<commit_message>
Made some changes to the user and developer guide, as well as updated the relevant diagrams in the developer guide.
</commit_message>
<xml_diff>
--- a/docs/Diagrams.pptx
+++ b/docs/Diagrams.pptx
@@ -211,7 +211,7 @@
           <a:p>
             <a:fld id="{F5CC4B3F-88C1-4FFA-B1B6-F41C21DC6924}" type="datetimeFigureOut">
               <a:rPr lang="en-US" smtClean="0"/>
-              <a:t>8/12/2018</a:t>
+              <a:t>10/2/18</a:t>
             </a:fld>
             <a:endParaRPr lang="en-US"/>
           </a:p>
@@ -741,7 +741,7 @@
           <a:p>
             <a:fld id="{78C97017-6FC3-485B-9764-EAC9E56C1D49}" type="datetimeFigureOut">
               <a:rPr lang="en-US" smtClean="0"/>
-              <a:t>8/12/2018</a:t>
+              <a:t>10/2/18</a:t>
             </a:fld>
             <a:endParaRPr lang="en-US"/>
           </a:p>
@@ -909,7 +909,7 @@
           <a:p>
             <a:fld id="{78C97017-6FC3-485B-9764-EAC9E56C1D49}" type="datetimeFigureOut">
               <a:rPr lang="en-US" smtClean="0"/>
-              <a:t>8/12/2018</a:t>
+              <a:t>10/2/18</a:t>
             </a:fld>
             <a:endParaRPr lang="en-US"/>
           </a:p>
@@ -1087,7 +1087,7 @@
           <a:p>
             <a:fld id="{78C97017-6FC3-485B-9764-EAC9E56C1D49}" type="datetimeFigureOut">
               <a:rPr lang="en-US" smtClean="0"/>
-              <a:t>8/12/2018</a:t>
+              <a:t>10/2/18</a:t>
             </a:fld>
             <a:endParaRPr lang="en-US"/>
           </a:p>
@@ -1255,7 +1255,7 @@
           <a:p>
             <a:fld id="{78C97017-6FC3-485B-9764-EAC9E56C1D49}" type="datetimeFigureOut">
               <a:rPr lang="en-US" smtClean="0"/>
-              <a:t>8/12/2018</a:t>
+              <a:t>10/2/18</a:t>
             </a:fld>
             <a:endParaRPr lang="en-US"/>
           </a:p>
@@ -1500,7 +1500,7 @@
           <a:p>
             <a:fld id="{78C97017-6FC3-485B-9764-EAC9E56C1D49}" type="datetimeFigureOut">
               <a:rPr lang="en-US" smtClean="0"/>
-              <a:t>8/12/2018</a:t>
+              <a:t>10/2/18</a:t>
             </a:fld>
             <a:endParaRPr lang="en-US"/>
           </a:p>
@@ -1785,7 +1785,7 @@
           <a:p>
             <a:fld id="{78C97017-6FC3-485B-9764-EAC9E56C1D49}" type="datetimeFigureOut">
               <a:rPr lang="en-US" smtClean="0"/>
-              <a:t>8/12/2018</a:t>
+              <a:t>10/2/18</a:t>
             </a:fld>
             <a:endParaRPr lang="en-US"/>
           </a:p>
@@ -2204,7 +2204,7 @@
           <a:p>
             <a:fld id="{78C97017-6FC3-485B-9764-EAC9E56C1D49}" type="datetimeFigureOut">
               <a:rPr lang="en-US" smtClean="0"/>
-              <a:t>8/12/2018</a:t>
+              <a:t>10/2/18</a:t>
             </a:fld>
             <a:endParaRPr lang="en-US"/>
           </a:p>
@@ -2321,7 +2321,7 @@
           <a:p>
             <a:fld id="{78C97017-6FC3-485B-9764-EAC9E56C1D49}" type="datetimeFigureOut">
               <a:rPr lang="en-US" smtClean="0"/>
-              <a:t>8/12/2018</a:t>
+              <a:t>10/2/18</a:t>
             </a:fld>
             <a:endParaRPr lang="en-US"/>
           </a:p>
@@ -2416,7 +2416,7 @@
           <a:p>
             <a:fld id="{78C97017-6FC3-485B-9764-EAC9E56C1D49}" type="datetimeFigureOut">
               <a:rPr lang="en-US" smtClean="0"/>
-              <a:t>8/12/2018</a:t>
+              <a:t>10/2/18</a:t>
             </a:fld>
             <a:endParaRPr lang="en-US"/>
           </a:p>
@@ -2691,7 +2691,7 @@
           <a:p>
             <a:fld id="{78C97017-6FC3-485B-9764-EAC9E56C1D49}" type="datetimeFigureOut">
               <a:rPr lang="en-US" smtClean="0"/>
-              <a:t>8/12/2018</a:t>
+              <a:t>10/2/18</a:t>
             </a:fld>
             <a:endParaRPr lang="en-US"/>
           </a:p>
@@ -2943,7 +2943,7 @@
           <a:p>
             <a:fld id="{78C97017-6FC3-485B-9764-EAC9E56C1D49}" type="datetimeFigureOut">
               <a:rPr lang="en-US" smtClean="0"/>
-              <a:t>8/12/2018</a:t>
+              <a:t>10/2/18</a:t>
             </a:fld>
             <a:endParaRPr lang="en-US"/>
           </a:p>
@@ -3154,7 +3154,7 @@
           <a:p>
             <a:fld id="{78C97017-6FC3-485B-9764-EAC9E56C1D49}" type="datetimeFigureOut">
               <a:rPr lang="en-US" smtClean="0"/>
-              <a:t>8/12/2018</a:t>
+              <a:t>10/2/18</a:t>
             </a:fld>
             <a:endParaRPr lang="en-US"/>
           </a:p>
@@ -4977,8 +4977,8 @@
           <a:p>
             <a:pPr algn="ctr"/>
             <a:r>
-              <a:rPr lang="en-US" sz="1050" dirty="0" err="1"/>
-              <a:t>CrearCommand</a:t>
+              <a:rPr lang="en-US" sz="1050"/>
+              <a:t>ClearCommand</a:t>
             </a:r>
             <a:endParaRPr lang="en-SG" sz="1050" dirty="0"/>
           </a:p>
@@ -6754,6 +6754,282 @@
               </a:rPr>
               <a:t>*</a:t>
             </a:r>
+          </a:p>
+        </p:txBody>
+      </p:sp>
+      <p:sp>
+        <p:nvSpPr>
+          <p:cNvPr id="74" name="Rectangle 73">
+            <a:extLst>
+              <a:ext uri="{FF2B5EF4-FFF2-40B4-BE49-F238E27FC236}">
+                <a16:creationId xmlns:a16="http://schemas.microsoft.com/office/drawing/2014/main" id="{9FC3B9EC-7F90-3249-A565-E448D0819549}"/>
+              </a:ext>
+            </a:extLst>
+          </p:cNvPr>
+          <p:cNvSpPr/>
+          <p:nvPr/>
+        </p:nvSpPr>
+        <p:spPr>
+          <a:xfrm>
+            <a:off x="8205607" y="5406124"/>
+            <a:ext cx="929296" cy="346760"/>
+          </a:xfrm>
+          <a:prstGeom prst="rect">
+            <a:avLst/>
+          </a:prstGeom>
+          <a:ln w="19050"/>
+          <a:effectLst/>
+        </p:spPr>
+        <p:style>
+          <a:lnRef idx="1">
+            <a:schemeClr val="accent4"/>
+          </a:lnRef>
+          <a:fillRef idx="2">
+            <a:schemeClr val="accent4"/>
+          </a:fillRef>
+          <a:effectRef idx="1">
+            <a:schemeClr val="accent4"/>
+          </a:effectRef>
+          <a:fontRef idx="minor">
+            <a:schemeClr val="dk1"/>
+          </a:fontRef>
+        </p:style>
+        <p:txBody>
+          <a:bodyPr rtlCol="0" anchor="ctr"/>
+          <a:lstStyle/>
+          <a:p>
+            <a:pPr algn="ctr"/>
+            <a:r>
+              <a:rPr lang="en-US" sz="1050" dirty="0"/>
+              <a:t>Curriculum</a:t>
+            </a:r>
+            <a:endParaRPr lang="en-SG" sz="1050" dirty="0"/>
+          </a:p>
+        </p:txBody>
+      </p:sp>
+      <p:cxnSp>
+        <p:nvCxnSpPr>
+          <p:cNvPr id="78" name="Straight Arrow Connector 77">
+            <a:extLst>
+              <a:ext uri="{FF2B5EF4-FFF2-40B4-BE49-F238E27FC236}">
+                <a16:creationId xmlns:a16="http://schemas.microsoft.com/office/drawing/2014/main" id="{2B6B342C-8D04-FF4F-9B74-4F19A52A7D69}"/>
+              </a:ext>
+            </a:extLst>
+          </p:cNvPr>
+          <p:cNvCxnSpPr>
+            <a:cxnSpLocks/>
+          </p:cNvCxnSpPr>
+          <p:nvPr/>
+        </p:nvCxnSpPr>
+        <p:spPr>
+          <a:xfrm>
+            <a:off x="7996056" y="5562600"/>
+            <a:ext cx="203994" cy="0"/>
+          </a:xfrm>
+          <a:prstGeom prst="straightConnector1">
+            <a:avLst/>
+          </a:prstGeom>
+          <a:ln w="19050">
+            <a:solidFill>
+              <a:srgbClr val="7030A0"/>
+            </a:solidFill>
+            <a:headEnd type="none" w="med" len="med"/>
+            <a:tailEnd type="arrow" w="med" len="med"/>
+          </a:ln>
+          <a:effectLst/>
+        </p:spPr>
+        <p:style>
+          <a:lnRef idx="1">
+            <a:schemeClr val="accent6"/>
+          </a:lnRef>
+          <a:fillRef idx="2">
+            <a:schemeClr val="accent6"/>
+          </a:fillRef>
+          <a:effectRef idx="1">
+            <a:schemeClr val="accent6"/>
+          </a:effectRef>
+          <a:fontRef idx="minor">
+            <a:schemeClr val="dk1"/>
+          </a:fontRef>
+        </p:style>
+      </p:cxnSp>
+      <p:cxnSp>
+        <p:nvCxnSpPr>
+          <p:cNvPr id="8" name="Straight Connector 7">
+            <a:extLst>
+              <a:ext uri="{FF2B5EF4-FFF2-40B4-BE49-F238E27FC236}">
+                <a16:creationId xmlns:a16="http://schemas.microsoft.com/office/drawing/2014/main" id="{E009D80B-3628-1A4F-ACF4-33FB32EB552C}"/>
+              </a:ext>
+            </a:extLst>
+          </p:cNvPr>
+          <p:cNvCxnSpPr>
+            <a:cxnSpLocks/>
+          </p:cNvCxnSpPr>
+          <p:nvPr/>
+        </p:nvCxnSpPr>
+        <p:spPr>
+          <a:xfrm>
+            <a:off x="7996056" y="5126380"/>
+            <a:ext cx="0" cy="436220"/>
+          </a:xfrm>
+          <a:prstGeom prst="line">
+            <a:avLst/>
+          </a:prstGeom>
+          <a:ln w="19050">
+            <a:solidFill>
+              <a:srgbClr val="7030A0"/>
+            </a:solidFill>
+          </a:ln>
+        </p:spPr>
+        <p:style>
+          <a:lnRef idx="1">
+            <a:schemeClr val="accent1"/>
+          </a:lnRef>
+          <a:fillRef idx="0">
+            <a:schemeClr val="accent1"/>
+          </a:fillRef>
+          <a:effectRef idx="0">
+            <a:schemeClr val="accent1"/>
+          </a:effectRef>
+          <a:fontRef idx="minor">
+            <a:schemeClr val="tx1"/>
+          </a:fontRef>
+        </p:style>
+      </p:cxnSp>
+      <p:cxnSp>
+        <p:nvCxnSpPr>
+          <p:cNvPr id="83" name="Straight Arrow Connector 82">
+            <a:extLst>
+              <a:ext uri="{FF2B5EF4-FFF2-40B4-BE49-F238E27FC236}">
+                <a16:creationId xmlns:a16="http://schemas.microsoft.com/office/drawing/2014/main" id="{84D044FA-5472-AC49-A1F6-81EA4BB8BB48}"/>
+              </a:ext>
+            </a:extLst>
+          </p:cNvPr>
+          <p:cNvCxnSpPr>
+            <a:cxnSpLocks/>
+            <a:stCxn id="74" idx="2"/>
+          </p:cNvCxnSpPr>
+          <p:nvPr/>
+        </p:nvCxnSpPr>
+        <p:spPr>
+          <a:xfrm flipH="1">
+            <a:off x="8664698" y="5752884"/>
+            <a:ext cx="5557" cy="265911"/>
+          </a:xfrm>
+          <a:prstGeom prst="straightConnector1">
+            <a:avLst/>
+          </a:prstGeom>
+          <a:ln w="19050">
+            <a:solidFill>
+              <a:srgbClr val="7030A0"/>
+            </a:solidFill>
+            <a:headEnd type="none" w="med" len="med"/>
+            <a:tailEnd type="arrow" w="med" len="med"/>
+          </a:ln>
+          <a:effectLst/>
+        </p:spPr>
+        <p:style>
+          <a:lnRef idx="1">
+            <a:schemeClr val="accent6"/>
+          </a:lnRef>
+          <a:fillRef idx="2">
+            <a:schemeClr val="accent6"/>
+          </a:fillRef>
+          <a:effectRef idx="1">
+            <a:schemeClr val="accent6"/>
+          </a:effectRef>
+          <a:fontRef idx="minor">
+            <a:schemeClr val="dk1"/>
+          </a:fontRef>
+        </p:style>
+      </p:cxnSp>
+      <p:sp>
+        <p:nvSpPr>
+          <p:cNvPr id="88" name="Rectangle 87">
+            <a:extLst>
+              <a:ext uri="{FF2B5EF4-FFF2-40B4-BE49-F238E27FC236}">
+                <a16:creationId xmlns:a16="http://schemas.microsoft.com/office/drawing/2014/main" id="{29CD13A2-16A8-2143-A025-6D7D81B2D214}"/>
+              </a:ext>
+            </a:extLst>
+          </p:cNvPr>
+          <p:cNvSpPr/>
+          <p:nvPr/>
+        </p:nvSpPr>
+        <p:spPr>
+          <a:xfrm>
+            <a:off x="8200050" y="6015724"/>
+            <a:ext cx="929296" cy="346760"/>
+          </a:xfrm>
+          <a:prstGeom prst="rect">
+            <a:avLst/>
+          </a:prstGeom>
+          <a:ln w="19050"/>
+          <a:effectLst/>
+        </p:spPr>
+        <p:style>
+          <a:lnRef idx="1">
+            <a:schemeClr val="accent4"/>
+          </a:lnRef>
+          <a:fillRef idx="2">
+            <a:schemeClr val="accent4"/>
+          </a:fillRef>
+          <a:effectRef idx="1">
+            <a:schemeClr val="accent4"/>
+          </a:effectRef>
+          <a:fontRef idx="minor">
+            <a:schemeClr val="dk1"/>
+          </a:fontRef>
+        </p:style>
+        <p:txBody>
+          <a:bodyPr rtlCol="0" anchor="ctr"/>
+          <a:lstStyle/>
+          <a:p>
+            <a:pPr algn="ctr"/>
+            <a:r>
+              <a:rPr lang="en-US" sz="1050" dirty="0" err="1"/>
+              <a:t>EnrolledClass</a:t>
+            </a:r>
+            <a:endParaRPr lang="en-SG" sz="1050" dirty="0"/>
+          </a:p>
+        </p:txBody>
+      </p:sp>
+      <p:sp>
+        <p:nvSpPr>
+          <p:cNvPr id="18" name="TextBox 17">
+            <a:extLst>
+              <a:ext uri="{FF2B5EF4-FFF2-40B4-BE49-F238E27FC236}">
+                <a16:creationId xmlns:a16="http://schemas.microsoft.com/office/drawing/2014/main" id="{9BA2C63F-6E5B-F749-81B3-1797FA7F68D3}"/>
+              </a:ext>
+            </a:extLst>
+          </p:cNvPr>
+          <p:cNvSpPr txBox="1"/>
+          <p:nvPr/>
+        </p:nvSpPr>
+        <p:spPr>
+          <a:xfrm>
+            <a:off x="8664698" y="5752883"/>
+            <a:ext cx="300082" cy="369332"/>
+          </a:xfrm>
+          <a:prstGeom prst="rect">
+            <a:avLst/>
+          </a:prstGeom>
+          <a:noFill/>
+        </p:spPr>
+        <p:txBody>
+          <a:bodyPr wrap="none" rtlCol="0">
+            <a:spAutoFit/>
+          </a:bodyPr>
+          <a:lstStyle/>
+          <a:p>
+            <a:r>
+              <a:rPr lang="en-US" dirty="0">
+                <a:solidFill>
+                  <a:srgbClr val="7030A0"/>
+                </a:solidFill>
+              </a:rPr>
+              <a:t>*</a:t>
+            </a:r>
+            <a:endParaRPr lang="en-US" dirty="0"/>
           </a:p>
         </p:txBody>
       </p:sp>

</xml_diff>

<commit_message>
add design architecture section for the Dev Guide
</commit_message>
<xml_diff>
--- a/docs/Diagrams.pptx
+++ b/docs/Diagrams.pptx
@@ -5,13 +5,14 @@
     <p:sldMasterId id="2147483648" r:id="rId1"/>
   </p:sldMasterIdLst>
   <p:notesMasterIdLst>
-    <p:notesMasterId r:id="rId6"/>
+    <p:notesMasterId r:id="rId7"/>
   </p:notesMasterIdLst>
   <p:sldIdLst>
     <p:sldId id="256" r:id="rId2"/>
     <p:sldId id="257" r:id="rId3"/>
     <p:sldId id="259" r:id="rId4"/>
     <p:sldId id="258" r:id="rId5"/>
+    <p:sldId id="260" r:id="rId6"/>
   </p:sldIdLst>
   <p:sldSz cx="9144000" cy="6858000" type="screen4x3"/>
   <p:notesSz cx="6858000" cy="9144000"/>
@@ -211,7 +212,7 @@
           <a:p>
             <a:fld id="{F5CC4B3F-88C1-4FFA-B1B6-F41C21DC6924}" type="datetimeFigureOut">
               <a:rPr lang="en-US" smtClean="0"/>
-              <a:t>8/12/2018</a:t>
+              <a:t>10/25/2018</a:t>
             </a:fld>
             <a:endParaRPr lang="en-US"/>
           </a:p>
@@ -741,7 +742,7 @@
           <a:p>
             <a:fld id="{78C97017-6FC3-485B-9764-EAC9E56C1D49}" type="datetimeFigureOut">
               <a:rPr lang="en-US" smtClean="0"/>
-              <a:t>8/12/2018</a:t>
+              <a:t>10/25/2018</a:t>
             </a:fld>
             <a:endParaRPr lang="en-US"/>
           </a:p>
@@ -909,7 +910,7 @@
           <a:p>
             <a:fld id="{78C97017-6FC3-485B-9764-EAC9E56C1D49}" type="datetimeFigureOut">
               <a:rPr lang="en-US" smtClean="0"/>
-              <a:t>8/12/2018</a:t>
+              <a:t>10/25/2018</a:t>
             </a:fld>
             <a:endParaRPr lang="en-US"/>
           </a:p>
@@ -1087,7 +1088,7 @@
           <a:p>
             <a:fld id="{78C97017-6FC3-485B-9764-EAC9E56C1D49}" type="datetimeFigureOut">
               <a:rPr lang="en-US" smtClean="0"/>
-              <a:t>8/12/2018</a:t>
+              <a:t>10/25/2018</a:t>
             </a:fld>
             <a:endParaRPr lang="en-US"/>
           </a:p>
@@ -1255,7 +1256,7 @@
           <a:p>
             <a:fld id="{78C97017-6FC3-485B-9764-EAC9E56C1D49}" type="datetimeFigureOut">
               <a:rPr lang="en-US" smtClean="0"/>
-              <a:t>8/12/2018</a:t>
+              <a:t>10/25/2018</a:t>
             </a:fld>
             <a:endParaRPr lang="en-US"/>
           </a:p>
@@ -1500,7 +1501,7 @@
           <a:p>
             <a:fld id="{78C97017-6FC3-485B-9764-EAC9E56C1D49}" type="datetimeFigureOut">
               <a:rPr lang="en-US" smtClean="0"/>
-              <a:t>8/12/2018</a:t>
+              <a:t>10/25/2018</a:t>
             </a:fld>
             <a:endParaRPr lang="en-US"/>
           </a:p>
@@ -1785,7 +1786,7 @@
           <a:p>
             <a:fld id="{78C97017-6FC3-485B-9764-EAC9E56C1D49}" type="datetimeFigureOut">
               <a:rPr lang="en-US" smtClean="0"/>
-              <a:t>8/12/2018</a:t>
+              <a:t>10/25/2018</a:t>
             </a:fld>
             <a:endParaRPr lang="en-US"/>
           </a:p>
@@ -2204,7 +2205,7 @@
           <a:p>
             <a:fld id="{78C97017-6FC3-485B-9764-EAC9E56C1D49}" type="datetimeFigureOut">
               <a:rPr lang="en-US" smtClean="0"/>
-              <a:t>8/12/2018</a:t>
+              <a:t>10/25/2018</a:t>
             </a:fld>
             <a:endParaRPr lang="en-US"/>
           </a:p>
@@ -2321,7 +2322,7 @@
           <a:p>
             <a:fld id="{78C97017-6FC3-485B-9764-EAC9E56C1D49}" type="datetimeFigureOut">
               <a:rPr lang="en-US" smtClean="0"/>
-              <a:t>8/12/2018</a:t>
+              <a:t>10/25/2018</a:t>
             </a:fld>
             <a:endParaRPr lang="en-US"/>
           </a:p>
@@ -2416,7 +2417,7 @@
           <a:p>
             <a:fld id="{78C97017-6FC3-485B-9764-EAC9E56C1D49}" type="datetimeFigureOut">
               <a:rPr lang="en-US" smtClean="0"/>
-              <a:t>8/12/2018</a:t>
+              <a:t>10/25/2018</a:t>
             </a:fld>
             <a:endParaRPr lang="en-US"/>
           </a:p>
@@ -2691,7 +2692,7 @@
           <a:p>
             <a:fld id="{78C97017-6FC3-485B-9764-EAC9E56C1D49}" type="datetimeFigureOut">
               <a:rPr lang="en-US" smtClean="0"/>
-              <a:t>8/12/2018</a:t>
+              <a:t>10/25/2018</a:t>
             </a:fld>
             <a:endParaRPr lang="en-US"/>
           </a:p>
@@ -2943,7 +2944,7 @@
           <a:p>
             <a:fld id="{78C97017-6FC3-485B-9764-EAC9E56C1D49}" type="datetimeFigureOut">
               <a:rPr lang="en-US" smtClean="0"/>
-              <a:t>8/12/2018</a:t>
+              <a:t>10/25/2018</a:t>
             </a:fld>
             <a:endParaRPr lang="en-US"/>
           </a:p>
@@ -3154,7 +3155,7 @@
           <a:p>
             <a:fld id="{78C97017-6FC3-485B-9764-EAC9E56C1D49}" type="datetimeFigureOut">
               <a:rPr lang="en-US" smtClean="0"/>
-              <a:t>8/12/2018</a:t>
+              <a:t>10/25/2018</a:t>
             </a:fld>
             <a:endParaRPr lang="en-US"/>
           </a:p>
@@ -9505,6 +9506,1267 @@
     <p:extLst>
       <p:ext uri="{BB962C8B-B14F-4D97-AF65-F5344CB8AC3E}">
         <p14:creationId xmlns:p14="http://schemas.microsoft.com/office/powerpoint/2010/main" val="2619388383"/>
+      </p:ext>
+    </p:extLst>
+  </p:cSld>
+  <p:clrMapOvr>
+    <a:masterClrMapping/>
+  </p:clrMapOvr>
+</p:sld>
+</file>
+
+<file path=ppt/slides/slide5.xml><?xml version="1.0" encoding="utf-8"?>
+<p:sld xmlns:a="http://schemas.openxmlformats.org/drawingml/2006/main" xmlns:r="http://schemas.openxmlformats.org/officeDocument/2006/relationships" xmlns:p="http://schemas.openxmlformats.org/presentationml/2006/main">
+  <p:cSld>
+    <p:spTree>
+      <p:nvGrpSpPr>
+        <p:cNvPr id="1" name=""/>
+        <p:cNvGrpSpPr/>
+        <p:nvPr/>
+      </p:nvGrpSpPr>
+      <p:grpSpPr>
+        <a:xfrm>
+          <a:off x="0" y="0"/>
+          <a:ext cx="0" cy="0"/>
+          <a:chOff x="0" y="0"/>
+          <a:chExt cx="0" cy="0"/>
+        </a:xfrm>
+      </p:grpSpPr>
+      <p:grpSp>
+        <p:nvGrpSpPr>
+          <p:cNvPr id="3" name="Group 2">
+            <a:extLst>
+              <a:ext uri="{FF2B5EF4-FFF2-40B4-BE49-F238E27FC236}">
+                <a16:creationId xmlns:a16="http://schemas.microsoft.com/office/drawing/2014/main" id="{4E9AD5C6-7AC1-4F40-88FB-EDAB39A55F4A}"/>
+              </a:ext>
+            </a:extLst>
+          </p:cNvPr>
+          <p:cNvGrpSpPr/>
+          <p:nvPr/>
+        </p:nvGrpSpPr>
+        <p:grpSpPr>
+          <a:xfrm>
+            <a:off x="1595718" y="497542"/>
+            <a:ext cx="9377082" cy="4684058"/>
+            <a:chOff x="1268504" y="497541"/>
+            <a:chExt cx="9906000" cy="5629835"/>
+          </a:xfrm>
+        </p:grpSpPr>
+        <p:sp>
+          <p:nvSpPr>
+            <p:cNvPr id="4" name="Rectangle: Rounded Corners 3">
+              <a:extLst>
+                <a:ext uri="{FF2B5EF4-FFF2-40B4-BE49-F238E27FC236}">
+                  <a16:creationId xmlns:a16="http://schemas.microsoft.com/office/drawing/2014/main" id="{7094D7BB-B139-40F2-ABF0-066571138391}"/>
+                </a:ext>
+              </a:extLst>
+            </p:cNvPr>
+            <p:cNvSpPr/>
+            <p:nvPr/>
+          </p:nvSpPr>
+          <p:spPr>
+            <a:xfrm>
+              <a:off x="1268504" y="497541"/>
+              <a:ext cx="9906000" cy="5629835"/>
+            </a:xfrm>
+            <a:prstGeom prst="roundRect">
+              <a:avLst/>
+            </a:prstGeom>
+            <a:solidFill>
+              <a:schemeClr val="bg1">
+                <a:lumMod val="85000"/>
+              </a:schemeClr>
+            </a:solidFill>
+            <a:ln>
+              <a:solidFill>
+                <a:schemeClr val="bg1">
+                  <a:lumMod val="65000"/>
+                </a:schemeClr>
+              </a:solidFill>
+            </a:ln>
+          </p:spPr>
+          <p:style>
+            <a:lnRef idx="2">
+              <a:schemeClr val="accent1">
+                <a:shade val="50000"/>
+              </a:schemeClr>
+            </a:lnRef>
+            <a:fillRef idx="1">
+              <a:schemeClr val="accent1"/>
+            </a:fillRef>
+            <a:effectRef idx="0">
+              <a:schemeClr val="accent1"/>
+            </a:effectRef>
+            <a:fontRef idx="minor">
+              <a:schemeClr val="lt1"/>
+            </a:fontRef>
+          </p:style>
+          <p:txBody>
+            <a:bodyPr rtlCol="0" anchor="ctr"/>
+            <a:lstStyle/>
+            <a:p>
+              <a:pPr algn="ctr"/>
+              <a:endParaRPr lang="en-US"/>
+            </a:p>
+          </p:txBody>
+        </p:sp>
+        <p:grpSp>
+          <p:nvGrpSpPr>
+            <p:cNvPr id="5" name="Group 4">
+              <a:extLst>
+                <a:ext uri="{FF2B5EF4-FFF2-40B4-BE49-F238E27FC236}">
+                  <a16:creationId xmlns:a16="http://schemas.microsoft.com/office/drawing/2014/main" id="{8FFC8E17-8560-4423-BEA9-8BBF6F9AF2FB}"/>
+                </a:ext>
+              </a:extLst>
+            </p:cNvPr>
+            <p:cNvGrpSpPr/>
+            <p:nvPr/>
+          </p:nvGrpSpPr>
+          <p:grpSpPr>
+            <a:xfrm>
+              <a:off x="1786805" y="1777072"/>
+              <a:ext cx="8726903" cy="3761850"/>
+              <a:chOff x="1042736" y="1777072"/>
+              <a:chExt cx="8726903" cy="3761850"/>
+            </a:xfrm>
+          </p:grpSpPr>
+          <p:grpSp>
+            <p:nvGrpSpPr>
+              <p:cNvPr id="6" name="Group 5">
+                <a:extLst>
+                  <a:ext uri="{FF2B5EF4-FFF2-40B4-BE49-F238E27FC236}">
+                    <a16:creationId xmlns:a16="http://schemas.microsoft.com/office/drawing/2014/main" id="{9DDDA64D-B12A-4B2F-9593-797D661B3BB2}"/>
+                  </a:ext>
+                </a:extLst>
+              </p:cNvPr>
+              <p:cNvGrpSpPr/>
+              <p:nvPr/>
+            </p:nvGrpSpPr>
+            <p:grpSpPr>
+              <a:xfrm>
+                <a:off x="7186862" y="1777072"/>
+                <a:ext cx="2582777" cy="1326801"/>
+                <a:chOff x="8021052" y="1026877"/>
+                <a:chExt cx="2855494" cy="1395481"/>
+              </a:xfrm>
+            </p:grpSpPr>
+            <p:sp>
+              <p:nvSpPr>
+                <p:cNvPr id="29" name="Rectangle: Rounded Corners 28">
+                  <a:extLst>
+                    <a:ext uri="{FF2B5EF4-FFF2-40B4-BE49-F238E27FC236}">
+                      <a16:creationId xmlns:a16="http://schemas.microsoft.com/office/drawing/2014/main" id="{6D4DA044-D6CD-41D7-B46B-2C9BA784C423}"/>
+                    </a:ext>
+                  </a:extLst>
+                </p:cNvPr>
+                <p:cNvSpPr/>
+                <p:nvPr/>
+              </p:nvSpPr>
+              <p:spPr>
+                <a:xfrm>
+                  <a:off x="8021052" y="1026877"/>
+                  <a:ext cx="2855494" cy="1395481"/>
+                </a:xfrm>
+                <a:prstGeom prst="roundRect">
+                  <a:avLst/>
+                </a:prstGeom>
+                <a:solidFill>
+                  <a:srgbClr val="8E1DEB"/>
+                </a:solidFill>
+                <a:ln>
+                  <a:solidFill>
+                    <a:srgbClr val="8E1DEB"/>
+                  </a:solidFill>
+                </a:ln>
+              </p:spPr>
+              <p:style>
+                <a:lnRef idx="2">
+                  <a:schemeClr val="accent1">
+                    <a:shade val="50000"/>
+                  </a:schemeClr>
+                </a:lnRef>
+                <a:fillRef idx="1">
+                  <a:schemeClr val="accent1"/>
+                </a:fillRef>
+                <a:effectRef idx="0">
+                  <a:schemeClr val="accent1"/>
+                </a:effectRef>
+                <a:fontRef idx="minor">
+                  <a:schemeClr val="lt1"/>
+                </a:fontRef>
+              </p:style>
+              <p:txBody>
+                <a:bodyPr rtlCol="0" anchor="ctr"/>
+                <a:lstStyle/>
+                <a:p>
+                  <a:pPr algn="ctr"/>
+                  <a:endParaRPr lang="en-US"/>
+                </a:p>
+              </p:txBody>
+            </p:sp>
+            <p:sp>
+              <p:nvSpPr>
+                <p:cNvPr id="30" name="TextBox 29">
+                  <a:extLst>
+                    <a:ext uri="{FF2B5EF4-FFF2-40B4-BE49-F238E27FC236}">
+                      <a16:creationId xmlns:a16="http://schemas.microsoft.com/office/drawing/2014/main" id="{43E1F83D-6EA1-4FB6-A2DF-C00D901AD5C7}"/>
+                    </a:ext>
+                  </a:extLst>
+                </p:cNvPr>
+                <p:cNvSpPr txBox="1"/>
+                <p:nvPr/>
+              </p:nvSpPr>
+              <p:spPr>
+                <a:xfrm>
+                  <a:off x="8984679" y="1440251"/>
+                  <a:ext cx="1876926" cy="583604"/>
+                </a:xfrm>
+                <a:prstGeom prst="rect">
+                  <a:avLst/>
+                </a:prstGeom>
+                <a:noFill/>
+                <a:ln>
+                  <a:solidFill>
+                    <a:srgbClr val="8E1DEB"/>
+                  </a:solidFill>
+                </a:ln>
+              </p:spPr>
+              <p:txBody>
+                <a:bodyPr wrap="square" rtlCol="0">
+                  <a:spAutoFit/>
+                </a:bodyPr>
+                <a:lstStyle/>
+                <a:p>
+                  <a:r>
+                    <a:rPr lang="en-US" sz="2400" dirty="0">
+                      <a:solidFill>
+                        <a:schemeClr val="bg1"/>
+                      </a:solidFill>
+                    </a:rPr>
+                    <a:t>Data</a:t>
+                  </a:r>
+                </a:p>
+              </p:txBody>
+            </p:sp>
+          </p:grpSp>
+          <p:grpSp>
+            <p:nvGrpSpPr>
+              <p:cNvPr id="7" name="Group 6">
+                <a:extLst>
+                  <a:ext uri="{FF2B5EF4-FFF2-40B4-BE49-F238E27FC236}">
+                    <a16:creationId xmlns:a16="http://schemas.microsoft.com/office/drawing/2014/main" id="{46317A03-C7A8-49CB-A49F-0BF19A8828AF}"/>
+                  </a:ext>
+                </a:extLst>
+              </p:cNvPr>
+              <p:cNvGrpSpPr/>
+              <p:nvPr/>
+            </p:nvGrpSpPr>
+            <p:grpSpPr>
+              <a:xfrm>
+                <a:off x="3974431" y="1864465"/>
+                <a:ext cx="1876926" cy="1159863"/>
+                <a:chOff x="3974431" y="1868631"/>
+                <a:chExt cx="1876926" cy="1251284"/>
+              </a:xfrm>
+            </p:grpSpPr>
+            <p:sp>
+              <p:nvSpPr>
+                <p:cNvPr id="27" name="Rectangle: Rounded Corners 26">
+                  <a:extLst>
+                    <a:ext uri="{FF2B5EF4-FFF2-40B4-BE49-F238E27FC236}">
+                      <a16:creationId xmlns:a16="http://schemas.microsoft.com/office/drawing/2014/main" id="{D301BA87-EA5F-44C4-91DE-5A5619FF3AB0}"/>
+                    </a:ext>
+                  </a:extLst>
+                </p:cNvPr>
+                <p:cNvSpPr/>
+                <p:nvPr/>
+              </p:nvSpPr>
+              <p:spPr>
+                <a:xfrm>
+                  <a:off x="3974431" y="1868631"/>
+                  <a:ext cx="1876926" cy="1251284"/>
+                </a:xfrm>
+                <a:prstGeom prst="roundRect">
+                  <a:avLst/>
+                </a:prstGeom>
+              </p:spPr>
+              <p:style>
+                <a:lnRef idx="2">
+                  <a:schemeClr val="accent1">
+                    <a:shade val="50000"/>
+                  </a:schemeClr>
+                </a:lnRef>
+                <a:fillRef idx="1">
+                  <a:schemeClr val="accent1"/>
+                </a:fillRef>
+                <a:effectRef idx="0">
+                  <a:schemeClr val="accent1"/>
+                </a:effectRef>
+                <a:fontRef idx="minor">
+                  <a:schemeClr val="lt1"/>
+                </a:fontRef>
+              </p:style>
+              <p:txBody>
+                <a:bodyPr rtlCol="0" anchor="ctr"/>
+                <a:lstStyle/>
+                <a:p>
+                  <a:pPr algn="ctr"/>
+                  <a:endParaRPr lang="en-US" sz="2400"/>
+                </a:p>
+              </p:txBody>
+            </p:sp>
+            <p:sp>
+              <p:nvSpPr>
+                <p:cNvPr id="28" name="TextBox 27">
+                  <a:extLst>
+                    <a:ext uri="{FF2B5EF4-FFF2-40B4-BE49-F238E27FC236}">
+                      <a16:creationId xmlns:a16="http://schemas.microsoft.com/office/drawing/2014/main" id="{AAFA2BD8-AC3E-4923-8424-7407993ED9CC}"/>
+                    </a:ext>
+                  </a:extLst>
+                </p:cNvPr>
+                <p:cNvSpPr txBox="1"/>
+                <p:nvPr/>
+              </p:nvSpPr>
+              <p:spPr>
+                <a:xfrm>
+                  <a:off x="4423610" y="2221557"/>
+                  <a:ext cx="1010652" cy="461665"/>
+                </a:xfrm>
+                <a:prstGeom prst="rect">
+                  <a:avLst/>
+                </a:prstGeom>
+                <a:noFill/>
+              </p:spPr>
+              <p:txBody>
+                <a:bodyPr wrap="square" rtlCol="0">
+                  <a:spAutoFit/>
+                </a:bodyPr>
+                <a:lstStyle/>
+                <a:p>
+                  <a:r>
+                    <a:rPr lang="en-US" sz="2400" dirty="0">
+                      <a:solidFill>
+                        <a:schemeClr val="bg1"/>
+                      </a:solidFill>
+                    </a:rPr>
+                    <a:t>Logic</a:t>
+                  </a:r>
+                </a:p>
+              </p:txBody>
+            </p:sp>
+          </p:grpSp>
+          <p:grpSp>
+            <p:nvGrpSpPr>
+              <p:cNvPr id="8" name="Group 7">
+                <a:extLst>
+                  <a:ext uri="{FF2B5EF4-FFF2-40B4-BE49-F238E27FC236}">
+                    <a16:creationId xmlns:a16="http://schemas.microsoft.com/office/drawing/2014/main" id="{15DB32CB-91C2-4ADA-BB62-9CBD2D07B4B8}"/>
+                  </a:ext>
+                </a:extLst>
+              </p:cNvPr>
+              <p:cNvGrpSpPr/>
+              <p:nvPr/>
+            </p:nvGrpSpPr>
+            <p:grpSpPr>
+              <a:xfrm>
+                <a:off x="3797967" y="4436301"/>
+                <a:ext cx="2229853" cy="1102621"/>
+                <a:chOff x="4363452" y="4832866"/>
+                <a:chExt cx="2229853" cy="1395481"/>
+              </a:xfrm>
+            </p:grpSpPr>
+            <p:sp>
+              <p:nvSpPr>
+                <p:cNvPr id="25" name="Rectangle: Rounded Corners 24">
+                  <a:extLst>
+                    <a:ext uri="{FF2B5EF4-FFF2-40B4-BE49-F238E27FC236}">
+                      <a16:creationId xmlns:a16="http://schemas.microsoft.com/office/drawing/2014/main" id="{39C25D7D-C05E-4082-B6B9-8E09F3728CD0}"/>
+                    </a:ext>
+                  </a:extLst>
+                </p:cNvPr>
+                <p:cNvSpPr/>
+                <p:nvPr/>
+              </p:nvSpPr>
+              <p:spPr>
+                <a:xfrm>
+                  <a:off x="4363452" y="4832866"/>
+                  <a:ext cx="2229853" cy="1395481"/>
+                </a:xfrm>
+                <a:prstGeom prst="roundRect">
+                  <a:avLst/>
+                </a:prstGeom>
+                <a:solidFill>
+                  <a:srgbClr val="92D050"/>
+                </a:solidFill>
+                <a:ln>
+                  <a:solidFill>
+                    <a:srgbClr val="92D050"/>
+                  </a:solidFill>
+                </a:ln>
+              </p:spPr>
+              <p:style>
+                <a:lnRef idx="2">
+                  <a:schemeClr val="accent1">
+                    <a:shade val="50000"/>
+                  </a:schemeClr>
+                </a:lnRef>
+                <a:fillRef idx="1">
+                  <a:schemeClr val="accent1"/>
+                </a:fillRef>
+                <a:effectRef idx="0">
+                  <a:schemeClr val="accent1"/>
+                </a:effectRef>
+                <a:fontRef idx="minor">
+                  <a:schemeClr val="lt1"/>
+                </a:fontRef>
+              </p:style>
+              <p:txBody>
+                <a:bodyPr rtlCol="0" anchor="ctr"/>
+                <a:lstStyle/>
+                <a:p>
+                  <a:pPr algn="ctr"/>
+                  <a:endParaRPr lang="en-US" sz="2400" dirty="0"/>
+                </a:p>
+              </p:txBody>
+            </p:sp>
+            <p:sp>
+              <p:nvSpPr>
+                <p:cNvPr id="26" name="TextBox 25">
+                  <a:extLst>
+                    <a:ext uri="{FF2B5EF4-FFF2-40B4-BE49-F238E27FC236}">
+                      <a16:creationId xmlns:a16="http://schemas.microsoft.com/office/drawing/2014/main" id="{F60A93C3-A54F-4FBE-B247-41B9ED997978}"/>
+                    </a:ext>
+                  </a:extLst>
+                </p:cNvPr>
+                <p:cNvSpPr txBox="1"/>
+                <p:nvPr/>
+              </p:nvSpPr>
+              <p:spPr>
+                <a:xfrm>
+                  <a:off x="4908884" y="5258075"/>
+                  <a:ext cx="1195755" cy="533000"/>
+                </a:xfrm>
+                <a:prstGeom prst="rect">
+                  <a:avLst/>
+                </a:prstGeom>
+                <a:noFill/>
+              </p:spPr>
+              <p:txBody>
+                <a:bodyPr wrap="square" rtlCol="0">
+                  <a:spAutoFit/>
+                </a:bodyPr>
+                <a:lstStyle/>
+                <a:p>
+                  <a:r>
+                    <a:rPr lang="en-US" sz="2400" dirty="0">
+                      <a:solidFill>
+                        <a:schemeClr val="bg1"/>
+                      </a:solidFill>
+                    </a:rPr>
+                    <a:t>Storage</a:t>
+                  </a:r>
+                </a:p>
+              </p:txBody>
+            </p:sp>
+          </p:grpSp>
+          <p:cxnSp>
+            <p:nvCxnSpPr>
+              <p:cNvPr id="9" name="Straight Arrow Connector 8">
+                <a:extLst>
+                  <a:ext uri="{FF2B5EF4-FFF2-40B4-BE49-F238E27FC236}">
+                    <a16:creationId xmlns:a16="http://schemas.microsoft.com/office/drawing/2014/main" id="{098E8ED0-A06C-47EA-91DD-CB0948B18E32}"/>
+                  </a:ext>
+                </a:extLst>
+              </p:cNvPr>
+              <p:cNvCxnSpPr>
+                <a:cxnSpLocks/>
+                <a:stCxn id="22" idx="3"/>
+                <a:endCxn id="27" idx="1"/>
+              </p:cNvCxnSpPr>
+              <p:nvPr/>
+            </p:nvCxnSpPr>
+            <p:spPr>
+              <a:xfrm flipV="1">
+                <a:off x="2878230" y="2444397"/>
+                <a:ext cx="1096202" cy="6482"/>
+              </a:xfrm>
+              <a:prstGeom prst="straightConnector1">
+                <a:avLst/>
+              </a:prstGeom>
+              <a:ln w="28575">
+                <a:solidFill>
+                  <a:srgbClr val="C93F3F"/>
+                </a:solidFill>
+                <a:tailEnd type="triangle"/>
+              </a:ln>
+            </p:spPr>
+            <p:style>
+              <a:lnRef idx="1">
+                <a:schemeClr val="accent1"/>
+              </a:lnRef>
+              <a:fillRef idx="0">
+                <a:schemeClr val="accent1"/>
+              </a:fillRef>
+              <a:effectRef idx="0">
+                <a:schemeClr val="accent1"/>
+              </a:effectRef>
+              <a:fontRef idx="minor">
+                <a:schemeClr val="tx1"/>
+              </a:fontRef>
+            </p:style>
+          </p:cxnSp>
+          <p:grpSp>
+            <p:nvGrpSpPr>
+              <p:cNvPr id="10" name="Group 9">
+                <a:extLst>
+                  <a:ext uri="{FF2B5EF4-FFF2-40B4-BE49-F238E27FC236}">
+                    <a16:creationId xmlns:a16="http://schemas.microsoft.com/office/drawing/2014/main" id="{131D5762-BB2B-4609-BA57-509DCC2DD942}"/>
+                  </a:ext>
+                </a:extLst>
+              </p:cNvPr>
+              <p:cNvGrpSpPr/>
+              <p:nvPr/>
+            </p:nvGrpSpPr>
+            <p:grpSpPr>
+              <a:xfrm>
+                <a:off x="1042736" y="1886215"/>
+                <a:ext cx="1876917" cy="2725061"/>
+                <a:chOff x="1042736" y="1868631"/>
+                <a:chExt cx="1876917" cy="2725061"/>
+              </a:xfrm>
+            </p:grpSpPr>
+            <p:grpSp>
+              <p:nvGrpSpPr>
+                <p:cNvPr id="21" name="Group 20">
+                  <a:extLst>
+                    <a:ext uri="{FF2B5EF4-FFF2-40B4-BE49-F238E27FC236}">
+                      <a16:creationId xmlns:a16="http://schemas.microsoft.com/office/drawing/2014/main" id="{F557E534-F8DD-4A01-A277-88786AF926D9}"/>
+                    </a:ext>
+                  </a:extLst>
+                </p:cNvPr>
+                <p:cNvGrpSpPr/>
+                <p:nvPr/>
+              </p:nvGrpSpPr>
+              <p:grpSpPr>
+                <a:xfrm>
+                  <a:off x="1042736" y="1868631"/>
+                  <a:ext cx="1876917" cy="2725061"/>
+                  <a:chOff x="1122945" y="1171074"/>
+                  <a:chExt cx="1876917" cy="3160294"/>
+                </a:xfrm>
+              </p:grpSpPr>
+              <p:sp>
+                <p:nvSpPr>
+                  <p:cNvPr id="23" name="Rectangle: Rounded Corners 22">
+                    <a:extLst>
+                      <a:ext uri="{FF2B5EF4-FFF2-40B4-BE49-F238E27FC236}">
+                        <a16:creationId xmlns:a16="http://schemas.microsoft.com/office/drawing/2014/main" id="{5908DAC2-FBED-4E18-A13E-5DC126DBA542}"/>
+                      </a:ext>
+                    </a:extLst>
+                  </p:cNvPr>
+                  <p:cNvSpPr/>
+                  <p:nvPr/>
+                </p:nvSpPr>
+                <p:spPr>
+                  <a:xfrm>
+                    <a:off x="1122945" y="1171074"/>
+                    <a:ext cx="1876917" cy="3160294"/>
+                  </a:xfrm>
+                  <a:prstGeom prst="roundRect">
+                    <a:avLst/>
+                  </a:prstGeom>
+                  <a:solidFill>
+                    <a:srgbClr val="C93F3F"/>
+                  </a:solidFill>
+                  <a:ln>
+                    <a:solidFill>
+                      <a:srgbClr val="C00000"/>
+                    </a:solidFill>
+                  </a:ln>
+                </p:spPr>
+                <p:style>
+                  <a:lnRef idx="2">
+                    <a:schemeClr val="accent1">
+                      <a:shade val="50000"/>
+                    </a:schemeClr>
+                  </a:lnRef>
+                  <a:fillRef idx="1">
+                    <a:schemeClr val="accent1"/>
+                  </a:fillRef>
+                  <a:effectRef idx="0">
+                    <a:schemeClr val="accent1"/>
+                  </a:effectRef>
+                  <a:fontRef idx="minor">
+                    <a:schemeClr val="lt1"/>
+                  </a:fontRef>
+                </p:style>
+                <p:txBody>
+                  <a:bodyPr rtlCol="0" anchor="ctr"/>
+                  <a:lstStyle/>
+                  <a:p>
+                    <a:pPr algn="ctr"/>
+                    <a:endParaRPr lang="en-US" dirty="0"/>
+                  </a:p>
+                </p:txBody>
+              </p:sp>
+              <p:sp>
+                <p:nvSpPr>
+                  <p:cNvPr id="24" name="TextBox 23">
+                    <a:extLst>
+                      <a:ext uri="{FF2B5EF4-FFF2-40B4-BE49-F238E27FC236}">
+                        <a16:creationId xmlns:a16="http://schemas.microsoft.com/office/drawing/2014/main" id="{B067E048-3769-45BA-AF03-5429FAE66C5F}"/>
+                      </a:ext>
+                    </a:extLst>
+                  </p:cNvPr>
+                  <p:cNvSpPr txBox="1"/>
+                  <p:nvPr/>
+                </p:nvSpPr>
+                <p:spPr>
+                  <a:xfrm>
+                    <a:off x="1303156" y="2506436"/>
+                    <a:ext cx="1530693" cy="562259"/>
+                  </a:xfrm>
+                  <a:prstGeom prst="rect">
+                    <a:avLst/>
+                  </a:prstGeom>
+                  <a:noFill/>
+                </p:spPr>
+                <p:txBody>
+                  <a:bodyPr wrap="square" rtlCol="0">
+                    <a:spAutoFit/>
+                  </a:bodyPr>
+                  <a:lstStyle/>
+                  <a:p>
+                    <a:r>
+                      <a:rPr lang="en-US" sz="2400" dirty="0">
+                        <a:solidFill>
+                          <a:schemeClr val="bg1"/>
+                        </a:solidFill>
+                      </a:rPr>
+                      <a:t>Main / UI</a:t>
+                    </a:r>
+                  </a:p>
+                </p:txBody>
+              </p:sp>
+            </p:grpSp>
+            <p:sp>
+              <p:nvSpPr>
+                <p:cNvPr id="22" name="TextBox 21">
+                  <a:extLst>
+                    <a:ext uri="{FF2B5EF4-FFF2-40B4-BE49-F238E27FC236}">
+                      <a16:creationId xmlns:a16="http://schemas.microsoft.com/office/drawing/2014/main" id="{A766A0B8-8AD1-4D5F-BDD0-00A063A810D0}"/>
+                    </a:ext>
+                  </a:extLst>
+                </p:cNvPr>
+                <p:cNvSpPr txBox="1"/>
+                <p:nvPr/>
+              </p:nvSpPr>
+              <p:spPr>
+                <a:xfrm>
+                  <a:off x="1347538" y="2248628"/>
+                  <a:ext cx="1530692" cy="369332"/>
+                </a:xfrm>
+                <a:prstGeom prst="rect">
+                  <a:avLst/>
+                </a:prstGeom>
+                <a:noFill/>
+              </p:spPr>
+              <p:txBody>
+                <a:bodyPr wrap="square" rtlCol="0">
+                  <a:spAutoFit/>
+                </a:bodyPr>
+                <a:lstStyle/>
+                <a:p>
+                  <a:endParaRPr lang="en-US" dirty="0"/>
+                </a:p>
+              </p:txBody>
+            </p:sp>
+          </p:grpSp>
+          <p:cxnSp>
+            <p:nvCxnSpPr>
+              <p:cNvPr id="11" name="Straight Arrow Connector 10">
+                <a:extLst>
+                  <a:ext uri="{FF2B5EF4-FFF2-40B4-BE49-F238E27FC236}">
+                    <a16:creationId xmlns:a16="http://schemas.microsoft.com/office/drawing/2014/main" id="{44D9FACA-EF2F-4922-A551-230FC2A0ED1B}"/>
+                  </a:ext>
+                </a:extLst>
+              </p:cNvPr>
+              <p:cNvCxnSpPr>
+                <a:cxnSpLocks/>
+                <a:stCxn id="27" idx="3"/>
+                <a:endCxn id="29" idx="1"/>
+              </p:cNvCxnSpPr>
+              <p:nvPr/>
+            </p:nvCxnSpPr>
+            <p:spPr>
+              <a:xfrm flipV="1">
+                <a:off x="5851357" y="2440473"/>
+                <a:ext cx="1335505" cy="3924"/>
+              </a:xfrm>
+              <a:prstGeom prst="straightConnector1">
+                <a:avLst/>
+              </a:prstGeom>
+              <a:ln w="38100">
+                <a:tailEnd type="triangle"/>
+              </a:ln>
+            </p:spPr>
+            <p:style>
+              <a:lnRef idx="1">
+                <a:schemeClr val="accent1"/>
+              </a:lnRef>
+              <a:fillRef idx="0">
+                <a:schemeClr val="accent1"/>
+              </a:fillRef>
+              <a:effectRef idx="0">
+                <a:schemeClr val="accent1"/>
+              </a:effectRef>
+              <a:fontRef idx="minor">
+                <a:schemeClr val="tx1"/>
+              </a:fontRef>
+            </p:style>
+          </p:cxnSp>
+          <p:cxnSp>
+            <p:nvCxnSpPr>
+              <p:cNvPr id="12" name="Connector: Elbow 11">
+                <a:extLst>
+                  <a:ext uri="{FF2B5EF4-FFF2-40B4-BE49-F238E27FC236}">
+                    <a16:creationId xmlns:a16="http://schemas.microsoft.com/office/drawing/2014/main" id="{372C3C1D-B790-4F3D-BE19-49F7064C7DF6}"/>
+                  </a:ext>
+                </a:extLst>
+              </p:cNvPr>
+              <p:cNvCxnSpPr>
+                <a:cxnSpLocks/>
+                <a:stCxn id="23" idx="0"/>
+                <a:endCxn id="29" idx="0"/>
+              </p:cNvCxnSpPr>
+              <p:nvPr/>
+            </p:nvCxnSpPr>
+            <p:spPr>
+              <a:xfrm rot="5400000" flipH="1" flipV="1">
+                <a:off x="5175152" y="-1416884"/>
+                <a:ext cx="109143" cy="6497056"/>
+              </a:xfrm>
+              <a:prstGeom prst="bentConnector3">
+                <a:avLst>
+                  <a:gd name="adj1" fmla="val 319958"/>
+                </a:avLst>
+              </a:prstGeom>
+              <a:ln w="28575">
+                <a:solidFill>
+                  <a:srgbClr val="C93F3F"/>
+                </a:solidFill>
+                <a:tailEnd type="triangle"/>
+              </a:ln>
+            </p:spPr>
+            <p:style>
+              <a:lnRef idx="1">
+                <a:schemeClr val="accent1"/>
+              </a:lnRef>
+              <a:fillRef idx="0">
+                <a:schemeClr val="accent1"/>
+              </a:fillRef>
+              <a:effectRef idx="0">
+                <a:schemeClr val="accent1"/>
+              </a:effectRef>
+              <a:fontRef idx="minor">
+                <a:schemeClr val="tx1"/>
+              </a:fontRef>
+            </p:style>
+          </p:cxnSp>
+          <p:cxnSp>
+            <p:nvCxnSpPr>
+              <p:cNvPr id="13" name="Straight Arrow Connector 12">
+                <a:extLst>
+                  <a:ext uri="{FF2B5EF4-FFF2-40B4-BE49-F238E27FC236}">
+                    <a16:creationId xmlns:a16="http://schemas.microsoft.com/office/drawing/2014/main" id="{74352ECF-4723-4F58-AF60-C40A697AF458}"/>
+                  </a:ext>
+                </a:extLst>
+              </p:cNvPr>
+              <p:cNvCxnSpPr>
+                <a:cxnSpLocks/>
+                <a:stCxn id="27" idx="2"/>
+                <a:endCxn id="25" idx="0"/>
+              </p:cNvCxnSpPr>
+              <p:nvPr/>
+            </p:nvCxnSpPr>
+            <p:spPr>
+              <a:xfrm>
+                <a:off x="4912894" y="3024328"/>
+                <a:ext cx="0" cy="1411973"/>
+              </a:xfrm>
+              <a:prstGeom prst="straightConnector1">
+                <a:avLst/>
+              </a:prstGeom>
+              <a:ln w="28575">
+                <a:tailEnd type="triangle"/>
+              </a:ln>
+            </p:spPr>
+            <p:style>
+              <a:lnRef idx="1">
+                <a:schemeClr val="accent1"/>
+              </a:lnRef>
+              <a:fillRef idx="0">
+                <a:schemeClr val="accent1"/>
+              </a:fillRef>
+              <a:effectRef idx="0">
+                <a:schemeClr val="accent1"/>
+              </a:effectRef>
+              <a:fontRef idx="minor">
+                <a:schemeClr val="tx1"/>
+              </a:fontRef>
+            </p:style>
+          </p:cxnSp>
+          <p:grpSp>
+            <p:nvGrpSpPr>
+              <p:cNvPr id="14" name="Group 13">
+                <a:extLst>
+                  <a:ext uri="{FF2B5EF4-FFF2-40B4-BE49-F238E27FC236}">
+                    <a16:creationId xmlns:a16="http://schemas.microsoft.com/office/drawing/2014/main" id="{DC4CA120-905A-4B60-B99F-21942BE94721}"/>
+                  </a:ext>
+                </a:extLst>
+              </p:cNvPr>
+              <p:cNvGrpSpPr/>
+              <p:nvPr/>
+            </p:nvGrpSpPr>
+            <p:grpSpPr>
+              <a:xfrm>
+                <a:off x="7363322" y="3355901"/>
+                <a:ext cx="2348611" cy="1305885"/>
+                <a:chOff x="7555824" y="3499337"/>
+                <a:chExt cx="2348611" cy="1305885"/>
+              </a:xfrm>
+            </p:grpSpPr>
+            <p:grpSp>
+              <p:nvGrpSpPr>
+                <p:cNvPr id="15" name="Group 14">
+                  <a:extLst>
+                    <a:ext uri="{FF2B5EF4-FFF2-40B4-BE49-F238E27FC236}">
+                      <a16:creationId xmlns:a16="http://schemas.microsoft.com/office/drawing/2014/main" id="{3F677431-34DF-4CC4-AF7C-35156F4FE1ED}"/>
+                    </a:ext>
+                  </a:extLst>
+                </p:cNvPr>
+                <p:cNvGrpSpPr/>
+                <p:nvPr/>
+              </p:nvGrpSpPr>
+              <p:grpSpPr>
+                <a:xfrm>
+                  <a:off x="7555824" y="3922535"/>
+                  <a:ext cx="2348611" cy="882687"/>
+                  <a:chOff x="7908759" y="3190238"/>
+                  <a:chExt cx="2999126" cy="1008558"/>
+                </a:xfrm>
+              </p:grpSpPr>
+              <p:sp>
+                <p:nvSpPr>
+                  <p:cNvPr id="19" name="Rectangle: Rounded Corners 18">
+                    <a:extLst>
+                      <a:ext uri="{FF2B5EF4-FFF2-40B4-BE49-F238E27FC236}">
+                        <a16:creationId xmlns:a16="http://schemas.microsoft.com/office/drawing/2014/main" id="{AECE50A7-0064-4824-A5CA-1C6B3270A9D7}"/>
+                      </a:ext>
+                    </a:extLst>
+                  </p:cNvPr>
+                  <p:cNvSpPr/>
+                  <p:nvPr/>
+                </p:nvSpPr>
+                <p:spPr>
+                  <a:xfrm>
+                    <a:off x="7908759" y="3190238"/>
+                    <a:ext cx="2999126" cy="1008558"/>
+                  </a:xfrm>
+                  <a:prstGeom prst="roundRect">
+                    <a:avLst/>
+                  </a:prstGeom>
+                  <a:solidFill>
+                    <a:schemeClr val="bg1">
+                      <a:lumMod val="50000"/>
+                    </a:schemeClr>
+                  </a:solidFill>
+                  <a:ln>
+                    <a:solidFill>
+                      <a:schemeClr val="bg1">
+                        <a:lumMod val="50000"/>
+                      </a:schemeClr>
+                    </a:solidFill>
+                  </a:ln>
+                </p:spPr>
+                <p:style>
+                  <a:lnRef idx="2">
+                    <a:schemeClr val="accent1">
+                      <a:shade val="50000"/>
+                    </a:schemeClr>
+                  </a:lnRef>
+                  <a:fillRef idx="1">
+                    <a:schemeClr val="accent1"/>
+                  </a:fillRef>
+                  <a:effectRef idx="0">
+                    <a:schemeClr val="accent1"/>
+                  </a:effectRef>
+                  <a:fontRef idx="minor">
+                    <a:schemeClr val="lt1"/>
+                  </a:fontRef>
+                </p:style>
+                <p:txBody>
+                  <a:bodyPr rtlCol="0" anchor="ctr"/>
+                  <a:lstStyle/>
+                  <a:p>
+                    <a:pPr algn="ctr"/>
+                    <a:endParaRPr lang="en-US"/>
+                  </a:p>
+                </p:txBody>
+              </p:sp>
+              <p:sp>
+                <p:nvSpPr>
+                  <p:cNvPr id="20" name="TextBox 19">
+                    <a:extLst>
+                      <a:ext uri="{FF2B5EF4-FFF2-40B4-BE49-F238E27FC236}">
+                        <a16:creationId xmlns:a16="http://schemas.microsoft.com/office/drawing/2014/main" id="{8ACE848B-4847-4D1C-A6FB-D178E4E8535A}"/>
+                      </a:ext>
+                    </a:extLst>
+                  </p:cNvPr>
+                  <p:cNvSpPr txBox="1"/>
+                  <p:nvPr/>
+                </p:nvSpPr>
+                <p:spPr>
+                  <a:xfrm>
+                    <a:off x="8470557" y="3411261"/>
+                    <a:ext cx="1976889" cy="553962"/>
+                  </a:xfrm>
+                  <a:prstGeom prst="rect">
+                    <a:avLst/>
+                  </a:prstGeom>
+                  <a:noFill/>
+                </p:spPr>
+                <p:txBody>
+                  <a:bodyPr wrap="square" rtlCol="0">
+                    <a:spAutoFit/>
+                  </a:bodyPr>
+                  <a:lstStyle/>
+                  <a:p>
+                    <a:r>
+                      <a:rPr lang="en-US" sz="2400" dirty="0">
+                        <a:solidFill>
+                          <a:schemeClr val="bg1"/>
+                        </a:solidFill>
+                      </a:rPr>
+                      <a:t>Commons</a:t>
+                    </a:r>
+                  </a:p>
+                </p:txBody>
+              </p:sp>
+            </p:grpSp>
+            <p:cxnSp>
+              <p:nvCxnSpPr>
+                <p:cNvPr id="16" name="Straight Arrow Connector 15">
+                  <a:extLst>
+                    <a:ext uri="{FF2B5EF4-FFF2-40B4-BE49-F238E27FC236}">
+                      <a16:creationId xmlns:a16="http://schemas.microsoft.com/office/drawing/2014/main" id="{0EEADF24-3021-4074-BDFE-B7E7425D5F05}"/>
+                    </a:ext>
+                  </a:extLst>
+                </p:cNvPr>
+                <p:cNvCxnSpPr/>
+                <p:nvPr/>
+              </p:nvCxnSpPr>
+              <p:spPr>
+                <a:xfrm>
+                  <a:off x="8897815" y="3499338"/>
+                  <a:ext cx="0" cy="423197"/>
+                </a:xfrm>
+                <a:prstGeom prst="straightConnector1">
+                  <a:avLst/>
+                </a:prstGeom>
+                <a:ln w="28575">
+                  <a:solidFill>
+                    <a:schemeClr val="bg1">
+                      <a:lumMod val="50000"/>
+                    </a:schemeClr>
+                  </a:solidFill>
+                  <a:prstDash val="sysDash"/>
+                  <a:tailEnd type="triangle"/>
+                </a:ln>
+              </p:spPr>
+              <p:style>
+                <a:lnRef idx="1">
+                  <a:schemeClr val="accent1"/>
+                </a:lnRef>
+                <a:fillRef idx="0">
+                  <a:schemeClr val="accent1"/>
+                </a:fillRef>
+                <a:effectRef idx="0">
+                  <a:schemeClr val="accent1"/>
+                </a:effectRef>
+                <a:fontRef idx="minor">
+                  <a:schemeClr val="tx1"/>
+                </a:fontRef>
+              </p:style>
+            </p:cxnSp>
+            <p:cxnSp>
+              <p:nvCxnSpPr>
+                <p:cNvPr id="17" name="Straight Arrow Connector 16">
+                  <a:extLst>
+                    <a:ext uri="{FF2B5EF4-FFF2-40B4-BE49-F238E27FC236}">
+                      <a16:creationId xmlns:a16="http://schemas.microsoft.com/office/drawing/2014/main" id="{13B1E657-2C8E-495D-AAD0-A66ED663427F}"/>
+                    </a:ext>
+                  </a:extLst>
+                </p:cNvPr>
+                <p:cNvCxnSpPr/>
+                <p:nvPr/>
+              </p:nvCxnSpPr>
+              <p:spPr>
+                <a:xfrm>
+                  <a:off x="9050215" y="3499338"/>
+                  <a:ext cx="0" cy="423197"/>
+                </a:xfrm>
+                <a:prstGeom prst="straightConnector1">
+                  <a:avLst/>
+                </a:prstGeom>
+                <a:ln w="28575">
+                  <a:solidFill>
+                    <a:schemeClr val="bg1">
+                      <a:lumMod val="50000"/>
+                    </a:schemeClr>
+                  </a:solidFill>
+                  <a:prstDash val="sysDash"/>
+                  <a:tailEnd type="triangle"/>
+                </a:ln>
+              </p:spPr>
+              <p:style>
+                <a:lnRef idx="1">
+                  <a:schemeClr val="accent1"/>
+                </a:lnRef>
+                <a:fillRef idx="0">
+                  <a:schemeClr val="accent1"/>
+                </a:fillRef>
+                <a:effectRef idx="0">
+                  <a:schemeClr val="accent1"/>
+                </a:effectRef>
+                <a:fontRef idx="minor">
+                  <a:schemeClr val="tx1"/>
+                </a:fontRef>
+              </p:style>
+            </p:cxnSp>
+            <p:cxnSp>
+              <p:nvCxnSpPr>
+                <p:cNvPr id="18" name="Straight Arrow Connector 17">
+                  <a:extLst>
+                    <a:ext uri="{FF2B5EF4-FFF2-40B4-BE49-F238E27FC236}">
+                      <a16:creationId xmlns:a16="http://schemas.microsoft.com/office/drawing/2014/main" id="{A9A65591-D4FC-4062-A96F-0F1E69FA9DBA}"/>
+                    </a:ext>
+                  </a:extLst>
+                </p:cNvPr>
+                <p:cNvCxnSpPr/>
+                <p:nvPr/>
+              </p:nvCxnSpPr>
+              <p:spPr>
+                <a:xfrm>
+                  <a:off x="9202615" y="3499337"/>
+                  <a:ext cx="0" cy="423197"/>
+                </a:xfrm>
+                <a:prstGeom prst="straightConnector1">
+                  <a:avLst/>
+                </a:prstGeom>
+                <a:ln w="28575">
+                  <a:solidFill>
+                    <a:schemeClr val="bg1">
+                      <a:lumMod val="50000"/>
+                    </a:schemeClr>
+                  </a:solidFill>
+                  <a:prstDash val="sysDash"/>
+                  <a:tailEnd type="triangle"/>
+                </a:ln>
+              </p:spPr>
+              <p:style>
+                <a:lnRef idx="1">
+                  <a:schemeClr val="accent1"/>
+                </a:lnRef>
+                <a:fillRef idx="0">
+                  <a:schemeClr val="accent1"/>
+                </a:fillRef>
+                <a:effectRef idx="0">
+                  <a:schemeClr val="accent1"/>
+                </a:effectRef>
+                <a:fontRef idx="minor">
+                  <a:schemeClr val="tx1"/>
+                </a:fontRef>
+              </p:style>
+            </p:cxnSp>
+          </p:grpSp>
+        </p:grpSp>
+      </p:grpSp>
+      <p:pic>
+        <p:nvPicPr>
+          <p:cNvPr id="31" name="Graphic 30" descr="Smiling Face with No Fill">
+            <a:extLst>
+              <a:ext uri="{FF2B5EF4-FFF2-40B4-BE49-F238E27FC236}">
+                <a16:creationId xmlns:a16="http://schemas.microsoft.com/office/drawing/2014/main" id="{274EE4E8-8CEB-48E2-9924-26EA71D9F717}"/>
+              </a:ext>
+            </a:extLst>
+          </p:cNvPr>
+          <p:cNvPicPr>
+            <a:picLocks noChangeAspect="1"/>
+          </p:cNvPicPr>
+          <p:nvPr/>
+        </p:nvPicPr>
+        <p:blipFill>
+          <a:blip r:embed="rId2">
+            <a:extLst>
+              <a:ext uri="{28A0092B-C50C-407E-A947-70E740481C1C}">
+                <a14:useLocalDpi xmlns:a14="http://schemas.microsoft.com/office/drawing/2010/main" val="0"/>
+              </a:ext>
+              <a:ext uri="{96DAC541-7B7A-43D3-8B79-37D633B846F1}">
+                <asvg:svgBlip xmlns:asvg="http://schemas.microsoft.com/office/drawing/2016/SVG/main" r:embed="rId3"/>
+              </a:ext>
+            </a:extLst>
+          </a:blip>
+          <a:stretch>
+            <a:fillRect/>
+          </a:stretch>
+        </p:blipFill>
+        <p:spPr>
+          <a:xfrm>
+            <a:off x="-27495" y="2329362"/>
+            <a:ext cx="914400" cy="914400"/>
+          </a:xfrm>
+          <a:prstGeom prst="rect">
+            <a:avLst/>
+          </a:prstGeom>
+        </p:spPr>
+      </p:pic>
+      <p:cxnSp>
+        <p:nvCxnSpPr>
+          <p:cNvPr id="32" name="Straight Arrow Connector 31">
+            <a:extLst>
+              <a:ext uri="{FF2B5EF4-FFF2-40B4-BE49-F238E27FC236}">
+                <a16:creationId xmlns:a16="http://schemas.microsoft.com/office/drawing/2014/main" id="{56BA2B75-ACAD-406A-B301-4ECC213A514A}"/>
+              </a:ext>
+            </a:extLst>
+          </p:cNvPr>
+          <p:cNvCxnSpPr>
+            <a:cxnSpLocks/>
+            <a:stCxn id="31" idx="3"/>
+            <a:endCxn id="23" idx="1"/>
+          </p:cNvCxnSpPr>
+          <p:nvPr/>
+        </p:nvCxnSpPr>
+        <p:spPr>
+          <a:xfrm>
+            <a:off x="886905" y="2786562"/>
+            <a:ext cx="1199440" cy="0"/>
+          </a:xfrm>
+          <a:prstGeom prst="straightConnector1">
+            <a:avLst/>
+          </a:prstGeom>
+          <a:ln w="28575">
+            <a:solidFill>
+              <a:schemeClr val="tx1"/>
+            </a:solidFill>
+            <a:prstDash val="sysDash"/>
+            <a:tailEnd type="triangle"/>
+          </a:ln>
+        </p:spPr>
+        <p:style>
+          <a:lnRef idx="1">
+            <a:schemeClr val="accent1"/>
+          </a:lnRef>
+          <a:fillRef idx="0">
+            <a:schemeClr val="accent1"/>
+          </a:fillRef>
+          <a:effectRef idx="0">
+            <a:schemeClr val="accent1"/>
+          </a:effectRef>
+          <a:fontRef idx="minor">
+            <a:schemeClr val="tx1"/>
+          </a:fontRef>
+        </p:style>
+      </p:cxnSp>
+      <p:pic>
+        <p:nvPicPr>
+          <p:cNvPr id="33" name="Graphic 32" descr="Document">
+            <a:extLst>
+              <a:ext uri="{FF2B5EF4-FFF2-40B4-BE49-F238E27FC236}">
+                <a16:creationId xmlns:a16="http://schemas.microsoft.com/office/drawing/2014/main" id="{45EF105C-C60B-487E-B684-8C225EB85AED}"/>
+              </a:ext>
+            </a:extLst>
+          </p:cNvPr>
+          <p:cNvPicPr>
+            <a:picLocks noChangeAspect="1"/>
+          </p:cNvPicPr>
+          <p:nvPr/>
+        </p:nvPicPr>
+        <p:blipFill>
+          <a:blip r:embed="rId4">
+            <a:extLst>
+              <a:ext uri="{28A0092B-C50C-407E-A947-70E740481C1C}">
+                <a14:useLocalDpi xmlns:a14="http://schemas.microsoft.com/office/drawing/2010/main" val="0"/>
+              </a:ext>
+              <a:ext uri="{96DAC541-7B7A-43D3-8B79-37D633B846F1}">
+                <asvg:svgBlip xmlns:asvg="http://schemas.microsoft.com/office/drawing/2016/SVG/main" r:embed="rId5"/>
+              </a:ext>
+            </a:extLst>
+          </a:blip>
+          <a:stretch>
+            <a:fillRect/>
+          </a:stretch>
+        </p:blipFill>
+        <p:spPr>
+          <a:xfrm>
+            <a:off x="5292661" y="5866773"/>
+            <a:ext cx="914400" cy="914400"/>
+          </a:xfrm>
+          <a:prstGeom prst="rect">
+            <a:avLst/>
+          </a:prstGeom>
+        </p:spPr>
+      </p:pic>
+      <p:cxnSp>
+        <p:nvCxnSpPr>
+          <p:cNvPr id="34" name="Straight Arrow Connector 33">
+            <a:extLst>
+              <a:ext uri="{FF2B5EF4-FFF2-40B4-BE49-F238E27FC236}">
+                <a16:creationId xmlns:a16="http://schemas.microsoft.com/office/drawing/2014/main" id="{17A9FC5E-0359-4855-BDEC-981462ADD7F0}"/>
+              </a:ext>
+            </a:extLst>
+          </p:cNvPr>
+          <p:cNvCxnSpPr>
+            <a:stCxn id="25" idx="2"/>
+            <a:endCxn id="33" idx="0"/>
+          </p:cNvCxnSpPr>
+          <p:nvPr/>
+        </p:nvCxnSpPr>
+        <p:spPr>
+          <a:xfrm>
+            <a:off x="5749861" y="4692003"/>
+            <a:ext cx="0" cy="1174770"/>
+          </a:xfrm>
+          <a:prstGeom prst="straightConnector1">
+            <a:avLst/>
+          </a:prstGeom>
+          <a:ln w="28575">
+            <a:solidFill>
+              <a:schemeClr val="tx1"/>
+            </a:solidFill>
+            <a:prstDash val="sysDash"/>
+            <a:tailEnd type="triangle"/>
+          </a:ln>
+        </p:spPr>
+        <p:style>
+          <a:lnRef idx="1">
+            <a:schemeClr val="accent1"/>
+          </a:lnRef>
+          <a:fillRef idx="0">
+            <a:schemeClr val="accent1"/>
+          </a:fillRef>
+          <a:effectRef idx="0">
+            <a:schemeClr val="accent1"/>
+          </a:effectRef>
+          <a:fontRef idx="minor">
+            <a:schemeClr val="tx1"/>
+          </a:fontRef>
+        </p:style>
+      </p:cxnSp>
+    </p:spTree>
+    <p:extLst>
+      <p:ext uri="{BB962C8B-B14F-4D97-AF65-F5344CB8AC3E}">
+        <p14:creationId xmlns:p14="http://schemas.microsoft.com/office/powerpoint/2010/main" val="4066089919"/>
       </p:ext>
     </p:extLst>
   </p:cSld>

</xml_diff>

<commit_message>
DeveloperGuide.adoc: add Logic Diagram and a part of Implementation section
</commit_message>
<xml_diff>
--- a/docs/Diagrams.pptx
+++ b/docs/Diagrams.pptx
@@ -5,7 +5,7 @@
     <p:sldMasterId id="2147483648" r:id="rId1"/>
   </p:sldMasterIdLst>
   <p:notesMasterIdLst>
-    <p:notesMasterId r:id="rId7"/>
+    <p:notesMasterId r:id="rId8"/>
   </p:notesMasterIdLst>
   <p:sldIdLst>
     <p:sldId id="256" r:id="rId2"/>
@@ -13,6 +13,7 @@
     <p:sldId id="259" r:id="rId4"/>
     <p:sldId id="258" r:id="rId5"/>
     <p:sldId id="260" r:id="rId6"/>
+    <p:sldId id="261" r:id="rId7"/>
   </p:sldIdLst>
   <p:sldSz cx="9144000" cy="6858000" type="screen4x3"/>
   <p:notesSz cx="6858000" cy="9144000"/>
@@ -212,7 +213,7 @@
           <a:p>
             <a:fld id="{F5CC4B3F-88C1-4FFA-B1B6-F41C21DC6924}" type="datetimeFigureOut">
               <a:rPr lang="en-US" smtClean="0"/>
-              <a:t>10/25/2018</a:t>
+              <a:t>10/28/2018</a:t>
             </a:fld>
             <a:endParaRPr lang="en-US"/>
           </a:p>
@@ -742,7 +743,7 @@
           <a:p>
             <a:fld id="{78C97017-6FC3-485B-9764-EAC9E56C1D49}" type="datetimeFigureOut">
               <a:rPr lang="en-US" smtClean="0"/>
-              <a:t>10/25/2018</a:t>
+              <a:t>10/28/2018</a:t>
             </a:fld>
             <a:endParaRPr lang="en-US"/>
           </a:p>
@@ -910,7 +911,7 @@
           <a:p>
             <a:fld id="{78C97017-6FC3-485B-9764-EAC9E56C1D49}" type="datetimeFigureOut">
               <a:rPr lang="en-US" smtClean="0"/>
-              <a:t>10/25/2018</a:t>
+              <a:t>10/28/2018</a:t>
             </a:fld>
             <a:endParaRPr lang="en-US"/>
           </a:p>
@@ -1088,7 +1089,7 @@
           <a:p>
             <a:fld id="{78C97017-6FC3-485B-9764-EAC9E56C1D49}" type="datetimeFigureOut">
               <a:rPr lang="en-US" smtClean="0"/>
-              <a:t>10/25/2018</a:t>
+              <a:t>10/28/2018</a:t>
             </a:fld>
             <a:endParaRPr lang="en-US"/>
           </a:p>
@@ -1256,7 +1257,7 @@
           <a:p>
             <a:fld id="{78C97017-6FC3-485B-9764-EAC9E56C1D49}" type="datetimeFigureOut">
               <a:rPr lang="en-US" smtClean="0"/>
-              <a:t>10/25/2018</a:t>
+              <a:t>10/28/2018</a:t>
             </a:fld>
             <a:endParaRPr lang="en-US"/>
           </a:p>
@@ -1501,7 +1502,7 @@
           <a:p>
             <a:fld id="{78C97017-6FC3-485B-9764-EAC9E56C1D49}" type="datetimeFigureOut">
               <a:rPr lang="en-US" smtClean="0"/>
-              <a:t>10/25/2018</a:t>
+              <a:t>10/28/2018</a:t>
             </a:fld>
             <a:endParaRPr lang="en-US"/>
           </a:p>
@@ -1786,7 +1787,7 @@
           <a:p>
             <a:fld id="{78C97017-6FC3-485B-9764-EAC9E56C1D49}" type="datetimeFigureOut">
               <a:rPr lang="en-US" smtClean="0"/>
-              <a:t>10/25/2018</a:t>
+              <a:t>10/28/2018</a:t>
             </a:fld>
             <a:endParaRPr lang="en-US"/>
           </a:p>
@@ -2205,7 +2206,7 @@
           <a:p>
             <a:fld id="{78C97017-6FC3-485B-9764-EAC9E56C1D49}" type="datetimeFigureOut">
               <a:rPr lang="en-US" smtClean="0"/>
-              <a:t>10/25/2018</a:t>
+              <a:t>10/28/2018</a:t>
             </a:fld>
             <a:endParaRPr lang="en-US"/>
           </a:p>
@@ -2322,7 +2323,7 @@
           <a:p>
             <a:fld id="{78C97017-6FC3-485B-9764-EAC9E56C1D49}" type="datetimeFigureOut">
               <a:rPr lang="en-US" smtClean="0"/>
-              <a:t>10/25/2018</a:t>
+              <a:t>10/28/2018</a:t>
             </a:fld>
             <a:endParaRPr lang="en-US"/>
           </a:p>
@@ -2417,7 +2418,7 @@
           <a:p>
             <a:fld id="{78C97017-6FC3-485B-9764-EAC9E56C1D49}" type="datetimeFigureOut">
               <a:rPr lang="en-US" smtClean="0"/>
-              <a:t>10/25/2018</a:t>
+              <a:t>10/28/2018</a:t>
             </a:fld>
             <a:endParaRPr lang="en-US"/>
           </a:p>
@@ -2692,7 +2693,7 @@
           <a:p>
             <a:fld id="{78C97017-6FC3-485B-9764-EAC9E56C1D49}" type="datetimeFigureOut">
               <a:rPr lang="en-US" smtClean="0"/>
-              <a:t>10/25/2018</a:t>
+              <a:t>10/28/2018</a:t>
             </a:fld>
             <a:endParaRPr lang="en-US"/>
           </a:p>
@@ -2944,7 +2945,7 @@
           <a:p>
             <a:fld id="{78C97017-6FC3-485B-9764-EAC9E56C1D49}" type="datetimeFigureOut">
               <a:rPr lang="en-US" smtClean="0"/>
-              <a:t>10/25/2018</a:t>
+              <a:t>10/28/2018</a:t>
             </a:fld>
             <a:endParaRPr lang="en-US"/>
           </a:p>
@@ -3155,7 +3156,7 @@
           <a:p>
             <a:fld id="{78C97017-6FC3-485B-9764-EAC9E56C1D49}" type="datetimeFigureOut">
               <a:rPr lang="en-US" smtClean="0"/>
-              <a:t>10/25/2018</a:t>
+              <a:t>10/28/2018</a:t>
             </a:fld>
             <a:endParaRPr lang="en-US"/>
           </a:p>
@@ -5073,6 +5074,7 @@
         <p:nvCxnSpPr>
           <p:cNvPr id="55" name="Elbow Connector 54"/>
           <p:cNvCxnSpPr>
+            <a:cxnSpLocks/>
             <a:stCxn id="54" idx="3"/>
             <a:endCxn id="52" idx="3"/>
           </p:cNvCxnSpPr>
@@ -5111,6 +5113,7 @@
         <p:nvCxnSpPr>
           <p:cNvPr id="56" name="Elbow Connector 55"/>
           <p:cNvCxnSpPr>
+            <a:cxnSpLocks/>
             <a:stCxn id="54" idx="3"/>
             <a:endCxn id="50" idx="3"/>
           </p:cNvCxnSpPr>
@@ -5149,6 +5152,7 @@
         <p:nvCxnSpPr>
           <p:cNvPr id="57" name="Elbow Connector 56"/>
           <p:cNvCxnSpPr>
+            <a:cxnSpLocks/>
             <a:stCxn id="54" idx="3"/>
             <a:endCxn id="53" idx="3"/>
           </p:cNvCxnSpPr>
@@ -5231,6 +5235,7 @@
         <p:nvCxnSpPr>
           <p:cNvPr id="60" name="Elbow Connector 59"/>
           <p:cNvCxnSpPr>
+            <a:cxnSpLocks/>
             <a:stCxn id="54" idx="3"/>
             <a:endCxn id="59" idx="3"/>
           </p:cNvCxnSpPr>
@@ -9546,9 +9551,9 @@
         </p:nvGrpSpPr>
         <p:grpSpPr>
           <a:xfrm>
-            <a:off x="1595718" y="497542"/>
-            <a:ext cx="9377082" cy="4684058"/>
-            <a:chOff x="1268504" y="497541"/>
+            <a:off x="1395580" y="1447800"/>
+            <a:ext cx="7367420" cy="3312458"/>
+            <a:chOff x="1243171" y="497541"/>
             <a:chExt cx="9906000" cy="5629835"/>
           </a:xfrm>
         </p:grpSpPr>
@@ -9566,7 +9571,7 @@
           </p:nvSpPr>
           <p:spPr>
             <a:xfrm>
-              <a:off x="1268504" y="497541"/>
+              <a:off x="1243171" y="497541"/>
               <a:ext cx="9906000" cy="5629835"/>
             </a:xfrm>
             <a:prstGeom prst="roundRect">
@@ -9624,10 +9629,10 @@
           </p:nvGrpSpPr>
           <p:grpSpPr>
             <a:xfrm>
-              <a:off x="1786805" y="1777072"/>
-              <a:ext cx="8726903" cy="3761850"/>
-              <a:chOff x="1042736" y="1777072"/>
-              <a:chExt cx="8726903" cy="3761850"/>
+              <a:off x="1784521" y="1886215"/>
+              <a:ext cx="8712235" cy="3849432"/>
+              <a:chOff x="1040452" y="1886215"/>
+              <a:chExt cx="8712235" cy="3849432"/>
             </a:xfrm>
           </p:grpSpPr>
           <p:grpSp>
@@ -9644,9 +9649,9 @@
             </p:nvGrpSpPr>
             <p:grpSpPr>
               <a:xfrm>
-                <a:off x="7186862" y="1777072"/>
+                <a:off x="7169910" y="2580331"/>
                 <a:ext cx="2582777" cy="1326801"/>
-                <a:chOff x="8021052" y="1026877"/>
+                <a:chOff x="8002310" y="1871715"/>
                 <a:chExt cx="2855494" cy="1395481"/>
               </a:xfrm>
             </p:grpSpPr>
@@ -9664,7 +9669,7 @@
               </p:nvSpPr>
               <p:spPr>
                 <a:xfrm>
-                  <a:off x="8021052" y="1026877"/>
+                  <a:off x="8002310" y="1871715"/>
                   <a:ext cx="2855494" cy="1395481"/>
                 </a:xfrm>
                 <a:prstGeom prst="roundRect">
@@ -9718,8 +9723,8 @@
               </p:nvSpPr>
               <p:spPr>
                 <a:xfrm>
-                  <a:off x="8984679" y="1440251"/>
-                  <a:ext cx="1876926" cy="583604"/>
+                  <a:off x="8632054" y="2205344"/>
+                  <a:ext cx="1596008" cy="825260"/>
                 </a:xfrm>
                 <a:prstGeom prst="rect">
                   <a:avLst/>
@@ -9737,13 +9742,14 @@
                 </a:bodyPr>
                 <a:lstStyle/>
                 <a:p>
+                  <a:pPr algn="ctr"/>
                   <a:r>
                     <a:rPr lang="en-US" sz="2400" dirty="0">
                       <a:solidFill>
                         <a:schemeClr val="bg1"/>
                       </a:solidFill>
                     </a:rPr>
-                    <a:t>Data</a:t>
+                    <a:t>Model</a:t>
                   </a:r>
                 </a:p>
               </p:txBody>
@@ -9763,9 +9769,9 @@
             </p:nvGrpSpPr>
             <p:grpSpPr>
               <a:xfrm>
-                <a:off x="3974431" y="1864465"/>
+                <a:off x="3974430" y="2673024"/>
                 <a:ext cx="1876926" cy="1159863"/>
-                <a:chOff x="3974431" y="1868631"/>
+                <a:chOff x="3974430" y="2740921"/>
                 <a:chExt cx="1876926" cy="1251284"/>
               </a:xfrm>
             </p:grpSpPr>
@@ -9783,7 +9789,7 @@
               </p:nvSpPr>
               <p:spPr>
                 <a:xfrm>
-                  <a:off x="3974431" y="1868631"/>
+                  <a:off x="3974430" y="2740921"/>
                   <a:ext cx="1876926" cy="1251284"/>
                 </a:xfrm>
                 <a:prstGeom prst="roundRect">
@@ -9829,8 +9835,8 @@
               </p:nvSpPr>
               <p:spPr>
                 <a:xfrm>
-                  <a:off x="4423610" y="2221557"/>
-                  <a:ext cx="1010652" cy="461665"/>
+                  <a:off x="4253616" y="2952812"/>
+                  <a:ext cx="1318552" cy="846489"/>
                 </a:xfrm>
                 <a:prstGeom prst="rect">
                   <a:avLst/>
@@ -9843,6 +9849,7 @@
                 </a:bodyPr>
                 <a:lstStyle/>
                 <a:p>
+                  <a:pPr algn="ctr"/>
                   <a:r>
                     <a:rPr lang="en-US" sz="2400" dirty="0">
                       <a:solidFill>
@@ -9943,8 +9950,8 @@
               </p:nvSpPr>
               <p:spPr>
                 <a:xfrm>
-                  <a:off x="4908884" y="5258075"/>
-                  <a:ext cx="1195755" cy="533000"/>
+                  <a:off x="4636172" y="5035760"/>
+                  <a:ext cx="1684406" cy="993048"/>
                 </a:xfrm>
                 <a:prstGeom prst="rect">
                   <a:avLst/>
@@ -9957,6 +9964,7 @@
                 </a:bodyPr>
                 <a:lstStyle/>
                 <a:p>
+                  <a:pPr algn="ctr"/>
                   <a:r>
                     <a:rPr lang="en-US" sz="2400" dirty="0">
                       <a:solidFill>
@@ -9980,24 +9988,25 @@
               </p:cNvPr>
               <p:cNvCxnSpPr>
                 <a:cxnSpLocks/>
-                <a:stCxn id="22" idx="3"/>
+                <a:stCxn id="23" idx="3"/>
                 <a:endCxn id="27" idx="1"/>
               </p:cNvCxnSpPr>
               <p:nvPr/>
             </p:nvCxnSpPr>
             <p:spPr>
-              <a:xfrm flipV="1">
-                <a:off x="2878230" y="2444397"/>
-                <a:ext cx="1096202" cy="6482"/>
+              <a:xfrm>
+                <a:off x="2919653" y="3248746"/>
+                <a:ext cx="1054777" cy="4210"/>
               </a:xfrm>
               <a:prstGeom prst="straightConnector1">
                 <a:avLst/>
               </a:prstGeom>
-              <a:ln w="28575">
+              <a:ln w="38100">
                 <a:solidFill>
                   <a:srgbClr val="C93F3F"/>
                 </a:solidFill>
-                <a:tailEnd type="triangle"/>
+                <a:headEnd type="none" w="med" len="med"/>
+                <a:tailEnd type="arrow" w="med" len="med"/>
               </a:ln>
             </p:spPr>
             <p:style>
@@ -10029,10 +10038,10 @@
             </p:nvGrpSpPr>
             <p:grpSpPr>
               <a:xfrm>
-                <a:off x="1042736" y="1886215"/>
-                <a:ext cx="1876917" cy="2725061"/>
-                <a:chOff x="1042736" y="1868631"/>
-                <a:chExt cx="1876917" cy="2725061"/>
+                <a:off x="1040452" y="1886215"/>
+                <a:ext cx="1879201" cy="2725061"/>
+                <a:chOff x="1040452" y="1868631"/>
+                <a:chExt cx="1879201" cy="2725061"/>
               </a:xfrm>
             </p:grpSpPr>
             <p:grpSp>
@@ -10049,10 +10058,10 @@
               </p:nvGrpSpPr>
               <p:grpSpPr>
                 <a:xfrm>
-                  <a:off x="1042736" y="1868631"/>
-                  <a:ext cx="1876917" cy="2725061"/>
-                  <a:chOff x="1122945" y="1171074"/>
-                  <a:chExt cx="1876917" cy="3160294"/>
+                  <a:off x="1040452" y="1868631"/>
+                  <a:ext cx="1879201" cy="2725061"/>
+                  <a:chOff x="1120661" y="1171074"/>
+                  <a:chExt cx="1879201" cy="3160294"/>
                 </a:xfrm>
               </p:grpSpPr>
               <p:sp>
@@ -10123,8 +10132,8 @@
                 </p:nvSpPr>
                 <p:spPr>
                   <a:xfrm>
-                    <a:off x="1303156" y="2506436"/>
-                    <a:ext cx="1530693" cy="562259"/>
+                    <a:off x="1120661" y="2211732"/>
+                    <a:ext cx="1876917" cy="909962"/>
                   </a:xfrm>
                   <a:prstGeom prst="rect">
                     <a:avLst/>
@@ -10200,14 +10209,15 @@
             </p:nvCxnSpPr>
             <p:spPr>
               <a:xfrm flipV="1">
-                <a:off x="5851357" y="2440473"/>
-                <a:ext cx="1335505" cy="3924"/>
+                <a:off x="5851356" y="3243732"/>
+                <a:ext cx="1318554" cy="9223"/>
               </a:xfrm>
               <a:prstGeom prst="straightConnector1">
                 <a:avLst/>
               </a:prstGeom>
               <a:ln w="38100">
-                <a:tailEnd type="triangle"/>
+                <a:headEnd type="none" w="med" len="med"/>
+                <a:tailEnd type="arrow" w="med" len="med"/>
               </a:ln>
             </p:spPr>
             <p:style>
@@ -10242,20 +10252,21 @@
               <p:nvPr/>
             </p:nvCxnSpPr>
             <p:spPr>
-              <a:xfrm rot="5400000" flipH="1" flipV="1">
-                <a:off x="5175152" y="-1416884"/>
-                <a:ext cx="109143" cy="6497056"/>
+              <a:xfrm rot="16200000" flipH="1">
+                <a:off x="4874188" y="-1006779"/>
+                <a:ext cx="694116" cy="6480104"/>
               </a:xfrm>
               <a:prstGeom prst="bentConnector3">
                 <a:avLst>
-                  <a:gd name="adj1" fmla="val 319958"/>
+                  <a:gd name="adj1" fmla="val -98668"/>
                 </a:avLst>
               </a:prstGeom>
-              <a:ln w="28575">
+              <a:ln w="38100">
                 <a:solidFill>
                   <a:srgbClr val="C93F3F"/>
                 </a:solidFill>
-                <a:tailEnd type="triangle"/>
+                <a:headEnd type="none" w="med" len="med"/>
+                <a:tailEnd type="arrow" w="med" len="med"/>
               </a:ln>
             </p:spPr>
             <p:style>
@@ -10291,14 +10302,15 @@
             </p:nvCxnSpPr>
             <p:spPr>
               <a:xfrm>
-                <a:off x="4912894" y="3024328"/>
-                <a:ext cx="0" cy="1411973"/>
+                <a:off x="4912893" y="3832887"/>
+                <a:ext cx="1" cy="603414"/>
               </a:xfrm>
               <a:prstGeom prst="straightConnector1">
                 <a:avLst/>
               </a:prstGeom>
-              <a:ln w="28575">
-                <a:tailEnd type="triangle"/>
+              <a:ln w="38100">
+                <a:headEnd type="none" w="med" len="med"/>
+                <a:tailEnd type="arrow" w="med" len="med"/>
               </a:ln>
             </p:spPr>
             <p:style>
@@ -10330,10 +10342,10 @@
             </p:nvGrpSpPr>
             <p:grpSpPr>
               <a:xfrm>
-                <a:off x="7363322" y="3355901"/>
-                <a:ext cx="2348611" cy="1305885"/>
-                <a:chOff x="7555824" y="3499337"/>
-                <a:chExt cx="2348611" cy="1305885"/>
+                <a:off x="7265168" y="4188077"/>
+                <a:ext cx="2348611" cy="1547570"/>
+                <a:chOff x="7457670" y="4331513"/>
+                <a:chExt cx="2348611" cy="1547570"/>
               </a:xfrm>
             </p:grpSpPr>
             <p:grpSp>
@@ -10350,9 +10362,9 @@
               </p:nvGrpSpPr>
               <p:grpSpPr>
                 <a:xfrm>
-                  <a:off x="7555824" y="3922535"/>
+                  <a:off x="7457670" y="4996396"/>
                   <a:ext cx="2348611" cy="882687"/>
-                  <a:chOff x="7908759" y="3190238"/>
+                  <a:chOff x="7783418" y="4417230"/>
                   <a:chExt cx="2999126" cy="1008558"/>
                 </a:xfrm>
               </p:grpSpPr>
@@ -10370,7 +10382,7 @@
                 </p:nvSpPr>
                 <p:spPr>
                   <a:xfrm>
-                    <a:off x="7908759" y="3190238"/>
+                    <a:off x="7783418" y="4417230"/>
                     <a:ext cx="2999126" cy="1008558"/>
                   </a:xfrm>
                   <a:prstGeom prst="roundRect">
@@ -10428,8 +10440,8 @@
                 </p:nvSpPr>
                 <p:spPr>
                   <a:xfrm>
-                    <a:off x="8470557" y="3411261"/>
-                    <a:ext cx="1976889" cy="553962"/>
+                    <a:off x="8003494" y="4472295"/>
+                    <a:ext cx="2614710" cy="896534"/>
                   </a:xfrm>
                   <a:prstGeom prst="rect">
                     <a:avLst/>
@@ -10463,25 +10475,28 @@
                     </a:ext>
                   </a:extLst>
                 </p:cNvPr>
-                <p:cNvCxnSpPr/>
+                <p:cNvCxnSpPr>
+                  <a:cxnSpLocks/>
+                </p:cNvCxnSpPr>
                 <p:nvPr/>
               </p:nvCxnSpPr>
               <p:spPr>
                 <a:xfrm>
-                  <a:off x="8897815" y="3499338"/>
-                  <a:ext cx="0" cy="423197"/>
+                  <a:off x="8862967" y="4331515"/>
+                  <a:ext cx="0" cy="664882"/>
                 </a:xfrm>
                 <a:prstGeom prst="straightConnector1">
                   <a:avLst/>
                 </a:prstGeom>
-                <a:ln w="28575">
+                <a:ln w="38100">
                   <a:solidFill>
                     <a:schemeClr val="bg1">
                       <a:lumMod val="50000"/>
                     </a:schemeClr>
                   </a:solidFill>
                   <a:prstDash val="sysDash"/>
-                  <a:tailEnd type="triangle"/>
+                  <a:headEnd type="none" w="med" len="med"/>
+                  <a:tailEnd type="arrow" w="med" len="med"/>
                 </a:ln>
               </p:spPr>
               <p:style>
@@ -10508,25 +10523,28 @@
                     </a:ext>
                   </a:extLst>
                 </p:cNvPr>
-                <p:cNvCxnSpPr/>
+                <p:cNvCxnSpPr>
+                  <a:cxnSpLocks/>
+                </p:cNvCxnSpPr>
                 <p:nvPr/>
               </p:nvCxnSpPr>
               <p:spPr>
                 <a:xfrm>
-                  <a:off x="9050215" y="3499338"/>
-                  <a:ext cx="0" cy="423197"/>
+                  <a:off x="9136183" y="4331515"/>
+                  <a:ext cx="0" cy="664882"/>
                 </a:xfrm>
                 <a:prstGeom prst="straightConnector1">
                   <a:avLst/>
                 </a:prstGeom>
-                <a:ln w="28575">
+                <a:ln w="38100">
                   <a:solidFill>
                     <a:schemeClr val="bg1">
                       <a:lumMod val="50000"/>
                     </a:schemeClr>
                   </a:solidFill>
                   <a:prstDash val="sysDash"/>
-                  <a:tailEnd type="triangle"/>
+                  <a:headEnd type="none" w="med" len="med"/>
+                  <a:tailEnd type="arrow" w="med" len="med"/>
                 </a:ln>
               </p:spPr>
               <p:style>
@@ -10553,25 +10571,28 @@
                     </a:ext>
                   </a:extLst>
                 </p:cNvPr>
-                <p:cNvCxnSpPr/>
+                <p:cNvCxnSpPr>
+                  <a:cxnSpLocks/>
+                </p:cNvCxnSpPr>
                 <p:nvPr/>
               </p:nvCxnSpPr>
               <p:spPr>
                 <a:xfrm>
-                  <a:off x="9202615" y="3499337"/>
-                  <a:ext cx="0" cy="423197"/>
+                  <a:off x="9426818" y="4331513"/>
+                  <a:ext cx="0" cy="664883"/>
                 </a:xfrm>
                 <a:prstGeom prst="straightConnector1">
                   <a:avLst/>
                 </a:prstGeom>
-                <a:ln w="28575">
+                <a:ln w="38100">
                   <a:solidFill>
                     <a:schemeClr val="bg1">
                       <a:lumMod val="50000"/>
                     </a:schemeClr>
                   </a:solidFill>
                   <a:prstDash val="sysDash"/>
-                  <a:tailEnd type="triangle"/>
+                  <a:headEnd type="none" w="med" len="med"/>
+                  <a:tailEnd type="arrow" w="med" len="med"/>
                 </a:ln>
               </p:spPr>
               <p:style>
@@ -10623,8 +10644,8 @@
         </p:blipFill>
         <p:spPr>
           <a:xfrm>
-            <a:off x="-27495" y="2329362"/>
-            <a:ext cx="914400" cy="914400"/>
+            <a:off x="172043" y="2704376"/>
+            <a:ext cx="718429" cy="718429"/>
           </a:xfrm>
           <a:prstGeom prst="rect">
             <a:avLst/>
@@ -10649,18 +10670,19 @@
         </p:nvCxnSpPr>
         <p:spPr>
           <a:xfrm>
-            <a:off x="886905" y="2786562"/>
-            <a:ext cx="1199440" cy="0"/>
+            <a:off x="890472" y="3063591"/>
+            <a:ext cx="909427" cy="2951"/>
           </a:xfrm>
           <a:prstGeom prst="straightConnector1">
             <a:avLst/>
           </a:prstGeom>
-          <a:ln w="28575">
+          <a:ln w="38100">
             <a:solidFill>
               <a:schemeClr val="tx1"/>
             </a:solidFill>
             <a:prstDash val="sysDash"/>
-            <a:tailEnd type="triangle"/>
+            <a:headEnd type="none" w="med" len="med"/>
+            <a:tailEnd type="arrow" w="med" len="med"/>
           </a:ln>
         </p:spPr>
         <p:style>
@@ -10709,8 +10731,8 @@
         </p:blipFill>
         <p:spPr>
           <a:xfrm>
-            <a:off x="5292661" y="5866773"/>
-            <a:ext cx="914400" cy="914400"/>
+            <a:off x="4319048" y="5218105"/>
+            <a:ext cx="718429" cy="718429"/>
           </a:xfrm>
           <a:prstGeom prst="rect">
             <a:avLst/>
@@ -10733,19 +10755,20 @@
           <p:nvPr/>
         </p:nvCxnSpPr>
         <p:spPr>
-          <a:xfrm>
-            <a:off x="5749861" y="4692003"/>
-            <a:ext cx="0" cy="1174770"/>
+          <a:xfrm flipH="1">
+            <a:off x="4678263" y="4414026"/>
+            <a:ext cx="1" cy="804079"/>
           </a:xfrm>
           <a:prstGeom prst="straightConnector1">
             <a:avLst/>
           </a:prstGeom>
-          <a:ln w="28575">
+          <a:ln w="38100">
             <a:solidFill>
               <a:schemeClr val="tx1"/>
             </a:solidFill>
             <a:prstDash val="sysDash"/>
-            <a:tailEnd type="triangle"/>
+            <a:headEnd type="none" w="med" len="med"/>
+            <a:tailEnd type="arrow" w="med" len="med"/>
           </a:ln>
         </p:spPr>
         <p:style>
@@ -10767,6 +10790,3163 @@
     <p:extLst>
       <p:ext uri="{BB962C8B-B14F-4D97-AF65-F5344CB8AC3E}">
         <p14:creationId xmlns:p14="http://schemas.microsoft.com/office/powerpoint/2010/main" val="4066089919"/>
+      </p:ext>
+    </p:extLst>
+  </p:cSld>
+  <p:clrMapOvr>
+    <a:masterClrMapping/>
+  </p:clrMapOvr>
+</p:sld>
+</file>
+
+<file path=ppt/slides/slide6.xml><?xml version="1.0" encoding="utf-8"?>
+<p:sld xmlns:a="http://schemas.openxmlformats.org/drawingml/2006/main" xmlns:r="http://schemas.openxmlformats.org/officeDocument/2006/relationships" xmlns:p="http://schemas.openxmlformats.org/presentationml/2006/main">
+  <p:cSld>
+    <p:spTree>
+      <p:nvGrpSpPr>
+        <p:cNvPr id="1" name=""/>
+        <p:cNvGrpSpPr/>
+        <p:nvPr/>
+      </p:nvGrpSpPr>
+      <p:grpSpPr>
+        <a:xfrm>
+          <a:off x="0" y="0"/>
+          <a:ext cx="0" cy="0"/>
+          <a:chOff x="0" y="0"/>
+          <a:chExt cx="0" cy="0"/>
+        </a:xfrm>
+      </p:grpSpPr>
+      <p:sp>
+        <p:nvSpPr>
+          <p:cNvPr id="19" name="Hình chữ nhật: Góc Tròn 18">
+            <a:extLst>
+              <a:ext uri="{FF2B5EF4-FFF2-40B4-BE49-F238E27FC236}">
+                <a16:creationId xmlns:a16="http://schemas.microsoft.com/office/drawing/2014/main" id="{37E3C752-FC65-47FD-A640-F19304B711E3}"/>
+              </a:ext>
+            </a:extLst>
+          </p:cNvPr>
+          <p:cNvSpPr/>
+          <p:nvPr/>
+        </p:nvSpPr>
+        <p:spPr>
+          <a:xfrm>
+            <a:off x="942975" y="1295398"/>
+            <a:ext cx="7258050" cy="4800600"/>
+          </a:xfrm>
+          <a:prstGeom prst="roundRect">
+            <a:avLst>
+              <a:gd name="adj" fmla="val 6614"/>
+            </a:avLst>
+          </a:prstGeom>
+          <a:solidFill>
+            <a:schemeClr val="accent1">
+              <a:lumMod val="20000"/>
+              <a:lumOff val="80000"/>
+            </a:schemeClr>
+          </a:solidFill>
+          <a:ln>
+            <a:solidFill>
+              <a:schemeClr val="tx2">
+                <a:lumMod val="20000"/>
+                <a:lumOff val="80000"/>
+              </a:schemeClr>
+            </a:solidFill>
+          </a:ln>
+        </p:spPr>
+        <p:style>
+          <a:lnRef idx="2">
+            <a:schemeClr val="accent1">
+              <a:shade val="50000"/>
+            </a:schemeClr>
+          </a:lnRef>
+          <a:fillRef idx="1">
+            <a:schemeClr val="accent1"/>
+          </a:fillRef>
+          <a:effectRef idx="0">
+            <a:schemeClr val="accent1"/>
+          </a:effectRef>
+          <a:fontRef idx="minor">
+            <a:schemeClr val="lt1"/>
+          </a:fontRef>
+        </p:style>
+        <p:txBody>
+          <a:bodyPr rtlCol="0" anchor="t" anchorCtr="0"/>
+          <a:lstStyle/>
+          <a:p>
+            <a:r>
+              <a:rPr lang="en-US" b="1" dirty="0">
+                <a:solidFill>
+                  <a:srgbClr val="0070C0"/>
+                </a:solidFill>
+              </a:rPr>
+              <a:t>Logic</a:t>
+            </a:r>
+          </a:p>
+        </p:txBody>
+      </p:sp>
+      <p:sp>
+        <p:nvSpPr>
+          <p:cNvPr id="21" name="Hình chữ nhật 20">
+            <a:extLst>
+              <a:ext uri="{FF2B5EF4-FFF2-40B4-BE49-F238E27FC236}">
+                <a16:creationId xmlns:a16="http://schemas.microsoft.com/office/drawing/2014/main" id="{3D60721F-D668-40CE-8ED5-959BCD5786CA}"/>
+              </a:ext>
+            </a:extLst>
+          </p:cNvPr>
+          <p:cNvSpPr/>
+          <p:nvPr/>
+        </p:nvSpPr>
+        <p:spPr>
+          <a:xfrm>
+            <a:off x="4441627" y="1448534"/>
+            <a:ext cx="1676405" cy="545065"/>
+          </a:xfrm>
+          <a:prstGeom prst="rect">
+            <a:avLst/>
+          </a:prstGeom>
+          <a:solidFill>
+            <a:srgbClr val="0070C0"/>
+          </a:solidFill>
+        </p:spPr>
+        <p:style>
+          <a:lnRef idx="2">
+            <a:schemeClr val="accent1">
+              <a:shade val="50000"/>
+            </a:schemeClr>
+          </a:lnRef>
+          <a:fillRef idx="1">
+            <a:schemeClr val="accent1"/>
+          </a:fillRef>
+          <a:effectRef idx="0">
+            <a:schemeClr val="accent1"/>
+          </a:effectRef>
+          <a:fontRef idx="minor">
+            <a:schemeClr val="lt1"/>
+          </a:fontRef>
+        </p:style>
+        <p:txBody>
+          <a:bodyPr rtlCol="0" anchor="ctr"/>
+          <a:lstStyle/>
+          <a:p>
+            <a:pPr algn="ctr"/>
+            <a:r>
+              <a:rPr lang="en-US" dirty="0"/>
+              <a:t>Logic</a:t>
+            </a:r>
+          </a:p>
+        </p:txBody>
+      </p:sp>
+      <p:sp>
+        <p:nvSpPr>
+          <p:cNvPr id="22" name="Rectangle 45">
+            <a:extLst>
+              <a:ext uri="{FF2B5EF4-FFF2-40B4-BE49-F238E27FC236}">
+                <a16:creationId xmlns:a16="http://schemas.microsoft.com/office/drawing/2014/main" id="{ADB178A8-32CE-4940-899D-27730762590B}"/>
+              </a:ext>
+            </a:extLst>
+          </p:cNvPr>
+          <p:cNvSpPr/>
+          <p:nvPr/>
+        </p:nvSpPr>
+        <p:spPr>
+          <a:xfrm>
+            <a:off x="1759088" y="2518162"/>
+            <a:ext cx="1676407" cy="508279"/>
+          </a:xfrm>
+          <a:prstGeom prst="rect">
+            <a:avLst/>
+          </a:prstGeom>
+          <a:solidFill>
+            <a:schemeClr val="accent5"/>
+          </a:solidFill>
+          <a:ln w="19050">
+            <a:solidFill>
+              <a:schemeClr val="accent5"/>
+            </a:solidFill>
+          </a:ln>
+          <a:effectLst/>
+        </p:spPr>
+        <p:style>
+          <a:lnRef idx="1">
+            <a:schemeClr val="accent5"/>
+          </a:lnRef>
+          <a:fillRef idx="2">
+            <a:schemeClr val="accent5"/>
+          </a:fillRef>
+          <a:effectRef idx="1">
+            <a:schemeClr val="accent5"/>
+          </a:effectRef>
+          <a:fontRef idx="minor">
+            <a:schemeClr val="dk1"/>
+          </a:fontRef>
+        </p:style>
+        <p:txBody>
+          <a:bodyPr rtlCol="0" anchor="ctr"/>
+          <a:lstStyle/>
+          <a:p>
+            <a:pPr algn="ctr"/>
+            <a:r>
+              <a:rPr lang="en-US" sz="1050" dirty="0">
+                <a:solidFill>
+                  <a:schemeClr val="bg1"/>
+                </a:solidFill>
+              </a:rPr>
+              <a:t>{abstract}</a:t>
+            </a:r>
+            <a:br>
+              <a:rPr lang="en-US" sz="1050" dirty="0">
+                <a:solidFill>
+                  <a:schemeClr val="bg1"/>
+                </a:solidFill>
+              </a:rPr>
+            </a:br>
+            <a:r>
+              <a:rPr lang="en-US" sz="1050" dirty="0">
+                <a:solidFill>
+                  <a:schemeClr val="bg1"/>
+                </a:solidFill>
+              </a:rPr>
+              <a:t>Command</a:t>
+            </a:r>
+            <a:endParaRPr lang="en-SG" sz="1050" dirty="0">
+              <a:solidFill>
+                <a:schemeClr val="bg1"/>
+              </a:solidFill>
+            </a:endParaRPr>
+          </a:p>
+        </p:txBody>
+      </p:sp>
+      <p:sp>
+        <p:nvSpPr>
+          <p:cNvPr id="23" name="Rectangle 80">
+            <a:extLst>
+              <a:ext uri="{FF2B5EF4-FFF2-40B4-BE49-F238E27FC236}">
+                <a16:creationId xmlns:a16="http://schemas.microsoft.com/office/drawing/2014/main" id="{0C2B94C0-74E5-41A4-8444-83C7F12BE0EE}"/>
+              </a:ext>
+            </a:extLst>
+          </p:cNvPr>
+          <p:cNvSpPr/>
+          <p:nvPr/>
+        </p:nvSpPr>
+        <p:spPr>
+          <a:xfrm flipH="1">
+            <a:off x="5739829" y="3342386"/>
+            <a:ext cx="1676405" cy="508928"/>
+          </a:xfrm>
+          <a:prstGeom prst="rect">
+            <a:avLst/>
+          </a:prstGeom>
+          <a:ln w="19050"/>
+          <a:effectLst/>
+        </p:spPr>
+        <p:style>
+          <a:lnRef idx="1">
+            <a:schemeClr val="accent5"/>
+          </a:lnRef>
+          <a:fillRef idx="2">
+            <a:schemeClr val="accent5"/>
+          </a:fillRef>
+          <a:effectRef idx="1">
+            <a:schemeClr val="accent5"/>
+          </a:effectRef>
+          <a:fontRef idx="minor">
+            <a:schemeClr val="dk1"/>
+          </a:fontRef>
+        </p:style>
+        <p:txBody>
+          <a:bodyPr rtlCol="0" anchor="ctr"/>
+          <a:lstStyle/>
+          <a:p>
+            <a:pPr algn="ctr"/>
+            <a:r>
+              <a:rPr lang="en-US" sz="1050" dirty="0" err="1"/>
+              <a:t>CommandResult</a:t>
+            </a:r>
+            <a:endParaRPr lang="en-SG" sz="1050" dirty="0"/>
+          </a:p>
+        </p:txBody>
+      </p:sp>
+      <p:sp>
+        <p:nvSpPr>
+          <p:cNvPr id="24" name="Rectangle 49">
+            <a:extLst>
+              <a:ext uri="{FF2B5EF4-FFF2-40B4-BE49-F238E27FC236}">
+                <a16:creationId xmlns:a16="http://schemas.microsoft.com/office/drawing/2014/main" id="{02818AB7-55D6-4A8C-A4AF-FA7899CFEB76}"/>
+              </a:ext>
+            </a:extLst>
+          </p:cNvPr>
+          <p:cNvSpPr/>
+          <p:nvPr/>
+        </p:nvSpPr>
+        <p:spPr>
+          <a:xfrm flipH="1">
+            <a:off x="1759091" y="5401499"/>
+            <a:ext cx="1676405" cy="251621"/>
+          </a:xfrm>
+          <a:prstGeom prst="rect">
+            <a:avLst/>
+          </a:prstGeom>
+          <a:ln w="19050"/>
+          <a:effectLst/>
+        </p:spPr>
+        <p:style>
+          <a:lnRef idx="1">
+            <a:schemeClr val="accent5"/>
+          </a:lnRef>
+          <a:fillRef idx="2">
+            <a:schemeClr val="accent5"/>
+          </a:fillRef>
+          <a:effectRef idx="1">
+            <a:schemeClr val="accent5"/>
+          </a:effectRef>
+          <a:fontRef idx="minor">
+            <a:schemeClr val="dk1"/>
+          </a:fontRef>
+        </p:style>
+        <p:txBody>
+          <a:bodyPr rtlCol="0" anchor="ctr"/>
+          <a:lstStyle/>
+          <a:p>
+            <a:pPr algn="ctr"/>
+            <a:r>
+              <a:rPr lang="en-US" sz="1050" dirty="0" err="1"/>
+              <a:t>OrderXYZCommand</a:t>
+            </a:r>
+            <a:endParaRPr lang="en-SG" sz="1050" dirty="0"/>
+          </a:p>
+        </p:txBody>
+      </p:sp>
+      <p:sp>
+        <p:nvSpPr>
+          <p:cNvPr id="25" name="Rectangle 49">
+            <a:extLst>
+              <a:ext uri="{FF2B5EF4-FFF2-40B4-BE49-F238E27FC236}">
+                <a16:creationId xmlns:a16="http://schemas.microsoft.com/office/drawing/2014/main" id="{658010FD-8C3F-4364-B63D-D74285B6265E}"/>
+              </a:ext>
+            </a:extLst>
+          </p:cNvPr>
+          <p:cNvSpPr/>
+          <p:nvPr/>
+        </p:nvSpPr>
+        <p:spPr>
+          <a:xfrm flipH="1">
+            <a:off x="1759091" y="5091530"/>
+            <a:ext cx="1676405" cy="251621"/>
+          </a:xfrm>
+          <a:prstGeom prst="rect">
+            <a:avLst/>
+          </a:prstGeom>
+          <a:ln w="19050"/>
+          <a:effectLst/>
+        </p:spPr>
+        <p:style>
+          <a:lnRef idx="1">
+            <a:schemeClr val="accent5"/>
+          </a:lnRef>
+          <a:fillRef idx="2">
+            <a:schemeClr val="accent5"/>
+          </a:fillRef>
+          <a:effectRef idx="1">
+            <a:schemeClr val="accent5"/>
+          </a:effectRef>
+          <a:fontRef idx="minor">
+            <a:schemeClr val="dk1"/>
+          </a:fontRef>
+        </p:style>
+        <p:txBody>
+          <a:bodyPr rtlCol="0" anchor="ctr"/>
+          <a:lstStyle/>
+          <a:p>
+            <a:pPr algn="ctr"/>
+            <a:r>
+              <a:rPr lang="en-US" sz="1050" dirty="0" err="1"/>
+              <a:t>DraftOrderXYZCommand</a:t>
+            </a:r>
+            <a:endParaRPr lang="en-SG" sz="1050" dirty="0"/>
+          </a:p>
+        </p:txBody>
+      </p:sp>
+      <p:sp>
+        <p:nvSpPr>
+          <p:cNvPr id="26" name="Rectangle 49">
+            <a:extLst>
+              <a:ext uri="{FF2B5EF4-FFF2-40B4-BE49-F238E27FC236}">
+                <a16:creationId xmlns:a16="http://schemas.microsoft.com/office/drawing/2014/main" id="{81F87200-9633-4B9A-B388-7C8D48302405}"/>
+              </a:ext>
+            </a:extLst>
+          </p:cNvPr>
+          <p:cNvSpPr/>
+          <p:nvPr/>
+        </p:nvSpPr>
+        <p:spPr>
+          <a:xfrm flipH="1">
+            <a:off x="1759090" y="4772036"/>
+            <a:ext cx="1676405" cy="251621"/>
+          </a:xfrm>
+          <a:prstGeom prst="rect">
+            <a:avLst/>
+          </a:prstGeom>
+          <a:ln w="19050"/>
+          <a:effectLst/>
+        </p:spPr>
+        <p:style>
+          <a:lnRef idx="1">
+            <a:schemeClr val="accent5"/>
+          </a:lnRef>
+          <a:fillRef idx="2">
+            <a:schemeClr val="accent5"/>
+          </a:fillRef>
+          <a:effectRef idx="1">
+            <a:schemeClr val="accent5"/>
+          </a:effectRef>
+          <a:fontRef idx="minor">
+            <a:schemeClr val="dk1"/>
+          </a:fontRef>
+        </p:style>
+        <p:txBody>
+          <a:bodyPr rtlCol="0" anchor="ctr"/>
+          <a:lstStyle/>
+          <a:p>
+            <a:pPr algn="ctr"/>
+            <a:r>
+              <a:rPr lang="en-US" sz="1050" dirty="0" err="1"/>
+              <a:t>MenuXYZCommand</a:t>
+            </a:r>
+            <a:endParaRPr lang="en-SG" sz="1050" dirty="0"/>
+          </a:p>
+        </p:txBody>
+      </p:sp>
+      <p:sp>
+        <p:nvSpPr>
+          <p:cNvPr id="27" name="Rectangle 49">
+            <a:extLst>
+              <a:ext uri="{FF2B5EF4-FFF2-40B4-BE49-F238E27FC236}">
+                <a16:creationId xmlns:a16="http://schemas.microsoft.com/office/drawing/2014/main" id="{99F8BDC8-3CCD-4309-B223-2045C781B547}"/>
+              </a:ext>
+            </a:extLst>
+          </p:cNvPr>
+          <p:cNvSpPr/>
+          <p:nvPr/>
+        </p:nvSpPr>
+        <p:spPr>
+          <a:xfrm flipH="1">
+            <a:off x="1759090" y="4452542"/>
+            <a:ext cx="1676405" cy="251621"/>
+          </a:xfrm>
+          <a:prstGeom prst="rect">
+            <a:avLst/>
+          </a:prstGeom>
+          <a:ln w="19050"/>
+          <a:effectLst/>
+        </p:spPr>
+        <p:style>
+          <a:lnRef idx="1">
+            <a:schemeClr val="accent5"/>
+          </a:lnRef>
+          <a:fillRef idx="2">
+            <a:schemeClr val="accent5"/>
+          </a:fillRef>
+          <a:effectRef idx="1">
+            <a:schemeClr val="accent5"/>
+          </a:effectRef>
+          <a:fontRef idx="minor">
+            <a:schemeClr val="dk1"/>
+          </a:fontRef>
+        </p:style>
+        <p:txBody>
+          <a:bodyPr rtlCol="0" anchor="ctr"/>
+          <a:lstStyle/>
+          <a:p>
+            <a:pPr algn="ctr"/>
+            <a:r>
+              <a:rPr lang="en-US" sz="1050" dirty="0" err="1"/>
+              <a:t>MemberXYZCommand</a:t>
+            </a:r>
+            <a:endParaRPr lang="en-SG" sz="1050" dirty="0"/>
+          </a:p>
+        </p:txBody>
+      </p:sp>
+      <p:sp>
+        <p:nvSpPr>
+          <p:cNvPr id="28" name="Rectangle 49">
+            <a:extLst>
+              <a:ext uri="{FF2B5EF4-FFF2-40B4-BE49-F238E27FC236}">
+                <a16:creationId xmlns:a16="http://schemas.microsoft.com/office/drawing/2014/main" id="{B94DF0BF-4E6F-400F-9D49-B595A70CF2D0}"/>
+              </a:ext>
+            </a:extLst>
+          </p:cNvPr>
+          <p:cNvSpPr/>
+          <p:nvPr/>
+        </p:nvSpPr>
+        <p:spPr>
+          <a:xfrm flipH="1">
+            <a:off x="1759089" y="4140914"/>
+            <a:ext cx="1676405" cy="251621"/>
+          </a:xfrm>
+          <a:prstGeom prst="rect">
+            <a:avLst/>
+          </a:prstGeom>
+          <a:ln w="19050"/>
+          <a:effectLst/>
+        </p:spPr>
+        <p:style>
+          <a:lnRef idx="1">
+            <a:schemeClr val="accent5"/>
+          </a:lnRef>
+          <a:fillRef idx="2">
+            <a:schemeClr val="accent5"/>
+          </a:fillRef>
+          <a:effectRef idx="1">
+            <a:schemeClr val="accent5"/>
+          </a:effectRef>
+          <a:fontRef idx="minor">
+            <a:schemeClr val="dk1"/>
+          </a:fontRef>
+        </p:style>
+        <p:txBody>
+          <a:bodyPr rtlCol="0" anchor="ctr"/>
+          <a:lstStyle/>
+          <a:p>
+            <a:pPr algn="ctr"/>
+            <a:r>
+              <a:rPr lang="en-US" sz="1050" dirty="0" err="1"/>
+              <a:t>EmployeeXYZCommand</a:t>
+            </a:r>
+            <a:endParaRPr lang="en-SG" sz="1050" dirty="0"/>
+          </a:p>
+        </p:txBody>
+      </p:sp>
+      <p:sp>
+        <p:nvSpPr>
+          <p:cNvPr id="29" name="Rectangle 49">
+            <a:extLst>
+              <a:ext uri="{FF2B5EF4-FFF2-40B4-BE49-F238E27FC236}">
+                <a16:creationId xmlns:a16="http://schemas.microsoft.com/office/drawing/2014/main" id="{D9B68ACA-A49D-48A4-8618-C5A85A1195C6}"/>
+              </a:ext>
+            </a:extLst>
+          </p:cNvPr>
+          <p:cNvSpPr/>
+          <p:nvPr/>
+        </p:nvSpPr>
+        <p:spPr>
+          <a:xfrm flipH="1">
+            <a:off x="1759091" y="5711468"/>
+            <a:ext cx="1676405" cy="251621"/>
+          </a:xfrm>
+          <a:prstGeom prst="rect">
+            <a:avLst/>
+          </a:prstGeom>
+          <a:ln w="19050"/>
+          <a:effectLst/>
+        </p:spPr>
+        <p:style>
+          <a:lnRef idx="1">
+            <a:schemeClr val="accent5"/>
+          </a:lnRef>
+          <a:fillRef idx="2">
+            <a:schemeClr val="accent5"/>
+          </a:fillRef>
+          <a:effectRef idx="1">
+            <a:schemeClr val="accent5"/>
+          </a:effectRef>
+          <a:fontRef idx="minor">
+            <a:schemeClr val="dk1"/>
+          </a:fontRef>
+        </p:style>
+        <p:txBody>
+          <a:bodyPr rtlCol="0" anchor="ctr"/>
+          <a:lstStyle/>
+          <a:p>
+            <a:pPr algn="ctr"/>
+            <a:r>
+              <a:rPr lang="en-US" sz="1050" dirty="0" err="1"/>
+              <a:t>StatXYZCommand</a:t>
+            </a:r>
+            <a:endParaRPr lang="en-SG" sz="1050" dirty="0"/>
+          </a:p>
+        </p:txBody>
+      </p:sp>
+      <p:sp>
+        <p:nvSpPr>
+          <p:cNvPr id="30" name="Rectangle 80">
+            <a:extLst>
+              <a:ext uri="{FF2B5EF4-FFF2-40B4-BE49-F238E27FC236}">
+                <a16:creationId xmlns:a16="http://schemas.microsoft.com/office/drawing/2014/main" id="{61398F4E-C917-4996-93E8-B450677B87A9}"/>
+              </a:ext>
+            </a:extLst>
+          </p:cNvPr>
+          <p:cNvSpPr/>
+          <p:nvPr/>
+        </p:nvSpPr>
+        <p:spPr>
+          <a:xfrm flipH="1">
+            <a:off x="5739833" y="4140914"/>
+            <a:ext cx="1676405" cy="251621"/>
+          </a:xfrm>
+          <a:prstGeom prst="rect">
+            <a:avLst/>
+          </a:prstGeom>
+          <a:ln w="19050"/>
+          <a:effectLst/>
+        </p:spPr>
+        <p:style>
+          <a:lnRef idx="1">
+            <a:schemeClr val="accent5"/>
+          </a:lnRef>
+          <a:fillRef idx="2">
+            <a:schemeClr val="accent5"/>
+          </a:fillRef>
+          <a:effectRef idx="1">
+            <a:schemeClr val="accent5"/>
+          </a:effectRef>
+          <a:fontRef idx="minor">
+            <a:schemeClr val="dk1"/>
+          </a:fontRef>
+        </p:style>
+        <p:txBody>
+          <a:bodyPr rtlCol="0" anchor="ctr"/>
+          <a:lstStyle/>
+          <a:p>
+            <a:pPr algn="ctr"/>
+            <a:r>
+              <a:rPr lang="en-US" sz="1050" dirty="0" err="1"/>
+              <a:t>EmployeeCommandResult</a:t>
+            </a:r>
+            <a:endParaRPr lang="en-SG" sz="1050" dirty="0"/>
+          </a:p>
+        </p:txBody>
+      </p:sp>
+      <p:sp>
+        <p:nvSpPr>
+          <p:cNvPr id="31" name="Rectangle 80">
+            <a:extLst>
+              <a:ext uri="{FF2B5EF4-FFF2-40B4-BE49-F238E27FC236}">
+                <a16:creationId xmlns:a16="http://schemas.microsoft.com/office/drawing/2014/main" id="{4AAA1E9E-F999-4794-94C2-6732D22D065C}"/>
+              </a:ext>
+            </a:extLst>
+          </p:cNvPr>
+          <p:cNvSpPr/>
+          <p:nvPr/>
+        </p:nvSpPr>
+        <p:spPr>
+          <a:xfrm flipH="1">
+            <a:off x="5739832" y="4451795"/>
+            <a:ext cx="1676405" cy="251621"/>
+          </a:xfrm>
+          <a:prstGeom prst="rect">
+            <a:avLst/>
+          </a:prstGeom>
+          <a:ln w="19050"/>
+          <a:effectLst/>
+        </p:spPr>
+        <p:style>
+          <a:lnRef idx="1">
+            <a:schemeClr val="accent5"/>
+          </a:lnRef>
+          <a:fillRef idx="2">
+            <a:schemeClr val="accent5"/>
+          </a:fillRef>
+          <a:effectRef idx="1">
+            <a:schemeClr val="accent5"/>
+          </a:effectRef>
+          <a:fontRef idx="minor">
+            <a:schemeClr val="dk1"/>
+          </a:fontRef>
+        </p:style>
+        <p:txBody>
+          <a:bodyPr rtlCol="0" anchor="ctr"/>
+          <a:lstStyle/>
+          <a:p>
+            <a:pPr algn="ctr"/>
+            <a:r>
+              <a:rPr lang="en-US" sz="1050" dirty="0" err="1"/>
+              <a:t>MemberCommandResult</a:t>
+            </a:r>
+            <a:endParaRPr lang="en-SG" sz="1050" dirty="0"/>
+          </a:p>
+        </p:txBody>
+      </p:sp>
+      <p:sp>
+        <p:nvSpPr>
+          <p:cNvPr id="32" name="Rectangle 80">
+            <a:extLst>
+              <a:ext uri="{FF2B5EF4-FFF2-40B4-BE49-F238E27FC236}">
+                <a16:creationId xmlns:a16="http://schemas.microsoft.com/office/drawing/2014/main" id="{4A7C050D-DE7F-48F0-8D9D-BFC7A245F100}"/>
+              </a:ext>
+            </a:extLst>
+          </p:cNvPr>
+          <p:cNvSpPr/>
+          <p:nvPr/>
+        </p:nvSpPr>
+        <p:spPr>
+          <a:xfrm flipH="1">
+            <a:off x="5739831" y="4766776"/>
+            <a:ext cx="1676405" cy="251621"/>
+          </a:xfrm>
+          <a:prstGeom prst="rect">
+            <a:avLst/>
+          </a:prstGeom>
+          <a:ln w="19050"/>
+          <a:effectLst/>
+        </p:spPr>
+        <p:style>
+          <a:lnRef idx="1">
+            <a:schemeClr val="accent5"/>
+          </a:lnRef>
+          <a:fillRef idx="2">
+            <a:schemeClr val="accent5"/>
+          </a:fillRef>
+          <a:effectRef idx="1">
+            <a:schemeClr val="accent5"/>
+          </a:effectRef>
+          <a:fontRef idx="minor">
+            <a:schemeClr val="dk1"/>
+          </a:fontRef>
+        </p:style>
+        <p:txBody>
+          <a:bodyPr rtlCol="0" anchor="ctr"/>
+          <a:lstStyle/>
+          <a:p>
+            <a:pPr algn="ctr"/>
+            <a:r>
+              <a:rPr lang="en-US" sz="1050" dirty="0" err="1"/>
+              <a:t>MenuCommandResult</a:t>
+            </a:r>
+            <a:endParaRPr lang="en-SG" sz="1050" dirty="0"/>
+          </a:p>
+        </p:txBody>
+      </p:sp>
+      <p:sp>
+        <p:nvSpPr>
+          <p:cNvPr id="33" name="Rectangle 80">
+            <a:extLst>
+              <a:ext uri="{FF2B5EF4-FFF2-40B4-BE49-F238E27FC236}">
+                <a16:creationId xmlns:a16="http://schemas.microsoft.com/office/drawing/2014/main" id="{4E5BFDAC-D8BE-4A7E-B38E-B982E4FEF764}"/>
+              </a:ext>
+            </a:extLst>
+          </p:cNvPr>
+          <p:cNvSpPr/>
+          <p:nvPr/>
+        </p:nvSpPr>
+        <p:spPr>
+          <a:xfrm flipH="1">
+            <a:off x="5739829" y="5082669"/>
+            <a:ext cx="1676405" cy="251621"/>
+          </a:xfrm>
+          <a:prstGeom prst="rect">
+            <a:avLst/>
+          </a:prstGeom>
+          <a:ln w="19050"/>
+          <a:effectLst/>
+        </p:spPr>
+        <p:style>
+          <a:lnRef idx="1">
+            <a:schemeClr val="accent5"/>
+          </a:lnRef>
+          <a:fillRef idx="2">
+            <a:schemeClr val="accent5"/>
+          </a:fillRef>
+          <a:effectRef idx="1">
+            <a:schemeClr val="accent5"/>
+          </a:effectRef>
+          <a:fontRef idx="minor">
+            <a:schemeClr val="dk1"/>
+          </a:fontRef>
+        </p:style>
+        <p:txBody>
+          <a:bodyPr rtlCol="0" anchor="ctr"/>
+          <a:lstStyle/>
+          <a:p>
+            <a:pPr algn="ctr"/>
+            <a:r>
+              <a:rPr lang="en-US" sz="1050" dirty="0" err="1"/>
+              <a:t>OrderCommandResult</a:t>
+            </a:r>
+            <a:endParaRPr lang="en-SG" sz="1050" dirty="0"/>
+          </a:p>
+        </p:txBody>
+      </p:sp>
+      <p:sp>
+        <p:nvSpPr>
+          <p:cNvPr id="34" name="Rectangle 80">
+            <a:extLst>
+              <a:ext uri="{FF2B5EF4-FFF2-40B4-BE49-F238E27FC236}">
+                <a16:creationId xmlns:a16="http://schemas.microsoft.com/office/drawing/2014/main" id="{5A32AC12-1CE8-43BD-9306-3B28670D2143}"/>
+              </a:ext>
+            </a:extLst>
+          </p:cNvPr>
+          <p:cNvSpPr/>
+          <p:nvPr/>
+        </p:nvSpPr>
+        <p:spPr>
+          <a:xfrm flipH="1">
+            <a:off x="5739829" y="5392638"/>
+            <a:ext cx="1676405" cy="251621"/>
+          </a:xfrm>
+          <a:prstGeom prst="rect">
+            <a:avLst/>
+          </a:prstGeom>
+          <a:ln w="19050"/>
+          <a:effectLst/>
+        </p:spPr>
+        <p:style>
+          <a:lnRef idx="1">
+            <a:schemeClr val="accent5"/>
+          </a:lnRef>
+          <a:fillRef idx="2">
+            <a:schemeClr val="accent5"/>
+          </a:fillRef>
+          <a:effectRef idx="1">
+            <a:schemeClr val="accent5"/>
+          </a:effectRef>
+          <a:fontRef idx="minor">
+            <a:schemeClr val="dk1"/>
+          </a:fontRef>
+        </p:style>
+        <p:txBody>
+          <a:bodyPr rtlCol="0" anchor="ctr"/>
+          <a:lstStyle/>
+          <a:p>
+            <a:pPr algn="ctr"/>
+            <a:r>
+              <a:rPr lang="en-US" sz="1050" dirty="0" err="1"/>
+              <a:t>StatCommandResult</a:t>
+            </a:r>
+            <a:endParaRPr lang="en-SG" sz="1050" dirty="0"/>
+          </a:p>
+        </p:txBody>
+      </p:sp>
+      <p:sp>
+        <p:nvSpPr>
+          <p:cNvPr id="35" name="Hình chữ nhật 34">
+            <a:extLst>
+              <a:ext uri="{FF2B5EF4-FFF2-40B4-BE49-F238E27FC236}">
+                <a16:creationId xmlns:a16="http://schemas.microsoft.com/office/drawing/2014/main" id="{EBBA2C30-194E-4457-B2F4-8CC479C35666}"/>
+              </a:ext>
+            </a:extLst>
+          </p:cNvPr>
+          <p:cNvSpPr/>
+          <p:nvPr/>
+        </p:nvSpPr>
+        <p:spPr>
+          <a:xfrm>
+            <a:off x="4441627" y="2500409"/>
+            <a:ext cx="1676405" cy="545065"/>
+          </a:xfrm>
+          <a:prstGeom prst="rect">
+            <a:avLst/>
+          </a:prstGeom>
+          <a:solidFill>
+            <a:srgbClr val="0070C0"/>
+          </a:solidFill>
+        </p:spPr>
+        <p:style>
+          <a:lnRef idx="2">
+            <a:schemeClr val="accent1">
+              <a:shade val="50000"/>
+            </a:schemeClr>
+          </a:lnRef>
+          <a:fillRef idx="1">
+            <a:schemeClr val="accent1"/>
+          </a:fillRef>
+          <a:effectRef idx="0">
+            <a:schemeClr val="accent1"/>
+          </a:effectRef>
+          <a:fontRef idx="minor">
+            <a:schemeClr val="lt1"/>
+          </a:fontRef>
+        </p:style>
+        <p:txBody>
+          <a:bodyPr rtlCol="0" anchor="ctr"/>
+          <a:lstStyle/>
+          <a:p>
+            <a:pPr algn="ctr"/>
+            <a:r>
+              <a:rPr lang="en-US" dirty="0"/>
+              <a:t>Parser</a:t>
+            </a:r>
+          </a:p>
+        </p:txBody>
+      </p:sp>
+      <p:cxnSp>
+        <p:nvCxnSpPr>
+          <p:cNvPr id="49" name="Đường nối Thẳng 48">
+            <a:extLst>
+              <a:ext uri="{FF2B5EF4-FFF2-40B4-BE49-F238E27FC236}">
+                <a16:creationId xmlns:a16="http://schemas.microsoft.com/office/drawing/2014/main" id="{6283D58A-9BF6-4006-AF29-308179FFB197}"/>
+              </a:ext>
+            </a:extLst>
+          </p:cNvPr>
+          <p:cNvCxnSpPr>
+            <a:stCxn id="28" idx="3"/>
+          </p:cNvCxnSpPr>
+          <p:nvPr/>
+        </p:nvCxnSpPr>
+        <p:spPr>
+          <a:xfrm flipH="1">
+            <a:off x="1219200" y="4266725"/>
+            <a:ext cx="539889" cy="746"/>
+          </a:xfrm>
+          <a:prstGeom prst="line">
+            <a:avLst/>
+          </a:prstGeom>
+          <a:ln w="28575"/>
+        </p:spPr>
+        <p:style>
+          <a:lnRef idx="1">
+            <a:schemeClr val="accent1"/>
+          </a:lnRef>
+          <a:fillRef idx="0">
+            <a:schemeClr val="accent1"/>
+          </a:fillRef>
+          <a:effectRef idx="0">
+            <a:schemeClr val="accent1"/>
+          </a:effectRef>
+          <a:fontRef idx="minor">
+            <a:schemeClr val="tx1"/>
+          </a:fontRef>
+        </p:style>
+      </p:cxnSp>
+      <p:cxnSp>
+        <p:nvCxnSpPr>
+          <p:cNvPr id="51" name="Đường nối Thẳng 50">
+            <a:extLst>
+              <a:ext uri="{FF2B5EF4-FFF2-40B4-BE49-F238E27FC236}">
+                <a16:creationId xmlns:a16="http://schemas.microsoft.com/office/drawing/2014/main" id="{A67A4C16-6D8B-447F-9AEB-195C2393A5E2}"/>
+              </a:ext>
+            </a:extLst>
+          </p:cNvPr>
+          <p:cNvCxnSpPr>
+            <a:cxnSpLocks/>
+          </p:cNvCxnSpPr>
+          <p:nvPr/>
+        </p:nvCxnSpPr>
+        <p:spPr>
+          <a:xfrm flipV="1">
+            <a:off x="1219200" y="2945273"/>
+            <a:ext cx="0" cy="1321452"/>
+          </a:xfrm>
+          <a:prstGeom prst="line">
+            <a:avLst/>
+          </a:prstGeom>
+          <a:ln w="28575"/>
+        </p:spPr>
+        <p:style>
+          <a:lnRef idx="1">
+            <a:schemeClr val="accent1"/>
+          </a:lnRef>
+          <a:fillRef idx="0">
+            <a:schemeClr val="accent1"/>
+          </a:fillRef>
+          <a:effectRef idx="0">
+            <a:schemeClr val="accent1"/>
+          </a:effectRef>
+          <a:fontRef idx="minor">
+            <a:schemeClr val="tx1"/>
+          </a:fontRef>
+        </p:style>
+      </p:cxnSp>
+      <p:sp>
+        <p:nvSpPr>
+          <p:cNvPr id="53" name="Tam giác Cân 52">
+            <a:extLst>
+              <a:ext uri="{FF2B5EF4-FFF2-40B4-BE49-F238E27FC236}">
+                <a16:creationId xmlns:a16="http://schemas.microsoft.com/office/drawing/2014/main" id="{2DD544BB-73CC-4E25-8BD8-330BDA43D693}"/>
+              </a:ext>
+            </a:extLst>
+          </p:cNvPr>
+          <p:cNvSpPr/>
+          <p:nvPr/>
+        </p:nvSpPr>
+        <p:spPr>
+          <a:xfrm rot="5400000">
+            <a:off x="1477634" y="2819462"/>
+            <a:ext cx="311287" cy="251621"/>
+          </a:xfrm>
+          <a:prstGeom prst="triangle">
+            <a:avLst/>
+          </a:prstGeom>
+          <a:solidFill>
+            <a:schemeClr val="accent5">
+              <a:lumMod val="40000"/>
+              <a:lumOff val="60000"/>
+            </a:schemeClr>
+          </a:solidFill>
+        </p:spPr>
+        <p:style>
+          <a:lnRef idx="2">
+            <a:schemeClr val="accent1">
+              <a:shade val="50000"/>
+            </a:schemeClr>
+          </a:lnRef>
+          <a:fillRef idx="1">
+            <a:schemeClr val="accent1"/>
+          </a:fillRef>
+          <a:effectRef idx="0">
+            <a:schemeClr val="accent1"/>
+          </a:effectRef>
+          <a:fontRef idx="minor">
+            <a:schemeClr val="lt1"/>
+          </a:fontRef>
+        </p:style>
+        <p:txBody>
+          <a:bodyPr rtlCol="0" anchor="ctr"/>
+          <a:lstStyle/>
+          <a:p>
+            <a:pPr algn="ctr"/>
+            <a:endParaRPr lang="en-US"/>
+          </a:p>
+        </p:txBody>
+      </p:sp>
+      <p:cxnSp>
+        <p:nvCxnSpPr>
+          <p:cNvPr id="55" name="Đường nối Thẳng 54">
+            <a:extLst>
+              <a:ext uri="{FF2B5EF4-FFF2-40B4-BE49-F238E27FC236}">
+                <a16:creationId xmlns:a16="http://schemas.microsoft.com/office/drawing/2014/main" id="{77CAF044-14C6-40E2-9585-2946A963FB1B}"/>
+              </a:ext>
+            </a:extLst>
+          </p:cNvPr>
+          <p:cNvCxnSpPr>
+            <a:cxnSpLocks/>
+            <a:endCxn id="53" idx="3"/>
+          </p:cNvCxnSpPr>
+          <p:nvPr/>
+        </p:nvCxnSpPr>
+        <p:spPr>
+          <a:xfrm>
+            <a:off x="1219200" y="2945273"/>
+            <a:ext cx="288267" cy="0"/>
+          </a:xfrm>
+          <a:prstGeom prst="line">
+            <a:avLst/>
+          </a:prstGeom>
+          <a:ln w="28575"/>
+        </p:spPr>
+        <p:style>
+          <a:lnRef idx="1">
+            <a:schemeClr val="accent1"/>
+          </a:lnRef>
+          <a:fillRef idx="0">
+            <a:schemeClr val="accent1"/>
+          </a:fillRef>
+          <a:effectRef idx="0">
+            <a:schemeClr val="accent1"/>
+          </a:effectRef>
+          <a:fontRef idx="minor">
+            <a:schemeClr val="tx1"/>
+          </a:fontRef>
+        </p:style>
+      </p:cxnSp>
+      <p:cxnSp>
+        <p:nvCxnSpPr>
+          <p:cNvPr id="59" name="Đường nối Thẳng 58">
+            <a:extLst>
+              <a:ext uri="{FF2B5EF4-FFF2-40B4-BE49-F238E27FC236}">
+                <a16:creationId xmlns:a16="http://schemas.microsoft.com/office/drawing/2014/main" id="{1E89C6E3-93CA-4B6E-B802-84D1CF1F6C1A}"/>
+              </a:ext>
+            </a:extLst>
+          </p:cNvPr>
+          <p:cNvCxnSpPr>
+            <a:cxnSpLocks/>
+          </p:cNvCxnSpPr>
+          <p:nvPr/>
+        </p:nvCxnSpPr>
+        <p:spPr>
+          <a:xfrm>
+            <a:off x="1219200" y="4266725"/>
+            <a:ext cx="0" cy="1570554"/>
+          </a:xfrm>
+          <a:prstGeom prst="line">
+            <a:avLst/>
+          </a:prstGeom>
+          <a:ln w="28575"/>
+        </p:spPr>
+        <p:style>
+          <a:lnRef idx="1">
+            <a:schemeClr val="accent1"/>
+          </a:lnRef>
+          <a:fillRef idx="0">
+            <a:schemeClr val="accent1"/>
+          </a:fillRef>
+          <a:effectRef idx="0">
+            <a:schemeClr val="accent1"/>
+          </a:effectRef>
+          <a:fontRef idx="minor">
+            <a:schemeClr val="tx1"/>
+          </a:fontRef>
+        </p:style>
+      </p:cxnSp>
+      <p:cxnSp>
+        <p:nvCxnSpPr>
+          <p:cNvPr id="61" name="Đường nối Thẳng 60">
+            <a:extLst>
+              <a:ext uri="{FF2B5EF4-FFF2-40B4-BE49-F238E27FC236}">
+                <a16:creationId xmlns:a16="http://schemas.microsoft.com/office/drawing/2014/main" id="{8BF23CB0-1BB0-4181-8CEB-1EBEF7A8C6EE}"/>
+              </a:ext>
+            </a:extLst>
+          </p:cNvPr>
+          <p:cNvCxnSpPr>
+            <a:cxnSpLocks/>
+            <a:stCxn id="29" idx="3"/>
+          </p:cNvCxnSpPr>
+          <p:nvPr/>
+        </p:nvCxnSpPr>
+        <p:spPr>
+          <a:xfrm flipH="1">
+            <a:off x="1219200" y="5837279"/>
+            <a:ext cx="539891" cy="0"/>
+          </a:xfrm>
+          <a:prstGeom prst="line">
+            <a:avLst/>
+          </a:prstGeom>
+          <a:ln w="28575"/>
+        </p:spPr>
+        <p:style>
+          <a:lnRef idx="1">
+            <a:schemeClr val="accent1"/>
+          </a:lnRef>
+          <a:fillRef idx="0">
+            <a:schemeClr val="accent1"/>
+          </a:fillRef>
+          <a:effectRef idx="0">
+            <a:schemeClr val="accent1"/>
+          </a:effectRef>
+          <a:fontRef idx="minor">
+            <a:schemeClr val="tx1"/>
+          </a:fontRef>
+        </p:style>
+      </p:cxnSp>
+      <p:cxnSp>
+        <p:nvCxnSpPr>
+          <p:cNvPr id="65" name="Đường nối Thẳng 64">
+            <a:extLst>
+              <a:ext uri="{FF2B5EF4-FFF2-40B4-BE49-F238E27FC236}">
+                <a16:creationId xmlns:a16="http://schemas.microsoft.com/office/drawing/2014/main" id="{2A3627F8-7858-419B-B732-3F67A004CBEF}"/>
+              </a:ext>
+            </a:extLst>
+          </p:cNvPr>
+          <p:cNvCxnSpPr>
+            <a:cxnSpLocks/>
+            <a:stCxn id="24" idx="3"/>
+          </p:cNvCxnSpPr>
+          <p:nvPr/>
+        </p:nvCxnSpPr>
+        <p:spPr>
+          <a:xfrm flipH="1">
+            <a:off x="1219200" y="5527310"/>
+            <a:ext cx="539891" cy="0"/>
+          </a:xfrm>
+          <a:prstGeom prst="line">
+            <a:avLst/>
+          </a:prstGeom>
+          <a:ln w="28575"/>
+        </p:spPr>
+        <p:style>
+          <a:lnRef idx="1">
+            <a:schemeClr val="accent1"/>
+          </a:lnRef>
+          <a:fillRef idx="0">
+            <a:schemeClr val="accent1"/>
+          </a:fillRef>
+          <a:effectRef idx="0">
+            <a:schemeClr val="accent1"/>
+          </a:effectRef>
+          <a:fontRef idx="minor">
+            <a:schemeClr val="tx1"/>
+          </a:fontRef>
+        </p:style>
+      </p:cxnSp>
+      <p:cxnSp>
+        <p:nvCxnSpPr>
+          <p:cNvPr id="70" name="Đường nối Thẳng 69">
+            <a:extLst>
+              <a:ext uri="{FF2B5EF4-FFF2-40B4-BE49-F238E27FC236}">
+                <a16:creationId xmlns:a16="http://schemas.microsoft.com/office/drawing/2014/main" id="{BF6EADB3-CB52-4DA5-8B17-2BFC52B5DDC5}"/>
+              </a:ext>
+            </a:extLst>
+          </p:cNvPr>
+          <p:cNvCxnSpPr>
+            <a:cxnSpLocks/>
+            <a:stCxn id="25" idx="3"/>
+          </p:cNvCxnSpPr>
+          <p:nvPr/>
+        </p:nvCxnSpPr>
+        <p:spPr>
+          <a:xfrm flipH="1">
+            <a:off x="1219200" y="5217341"/>
+            <a:ext cx="539891" cy="0"/>
+          </a:xfrm>
+          <a:prstGeom prst="line">
+            <a:avLst/>
+          </a:prstGeom>
+          <a:ln w="28575"/>
+        </p:spPr>
+        <p:style>
+          <a:lnRef idx="1">
+            <a:schemeClr val="accent1"/>
+          </a:lnRef>
+          <a:fillRef idx="0">
+            <a:schemeClr val="accent1"/>
+          </a:fillRef>
+          <a:effectRef idx="0">
+            <a:schemeClr val="accent1"/>
+          </a:effectRef>
+          <a:fontRef idx="minor">
+            <a:schemeClr val="tx1"/>
+          </a:fontRef>
+        </p:style>
+      </p:cxnSp>
+      <p:cxnSp>
+        <p:nvCxnSpPr>
+          <p:cNvPr id="73" name="Đường nối Thẳng 72">
+            <a:extLst>
+              <a:ext uri="{FF2B5EF4-FFF2-40B4-BE49-F238E27FC236}">
+                <a16:creationId xmlns:a16="http://schemas.microsoft.com/office/drawing/2014/main" id="{0D08521E-A2A6-4DD7-8F64-C2D1348A0BF7}"/>
+              </a:ext>
+            </a:extLst>
+          </p:cNvPr>
+          <p:cNvCxnSpPr>
+            <a:cxnSpLocks/>
+            <a:stCxn id="26" idx="3"/>
+          </p:cNvCxnSpPr>
+          <p:nvPr/>
+        </p:nvCxnSpPr>
+        <p:spPr>
+          <a:xfrm flipH="1">
+            <a:off x="1219200" y="4897847"/>
+            <a:ext cx="539890" cy="0"/>
+          </a:xfrm>
+          <a:prstGeom prst="line">
+            <a:avLst/>
+          </a:prstGeom>
+          <a:ln w="28575"/>
+        </p:spPr>
+        <p:style>
+          <a:lnRef idx="1">
+            <a:schemeClr val="accent1"/>
+          </a:lnRef>
+          <a:fillRef idx="0">
+            <a:schemeClr val="accent1"/>
+          </a:fillRef>
+          <a:effectRef idx="0">
+            <a:schemeClr val="accent1"/>
+          </a:effectRef>
+          <a:fontRef idx="minor">
+            <a:schemeClr val="tx1"/>
+          </a:fontRef>
+        </p:style>
+      </p:cxnSp>
+      <p:cxnSp>
+        <p:nvCxnSpPr>
+          <p:cNvPr id="76" name="Đường nối Thẳng 75">
+            <a:extLst>
+              <a:ext uri="{FF2B5EF4-FFF2-40B4-BE49-F238E27FC236}">
+                <a16:creationId xmlns:a16="http://schemas.microsoft.com/office/drawing/2014/main" id="{FF0A0367-5581-4CE9-906A-5F4A3D1F197A}"/>
+              </a:ext>
+            </a:extLst>
+          </p:cNvPr>
+          <p:cNvCxnSpPr>
+            <a:stCxn id="27" idx="3"/>
+          </p:cNvCxnSpPr>
+          <p:nvPr/>
+        </p:nvCxnSpPr>
+        <p:spPr>
+          <a:xfrm flipH="1" flipV="1">
+            <a:off x="1219200" y="4578352"/>
+            <a:ext cx="539890" cy="1"/>
+          </a:xfrm>
+          <a:prstGeom prst="line">
+            <a:avLst/>
+          </a:prstGeom>
+          <a:ln w="28575"/>
+        </p:spPr>
+        <p:style>
+          <a:lnRef idx="1">
+            <a:schemeClr val="accent1"/>
+          </a:lnRef>
+          <a:fillRef idx="0">
+            <a:schemeClr val="accent1"/>
+          </a:fillRef>
+          <a:effectRef idx="0">
+            <a:schemeClr val="accent1"/>
+          </a:effectRef>
+          <a:fontRef idx="minor">
+            <a:schemeClr val="tx1"/>
+          </a:fontRef>
+        </p:style>
+      </p:cxnSp>
+      <p:sp>
+        <p:nvSpPr>
+          <p:cNvPr id="78" name="Tam giác Cân 77">
+            <a:extLst>
+              <a:ext uri="{FF2B5EF4-FFF2-40B4-BE49-F238E27FC236}">
+                <a16:creationId xmlns:a16="http://schemas.microsoft.com/office/drawing/2014/main" id="{FBE1F5F9-87DB-45D5-9163-8D423D7A744D}"/>
+              </a:ext>
+            </a:extLst>
+          </p:cNvPr>
+          <p:cNvSpPr/>
+          <p:nvPr/>
+        </p:nvSpPr>
+        <p:spPr>
+          <a:xfrm rot="16200000">
+            <a:off x="7385444" y="3660128"/>
+            <a:ext cx="311287" cy="251621"/>
+          </a:xfrm>
+          <a:prstGeom prst="triangle">
+            <a:avLst/>
+          </a:prstGeom>
+          <a:solidFill>
+            <a:schemeClr val="accent5">
+              <a:lumMod val="40000"/>
+              <a:lumOff val="60000"/>
+            </a:schemeClr>
+          </a:solidFill>
+        </p:spPr>
+        <p:style>
+          <a:lnRef idx="2">
+            <a:schemeClr val="accent1">
+              <a:shade val="50000"/>
+            </a:schemeClr>
+          </a:lnRef>
+          <a:fillRef idx="1">
+            <a:schemeClr val="accent1"/>
+          </a:fillRef>
+          <a:effectRef idx="0">
+            <a:schemeClr val="accent1"/>
+          </a:effectRef>
+          <a:fontRef idx="minor">
+            <a:schemeClr val="lt1"/>
+          </a:fontRef>
+        </p:style>
+        <p:txBody>
+          <a:bodyPr rtlCol="0" anchor="ctr"/>
+          <a:lstStyle/>
+          <a:p>
+            <a:pPr algn="ctr"/>
+            <a:endParaRPr lang="en-US"/>
+          </a:p>
+        </p:txBody>
+      </p:sp>
+      <p:cxnSp>
+        <p:nvCxnSpPr>
+          <p:cNvPr id="79" name="Đường nối Thẳng 78">
+            <a:extLst>
+              <a:ext uri="{FF2B5EF4-FFF2-40B4-BE49-F238E27FC236}">
+                <a16:creationId xmlns:a16="http://schemas.microsoft.com/office/drawing/2014/main" id="{17F42171-16DD-479A-8DD9-3931C12BFB78}"/>
+              </a:ext>
+            </a:extLst>
+          </p:cNvPr>
+          <p:cNvCxnSpPr>
+            <a:cxnSpLocks/>
+          </p:cNvCxnSpPr>
+          <p:nvPr/>
+        </p:nvCxnSpPr>
+        <p:spPr>
+          <a:xfrm flipV="1">
+            <a:off x="7924800" y="3760233"/>
+            <a:ext cx="31321" cy="1767078"/>
+          </a:xfrm>
+          <a:prstGeom prst="line">
+            <a:avLst/>
+          </a:prstGeom>
+          <a:ln w="28575"/>
+        </p:spPr>
+        <p:style>
+          <a:lnRef idx="1">
+            <a:schemeClr val="accent1"/>
+          </a:lnRef>
+          <a:fillRef idx="0">
+            <a:schemeClr val="accent1"/>
+          </a:fillRef>
+          <a:effectRef idx="0">
+            <a:schemeClr val="accent1"/>
+          </a:effectRef>
+          <a:fontRef idx="minor">
+            <a:schemeClr val="tx1"/>
+          </a:fontRef>
+        </p:style>
+      </p:cxnSp>
+      <p:cxnSp>
+        <p:nvCxnSpPr>
+          <p:cNvPr id="82" name="Đường nối Thẳng 81">
+            <a:extLst>
+              <a:ext uri="{FF2B5EF4-FFF2-40B4-BE49-F238E27FC236}">
+                <a16:creationId xmlns:a16="http://schemas.microsoft.com/office/drawing/2014/main" id="{258C5A8C-C988-4B5E-9B83-D73E891FDE16}"/>
+              </a:ext>
+            </a:extLst>
+          </p:cNvPr>
+          <p:cNvCxnSpPr>
+            <a:cxnSpLocks/>
+            <a:endCxn id="30" idx="1"/>
+          </p:cNvCxnSpPr>
+          <p:nvPr/>
+        </p:nvCxnSpPr>
+        <p:spPr>
+          <a:xfrm flipH="1">
+            <a:off x="7416238" y="4266725"/>
+            <a:ext cx="526885" cy="0"/>
+          </a:xfrm>
+          <a:prstGeom prst="line">
+            <a:avLst/>
+          </a:prstGeom>
+          <a:ln w="28575"/>
+        </p:spPr>
+        <p:style>
+          <a:lnRef idx="1">
+            <a:schemeClr val="accent1"/>
+          </a:lnRef>
+          <a:fillRef idx="0">
+            <a:schemeClr val="accent1"/>
+          </a:fillRef>
+          <a:effectRef idx="0">
+            <a:schemeClr val="accent1"/>
+          </a:effectRef>
+          <a:fontRef idx="minor">
+            <a:schemeClr val="tx1"/>
+          </a:fontRef>
+        </p:style>
+      </p:cxnSp>
+      <p:cxnSp>
+        <p:nvCxnSpPr>
+          <p:cNvPr id="86" name="Đường nối Thẳng 85">
+            <a:extLst>
+              <a:ext uri="{FF2B5EF4-FFF2-40B4-BE49-F238E27FC236}">
+                <a16:creationId xmlns:a16="http://schemas.microsoft.com/office/drawing/2014/main" id="{E34A6BF6-7466-4DF4-A977-74D39D9FE08A}"/>
+              </a:ext>
+            </a:extLst>
+          </p:cNvPr>
+          <p:cNvCxnSpPr>
+            <a:cxnSpLocks/>
+            <a:endCxn id="31" idx="1"/>
+          </p:cNvCxnSpPr>
+          <p:nvPr/>
+        </p:nvCxnSpPr>
+        <p:spPr>
+          <a:xfrm flipH="1" flipV="1">
+            <a:off x="7416237" y="4577606"/>
+            <a:ext cx="526886" cy="746"/>
+          </a:xfrm>
+          <a:prstGeom prst="line">
+            <a:avLst/>
+          </a:prstGeom>
+          <a:ln w="28575"/>
+        </p:spPr>
+        <p:style>
+          <a:lnRef idx="1">
+            <a:schemeClr val="accent1"/>
+          </a:lnRef>
+          <a:fillRef idx="0">
+            <a:schemeClr val="accent1"/>
+          </a:fillRef>
+          <a:effectRef idx="0">
+            <a:schemeClr val="accent1"/>
+          </a:effectRef>
+          <a:fontRef idx="minor">
+            <a:schemeClr val="tx1"/>
+          </a:fontRef>
+        </p:style>
+      </p:cxnSp>
+      <p:cxnSp>
+        <p:nvCxnSpPr>
+          <p:cNvPr id="87" name="Đường nối Thẳng 86">
+            <a:extLst>
+              <a:ext uri="{FF2B5EF4-FFF2-40B4-BE49-F238E27FC236}">
+                <a16:creationId xmlns:a16="http://schemas.microsoft.com/office/drawing/2014/main" id="{E46FD22A-6DF2-4C71-B91A-8BA62715054A}"/>
+              </a:ext>
+            </a:extLst>
+          </p:cNvPr>
+          <p:cNvCxnSpPr>
+            <a:cxnSpLocks/>
+            <a:endCxn id="32" idx="1"/>
+          </p:cNvCxnSpPr>
+          <p:nvPr/>
+        </p:nvCxnSpPr>
+        <p:spPr>
+          <a:xfrm flipH="1">
+            <a:off x="7416236" y="4892587"/>
+            <a:ext cx="508564" cy="0"/>
+          </a:xfrm>
+          <a:prstGeom prst="line">
+            <a:avLst/>
+          </a:prstGeom>
+          <a:ln w="28575"/>
+        </p:spPr>
+        <p:style>
+          <a:lnRef idx="1">
+            <a:schemeClr val="accent1"/>
+          </a:lnRef>
+          <a:fillRef idx="0">
+            <a:schemeClr val="accent1"/>
+          </a:fillRef>
+          <a:effectRef idx="0">
+            <a:schemeClr val="accent1"/>
+          </a:effectRef>
+          <a:fontRef idx="minor">
+            <a:schemeClr val="tx1"/>
+          </a:fontRef>
+        </p:style>
+      </p:cxnSp>
+      <p:cxnSp>
+        <p:nvCxnSpPr>
+          <p:cNvPr id="88" name="Đường nối Thẳng 87">
+            <a:extLst>
+              <a:ext uri="{FF2B5EF4-FFF2-40B4-BE49-F238E27FC236}">
+                <a16:creationId xmlns:a16="http://schemas.microsoft.com/office/drawing/2014/main" id="{61DC614F-DDDA-408B-A888-D07A7511DC27}"/>
+              </a:ext>
+            </a:extLst>
+          </p:cNvPr>
+          <p:cNvCxnSpPr>
+            <a:cxnSpLocks/>
+            <a:endCxn id="33" idx="1"/>
+          </p:cNvCxnSpPr>
+          <p:nvPr/>
+        </p:nvCxnSpPr>
+        <p:spPr>
+          <a:xfrm flipH="1">
+            <a:off x="7416234" y="5208480"/>
+            <a:ext cx="526889" cy="0"/>
+          </a:xfrm>
+          <a:prstGeom prst="line">
+            <a:avLst/>
+          </a:prstGeom>
+          <a:ln w="28575"/>
+        </p:spPr>
+        <p:style>
+          <a:lnRef idx="1">
+            <a:schemeClr val="accent1"/>
+          </a:lnRef>
+          <a:fillRef idx="0">
+            <a:schemeClr val="accent1"/>
+          </a:fillRef>
+          <a:effectRef idx="0">
+            <a:schemeClr val="accent1"/>
+          </a:effectRef>
+          <a:fontRef idx="minor">
+            <a:schemeClr val="tx1"/>
+          </a:fontRef>
+        </p:style>
+      </p:cxnSp>
+      <p:cxnSp>
+        <p:nvCxnSpPr>
+          <p:cNvPr id="89" name="Đường nối Thẳng 88">
+            <a:extLst>
+              <a:ext uri="{FF2B5EF4-FFF2-40B4-BE49-F238E27FC236}">
+                <a16:creationId xmlns:a16="http://schemas.microsoft.com/office/drawing/2014/main" id="{32F4092F-5EC8-452A-B007-BAD49722F5E5}"/>
+              </a:ext>
+            </a:extLst>
+          </p:cNvPr>
+          <p:cNvCxnSpPr>
+            <a:cxnSpLocks/>
+            <a:endCxn id="34" idx="1"/>
+          </p:cNvCxnSpPr>
+          <p:nvPr/>
+        </p:nvCxnSpPr>
+        <p:spPr>
+          <a:xfrm flipH="1" flipV="1">
+            <a:off x="7416234" y="5518449"/>
+            <a:ext cx="508566" cy="4267"/>
+          </a:xfrm>
+          <a:prstGeom prst="line">
+            <a:avLst/>
+          </a:prstGeom>
+          <a:ln w="28575"/>
+        </p:spPr>
+        <p:style>
+          <a:lnRef idx="1">
+            <a:schemeClr val="accent1"/>
+          </a:lnRef>
+          <a:fillRef idx="0">
+            <a:schemeClr val="accent1"/>
+          </a:fillRef>
+          <a:effectRef idx="0">
+            <a:schemeClr val="accent1"/>
+          </a:effectRef>
+          <a:fontRef idx="minor">
+            <a:schemeClr val="tx1"/>
+          </a:fontRef>
+        </p:style>
+      </p:cxnSp>
+      <p:cxnSp>
+        <p:nvCxnSpPr>
+          <p:cNvPr id="94" name="Đường nối Thẳng 93">
+            <a:extLst>
+              <a:ext uri="{FF2B5EF4-FFF2-40B4-BE49-F238E27FC236}">
+                <a16:creationId xmlns:a16="http://schemas.microsoft.com/office/drawing/2014/main" id="{7F630AE3-1EDC-4F76-88A1-CA81B43404D7}"/>
+              </a:ext>
+            </a:extLst>
+          </p:cNvPr>
+          <p:cNvCxnSpPr>
+            <a:cxnSpLocks/>
+            <a:endCxn id="78" idx="3"/>
+          </p:cNvCxnSpPr>
+          <p:nvPr/>
+        </p:nvCxnSpPr>
+        <p:spPr>
+          <a:xfrm flipH="1">
+            <a:off x="7666898" y="3785938"/>
+            <a:ext cx="306590" cy="0"/>
+          </a:xfrm>
+          <a:prstGeom prst="line">
+            <a:avLst/>
+          </a:prstGeom>
+          <a:ln w="28575"/>
+        </p:spPr>
+        <p:style>
+          <a:lnRef idx="1">
+            <a:schemeClr val="accent1"/>
+          </a:lnRef>
+          <a:fillRef idx="0">
+            <a:schemeClr val="accent1"/>
+          </a:fillRef>
+          <a:effectRef idx="0">
+            <a:schemeClr val="accent1"/>
+          </a:effectRef>
+          <a:fontRef idx="minor">
+            <a:schemeClr val="tx1"/>
+          </a:fontRef>
+        </p:style>
+      </p:cxnSp>
+      <p:cxnSp>
+        <p:nvCxnSpPr>
+          <p:cNvPr id="121" name="Đường kết nối Mũi tên Thẳng 120">
+            <a:extLst>
+              <a:ext uri="{FF2B5EF4-FFF2-40B4-BE49-F238E27FC236}">
+                <a16:creationId xmlns:a16="http://schemas.microsoft.com/office/drawing/2014/main" id="{677F0DB1-D971-4690-AB37-F65A86691DC9}"/>
+              </a:ext>
+            </a:extLst>
+          </p:cNvPr>
+          <p:cNvCxnSpPr>
+            <a:stCxn id="28" idx="1"/>
+            <a:endCxn id="30" idx="3"/>
+          </p:cNvCxnSpPr>
+          <p:nvPr/>
+        </p:nvCxnSpPr>
+        <p:spPr>
+          <a:xfrm>
+            <a:off x="3435494" y="4266725"/>
+            <a:ext cx="2304339" cy="0"/>
+          </a:xfrm>
+          <a:prstGeom prst="straightConnector1">
+            <a:avLst/>
+          </a:prstGeom>
+          <a:ln w="19050" cap="flat" cmpd="sng" algn="ctr">
+            <a:solidFill>
+              <a:schemeClr val="accent1"/>
+            </a:solidFill>
+            <a:prstDash val="sysDot"/>
+            <a:round/>
+            <a:headEnd type="none" w="med" len="med"/>
+            <a:tailEnd type="arrow" w="lg" len="lg"/>
+          </a:ln>
+        </p:spPr>
+        <p:style>
+          <a:lnRef idx="0">
+            <a:scrgbClr r="0" g="0" b="0"/>
+          </a:lnRef>
+          <a:fillRef idx="0">
+            <a:scrgbClr r="0" g="0" b="0"/>
+          </a:fillRef>
+          <a:effectRef idx="0">
+            <a:scrgbClr r="0" g="0" b="0"/>
+          </a:effectRef>
+          <a:fontRef idx="minor">
+            <a:schemeClr val="tx1"/>
+          </a:fontRef>
+        </p:style>
+      </p:cxnSp>
+      <p:cxnSp>
+        <p:nvCxnSpPr>
+          <p:cNvPr id="122" name="Đường kết nối Mũi tên Thẳng 121">
+            <a:extLst>
+              <a:ext uri="{FF2B5EF4-FFF2-40B4-BE49-F238E27FC236}">
+                <a16:creationId xmlns:a16="http://schemas.microsoft.com/office/drawing/2014/main" id="{1D193B27-513D-4D6A-AEC7-7463655F1265}"/>
+              </a:ext>
+            </a:extLst>
+          </p:cNvPr>
+          <p:cNvCxnSpPr>
+            <a:cxnSpLocks/>
+            <a:stCxn id="27" idx="1"/>
+            <a:endCxn id="31" idx="3"/>
+          </p:cNvCxnSpPr>
+          <p:nvPr/>
+        </p:nvCxnSpPr>
+        <p:spPr>
+          <a:xfrm flipV="1">
+            <a:off x="3435495" y="4577606"/>
+            <a:ext cx="2304337" cy="747"/>
+          </a:xfrm>
+          <a:prstGeom prst="straightConnector1">
+            <a:avLst/>
+          </a:prstGeom>
+          <a:ln w="19050" cap="flat" cmpd="sng" algn="ctr">
+            <a:solidFill>
+              <a:schemeClr val="accent1"/>
+            </a:solidFill>
+            <a:prstDash val="sysDot"/>
+            <a:round/>
+            <a:headEnd type="none" w="med" len="med"/>
+            <a:tailEnd type="arrow" w="lg" len="lg"/>
+          </a:ln>
+        </p:spPr>
+        <p:style>
+          <a:lnRef idx="0">
+            <a:scrgbClr r="0" g="0" b="0"/>
+          </a:lnRef>
+          <a:fillRef idx="0">
+            <a:scrgbClr r="0" g="0" b="0"/>
+          </a:fillRef>
+          <a:effectRef idx="0">
+            <a:scrgbClr r="0" g="0" b="0"/>
+          </a:effectRef>
+          <a:fontRef idx="minor">
+            <a:schemeClr val="tx1"/>
+          </a:fontRef>
+        </p:style>
+      </p:cxnSp>
+      <p:cxnSp>
+        <p:nvCxnSpPr>
+          <p:cNvPr id="125" name="Đường kết nối Mũi tên Thẳng 124">
+            <a:extLst>
+              <a:ext uri="{FF2B5EF4-FFF2-40B4-BE49-F238E27FC236}">
+                <a16:creationId xmlns:a16="http://schemas.microsoft.com/office/drawing/2014/main" id="{1A775D42-DD1E-42AA-A367-246C181592CF}"/>
+              </a:ext>
+            </a:extLst>
+          </p:cNvPr>
+          <p:cNvCxnSpPr>
+            <a:cxnSpLocks/>
+            <a:stCxn id="26" idx="1"/>
+            <a:endCxn id="32" idx="3"/>
+          </p:cNvCxnSpPr>
+          <p:nvPr/>
+        </p:nvCxnSpPr>
+        <p:spPr>
+          <a:xfrm flipV="1">
+            <a:off x="3435495" y="4892587"/>
+            <a:ext cx="2304336" cy="5260"/>
+          </a:xfrm>
+          <a:prstGeom prst="straightConnector1">
+            <a:avLst/>
+          </a:prstGeom>
+          <a:ln w="19050" cap="flat" cmpd="sng" algn="ctr">
+            <a:solidFill>
+              <a:schemeClr val="accent1"/>
+            </a:solidFill>
+            <a:prstDash val="sysDot"/>
+            <a:round/>
+            <a:headEnd type="none" w="med" len="med"/>
+            <a:tailEnd type="arrow" w="lg" len="lg"/>
+          </a:ln>
+        </p:spPr>
+        <p:style>
+          <a:lnRef idx="0">
+            <a:scrgbClr r="0" g="0" b="0"/>
+          </a:lnRef>
+          <a:fillRef idx="0">
+            <a:scrgbClr r="0" g="0" b="0"/>
+          </a:fillRef>
+          <a:effectRef idx="0">
+            <a:scrgbClr r="0" g="0" b="0"/>
+          </a:effectRef>
+          <a:fontRef idx="minor">
+            <a:schemeClr val="tx1"/>
+          </a:fontRef>
+        </p:style>
+      </p:cxnSp>
+      <p:cxnSp>
+        <p:nvCxnSpPr>
+          <p:cNvPr id="128" name="Đường kết nối Mũi tên Thẳng 127">
+            <a:extLst>
+              <a:ext uri="{FF2B5EF4-FFF2-40B4-BE49-F238E27FC236}">
+                <a16:creationId xmlns:a16="http://schemas.microsoft.com/office/drawing/2014/main" id="{78DA834C-232B-43B0-A20E-429A7FF68E2E}"/>
+              </a:ext>
+            </a:extLst>
+          </p:cNvPr>
+          <p:cNvCxnSpPr>
+            <a:cxnSpLocks/>
+            <a:stCxn id="25" idx="1"/>
+            <a:endCxn id="33" idx="3"/>
+          </p:cNvCxnSpPr>
+          <p:nvPr/>
+        </p:nvCxnSpPr>
+        <p:spPr>
+          <a:xfrm flipV="1">
+            <a:off x="3435496" y="5208480"/>
+            <a:ext cx="2304333" cy="8861"/>
+          </a:xfrm>
+          <a:prstGeom prst="straightConnector1">
+            <a:avLst/>
+          </a:prstGeom>
+          <a:ln w="19050" cap="flat" cmpd="sng" algn="ctr">
+            <a:solidFill>
+              <a:schemeClr val="accent1"/>
+            </a:solidFill>
+            <a:prstDash val="sysDot"/>
+            <a:round/>
+            <a:headEnd type="none" w="med" len="med"/>
+            <a:tailEnd type="arrow" w="lg" len="lg"/>
+          </a:ln>
+        </p:spPr>
+        <p:style>
+          <a:lnRef idx="0">
+            <a:scrgbClr r="0" g="0" b="0"/>
+          </a:lnRef>
+          <a:fillRef idx="0">
+            <a:scrgbClr r="0" g="0" b="0"/>
+          </a:fillRef>
+          <a:effectRef idx="0">
+            <a:scrgbClr r="0" g="0" b="0"/>
+          </a:effectRef>
+          <a:fontRef idx="minor">
+            <a:schemeClr val="tx1"/>
+          </a:fontRef>
+        </p:style>
+      </p:cxnSp>
+      <p:cxnSp>
+        <p:nvCxnSpPr>
+          <p:cNvPr id="132" name="Đường kết nối: Mũi tên Gấp khúc 131">
+            <a:extLst>
+              <a:ext uri="{FF2B5EF4-FFF2-40B4-BE49-F238E27FC236}">
+                <a16:creationId xmlns:a16="http://schemas.microsoft.com/office/drawing/2014/main" id="{6D0945E9-1BD5-4FA5-A860-EB8F6BFE02BE}"/>
+              </a:ext>
+            </a:extLst>
+          </p:cNvPr>
+          <p:cNvCxnSpPr>
+            <a:stCxn id="29" idx="1"/>
+            <a:endCxn id="34" idx="3"/>
+          </p:cNvCxnSpPr>
+          <p:nvPr/>
+        </p:nvCxnSpPr>
+        <p:spPr>
+          <a:xfrm flipV="1">
+            <a:off x="3435496" y="5518449"/>
+            <a:ext cx="2304333" cy="318830"/>
+          </a:xfrm>
+          <a:prstGeom prst="bentConnector3">
+            <a:avLst/>
+          </a:prstGeom>
+          <a:ln w="19050" cap="flat" cmpd="sng" algn="ctr">
+            <a:solidFill>
+              <a:schemeClr val="accent1"/>
+            </a:solidFill>
+            <a:prstDash val="sysDot"/>
+            <a:round/>
+            <a:headEnd type="none" w="med" len="med"/>
+            <a:tailEnd type="arrow" w="lg" len="lg"/>
+          </a:ln>
+        </p:spPr>
+        <p:style>
+          <a:lnRef idx="0">
+            <a:scrgbClr r="0" g="0" b="0"/>
+          </a:lnRef>
+          <a:fillRef idx="0">
+            <a:scrgbClr r="0" g="0" b="0"/>
+          </a:fillRef>
+          <a:effectRef idx="0">
+            <a:scrgbClr r="0" g="0" b="0"/>
+          </a:effectRef>
+          <a:fontRef idx="minor">
+            <a:schemeClr val="tx1"/>
+          </a:fontRef>
+        </p:style>
+      </p:cxnSp>
+      <p:cxnSp>
+        <p:nvCxnSpPr>
+          <p:cNvPr id="138" name="Đường nối Thẳng 137">
+            <a:extLst>
+              <a:ext uri="{FF2B5EF4-FFF2-40B4-BE49-F238E27FC236}">
+                <a16:creationId xmlns:a16="http://schemas.microsoft.com/office/drawing/2014/main" id="{A88E644F-AFA6-42D5-ACAD-69971AE485CE}"/>
+              </a:ext>
+            </a:extLst>
+          </p:cNvPr>
+          <p:cNvCxnSpPr>
+            <a:stCxn id="24" idx="1"/>
+          </p:cNvCxnSpPr>
+          <p:nvPr/>
+        </p:nvCxnSpPr>
+        <p:spPr>
+          <a:xfrm flipV="1">
+            <a:off x="3435496" y="5518449"/>
+            <a:ext cx="603104" cy="8861"/>
+          </a:xfrm>
+          <a:prstGeom prst="line">
+            <a:avLst/>
+          </a:prstGeom>
+          <a:ln w="19050">
+            <a:prstDash val="sysDot"/>
+          </a:ln>
+        </p:spPr>
+        <p:style>
+          <a:lnRef idx="1">
+            <a:schemeClr val="accent1"/>
+          </a:lnRef>
+          <a:fillRef idx="0">
+            <a:schemeClr val="accent1"/>
+          </a:fillRef>
+          <a:effectRef idx="0">
+            <a:schemeClr val="accent1"/>
+          </a:effectRef>
+          <a:fontRef idx="minor">
+            <a:schemeClr val="tx1"/>
+          </a:fontRef>
+        </p:style>
+      </p:cxnSp>
+      <p:cxnSp>
+        <p:nvCxnSpPr>
+          <p:cNvPr id="142" name="Đường nối Thẳng 141">
+            <a:extLst>
+              <a:ext uri="{FF2B5EF4-FFF2-40B4-BE49-F238E27FC236}">
+                <a16:creationId xmlns:a16="http://schemas.microsoft.com/office/drawing/2014/main" id="{F0F68930-F639-4A10-A96A-AF92585DD0B9}"/>
+              </a:ext>
+            </a:extLst>
+          </p:cNvPr>
+          <p:cNvCxnSpPr/>
+          <p:nvPr/>
+        </p:nvCxnSpPr>
+        <p:spPr>
+          <a:xfrm flipV="1">
+            <a:off x="4038600" y="5208480"/>
+            <a:ext cx="0" cy="318830"/>
+          </a:xfrm>
+          <a:prstGeom prst="line">
+            <a:avLst/>
+          </a:prstGeom>
+          <a:ln w="19050">
+            <a:prstDash val="sysDot"/>
+          </a:ln>
+        </p:spPr>
+        <p:style>
+          <a:lnRef idx="1">
+            <a:schemeClr val="accent1"/>
+          </a:lnRef>
+          <a:fillRef idx="0">
+            <a:schemeClr val="accent1"/>
+          </a:fillRef>
+          <a:effectRef idx="0">
+            <a:schemeClr val="accent1"/>
+          </a:effectRef>
+          <a:fontRef idx="minor">
+            <a:schemeClr val="tx1"/>
+          </a:fontRef>
+        </p:style>
+      </p:cxnSp>
+      <p:sp>
+        <p:nvSpPr>
+          <p:cNvPr id="145" name="Rectangle 49">
+            <a:extLst>
+              <a:ext uri="{FF2B5EF4-FFF2-40B4-BE49-F238E27FC236}">
+                <a16:creationId xmlns:a16="http://schemas.microsoft.com/office/drawing/2014/main" id="{B0B45D32-8B1B-48C9-82C7-3757BC9E976D}"/>
+              </a:ext>
+            </a:extLst>
+          </p:cNvPr>
+          <p:cNvSpPr/>
+          <p:nvPr/>
+        </p:nvSpPr>
+        <p:spPr>
+          <a:xfrm flipH="1">
+            <a:off x="1759088" y="3166028"/>
+            <a:ext cx="1676405" cy="251621"/>
+          </a:xfrm>
+          <a:prstGeom prst="rect">
+            <a:avLst/>
+          </a:prstGeom>
+          <a:ln w="19050"/>
+          <a:effectLst/>
+        </p:spPr>
+        <p:style>
+          <a:lnRef idx="1">
+            <a:schemeClr val="accent5"/>
+          </a:lnRef>
+          <a:fillRef idx="2">
+            <a:schemeClr val="accent5"/>
+          </a:fillRef>
+          <a:effectRef idx="1">
+            <a:schemeClr val="accent5"/>
+          </a:effectRef>
+          <a:fontRef idx="minor">
+            <a:schemeClr val="dk1"/>
+          </a:fontRef>
+        </p:style>
+        <p:txBody>
+          <a:bodyPr rtlCol="0" anchor="ctr"/>
+          <a:lstStyle/>
+          <a:p>
+            <a:pPr algn="ctr"/>
+            <a:r>
+              <a:rPr lang="en-US" sz="1050" dirty="0" err="1"/>
+              <a:t>ExitCommand</a:t>
+            </a:r>
+            <a:endParaRPr lang="en-SG" sz="1050" dirty="0"/>
+          </a:p>
+        </p:txBody>
+      </p:sp>
+      <p:sp>
+        <p:nvSpPr>
+          <p:cNvPr id="146" name="Rectangle 49">
+            <a:extLst>
+              <a:ext uri="{FF2B5EF4-FFF2-40B4-BE49-F238E27FC236}">
+                <a16:creationId xmlns:a16="http://schemas.microsoft.com/office/drawing/2014/main" id="{C9AB2557-2932-4B0B-8DC1-47BE24005E7B}"/>
+              </a:ext>
+            </a:extLst>
+          </p:cNvPr>
+          <p:cNvSpPr/>
+          <p:nvPr/>
+        </p:nvSpPr>
+        <p:spPr>
+          <a:xfrm flipH="1">
+            <a:off x="1759088" y="3471412"/>
+            <a:ext cx="1676405" cy="251621"/>
+          </a:xfrm>
+          <a:prstGeom prst="rect">
+            <a:avLst/>
+          </a:prstGeom>
+          <a:ln w="19050"/>
+          <a:effectLst/>
+        </p:spPr>
+        <p:style>
+          <a:lnRef idx="1">
+            <a:schemeClr val="accent5"/>
+          </a:lnRef>
+          <a:fillRef idx="2">
+            <a:schemeClr val="accent5"/>
+          </a:fillRef>
+          <a:effectRef idx="1">
+            <a:schemeClr val="accent5"/>
+          </a:effectRef>
+          <a:fontRef idx="minor">
+            <a:schemeClr val="dk1"/>
+          </a:fontRef>
+        </p:style>
+        <p:txBody>
+          <a:bodyPr rtlCol="0" anchor="ctr"/>
+          <a:lstStyle/>
+          <a:p>
+            <a:pPr algn="ctr"/>
+            <a:r>
+              <a:rPr lang="en-US" sz="1050" dirty="0" err="1"/>
+              <a:t>HelpCommand</a:t>
+            </a:r>
+            <a:endParaRPr lang="en-SG" sz="1050" dirty="0"/>
+          </a:p>
+        </p:txBody>
+      </p:sp>
+      <p:sp>
+        <p:nvSpPr>
+          <p:cNvPr id="147" name="Rectangle 49">
+            <a:extLst>
+              <a:ext uri="{FF2B5EF4-FFF2-40B4-BE49-F238E27FC236}">
+                <a16:creationId xmlns:a16="http://schemas.microsoft.com/office/drawing/2014/main" id="{745E4D91-6026-4C76-8090-AF924D87106A}"/>
+              </a:ext>
+            </a:extLst>
+          </p:cNvPr>
+          <p:cNvSpPr/>
+          <p:nvPr/>
+        </p:nvSpPr>
+        <p:spPr>
+          <a:xfrm flipH="1">
+            <a:off x="1759088" y="3785939"/>
+            <a:ext cx="1676405" cy="251621"/>
+          </a:xfrm>
+          <a:prstGeom prst="rect">
+            <a:avLst/>
+          </a:prstGeom>
+          <a:ln w="19050"/>
+          <a:effectLst/>
+        </p:spPr>
+        <p:style>
+          <a:lnRef idx="1">
+            <a:schemeClr val="accent5"/>
+          </a:lnRef>
+          <a:fillRef idx="2">
+            <a:schemeClr val="accent5"/>
+          </a:fillRef>
+          <a:effectRef idx="1">
+            <a:schemeClr val="accent5"/>
+          </a:effectRef>
+          <a:fontRef idx="minor">
+            <a:schemeClr val="dk1"/>
+          </a:fontRef>
+        </p:style>
+        <p:txBody>
+          <a:bodyPr rtlCol="0" anchor="ctr"/>
+          <a:lstStyle/>
+          <a:p>
+            <a:pPr algn="ctr"/>
+            <a:r>
+              <a:rPr lang="en-US" sz="1050" dirty="0" err="1"/>
+              <a:t>IncorrectCommand</a:t>
+            </a:r>
+            <a:endParaRPr lang="en-SG" sz="1050" dirty="0"/>
+          </a:p>
+        </p:txBody>
+      </p:sp>
+      <p:cxnSp>
+        <p:nvCxnSpPr>
+          <p:cNvPr id="153" name="Đường nối Thẳng 152">
+            <a:extLst>
+              <a:ext uri="{FF2B5EF4-FFF2-40B4-BE49-F238E27FC236}">
+                <a16:creationId xmlns:a16="http://schemas.microsoft.com/office/drawing/2014/main" id="{6237A15F-7987-4D74-89BB-DDC6757F7700}"/>
+              </a:ext>
+            </a:extLst>
+          </p:cNvPr>
+          <p:cNvCxnSpPr>
+            <a:cxnSpLocks/>
+            <a:stCxn id="147" idx="3"/>
+          </p:cNvCxnSpPr>
+          <p:nvPr/>
+        </p:nvCxnSpPr>
+        <p:spPr>
+          <a:xfrm flipH="1">
+            <a:off x="1219200" y="3911750"/>
+            <a:ext cx="539888" cy="0"/>
+          </a:xfrm>
+          <a:prstGeom prst="line">
+            <a:avLst/>
+          </a:prstGeom>
+          <a:ln w="28575"/>
+        </p:spPr>
+        <p:style>
+          <a:lnRef idx="1">
+            <a:schemeClr val="accent1"/>
+          </a:lnRef>
+          <a:fillRef idx="0">
+            <a:schemeClr val="accent1"/>
+          </a:fillRef>
+          <a:effectRef idx="0">
+            <a:schemeClr val="accent1"/>
+          </a:effectRef>
+          <a:fontRef idx="minor">
+            <a:schemeClr val="tx1"/>
+          </a:fontRef>
+        </p:style>
+      </p:cxnSp>
+      <p:cxnSp>
+        <p:nvCxnSpPr>
+          <p:cNvPr id="157" name="Đường nối Thẳng 156">
+            <a:extLst>
+              <a:ext uri="{FF2B5EF4-FFF2-40B4-BE49-F238E27FC236}">
+                <a16:creationId xmlns:a16="http://schemas.microsoft.com/office/drawing/2014/main" id="{DC37D97F-924E-4296-8DBB-2EE3F553392C}"/>
+              </a:ext>
+            </a:extLst>
+          </p:cNvPr>
+          <p:cNvCxnSpPr>
+            <a:cxnSpLocks/>
+            <a:stCxn id="146" idx="3"/>
+          </p:cNvCxnSpPr>
+          <p:nvPr/>
+        </p:nvCxnSpPr>
+        <p:spPr>
+          <a:xfrm flipH="1" flipV="1">
+            <a:off x="1214233" y="3597222"/>
+            <a:ext cx="544855" cy="1"/>
+          </a:xfrm>
+          <a:prstGeom prst="line">
+            <a:avLst/>
+          </a:prstGeom>
+          <a:ln w="28575"/>
+        </p:spPr>
+        <p:style>
+          <a:lnRef idx="1">
+            <a:schemeClr val="accent1"/>
+          </a:lnRef>
+          <a:fillRef idx="0">
+            <a:schemeClr val="accent1"/>
+          </a:fillRef>
+          <a:effectRef idx="0">
+            <a:schemeClr val="accent1"/>
+          </a:effectRef>
+          <a:fontRef idx="minor">
+            <a:schemeClr val="tx1"/>
+          </a:fontRef>
+        </p:style>
+      </p:cxnSp>
+      <p:cxnSp>
+        <p:nvCxnSpPr>
+          <p:cNvPr id="160" name="Đường nối Thẳng 159">
+            <a:extLst>
+              <a:ext uri="{FF2B5EF4-FFF2-40B4-BE49-F238E27FC236}">
+                <a16:creationId xmlns:a16="http://schemas.microsoft.com/office/drawing/2014/main" id="{34AE6E0C-B3C1-4200-AF07-EB98081A4D46}"/>
+              </a:ext>
+            </a:extLst>
+          </p:cNvPr>
+          <p:cNvCxnSpPr>
+            <a:cxnSpLocks/>
+            <a:stCxn id="145" idx="3"/>
+          </p:cNvCxnSpPr>
+          <p:nvPr/>
+        </p:nvCxnSpPr>
+        <p:spPr>
+          <a:xfrm flipH="1">
+            <a:off x="1219200" y="3291839"/>
+            <a:ext cx="539888" cy="0"/>
+          </a:xfrm>
+          <a:prstGeom prst="line">
+            <a:avLst/>
+          </a:prstGeom>
+          <a:ln w="28575"/>
+        </p:spPr>
+        <p:style>
+          <a:lnRef idx="1">
+            <a:schemeClr val="accent1"/>
+          </a:lnRef>
+          <a:fillRef idx="0">
+            <a:schemeClr val="accent1"/>
+          </a:fillRef>
+          <a:effectRef idx="0">
+            <a:schemeClr val="accent1"/>
+          </a:effectRef>
+          <a:fontRef idx="minor">
+            <a:schemeClr val="tx1"/>
+          </a:fontRef>
+        </p:style>
+      </p:cxnSp>
+      <p:sp>
+        <p:nvSpPr>
+          <p:cNvPr id="175" name="Hình chữ nhật: Góc Tròn 174">
+            <a:extLst>
+              <a:ext uri="{FF2B5EF4-FFF2-40B4-BE49-F238E27FC236}">
+                <a16:creationId xmlns:a16="http://schemas.microsoft.com/office/drawing/2014/main" id="{73869527-4D7C-4C95-8701-6AFE3C0F82DD}"/>
+              </a:ext>
+            </a:extLst>
+          </p:cNvPr>
+          <p:cNvSpPr/>
+          <p:nvPr/>
+        </p:nvSpPr>
+        <p:spPr>
+          <a:xfrm rot="16200000">
+            <a:off x="-1883257" y="3494376"/>
+            <a:ext cx="4800602" cy="402646"/>
+          </a:xfrm>
+          <a:prstGeom prst="roundRect">
+            <a:avLst/>
+          </a:prstGeom>
+          <a:solidFill>
+            <a:schemeClr val="accent4">
+              <a:lumMod val="40000"/>
+              <a:lumOff val="60000"/>
+            </a:schemeClr>
+          </a:solidFill>
+          <a:ln>
+            <a:solidFill>
+              <a:srgbClr val="7030A0"/>
+            </a:solidFill>
+          </a:ln>
+        </p:spPr>
+        <p:style>
+          <a:lnRef idx="2">
+            <a:schemeClr val="accent1">
+              <a:shade val="50000"/>
+            </a:schemeClr>
+          </a:lnRef>
+          <a:fillRef idx="1">
+            <a:schemeClr val="accent1"/>
+          </a:fillRef>
+          <a:effectRef idx="0">
+            <a:schemeClr val="accent1"/>
+          </a:effectRef>
+          <a:fontRef idx="minor">
+            <a:schemeClr val="lt1"/>
+          </a:fontRef>
+        </p:style>
+        <p:txBody>
+          <a:bodyPr rtlCol="0" anchor="ctr"/>
+          <a:lstStyle/>
+          <a:p>
+            <a:pPr algn="ctr"/>
+            <a:r>
+              <a:rPr lang="en-US" dirty="0">
+                <a:solidFill>
+                  <a:srgbClr val="7030A0"/>
+                </a:solidFill>
+              </a:rPr>
+              <a:t>Model</a:t>
+            </a:r>
+          </a:p>
+        </p:txBody>
+      </p:sp>
+      <p:cxnSp>
+        <p:nvCxnSpPr>
+          <p:cNvPr id="176" name="Đường kết nối Mũi tên Thẳng 175">
+            <a:extLst>
+              <a:ext uri="{FF2B5EF4-FFF2-40B4-BE49-F238E27FC236}">
+                <a16:creationId xmlns:a16="http://schemas.microsoft.com/office/drawing/2014/main" id="{0CA5A4AD-7DB0-4FE2-A0B1-C348ACD39196}"/>
+              </a:ext>
+            </a:extLst>
+          </p:cNvPr>
+          <p:cNvCxnSpPr>
+            <a:cxnSpLocks/>
+          </p:cNvCxnSpPr>
+          <p:nvPr/>
+        </p:nvCxnSpPr>
+        <p:spPr>
+          <a:xfrm flipH="1">
+            <a:off x="718368" y="2617233"/>
+            <a:ext cx="1040720" cy="0"/>
+          </a:xfrm>
+          <a:prstGeom prst="straightConnector1">
+            <a:avLst/>
+          </a:prstGeom>
+          <a:ln w="19050" cap="flat" cmpd="sng" algn="ctr">
+            <a:solidFill>
+              <a:schemeClr val="accent5"/>
+            </a:solidFill>
+            <a:prstDash val="solid"/>
+            <a:round/>
+            <a:headEnd type="none" w="med" len="med"/>
+            <a:tailEnd type="arrow" w="lg" len="lg"/>
+          </a:ln>
+        </p:spPr>
+        <p:style>
+          <a:lnRef idx="0">
+            <a:scrgbClr r="0" g="0" b="0"/>
+          </a:lnRef>
+          <a:fillRef idx="0">
+            <a:scrgbClr r="0" g="0" b="0"/>
+          </a:fillRef>
+          <a:effectRef idx="0">
+            <a:scrgbClr r="0" g="0" b="0"/>
+          </a:effectRef>
+          <a:fontRef idx="minor">
+            <a:schemeClr val="tx1"/>
+          </a:fontRef>
+        </p:style>
+      </p:cxnSp>
+      <p:cxnSp>
+        <p:nvCxnSpPr>
+          <p:cNvPr id="182" name="Đường kết nối: Mũi tên Gấp khúc 181">
+            <a:extLst>
+              <a:ext uri="{FF2B5EF4-FFF2-40B4-BE49-F238E27FC236}">
+                <a16:creationId xmlns:a16="http://schemas.microsoft.com/office/drawing/2014/main" id="{0CF24237-7166-4C92-93D1-2716BEA89161}"/>
+              </a:ext>
+            </a:extLst>
+          </p:cNvPr>
+          <p:cNvCxnSpPr>
+            <a:cxnSpLocks/>
+            <a:endCxn id="23" idx="3"/>
+          </p:cNvCxnSpPr>
+          <p:nvPr/>
+        </p:nvCxnSpPr>
+        <p:spPr>
+          <a:xfrm>
+            <a:off x="3451033" y="2939398"/>
+            <a:ext cx="2288796" cy="657452"/>
+          </a:xfrm>
+          <a:prstGeom prst="bentConnector3">
+            <a:avLst>
+              <a:gd name="adj1" fmla="val 10049"/>
+            </a:avLst>
+          </a:prstGeom>
+          <a:ln w="19050" cap="flat" cmpd="sng" algn="ctr">
+            <a:solidFill>
+              <a:schemeClr val="accent5"/>
+            </a:solidFill>
+            <a:prstDash val="sysDot"/>
+            <a:round/>
+            <a:headEnd type="none" w="med" len="med"/>
+            <a:tailEnd type="arrow" w="lg" len="lg"/>
+          </a:ln>
+        </p:spPr>
+        <p:style>
+          <a:lnRef idx="0">
+            <a:scrgbClr r="0" g="0" b="0"/>
+          </a:lnRef>
+          <a:fillRef idx="0">
+            <a:scrgbClr r="0" g="0" b="0"/>
+          </a:fillRef>
+          <a:effectRef idx="0">
+            <a:scrgbClr r="0" g="0" b="0"/>
+          </a:effectRef>
+          <a:fontRef idx="minor">
+            <a:schemeClr val="tx1"/>
+          </a:fontRef>
+        </p:style>
+      </p:cxnSp>
+      <p:cxnSp>
+        <p:nvCxnSpPr>
+          <p:cNvPr id="196" name="Đường kết nối Mũi tên Thẳng 195">
+            <a:extLst>
+              <a:ext uri="{FF2B5EF4-FFF2-40B4-BE49-F238E27FC236}">
+                <a16:creationId xmlns:a16="http://schemas.microsoft.com/office/drawing/2014/main" id="{B71C7085-B68D-428E-8101-44CAC91FBF44}"/>
+              </a:ext>
+            </a:extLst>
+          </p:cNvPr>
+          <p:cNvCxnSpPr>
+            <a:cxnSpLocks/>
+            <a:stCxn id="35" idx="1"/>
+            <a:endCxn id="22" idx="3"/>
+          </p:cNvCxnSpPr>
+          <p:nvPr/>
+        </p:nvCxnSpPr>
+        <p:spPr>
+          <a:xfrm flipH="1" flipV="1">
+            <a:off x="3435495" y="2772302"/>
+            <a:ext cx="1006132" cy="640"/>
+          </a:xfrm>
+          <a:prstGeom prst="straightConnector1">
+            <a:avLst/>
+          </a:prstGeom>
+          <a:ln w="19050" cap="flat" cmpd="sng" algn="ctr">
+            <a:solidFill>
+              <a:srgbClr val="0070C0"/>
+            </a:solidFill>
+            <a:prstDash val="sysDot"/>
+            <a:round/>
+            <a:headEnd type="none" w="med" len="med"/>
+            <a:tailEnd type="arrow" w="lg" len="lg"/>
+          </a:ln>
+        </p:spPr>
+        <p:style>
+          <a:lnRef idx="0">
+            <a:scrgbClr r="0" g="0" b="0"/>
+          </a:lnRef>
+          <a:fillRef idx="0">
+            <a:scrgbClr r="0" g="0" b="0"/>
+          </a:fillRef>
+          <a:effectRef idx="0">
+            <a:scrgbClr r="0" g="0" b="0"/>
+          </a:effectRef>
+          <a:fontRef idx="minor">
+            <a:schemeClr val="tx1"/>
+          </a:fontRef>
+        </p:style>
+      </p:cxnSp>
+      <p:cxnSp>
+        <p:nvCxnSpPr>
+          <p:cNvPr id="199" name="Đường kết nối: Mũi tên Gấp khúc 198">
+            <a:extLst>
+              <a:ext uri="{FF2B5EF4-FFF2-40B4-BE49-F238E27FC236}">
+                <a16:creationId xmlns:a16="http://schemas.microsoft.com/office/drawing/2014/main" id="{AB828EAC-CFCB-4228-8569-E0B4FE63E025}"/>
+              </a:ext>
+            </a:extLst>
+          </p:cNvPr>
+          <p:cNvCxnSpPr>
+            <a:cxnSpLocks/>
+            <a:stCxn id="21" idx="1"/>
+            <a:endCxn id="22" idx="0"/>
+          </p:cNvCxnSpPr>
+          <p:nvPr/>
+        </p:nvCxnSpPr>
+        <p:spPr>
+          <a:xfrm rot="10800000" flipV="1">
+            <a:off x="2597293" y="1721066"/>
+            <a:ext cx="1844335" cy="797095"/>
+          </a:xfrm>
+          <a:prstGeom prst="bentConnector2">
+            <a:avLst/>
+          </a:prstGeom>
+          <a:ln w="19050" cap="flat" cmpd="sng" algn="ctr">
+            <a:solidFill>
+              <a:srgbClr val="0070C0"/>
+            </a:solidFill>
+            <a:prstDash val="sysDot"/>
+            <a:round/>
+            <a:headEnd type="none" w="med" len="med"/>
+            <a:tailEnd type="arrow" w="lg" len="lg"/>
+          </a:ln>
+        </p:spPr>
+        <p:style>
+          <a:lnRef idx="0">
+            <a:scrgbClr r="0" g="0" b="0"/>
+          </a:lnRef>
+          <a:fillRef idx="0">
+            <a:scrgbClr r="0" g="0" b="0"/>
+          </a:fillRef>
+          <a:effectRef idx="0">
+            <a:scrgbClr r="0" g="0" b="0"/>
+          </a:effectRef>
+          <a:fontRef idx="minor">
+            <a:schemeClr val="tx1"/>
+          </a:fontRef>
+        </p:style>
+      </p:cxnSp>
+      <p:cxnSp>
+        <p:nvCxnSpPr>
+          <p:cNvPr id="207" name="Đường kết nối Mũi tên Thẳng 206">
+            <a:extLst>
+              <a:ext uri="{FF2B5EF4-FFF2-40B4-BE49-F238E27FC236}">
+                <a16:creationId xmlns:a16="http://schemas.microsoft.com/office/drawing/2014/main" id="{77EAF439-CE26-49F0-AD08-8BF36ECDCC35}"/>
+              </a:ext>
+            </a:extLst>
+          </p:cNvPr>
+          <p:cNvCxnSpPr>
+            <a:cxnSpLocks/>
+            <a:stCxn id="21" idx="2"/>
+            <a:endCxn id="35" idx="0"/>
+          </p:cNvCxnSpPr>
+          <p:nvPr/>
+        </p:nvCxnSpPr>
+        <p:spPr>
+          <a:xfrm>
+            <a:off x="5279830" y="1993599"/>
+            <a:ext cx="0" cy="506810"/>
+          </a:xfrm>
+          <a:prstGeom prst="straightConnector1">
+            <a:avLst/>
+          </a:prstGeom>
+          <a:ln w="19050" cap="flat" cmpd="sng" algn="ctr">
+            <a:solidFill>
+              <a:srgbClr val="0070C0"/>
+            </a:solidFill>
+            <a:prstDash val="sysDot"/>
+            <a:round/>
+            <a:headEnd type="none" w="med" len="med"/>
+            <a:tailEnd type="arrow" w="lg" len="lg"/>
+          </a:ln>
+        </p:spPr>
+        <p:style>
+          <a:lnRef idx="0">
+            <a:scrgbClr r="0" g="0" b="0"/>
+          </a:lnRef>
+          <a:fillRef idx="0">
+            <a:scrgbClr r="0" g="0" b="0"/>
+          </a:fillRef>
+          <a:effectRef idx="0">
+            <a:scrgbClr r="0" g="0" b="0"/>
+          </a:effectRef>
+          <a:fontRef idx="minor">
+            <a:schemeClr val="tx1"/>
+          </a:fontRef>
+        </p:style>
+      </p:cxnSp>
+      <p:cxnSp>
+        <p:nvCxnSpPr>
+          <p:cNvPr id="218" name="Đường kết nối Mũi tên Thẳng 217">
+            <a:extLst>
+              <a:ext uri="{FF2B5EF4-FFF2-40B4-BE49-F238E27FC236}">
+                <a16:creationId xmlns:a16="http://schemas.microsoft.com/office/drawing/2014/main" id="{AF91938B-FE29-4489-8401-DF313ECB629F}"/>
+              </a:ext>
+            </a:extLst>
+          </p:cNvPr>
+          <p:cNvCxnSpPr>
+            <a:cxnSpLocks/>
+          </p:cNvCxnSpPr>
+          <p:nvPr/>
+        </p:nvCxnSpPr>
+        <p:spPr>
+          <a:xfrm flipH="1">
+            <a:off x="718371" y="2223417"/>
+            <a:ext cx="5600660" cy="23594"/>
+          </a:xfrm>
+          <a:prstGeom prst="straightConnector1">
+            <a:avLst/>
+          </a:prstGeom>
+          <a:ln w="19050" cap="flat" cmpd="sng" algn="ctr">
+            <a:solidFill>
+              <a:schemeClr val="tx2">
+                <a:lumMod val="60000"/>
+                <a:lumOff val="40000"/>
+              </a:schemeClr>
+            </a:solidFill>
+            <a:prstDash val="solid"/>
+            <a:round/>
+            <a:headEnd type="none" w="med" len="med"/>
+            <a:tailEnd type="arrow" w="lg" len="lg"/>
+          </a:ln>
+        </p:spPr>
+        <p:style>
+          <a:lnRef idx="0">
+            <a:scrgbClr r="0" g="0" b="0"/>
+          </a:lnRef>
+          <a:fillRef idx="0">
+            <a:scrgbClr r="0" g="0" b="0"/>
+          </a:fillRef>
+          <a:effectRef idx="0">
+            <a:scrgbClr r="0" g="0" b="0"/>
+          </a:effectRef>
+          <a:fontRef idx="minor">
+            <a:schemeClr val="tx1"/>
+          </a:fontRef>
+        </p:style>
+      </p:cxnSp>
+      <p:cxnSp>
+        <p:nvCxnSpPr>
+          <p:cNvPr id="223" name="Đường nối Thẳng 222">
+            <a:extLst>
+              <a:ext uri="{FF2B5EF4-FFF2-40B4-BE49-F238E27FC236}">
+                <a16:creationId xmlns:a16="http://schemas.microsoft.com/office/drawing/2014/main" id="{CF82F2C5-D1BB-4F26-A6B4-F9B64E037D15}"/>
+              </a:ext>
+            </a:extLst>
+          </p:cNvPr>
+          <p:cNvCxnSpPr>
+            <a:cxnSpLocks/>
+          </p:cNvCxnSpPr>
+          <p:nvPr/>
+        </p:nvCxnSpPr>
+        <p:spPr>
+          <a:xfrm flipH="1">
+            <a:off x="6319031" y="2219603"/>
+            <a:ext cx="1" cy="1122783"/>
+          </a:xfrm>
+          <a:prstGeom prst="line">
+            <a:avLst/>
+          </a:prstGeom>
+          <a:ln w="19050"/>
+        </p:spPr>
+        <p:style>
+          <a:lnRef idx="1">
+            <a:schemeClr val="accent1"/>
+          </a:lnRef>
+          <a:fillRef idx="0">
+            <a:schemeClr val="accent1"/>
+          </a:fillRef>
+          <a:effectRef idx="0">
+            <a:schemeClr val="accent1"/>
+          </a:effectRef>
+          <a:fontRef idx="minor">
+            <a:schemeClr val="tx1"/>
+          </a:fontRef>
+        </p:style>
+      </p:cxnSp>
+      <p:sp>
+        <p:nvSpPr>
+          <p:cNvPr id="227" name="Hình chữ nhật: Góc Tròn 226">
+            <a:extLst>
+              <a:ext uri="{FF2B5EF4-FFF2-40B4-BE49-F238E27FC236}">
+                <a16:creationId xmlns:a16="http://schemas.microsoft.com/office/drawing/2014/main" id="{DD394EC8-2CD0-4CA6-8427-0EE03C8F1498}"/>
+              </a:ext>
+            </a:extLst>
+          </p:cNvPr>
+          <p:cNvSpPr/>
+          <p:nvPr/>
+        </p:nvSpPr>
+        <p:spPr>
+          <a:xfrm rot="5400000">
+            <a:off x="6219824" y="3494374"/>
+            <a:ext cx="4800602" cy="402646"/>
+          </a:xfrm>
+          <a:prstGeom prst="roundRect">
+            <a:avLst/>
+          </a:prstGeom>
+          <a:solidFill>
+            <a:schemeClr val="accent2">
+              <a:lumMod val="40000"/>
+              <a:lumOff val="60000"/>
+            </a:schemeClr>
+          </a:solidFill>
+          <a:ln>
+            <a:solidFill>
+              <a:srgbClr val="FF0000"/>
+            </a:solidFill>
+          </a:ln>
+        </p:spPr>
+        <p:style>
+          <a:lnRef idx="2">
+            <a:schemeClr val="accent1">
+              <a:shade val="50000"/>
+            </a:schemeClr>
+          </a:lnRef>
+          <a:fillRef idx="1">
+            <a:schemeClr val="accent1"/>
+          </a:fillRef>
+          <a:effectRef idx="0">
+            <a:schemeClr val="accent1"/>
+          </a:effectRef>
+          <a:fontRef idx="minor">
+            <a:schemeClr val="lt1"/>
+          </a:fontRef>
+        </p:style>
+        <p:txBody>
+          <a:bodyPr rtlCol="0" anchor="ctr"/>
+          <a:lstStyle/>
+          <a:p>
+            <a:pPr algn="ctr"/>
+            <a:r>
+              <a:rPr lang="en-US" dirty="0">
+                <a:solidFill>
+                  <a:srgbClr val="FF0000"/>
+                </a:solidFill>
+              </a:rPr>
+              <a:t>Main / UI</a:t>
+            </a:r>
+          </a:p>
+        </p:txBody>
+      </p:sp>
+      <p:sp>
+        <p:nvSpPr>
+          <p:cNvPr id="228" name="Hình chữ nhật: Góc Tròn 227">
+            <a:extLst>
+              <a:ext uri="{FF2B5EF4-FFF2-40B4-BE49-F238E27FC236}">
+                <a16:creationId xmlns:a16="http://schemas.microsoft.com/office/drawing/2014/main" id="{9B86A0EE-950D-49EC-AA9B-BAAEF0C93105}"/>
+              </a:ext>
+            </a:extLst>
+          </p:cNvPr>
+          <p:cNvSpPr/>
+          <p:nvPr/>
+        </p:nvSpPr>
+        <p:spPr>
+          <a:xfrm>
+            <a:off x="942973" y="671532"/>
+            <a:ext cx="7258049" cy="408657"/>
+          </a:xfrm>
+          <a:prstGeom prst="roundRect">
+            <a:avLst/>
+          </a:prstGeom>
+          <a:solidFill>
+            <a:schemeClr val="accent6">
+              <a:lumMod val="40000"/>
+              <a:lumOff val="60000"/>
+            </a:schemeClr>
+          </a:solidFill>
+          <a:ln>
+            <a:solidFill>
+              <a:schemeClr val="accent6"/>
+            </a:solidFill>
+          </a:ln>
+        </p:spPr>
+        <p:style>
+          <a:lnRef idx="2">
+            <a:schemeClr val="accent1">
+              <a:shade val="50000"/>
+            </a:schemeClr>
+          </a:lnRef>
+          <a:fillRef idx="1">
+            <a:schemeClr val="accent1"/>
+          </a:fillRef>
+          <a:effectRef idx="0">
+            <a:schemeClr val="accent1"/>
+          </a:effectRef>
+          <a:fontRef idx="minor">
+            <a:schemeClr val="lt1"/>
+          </a:fontRef>
+        </p:style>
+        <p:txBody>
+          <a:bodyPr rtlCol="0" anchor="ctr"/>
+          <a:lstStyle/>
+          <a:p>
+            <a:pPr algn="ctr"/>
+            <a:r>
+              <a:rPr lang="en-US" dirty="0">
+                <a:solidFill>
+                  <a:schemeClr val="accent6">
+                    <a:lumMod val="75000"/>
+                  </a:schemeClr>
+                </a:solidFill>
+              </a:rPr>
+              <a:t>Storage</a:t>
+            </a:r>
+          </a:p>
+        </p:txBody>
+      </p:sp>
+      <p:cxnSp>
+        <p:nvCxnSpPr>
+          <p:cNvPr id="229" name="Đường kết nối Mũi tên Thẳng 228">
+            <a:extLst>
+              <a:ext uri="{FF2B5EF4-FFF2-40B4-BE49-F238E27FC236}">
+                <a16:creationId xmlns:a16="http://schemas.microsoft.com/office/drawing/2014/main" id="{1909CDCC-034E-436B-B369-0B1108FD417F}"/>
+              </a:ext>
+            </a:extLst>
+          </p:cNvPr>
+          <p:cNvCxnSpPr>
+            <a:cxnSpLocks/>
+            <a:endCxn id="21" idx="3"/>
+          </p:cNvCxnSpPr>
+          <p:nvPr/>
+        </p:nvCxnSpPr>
+        <p:spPr>
+          <a:xfrm flipH="1" flipV="1">
+            <a:off x="6118032" y="1721067"/>
+            <a:ext cx="2300770" cy="27290"/>
+          </a:xfrm>
+          <a:prstGeom prst="straightConnector1">
+            <a:avLst/>
+          </a:prstGeom>
+          <a:ln w="19050">
+            <a:solidFill>
+              <a:srgbClr val="FF0000"/>
+            </a:solidFill>
+            <a:headEnd type="none" w="med" len="med"/>
+            <a:tailEnd type="arrow" w="lg" len="lg"/>
+          </a:ln>
+        </p:spPr>
+        <p:style>
+          <a:lnRef idx="1">
+            <a:schemeClr val="accent2"/>
+          </a:lnRef>
+          <a:fillRef idx="0">
+            <a:schemeClr val="accent2"/>
+          </a:fillRef>
+          <a:effectRef idx="0">
+            <a:schemeClr val="accent2"/>
+          </a:effectRef>
+          <a:fontRef idx="minor">
+            <a:schemeClr val="tx1"/>
+          </a:fontRef>
+        </p:style>
+      </p:cxnSp>
+      <p:cxnSp>
+        <p:nvCxnSpPr>
+          <p:cNvPr id="232" name="Đường kết nối Mũi tên Thẳng 231">
+            <a:extLst>
+              <a:ext uri="{FF2B5EF4-FFF2-40B4-BE49-F238E27FC236}">
+                <a16:creationId xmlns:a16="http://schemas.microsoft.com/office/drawing/2014/main" id="{F9F7AD49-AC1E-4793-8C55-493C09EC2018}"/>
+              </a:ext>
+            </a:extLst>
+          </p:cNvPr>
+          <p:cNvCxnSpPr>
+            <a:cxnSpLocks/>
+          </p:cNvCxnSpPr>
+          <p:nvPr/>
+        </p:nvCxnSpPr>
+        <p:spPr>
+          <a:xfrm flipH="1">
+            <a:off x="7415278" y="3471412"/>
+            <a:ext cx="1003524" cy="0"/>
+          </a:xfrm>
+          <a:prstGeom prst="straightConnector1">
+            <a:avLst/>
+          </a:prstGeom>
+          <a:ln w="19050">
+            <a:solidFill>
+              <a:srgbClr val="FF0000"/>
+            </a:solidFill>
+            <a:prstDash val="sysDot"/>
+            <a:headEnd type="none" w="med" len="med"/>
+            <a:tailEnd type="arrow" w="lg" len="lg"/>
+          </a:ln>
+        </p:spPr>
+        <p:style>
+          <a:lnRef idx="1">
+            <a:schemeClr val="accent2"/>
+          </a:lnRef>
+          <a:fillRef idx="0">
+            <a:schemeClr val="accent2"/>
+          </a:fillRef>
+          <a:effectRef idx="0">
+            <a:schemeClr val="accent2"/>
+          </a:effectRef>
+          <a:fontRef idx="minor">
+            <a:schemeClr val="tx1"/>
+          </a:fontRef>
+        </p:style>
+      </p:cxnSp>
+      <p:cxnSp>
+        <p:nvCxnSpPr>
+          <p:cNvPr id="260" name="Đường kết nối Mũi tên Thẳng 259">
+            <a:extLst>
+              <a:ext uri="{FF2B5EF4-FFF2-40B4-BE49-F238E27FC236}">
+                <a16:creationId xmlns:a16="http://schemas.microsoft.com/office/drawing/2014/main" id="{A9AF2BCC-3B78-496F-A97E-89C6FB0659F9}"/>
+              </a:ext>
+            </a:extLst>
+          </p:cNvPr>
+          <p:cNvCxnSpPr>
+            <a:cxnSpLocks/>
+          </p:cNvCxnSpPr>
+          <p:nvPr/>
+        </p:nvCxnSpPr>
+        <p:spPr>
+          <a:xfrm flipH="1">
+            <a:off x="725198" y="1903923"/>
+            <a:ext cx="3716428" cy="18768"/>
+          </a:xfrm>
+          <a:prstGeom prst="straightConnector1">
+            <a:avLst/>
+          </a:prstGeom>
+          <a:ln w="19050" cap="flat" cmpd="sng" algn="ctr">
+            <a:solidFill>
+              <a:schemeClr val="tx2">
+                <a:lumMod val="60000"/>
+                <a:lumOff val="40000"/>
+              </a:schemeClr>
+            </a:solidFill>
+            <a:prstDash val="solid"/>
+            <a:round/>
+            <a:headEnd type="none" w="med" len="med"/>
+            <a:tailEnd type="arrow" w="lg" len="lg"/>
+          </a:ln>
+        </p:spPr>
+        <p:style>
+          <a:lnRef idx="0">
+            <a:scrgbClr r="0" g="0" b="0"/>
+          </a:lnRef>
+          <a:fillRef idx="0">
+            <a:scrgbClr r="0" g="0" b="0"/>
+          </a:fillRef>
+          <a:effectRef idx="0">
+            <a:scrgbClr r="0" g="0" b="0"/>
+          </a:effectRef>
+          <a:fontRef idx="minor">
+            <a:schemeClr val="tx1"/>
+          </a:fontRef>
+        </p:style>
+      </p:cxnSp>
+      <p:cxnSp>
+        <p:nvCxnSpPr>
+          <p:cNvPr id="268" name="Đường kết nối Mũi tên Thẳng 267">
+            <a:extLst>
+              <a:ext uri="{FF2B5EF4-FFF2-40B4-BE49-F238E27FC236}">
+                <a16:creationId xmlns:a16="http://schemas.microsoft.com/office/drawing/2014/main" id="{8F0FC727-8DD2-4D87-8489-B360D87E2B82}"/>
+              </a:ext>
+            </a:extLst>
+          </p:cNvPr>
+          <p:cNvCxnSpPr>
+            <a:cxnSpLocks/>
+            <a:stCxn id="21" idx="0"/>
+          </p:cNvCxnSpPr>
+          <p:nvPr/>
+        </p:nvCxnSpPr>
+        <p:spPr>
+          <a:xfrm flipV="1">
+            <a:off x="5279830" y="1080189"/>
+            <a:ext cx="0" cy="368345"/>
+          </a:xfrm>
+          <a:prstGeom prst="straightConnector1">
+            <a:avLst/>
+          </a:prstGeom>
+          <a:ln w="19050" cap="flat" cmpd="sng" algn="ctr">
+            <a:solidFill>
+              <a:schemeClr val="tx2">
+                <a:lumMod val="60000"/>
+                <a:lumOff val="40000"/>
+              </a:schemeClr>
+            </a:solidFill>
+            <a:prstDash val="solid"/>
+            <a:round/>
+            <a:headEnd type="none" w="med" len="med"/>
+            <a:tailEnd type="arrow" w="lg" len="lg"/>
+          </a:ln>
+        </p:spPr>
+        <p:style>
+          <a:lnRef idx="0">
+            <a:scrgbClr r="0" g="0" b="0"/>
+          </a:lnRef>
+          <a:fillRef idx="0">
+            <a:scrgbClr r="0" g="0" b="0"/>
+          </a:fillRef>
+          <a:effectRef idx="0">
+            <a:scrgbClr r="0" g="0" b="0"/>
+          </a:effectRef>
+          <a:fontRef idx="minor">
+            <a:schemeClr val="tx1"/>
+          </a:fontRef>
+        </p:style>
+      </p:cxnSp>
+      <p:sp>
+        <p:nvSpPr>
+          <p:cNvPr id="271" name="Hình chữ nhật: Góc Gập 270">
+            <a:extLst>
+              <a:ext uri="{FF2B5EF4-FFF2-40B4-BE49-F238E27FC236}">
+                <a16:creationId xmlns:a16="http://schemas.microsoft.com/office/drawing/2014/main" id="{6E2F354C-4493-49B1-8A8D-374454172379}"/>
+              </a:ext>
+            </a:extLst>
+          </p:cNvPr>
+          <p:cNvSpPr/>
+          <p:nvPr/>
+        </p:nvSpPr>
+        <p:spPr>
+          <a:xfrm>
+            <a:off x="6529368" y="2273854"/>
+            <a:ext cx="1479109" cy="726312"/>
+          </a:xfrm>
+          <a:prstGeom prst="foldedCorner">
+            <a:avLst>
+              <a:gd name="adj" fmla="val 23988"/>
+            </a:avLst>
+          </a:prstGeom>
+          <a:solidFill>
+            <a:schemeClr val="accent5">
+              <a:lumMod val="40000"/>
+              <a:lumOff val="60000"/>
+            </a:schemeClr>
+          </a:solidFill>
+        </p:spPr>
+        <p:style>
+          <a:lnRef idx="2">
+            <a:schemeClr val="accent1">
+              <a:shade val="50000"/>
+            </a:schemeClr>
+          </a:lnRef>
+          <a:fillRef idx="1">
+            <a:schemeClr val="accent1"/>
+          </a:fillRef>
+          <a:effectRef idx="0">
+            <a:schemeClr val="accent1"/>
+          </a:effectRef>
+          <a:fontRef idx="minor">
+            <a:schemeClr val="lt1"/>
+          </a:fontRef>
+        </p:style>
+        <p:txBody>
+          <a:bodyPr rtlCol="0" anchor="ctr"/>
+          <a:lstStyle/>
+          <a:p>
+            <a:pPr algn="ctr"/>
+            <a:r>
+              <a:rPr lang="en-US" sz="1200" dirty="0" err="1">
+                <a:solidFill>
+                  <a:schemeClr val="tx1"/>
+                </a:solidFill>
+              </a:rPr>
+              <a:t>XYZCommand</a:t>
+            </a:r>
+            <a:r>
+              <a:rPr lang="en-US" sz="1200" dirty="0">
+                <a:solidFill>
+                  <a:schemeClr val="tx1"/>
+                </a:solidFill>
+              </a:rPr>
+              <a:t> = </a:t>
+            </a:r>
+            <a:r>
+              <a:rPr lang="en-US" sz="1200" dirty="0" err="1">
+                <a:solidFill>
+                  <a:schemeClr val="tx1"/>
+                </a:solidFill>
+              </a:rPr>
+              <a:t>AddCommand</a:t>
+            </a:r>
+            <a:r>
+              <a:rPr lang="en-US" sz="1200" dirty="0">
+                <a:solidFill>
+                  <a:schemeClr val="tx1"/>
+                </a:solidFill>
+              </a:rPr>
+              <a:t>, </a:t>
+            </a:r>
+            <a:r>
+              <a:rPr lang="en-US" sz="1200" dirty="0" err="1">
+                <a:solidFill>
+                  <a:schemeClr val="tx1"/>
+                </a:solidFill>
+              </a:rPr>
+              <a:t>ListCommand</a:t>
+            </a:r>
+            <a:r>
+              <a:rPr lang="en-US" sz="1200" dirty="0">
+                <a:solidFill>
+                  <a:schemeClr val="tx1"/>
+                </a:solidFill>
+              </a:rPr>
+              <a:t>, etc.</a:t>
+            </a:r>
+          </a:p>
+        </p:txBody>
+      </p:sp>
+      <p:sp>
+        <p:nvSpPr>
+          <p:cNvPr id="224" name="Hộp Văn bản 223">
+            <a:extLst>
+              <a:ext uri="{FF2B5EF4-FFF2-40B4-BE49-F238E27FC236}">
+                <a16:creationId xmlns:a16="http://schemas.microsoft.com/office/drawing/2014/main" id="{54C5C4B7-214A-4974-8470-25FBFA373410}"/>
+              </a:ext>
+            </a:extLst>
+          </p:cNvPr>
+          <p:cNvSpPr txBox="1"/>
+          <p:nvPr/>
+        </p:nvSpPr>
+        <p:spPr>
+          <a:xfrm>
+            <a:off x="3526896" y="2530957"/>
+            <a:ext cx="914400" cy="276999"/>
+          </a:xfrm>
+          <a:prstGeom prst="rect">
+            <a:avLst/>
+          </a:prstGeom>
+          <a:noFill/>
+        </p:spPr>
+        <p:txBody>
+          <a:bodyPr wrap="square" rtlCol="0">
+            <a:spAutoFit/>
+          </a:bodyPr>
+          <a:lstStyle/>
+          <a:p>
+            <a:pPr algn="ctr"/>
+            <a:r>
+              <a:rPr lang="en-US" sz="1200" dirty="0">
+                <a:solidFill>
+                  <a:srgbClr val="0070C0"/>
+                </a:solidFill>
+              </a:rPr>
+              <a:t>&lt; creates</a:t>
+            </a:r>
+          </a:p>
+        </p:txBody>
+      </p:sp>
+      <p:sp>
+        <p:nvSpPr>
+          <p:cNvPr id="83" name="Hộp Văn bản 82">
+            <a:extLst>
+              <a:ext uri="{FF2B5EF4-FFF2-40B4-BE49-F238E27FC236}">
+                <a16:creationId xmlns:a16="http://schemas.microsoft.com/office/drawing/2014/main" id="{D9803EC6-8148-4AAB-99CA-6B9440D188D3}"/>
+              </a:ext>
+            </a:extLst>
+          </p:cNvPr>
+          <p:cNvSpPr txBox="1"/>
+          <p:nvPr/>
+        </p:nvSpPr>
+        <p:spPr>
+          <a:xfrm>
+            <a:off x="4111385" y="3332912"/>
+            <a:ext cx="914400" cy="276999"/>
+          </a:xfrm>
+          <a:prstGeom prst="rect">
+            <a:avLst/>
+          </a:prstGeom>
+          <a:noFill/>
+        </p:spPr>
+        <p:txBody>
+          <a:bodyPr wrap="square" rtlCol="0">
+            <a:spAutoFit/>
+          </a:bodyPr>
+          <a:lstStyle/>
+          <a:p>
+            <a:pPr algn="ctr"/>
+            <a:r>
+              <a:rPr lang="en-US" sz="1200" dirty="0">
+                <a:solidFill>
+                  <a:schemeClr val="accent5">
+                    <a:lumMod val="75000"/>
+                  </a:schemeClr>
+                </a:solidFill>
+              </a:rPr>
+              <a:t>produces &gt;</a:t>
+            </a:r>
+          </a:p>
+        </p:txBody>
+      </p:sp>
+      <p:sp>
+        <p:nvSpPr>
+          <p:cNvPr id="84" name="Hộp Văn bản 83">
+            <a:extLst>
+              <a:ext uri="{FF2B5EF4-FFF2-40B4-BE49-F238E27FC236}">
+                <a16:creationId xmlns:a16="http://schemas.microsoft.com/office/drawing/2014/main" id="{313DEA24-FE3C-4406-9A83-597CB1E1CD4B}"/>
+              </a:ext>
+            </a:extLst>
+          </p:cNvPr>
+          <p:cNvSpPr txBox="1"/>
+          <p:nvPr/>
+        </p:nvSpPr>
+        <p:spPr>
+          <a:xfrm>
+            <a:off x="3024161" y="1464315"/>
+            <a:ext cx="914400" cy="276999"/>
+          </a:xfrm>
+          <a:prstGeom prst="rect">
+            <a:avLst/>
+          </a:prstGeom>
+          <a:noFill/>
+        </p:spPr>
+        <p:txBody>
+          <a:bodyPr wrap="square" rtlCol="0">
+            <a:spAutoFit/>
+          </a:bodyPr>
+          <a:lstStyle/>
+          <a:p>
+            <a:pPr algn="ctr"/>
+            <a:r>
+              <a:rPr lang="en-US" sz="1200" dirty="0">
+                <a:solidFill>
+                  <a:srgbClr val="0070C0"/>
+                </a:solidFill>
+              </a:rPr>
+              <a:t>&lt; executes</a:t>
+            </a:r>
+          </a:p>
+        </p:txBody>
+      </p:sp>
+    </p:spTree>
+    <p:extLst>
+      <p:ext uri="{BB962C8B-B14F-4D97-AF65-F5344CB8AC3E}">
+        <p14:creationId xmlns:p14="http://schemas.microsoft.com/office/powerpoint/2010/main" val="2875802013"/>
       </p:ext>
     </p:extLst>
   </p:cSld>

</xml_diff>

<commit_message>
Update diagram with storage class diagram
</commit_message>
<xml_diff>
--- a/docs/Diagrams.pptx
+++ b/docs/Diagrams.pptx
@@ -5,15 +5,16 @@
     <p:sldMasterId id="2147483648" r:id="rId1"/>
   </p:sldMasterIdLst>
   <p:notesMasterIdLst>
-    <p:notesMasterId r:id="rId8"/>
+    <p:notesMasterId r:id="rId9"/>
   </p:notesMasterIdLst>
   <p:sldIdLst>
     <p:sldId id="256" r:id="rId2"/>
     <p:sldId id="257" r:id="rId3"/>
-    <p:sldId id="259" r:id="rId4"/>
-    <p:sldId id="258" r:id="rId5"/>
-    <p:sldId id="260" r:id="rId6"/>
-    <p:sldId id="261" r:id="rId7"/>
+    <p:sldId id="262" r:id="rId4"/>
+    <p:sldId id="259" r:id="rId5"/>
+    <p:sldId id="258" r:id="rId6"/>
+    <p:sldId id="260" r:id="rId7"/>
+    <p:sldId id="261" r:id="rId8"/>
   </p:sldIdLst>
   <p:sldSz cx="9144000" cy="6858000" type="screen4x3"/>
   <p:notesSz cx="6858000" cy="9144000"/>
@@ -213,7 +214,7 @@
           <a:p>
             <a:fld id="{F5CC4B3F-88C1-4FFA-B1B6-F41C21DC6924}" type="datetimeFigureOut">
               <a:rPr lang="en-US" smtClean="0"/>
-              <a:t>10/28/2018</a:t>
+              <a:t>11/1/18</a:t>
             </a:fld>
             <a:endParaRPr lang="en-US"/>
           </a:p>
@@ -743,7 +744,7 @@
           <a:p>
             <a:fld id="{78C97017-6FC3-485B-9764-EAC9E56C1D49}" type="datetimeFigureOut">
               <a:rPr lang="en-US" smtClean="0"/>
-              <a:t>10/28/2018</a:t>
+              <a:t>11/1/18</a:t>
             </a:fld>
             <a:endParaRPr lang="en-US"/>
           </a:p>
@@ -911,7 +912,7 @@
           <a:p>
             <a:fld id="{78C97017-6FC3-485B-9764-EAC9E56C1D49}" type="datetimeFigureOut">
               <a:rPr lang="en-US" smtClean="0"/>
-              <a:t>10/28/2018</a:t>
+              <a:t>11/1/18</a:t>
             </a:fld>
             <a:endParaRPr lang="en-US"/>
           </a:p>
@@ -1089,7 +1090,7 @@
           <a:p>
             <a:fld id="{78C97017-6FC3-485B-9764-EAC9E56C1D49}" type="datetimeFigureOut">
               <a:rPr lang="en-US" smtClean="0"/>
-              <a:t>10/28/2018</a:t>
+              <a:t>11/1/18</a:t>
             </a:fld>
             <a:endParaRPr lang="en-US"/>
           </a:p>
@@ -1257,7 +1258,7 @@
           <a:p>
             <a:fld id="{78C97017-6FC3-485B-9764-EAC9E56C1D49}" type="datetimeFigureOut">
               <a:rPr lang="en-US" smtClean="0"/>
-              <a:t>10/28/2018</a:t>
+              <a:t>11/1/18</a:t>
             </a:fld>
             <a:endParaRPr lang="en-US"/>
           </a:p>
@@ -1502,7 +1503,7 @@
           <a:p>
             <a:fld id="{78C97017-6FC3-485B-9764-EAC9E56C1D49}" type="datetimeFigureOut">
               <a:rPr lang="en-US" smtClean="0"/>
-              <a:t>10/28/2018</a:t>
+              <a:t>11/1/18</a:t>
             </a:fld>
             <a:endParaRPr lang="en-US"/>
           </a:p>
@@ -1787,7 +1788,7 @@
           <a:p>
             <a:fld id="{78C97017-6FC3-485B-9764-EAC9E56C1D49}" type="datetimeFigureOut">
               <a:rPr lang="en-US" smtClean="0"/>
-              <a:t>10/28/2018</a:t>
+              <a:t>11/1/18</a:t>
             </a:fld>
             <a:endParaRPr lang="en-US"/>
           </a:p>
@@ -2206,7 +2207,7 @@
           <a:p>
             <a:fld id="{78C97017-6FC3-485B-9764-EAC9E56C1D49}" type="datetimeFigureOut">
               <a:rPr lang="en-US" smtClean="0"/>
-              <a:t>10/28/2018</a:t>
+              <a:t>11/1/18</a:t>
             </a:fld>
             <a:endParaRPr lang="en-US"/>
           </a:p>
@@ -2323,7 +2324,7 @@
           <a:p>
             <a:fld id="{78C97017-6FC3-485B-9764-EAC9E56C1D49}" type="datetimeFigureOut">
               <a:rPr lang="en-US" smtClean="0"/>
-              <a:t>10/28/2018</a:t>
+              <a:t>11/1/18</a:t>
             </a:fld>
             <a:endParaRPr lang="en-US"/>
           </a:p>
@@ -2418,7 +2419,7 @@
           <a:p>
             <a:fld id="{78C97017-6FC3-485B-9764-EAC9E56C1D49}" type="datetimeFigureOut">
               <a:rPr lang="en-US" smtClean="0"/>
-              <a:t>10/28/2018</a:t>
+              <a:t>11/1/18</a:t>
             </a:fld>
             <a:endParaRPr lang="en-US"/>
           </a:p>
@@ -2693,7 +2694,7 @@
           <a:p>
             <a:fld id="{78C97017-6FC3-485B-9764-EAC9E56C1D49}" type="datetimeFigureOut">
               <a:rPr lang="en-US" smtClean="0"/>
-              <a:t>10/28/2018</a:t>
+              <a:t>11/1/18</a:t>
             </a:fld>
             <a:endParaRPr lang="en-US"/>
           </a:p>
@@ -2945,7 +2946,7 @@
           <a:p>
             <a:fld id="{78C97017-6FC3-485B-9764-EAC9E56C1D49}" type="datetimeFigureOut">
               <a:rPr lang="en-US" smtClean="0"/>
-              <a:t>10/28/2018</a:t>
+              <a:t>11/1/18</a:t>
             </a:fld>
             <a:endParaRPr lang="en-US"/>
           </a:p>
@@ -3156,7 +3157,7 @@
           <a:p>
             <a:fld id="{78C97017-6FC3-485B-9764-EAC9E56C1D49}" type="datetimeFigureOut">
               <a:rPr lang="en-US" smtClean="0"/>
-              <a:t>10/28/2018</a:t>
+              <a:t>11/1/18</a:t>
             </a:fld>
             <a:endParaRPr lang="en-US"/>
           </a:p>
@@ -6795,37 +6796,118 @@
       </p:grpSpPr>
       <p:sp>
         <p:nvSpPr>
-          <p:cNvPr id="2" name="Rectangle 18"/>
+          <p:cNvPr id="5" name="Rectangle 65">
+            <a:extLst>
+              <a:ext uri="{FF2B5EF4-FFF2-40B4-BE49-F238E27FC236}">
+                <a16:creationId xmlns:a16="http://schemas.microsoft.com/office/drawing/2014/main" id="{23AE98BB-9C81-A644-BDF9-51830346D417}"/>
+              </a:ext>
+            </a:extLst>
+          </p:cNvPr>
           <p:cNvSpPr/>
           <p:nvPr/>
         </p:nvSpPr>
         <p:spPr>
           <a:xfrm>
-            <a:off x="6637708" y="4352685"/>
-            <a:ext cx="929296" cy="346760"/>
+            <a:off x="914400" y="2825961"/>
+            <a:ext cx="5791200" cy="2965239"/>
+          </a:xfrm>
+          <a:prstGeom prst="roundRect">
+            <a:avLst>
+              <a:gd name="adj" fmla="val 3484"/>
+            </a:avLst>
+          </a:prstGeom>
+          <a:solidFill>
+            <a:schemeClr val="accent6">
+              <a:lumMod val="20000"/>
+              <a:lumOff val="80000"/>
+            </a:schemeClr>
+          </a:solidFill>
+          <a:ln w="19050">
+            <a:noFill/>
+          </a:ln>
+          <a:effectLst/>
+        </p:spPr>
+        <p:style>
+          <a:lnRef idx="1">
+            <a:schemeClr val="accent2"/>
+          </a:lnRef>
+          <a:fillRef idx="2">
+            <a:schemeClr val="accent2"/>
+          </a:fillRef>
+          <a:effectRef idx="1">
+            <a:schemeClr val="accent2"/>
+          </a:effectRef>
+          <a:fontRef idx="minor">
+            <a:schemeClr val="dk1"/>
+          </a:fontRef>
+        </p:style>
+        <p:txBody>
+          <a:bodyPr rtlCol="0" anchor="t"/>
+          <a:lstStyle/>
+          <a:p>
+            <a:r>
+              <a:rPr lang="en-US" sz="1200" b="1" dirty="0">
+                <a:solidFill>
+                  <a:schemeClr val="accent6">
+                    <a:lumMod val="75000"/>
+                  </a:schemeClr>
+                </a:solidFill>
+              </a:rPr>
+              <a:t>Storage</a:t>
+            </a:r>
+            <a:endParaRPr lang="en-SG" sz="1200" b="1" dirty="0">
+              <a:solidFill>
+                <a:schemeClr val="accent6">
+                  <a:lumMod val="75000"/>
+                </a:schemeClr>
+              </a:solidFill>
+            </a:endParaRPr>
+          </a:p>
+        </p:txBody>
+      </p:sp>
+      <p:sp>
+        <p:nvSpPr>
+          <p:cNvPr id="6" name="Rectangle 8">
+            <a:extLst>
+              <a:ext uri="{FF2B5EF4-FFF2-40B4-BE49-F238E27FC236}">
+                <a16:creationId xmlns:a16="http://schemas.microsoft.com/office/drawing/2014/main" id="{723D2ADF-4AFF-A741-A603-0BA6131C8E61}"/>
+              </a:ext>
+            </a:extLst>
+          </p:cNvPr>
+          <p:cNvSpPr/>
+          <p:nvPr/>
+        </p:nvSpPr>
+        <p:spPr>
+          <a:xfrm>
+            <a:off x="1131592" y="3675891"/>
+            <a:ext cx="1323049" cy="346760"/>
           </a:xfrm>
           <a:prstGeom prst="rect">
             <a:avLst/>
           </a:prstGeom>
           <a:solidFill>
-            <a:srgbClr val="7030A0"/>
+            <a:schemeClr val="accent6">
+              <a:lumMod val="75000"/>
+            </a:schemeClr>
           </a:solidFill>
           <a:ln w="19050">
             <a:solidFill>
-              <a:srgbClr val="7030A0"/>
+              <a:schemeClr val="accent6">
+                <a:lumMod val="75000"/>
+              </a:schemeClr>
             </a:solidFill>
           </a:ln>
           <a:effectLst/>
         </p:spPr>
         <p:style>
           <a:lnRef idx="1">
-            <a:schemeClr val="accent6"/>
+            <a:schemeClr val="accent2"/>
           </a:lnRef>
           <a:fillRef idx="2">
-            <a:schemeClr val="accent6"/>
+            <a:schemeClr val="accent2"/>
           </a:fillRef>
           <a:effectRef idx="1">
-            <a:schemeClr val="accent6"/>
+            <a:schemeClr val="accent2"/>
           </a:effectRef>
           <a:fontRef idx="minor">
             <a:schemeClr val="dk1"/>
@@ -6837,12 +6919,12 @@
           <a:p>
             <a:pPr algn="ctr"/>
             <a:r>
-              <a:rPr lang="en-US" sz="1050" dirty="0">
+              <a:rPr lang="en-US" sz="1050" dirty="0" err="1">
                 <a:solidFill>
                   <a:schemeClr val="bg1"/>
                 </a:solidFill>
               </a:rPr>
-              <a:t>Person</a:t>
+              <a:t>StorageFile</a:t>
             </a:r>
             <a:endParaRPr lang="en-SG" sz="1050" dirty="0">
               <a:solidFill>
@@ -6852,79 +6934,35 @@
           </a:p>
         </p:txBody>
       </p:sp>
-      <p:sp>
-        <p:nvSpPr>
-          <p:cNvPr id="3" name="Rectangle 128"/>
-          <p:cNvSpPr/>
-          <p:nvPr/>
-        </p:nvSpPr>
-        <p:spPr>
-          <a:xfrm>
-            <a:off x="6363802" y="5140408"/>
-            <a:ext cx="1408598" cy="346760"/>
-          </a:xfrm>
-          <a:prstGeom prst="rect">
-            <a:avLst/>
-          </a:prstGeom>
-          <a:ln w="19050"/>
-          <a:effectLst/>
-        </p:spPr>
-        <p:style>
-          <a:lnRef idx="1">
-            <a:schemeClr val="accent4"/>
-          </a:lnRef>
-          <a:fillRef idx="2">
-            <a:schemeClr val="accent4"/>
-          </a:fillRef>
-          <a:effectRef idx="1">
-            <a:schemeClr val="accent4"/>
-          </a:effectRef>
-          <a:fontRef idx="minor">
-            <a:schemeClr val="dk1"/>
-          </a:fontRef>
-        </p:style>
-        <p:txBody>
-          <a:bodyPr rtlCol="0" anchor="ctr"/>
-          <a:lstStyle/>
-          <a:p>
-            <a:pPr algn="ctr"/>
-            <a:r>
-              <a:rPr lang="en-US" sz="1050" dirty="0"/>
-              <a:t>&lt;&lt;interface&gt;&gt;</a:t>
-            </a:r>
-          </a:p>
-          <a:p>
-            <a:pPr algn="ctr"/>
-            <a:r>
-              <a:rPr lang="en-US" sz="1050" dirty="0" err="1"/>
-              <a:t>ReadOnlyPerson</a:t>
-            </a:r>
-            <a:endParaRPr lang="en-SG" sz="1050" dirty="0"/>
-          </a:p>
-        </p:txBody>
-      </p:sp>
       <p:cxnSp>
         <p:nvCxnSpPr>
-          <p:cNvPr id="4" name="Elbow Connector 131"/>
-          <p:cNvCxnSpPr>
-            <a:stCxn id="7" idx="2"/>
-            <a:endCxn id="3" idx="1"/>
-          </p:cNvCxnSpPr>
+          <p:cNvPr id="11" name="Elbow Connector 122">
+            <a:extLst>
+              <a:ext uri="{FF2B5EF4-FFF2-40B4-BE49-F238E27FC236}">
+                <a16:creationId xmlns:a16="http://schemas.microsoft.com/office/drawing/2014/main" id="{116113E9-9F70-714D-80EB-438B7EEE8712}"/>
+              </a:ext>
+            </a:extLst>
+          </p:cNvPr>
+          <p:cNvCxnSpPr/>
           <p:nvPr/>
         </p:nvCxnSpPr>
         <p:spPr>
-          <a:xfrm rot="16200000" flipH="1">
-            <a:off x="5136573" y="4086558"/>
-            <a:ext cx="614343" cy="1840116"/>
-          </a:xfrm>
-          <a:prstGeom prst="bentConnector2">
-            <a:avLst/>
+          <a:xfrm>
+            <a:off x="704626" y="3849271"/>
+            <a:ext cx="419548" cy="2860"/>
+          </a:xfrm>
+          <a:prstGeom prst="bentConnector3">
+            <a:avLst>
+              <a:gd name="adj1" fmla="val 50000"/>
+            </a:avLst>
           </a:prstGeom>
           <a:ln w="19050">
             <a:solidFill>
-              <a:srgbClr val="C00000"/>
+              <a:schemeClr val="bg1">
+                <a:lumMod val="75000"/>
+              </a:schemeClr>
             </a:solidFill>
-            <a:prstDash val="dash"/>
+            <a:prstDash val="sysDot"/>
             <a:headEnd type="none" w="med" len="med"/>
             <a:tailEnd type="arrow" w="med" len="med"/>
           </a:ln>
@@ -6945,59 +6983,26 @@
           </a:fontRef>
         </p:style>
       </p:cxnSp>
-      <p:sp>
-        <p:nvSpPr>
-          <p:cNvPr id="5" name="Isosceles Triangle 134"/>
-          <p:cNvSpPr/>
-          <p:nvPr/>
-        </p:nvSpPr>
-        <p:spPr>
-          <a:xfrm rot="10800000">
-            <a:off x="6964221" y="4953000"/>
-            <a:ext cx="270504" cy="175523"/>
-          </a:xfrm>
-          <a:prstGeom prst="triangle">
-            <a:avLst/>
-          </a:prstGeom>
-          <a:ln w="19050"/>
-          <a:effectLst/>
-        </p:spPr>
-        <p:style>
-          <a:lnRef idx="1">
-            <a:schemeClr val="accent4"/>
-          </a:lnRef>
-          <a:fillRef idx="2">
-            <a:schemeClr val="accent4"/>
-          </a:fillRef>
-          <a:effectRef idx="1">
-            <a:schemeClr val="accent4"/>
-          </a:effectRef>
-          <a:fontRef idx="minor">
-            <a:schemeClr val="dk1"/>
-          </a:fontRef>
-        </p:style>
-        <p:txBody>
-          <a:bodyPr rtlCol="0" anchor="ctr"/>
-          <a:lstStyle/>
-          <a:p>
-            <a:pPr algn="ctr"/>
-            <a:endParaRPr lang="en-SG" sz="1050"/>
-          </a:p>
-        </p:txBody>
-      </p:sp>
       <p:cxnSp>
         <p:nvCxnSpPr>
-          <p:cNvPr id="6" name="Elbow Connector 135"/>
+          <p:cNvPr id="16" name="Elbow Connector 122">
+            <a:extLst>
+              <a:ext uri="{FF2B5EF4-FFF2-40B4-BE49-F238E27FC236}">
+                <a16:creationId xmlns:a16="http://schemas.microsoft.com/office/drawing/2014/main" id="{5BC7F02B-1553-464D-AB92-FA648868259F}"/>
+              </a:ext>
+            </a:extLst>
+          </p:cNvPr>
           <p:cNvCxnSpPr>
-            <a:stCxn id="2" idx="2"/>
-            <a:endCxn id="5" idx="3"/>
+            <a:cxnSpLocks/>
+            <a:stCxn id="17" idx="3"/>
+            <a:endCxn id="24" idx="1"/>
           </p:cNvCxnSpPr>
           <p:nvPr/>
         </p:nvCxnSpPr>
         <p:spPr>
-          <a:xfrm rot="5400000">
-            <a:off x="6974138" y="4824781"/>
-            <a:ext cx="253555" cy="2883"/>
+          <a:xfrm>
+            <a:off x="4247985" y="3849977"/>
+            <a:ext cx="863708" cy="142207"/>
           </a:xfrm>
           <a:prstGeom prst="bentConnector3">
             <a:avLst>
@@ -7006,16 +7011,56 @@
           </a:prstGeom>
           <a:ln w="19050">
             <a:solidFill>
-              <a:srgbClr val="7030A0"/>
+              <a:schemeClr val="accent6">
+                <a:lumMod val="75000"/>
+              </a:schemeClr>
             </a:solidFill>
-            <a:prstDash val="dash"/>
+            <a:prstDash val="sysDot"/>
             <a:headEnd type="none" w="med" len="med"/>
-            <a:tailEnd type="none" w="med" len="med"/>
+            <a:tailEnd type="arrow" w="med" len="med"/>
           </a:ln>
           <a:effectLst/>
         </p:spPr>
         <p:style>
           <a:lnRef idx="1">
+            <a:schemeClr val="accent2"/>
+          </a:lnRef>
+          <a:fillRef idx="2">
+            <a:schemeClr val="accent2"/>
+          </a:fillRef>
+          <a:effectRef idx="1">
+            <a:schemeClr val="accent2"/>
+          </a:effectRef>
+          <a:fontRef idx="minor">
+            <a:schemeClr val="dk1"/>
+          </a:fontRef>
+        </p:style>
+      </p:cxnSp>
+      <p:sp>
+        <p:nvSpPr>
+          <p:cNvPr id="17" name="Rectangle 8">
+            <a:extLst>
+              <a:ext uri="{FF2B5EF4-FFF2-40B4-BE49-F238E27FC236}">
+                <a16:creationId xmlns:a16="http://schemas.microsoft.com/office/drawing/2014/main" id="{A688D318-F9A5-9B4D-ACEF-17EC4F0C1BA0}"/>
+              </a:ext>
+            </a:extLst>
+          </p:cNvPr>
+          <p:cNvSpPr/>
+          <p:nvPr/>
+        </p:nvSpPr>
+        <p:spPr>
+          <a:xfrm>
+            <a:off x="3078150" y="3676597"/>
+            <a:ext cx="1169835" cy="346760"/>
+          </a:xfrm>
+          <a:prstGeom prst="rect">
+            <a:avLst/>
+          </a:prstGeom>
+          <a:ln w="19050"/>
+          <a:effectLst/>
+        </p:spPr>
+        <p:style>
+          <a:lnRef idx="1">
             <a:schemeClr val="accent6"/>
           </a:lnRef>
           <a:fillRef idx="2">
@@ -7028,28 +7073,128 @@
             <a:schemeClr val="dk1"/>
           </a:fontRef>
         </p:style>
-      </p:cxnSp>
-      <p:sp>
-        <p:nvSpPr>
-          <p:cNvPr id="7" name="Rectangle 62"/>
+        <p:txBody>
+          <a:bodyPr rtlCol="0" anchor="ctr"/>
+          <a:lstStyle/>
+          <a:p>
+            <a:pPr algn="ctr"/>
+            <a:r>
+              <a:rPr lang="en-US" sz="1050" b="1" dirty="0" err="1">
+                <a:solidFill>
+                  <a:schemeClr val="accent6">
+                    <a:lumMod val="75000"/>
+                  </a:schemeClr>
+                </a:solidFill>
+              </a:rPr>
+              <a:t>AdaptedRms</a:t>
+            </a:r>
+            <a:endParaRPr lang="en-SG" sz="1050" b="1" dirty="0">
+              <a:solidFill>
+                <a:schemeClr val="accent6">
+                  <a:lumMod val="75000"/>
+                </a:schemeClr>
+              </a:solidFill>
+            </a:endParaRPr>
+          </a:p>
+        </p:txBody>
+      </p:sp>
+      <p:sp>
+        <p:nvSpPr>
+          <p:cNvPr id="24" name="Rectangle 8">
+            <a:extLst>
+              <a:ext uri="{FF2B5EF4-FFF2-40B4-BE49-F238E27FC236}">
+                <a16:creationId xmlns:a16="http://schemas.microsoft.com/office/drawing/2014/main" id="{3D5474C8-0EDC-9E45-9B78-BD4140AA55AC}"/>
+              </a:ext>
+            </a:extLst>
+          </p:cNvPr>
           <p:cNvSpPr/>
           <p:nvPr/>
         </p:nvSpPr>
         <p:spPr>
           <a:xfrm>
-            <a:off x="3650593" y="4352685"/>
-            <a:ext cx="1746186" cy="346760"/>
+            <a:off x="5111693" y="3818804"/>
+            <a:ext cx="1300042" cy="346760"/>
           </a:xfrm>
           <a:prstGeom prst="rect">
             <a:avLst/>
           </a:prstGeom>
-          <a:solidFill>
-            <a:srgbClr val="C00000"/>
-          </a:solidFill>
+          <a:ln w="19050"/>
+          <a:effectLst/>
+        </p:spPr>
+        <p:style>
+          <a:lnRef idx="1">
+            <a:schemeClr val="accent6"/>
+          </a:lnRef>
+          <a:fillRef idx="2">
+            <a:schemeClr val="accent6"/>
+          </a:fillRef>
+          <a:effectRef idx="1">
+            <a:schemeClr val="accent6"/>
+          </a:effectRef>
+          <a:fontRef idx="minor">
+            <a:schemeClr val="dk1"/>
+          </a:fontRef>
+        </p:style>
+        <p:txBody>
+          <a:bodyPr rtlCol="0" anchor="ctr"/>
+          <a:lstStyle/>
+          <a:p>
+            <a:pPr algn="ctr"/>
+            <a:r>
+              <a:rPr lang="en-US" sz="1050" b="1" dirty="0" err="1">
+                <a:solidFill>
+                  <a:schemeClr val="accent6">
+                    <a:lumMod val="75000"/>
+                  </a:schemeClr>
+                </a:solidFill>
+              </a:rPr>
+              <a:t>AdaptedEmployee</a:t>
+            </a:r>
+            <a:endParaRPr lang="en-US" sz="1050" b="1" dirty="0">
+              <a:solidFill>
+                <a:schemeClr val="accent6">
+                  <a:lumMod val="75000"/>
+                </a:schemeClr>
+              </a:solidFill>
+            </a:endParaRPr>
+          </a:p>
+        </p:txBody>
+      </p:sp>
+      <p:cxnSp>
+        <p:nvCxnSpPr>
+          <p:cNvPr id="31" name="Elbow Connector 122">
+            <a:extLst>
+              <a:ext uri="{FF2B5EF4-FFF2-40B4-BE49-F238E27FC236}">
+                <a16:creationId xmlns:a16="http://schemas.microsoft.com/office/drawing/2014/main" id="{4C916BFE-9450-B043-8CED-7CA208F39F4D}"/>
+              </a:ext>
+            </a:extLst>
+          </p:cNvPr>
+          <p:cNvCxnSpPr>
+            <a:cxnSpLocks/>
+            <a:stCxn id="6" idx="3"/>
+            <a:endCxn id="17" idx="1"/>
+          </p:cNvCxnSpPr>
+          <p:nvPr/>
+        </p:nvCxnSpPr>
+        <p:spPr>
+          <a:xfrm>
+            <a:off x="2454641" y="3849271"/>
+            <a:ext cx="623509" cy="706"/>
+          </a:xfrm>
+          <a:prstGeom prst="bentConnector3">
+            <a:avLst>
+              <a:gd name="adj1" fmla="val 50000"/>
+            </a:avLst>
+          </a:prstGeom>
           <a:ln w="19050">
             <a:solidFill>
-              <a:srgbClr val="C00000"/>
+              <a:schemeClr val="accent6">
+                <a:lumMod val="75000"/>
+              </a:schemeClr>
             </a:solidFill>
+            <a:prstDash val="sysDot"/>
+            <a:headEnd type="none" w="med" len="med"/>
+            <a:tailEnd type="arrow" w="med" len="med"/>
           </a:ln>
           <a:effectLst/>
         </p:spPr>
@@ -7067,31 +7212,356 @@
             <a:schemeClr val="dk1"/>
           </a:fontRef>
         </p:style>
+      </p:cxnSp>
+      <p:sp>
+        <p:nvSpPr>
+          <p:cNvPr id="39" name="Rectangle 8">
+            <a:extLst>
+              <a:ext uri="{FF2B5EF4-FFF2-40B4-BE49-F238E27FC236}">
+                <a16:creationId xmlns:a16="http://schemas.microsoft.com/office/drawing/2014/main" id="{94199B8A-B845-334B-BF72-766DF502B067}"/>
+              </a:ext>
+            </a:extLst>
+          </p:cNvPr>
+          <p:cNvSpPr/>
+          <p:nvPr/>
+        </p:nvSpPr>
+        <p:spPr>
+          <a:xfrm>
+            <a:off x="5111693" y="3174269"/>
+            <a:ext cx="1300042" cy="346760"/>
+          </a:xfrm>
+          <a:prstGeom prst="rect">
+            <a:avLst/>
+          </a:prstGeom>
+          <a:ln w="19050"/>
+          <a:effectLst/>
+        </p:spPr>
+        <p:style>
+          <a:lnRef idx="1">
+            <a:schemeClr val="accent6"/>
+          </a:lnRef>
+          <a:fillRef idx="2">
+            <a:schemeClr val="accent6"/>
+          </a:fillRef>
+          <a:effectRef idx="1">
+            <a:schemeClr val="accent6"/>
+          </a:effectRef>
+          <a:fontRef idx="minor">
+            <a:schemeClr val="dk1"/>
+          </a:fontRef>
+        </p:style>
         <p:txBody>
           <a:bodyPr rtlCol="0" anchor="ctr"/>
           <a:lstStyle/>
           <a:p>
             <a:pPr algn="ctr"/>
             <a:r>
-              <a:rPr lang="en-US" sz="1050" dirty="0" err="1">
+              <a:rPr lang="en-US" sz="1050" b="1" dirty="0" err="1">
                 <a:solidFill>
-                  <a:schemeClr val="bg1"/>
+                  <a:schemeClr val="accent6">
+                    <a:lumMod val="75000"/>
+                  </a:schemeClr>
                 </a:solidFill>
               </a:rPr>
-              <a:t>MainWindow</a:t>
-            </a:r>
-            <a:endParaRPr lang="en-SG" sz="1050" dirty="0">
+              <a:t>AdaptedMenu</a:t>
+            </a:r>
+            <a:endParaRPr lang="en-US" sz="1050" b="1" dirty="0">
               <a:solidFill>
-                <a:schemeClr val="bg1"/>
+                <a:schemeClr val="accent6">
+                  <a:lumMod val="75000"/>
+                </a:schemeClr>
               </a:solidFill>
             </a:endParaRPr>
           </a:p>
         </p:txBody>
       </p:sp>
+      <p:sp>
+        <p:nvSpPr>
+          <p:cNvPr id="40" name="Rectangle 8">
+            <a:extLst>
+              <a:ext uri="{FF2B5EF4-FFF2-40B4-BE49-F238E27FC236}">
+                <a16:creationId xmlns:a16="http://schemas.microsoft.com/office/drawing/2014/main" id="{790BB9A5-B75F-F447-92FA-DD2BC33418E9}"/>
+              </a:ext>
+            </a:extLst>
+          </p:cNvPr>
+          <p:cNvSpPr/>
+          <p:nvPr/>
+        </p:nvSpPr>
+        <p:spPr>
+          <a:xfrm>
+            <a:off x="5111693" y="4486496"/>
+            <a:ext cx="1300042" cy="346760"/>
+          </a:xfrm>
+          <a:prstGeom prst="rect">
+            <a:avLst/>
+          </a:prstGeom>
+          <a:ln w="19050"/>
+          <a:effectLst/>
+        </p:spPr>
+        <p:style>
+          <a:lnRef idx="1">
+            <a:schemeClr val="accent6"/>
+          </a:lnRef>
+          <a:fillRef idx="2">
+            <a:schemeClr val="accent6"/>
+          </a:fillRef>
+          <a:effectRef idx="1">
+            <a:schemeClr val="accent6"/>
+          </a:effectRef>
+          <a:fontRef idx="minor">
+            <a:schemeClr val="dk1"/>
+          </a:fontRef>
+        </p:style>
+        <p:txBody>
+          <a:bodyPr rtlCol="0" anchor="ctr"/>
+          <a:lstStyle/>
+          <a:p>
+            <a:pPr algn="ctr"/>
+            <a:r>
+              <a:rPr lang="en-US" sz="1050" b="1" dirty="0" err="1">
+                <a:solidFill>
+                  <a:schemeClr val="accent6">
+                    <a:lumMod val="75000"/>
+                  </a:schemeClr>
+                </a:solidFill>
+              </a:rPr>
+              <a:t>AdaptedMember</a:t>
+            </a:r>
+            <a:endParaRPr lang="en-US" sz="1050" b="1" dirty="0">
+              <a:solidFill>
+                <a:schemeClr val="accent6">
+                  <a:lumMod val="75000"/>
+                </a:schemeClr>
+              </a:solidFill>
+            </a:endParaRPr>
+          </a:p>
+        </p:txBody>
+      </p:sp>
+      <p:sp>
+        <p:nvSpPr>
+          <p:cNvPr id="41" name="Rectangle 8">
+            <a:extLst>
+              <a:ext uri="{FF2B5EF4-FFF2-40B4-BE49-F238E27FC236}">
+                <a16:creationId xmlns:a16="http://schemas.microsoft.com/office/drawing/2014/main" id="{FBD7CB88-3408-0B49-92B2-1E872A01BE95}"/>
+              </a:ext>
+            </a:extLst>
+          </p:cNvPr>
+          <p:cNvSpPr/>
+          <p:nvPr/>
+        </p:nvSpPr>
+        <p:spPr>
+          <a:xfrm>
+            <a:off x="5111693" y="5139640"/>
+            <a:ext cx="1300042" cy="346760"/>
+          </a:xfrm>
+          <a:prstGeom prst="rect">
+            <a:avLst/>
+          </a:prstGeom>
+          <a:ln w="19050"/>
+          <a:effectLst/>
+        </p:spPr>
+        <p:style>
+          <a:lnRef idx="1">
+            <a:schemeClr val="accent6"/>
+          </a:lnRef>
+          <a:fillRef idx="2">
+            <a:schemeClr val="accent6"/>
+          </a:fillRef>
+          <a:effectRef idx="1">
+            <a:schemeClr val="accent6"/>
+          </a:effectRef>
+          <a:fontRef idx="minor">
+            <a:schemeClr val="dk1"/>
+          </a:fontRef>
+        </p:style>
+        <p:txBody>
+          <a:bodyPr rtlCol="0" anchor="ctr"/>
+          <a:lstStyle/>
+          <a:p>
+            <a:pPr algn="ctr"/>
+            <a:r>
+              <a:rPr lang="en-US" sz="1050" b="1" dirty="0" err="1">
+                <a:solidFill>
+                  <a:schemeClr val="accent6">
+                    <a:lumMod val="75000"/>
+                  </a:schemeClr>
+                </a:solidFill>
+              </a:rPr>
+              <a:t>AdaptedOrder</a:t>
+            </a:r>
+            <a:endParaRPr lang="en-US" sz="1050" b="1" dirty="0">
+              <a:solidFill>
+                <a:schemeClr val="accent6">
+                  <a:lumMod val="75000"/>
+                </a:schemeClr>
+              </a:solidFill>
+            </a:endParaRPr>
+          </a:p>
+        </p:txBody>
+      </p:sp>
+      <p:cxnSp>
+        <p:nvCxnSpPr>
+          <p:cNvPr id="42" name="Elbow Connector 122">
+            <a:extLst>
+              <a:ext uri="{FF2B5EF4-FFF2-40B4-BE49-F238E27FC236}">
+                <a16:creationId xmlns:a16="http://schemas.microsoft.com/office/drawing/2014/main" id="{824306AE-B921-6B40-AEED-13D7153BF6FD}"/>
+              </a:ext>
+            </a:extLst>
+          </p:cNvPr>
+          <p:cNvCxnSpPr>
+            <a:cxnSpLocks/>
+            <a:stCxn id="17" idx="3"/>
+            <a:endCxn id="39" idx="1"/>
+          </p:cNvCxnSpPr>
+          <p:nvPr/>
+        </p:nvCxnSpPr>
+        <p:spPr>
+          <a:xfrm flipV="1">
+            <a:off x="4247985" y="3347649"/>
+            <a:ext cx="863708" cy="502328"/>
+          </a:xfrm>
+          <a:prstGeom prst="bentConnector3">
+            <a:avLst>
+              <a:gd name="adj1" fmla="val 50000"/>
+            </a:avLst>
+          </a:prstGeom>
+          <a:ln w="19050">
+            <a:solidFill>
+              <a:schemeClr val="accent6">
+                <a:lumMod val="75000"/>
+              </a:schemeClr>
+            </a:solidFill>
+            <a:prstDash val="sysDot"/>
+            <a:headEnd type="none" w="med" len="med"/>
+            <a:tailEnd type="arrow" w="med" len="med"/>
+          </a:ln>
+          <a:effectLst/>
+        </p:spPr>
+        <p:style>
+          <a:lnRef idx="1">
+            <a:schemeClr val="accent2"/>
+          </a:lnRef>
+          <a:fillRef idx="2">
+            <a:schemeClr val="accent2"/>
+          </a:fillRef>
+          <a:effectRef idx="1">
+            <a:schemeClr val="accent2"/>
+          </a:effectRef>
+          <a:fontRef idx="minor">
+            <a:schemeClr val="dk1"/>
+          </a:fontRef>
+        </p:style>
+      </p:cxnSp>
+      <p:cxnSp>
+        <p:nvCxnSpPr>
+          <p:cNvPr id="46" name="Elbow Connector 122">
+            <a:extLst>
+              <a:ext uri="{FF2B5EF4-FFF2-40B4-BE49-F238E27FC236}">
+                <a16:creationId xmlns:a16="http://schemas.microsoft.com/office/drawing/2014/main" id="{5FEEBF9B-EEA5-C14B-913E-BA59A58DCCF8}"/>
+              </a:ext>
+            </a:extLst>
+          </p:cNvPr>
+          <p:cNvCxnSpPr>
+            <a:cxnSpLocks/>
+            <a:stCxn id="17" idx="3"/>
+            <a:endCxn id="40" idx="1"/>
+          </p:cNvCxnSpPr>
+          <p:nvPr/>
+        </p:nvCxnSpPr>
+        <p:spPr>
+          <a:xfrm>
+            <a:off x="4247985" y="3849977"/>
+            <a:ext cx="863708" cy="809899"/>
+          </a:xfrm>
+          <a:prstGeom prst="bentConnector3">
+            <a:avLst>
+              <a:gd name="adj1" fmla="val 50000"/>
+            </a:avLst>
+          </a:prstGeom>
+          <a:ln w="19050">
+            <a:solidFill>
+              <a:schemeClr val="accent6">
+                <a:lumMod val="75000"/>
+              </a:schemeClr>
+            </a:solidFill>
+            <a:prstDash val="sysDot"/>
+            <a:headEnd type="none" w="med" len="med"/>
+            <a:tailEnd type="arrow" w="med" len="med"/>
+          </a:ln>
+          <a:effectLst/>
+        </p:spPr>
+        <p:style>
+          <a:lnRef idx="1">
+            <a:schemeClr val="accent2"/>
+          </a:lnRef>
+          <a:fillRef idx="2">
+            <a:schemeClr val="accent2"/>
+          </a:fillRef>
+          <a:effectRef idx="1">
+            <a:schemeClr val="accent2"/>
+          </a:effectRef>
+          <a:fontRef idx="minor">
+            <a:schemeClr val="dk1"/>
+          </a:fontRef>
+        </p:style>
+      </p:cxnSp>
+      <p:cxnSp>
+        <p:nvCxnSpPr>
+          <p:cNvPr id="49" name="Elbow Connector 122">
+            <a:extLst>
+              <a:ext uri="{FF2B5EF4-FFF2-40B4-BE49-F238E27FC236}">
+                <a16:creationId xmlns:a16="http://schemas.microsoft.com/office/drawing/2014/main" id="{8AF606F6-2E45-F242-990D-6EB72D708E98}"/>
+              </a:ext>
+            </a:extLst>
+          </p:cNvPr>
+          <p:cNvCxnSpPr>
+            <a:cxnSpLocks/>
+            <a:stCxn id="17" idx="3"/>
+            <a:endCxn id="41" idx="1"/>
+          </p:cNvCxnSpPr>
+          <p:nvPr/>
+        </p:nvCxnSpPr>
+        <p:spPr>
+          <a:xfrm>
+            <a:off x="4247985" y="3849977"/>
+            <a:ext cx="863708" cy="1463043"/>
+          </a:xfrm>
+          <a:prstGeom prst="bentConnector3">
+            <a:avLst>
+              <a:gd name="adj1" fmla="val 50000"/>
+            </a:avLst>
+          </a:prstGeom>
+          <a:ln w="19050">
+            <a:solidFill>
+              <a:schemeClr val="accent6">
+                <a:lumMod val="75000"/>
+              </a:schemeClr>
+            </a:solidFill>
+            <a:prstDash val="sysDot"/>
+            <a:headEnd type="none" w="med" len="med"/>
+            <a:tailEnd type="arrow" w="med" len="med"/>
+          </a:ln>
+          <a:effectLst/>
+        </p:spPr>
+        <p:style>
+          <a:lnRef idx="1">
+            <a:schemeClr val="accent2"/>
+          </a:lnRef>
+          <a:fillRef idx="2">
+            <a:schemeClr val="accent2"/>
+          </a:fillRef>
+          <a:effectRef idx="1">
+            <a:schemeClr val="accent2"/>
+          </a:effectRef>
+          <a:fontRef idx="minor">
+            <a:schemeClr val="dk1"/>
+          </a:fontRef>
+        </p:style>
+      </p:cxnSp>
     </p:spTree>
     <p:extLst>
       <p:ext uri="{BB962C8B-B14F-4D97-AF65-F5344CB8AC3E}">
-        <p14:creationId xmlns:p14="http://schemas.microsoft.com/office/powerpoint/2010/main" val="4275401693"/>
+        <p14:creationId xmlns:p14="http://schemas.microsoft.com/office/powerpoint/2010/main" val="2352156642"/>
       </p:ext>
     </p:extLst>
   </p:cSld>
@@ -7120,6 +7590,331 @@
       </p:grpSpPr>
       <p:sp>
         <p:nvSpPr>
+          <p:cNvPr id="2" name="Rectangle 18"/>
+          <p:cNvSpPr/>
+          <p:nvPr/>
+        </p:nvSpPr>
+        <p:spPr>
+          <a:xfrm>
+            <a:off x="6637708" y="4352685"/>
+            <a:ext cx="929296" cy="346760"/>
+          </a:xfrm>
+          <a:prstGeom prst="rect">
+            <a:avLst/>
+          </a:prstGeom>
+          <a:solidFill>
+            <a:srgbClr val="7030A0"/>
+          </a:solidFill>
+          <a:ln w="19050">
+            <a:solidFill>
+              <a:srgbClr val="7030A0"/>
+            </a:solidFill>
+          </a:ln>
+          <a:effectLst/>
+        </p:spPr>
+        <p:style>
+          <a:lnRef idx="1">
+            <a:schemeClr val="accent6"/>
+          </a:lnRef>
+          <a:fillRef idx="2">
+            <a:schemeClr val="accent6"/>
+          </a:fillRef>
+          <a:effectRef idx="1">
+            <a:schemeClr val="accent6"/>
+          </a:effectRef>
+          <a:fontRef idx="minor">
+            <a:schemeClr val="dk1"/>
+          </a:fontRef>
+        </p:style>
+        <p:txBody>
+          <a:bodyPr rtlCol="0" anchor="ctr"/>
+          <a:lstStyle/>
+          <a:p>
+            <a:pPr algn="ctr"/>
+            <a:r>
+              <a:rPr lang="en-US" sz="1050" dirty="0">
+                <a:solidFill>
+                  <a:schemeClr val="bg1"/>
+                </a:solidFill>
+              </a:rPr>
+              <a:t>Person</a:t>
+            </a:r>
+            <a:endParaRPr lang="en-SG" sz="1050" dirty="0">
+              <a:solidFill>
+                <a:schemeClr val="bg1"/>
+              </a:solidFill>
+            </a:endParaRPr>
+          </a:p>
+        </p:txBody>
+      </p:sp>
+      <p:sp>
+        <p:nvSpPr>
+          <p:cNvPr id="3" name="Rectangle 128"/>
+          <p:cNvSpPr/>
+          <p:nvPr/>
+        </p:nvSpPr>
+        <p:spPr>
+          <a:xfrm>
+            <a:off x="6363802" y="5140408"/>
+            <a:ext cx="1408598" cy="346760"/>
+          </a:xfrm>
+          <a:prstGeom prst="rect">
+            <a:avLst/>
+          </a:prstGeom>
+          <a:ln w="19050"/>
+          <a:effectLst/>
+        </p:spPr>
+        <p:style>
+          <a:lnRef idx="1">
+            <a:schemeClr val="accent4"/>
+          </a:lnRef>
+          <a:fillRef idx="2">
+            <a:schemeClr val="accent4"/>
+          </a:fillRef>
+          <a:effectRef idx="1">
+            <a:schemeClr val="accent4"/>
+          </a:effectRef>
+          <a:fontRef idx="minor">
+            <a:schemeClr val="dk1"/>
+          </a:fontRef>
+        </p:style>
+        <p:txBody>
+          <a:bodyPr rtlCol="0" anchor="ctr"/>
+          <a:lstStyle/>
+          <a:p>
+            <a:pPr algn="ctr"/>
+            <a:r>
+              <a:rPr lang="en-US" sz="1050" dirty="0"/>
+              <a:t>&lt;&lt;interface&gt;&gt;</a:t>
+            </a:r>
+          </a:p>
+          <a:p>
+            <a:pPr algn="ctr"/>
+            <a:r>
+              <a:rPr lang="en-US" sz="1050" dirty="0" err="1"/>
+              <a:t>ReadOnlyPerson</a:t>
+            </a:r>
+            <a:endParaRPr lang="en-SG" sz="1050" dirty="0"/>
+          </a:p>
+        </p:txBody>
+      </p:sp>
+      <p:cxnSp>
+        <p:nvCxnSpPr>
+          <p:cNvPr id="4" name="Elbow Connector 131"/>
+          <p:cNvCxnSpPr>
+            <a:stCxn id="7" idx="2"/>
+            <a:endCxn id="3" idx="1"/>
+          </p:cNvCxnSpPr>
+          <p:nvPr/>
+        </p:nvCxnSpPr>
+        <p:spPr>
+          <a:xfrm rot="16200000" flipH="1">
+            <a:off x="5136573" y="4086558"/>
+            <a:ext cx="614343" cy="1840116"/>
+          </a:xfrm>
+          <a:prstGeom prst="bentConnector2">
+            <a:avLst/>
+          </a:prstGeom>
+          <a:ln w="19050">
+            <a:solidFill>
+              <a:srgbClr val="C00000"/>
+            </a:solidFill>
+            <a:prstDash val="dash"/>
+            <a:headEnd type="none" w="med" len="med"/>
+            <a:tailEnd type="arrow" w="med" len="med"/>
+          </a:ln>
+          <a:effectLst/>
+        </p:spPr>
+        <p:style>
+          <a:lnRef idx="1">
+            <a:schemeClr val="accent2"/>
+          </a:lnRef>
+          <a:fillRef idx="2">
+            <a:schemeClr val="accent2"/>
+          </a:fillRef>
+          <a:effectRef idx="1">
+            <a:schemeClr val="accent2"/>
+          </a:effectRef>
+          <a:fontRef idx="minor">
+            <a:schemeClr val="dk1"/>
+          </a:fontRef>
+        </p:style>
+      </p:cxnSp>
+      <p:sp>
+        <p:nvSpPr>
+          <p:cNvPr id="5" name="Isosceles Triangle 134"/>
+          <p:cNvSpPr/>
+          <p:nvPr/>
+        </p:nvSpPr>
+        <p:spPr>
+          <a:xfrm rot="10800000">
+            <a:off x="6964221" y="4953000"/>
+            <a:ext cx="270504" cy="175523"/>
+          </a:xfrm>
+          <a:prstGeom prst="triangle">
+            <a:avLst/>
+          </a:prstGeom>
+          <a:ln w="19050"/>
+          <a:effectLst/>
+        </p:spPr>
+        <p:style>
+          <a:lnRef idx="1">
+            <a:schemeClr val="accent4"/>
+          </a:lnRef>
+          <a:fillRef idx="2">
+            <a:schemeClr val="accent4"/>
+          </a:fillRef>
+          <a:effectRef idx="1">
+            <a:schemeClr val="accent4"/>
+          </a:effectRef>
+          <a:fontRef idx="minor">
+            <a:schemeClr val="dk1"/>
+          </a:fontRef>
+        </p:style>
+        <p:txBody>
+          <a:bodyPr rtlCol="0" anchor="ctr"/>
+          <a:lstStyle/>
+          <a:p>
+            <a:pPr algn="ctr"/>
+            <a:endParaRPr lang="en-SG" sz="1050"/>
+          </a:p>
+        </p:txBody>
+      </p:sp>
+      <p:cxnSp>
+        <p:nvCxnSpPr>
+          <p:cNvPr id="6" name="Elbow Connector 135"/>
+          <p:cNvCxnSpPr>
+            <a:stCxn id="2" idx="2"/>
+            <a:endCxn id="5" idx="3"/>
+          </p:cNvCxnSpPr>
+          <p:nvPr/>
+        </p:nvCxnSpPr>
+        <p:spPr>
+          <a:xfrm rot="5400000">
+            <a:off x="6974138" y="4824781"/>
+            <a:ext cx="253555" cy="2883"/>
+          </a:xfrm>
+          <a:prstGeom prst="bentConnector3">
+            <a:avLst>
+              <a:gd name="adj1" fmla="val 50000"/>
+            </a:avLst>
+          </a:prstGeom>
+          <a:ln w="19050">
+            <a:solidFill>
+              <a:srgbClr val="7030A0"/>
+            </a:solidFill>
+            <a:prstDash val="dash"/>
+            <a:headEnd type="none" w="med" len="med"/>
+            <a:tailEnd type="none" w="med" len="med"/>
+          </a:ln>
+          <a:effectLst/>
+        </p:spPr>
+        <p:style>
+          <a:lnRef idx="1">
+            <a:schemeClr val="accent6"/>
+          </a:lnRef>
+          <a:fillRef idx="2">
+            <a:schemeClr val="accent6"/>
+          </a:fillRef>
+          <a:effectRef idx="1">
+            <a:schemeClr val="accent6"/>
+          </a:effectRef>
+          <a:fontRef idx="minor">
+            <a:schemeClr val="dk1"/>
+          </a:fontRef>
+        </p:style>
+      </p:cxnSp>
+      <p:sp>
+        <p:nvSpPr>
+          <p:cNvPr id="7" name="Rectangle 62"/>
+          <p:cNvSpPr/>
+          <p:nvPr/>
+        </p:nvSpPr>
+        <p:spPr>
+          <a:xfrm>
+            <a:off x="3650593" y="4352685"/>
+            <a:ext cx="1746186" cy="346760"/>
+          </a:xfrm>
+          <a:prstGeom prst="rect">
+            <a:avLst/>
+          </a:prstGeom>
+          <a:solidFill>
+            <a:srgbClr val="C00000"/>
+          </a:solidFill>
+          <a:ln w="19050">
+            <a:solidFill>
+              <a:srgbClr val="C00000"/>
+            </a:solidFill>
+          </a:ln>
+          <a:effectLst/>
+        </p:spPr>
+        <p:style>
+          <a:lnRef idx="1">
+            <a:schemeClr val="accent2"/>
+          </a:lnRef>
+          <a:fillRef idx="2">
+            <a:schemeClr val="accent2"/>
+          </a:fillRef>
+          <a:effectRef idx="1">
+            <a:schemeClr val="accent2"/>
+          </a:effectRef>
+          <a:fontRef idx="minor">
+            <a:schemeClr val="dk1"/>
+          </a:fontRef>
+        </p:style>
+        <p:txBody>
+          <a:bodyPr rtlCol="0" anchor="ctr"/>
+          <a:lstStyle/>
+          <a:p>
+            <a:pPr algn="ctr"/>
+            <a:r>
+              <a:rPr lang="en-US" sz="1050" dirty="0" err="1">
+                <a:solidFill>
+                  <a:schemeClr val="bg1"/>
+                </a:solidFill>
+              </a:rPr>
+              <a:t>MainWindow</a:t>
+            </a:r>
+            <a:endParaRPr lang="en-SG" sz="1050" dirty="0">
+              <a:solidFill>
+                <a:schemeClr val="bg1"/>
+              </a:solidFill>
+            </a:endParaRPr>
+          </a:p>
+        </p:txBody>
+      </p:sp>
+    </p:spTree>
+    <p:extLst>
+      <p:ext uri="{BB962C8B-B14F-4D97-AF65-F5344CB8AC3E}">
+        <p14:creationId xmlns:p14="http://schemas.microsoft.com/office/powerpoint/2010/main" val="4275401693"/>
+      </p:ext>
+    </p:extLst>
+  </p:cSld>
+  <p:clrMapOvr>
+    <a:masterClrMapping/>
+  </p:clrMapOvr>
+</p:sld>
+</file>
+
+<file path=ppt/slides/slide5.xml><?xml version="1.0" encoding="utf-8"?>
+<p:sld xmlns:a="http://schemas.openxmlformats.org/drawingml/2006/main" xmlns:r="http://schemas.openxmlformats.org/officeDocument/2006/relationships" xmlns:p="http://schemas.openxmlformats.org/presentationml/2006/main">
+  <p:cSld>
+    <p:spTree>
+      <p:nvGrpSpPr>
+        <p:cNvPr id="1" name=""/>
+        <p:cNvGrpSpPr/>
+        <p:nvPr/>
+      </p:nvGrpSpPr>
+      <p:grpSpPr>
+        <a:xfrm>
+          <a:off x="0" y="0"/>
+          <a:ext cx="0" cy="0"/>
+          <a:chOff x="0" y="0"/>
+          <a:chExt cx="0" cy="0"/>
+        </a:xfrm>
+      </p:grpSpPr>
+      <p:sp>
+        <p:nvSpPr>
           <p:cNvPr id="2" name="Rectangle 22"/>
           <p:cNvSpPr/>
           <p:nvPr/>
@@ -9520,7 +10315,7 @@
 </p:sld>
 </file>
 
-<file path=ppt/slides/slide5.xml><?xml version="1.0" encoding="utf-8"?>
+<file path=ppt/slides/slide6.xml><?xml version="1.0" encoding="utf-8"?>
 <p:sld xmlns:a="http://schemas.openxmlformats.org/drawingml/2006/main" xmlns:r="http://schemas.openxmlformats.org/officeDocument/2006/relationships" xmlns:p="http://schemas.openxmlformats.org/presentationml/2006/main">
   <p:cSld>
     <p:spTree>
@@ -10799,7 +11594,7 @@
 </p:sld>
 </file>
 
-<file path=ppt/slides/slide6.xml><?xml version="1.0" encoding="utf-8"?>
+<file path=ppt/slides/slide7.xml><?xml version="1.0" encoding="utf-8"?>
 <p:sld xmlns:a="http://schemas.openxmlformats.org/drawingml/2006/main" xmlns:r="http://schemas.openxmlformats.org/officeDocument/2006/relationships" xmlns:p="http://schemas.openxmlformats.org/presentationml/2006/main">
   <p:cSld>
     <p:spTree>

</xml_diff>

<commit_message>
fix inconsistencies in DG diagrams
</commit_message>
<xml_diff>
--- a/docs/Diagrams.pptx
+++ b/docs/Diagrams.pptx
@@ -214,7 +214,7 @@
           <a:p>
             <a:fld id="{F5CC4B3F-88C1-4FFA-B1B6-F41C21DC6924}" type="datetimeFigureOut">
               <a:rPr lang="en-US" smtClean="0"/>
-              <a:t>11/1/18</a:t>
+              <a:t>11/6/2018</a:t>
             </a:fld>
             <a:endParaRPr lang="en-US"/>
           </a:p>
@@ -744,7 +744,7 @@
           <a:p>
             <a:fld id="{78C97017-6FC3-485B-9764-EAC9E56C1D49}" type="datetimeFigureOut">
               <a:rPr lang="en-US" smtClean="0"/>
-              <a:t>11/1/18</a:t>
+              <a:t>11/6/2018</a:t>
             </a:fld>
             <a:endParaRPr lang="en-US"/>
           </a:p>
@@ -912,7 +912,7 @@
           <a:p>
             <a:fld id="{78C97017-6FC3-485B-9764-EAC9E56C1D49}" type="datetimeFigureOut">
               <a:rPr lang="en-US" smtClean="0"/>
-              <a:t>11/1/18</a:t>
+              <a:t>11/6/2018</a:t>
             </a:fld>
             <a:endParaRPr lang="en-US"/>
           </a:p>
@@ -1090,7 +1090,7 @@
           <a:p>
             <a:fld id="{78C97017-6FC3-485B-9764-EAC9E56C1D49}" type="datetimeFigureOut">
               <a:rPr lang="en-US" smtClean="0"/>
-              <a:t>11/1/18</a:t>
+              <a:t>11/6/2018</a:t>
             </a:fld>
             <a:endParaRPr lang="en-US"/>
           </a:p>
@@ -1258,7 +1258,7 @@
           <a:p>
             <a:fld id="{78C97017-6FC3-485B-9764-EAC9E56C1D49}" type="datetimeFigureOut">
               <a:rPr lang="en-US" smtClean="0"/>
-              <a:t>11/1/18</a:t>
+              <a:t>11/6/2018</a:t>
             </a:fld>
             <a:endParaRPr lang="en-US"/>
           </a:p>
@@ -1503,7 +1503,7 @@
           <a:p>
             <a:fld id="{78C97017-6FC3-485B-9764-EAC9E56C1D49}" type="datetimeFigureOut">
               <a:rPr lang="en-US" smtClean="0"/>
-              <a:t>11/1/18</a:t>
+              <a:t>11/6/2018</a:t>
             </a:fld>
             <a:endParaRPr lang="en-US"/>
           </a:p>
@@ -1788,7 +1788,7 @@
           <a:p>
             <a:fld id="{78C97017-6FC3-485B-9764-EAC9E56C1D49}" type="datetimeFigureOut">
               <a:rPr lang="en-US" smtClean="0"/>
-              <a:t>11/1/18</a:t>
+              <a:t>11/6/2018</a:t>
             </a:fld>
             <a:endParaRPr lang="en-US"/>
           </a:p>
@@ -2207,7 +2207,7 @@
           <a:p>
             <a:fld id="{78C97017-6FC3-485B-9764-EAC9E56C1D49}" type="datetimeFigureOut">
               <a:rPr lang="en-US" smtClean="0"/>
-              <a:t>11/1/18</a:t>
+              <a:t>11/6/2018</a:t>
             </a:fld>
             <a:endParaRPr lang="en-US"/>
           </a:p>
@@ -2324,7 +2324,7 @@
           <a:p>
             <a:fld id="{78C97017-6FC3-485B-9764-EAC9E56C1D49}" type="datetimeFigureOut">
               <a:rPr lang="en-US" smtClean="0"/>
-              <a:t>11/1/18</a:t>
+              <a:t>11/6/2018</a:t>
             </a:fld>
             <a:endParaRPr lang="en-US"/>
           </a:p>
@@ -2419,7 +2419,7 @@
           <a:p>
             <a:fld id="{78C97017-6FC3-485B-9764-EAC9E56C1D49}" type="datetimeFigureOut">
               <a:rPr lang="en-US" smtClean="0"/>
-              <a:t>11/1/18</a:t>
+              <a:t>11/6/2018</a:t>
             </a:fld>
             <a:endParaRPr lang="en-US"/>
           </a:p>
@@ -2694,7 +2694,7 @@
           <a:p>
             <a:fld id="{78C97017-6FC3-485B-9764-EAC9E56C1D49}" type="datetimeFigureOut">
               <a:rPr lang="en-US" smtClean="0"/>
-              <a:t>11/1/18</a:t>
+              <a:t>11/6/2018</a:t>
             </a:fld>
             <a:endParaRPr lang="en-US"/>
           </a:p>
@@ -2946,7 +2946,7 @@
           <a:p>
             <a:fld id="{78C97017-6FC3-485B-9764-EAC9E56C1D49}" type="datetimeFigureOut">
               <a:rPr lang="en-US" smtClean="0"/>
-              <a:t>11/1/18</a:t>
+              <a:t>11/6/2018</a:t>
             </a:fld>
             <a:endParaRPr lang="en-US"/>
           </a:p>
@@ -3157,7 +3157,7 @@
           <a:p>
             <a:fld id="{78C97017-6FC3-485B-9764-EAC9E56C1D49}" type="datetimeFigureOut">
               <a:rPr lang="en-US" smtClean="0"/>
-              <a:t>11/1/18</a:t>
+              <a:t>11/6/2018</a:t>
             </a:fld>
             <a:endParaRPr lang="en-US"/>
           </a:p>
@@ -10544,7 +10544,7 @@
                         <a:schemeClr val="bg1"/>
                       </a:solidFill>
                     </a:rPr>
-                    <a:t>Model</a:t>
+                    <a:t>Data</a:t>
                   </a:r>
                 </a:p>
               </p:txBody>
@@ -13854,7 +13854,7 @@
                   <a:srgbClr val="7030A0"/>
                 </a:solidFill>
               </a:rPr>
-              <a:t>Model</a:t>
+              <a:t>Data</a:t>
             </a:r>
           </a:p>
         </p:txBody>

</xml_diff>

<commit_message>
Added recommendations command in developer and user guide
</commit_message>
<xml_diff>
--- a/docs/Diagrams.pptx
+++ b/docs/Diagrams.pptx
@@ -5,7 +5,7 @@
     <p:sldMasterId id="2147483648" r:id="rId1"/>
   </p:sldMasterIdLst>
   <p:notesMasterIdLst>
-    <p:notesMasterId r:id="rId9"/>
+    <p:notesMasterId r:id="rId10"/>
   </p:notesMasterIdLst>
   <p:sldIdLst>
     <p:sldId id="256" r:id="rId2"/>
@@ -13,8 +13,9 @@
     <p:sldId id="262" r:id="rId4"/>
     <p:sldId id="259" r:id="rId5"/>
     <p:sldId id="258" r:id="rId6"/>
-    <p:sldId id="260" r:id="rId7"/>
-    <p:sldId id="261" r:id="rId8"/>
+    <p:sldId id="264" r:id="rId7"/>
+    <p:sldId id="260" r:id="rId8"/>
+    <p:sldId id="261" r:id="rId9"/>
   </p:sldIdLst>
   <p:sldSz cx="9144000" cy="6858000" type="screen4x3"/>
   <p:notesSz cx="6858000" cy="9144000"/>
@@ -214,7 +215,7 @@
           <a:p>
             <a:fld id="{F5CC4B3F-88C1-4FFA-B1B6-F41C21DC6924}" type="datetimeFigureOut">
               <a:rPr lang="en-US" smtClean="0"/>
-              <a:t>11/6/2018</a:t>
+              <a:t>11/8/2018</a:t>
             </a:fld>
             <a:endParaRPr lang="en-US"/>
           </a:p>
@@ -565,6 +566,90 @@
 </p:notes>
 </file>
 
+<file path=ppt/notesSlides/notesSlide2.xml><?xml version="1.0" encoding="utf-8"?>
+<p:notes xmlns:a="http://schemas.openxmlformats.org/drawingml/2006/main" xmlns:r="http://schemas.openxmlformats.org/officeDocument/2006/relationships" xmlns:p="http://schemas.openxmlformats.org/presentationml/2006/main">
+  <p:cSld>
+    <p:spTree>
+      <p:nvGrpSpPr>
+        <p:cNvPr id="1" name=""/>
+        <p:cNvGrpSpPr/>
+        <p:nvPr/>
+      </p:nvGrpSpPr>
+      <p:grpSpPr>
+        <a:xfrm>
+          <a:off x="0" y="0"/>
+          <a:ext cx="0" cy="0"/>
+          <a:chOff x="0" y="0"/>
+          <a:chExt cx="0" cy="0"/>
+        </a:xfrm>
+      </p:grpSpPr>
+      <p:sp>
+        <p:nvSpPr>
+          <p:cNvPr id="2" name="Slide Image Placeholder 1"/>
+          <p:cNvSpPr>
+            <a:spLocks noGrp="1" noRot="1" noChangeAspect="1"/>
+          </p:cNvSpPr>
+          <p:nvPr>
+            <p:ph type="sldImg"/>
+          </p:nvPr>
+        </p:nvSpPr>
+        <p:spPr/>
+      </p:sp>
+      <p:sp>
+        <p:nvSpPr>
+          <p:cNvPr id="3" name="Notes Placeholder 2"/>
+          <p:cNvSpPr>
+            <a:spLocks noGrp="1"/>
+          </p:cNvSpPr>
+          <p:nvPr>
+            <p:ph type="body" idx="1"/>
+          </p:nvPr>
+        </p:nvSpPr>
+        <p:spPr/>
+        <p:txBody>
+          <a:bodyPr/>
+          <a:lstStyle/>
+          <a:p>
+            <a:endParaRPr lang="en-US" dirty="0"/>
+          </a:p>
+        </p:txBody>
+      </p:sp>
+      <p:sp>
+        <p:nvSpPr>
+          <p:cNvPr id="4" name="Slide Number Placeholder 3"/>
+          <p:cNvSpPr>
+            <a:spLocks noGrp="1"/>
+          </p:cNvSpPr>
+          <p:nvPr>
+            <p:ph type="sldNum" sz="quarter" idx="5"/>
+          </p:nvPr>
+        </p:nvSpPr>
+        <p:spPr/>
+        <p:txBody>
+          <a:bodyPr/>
+          <a:lstStyle/>
+          <a:p>
+            <a:fld id="{5A7AB025-77E3-4BD1-A2FD-B3183DBA47A3}" type="slidenum">
+              <a:rPr lang="en-US" smtClean="0"/>
+              <a:t>6</a:t>
+            </a:fld>
+            <a:endParaRPr lang="en-US"/>
+          </a:p>
+        </p:txBody>
+      </p:sp>
+    </p:spTree>
+    <p:extLst>
+      <p:ext uri="{BB962C8B-B14F-4D97-AF65-F5344CB8AC3E}">
+        <p14:creationId xmlns:p14="http://schemas.microsoft.com/office/powerpoint/2010/main" val="1418928258"/>
+      </p:ext>
+    </p:extLst>
+  </p:cSld>
+  <p:clrMapOvr>
+    <a:masterClrMapping/>
+  </p:clrMapOvr>
+</p:notes>
+</file>
+
 <file path=ppt/slideLayouts/slideLayout1.xml><?xml version="1.0" encoding="utf-8"?>
 <p:sldLayout xmlns:a="http://schemas.openxmlformats.org/drawingml/2006/main" xmlns:r="http://schemas.openxmlformats.org/officeDocument/2006/relationships" xmlns:p="http://schemas.openxmlformats.org/presentationml/2006/main" type="title" preserve="1">
   <p:cSld name="Title Slide">
@@ -744,7 +829,7 @@
           <a:p>
             <a:fld id="{78C97017-6FC3-485B-9764-EAC9E56C1D49}" type="datetimeFigureOut">
               <a:rPr lang="en-US" smtClean="0"/>
-              <a:t>11/6/2018</a:t>
+              <a:t>11/8/2018</a:t>
             </a:fld>
             <a:endParaRPr lang="en-US"/>
           </a:p>
@@ -912,7 +997,7 @@
           <a:p>
             <a:fld id="{78C97017-6FC3-485B-9764-EAC9E56C1D49}" type="datetimeFigureOut">
               <a:rPr lang="en-US" smtClean="0"/>
-              <a:t>11/6/2018</a:t>
+              <a:t>11/8/2018</a:t>
             </a:fld>
             <a:endParaRPr lang="en-US"/>
           </a:p>
@@ -1090,7 +1175,7 @@
           <a:p>
             <a:fld id="{78C97017-6FC3-485B-9764-EAC9E56C1D49}" type="datetimeFigureOut">
               <a:rPr lang="en-US" smtClean="0"/>
-              <a:t>11/6/2018</a:t>
+              <a:t>11/8/2018</a:t>
             </a:fld>
             <a:endParaRPr lang="en-US"/>
           </a:p>
@@ -1258,7 +1343,7 @@
           <a:p>
             <a:fld id="{78C97017-6FC3-485B-9764-EAC9E56C1D49}" type="datetimeFigureOut">
               <a:rPr lang="en-US" smtClean="0"/>
-              <a:t>11/6/2018</a:t>
+              <a:t>11/8/2018</a:t>
             </a:fld>
             <a:endParaRPr lang="en-US"/>
           </a:p>
@@ -1503,7 +1588,7 @@
           <a:p>
             <a:fld id="{78C97017-6FC3-485B-9764-EAC9E56C1D49}" type="datetimeFigureOut">
               <a:rPr lang="en-US" smtClean="0"/>
-              <a:t>11/6/2018</a:t>
+              <a:t>11/8/2018</a:t>
             </a:fld>
             <a:endParaRPr lang="en-US"/>
           </a:p>
@@ -1788,7 +1873,7 @@
           <a:p>
             <a:fld id="{78C97017-6FC3-485B-9764-EAC9E56C1D49}" type="datetimeFigureOut">
               <a:rPr lang="en-US" smtClean="0"/>
-              <a:t>11/6/2018</a:t>
+              <a:t>11/8/2018</a:t>
             </a:fld>
             <a:endParaRPr lang="en-US"/>
           </a:p>
@@ -2207,7 +2292,7 @@
           <a:p>
             <a:fld id="{78C97017-6FC3-485B-9764-EAC9E56C1D49}" type="datetimeFigureOut">
               <a:rPr lang="en-US" smtClean="0"/>
-              <a:t>11/6/2018</a:t>
+              <a:t>11/8/2018</a:t>
             </a:fld>
             <a:endParaRPr lang="en-US"/>
           </a:p>
@@ -2324,7 +2409,7 @@
           <a:p>
             <a:fld id="{78C97017-6FC3-485B-9764-EAC9E56C1D49}" type="datetimeFigureOut">
               <a:rPr lang="en-US" smtClean="0"/>
-              <a:t>11/6/2018</a:t>
+              <a:t>11/8/2018</a:t>
             </a:fld>
             <a:endParaRPr lang="en-US"/>
           </a:p>
@@ -2419,7 +2504,7 @@
           <a:p>
             <a:fld id="{78C97017-6FC3-485B-9764-EAC9E56C1D49}" type="datetimeFigureOut">
               <a:rPr lang="en-US" smtClean="0"/>
-              <a:t>11/6/2018</a:t>
+              <a:t>11/8/2018</a:t>
             </a:fld>
             <a:endParaRPr lang="en-US"/>
           </a:p>
@@ -2694,7 +2779,7 @@
           <a:p>
             <a:fld id="{78C97017-6FC3-485B-9764-EAC9E56C1D49}" type="datetimeFigureOut">
               <a:rPr lang="en-US" smtClean="0"/>
-              <a:t>11/6/2018</a:t>
+              <a:t>11/8/2018</a:t>
             </a:fld>
             <a:endParaRPr lang="en-US"/>
           </a:p>
@@ -2946,7 +3031,7 @@
           <a:p>
             <a:fld id="{78C97017-6FC3-485B-9764-EAC9E56C1D49}" type="datetimeFigureOut">
               <a:rPr lang="en-US" smtClean="0"/>
-              <a:t>11/6/2018</a:t>
+              <a:t>11/8/2018</a:t>
             </a:fld>
             <a:endParaRPr lang="en-US"/>
           </a:p>
@@ -3157,7 +3242,7 @@
           <a:p>
             <a:fld id="{78C97017-6FC3-485B-9764-EAC9E56C1D49}" type="datetimeFigureOut">
               <a:rPr lang="en-US" smtClean="0"/>
-              <a:t>11/6/2018</a:t>
+              <a:t>11/8/2018</a:t>
             </a:fld>
             <a:endParaRPr lang="en-US"/>
           </a:p>
@@ -10316,6 +10401,4491 @@
 </file>
 
 <file path=ppt/slides/slide6.xml><?xml version="1.0" encoding="utf-8"?>
+<p:sld xmlns:a="http://schemas.openxmlformats.org/drawingml/2006/main" xmlns:r="http://schemas.openxmlformats.org/officeDocument/2006/relationships" xmlns:p="http://schemas.openxmlformats.org/presentationml/2006/main">
+  <p:cSld>
+    <p:spTree>
+      <p:nvGrpSpPr>
+        <p:cNvPr id="1" name=""/>
+        <p:cNvGrpSpPr/>
+        <p:nvPr/>
+      </p:nvGrpSpPr>
+      <p:grpSpPr>
+        <a:xfrm>
+          <a:off x="0" y="0"/>
+          <a:ext cx="0" cy="0"/>
+          <a:chOff x="0" y="0"/>
+          <a:chExt cx="0" cy="0"/>
+        </a:xfrm>
+      </p:grpSpPr>
+      <p:sp>
+        <p:nvSpPr>
+          <p:cNvPr id="74" name="Rectangle 65">
+            <a:extLst>
+              <a:ext uri="{FF2B5EF4-FFF2-40B4-BE49-F238E27FC236}">
+                <a16:creationId xmlns:a16="http://schemas.microsoft.com/office/drawing/2014/main" id="{16F46D60-B23E-42F6-9A91-EB4029C414A3}"/>
+              </a:ext>
+            </a:extLst>
+          </p:cNvPr>
+          <p:cNvSpPr/>
+          <p:nvPr/>
+        </p:nvSpPr>
+        <p:spPr>
+          <a:xfrm>
+            <a:off x="113164" y="565913"/>
+            <a:ext cx="8802236" cy="6040606"/>
+          </a:xfrm>
+          <a:prstGeom prst="roundRect">
+            <a:avLst>
+              <a:gd name="adj" fmla="val 3484"/>
+            </a:avLst>
+          </a:prstGeom>
+          <a:solidFill>
+            <a:schemeClr val="accent4">
+              <a:lumMod val="20000"/>
+              <a:lumOff val="80000"/>
+            </a:schemeClr>
+          </a:solidFill>
+          <a:ln w="19050">
+            <a:noFill/>
+          </a:ln>
+          <a:effectLst/>
+        </p:spPr>
+        <p:style>
+          <a:lnRef idx="1">
+            <a:schemeClr val="accent2"/>
+          </a:lnRef>
+          <a:fillRef idx="2">
+            <a:schemeClr val="accent2"/>
+          </a:fillRef>
+          <a:effectRef idx="1">
+            <a:schemeClr val="accent2"/>
+          </a:effectRef>
+          <a:fontRef idx="minor">
+            <a:schemeClr val="dk1"/>
+          </a:fontRef>
+        </p:style>
+        <p:txBody>
+          <a:bodyPr rtlCol="0" anchor="t"/>
+          <a:lstStyle/>
+          <a:p>
+            <a:r>
+              <a:rPr lang="en-US" sz="1400" b="1" dirty="0">
+                <a:solidFill>
+                  <a:srgbClr val="7030A0"/>
+                </a:solidFill>
+              </a:rPr>
+              <a:t>Data</a:t>
+            </a:r>
+            <a:endParaRPr lang="en-SG" sz="1400" b="1" dirty="0">
+              <a:solidFill>
+                <a:srgbClr val="7030A0"/>
+              </a:solidFill>
+            </a:endParaRPr>
+          </a:p>
+        </p:txBody>
+      </p:sp>
+      <p:cxnSp>
+        <p:nvCxnSpPr>
+          <p:cNvPr id="75" name="Elbow Connector 122"/>
+          <p:cNvCxnSpPr/>
+          <p:nvPr/>
+        </p:nvCxnSpPr>
+        <p:spPr>
+          <a:xfrm>
+            <a:off x="-101241" y="3065185"/>
+            <a:ext cx="419548" cy="2860"/>
+          </a:xfrm>
+          <a:prstGeom prst="bentConnector3">
+            <a:avLst>
+              <a:gd name="adj1" fmla="val 50000"/>
+            </a:avLst>
+          </a:prstGeom>
+          <a:ln w="19050">
+            <a:solidFill>
+              <a:schemeClr val="bg1">
+                <a:lumMod val="75000"/>
+              </a:schemeClr>
+            </a:solidFill>
+            <a:prstDash val="sysDot"/>
+            <a:headEnd type="none" w="med" len="med"/>
+            <a:tailEnd type="arrow" w="med" len="med"/>
+          </a:ln>
+          <a:effectLst/>
+        </p:spPr>
+        <p:style>
+          <a:lnRef idx="1">
+            <a:schemeClr val="accent2"/>
+          </a:lnRef>
+          <a:fillRef idx="2">
+            <a:schemeClr val="accent2"/>
+          </a:fillRef>
+          <a:effectRef idx="1">
+            <a:schemeClr val="accent2"/>
+          </a:effectRef>
+          <a:fontRef idx="minor">
+            <a:schemeClr val="dk1"/>
+          </a:fontRef>
+        </p:style>
+      </p:cxnSp>
+      <p:sp>
+        <p:nvSpPr>
+          <p:cNvPr id="46" name="Rectangle 8"/>
+          <p:cNvSpPr/>
+          <p:nvPr/>
+        </p:nvSpPr>
+        <p:spPr>
+          <a:xfrm>
+            <a:off x="304290" y="2907965"/>
+            <a:ext cx="829704" cy="261993"/>
+          </a:xfrm>
+          <a:prstGeom prst="rect">
+            <a:avLst/>
+          </a:prstGeom>
+          <a:ln w="19050">
+            <a:solidFill>
+              <a:srgbClr val="7030A0"/>
+            </a:solidFill>
+          </a:ln>
+          <a:effectLst/>
+        </p:spPr>
+        <p:style>
+          <a:lnRef idx="1">
+            <a:schemeClr val="accent4"/>
+          </a:lnRef>
+          <a:fillRef idx="2">
+            <a:schemeClr val="accent4"/>
+          </a:fillRef>
+          <a:effectRef idx="1">
+            <a:schemeClr val="accent4"/>
+          </a:effectRef>
+          <a:fontRef idx="minor">
+            <a:schemeClr val="dk1"/>
+          </a:fontRef>
+        </p:style>
+        <p:txBody>
+          <a:bodyPr rtlCol="0" anchor="ctr"/>
+          <a:lstStyle/>
+          <a:p>
+            <a:pPr algn="ctr"/>
+            <a:r>
+              <a:rPr lang="en-US" sz="1050" dirty="0">
+                <a:solidFill>
+                  <a:srgbClr val="7030A0"/>
+                </a:solidFill>
+              </a:rPr>
+              <a:t>RMS</a:t>
+            </a:r>
+            <a:endParaRPr lang="en-SG" sz="1050" dirty="0">
+              <a:solidFill>
+                <a:srgbClr val="7030A0"/>
+              </a:solidFill>
+            </a:endParaRPr>
+          </a:p>
+        </p:txBody>
+      </p:sp>
+      <p:sp>
+        <p:nvSpPr>
+          <p:cNvPr id="49" name="Rectangle 8"/>
+          <p:cNvSpPr/>
+          <p:nvPr/>
+        </p:nvSpPr>
+        <p:spPr>
+          <a:xfrm>
+            <a:off x="1994022" y="1503020"/>
+            <a:ext cx="1358772" cy="346760"/>
+          </a:xfrm>
+          <a:prstGeom prst="rect">
+            <a:avLst/>
+          </a:prstGeom>
+          <a:ln w="19050">
+            <a:solidFill>
+              <a:srgbClr val="7030A0"/>
+            </a:solidFill>
+          </a:ln>
+          <a:effectLst/>
+        </p:spPr>
+        <p:style>
+          <a:lnRef idx="1">
+            <a:schemeClr val="accent4"/>
+          </a:lnRef>
+          <a:fillRef idx="2">
+            <a:schemeClr val="accent4"/>
+          </a:fillRef>
+          <a:effectRef idx="1">
+            <a:schemeClr val="accent4"/>
+          </a:effectRef>
+          <a:fontRef idx="minor">
+            <a:schemeClr val="dk1"/>
+          </a:fontRef>
+        </p:style>
+        <p:txBody>
+          <a:bodyPr rtlCol="0" anchor="ctr"/>
+          <a:lstStyle/>
+          <a:p>
+            <a:pPr algn="ctr"/>
+            <a:r>
+              <a:rPr lang="en-US" sz="1050" dirty="0" err="1">
+                <a:solidFill>
+                  <a:srgbClr val="7030A0"/>
+                </a:solidFill>
+              </a:rPr>
+              <a:t>UniqueEmployeeList</a:t>
+            </a:r>
+            <a:endParaRPr lang="en-SG" sz="1050" dirty="0">
+              <a:solidFill>
+                <a:srgbClr val="7030A0"/>
+              </a:solidFill>
+            </a:endParaRPr>
+          </a:p>
+        </p:txBody>
+      </p:sp>
+      <p:sp>
+        <p:nvSpPr>
+          <p:cNvPr id="62" name="Rectangle 8"/>
+          <p:cNvSpPr/>
+          <p:nvPr/>
+        </p:nvSpPr>
+        <p:spPr>
+          <a:xfrm>
+            <a:off x="3746615" y="1497652"/>
+            <a:ext cx="769442" cy="346760"/>
+          </a:xfrm>
+          <a:prstGeom prst="rect">
+            <a:avLst/>
+          </a:prstGeom>
+          <a:ln w="19050">
+            <a:solidFill>
+              <a:srgbClr val="7030A0"/>
+            </a:solidFill>
+          </a:ln>
+          <a:effectLst/>
+        </p:spPr>
+        <p:style>
+          <a:lnRef idx="1">
+            <a:schemeClr val="accent4"/>
+          </a:lnRef>
+          <a:fillRef idx="2">
+            <a:schemeClr val="accent4"/>
+          </a:fillRef>
+          <a:effectRef idx="1">
+            <a:schemeClr val="accent4"/>
+          </a:effectRef>
+          <a:fontRef idx="minor">
+            <a:schemeClr val="dk1"/>
+          </a:fontRef>
+        </p:style>
+        <p:txBody>
+          <a:bodyPr rtlCol="0" anchor="ctr"/>
+          <a:lstStyle/>
+          <a:p>
+            <a:pPr algn="ctr"/>
+            <a:r>
+              <a:rPr lang="en-US" sz="1050" dirty="0">
+                <a:solidFill>
+                  <a:srgbClr val="7030A0"/>
+                </a:solidFill>
+              </a:rPr>
+              <a:t>Employee</a:t>
+            </a:r>
+            <a:endParaRPr lang="en-SG" sz="1050" dirty="0">
+              <a:solidFill>
+                <a:srgbClr val="7030A0"/>
+              </a:solidFill>
+            </a:endParaRPr>
+          </a:p>
+        </p:txBody>
+      </p:sp>
+      <p:sp>
+        <p:nvSpPr>
+          <p:cNvPr id="63" name="Flowchart: Decision 96"/>
+          <p:cNvSpPr/>
+          <p:nvPr/>
+        </p:nvSpPr>
+        <p:spPr>
+          <a:xfrm>
+            <a:off x="3352945" y="1581262"/>
+            <a:ext cx="236048" cy="173380"/>
+          </a:xfrm>
+          <a:prstGeom prst="flowChartDecision">
+            <a:avLst/>
+          </a:prstGeom>
+          <a:noFill/>
+          <a:ln w="19050">
+            <a:solidFill>
+              <a:srgbClr val="7030A0"/>
+            </a:solidFill>
+          </a:ln>
+          <a:effectLst/>
+        </p:spPr>
+        <p:style>
+          <a:lnRef idx="1">
+            <a:schemeClr val="accent6"/>
+          </a:lnRef>
+          <a:fillRef idx="2">
+            <a:schemeClr val="accent6"/>
+          </a:fillRef>
+          <a:effectRef idx="1">
+            <a:schemeClr val="accent6"/>
+          </a:effectRef>
+          <a:fontRef idx="minor">
+            <a:schemeClr val="dk1"/>
+          </a:fontRef>
+        </p:style>
+        <p:txBody>
+          <a:bodyPr rtlCol="0" anchor="ctr"/>
+          <a:lstStyle/>
+          <a:p>
+            <a:pPr algn="ctr"/>
+            <a:endParaRPr lang="en-US" sz="1050"/>
+          </a:p>
+        </p:txBody>
+      </p:sp>
+      <p:sp>
+        <p:nvSpPr>
+          <p:cNvPr id="76" name="Rectangle 8"/>
+          <p:cNvSpPr/>
+          <p:nvPr/>
+        </p:nvSpPr>
+        <p:spPr>
+          <a:xfrm>
+            <a:off x="5242508" y="1204266"/>
+            <a:ext cx="1194206" cy="285783"/>
+          </a:xfrm>
+          <a:prstGeom prst="rect">
+            <a:avLst/>
+          </a:prstGeom>
+          <a:ln w="19050">
+            <a:solidFill>
+              <a:srgbClr val="7030A0"/>
+            </a:solidFill>
+          </a:ln>
+          <a:effectLst/>
+        </p:spPr>
+        <p:style>
+          <a:lnRef idx="1">
+            <a:schemeClr val="accent4"/>
+          </a:lnRef>
+          <a:fillRef idx="2">
+            <a:schemeClr val="accent4"/>
+          </a:fillRef>
+          <a:effectRef idx="1">
+            <a:schemeClr val="accent4"/>
+          </a:effectRef>
+          <a:fontRef idx="minor">
+            <a:schemeClr val="dk1"/>
+          </a:fontRef>
+        </p:style>
+        <p:txBody>
+          <a:bodyPr rtlCol="0" anchor="ctr"/>
+          <a:lstStyle/>
+          <a:p>
+            <a:pPr algn="ctr"/>
+            <a:r>
+              <a:rPr lang="en-US" sz="1050" dirty="0" err="1">
+                <a:solidFill>
+                  <a:srgbClr val="7030A0"/>
+                </a:solidFill>
+              </a:rPr>
+              <a:t>EmployeePhone</a:t>
+            </a:r>
+            <a:endParaRPr lang="en-SG" sz="1050" dirty="0">
+              <a:solidFill>
+                <a:srgbClr val="7030A0"/>
+              </a:solidFill>
+            </a:endParaRPr>
+          </a:p>
+        </p:txBody>
+      </p:sp>
+      <p:sp>
+        <p:nvSpPr>
+          <p:cNvPr id="78" name="Flowchart: Decision 96"/>
+          <p:cNvSpPr/>
+          <p:nvPr/>
+        </p:nvSpPr>
+        <p:spPr>
+          <a:xfrm>
+            <a:off x="4536141" y="1587787"/>
+            <a:ext cx="236048" cy="173380"/>
+          </a:xfrm>
+          <a:prstGeom prst="flowChartDecision">
+            <a:avLst/>
+          </a:prstGeom>
+          <a:solidFill>
+            <a:srgbClr val="7030A0"/>
+          </a:solidFill>
+          <a:ln w="19050">
+            <a:solidFill>
+              <a:srgbClr val="7030A0"/>
+            </a:solidFill>
+          </a:ln>
+          <a:effectLst/>
+        </p:spPr>
+        <p:style>
+          <a:lnRef idx="1">
+            <a:schemeClr val="accent6"/>
+          </a:lnRef>
+          <a:fillRef idx="2">
+            <a:schemeClr val="accent6"/>
+          </a:fillRef>
+          <a:effectRef idx="1">
+            <a:schemeClr val="accent6"/>
+          </a:effectRef>
+          <a:fontRef idx="minor">
+            <a:schemeClr val="dk1"/>
+          </a:fontRef>
+        </p:style>
+        <p:txBody>
+          <a:bodyPr rtlCol="0" anchor="ctr"/>
+          <a:lstStyle/>
+          <a:p>
+            <a:pPr algn="ctr"/>
+            <a:endParaRPr lang="en-US" sz="1050"/>
+          </a:p>
+        </p:txBody>
+      </p:sp>
+      <p:sp>
+        <p:nvSpPr>
+          <p:cNvPr id="80" name="Rectangle 8"/>
+          <p:cNvSpPr/>
+          <p:nvPr/>
+        </p:nvSpPr>
+        <p:spPr>
+          <a:xfrm>
+            <a:off x="5238706" y="1527147"/>
+            <a:ext cx="1194207" cy="285783"/>
+          </a:xfrm>
+          <a:prstGeom prst="rect">
+            <a:avLst/>
+          </a:prstGeom>
+          <a:ln w="19050">
+            <a:solidFill>
+              <a:srgbClr val="7030A0"/>
+            </a:solidFill>
+          </a:ln>
+          <a:effectLst/>
+        </p:spPr>
+        <p:style>
+          <a:lnRef idx="1">
+            <a:schemeClr val="accent4"/>
+          </a:lnRef>
+          <a:fillRef idx="2">
+            <a:schemeClr val="accent4"/>
+          </a:fillRef>
+          <a:effectRef idx="1">
+            <a:schemeClr val="accent4"/>
+          </a:effectRef>
+          <a:fontRef idx="minor">
+            <a:schemeClr val="dk1"/>
+          </a:fontRef>
+        </p:style>
+        <p:txBody>
+          <a:bodyPr rtlCol="0" anchor="ctr"/>
+          <a:lstStyle/>
+          <a:p>
+            <a:pPr algn="ctr"/>
+            <a:r>
+              <a:rPr lang="en-US" sz="1050" dirty="0" err="1">
+                <a:solidFill>
+                  <a:srgbClr val="7030A0"/>
+                </a:solidFill>
+              </a:rPr>
+              <a:t>EmployeeEmail</a:t>
+            </a:r>
+            <a:endParaRPr lang="en-SG" sz="1050" dirty="0">
+              <a:solidFill>
+                <a:srgbClr val="7030A0"/>
+              </a:solidFill>
+            </a:endParaRPr>
+          </a:p>
+        </p:txBody>
+      </p:sp>
+      <p:sp>
+        <p:nvSpPr>
+          <p:cNvPr id="83" name="Rectangle 8"/>
+          <p:cNvSpPr/>
+          <p:nvPr/>
+        </p:nvSpPr>
+        <p:spPr>
+          <a:xfrm>
+            <a:off x="5238704" y="1842192"/>
+            <a:ext cx="1194209" cy="285783"/>
+          </a:xfrm>
+          <a:prstGeom prst="rect">
+            <a:avLst/>
+          </a:prstGeom>
+          <a:ln w="19050">
+            <a:solidFill>
+              <a:srgbClr val="7030A0"/>
+            </a:solidFill>
+          </a:ln>
+          <a:effectLst/>
+        </p:spPr>
+        <p:style>
+          <a:lnRef idx="1">
+            <a:schemeClr val="accent4"/>
+          </a:lnRef>
+          <a:fillRef idx="2">
+            <a:schemeClr val="accent4"/>
+          </a:fillRef>
+          <a:effectRef idx="1">
+            <a:schemeClr val="accent4"/>
+          </a:effectRef>
+          <a:fontRef idx="minor">
+            <a:schemeClr val="dk1"/>
+          </a:fontRef>
+        </p:style>
+        <p:txBody>
+          <a:bodyPr rtlCol="0" anchor="ctr"/>
+          <a:lstStyle/>
+          <a:p>
+            <a:pPr algn="ctr"/>
+            <a:r>
+              <a:rPr lang="en-US" sz="1050" dirty="0" err="1">
+                <a:solidFill>
+                  <a:srgbClr val="7030A0"/>
+                </a:solidFill>
+              </a:rPr>
+              <a:t>EmployeeAddress</a:t>
+            </a:r>
+            <a:endParaRPr lang="en-SG" sz="1050" dirty="0">
+              <a:solidFill>
+                <a:srgbClr val="7030A0"/>
+              </a:solidFill>
+            </a:endParaRPr>
+          </a:p>
+        </p:txBody>
+      </p:sp>
+      <p:sp>
+        <p:nvSpPr>
+          <p:cNvPr id="85" name="Rectangle 8"/>
+          <p:cNvSpPr/>
+          <p:nvPr/>
+        </p:nvSpPr>
+        <p:spPr>
+          <a:xfrm>
+            <a:off x="5238704" y="2173647"/>
+            <a:ext cx="1194207" cy="285783"/>
+          </a:xfrm>
+          <a:prstGeom prst="rect">
+            <a:avLst/>
+          </a:prstGeom>
+          <a:ln w="19050">
+            <a:solidFill>
+              <a:srgbClr val="7030A0"/>
+            </a:solidFill>
+          </a:ln>
+          <a:effectLst/>
+        </p:spPr>
+        <p:style>
+          <a:lnRef idx="1">
+            <a:schemeClr val="accent4"/>
+          </a:lnRef>
+          <a:fillRef idx="2">
+            <a:schemeClr val="accent4"/>
+          </a:fillRef>
+          <a:effectRef idx="1">
+            <a:schemeClr val="accent4"/>
+          </a:effectRef>
+          <a:fontRef idx="minor">
+            <a:schemeClr val="dk1"/>
+          </a:fontRef>
+        </p:style>
+        <p:txBody>
+          <a:bodyPr rtlCol="0" anchor="ctr"/>
+          <a:lstStyle/>
+          <a:p>
+            <a:pPr algn="ctr"/>
+            <a:r>
+              <a:rPr lang="en-US" sz="1050" dirty="0" err="1">
+                <a:solidFill>
+                  <a:srgbClr val="7030A0"/>
+                </a:solidFill>
+              </a:rPr>
+              <a:t>EmployeePosition</a:t>
+            </a:r>
+            <a:endParaRPr lang="en-SG" sz="1050" dirty="0">
+              <a:solidFill>
+                <a:srgbClr val="7030A0"/>
+              </a:solidFill>
+            </a:endParaRPr>
+          </a:p>
+        </p:txBody>
+      </p:sp>
+      <p:sp>
+        <p:nvSpPr>
+          <p:cNvPr id="61" name="TextBox 60"/>
+          <p:cNvSpPr txBox="1"/>
+          <p:nvPr/>
+        </p:nvSpPr>
+        <p:spPr>
+          <a:xfrm>
+            <a:off x="3597938" y="1492830"/>
+            <a:ext cx="189257" cy="178683"/>
+          </a:xfrm>
+          <a:prstGeom prst="rect">
+            <a:avLst/>
+          </a:prstGeom>
+          <a:noFill/>
+        </p:spPr>
+        <p:txBody>
+          <a:bodyPr wrap="square" lIns="0" tIns="0" rIns="0" bIns="0" rtlCol="0">
+            <a:noAutofit/>
+          </a:bodyPr>
+          <a:lstStyle/>
+          <a:p>
+            <a:pPr algn="ctr"/>
+            <a:r>
+              <a:rPr lang="en-US" sz="1100" dirty="0">
+                <a:solidFill>
+                  <a:srgbClr val="7030A0"/>
+                </a:solidFill>
+              </a:rPr>
+              <a:t>*</a:t>
+            </a:r>
+            <a:endParaRPr lang="en-SG" sz="1100" dirty="0">
+              <a:solidFill>
+                <a:srgbClr val="7030A0"/>
+              </a:solidFill>
+            </a:endParaRPr>
+          </a:p>
+        </p:txBody>
+      </p:sp>
+      <p:sp>
+        <p:nvSpPr>
+          <p:cNvPr id="52" name="Rectangle 8">
+            <a:extLst>
+              <a:ext uri="{FF2B5EF4-FFF2-40B4-BE49-F238E27FC236}">
+                <a16:creationId xmlns:a16="http://schemas.microsoft.com/office/drawing/2014/main" id="{ABDCDBD2-131A-4B66-A2F2-43BBEE82C773}"/>
+              </a:ext>
+            </a:extLst>
+          </p:cNvPr>
+          <p:cNvSpPr/>
+          <p:nvPr/>
+        </p:nvSpPr>
+        <p:spPr>
+          <a:xfrm>
+            <a:off x="5242508" y="869060"/>
+            <a:ext cx="1194206" cy="285783"/>
+          </a:xfrm>
+          <a:prstGeom prst="rect">
+            <a:avLst/>
+          </a:prstGeom>
+          <a:ln w="19050">
+            <a:solidFill>
+              <a:srgbClr val="7030A0"/>
+            </a:solidFill>
+          </a:ln>
+          <a:effectLst/>
+        </p:spPr>
+        <p:style>
+          <a:lnRef idx="1">
+            <a:schemeClr val="accent4"/>
+          </a:lnRef>
+          <a:fillRef idx="2">
+            <a:schemeClr val="accent4"/>
+          </a:fillRef>
+          <a:effectRef idx="1">
+            <a:schemeClr val="accent4"/>
+          </a:effectRef>
+          <a:fontRef idx="minor">
+            <a:schemeClr val="dk1"/>
+          </a:fontRef>
+        </p:style>
+        <p:txBody>
+          <a:bodyPr rtlCol="0" anchor="ctr"/>
+          <a:lstStyle/>
+          <a:p>
+            <a:pPr algn="ctr"/>
+            <a:r>
+              <a:rPr lang="en-US" sz="1050" dirty="0" err="1">
+                <a:solidFill>
+                  <a:srgbClr val="7030A0"/>
+                </a:solidFill>
+              </a:rPr>
+              <a:t>EmployeeName</a:t>
+            </a:r>
+            <a:endParaRPr lang="en-SG" sz="1050" dirty="0">
+              <a:solidFill>
+                <a:srgbClr val="7030A0"/>
+              </a:solidFill>
+            </a:endParaRPr>
+          </a:p>
+        </p:txBody>
+      </p:sp>
+      <p:cxnSp>
+        <p:nvCxnSpPr>
+          <p:cNvPr id="14" name="Straight Connector 13">
+            <a:extLst>
+              <a:ext uri="{FF2B5EF4-FFF2-40B4-BE49-F238E27FC236}">
+                <a16:creationId xmlns:a16="http://schemas.microsoft.com/office/drawing/2014/main" id="{441B5885-AA84-4B9C-8251-1C5495C532C9}"/>
+              </a:ext>
+            </a:extLst>
+          </p:cNvPr>
+          <p:cNvCxnSpPr/>
+          <p:nvPr/>
+        </p:nvCxnSpPr>
+        <p:spPr>
+          <a:xfrm>
+            <a:off x="1372737" y="3049313"/>
+            <a:ext cx="227463" cy="0"/>
+          </a:xfrm>
+          <a:prstGeom prst="line">
+            <a:avLst/>
+          </a:prstGeom>
+          <a:ln w="19050"/>
+        </p:spPr>
+        <p:style>
+          <a:lnRef idx="1">
+            <a:schemeClr val="accent4"/>
+          </a:lnRef>
+          <a:fillRef idx="0">
+            <a:schemeClr val="accent4"/>
+          </a:fillRef>
+          <a:effectRef idx="0">
+            <a:schemeClr val="accent4"/>
+          </a:effectRef>
+          <a:fontRef idx="minor">
+            <a:schemeClr val="tx1"/>
+          </a:fontRef>
+        </p:style>
+      </p:cxnSp>
+      <p:cxnSp>
+        <p:nvCxnSpPr>
+          <p:cNvPr id="16" name="Straight Connector 15">
+            <a:extLst>
+              <a:ext uri="{FF2B5EF4-FFF2-40B4-BE49-F238E27FC236}">
+                <a16:creationId xmlns:a16="http://schemas.microsoft.com/office/drawing/2014/main" id="{8BC8FDE2-A66C-4664-B7EE-B6A966A88B15}"/>
+              </a:ext>
+            </a:extLst>
+          </p:cNvPr>
+          <p:cNvCxnSpPr>
+            <a:cxnSpLocks/>
+          </p:cNvCxnSpPr>
+          <p:nvPr/>
+        </p:nvCxnSpPr>
+        <p:spPr>
+          <a:xfrm flipH="1">
+            <a:off x="1567295" y="1676400"/>
+            <a:ext cx="32908" cy="3505200"/>
+          </a:xfrm>
+          <a:prstGeom prst="line">
+            <a:avLst/>
+          </a:prstGeom>
+          <a:ln w="19050"/>
+        </p:spPr>
+        <p:style>
+          <a:lnRef idx="1">
+            <a:schemeClr val="accent4"/>
+          </a:lnRef>
+          <a:fillRef idx="0">
+            <a:schemeClr val="accent4"/>
+          </a:fillRef>
+          <a:effectRef idx="0">
+            <a:schemeClr val="accent4"/>
+          </a:effectRef>
+          <a:fontRef idx="minor">
+            <a:schemeClr val="tx1"/>
+          </a:fontRef>
+        </p:style>
+      </p:cxnSp>
+      <p:cxnSp>
+        <p:nvCxnSpPr>
+          <p:cNvPr id="20" name="Straight Arrow Connector 19">
+            <a:extLst>
+              <a:ext uri="{FF2B5EF4-FFF2-40B4-BE49-F238E27FC236}">
+                <a16:creationId xmlns:a16="http://schemas.microsoft.com/office/drawing/2014/main" id="{977F1C93-DBA4-4ECE-800B-32FB58E78172}"/>
+              </a:ext>
+            </a:extLst>
+          </p:cNvPr>
+          <p:cNvCxnSpPr/>
+          <p:nvPr/>
+        </p:nvCxnSpPr>
+        <p:spPr>
+          <a:xfrm>
+            <a:off x="1600200" y="1676400"/>
+            <a:ext cx="381000" cy="0"/>
+          </a:xfrm>
+          <a:prstGeom prst="straightConnector1">
+            <a:avLst/>
+          </a:prstGeom>
+          <a:ln w="19050">
+            <a:tailEnd type="triangle"/>
+          </a:ln>
+        </p:spPr>
+        <p:style>
+          <a:lnRef idx="1">
+            <a:schemeClr val="accent4"/>
+          </a:lnRef>
+          <a:fillRef idx="0">
+            <a:schemeClr val="accent4"/>
+          </a:fillRef>
+          <a:effectRef idx="0">
+            <a:schemeClr val="accent4"/>
+          </a:effectRef>
+          <a:fontRef idx="minor">
+            <a:schemeClr val="tx1"/>
+          </a:fontRef>
+        </p:style>
+      </p:cxnSp>
+      <p:sp>
+        <p:nvSpPr>
+          <p:cNvPr id="82" name="Rectangle 8">
+            <a:extLst>
+              <a:ext uri="{FF2B5EF4-FFF2-40B4-BE49-F238E27FC236}">
+                <a16:creationId xmlns:a16="http://schemas.microsoft.com/office/drawing/2014/main" id="{FE502197-E262-4EBE-858D-E44431D2B573}"/>
+              </a:ext>
+            </a:extLst>
+          </p:cNvPr>
+          <p:cNvSpPr/>
+          <p:nvPr/>
+        </p:nvSpPr>
+        <p:spPr>
+          <a:xfrm>
+            <a:off x="1975711" y="2637343"/>
+            <a:ext cx="1358772" cy="346760"/>
+          </a:xfrm>
+          <a:prstGeom prst="rect">
+            <a:avLst/>
+          </a:prstGeom>
+          <a:ln w="19050">
+            <a:solidFill>
+              <a:srgbClr val="7030A0"/>
+            </a:solidFill>
+          </a:ln>
+          <a:effectLst/>
+        </p:spPr>
+        <p:style>
+          <a:lnRef idx="1">
+            <a:schemeClr val="accent4"/>
+          </a:lnRef>
+          <a:fillRef idx="2">
+            <a:schemeClr val="accent4"/>
+          </a:fillRef>
+          <a:effectRef idx="1">
+            <a:schemeClr val="accent4"/>
+          </a:effectRef>
+          <a:fontRef idx="minor">
+            <a:schemeClr val="dk1"/>
+          </a:fontRef>
+        </p:style>
+        <p:txBody>
+          <a:bodyPr rtlCol="0" anchor="ctr"/>
+          <a:lstStyle/>
+          <a:p>
+            <a:pPr algn="ctr"/>
+            <a:r>
+              <a:rPr lang="en-US" sz="1050" dirty="0" err="1">
+                <a:solidFill>
+                  <a:srgbClr val="7030A0"/>
+                </a:solidFill>
+              </a:rPr>
+              <a:t>UniqueMemberList</a:t>
+            </a:r>
+            <a:endParaRPr lang="en-SG" sz="1050" dirty="0">
+              <a:solidFill>
+                <a:srgbClr val="7030A0"/>
+              </a:solidFill>
+            </a:endParaRPr>
+          </a:p>
+        </p:txBody>
+      </p:sp>
+      <p:sp>
+        <p:nvSpPr>
+          <p:cNvPr id="87" name="Rectangle 8">
+            <a:extLst>
+              <a:ext uri="{FF2B5EF4-FFF2-40B4-BE49-F238E27FC236}">
+                <a16:creationId xmlns:a16="http://schemas.microsoft.com/office/drawing/2014/main" id="{032BA822-9C54-42C6-BC9C-01267CA8A6B7}"/>
+              </a:ext>
+            </a:extLst>
+          </p:cNvPr>
+          <p:cNvSpPr/>
+          <p:nvPr/>
+        </p:nvSpPr>
+        <p:spPr>
+          <a:xfrm>
+            <a:off x="5722332" y="2644450"/>
+            <a:ext cx="769442" cy="346760"/>
+          </a:xfrm>
+          <a:prstGeom prst="rect">
+            <a:avLst/>
+          </a:prstGeom>
+          <a:ln w="19050">
+            <a:solidFill>
+              <a:srgbClr val="7030A0"/>
+            </a:solidFill>
+          </a:ln>
+          <a:effectLst/>
+        </p:spPr>
+        <p:style>
+          <a:lnRef idx="1">
+            <a:schemeClr val="accent4"/>
+          </a:lnRef>
+          <a:fillRef idx="2">
+            <a:schemeClr val="accent4"/>
+          </a:fillRef>
+          <a:effectRef idx="1">
+            <a:schemeClr val="accent4"/>
+          </a:effectRef>
+          <a:fontRef idx="minor">
+            <a:schemeClr val="dk1"/>
+          </a:fontRef>
+        </p:style>
+        <p:txBody>
+          <a:bodyPr rtlCol="0" anchor="ctr"/>
+          <a:lstStyle/>
+          <a:p>
+            <a:pPr algn="ctr"/>
+            <a:r>
+              <a:rPr lang="en-US" sz="1050" dirty="0">
+                <a:solidFill>
+                  <a:srgbClr val="7030A0"/>
+                </a:solidFill>
+              </a:rPr>
+              <a:t>Member</a:t>
+            </a:r>
+            <a:endParaRPr lang="en-SG" sz="1050" dirty="0">
+              <a:solidFill>
+                <a:srgbClr val="7030A0"/>
+              </a:solidFill>
+            </a:endParaRPr>
+          </a:p>
+        </p:txBody>
+      </p:sp>
+      <p:sp>
+        <p:nvSpPr>
+          <p:cNvPr id="88" name="Flowchart: Decision 96">
+            <a:extLst>
+              <a:ext uri="{FF2B5EF4-FFF2-40B4-BE49-F238E27FC236}">
+                <a16:creationId xmlns:a16="http://schemas.microsoft.com/office/drawing/2014/main" id="{686773B0-C6F6-4E20-A455-9E32CC13749E}"/>
+              </a:ext>
+            </a:extLst>
+          </p:cNvPr>
+          <p:cNvSpPr/>
+          <p:nvPr/>
+        </p:nvSpPr>
+        <p:spPr>
+          <a:xfrm>
+            <a:off x="3326875" y="2734617"/>
+            <a:ext cx="236048" cy="173380"/>
+          </a:xfrm>
+          <a:prstGeom prst="flowChartDecision">
+            <a:avLst/>
+          </a:prstGeom>
+          <a:noFill/>
+          <a:ln w="19050">
+            <a:solidFill>
+              <a:srgbClr val="7030A0"/>
+            </a:solidFill>
+          </a:ln>
+          <a:effectLst/>
+        </p:spPr>
+        <p:style>
+          <a:lnRef idx="1">
+            <a:schemeClr val="accent6"/>
+          </a:lnRef>
+          <a:fillRef idx="2">
+            <a:schemeClr val="accent6"/>
+          </a:fillRef>
+          <a:effectRef idx="1">
+            <a:schemeClr val="accent6"/>
+          </a:effectRef>
+          <a:fontRef idx="minor">
+            <a:schemeClr val="dk1"/>
+          </a:fontRef>
+        </p:style>
+        <p:txBody>
+          <a:bodyPr rtlCol="0" anchor="ctr"/>
+          <a:lstStyle/>
+          <a:p>
+            <a:pPr algn="ctr"/>
+            <a:endParaRPr lang="en-US" sz="1050"/>
+          </a:p>
+        </p:txBody>
+      </p:sp>
+      <p:sp>
+        <p:nvSpPr>
+          <p:cNvPr id="91" name="Flowchart: Decision 96">
+            <a:extLst>
+              <a:ext uri="{FF2B5EF4-FFF2-40B4-BE49-F238E27FC236}">
+                <a16:creationId xmlns:a16="http://schemas.microsoft.com/office/drawing/2014/main" id="{ED97A564-ED26-44D6-83B2-01ACD1999F47}"/>
+              </a:ext>
+            </a:extLst>
+          </p:cNvPr>
+          <p:cNvSpPr/>
+          <p:nvPr/>
+        </p:nvSpPr>
+        <p:spPr>
+          <a:xfrm>
+            <a:off x="6511858" y="2734585"/>
+            <a:ext cx="236048" cy="173380"/>
+          </a:xfrm>
+          <a:prstGeom prst="flowChartDecision">
+            <a:avLst/>
+          </a:prstGeom>
+          <a:solidFill>
+            <a:srgbClr val="7030A0"/>
+          </a:solidFill>
+          <a:ln w="19050">
+            <a:solidFill>
+              <a:srgbClr val="7030A0"/>
+            </a:solidFill>
+          </a:ln>
+          <a:effectLst/>
+        </p:spPr>
+        <p:style>
+          <a:lnRef idx="1">
+            <a:schemeClr val="accent6"/>
+          </a:lnRef>
+          <a:fillRef idx="2">
+            <a:schemeClr val="accent6"/>
+          </a:fillRef>
+          <a:effectRef idx="1">
+            <a:schemeClr val="accent6"/>
+          </a:effectRef>
+          <a:fontRef idx="minor">
+            <a:schemeClr val="dk1"/>
+          </a:fontRef>
+        </p:style>
+        <p:txBody>
+          <a:bodyPr rtlCol="0" anchor="ctr"/>
+          <a:lstStyle/>
+          <a:p>
+            <a:pPr algn="ctr"/>
+            <a:endParaRPr lang="en-US" sz="1050"/>
+          </a:p>
+        </p:txBody>
+      </p:sp>
+      <p:sp>
+        <p:nvSpPr>
+          <p:cNvPr id="93" name="Rectangle 8">
+            <a:extLst>
+              <a:ext uri="{FF2B5EF4-FFF2-40B4-BE49-F238E27FC236}">
+                <a16:creationId xmlns:a16="http://schemas.microsoft.com/office/drawing/2014/main" id="{8E103BF5-8140-4A7D-9D46-857DA4DF0537}"/>
+              </a:ext>
+            </a:extLst>
+          </p:cNvPr>
+          <p:cNvSpPr/>
+          <p:nvPr/>
+        </p:nvSpPr>
+        <p:spPr>
+          <a:xfrm>
+            <a:off x="7205170" y="2354303"/>
+            <a:ext cx="1194207" cy="285783"/>
+          </a:xfrm>
+          <a:prstGeom prst="rect">
+            <a:avLst/>
+          </a:prstGeom>
+          <a:ln w="19050">
+            <a:solidFill>
+              <a:srgbClr val="7030A0"/>
+            </a:solidFill>
+          </a:ln>
+          <a:effectLst/>
+        </p:spPr>
+        <p:style>
+          <a:lnRef idx="1">
+            <a:schemeClr val="accent4"/>
+          </a:lnRef>
+          <a:fillRef idx="2">
+            <a:schemeClr val="accent4"/>
+          </a:fillRef>
+          <a:effectRef idx="1">
+            <a:schemeClr val="accent4"/>
+          </a:effectRef>
+          <a:fontRef idx="minor">
+            <a:schemeClr val="dk1"/>
+          </a:fontRef>
+        </p:style>
+        <p:txBody>
+          <a:bodyPr rtlCol="0" anchor="ctr"/>
+          <a:lstStyle/>
+          <a:p>
+            <a:pPr algn="ctr"/>
+            <a:r>
+              <a:rPr lang="en-US" sz="1050" dirty="0" err="1">
+                <a:solidFill>
+                  <a:srgbClr val="7030A0"/>
+                </a:solidFill>
+              </a:rPr>
+              <a:t>MemberName</a:t>
+            </a:r>
+            <a:endParaRPr lang="en-SG" sz="1050" dirty="0">
+              <a:solidFill>
+                <a:srgbClr val="7030A0"/>
+              </a:solidFill>
+            </a:endParaRPr>
+          </a:p>
+        </p:txBody>
+      </p:sp>
+      <p:sp>
+        <p:nvSpPr>
+          <p:cNvPr id="95" name="Rectangle 8">
+            <a:extLst>
+              <a:ext uri="{FF2B5EF4-FFF2-40B4-BE49-F238E27FC236}">
+                <a16:creationId xmlns:a16="http://schemas.microsoft.com/office/drawing/2014/main" id="{E2CAC249-F3A1-4507-8CCF-DBBCB75CB10F}"/>
+              </a:ext>
+            </a:extLst>
+          </p:cNvPr>
+          <p:cNvSpPr/>
+          <p:nvPr/>
+        </p:nvSpPr>
+        <p:spPr>
+          <a:xfrm>
+            <a:off x="7221081" y="2741734"/>
+            <a:ext cx="1194209" cy="285783"/>
+          </a:xfrm>
+          <a:prstGeom prst="rect">
+            <a:avLst/>
+          </a:prstGeom>
+          <a:ln w="19050">
+            <a:solidFill>
+              <a:srgbClr val="7030A0"/>
+            </a:solidFill>
+          </a:ln>
+          <a:effectLst/>
+        </p:spPr>
+        <p:style>
+          <a:lnRef idx="1">
+            <a:schemeClr val="accent4"/>
+          </a:lnRef>
+          <a:fillRef idx="2">
+            <a:schemeClr val="accent4"/>
+          </a:fillRef>
+          <a:effectRef idx="1">
+            <a:schemeClr val="accent4"/>
+          </a:effectRef>
+          <a:fontRef idx="minor">
+            <a:schemeClr val="dk1"/>
+          </a:fontRef>
+        </p:style>
+        <p:txBody>
+          <a:bodyPr rtlCol="0" anchor="ctr"/>
+          <a:lstStyle/>
+          <a:p>
+            <a:pPr algn="ctr"/>
+            <a:r>
+              <a:rPr lang="en-US" sz="1050" dirty="0">
+                <a:solidFill>
+                  <a:srgbClr val="7030A0"/>
+                </a:solidFill>
+              </a:rPr>
+              <a:t>Points</a:t>
+            </a:r>
+            <a:endParaRPr lang="en-SG" sz="1050" dirty="0">
+              <a:solidFill>
+                <a:srgbClr val="7030A0"/>
+              </a:solidFill>
+            </a:endParaRPr>
+          </a:p>
+        </p:txBody>
+      </p:sp>
+      <p:sp>
+        <p:nvSpPr>
+          <p:cNvPr id="102" name="TextBox 101">
+            <a:extLst>
+              <a:ext uri="{FF2B5EF4-FFF2-40B4-BE49-F238E27FC236}">
+                <a16:creationId xmlns:a16="http://schemas.microsoft.com/office/drawing/2014/main" id="{1A0DA7CC-EA07-4752-8812-B17902BA377C}"/>
+              </a:ext>
+            </a:extLst>
+          </p:cNvPr>
+          <p:cNvSpPr txBox="1"/>
+          <p:nvPr/>
+        </p:nvSpPr>
+        <p:spPr>
+          <a:xfrm>
+            <a:off x="3557358" y="2699585"/>
+            <a:ext cx="189257" cy="178683"/>
+          </a:xfrm>
+          <a:prstGeom prst="rect">
+            <a:avLst/>
+          </a:prstGeom>
+          <a:noFill/>
+        </p:spPr>
+        <p:txBody>
+          <a:bodyPr wrap="square" lIns="0" tIns="0" rIns="0" bIns="0" rtlCol="0">
+            <a:noAutofit/>
+          </a:bodyPr>
+          <a:lstStyle/>
+          <a:p>
+            <a:pPr algn="ctr"/>
+            <a:r>
+              <a:rPr lang="en-US" sz="1100" dirty="0">
+                <a:solidFill>
+                  <a:srgbClr val="7030A0"/>
+                </a:solidFill>
+              </a:rPr>
+              <a:t>*</a:t>
+            </a:r>
+            <a:endParaRPr lang="en-SG" sz="1100" dirty="0">
+              <a:solidFill>
+                <a:srgbClr val="7030A0"/>
+              </a:solidFill>
+            </a:endParaRPr>
+          </a:p>
+        </p:txBody>
+      </p:sp>
+      <p:sp>
+        <p:nvSpPr>
+          <p:cNvPr id="108" name="Flowchart: Decision 96">
+            <a:extLst>
+              <a:ext uri="{FF2B5EF4-FFF2-40B4-BE49-F238E27FC236}">
+                <a16:creationId xmlns:a16="http://schemas.microsoft.com/office/drawing/2014/main" id="{4379FF65-965D-4250-861B-42E6E3B483F2}"/>
+              </a:ext>
+            </a:extLst>
+          </p:cNvPr>
+          <p:cNvSpPr/>
+          <p:nvPr/>
+        </p:nvSpPr>
+        <p:spPr>
+          <a:xfrm>
+            <a:off x="1154940" y="2966089"/>
+            <a:ext cx="236048" cy="173380"/>
+          </a:xfrm>
+          <a:prstGeom prst="flowChartDecision">
+            <a:avLst/>
+          </a:prstGeom>
+          <a:solidFill>
+            <a:srgbClr val="7030A0"/>
+          </a:solidFill>
+          <a:ln w="19050">
+            <a:solidFill>
+              <a:srgbClr val="7030A0"/>
+            </a:solidFill>
+          </a:ln>
+          <a:effectLst/>
+        </p:spPr>
+        <p:style>
+          <a:lnRef idx="1">
+            <a:schemeClr val="accent6"/>
+          </a:lnRef>
+          <a:fillRef idx="2">
+            <a:schemeClr val="accent6"/>
+          </a:fillRef>
+          <a:effectRef idx="1">
+            <a:schemeClr val="accent6"/>
+          </a:effectRef>
+          <a:fontRef idx="minor">
+            <a:schemeClr val="dk1"/>
+          </a:fontRef>
+        </p:style>
+        <p:txBody>
+          <a:bodyPr rtlCol="0" anchor="ctr"/>
+          <a:lstStyle/>
+          <a:p>
+            <a:pPr algn="ctr"/>
+            <a:endParaRPr lang="en-US" sz="1050"/>
+          </a:p>
+        </p:txBody>
+      </p:sp>
+      <p:sp>
+        <p:nvSpPr>
+          <p:cNvPr id="109" name="Rectangle 8">
+            <a:extLst>
+              <a:ext uri="{FF2B5EF4-FFF2-40B4-BE49-F238E27FC236}">
+                <a16:creationId xmlns:a16="http://schemas.microsoft.com/office/drawing/2014/main" id="{2F1E36F3-9EA3-43FB-96AD-4A3CFC83B257}"/>
+              </a:ext>
+            </a:extLst>
+          </p:cNvPr>
+          <p:cNvSpPr/>
+          <p:nvPr/>
+        </p:nvSpPr>
+        <p:spPr>
+          <a:xfrm>
+            <a:off x="1981200" y="3286235"/>
+            <a:ext cx="1358772" cy="346760"/>
+          </a:xfrm>
+          <a:prstGeom prst="rect">
+            <a:avLst/>
+          </a:prstGeom>
+          <a:ln w="19050">
+            <a:solidFill>
+              <a:srgbClr val="7030A0"/>
+            </a:solidFill>
+          </a:ln>
+          <a:effectLst/>
+        </p:spPr>
+        <p:style>
+          <a:lnRef idx="1">
+            <a:schemeClr val="accent4"/>
+          </a:lnRef>
+          <a:fillRef idx="2">
+            <a:schemeClr val="accent4"/>
+          </a:fillRef>
+          <a:effectRef idx="1">
+            <a:schemeClr val="accent4"/>
+          </a:effectRef>
+          <a:fontRef idx="minor">
+            <a:schemeClr val="dk1"/>
+          </a:fontRef>
+        </p:style>
+        <p:txBody>
+          <a:bodyPr rtlCol="0" anchor="ctr"/>
+          <a:lstStyle/>
+          <a:p>
+            <a:pPr algn="ctr"/>
+            <a:r>
+              <a:rPr lang="en-US" sz="1050" dirty="0" err="1">
+                <a:solidFill>
+                  <a:srgbClr val="7030A0"/>
+                </a:solidFill>
+              </a:rPr>
+              <a:t>UniqueOrderList</a:t>
+            </a:r>
+            <a:endParaRPr lang="en-SG" sz="1050" dirty="0">
+              <a:solidFill>
+                <a:srgbClr val="7030A0"/>
+              </a:solidFill>
+            </a:endParaRPr>
+          </a:p>
+        </p:txBody>
+      </p:sp>
+      <p:sp>
+        <p:nvSpPr>
+          <p:cNvPr id="110" name="Rectangle 8">
+            <a:extLst>
+              <a:ext uri="{FF2B5EF4-FFF2-40B4-BE49-F238E27FC236}">
+                <a16:creationId xmlns:a16="http://schemas.microsoft.com/office/drawing/2014/main" id="{3F4D8F18-6FC8-4621-921B-85E76C71B65B}"/>
+              </a:ext>
+            </a:extLst>
+          </p:cNvPr>
+          <p:cNvSpPr/>
+          <p:nvPr/>
+        </p:nvSpPr>
+        <p:spPr>
+          <a:xfrm>
+            <a:off x="3733793" y="3280867"/>
+            <a:ext cx="769442" cy="346760"/>
+          </a:xfrm>
+          <a:prstGeom prst="rect">
+            <a:avLst/>
+          </a:prstGeom>
+          <a:ln w="19050">
+            <a:solidFill>
+              <a:srgbClr val="7030A0"/>
+            </a:solidFill>
+          </a:ln>
+          <a:effectLst/>
+        </p:spPr>
+        <p:style>
+          <a:lnRef idx="1">
+            <a:schemeClr val="accent4"/>
+          </a:lnRef>
+          <a:fillRef idx="2">
+            <a:schemeClr val="accent4"/>
+          </a:fillRef>
+          <a:effectRef idx="1">
+            <a:schemeClr val="accent4"/>
+          </a:effectRef>
+          <a:fontRef idx="minor">
+            <a:schemeClr val="dk1"/>
+          </a:fontRef>
+        </p:style>
+        <p:txBody>
+          <a:bodyPr rtlCol="0" anchor="ctr"/>
+          <a:lstStyle/>
+          <a:p>
+            <a:pPr algn="ctr"/>
+            <a:r>
+              <a:rPr lang="en-US" sz="1050" dirty="0">
+                <a:solidFill>
+                  <a:srgbClr val="7030A0"/>
+                </a:solidFill>
+              </a:rPr>
+              <a:t>Order</a:t>
+            </a:r>
+            <a:endParaRPr lang="en-SG" sz="1050" dirty="0">
+              <a:solidFill>
+                <a:srgbClr val="7030A0"/>
+              </a:solidFill>
+            </a:endParaRPr>
+          </a:p>
+        </p:txBody>
+      </p:sp>
+      <p:sp>
+        <p:nvSpPr>
+          <p:cNvPr id="111" name="Flowchart: Decision 96">
+            <a:extLst>
+              <a:ext uri="{FF2B5EF4-FFF2-40B4-BE49-F238E27FC236}">
+                <a16:creationId xmlns:a16="http://schemas.microsoft.com/office/drawing/2014/main" id="{E4795FA2-5E3E-4280-A54C-16F0168A5B5D}"/>
+              </a:ext>
+            </a:extLst>
+          </p:cNvPr>
+          <p:cNvSpPr/>
+          <p:nvPr/>
+        </p:nvSpPr>
+        <p:spPr>
+          <a:xfrm>
+            <a:off x="3340123" y="3364477"/>
+            <a:ext cx="236048" cy="173380"/>
+          </a:xfrm>
+          <a:prstGeom prst="flowChartDecision">
+            <a:avLst/>
+          </a:prstGeom>
+          <a:noFill/>
+          <a:ln w="19050">
+            <a:solidFill>
+              <a:srgbClr val="7030A0"/>
+            </a:solidFill>
+          </a:ln>
+          <a:effectLst/>
+        </p:spPr>
+        <p:style>
+          <a:lnRef idx="1">
+            <a:schemeClr val="accent6"/>
+          </a:lnRef>
+          <a:fillRef idx="2">
+            <a:schemeClr val="accent6"/>
+          </a:fillRef>
+          <a:effectRef idx="1">
+            <a:schemeClr val="accent6"/>
+          </a:effectRef>
+          <a:fontRef idx="minor">
+            <a:schemeClr val="dk1"/>
+          </a:fontRef>
+        </p:style>
+        <p:txBody>
+          <a:bodyPr rtlCol="0" anchor="ctr"/>
+          <a:lstStyle/>
+          <a:p>
+            <a:pPr algn="ctr"/>
+            <a:endParaRPr lang="en-US" sz="1050"/>
+          </a:p>
+        </p:txBody>
+      </p:sp>
+      <p:sp>
+        <p:nvSpPr>
+          <p:cNvPr id="113" name="Rectangle 8">
+            <a:extLst>
+              <a:ext uri="{FF2B5EF4-FFF2-40B4-BE49-F238E27FC236}">
+                <a16:creationId xmlns:a16="http://schemas.microsoft.com/office/drawing/2014/main" id="{1681AD88-36DF-4BB8-A425-8AA5FCEBEBA1}"/>
+              </a:ext>
+            </a:extLst>
+          </p:cNvPr>
+          <p:cNvSpPr/>
+          <p:nvPr/>
+        </p:nvSpPr>
+        <p:spPr>
+          <a:xfrm>
+            <a:off x="5721537" y="3673423"/>
+            <a:ext cx="790321" cy="328407"/>
+          </a:xfrm>
+          <a:prstGeom prst="rect">
+            <a:avLst/>
+          </a:prstGeom>
+          <a:ln w="19050">
+            <a:solidFill>
+              <a:srgbClr val="7030A0"/>
+            </a:solidFill>
+          </a:ln>
+          <a:effectLst/>
+        </p:spPr>
+        <p:style>
+          <a:lnRef idx="1">
+            <a:schemeClr val="accent4"/>
+          </a:lnRef>
+          <a:fillRef idx="2">
+            <a:schemeClr val="accent4"/>
+          </a:fillRef>
+          <a:effectRef idx="1">
+            <a:schemeClr val="accent4"/>
+          </a:effectRef>
+          <a:fontRef idx="minor">
+            <a:schemeClr val="dk1"/>
+          </a:fontRef>
+        </p:style>
+        <p:txBody>
+          <a:bodyPr rtlCol="0" anchor="ctr"/>
+          <a:lstStyle/>
+          <a:p>
+            <a:pPr algn="ctr"/>
+            <a:r>
+              <a:rPr lang="en-US" sz="1050" dirty="0">
+                <a:solidFill>
+                  <a:srgbClr val="7030A0"/>
+                </a:solidFill>
+              </a:rPr>
+              <a:t>Date</a:t>
+            </a:r>
+            <a:endParaRPr lang="en-SG" sz="1050" dirty="0">
+              <a:solidFill>
+                <a:srgbClr val="7030A0"/>
+              </a:solidFill>
+            </a:endParaRPr>
+          </a:p>
+        </p:txBody>
+      </p:sp>
+      <p:sp>
+        <p:nvSpPr>
+          <p:cNvPr id="115" name="Flowchart: Decision 96">
+            <a:extLst>
+              <a:ext uri="{FF2B5EF4-FFF2-40B4-BE49-F238E27FC236}">
+                <a16:creationId xmlns:a16="http://schemas.microsoft.com/office/drawing/2014/main" id="{69A62584-9E88-4AFF-9184-971F46787C20}"/>
+              </a:ext>
+            </a:extLst>
+          </p:cNvPr>
+          <p:cNvSpPr/>
+          <p:nvPr/>
+        </p:nvSpPr>
+        <p:spPr>
+          <a:xfrm>
+            <a:off x="4523319" y="3371002"/>
+            <a:ext cx="236048" cy="173380"/>
+          </a:xfrm>
+          <a:prstGeom prst="flowChartDecision">
+            <a:avLst/>
+          </a:prstGeom>
+          <a:solidFill>
+            <a:srgbClr val="7030A0"/>
+          </a:solidFill>
+          <a:ln w="19050">
+            <a:solidFill>
+              <a:srgbClr val="7030A0"/>
+            </a:solidFill>
+          </a:ln>
+          <a:effectLst/>
+        </p:spPr>
+        <p:style>
+          <a:lnRef idx="1">
+            <a:schemeClr val="accent6"/>
+          </a:lnRef>
+          <a:fillRef idx="2">
+            <a:schemeClr val="accent6"/>
+          </a:fillRef>
+          <a:effectRef idx="1">
+            <a:schemeClr val="accent6"/>
+          </a:effectRef>
+          <a:fontRef idx="minor">
+            <a:schemeClr val="dk1"/>
+          </a:fontRef>
+        </p:style>
+        <p:txBody>
+          <a:bodyPr rtlCol="0" anchor="ctr"/>
+          <a:lstStyle/>
+          <a:p>
+            <a:pPr algn="ctr"/>
+            <a:endParaRPr lang="en-US" sz="1050"/>
+          </a:p>
+        </p:txBody>
+      </p:sp>
+      <p:sp>
+        <p:nvSpPr>
+          <p:cNvPr id="128" name="TextBox 127">
+            <a:extLst>
+              <a:ext uri="{FF2B5EF4-FFF2-40B4-BE49-F238E27FC236}">
+                <a16:creationId xmlns:a16="http://schemas.microsoft.com/office/drawing/2014/main" id="{0DE03022-0E9B-4722-888C-A41946F763E9}"/>
+              </a:ext>
+            </a:extLst>
+          </p:cNvPr>
+          <p:cNvSpPr txBox="1"/>
+          <p:nvPr/>
+        </p:nvSpPr>
+        <p:spPr>
+          <a:xfrm>
+            <a:off x="3560354" y="3524075"/>
+            <a:ext cx="189257" cy="178683"/>
+          </a:xfrm>
+          <a:prstGeom prst="rect">
+            <a:avLst/>
+          </a:prstGeom>
+          <a:noFill/>
+        </p:spPr>
+        <p:txBody>
+          <a:bodyPr wrap="square" lIns="0" tIns="0" rIns="0" bIns="0" rtlCol="0">
+            <a:noAutofit/>
+          </a:bodyPr>
+          <a:lstStyle/>
+          <a:p>
+            <a:pPr algn="ctr"/>
+            <a:r>
+              <a:rPr lang="en-US" sz="1100" dirty="0">
+                <a:solidFill>
+                  <a:srgbClr val="7030A0"/>
+                </a:solidFill>
+              </a:rPr>
+              <a:t>*</a:t>
+            </a:r>
+            <a:endParaRPr lang="en-SG" sz="1100" dirty="0">
+              <a:solidFill>
+                <a:srgbClr val="7030A0"/>
+              </a:solidFill>
+            </a:endParaRPr>
+          </a:p>
+        </p:txBody>
+      </p:sp>
+      <p:cxnSp>
+        <p:nvCxnSpPr>
+          <p:cNvPr id="132" name="Straight Arrow Connector 131">
+            <a:extLst>
+              <a:ext uri="{FF2B5EF4-FFF2-40B4-BE49-F238E27FC236}">
+                <a16:creationId xmlns:a16="http://schemas.microsoft.com/office/drawing/2014/main" id="{DFCE0B28-EDCA-45E5-9A48-5559F778895B}"/>
+              </a:ext>
+            </a:extLst>
+          </p:cNvPr>
+          <p:cNvCxnSpPr/>
+          <p:nvPr/>
+        </p:nvCxnSpPr>
+        <p:spPr>
+          <a:xfrm>
+            <a:off x="1587379" y="3453907"/>
+            <a:ext cx="381000" cy="0"/>
+          </a:xfrm>
+          <a:prstGeom prst="straightConnector1">
+            <a:avLst/>
+          </a:prstGeom>
+          <a:ln w="19050">
+            <a:tailEnd type="triangle"/>
+          </a:ln>
+        </p:spPr>
+        <p:style>
+          <a:lnRef idx="1">
+            <a:schemeClr val="accent4"/>
+          </a:lnRef>
+          <a:fillRef idx="0">
+            <a:schemeClr val="accent4"/>
+          </a:fillRef>
+          <a:effectRef idx="0">
+            <a:schemeClr val="accent4"/>
+          </a:effectRef>
+          <a:fontRef idx="minor">
+            <a:schemeClr val="tx1"/>
+          </a:fontRef>
+        </p:style>
+      </p:cxnSp>
+      <p:cxnSp>
+        <p:nvCxnSpPr>
+          <p:cNvPr id="133" name="Straight Arrow Connector 132">
+            <a:extLst>
+              <a:ext uri="{FF2B5EF4-FFF2-40B4-BE49-F238E27FC236}">
+                <a16:creationId xmlns:a16="http://schemas.microsoft.com/office/drawing/2014/main" id="{3260D866-1EA3-4E19-8924-BDDE387BA9AE}"/>
+              </a:ext>
+            </a:extLst>
+          </p:cNvPr>
+          <p:cNvCxnSpPr>
+            <a:cxnSpLocks/>
+          </p:cNvCxnSpPr>
+          <p:nvPr/>
+        </p:nvCxnSpPr>
+        <p:spPr>
+          <a:xfrm>
+            <a:off x="5526943" y="2966089"/>
+            <a:ext cx="188057" cy="0"/>
+          </a:xfrm>
+          <a:prstGeom prst="straightConnector1">
+            <a:avLst/>
+          </a:prstGeom>
+          <a:ln w="12700">
+            <a:tailEnd type="triangle"/>
+          </a:ln>
+        </p:spPr>
+        <p:style>
+          <a:lnRef idx="1">
+            <a:schemeClr val="accent4"/>
+          </a:lnRef>
+          <a:fillRef idx="0">
+            <a:schemeClr val="accent4"/>
+          </a:fillRef>
+          <a:effectRef idx="0">
+            <a:schemeClr val="accent4"/>
+          </a:effectRef>
+          <a:fontRef idx="minor">
+            <a:schemeClr val="tx1"/>
+          </a:fontRef>
+        </p:style>
+      </p:cxnSp>
+      <p:cxnSp>
+        <p:nvCxnSpPr>
+          <p:cNvPr id="134" name="Straight Connector 133">
+            <a:extLst>
+              <a:ext uri="{FF2B5EF4-FFF2-40B4-BE49-F238E27FC236}">
+                <a16:creationId xmlns:a16="http://schemas.microsoft.com/office/drawing/2014/main" id="{DFB9FB29-11CE-4E27-AA73-4AEB1ACE8CB9}"/>
+              </a:ext>
+            </a:extLst>
+          </p:cNvPr>
+          <p:cNvCxnSpPr>
+            <a:cxnSpLocks/>
+          </p:cNvCxnSpPr>
+          <p:nvPr/>
+        </p:nvCxnSpPr>
+        <p:spPr>
+          <a:xfrm flipH="1">
+            <a:off x="5526148" y="2965842"/>
+            <a:ext cx="2753" cy="2021551"/>
+          </a:xfrm>
+          <a:prstGeom prst="line">
+            <a:avLst/>
+          </a:prstGeom>
+          <a:ln w="12700"/>
+        </p:spPr>
+        <p:style>
+          <a:lnRef idx="1">
+            <a:schemeClr val="accent4"/>
+          </a:lnRef>
+          <a:fillRef idx="0">
+            <a:schemeClr val="accent4"/>
+          </a:fillRef>
+          <a:effectRef idx="0">
+            <a:schemeClr val="accent4"/>
+          </a:effectRef>
+          <a:fontRef idx="minor">
+            <a:schemeClr val="tx1"/>
+          </a:fontRef>
+        </p:style>
+      </p:cxnSp>
+      <p:cxnSp>
+        <p:nvCxnSpPr>
+          <p:cNvPr id="135" name="Straight Arrow Connector 134">
+            <a:extLst>
+              <a:ext uri="{FF2B5EF4-FFF2-40B4-BE49-F238E27FC236}">
+                <a16:creationId xmlns:a16="http://schemas.microsoft.com/office/drawing/2014/main" id="{B2B53A8F-CAAD-4658-96A1-76E6011920C9}"/>
+              </a:ext>
+            </a:extLst>
+          </p:cNvPr>
+          <p:cNvCxnSpPr>
+            <a:cxnSpLocks/>
+          </p:cNvCxnSpPr>
+          <p:nvPr/>
+        </p:nvCxnSpPr>
+        <p:spPr>
+          <a:xfrm>
+            <a:off x="5540230" y="3845577"/>
+            <a:ext cx="188057" cy="0"/>
+          </a:xfrm>
+          <a:prstGeom prst="straightConnector1">
+            <a:avLst/>
+          </a:prstGeom>
+          <a:ln w="12700">
+            <a:tailEnd type="triangle"/>
+          </a:ln>
+        </p:spPr>
+        <p:style>
+          <a:lnRef idx="1">
+            <a:schemeClr val="accent4"/>
+          </a:lnRef>
+          <a:fillRef idx="0">
+            <a:schemeClr val="accent4"/>
+          </a:fillRef>
+          <a:effectRef idx="0">
+            <a:schemeClr val="accent4"/>
+          </a:effectRef>
+          <a:fontRef idx="minor">
+            <a:schemeClr val="tx1"/>
+          </a:fontRef>
+        </p:style>
+      </p:cxnSp>
+      <p:cxnSp>
+        <p:nvCxnSpPr>
+          <p:cNvPr id="136" name="Straight Connector 135">
+            <a:extLst>
+              <a:ext uri="{FF2B5EF4-FFF2-40B4-BE49-F238E27FC236}">
+                <a16:creationId xmlns:a16="http://schemas.microsoft.com/office/drawing/2014/main" id="{3366C7B7-4535-4A50-BEAC-D1A9515C6326}"/>
+              </a:ext>
+            </a:extLst>
+          </p:cNvPr>
+          <p:cNvCxnSpPr>
+            <a:cxnSpLocks/>
+          </p:cNvCxnSpPr>
+          <p:nvPr/>
+        </p:nvCxnSpPr>
+        <p:spPr>
+          <a:xfrm>
+            <a:off x="4759367" y="3456456"/>
+            <a:ext cx="764946" cy="6787"/>
+          </a:xfrm>
+          <a:prstGeom prst="line">
+            <a:avLst/>
+          </a:prstGeom>
+          <a:ln w="12700"/>
+        </p:spPr>
+        <p:style>
+          <a:lnRef idx="1">
+            <a:schemeClr val="accent4"/>
+          </a:lnRef>
+          <a:fillRef idx="0">
+            <a:schemeClr val="accent4"/>
+          </a:fillRef>
+          <a:effectRef idx="0">
+            <a:schemeClr val="accent4"/>
+          </a:effectRef>
+          <a:fontRef idx="minor">
+            <a:schemeClr val="tx1"/>
+          </a:fontRef>
+        </p:style>
+      </p:cxnSp>
+      <p:sp>
+        <p:nvSpPr>
+          <p:cNvPr id="137" name="Rectangle 8">
+            <a:extLst>
+              <a:ext uri="{FF2B5EF4-FFF2-40B4-BE49-F238E27FC236}">
+                <a16:creationId xmlns:a16="http://schemas.microsoft.com/office/drawing/2014/main" id="{22F24057-9C97-4E80-980D-F02D7B1A29C4}"/>
+              </a:ext>
+            </a:extLst>
+          </p:cNvPr>
+          <p:cNvSpPr/>
+          <p:nvPr/>
+        </p:nvSpPr>
+        <p:spPr>
+          <a:xfrm>
+            <a:off x="1994022" y="4975711"/>
+            <a:ext cx="1358772" cy="346760"/>
+          </a:xfrm>
+          <a:prstGeom prst="rect">
+            <a:avLst/>
+          </a:prstGeom>
+          <a:ln w="19050">
+            <a:solidFill>
+              <a:srgbClr val="7030A0"/>
+            </a:solidFill>
+          </a:ln>
+          <a:effectLst/>
+        </p:spPr>
+        <p:style>
+          <a:lnRef idx="1">
+            <a:schemeClr val="accent4"/>
+          </a:lnRef>
+          <a:fillRef idx="2">
+            <a:schemeClr val="accent4"/>
+          </a:fillRef>
+          <a:effectRef idx="1">
+            <a:schemeClr val="accent4"/>
+          </a:effectRef>
+          <a:fontRef idx="minor">
+            <a:schemeClr val="dk1"/>
+          </a:fontRef>
+        </p:style>
+        <p:txBody>
+          <a:bodyPr rtlCol="0" anchor="ctr"/>
+          <a:lstStyle/>
+          <a:p>
+            <a:pPr algn="ctr"/>
+            <a:r>
+              <a:rPr lang="en-US" sz="1050" dirty="0" err="1">
+                <a:solidFill>
+                  <a:srgbClr val="7030A0"/>
+                </a:solidFill>
+              </a:rPr>
+              <a:t>UniqueMenuList</a:t>
+            </a:r>
+            <a:endParaRPr lang="en-SG" sz="1050" dirty="0">
+              <a:solidFill>
+                <a:srgbClr val="7030A0"/>
+              </a:solidFill>
+            </a:endParaRPr>
+          </a:p>
+        </p:txBody>
+      </p:sp>
+      <p:sp>
+        <p:nvSpPr>
+          <p:cNvPr id="138" name="Rectangle 8">
+            <a:extLst>
+              <a:ext uri="{FF2B5EF4-FFF2-40B4-BE49-F238E27FC236}">
+                <a16:creationId xmlns:a16="http://schemas.microsoft.com/office/drawing/2014/main" id="{A699D1A0-A294-4CE0-BB6F-150BFF4E0D12}"/>
+              </a:ext>
+            </a:extLst>
+          </p:cNvPr>
+          <p:cNvSpPr/>
+          <p:nvPr/>
+        </p:nvSpPr>
+        <p:spPr>
+          <a:xfrm>
+            <a:off x="5850785" y="4965521"/>
+            <a:ext cx="769442" cy="346760"/>
+          </a:xfrm>
+          <a:prstGeom prst="rect">
+            <a:avLst/>
+          </a:prstGeom>
+          <a:ln w="19050">
+            <a:solidFill>
+              <a:srgbClr val="7030A0"/>
+            </a:solidFill>
+          </a:ln>
+          <a:effectLst/>
+        </p:spPr>
+        <p:style>
+          <a:lnRef idx="1">
+            <a:schemeClr val="accent4"/>
+          </a:lnRef>
+          <a:fillRef idx="2">
+            <a:schemeClr val="accent4"/>
+          </a:fillRef>
+          <a:effectRef idx="1">
+            <a:schemeClr val="accent4"/>
+          </a:effectRef>
+          <a:fontRef idx="minor">
+            <a:schemeClr val="dk1"/>
+          </a:fontRef>
+        </p:style>
+        <p:txBody>
+          <a:bodyPr rtlCol="0" anchor="ctr"/>
+          <a:lstStyle/>
+          <a:p>
+            <a:pPr algn="ctr"/>
+            <a:r>
+              <a:rPr lang="en-US" sz="1050" dirty="0">
+                <a:solidFill>
+                  <a:srgbClr val="7030A0"/>
+                </a:solidFill>
+              </a:rPr>
+              <a:t>Menu</a:t>
+            </a:r>
+            <a:endParaRPr lang="en-SG" sz="1050" dirty="0">
+              <a:solidFill>
+                <a:srgbClr val="7030A0"/>
+              </a:solidFill>
+            </a:endParaRPr>
+          </a:p>
+        </p:txBody>
+      </p:sp>
+      <p:sp>
+        <p:nvSpPr>
+          <p:cNvPr id="139" name="Flowchart: Decision 96">
+            <a:extLst>
+              <a:ext uri="{FF2B5EF4-FFF2-40B4-BE49-F238E27FC236}">
+                <a16:creationId xmlns:a16="http://schemas.microsoft.com/office/drawing/2014/main" id="{60FD7786-F9A2-49B5-A341-20CC94CF16BD}"/>
+              </a:ext>
+            </a:extLst>
+          </p:cNvPr>
+          <p:cNvSpPr/>
+          <p:nvPr/>
+        </p:nvSpPr>
+        <p:spPr>
+          <a:xfrm>
+            <a:off x="3352945" y="5053953"/>
+            <a:ext cx="236048" cy="173380"/>
+          </a:xfrm>
+          <a:prstGeom prst="flowChartDecision">
+            <a:avLst/>
+          </a:prstGeom>
+          <a:noFill/>
+          <a:ln w="19050">
+            <a:solidFill>
+              <a:srgbClr val="7030A0"/>
+            </a:solidFill>
+          </a:ln>
+          <a:effectLst/>
+        </p:spPr>
+        <p:style>
+          <a:lnRef idx="1">
+            <a:schemeClr val="accent6"/>
+          </a:lnRef>
+          <a:fillRef idx="2">
+            <a:schemeClr val="accent6"/>
+          </a:fillRef>
+          <a:effectRef idx="1">
+            <a:schemeClr val="accent6"/>
+          </a:effectRef>
+          <a:fontRef idx="minor">
+            <a:schemeClr val="dk1"/>
+          </a:fontRef>
+        </p:style>
+        <p:txBody>
+          <a:bodyPr rtlCol="0" anchor="ctr"/>
+          <a:lstStyle/>
+          <a:p>
+            <a:pPr algn="ctr"/>
+            <a:endParaRPr lang="en-US" sz="1050"/>
+          </a:p>
+        </p:txBody>
+      </p:sp>
+      <p:sp>
+        <p:nvSpPr>
+          <p:cNvPr id="141" name="Rectangle 8">
+            <a:extLst>
+              <a:ext uri="{FF2B5EF4-FFF2-40B4-BE49-F238E27FC236}">
+                <a16:creationId xmlns:a16="http://schemas.microsoft.com/office/drawing/2014/main" id="{3FA923BE-E6F8-4844-80D1-485F6386BDB0}"/>
+              </a:ext>
+            </a:extLst>
+          </p:cNvPr>
+          <p:cNvSpPr/>
+          <p:nvPr/>
+        </p:nvSpPr>
+        <p:spPr>
+          <a:xfrm>
+            <a:off x="7275864" y="4671760"/>
+            <a:ext cx="1194206" cy="285783"/>
+          </a:xfrm>
+          <a:prstGeom prst="rect">
+            <a:avLst/>
+          </a:prstGeom>
+          <a:ln w="19050">
+            <a:solidFill>
+              <a:srgbClr val="7030A0"/>
+            </a:solidFill>
+          </a:ln>
+          <a:effectLst/>
+        </p:spPr>
+        <p:style>
+          <a:lnRef idx="1">
+            <a:schemeClr val="accent4"/>
+          </a:lnRef>
+          <a:fillRef idx="2">
+            <a:schemeClr val="accent4"/>
+          </a:fillRef>
+          <a:effectRef idx="1">
+            <a:schemeClr val="accent4"/>
+          </a:effectRef>
+          <a:fontRef idx="minor">
+            <a:schemeClr val="dk1"/>
+          </a:fontRef>
+        </p:style>
+        <p:txBody>
+          <a:bodyPr rtlCol="0" anchor="ctr"/>
+          <a:lstStyle/>
+          <a:p>
+            <a:pPr algn="ctr"/>
+            <a:r>
+              <a:rPr lang="en-US" sz="1050" dirty="0" err="1">
+                <a:solidFill>
+                  <a:srgbClr val="7030A0"/>
+                </a:solidFill>
+              </a:rPr>
+              <a:t>MenuName</a:t>
+            </a:r>
+            <a:endParaRPr lang="en-SG" sz="1050" dirty="0">
+              <a:solidFill>
+                <a:srgbClr val="7030A0"/>
+              </a:solidFill>
+            </a:endParaRPr>
+          </a:p>
+        </p:txBody>
+      </p:sp>
+      <p:sp>
+        <p:nvSpPr>
+          <p:cNvPr id="142" name="Flowchart: Decision 96">
+            <a:extLst>
+              <a:ext uri="{FF2B5EF4-FFF2-40B4-BE49-F238E27FC236}">
+                <a16:creationId xmlns:a16="http://schemas.microsoft.com/office/drawing/2014/main" id="{AC932AEE-9FB8-445F-BD88-ADCF75A6F64B}"/>
+              </a:ext>
+            </a:extLst>
+          </p:cNvPr>
+          <p:cNvSpPr/>
+          <p:nvPr/>
+        </p:nvSpPr>
+        <p:spPr>
+          <a:xfrm>
+            <a:off x="6640311" y="5055656"/>
+            <a:ext cx="236048" cy="173380"/>
+          </a:xfrm>
+          <a:prstGeom prst="flowChartDecision">
+            <a:avLst/>
+          </a:prstGeom>
+          <a:solidFill>
+            <a:srgbClr val="7030A0"/>
+          </a:solidFill>
+          <a:ln w="19050">
+            <a:solidFill>
+              <a:srgbClr val="7030A0"/>
+            </a:solidFill>
+          </a:ln>
+          <a:effectLst/>
+        </p:spPr>
+        <p:style>
+          <a:lnRef idx="1">
+            <a:schemeClr val="accent6"/>
+          </a:lnRef>
+          <a:fillRef idx="2">
+            <a:schemeClr val="accent6"/>
+          </a:fillRef>
+          <a:effectRef idx="1">
+            <a:schemeClr val="accent6"/>
+          </a:effectRef>
+          <a:fontRef idx="minor">
+            <a:schemeClr val="dk1"/>
+          </a:fontRef>
+        </p:style>
+        <p:txBody>
+          <a:bodyPr rtlCol="0" anchor="ctr"/>
+          <a:lstStyle/>
+          <a:p>
+            <a:pPr algn="ctr"/>
+            <a:endParaRPr lang="en-US" sz="1050"/>
+          </a:p>
+        </p:txBody>
+      </p:sp>
+      <p:sp>
+        <p:nvSpPr>
+          <p:cNvPr id="144" name="Rectangle 8">
+            <a:extLst>
+              <a:ext uri="{FF2B5EF4-FFF2-40B4-BE49-F238E27FC236}">
+                <a16:creationId xmlns:a16="http://schemas.microsoft.com/office/drawing/2014/main" id="{2D88EFE8-DEF8-4539-9B4A-44E944CA0369}"/>
+              </a:ext>
+            </a:extLst>
+          </p:cNvPr>
+          <p:cNvSpPr/>
+          <p:nvPr/>
+        </p:nvSpPr>
+        <p:spPr>
+          <a:xfrm>
+            <a:off x="7274657" y="5279349"/>
+            <a:ext cx="1194207" cy="285783"/>
+          </a:xfrm>
+          <a:prstGeom prst="rect">
+            <a:avLst/>
+          </a:prstGeom>
+          <a:ln w="19050">
+            <a:solidFill>
+              <a:srgbClr val="7030A0"/>
+            </a:solidFill>
+          </a:ln>
+          <a:effectLst/>
+        </p:spPr>
+        <p:style>
+          <a:lnRef idx="1">
+            <a:schemeClr val="accent4"/>
+          </a:lnRef>
+          <a:fillRef idx="2">
+            <a:schemeClr val="accent4"/>
+          </a:fillRef>
+          <a:effectRef idx="1">
+            <a:schemeClr val="accent4"/>
+          </a:effectRef>
+          <a:fontRef idx="minor">
+            <a:schemeClr val="dk1"/>
+          </a:fontRef>
+        </p:style>
+        <p:txBody>
+          <a:bodyPr rtlCol="0" anchor="ctr"/>
+          <a:lstStyle/>
+          <a:p>
+            <a:pPr algn="ctr"/>
+            <a:r>
+              <a:rPr lang="en-US" sz="1050" dirty="0">
+                <a:solidFill>
+                  <a:srgbClr val="7030A0"/>
+                </a:solidFill>
+              </a:rPr>
+              <a:t>Type</a:t>
+            </a:r>
+            <a:endParaRPr lang="en-SG" sz="1050" dirty="0">
+              <a:solidFill>
+                <a:srgbClr val="7030A0"/>
+              </a:solidFill>
+            </a:endParaRPr>
+          </a:p>
+        </p:txBody>
+      </p:sp>
+      <p:sp>
+        <p:nvSpPr>
+          <p:cNvPr id="146" name="Rectangle 8">
+            <a:extLst>
+              <a:ext uri="{FF2B5EF4-FFF2-40B4-BE49-F238E27FC236}">
+                <a16:creationId xmlns:a16="http://schemas.microsoft.com/office/drawing/2014/main" id="{4621F7D9-FA01-48D9-97D7-E349B74F676D}"/>
+              </a:ext>
+            </a:extLst>
+          </p:cNvPr>
+          <p:cNvSpPr/>
+          <p:nvPr/>
+        </p:nvSpPr>
+        <p:spPr>
+          <a:xfrm>
+            <a:off x="7275861" y="5886939"/>
+            <a:ext cx="1194209" cy="285783"/>
+          </a:xfrm>
+          <a:prstGeom prst="rect">
+            <a:avLst/>
+          </a:prstGeom>
+          <a:ln w="19050">
+            <a:solidFill>
+              <a:srgbClr val="7030A0"/>
+            </a:solidFill>
+          </a:ln>
+          <a:effectLst/>
+        </p:spPr>
+        <p:style>
+          <a:lnRef idx="1">
+            <a:schemeClr val="accent4"/>
+          </a:lnRef>
+          <a:fillRef idx="2">
+            <a:schemeClr val="accent4"/>
+          </a:fillRef>
+          <a:effectRef idx="1">
+            <a:schemeClr val="accent4"/>
+          </a:effectRef>
+          <a:fontRef idx="minor">
+            <a:schemeClr val="dk1"/>
+          </a:fontRef>
+        </p:style>
+        <p:txBody>
+          <a:bodyPr rtlCol="0" anchor="ctr"/>
+          <a:lstStyle/>
+          <a:p>
+            <a:pPr algn="ctr"/>
+            <a:r>
+              <a:rPr lang="en-US" sz="1050" dirty="0">
+                <a:solidFill>
+                  <a:srgbClr val="7030A0"/>
+                </a:solidFill>
+              </a:rPr>
+              <a:t>Tag</a:t>
+            </a:r>
+            <a:endParaRPr lang="en-SG" sz="1050" dirty="0">
+              <a:solidFill>
+                <a:srgbClr val="7030A0"/>
+              </a:solidFill>
+            </a:endParaRPr>
+          </a:p>
+        </p:txBody>
+      </p:sp>
+      <p:sp>
+        <p:nvSpPr>
+          <p:cNvPr id="150" name="TextBox 149">
+            <a:extLst>
+              <a:ext uri="{FF2B5EF4-FFF2-40B4-BE49-F238E27FC236}">
+                <a16:creationId xmlns:a16="http://schemas.microsoft.com/office/drawing/2014/main" id="{5DE072D8-C213-4513-8CFB-9CD17A77D717}"/>
+              </a:ext>
+            </a:extLst>
+          </p:cNvPr>
+          <p:cNvSpPr txBox="1"/>
+          <p:nvPr/>
+        </p:nvSpPr>
+        <p:spPr>
+          <a:xfrm>
+            <a:off x="3597938" y="4965521"/>
+            <a:ext cx="189257" cy="178683"/>
+          </a:xfrm>
+          <a:prstGeom prst="rect">
+            <a:avLst/>
+          </a:prstGeom>
+          <a:noFill/>
+        </p:spPr>
+        <p:txBody>
+          <a:bodyPr wrap="square" lIns="0" tIns="0" rIns="0" bIns="0" rtlCol="0">
+            <a:noAutofit/>
+          </a:bodyPr>
+          <a:lstStyle/>
+          <a:p>
+            <a:pPr algn="ctr"/>
+            <a:r>
+              <a:rPr lang="en-US" sz="1100" dirty="0">
+                <a:solidFill>
+                  <a:srgbClr val="7030A0"/>
+                </a:solidFill>
+              </a:rPr>
+              <a:t>*</a:t>
+            </a:r>
+            <a:endParaRPr lang="en-SG" sz="1100" dirty="0">
+              <a:solidFill>
+                <a:srgbClr val="7030A0"/>
+              </a:solidFill>
+            </a:endParaRPr>
+          </a:p>
+        </p:txBody>
+      </p:sp>
+      <p:sp>
+        <p:nvSpPr>
+          <p:cNvPr id="152" name="Rectangle 8">
+            <a:extLst>
+              <a:ext uri="{FF2B5EF4-FFF2-40B4-BE49-F238E27FC236}">
+                <a16:creationId xmlns:a16="http://schemas.microsoft.com/office/drawing/2014/main" id="{ADE84F85-1273-4996-A35C-FCFFBC7F629D}"/>
+              </a:ext>
+            </a:extLst>
+          </p:cNvPr>
+          <p:cNvSpPr/>
+          <p:nvPr/>
+        </p:nvSpPr>
+        <p:spPr>
+          <a:xfrm>
+            <a:off x="7275863" y="4053356"/>
+            <a:ext cx="1194206" cy="285783"/>
+          </a:xfrm>
+          <a:prstGeom prst="rect">
+            <a:avLst/>
+          </a:prstGeom>
+          <a:ln w="19050">
+            <a:solidFill>
+              <a:srgbClr val="7030A0"/>
+            </a:solidFill>
+          </a:ln>
+          <a:effectLst/>
+        </p:spPr>
+        <p:style>
+          <a:lnRef idx="1">
+            <a:schemeClr val="accent4"/>
+          </a:lnRef>
+          <a:fillRef idx="2">
+            <a:schemeClr val="accent4"/>
+          </a:fillRef>
+          <a:effectRef idx="1">
+            <a:schemeClr val="accent4"/>
+          </a:effectRef>
+          <a:fontRef idx="minor">
+            <a:schemeClr val="dk1"/>
+          </a:fontRef>
+        </p:style>
+        <p:txBody>
+          <a:bodyPr rtlCol="0" anchor="ctr"/>
+          <a:lstStyle/>
+          <a:p>
+            <a:pPr algn="ctr"/>
+            <a:r>
+              <a:rPr lang="en-US" sz="1050" dirty="0">
+                <a:solidFill>
+                  <a:srgbClr val="7030A0"/>
+                </a:solidFill>
+              </a:rPr>
+              <a:t>Price</a:t>
+            </a:r>
+            <a:endParaRPr lang="en-SG" sz="1050" dirty="0">
+              <a:solidFill>
+                <a:srgbClr val="7030A0"/>
+              </a:solidFill>
+            </a:endParaRPr>
+          </a:p>
+        </p:txBody>
+      </p:sp>
+      <p:cxnSp>
+        <p:nvCxnSpPr>
+          <p:cNvPr id="154" name="Straight Arrow Connector 153">
+            <a:extLst>
+              <a:ext uri="{FF2B5EF4-FFF2-40B4-BE49-F238E27FC236}">
+                <a16:creationId xmlns:a16="http://schemas.microsoft.com/office/drawing/2014/main" id="{0E1533DE-BEFA-4C70-95FA-ED7216F96760}"/>
+              </a:ext>
+            </a:extLst>
+          </p:cNvPr>
+          <p:cNvCxnSpPr>
+            <a:cxnSpLocks/>
+          </p:cNvCxnSpPr>
+          <p:nvPr/>
+        </p:nvCxnSpPr>
+        <p:spPr>
+          <a:xfrm>
+            <a:off x="1567295" y="5149091"/>
+            <a:ext cx="413905" cy="0"/>
+          </a:xfrm>
+          <a:prstGeom prst="straightConnector1">
+            <a:avLst/>
+          </a:prstGeom>
+          <a:ln w="19050">
+            <a:tailEnd type="triangle"/>
+          </a:ln>
+        </p:spPr>
+        <p:style>
+          <a:lnRef idx="1">
+            <a:schemeClr val="accent4"/>
+          </a:lnRef>
+          <a:fillRef idx="0">
+            <a:schemeClr val="accent4"/>
+          </a:fillRef>
+          <a:effectRef idx="0">
+            <a:schemeClr val="accent4"/>
+          </a:effectRef>
+          <a:fontRef idx="minor">
+            <a:schemeClr val="tx1"/>
+          </a:fontRef>
+        </p:style>
+      </p:cxnSp>
+      <p:cxnSp>
+        <p:nvCxnSpPr>
+          <p:cNvPr id="160" name="Straight Arrow Connector 159">
+            <a:extLst>
+              <a:ext uri="{FF2B5EF4-FFF2-40B4-BE49-F238E27FC236}">
+                <a16:creationId xmlns:a16="http://schemas.microsoft.com/office/drawing/2014/main" id="{45C776FE-3F60-4540-B986-423D6BCB9CE8}"/>
+              </a:ext>
+            </a:extLst>
+          </p:cNvPr>
+          <p:cNvCxnSpPr>
+            <a:cxnSpLocks/>
+          </p:cNvCxnSpPr>
+          <p:nvPr/>
+        </p:nvCxnSpPr>
+        <p:spPr>
+          <a:xfrm flipV="1">
+            <a:off x="5518205" y="4990954"/>
+            <a:ext cx="332580" cy="2465"/>
+          </a:xfrm>
+          <a:prstGeom prst="straightConnector1">
+            <a:avLst/>
+          </a:prstGeom>
+          <a:ln w="12700">
+            <a:tailEnd type="triangle"/>
+          </a:ln>
+        </p:spPr>
+        <p:style>
+          <a:lnRef idx="1">
+            <a:schemeClr val="accent4"/>
+          </a:lnRef>
+          <a:fillRef idx="0">
+            <a:schemeClr val="accent4"/>
+          </a:fillRef>
+          <a:effectRef idx="0">
+            <a:schemeClr val="accent4"/>
+          </a:effectRef>
+          <a:fontRef idx="minor">
+            <a:schemeClr val="tx1"/>
+          </a:fontRef>
+        </p:style>
+      </p:cxnSp>
+      <p:sp>
+        <p:nvSpPr>
+          <p:cNvPr id="168" name="TextBox 167">
+            <a:extLst>
+              <a:ext uri="{FF2B5EF4-FFF2-40B4-BE49-F238E27FC236}">
+                <a16:creationId xmlns:a16="http://schemas.microsoft.com/office/drawing/2014/main" id="{DA96A0AE-241B-4F81-AE11-3ED4748CA393}"/>
+              </a:ext>
+            </a:extLst>
+          </p:cNvPr>
+          <p:cNvSpPr txBox="1"/>
+          <p:nvPr/>
+        </p:nvSpPr>
+        <p:spPr>
+          <a:xfrm>
+            <a:off x="5546311" y="4811983"/>
+            <a:ext cx="270658" cy="220379"/>
+          </a:xfrm>
+          <a:prstGeom prst="rect">
+            <a:avLst/>
+          </a:prstGeom>
+          <a:noFill/>
+        </p:spPr>
+        <p:txBody>
+          <a:bodyPr wrap="square" lIns="0" tIns="0" rIns="0" bIns="0" rtlCol="0">
+            <a:noAutofit/>
+          </a:bodyPr>
+          <a:lstStyle/>
+          <a:p>
+            <a:pPr algn="ctr"/>
+            <a:r>
+              <a:rPr lang="en-US" sz="1100" dirty="0">
+                <a:solidFill>
+                  <a:srgbClr val="7030A0"/>
+                </a:solidFill>
+              </a:rPr>
+              <a:t>0…*</a:t>
+            </a:r>
+            <a:endParaRPr lang="en-SG" sz="1100" dirty="0">
+              <a:solidFill>
+                <a:srgbClr val="7030A0"/>
+              </a:solidFill>
+            </a:endParaRPr>
+          </a:p>
+        </p:txBody>
+      </p:sp>
+      <p:cxnSp>
+        <p:nvCxnSpPr>
+          <p:cNvPr id="172" name="Straight Connector 171">
+            <a:extLst>
+              <a:ext uri="{FF2B5EF4-FFF2-40B4-BE49-F238E27FC236}">
+                <a16:creationId xmlns:a16="http://schemas.microsoft.com/office/drawing/2014/main" id="{A224CB11-0D1B-4D29-B16D-7D380E01DF2A}"/>
+              </a:ext>
+            </a:extLst>
+          </p:cNvPr>
+          <p:cNvCxnSpPr>
+            <a:cxnSpLocks/>
+          </p:cNvCxnSpPr>
+          <p:nvPr/>
+        </p:nvCxnSpPr>
+        <p:spPr>
+          <a:xfrm>
+            <a:off x="6859137" y="5144204"/>
+            <a:ext cx="227463" cy="0"/>
+          </a:xfrm>
+          <a:prstGeom prst="line">
+            <a:avLst/>
+          </a:prstGeom>
+          <a:ln w="12700"/>
+        </p:spPr>
+        <p:style>
+          <a:lnRef idx="1">
+            <a:schemeClr val="accent4"/>
+          </a:lnRef>
+          <a:fillRef idx="0">
+            <a:schemeClr val="accent4"/>
+          </a:fillRef>
+          <a:effectRef idx="0">
+            <a:schemeClr val="accent4"/>
+          </a:effectRef>
+          <a:fontRef idx="minor">
+            <a:schemeClr val="tx1"/>
+          </a:fontRef>
+        </p:style>
+      </p:cxnSp>
+      <p:cxnSp>
+        <p:nvCxnSpPr>
+          <p:cNvPr id="175" name="Straight Connector 174">
+            <a:extLst>
+              <a:ext uri="{FF2B5EF4-FFF2-40B4-BE49-F238E27FC236}">
+                <a16:creationId xmlns:a16="http://schemas.microsoft.com/office/drawing/2014/main" id="{6C0FF31A-396F-459A-856B-EBBF6F95A23A}"/>
+              </a:ext>
+            </a:extLst>
+          </p:cNvPr>
+          <p:cNvCxnSpPr>
+            <a:cxnSpLocks/>
+          </p:cNvCxnSpPr>
+          <p:nvPr/>
+        </p:nvCxnSpPr>
+        <p:spPr>
+          <a:xfrm flipH="1">
+            <a:off x="7087806" y="4267200"/>
+            <a:ext cx="7379" cy="1762630"/>
+          </a:xfrm>
+          <a:prstGeom prst="line">
+            <a:avLst/>
+          </a:prstGeom>
+          <a:ln w="12700"/>
+        </p:spPr>
+        <p:style>
+          <a:lnRef idx="1">
+            <a:schemeClr val="accent4"/>
+          </a:lnRef>
+          <a:fillRef idx="0">
+            <a:schemeClr val="accent4"/>
+          </a:fillRef>
+          <a:effectRef idx="0">
+            <a:schemeClr val="accent4"/>
+          </a:effectRef>
+          <a:fontRef idx="minor">
+            <a:schemeClr val="tx1"/>
+          </a:fontRef>
+        </p:style>
+      </p:cxnSp>
+      <p:cxnSp>
+        <p:nvCxnSpPr>
+          <p:cNvPr id="177" name="Straight Arrow Connector 176">
+            <a:extLst>
+              <a:ext uri="{FF2B5EF4-FFF2-40B4-BE49-F238E27FC236}">
+                <a16:creationId xmlns:a16="http://schemas.microsoft.com/office/drawing/2014/main" id="{5F87D8E2-2F75-47BE-8664-37A3A1C0BFD4}"/>
+              </a:ext>
+            </a:extLst>
+          </p:cNvPr>
+          <p:cNvCxnSpPr>
+            <a:cxnSpLocks/>
+          </p:cNvCxnSpPr>
+          <p:nvPr/>
+        </p:nvCxnSpPr>
+        <p:spPr>
+          <a:xfrm>
+            <a:off x="7086600" y="4267200"/>
+            <a:ext cx="188057" cy="0"/>
+          </a:xfrm>
+          <a:prstGeom prst="straightConnector1">
+            <a:avLst/>
+          </a:prstGeom>
+          <a:ln w="12700">
+            <a:tailEnd type="triangle"/>
+          </a:ln>
+        </p:spPr>
+        <p:style>
+          <a:lnRef idx="1">
+            <a:schemeClr val="accent4"/>
+          </a:lnRef>
+          <a:fillRef idx="0">
+            <a:schemeClr val="accent4"/>
+          </a:fillRef>
+          <a:effectRef idx="0">
+            <a:schemeClr val="accent4"/>
+          </a:effectRef>
+          <a:fontRef idx="minor">
+            <a:schemeClr val="tx1"/>
+          </a:fontRef>
+        </p:style>
+      </p:cxnSp>
+      <p:cxnSp>
+        <p:nvCxnSpPr>
+          <p:cNvPr id="180" name="Straight Arrow Connector 179">
+            <a:extLst>
+              <a:ext uri="{FF2B5EF4-FFF2-40B4-BE49-F238E27FC236}">
+                <a16:creationId xmlns:a16="http://schemas.microsoft.com/office/drawing/2014/main" id="{2942C48F-D76B-4487-9A83-6343DAF7CAD0}"/>
+              </a:ext>
+            </a:extLst>
+          </p:cNvPr>
+          <p:cNvCxnSpPr>
+            <a:cxnSpLocks/>
+          </p:cNvCxnSpPr>
+          <p:nvPr/>
+        </p:nvCxnSpPr>
+        <p:spPr>
+          <a:xfrm>
+            <a:off x="5526148" y="4114800"/>
+            <a:ext cx="1748509" cy="0"/>
+          </a:xfrm>
+          <a:prstGeom prst="straightConnector1">
+            <a:avLst/>
+          </a:prstGeom>
+          <a:ln w="12700">
+            <a:tailEnd type="triangle"/>
+          </a:ln>
+        </p:spPr>
+        <p:style>
+          <a:lnRef idx="1">
+            <a:schemeClr val="accent4"/>
+          </a:lnRef>
+          <a:fillRef idx="0">
+            <a:schemeClr val="accent4"/>
+          </a:fillRef>
+          <a:effectRef idx="0">
+            <a:schemeClr val="accent4"/>
+          </a:effectRef>
+          <a:fontRef idx="minor">
+            <a:schemeClr val="tx1"/>
+          </a:fontRef>
+        </p:style>
+      </p:cxnSp>
+      <p:cxnSp>
+        <p:nvCxnSpPr>
+          <p:cNvPr id="183" name="Straight Arrow Connector 182">
+            <a:extLst>
+              <a:ext uri="{FF2B5EF4-FFF2-40B4-BE49-F238E27FC236}">
+                <a16:creationId xmlns:a16="http://schemas.microsoft.com/office/drawing/2014/main" id="{0B500268-754F-463E-AE30-DA5B18829D89}"/>
+              </a:ext>
+            </a:extLst>
+          </p:cNvPr>
+          <p:cNvCxnSpPr>
+            <a:cxnSpLocks/>
+          </p:cNvCxnSpPr>
+          <p:nvPr/>
+        </p:nvCxnSpPr>
+        <p:spPr>
+          <a:xfrm>
+            <a:off x="7095185" y="4814651"/>
+            <a:ext cx="188057" cy="0"/>
+          </a:xfrm>
+          <a:prstGeom prst="straightConnector1">
+            <a:avLst/>
+          </a:prstGeom>
+          <a:ln w="12700">
+            <a:tailEnd type="triangle"/>
+          </a:ln>
+        </p:spPr>
+        <p:style>
+          <a:lnRef idx="1">
+            <a:schemeClr val="accent4"/>
+          </a:lnRef>
+          <a:fillRef idx="0">
+            <a:schemeClr val="accent4"/>
+          </a:fillRef>
+          <a:effectRef idx="0">
+            <a:schemeClr val="accent4"/>
+          </a:effectRef>
+          <a:fontRef idx="minor">
+            <a:schemeClr val="tx1"/>
+          </a:fontRef>
+        </p:style>
+      </p:cxnSp>
+      <p:cxnSp>
+        <p:nvCxnSpPr>
+          <p:cNvPr id="184" name="Straight Arrow Connector 183">
+            <a:extLst>
+              <a:ext uri="{FF2B5EF4-FFF2-40B4-BE49-F238E27FC236}">
+                <a16:creationId xmlns:a16="http://schemas.microsoft.com/office/drawing/2014/main" id="{AE0F8354-CDE9-46C9-83CA-18649C60CBFD}"/>
+              </a:ext>
+            </a:extLst>
+          </p:cNvPr>
+          <p:cNvCxnSpPr>
+            <a:cxnSpLocks/>
+          </p:cNvCxnSpPr>
+          <p:nvPr/>
+        </p:nvCxnSpPr>
+        <p:spPr>
+          <a:xfrm>
+            <a:off x="7095185" y="5424151"/>
+            <a:ext cx="188057" cy="0"/>
+          </a:xfrm>
+          <a:prstGeom prst="straightConnector1">
+            <a:avLst/>
+          </a:prstGeom>
+          <a:ln w="12700">
+            <a:tailEnd type="triangle"/>
+          </a:ln>
+        </p:spPr>
+        <p:style>
+          <a:lnRef idx="1">
+            <a:schemeClr val="accent4"/>
+          </a:lnRef>
+          <a:fillRef idx="0">
+            <a:schemeClr val="accent4"/>
+          </a:fillRef>
+          <a:effectRef idx="0">
+            <a:schemeClr val="accent4"/>
+          </a:effectRef>
+          <a:fontRef idx="minor">
+            <a:schemeClr val="tx1"/>
+          </a:fontRef>
+        </p:style>
+      </p:cxnSp>
+      <p:cxnSp>
+        <p:nvCxnSpPr>
+          <p:cNvPr id="185" name="Straight Arrow Connector 184">
+            <a:extLst>
+              <a:ext uri="{FF2B5EF4-FFF2-40B4-BE49-F238E27FC236}">
+                <a16:creationId xmlns:a16="http://schemas.microsoft.com/office/drawing/2014/main" id="{FEAA6D37-8DEC-4443-99EF-AABC4534696C}"/>
+              </a:ext>
+            </a:extLst>
+          </p:cNvPr>
+          <p:cNvCxnSpPr>
+            <a:cxnSpLocks/>
+          </p:cNvCxnSpPr>
+          <p:nvPr/>
+        </p:nvCxnSpPr>
+        <p:spPr>
+          <a:xfrm>
+            <a:off x="7095185" y="6029830"/>
+            <a:ext cx="188057" cy="0"/>
+          </a:xfrm>
+          <a:prstGeom prst="straightConnector1">
+            <a:avLst/>
+          </a:prstGeom>
+          <a:ln w="12700">
+            <a:tailEnd type="triangle"/>
+          </a:ln>
+        </p:spPr>
+        <p:style>
+          <a:lnRef idx="1">
+            <a:schemeClr val="accent4"/>
+          </a:lnRef>
+          <a:fillRef idx="0">
+            <a:schemeClr val="accent4"/>
+          </a:fillRef>
+          <a:effectRef idx="0">
+            <a:schemeClr val="accent4"/>
+          </a:effectRef>
+          <a:fontRef idx="minor">
+            <a:schemeClr val="tx1"/>
+          </a:fontRef>
+        </p:style>
+      </p:cxnSp>
+      <p:sp>
+        <p:nvSpPr>
+          <p:cNvPr id="188" name="TextBox 187">
+            <a:extLst>
+              <a:ext uri="{FF2B5EF4-FFF2-40B4-BE49-F238E27FC236}">
+                <a16:creationId xmlns:a16="http://schemas.microsoft.com/office/drawing/2014/main" id="{235F33BB-3CB4-4AFF-AF7D-A32C73D46430}"/>
+              </a:ext>
+            </a:extLst>
+          </p:cNvPr>
+          <p:cNvSpPr txBox="1"/>
+          <p:nvPr/>
+        </p:nvSpPr>
+        <p:spPr>
+          <a:xfrm>
+            <a:off x="7071872" y="5880414"/>
+            <a:ext cx="189257" cy="178683"/>
+          </a:xfrm>
+          <a:prstGeom prst="rect">
+            <a:avLst/>
+          </a:prstGeom>
+          <a:noFill/>
+        </p:spPr>
+        <p:txBody>
+          <a:bodyPr wrap="square" lIns="0" tIns="0" rIns="0" bIns="0" rtlCol="0">
+            <a:noAutofit/>
+          </a:bodyPr>
+          <a:lstStyle/>
+          <a:p>
+            <a:pPr algn="ctr"/>
+            <a:r>
+              <a:rPr lang="en-US" sz="1100" dirty="0">
+                <a:solidFill>
+                  <a:srgbClr val="7030A0"/>
+                </a:solidFill>
+              </a:rPr>
+              <a:t>*</a:t>
+            </a:r>
+            <a:endParaRPr lang="en-SG" sz="1100" dirty="0">
+              <a:solidFill>
+                <a:srgbClr val="7030A0"/>
+              </a:solidFill>
+            </a:endParaRPr>
+          </a:p>
+        </p:txBody>
+      </p:sp>
+      <p:grpSp>
+        <p:nvGrpSpPr>
+          <p:cNvPr id="193" name="Group 192">
+            <a:extLst>
+              <a:ext uri="{FF2B5EF4-FFF2-40B4-BE49-F238E27FC236}">
+                <a16:creationId xmlns:a16="http://schemas.microsoft.com/office/drawing/2014/main" id="{C00630A9-2CD6-4210-B796-06F617DBA764}"/>
+              </a:ext>
+            </a:extLst>
+          </p:cNvPr>
+          <p:cNvGrpSpPr/>
+          <p:nvPr/>
+        </p:nvGrpSpPr>
+        <p:grpSpPr>
+          <a:xfrm rot="10800000">
+            <a:off x="3978174" y="1883471"/>
+            <a:ext cx="265743" cy="313004"/>
+            <a:chOff x="3956721" y="5216228"/>
+            <a:chExt cx="282387" cy="450886"/>
+          </a:xfrm>
+        </p:grpSpPr>
+        <p:cxnSp>
+          <p:nvCxnSpPr>
+            <p:cNvPr id="191" name="Elbow Connector 63">
+              <a:extLst>
+                <a:ext uri="{FF2B5EF4-FFF2-40B4-BE49-F238E27FC236}">
+                  <a16:creationId xmlns:a16="http://schemas.microsoft.com/office/drawing/2014/main" id="{2291BE4A-C9CC-4759-A2E2-43BE7B3393C4}"/>
+                </a:ext>
+              </a:extLst>
+            </p:cNvPr>
+            <p:cNvCxnSpPr>
+              <a:stCxn id="192" idx="3"/>
+            </p:cNvCxnSpPr>
+            <p:nvPr/>
+          </p:nvCxnSpPr>
+          <p:spPr>
+            <a:xfrm rot="5400000">
+              <a:off x="3948033" y="5517233"/>
+              <a:ext cx="293825" cy="5938"/>
+            </a:xfrm>
+            <a:prstGeom prst="bentConnector3">
+              <a:avLst>
+                <a:gd name="adj1" fmla="val 50000"/>
+              </a:avLst>
+            </a:prstGeom>
+            <a:ln w="19050">
+              <a:solidFill>
+                <a:srgbClr val="7030A0"/>
+              </a:solidFill>
+              <a:prstDash val="sysDot"/>
+              <a:headEnd type="none" w="med" len="med"/>
+              <a:tailEnd type="none" w="med" len="med"/>
+            </a:ln>
+            <a:effectLst/>
+          </p:spPr>
+          <p:style>
+            <a:lnRef idx="1">
+              <a:schemeClr val="accent2"/>
+            </a:lnRef>
+            <a:fillRef idx="2">
+              <a:schemeClr val="accent2"/>
+            </a:fillRef>
+            <a:effectRef idx="1">
+              <a:schemeClr val="accent2"/>
+            </a:effectRef>
+            <a:fontRef idx="minor">
+              <a:schemeClr val="dk1"/>
+            </a:fontRef>
+          </p:style>
+        </p:cxnSp>
+        <p:sp>
+          <p:nvSpPr>
+            <p:cNvPr id="192" name="Isosceles Triangle 102">
+              <a:extLst>
+                <a:ext uri="{FF2B5EF4-FFF2-40B4-BE49-F238E27FC236}">
+                  <a16:creationId xmlns:a16="http://schemas.microsoft.com/office/drawing/2014/main" id="{0C9FDFDC-F382-4299-AC6C-2DDDA5039828}"/>
+                </a:ext>
+              </a:extLst>
+            </p:cNvPr>
+            <p:cNvSpPr/>
+            <p:nvPr/>
+          </p:nvSpPr>
+          <p:spPr>
+            <a:xfrm rot="10800000" flipV="1">
+              <a:off x="3956721" y="5216228"/>
+              <a:ext cx="282387" cy="157062"/>
+            </a:xfrm>
+            <a:prstGeom prst="triangle">
+              <a:avLst/>
+            </a:prstGeom>
+            <a:ln w="19050">
+              <a:solidFill>
+                <a:srgbClr val="7030A0"/>
+              </a:solidFill>
+            </a:ln>
+            <a:effectLst/>
+          </p:spPr>
+          <p:style>
+            <a:lnRef idx="1">
+              <a:schemeClr val="accent4"/>
+            </a:lnRef>
+            <a:fillRef idx="2">
+              <a:schemeClr val="accent4"/>
+            </a:fillRef>
+            <a:effectRef idx="1">
+              <a:schemeClr val="accent4"/>
+            </a:effectRef>
+            <a:fontRef idx="minor">
+              <a:schemeClr val="dk1"/>
+            </a:fontRef>
+          </p:style>
+          <p:txBody>
+            <a:bodyPr rtlCol="0" anchor="ctr"/>
+            <a:lstStyle/>
+            <a:p>
+              <a:pPr algn="ctr"/>
+              <a:endParaRPr lang="en-SG" sz="1050" b="1">
+                <a:solidFill>
+                  <a:srgbClr val="92D050"/>
+                </a:solidFill>
+              </a:endParaRPr>
+            </a:p>
+          </p:txBody>
+        </p:sp>
+      </p:grpSp>
+      <p:sp>
+        <p:nvSpPr>
+          <p:cNvPr id="194" name="Rectangle 8">
+            <a:extLst>
+              <a:ext uri="{FF2B5EF4-FFF2-40B4-BE49-F238E27FC236}">
+                <a16:creationId xmlns:a16="http://schemas.microsoft.com/office/drawing/2014/main" id="{D3D1E60F-E702-4F42-A347-6F6964436333}"/>
+              </a:ext>
+            </a:extLst>
+          </p:cNvPr>
+          <p:cNvSpPr/>
+          <p:nvPr/>
+        </p:nvSpPr>
+        <p:spPr>
+          <a:xfrm>
+            <a:off x="3431805" y="2204873"/>
+            <a:ext cx="1378274" cy="298860"/>
+          </a:xfrm>
+          <a:prstGeom prst="rect">
+            <a:avLst/>
+          </a:prstGeom>
+          <a:ln w="19050">
+            <a:solidFill>
+              <a:srgbClr val="7030A0"/>
+            </a:solidFill>
+          </a:ln>
+          <a:effectLst/>
+        </p:spPr>
+        <p:style>
+          <a:lnRef idx="1">
+            <a:schemeClr val="accent4"/>
+          </a:lnRef>
+          <a:fillRef idx="2">
+            <a:schemeClr val="accent4"/>
+          </a:fillRef>
+          <a:effectRef idx="1">
+            <a:schemeClr val="accent4"/>
+          </a:effectRef>
+          <a:fontRef idx="minor">
+            <a:schemeClr val="dk1"/>
+          </a:fontRef>
+        </p:style>
+        <p:txBody>
+          <a:bodyPr rtlCol="0" anchor="ctr"/>
+          <a:lstStyle/>
+          <a:p>
+            <a:pPr algn="ctr"/>
+            <a:r>
+              <a:rPr lang="en-US" sz="900" dirty="0">
+                <a:solidFill>
+                  <a:srgbClr val="7030A0"/>
+                </a:solidFill>
+              </a:rPr>
+              <a:t>&lt;&lt;interface&gt;&gt;</a:t>
+            </a:r>
+            <a:br>
+              <a:rPr lang="en-US" sz="900" dirty="0">
+                <a:solidFill>
+                  <a:srgbClr val="7030A0"/>
+                </a:solidFill>
+              </a:rPr>
+            </a:br>
+            <a:r>
+              <a:rPr lang="en-US" sz="900" dirty="0" err="1">
+                <a:solidFill>
+                  <a:srgbClr val="7030A0"/>
+                </a:solidFill>
+              </a:rPr>
+              <a:t>ReadOnlyEmployee</a:t>
+            </a:r>
+            <a:endParaRPr lang="en-SG" sz="900" dirty="0">
+              <a:solidFill>
+                <a:srgbClr val="7030A0"/>
+              </a:solidFill>
+            </a:endParaRPr>
+          </a:p>
+        </p:txBody>
+      </p:sp>
+      <p:grpSp>
+        <p:nvGrpSpPr>
+          <p:cNvPr id="195" name="Group 194">
+            <a:extLst>
+              <a:ext uri="{FF2B5EF4-FFF2-40B4-BE49-F238E27FC236}">
+                <a16:creationId xmlns:a16="http://schemas.microsoft.com/office/drawing/2014/main" id="{ED95ECA8-C4BF-4330-9C49-DE1B3658754C}"/>
+              </a:ext>
+            </a:extLst>
+          </p:cNvPr>
+          <p:cNvGrpSpPr/>
+          <p:nvPr/>
+        </p:nvGrpSpPr>
+        <p:grpSpPr>
+          <a:xfrm rot="10800000">
+            <a:off x="5979755" y="2999706"/>
+            <a:ext cx="250566" cy="313004"/>
+            <a:chOff x="3956721" y="5216228"/>
+            <a:chExt cx="282387" cy="450886"/>
+          </a:xfrm>
+        </p:grpSpPr>
+        <p:cxnSp>
+          <p:nvCxnSpPr>
+            <p:cNvPr id="196" name="Elbow Connector 63">
+              <a:extLst>
+                <a:ext uri="{FF2B5EF4-FFF2-40B4-BE49-F238E27FC236}">
+                  <a16:creationId xmlns:a16="http://schemas.microsoft.com/office/drawing/2014/main" id="{4D986A80-58FC-4658-9100-6A5721A42601}"/>
+                </a:ext>
+              </a:extLst>
+            </p:cNvPr>
+            <p:cNvCxnSpPr>
+              <a:stCxn id="197" idx="3"/>
+            </p:cNvCxnSpPr>
+            <p:nvPr/>
+          </p:nvCxnSpPr>
+          <p:spPr>
+            <a:xfrm rot="5400000">
+              <a:off x="3948033" y="5517233"/>
+              <a:ext cx="293825" cy="5938"/>
+            </a:xfrm>
+            <a:prstGeom prst="bentConnector3">
+              <a:avLst>
+                <a:gd name="adj1" fmla="val 50000"/>
+              </a:avLst>
+            </a:prstGeom>
+            <a:ln w="19050">
+              <a:solidFill>
+                <a:srgbClr val="7030A0"/>
+              </a:solidFill>
+              <a:prstDash val="sysDot"/>
+              <a:headEnd type="none" w="med" len="med"/>
+              <a:tailEnd type="none" w="med" len="med"/>
+            </a:ln>
+            <a:effectLst/>
+          </p:spPr>
+          <p:style>
+            <a:lnRef idx="1">
+              <a:schemeClr val="accent2"/>
+            </a:lnRef>
+            <a:fillRef idx="2">
+              <a:schemeClr val="accent2"/>
+            </a:fillRef>
+            <a:effectRef idx="1">
+              <a:schemeClr val="accent2"/>
+            </a:effectRef>
+            <a:fontRef idx="minor">
+              <a:schemeClr val="dk1"/>
+            </a:fontRef>
+          </p:style>
+        </p:cxnSp>
+        <p:sp>
+          <p:nvSpPr>
+            <p:cNvPr id="197" name="Isosceles Triangle 102">
+              <a:extLst>
+                <a:ext uri="{FF2B5EF4-FFF2-40B4-BE49-F238E27FC236}">
+                  <a16:creationId xmlns:a16="http://schemas.microsoft.com/office/drawing/2014/main" id="{A2FC8340-9853-4A05-A6E4-CDC5E5E56258}"/>
+                </a:ext>
+              </a:extLst>
+            </p:cNvPr>
+            <p:cNvSpPr/>
+            <p:nvPr/>
+          </p:nvSpPr>
+          <p:spPr>
+            <a:xfrm rot="10800000" flipV="1">
+              <a:off x="3956721" y="5216228"/>
+              <a:ext cx="282387" cy="157062"/>
+            </a:xfrm>
+            <a:prstGeom prst="triangle">
+              <a:avLst/>
+            </a:prstGeom>
+            <a:ln w="19050">
+              <a:solidFill>
+                <a:srgbClr val="7030A0"/>
+              </a:solidFill>
+            </a:ln>
+            <a:effectLst/>
+          </p:spPr>
+          <p:style>
+            <a:lnRef idx="1">
+              <a:schemeClr val="accent4"/>
+            </a:lnRef>
+            <a:fillRef idx="2">
+              <a:schemeClr val="accent4"/>
+            </a:fillRef>
+            <a:effectRef idx="1">
+              <a:schemeClr val="accent4"/>
+            </a:effectRef>
+            <a:fontRef idx="minor">
+              <a:schemeClr val="dk1"/>
+            </a:fontRef>
+          </p:style>
+          <p:txBody>
+            <a:bodyPr rtlCol="0" anchor="ctr"/>
+            <a:lstStyle/>
+            <a:p>
+              <a:pPr algn="ctr"/>
+              <a:endParaRPr lang="en-SG" sz="1050" b="1">
+                <a:solidFill>
+                  <a:srgbClr val="92D050"/>
+                </a:solidFill>
+              </a:endParaRPr>
+            </a:p>
+          </p:txBody>
+        </p:sp>
+      </p:grpSp>
+      <p:sp>
+        <p:nvSpPr>
+          <p:cNvPr id="198" name="Rectangle 8">
+            <a:extLst>
+              <a:ext uri="{FF2B5EF4-FFF2-40B4-BE49-F238E27FC236}">
+                <a16:creationId xmlns:a16="http://schemas.microsoft.com/office/drawing/2014/main" id="{7A267C83-FBE9-472B-A18F-8CB747C1640E}"/>
+              </a:ext>
+            </a:extLst>
+          </p:cNvPr>
+          <p:cNvSpPr/>
+          <p:nvPr/>
+        </p:nvSpPr>
+        <p:spPr>
+          <a:xfrm>
+            <a:off x="5620370" y="3319460"/>
+            <a:ext cx="1124781" cy="298860"/>
+          </a:xfrm>
+          <a:prstGeom prst="rect">
+            <a:avLst/>
+          </a:prstGeom>
+          <a:ln w="19050">
+            <a:solidFill>
+              <a:srgbClr val="7030A0"/>
+            </a:solidFill>
+          </a:ln>
+          <a:effectLst/>
+        </p:spPr>
+        <p:style>
+          <a:lnRef idx="1">
+            <a:schemeClr val="accent4"/>
+          </a:lnRef>
+          <a:fillRef idx="2">
+            <a:schemeClr val="accent4"/>
+          </a:fillRef>
+          <a:effectRef idx="1">
+            <a:schemeClr val="accent4"/>
+          </a:effectRef>
+          <a:fontRef idx="minor">
+            <a:schemeClr val="dk1"/>
+          </a:fontRef>
+        </p:style>
+        <p:txBody>
+          <a:bodyPr rtlCol="0" anchor="ctr"/>
+          <a:lstStyle/>
+          <a:p>
+            <a:pPr algn="ctr"/>
+            <a:r>
+              <a:rPr lang="en-US" sz="900" dirty="0">
+                <a:solidFill>
+                  <a:srgbClr val="7030A0"/>
+                </a:solidFill>
+              </a:rPr>
+              <a:t>&lt;&lt;interface&gt;&gt;</a:t>
+            </a:r>
+            <a:br>
+              <a:rPr lang="en-US" sz="900" dirty="0">
+                <a:solidFill>
+                  <a:srgbClr val="7030A0"/>
+                </a:solidFill>
+              </a:rPr>
+            </a:br>
+            <a:r>
+              <a:rPr lang="en-US" sz="900" dirty="0" err="1">
+                <a:solidFill>
+                  <a:srgbClr val="7030A0"/>
+                </a:solidFill>
+              </a:rPr>
+              <a:t>ReadOnlyMember</a:t>
+            </a:r>
+            <a:endParaRPr lang="en-SG" sz="900" dirty="0">
+              <a:solidFill>
+                <a:srgbClr val="7030A0"/>
+              </a:solidFill>
+            </a:endParaRPr>
+          </a:p>
+        </p:txBody>
+      </p:sp>
+      <p:grpSp>
+        <p:nvGrpSpPr>
+          <p:cNvPr id="199" name="Group 198">
+            <a:extLst>
+              <a:ext uri="{FF2B5EF4-FFF2-40B4-BE49-F238E27FC236}">
+                <a16:creationId xmlns:a16="http://schemas.microsoft.com/office/drawing/2014/main" id="{D3CC78F8-83B7-4273-A587-A46B028D4F3B}"/>
+              </a:ext>
+            </a:extLst>
+          </p:cNvPr>
+          <p:cNvGrpSpPr/>
+          <p:nvPr/>
+        </p:nvGrpSpPr>
+        <p:grpSpPr>
+          <a:xfrm rot="10800000">
+            <a:off x="3981299" y="3636981"/>
+            <a:ext cx="250566" cy="313004"/>
+            <a:chOff x="3956721" y="5216228"/>
+            <a:chExt cx="282387" cy="450886"/>
+          </a:xfrm>
+        </p:grpSpPr>
+        <p:cxnSp>
+          <p:nvCxnSpPr>
+            <p:cNvPr id="200" name="Elbow Connector 63">
+              <a:extLst>
+                <a:ext uri="{FF2B5EF4-FFF2-40B4-BE49-F238E27FC236}">
+                  <a16:creationId xmlns:a16="http://schemas.microsoft.com/office/drawing/2014/main" id="{15ED941B-84DD-49A7-8BF6-0D05CAF450F2}"/>
+                </a:ext>
+              </a:extLst>
+            </p:cNvPr>
+            <p:cNvCxnSpPr>
+              <a:stCxn id="201" idx="3"/>
+            </p:cNvCxnSpPr>
+            <p:nvPr/>
+          </p:nvCxnSpPr>
+          <p:spPr>
+            <a:xfrm rot="5400000">
+              <a:off x="3948033" y="5517233"/>
+              <a:ext cx="293825" cy="5938"/>
+            </a:xfrm>
+            <a:prstGeom prst="bentConnector3">
+              <a:avLst>
+                <a:gd name="adj1" fmla="val 50000"/>
+              </a:avLst>
+            </a:prstGeom>
+            <a:ln w="19050">
+              <a:solidFill>
+                <a:srgbClr val="7030A0"/>
+              </a:solidFill>
+              <a:prstDash val="sysDot"/>
+              <a:headEnd type="none" w="med" len="med"/>
+              <a:tailEnd type="none" w="med" len="med"/>
+            </a:ln>
+            <a:effectLst/>
+          </p:spPr>
+          <p:style>
+            <a:lnRef idx="1">
+              <a:schemeClr val="accent2"/>
+            </a:lnRef>
+            <a:fillRef idx="2">
+              <a:schemeClr val="accent2"/>
+            </a:fillRef>
+            <a:effectRef idx="1">
+              <a:schemeClr val="accent2"/>
+            </a:effectRef>
+            <a:fontRef idx="minor">
+              <a:schemeClr val="dk1"/>
+            </a:fontRef>
+          </p:style>
+        </p:cxnSp>
+        <p:sp>
+          <p:nvSpPr>
+            <p:cNvPr id="201" name="Isosceles Triangle 102">
+              <a:extLst>
+                <a:ext uri="{FF2B5EF4-FFF2-40B4-BE49-F238E27FC236}">
+                  <a16:creationId xmlns:a16="http://schemas.microsoft.com/office/drawing/2014/main" id="{BB3B0031-CDF5-4584-BAD2-61D3A53995E5}"/>
+                </a:ext>
+              </a:extLst>
+            </p:cNvPr>
+            <p:cNvSpPr/>
+            <p:nvPr/>
+          </p:nvSpPr>
+          <p:spPr>
+            <a:xfrm rot="10800000" flipV="1">
+              <a:off x="3956721" y="5216228"/>
+              <a:ext cx="282387" cy="157062"/>
+            </a:xfrm>
+            <a:prstGeom prst="triangle">
+              <a:avLst/>
+            </a:prstGeom>
+            <a:ln w="19050">
+              <a:solidFill>
+                <a:srgbClr val="7030A0"/>
+              </a:solidFill>
+            </a:ln>
+            <a:effectLst/>
+          </p:spPr>
+          <p:style>
+            <a:lnRef idx="1">
+              <a:schemeClr val="accent4"/>
+            </a:lnRef>
+            <a:fillRef idx="2">
+              <a:schemeClr val="accent4"/>
+            </a:fillRef>
+            <a:effectRef idx="1">
+              <a:schemeClr val="accent4"/>
+            </a:effectRef>
+            <a:fontRef idx="minor">
+              <a:schemeClr val="dk1"/>
+            </a:fontRef>
+          </p:style>
+          <p:txBody>
+            <a:bodyPr rtlCol="0" anchor="ctr"/>
+            <a:lstStyle/>
+            <a:p>
+              <a:pPr algn="ctr"/>
+              <a:endParaRPr lang="en-SG" sz="1050" b="1">
+                <a:solidFill>
+                  <a:srgbClr val="92D050"/>
+                </a:solidFill>
+              </a:endParaRPr>
+            </a:p>
+          </p:txBody>
+        </p:sp>
+      </p:grpSp>
+      <p:sp>
+        <p:nvSpPr>
+          <p:cNvPr id="202" name="Rectangle 8">
+            <a:extLst>
+              <a:ext uri="{FF2B5EF4-FFF2-40B4-BE49-F238E27FC236}">
+                <a16:creationId xmlns:a16="http://schemas.microsoft.com/office/drawing/2014/main" id="{5DEEBE06-A5D5-4FD1-A9D1-2DAD42C4817A}"/>
+              </a:ext>
+            </a:extLst>
+          </p:cNvPr>
+          <p:cNvSpPr/>
+          <p:nvPr/>
+        </p:nvSpPr>
+        <p:spPr>
+          <a:xfrm>
+            <a:off x="3560354" y="3956735"/>
+            <a:ext cx="1186341" cy="298860"/>
+          </a:xfrm>
+          <a:prstGeom prst="rect">
+            <a:avLst/>
+          </a:prstGeom>
+          <a:ln w="19050">
+            <a:solidFill>
+              <a:srgbClr val="7030A0"/>
+            </a:solidFill>
+          </a:ln>
+          <a:effectLst/>
+        </p:spPr>
+        <p:style>
+          <a:lnRef idx="1">
+            <a:schemeClr val="accent4"/>
+          </a:lnRef>
+          <a:fillRef idx="2">
+            <a:schemeClr val="accent4"/>
+          </a:fillRef>
+          <a:effectRef idx="1">
+            <a:schemeClr val="accent4"/>
+          </a:effectRef>
+          <a:fontRef idx="minor">
+            <a:schemeClr val="dk1"/>
+          </a:fontRef>
+        </p:style>
+        <p:txBody>
+          <a:bodyPr rtlCol="0" anchor="ctr"/>
+          <a:lstStyle/>
+          <a:p>
+            <a:pPr algn="ctr"/>
+            <a:r>
+              <a:rPr lang="en-US" sz="900" dirty="0">
+                <a:solidFill>
+                  <a:srgbClr val="7030A0"/>
+                </a:solidFill>
+              </a:rPr>
+              <a:t>&lt;&lt;interface&gt;&gt;</a:t>
+            </a:r>
+            <a:br>
+              <a:rPr lang="en-US" sz="900" dirty="0">
+                <a:solidFill>
+                  <a:srgbClr val="7030A0"/>
+                </a:solidFill>
+              </a:rPr>
+            </a:br>
+            <a:r>
+              <a:rPr lang="en-US" sz="900" dirty="0" err="1">
+                <a:solidFill>
+                  <a:srgbClr val="7030A0"/>
+                </a:solidFill>
+              </a:rPr>
+              <a:t>ReadOnlyOrder</a:t>
+            </a:r>
+            <a:endParaRPr lang="en-SG" sz="900" dirty="0">
+              <a:solidFill>
+                <a:srgbClr val="7030A0"/>
+              </a:solidFill>
+            </a:endParaRPr>
+          </a:p>
+        </p:txBody>
+      </p:sp>
+      <p:grpSp>
+        <p:nvGrpSpPr>
+          <p:cNvPr id="203" name="Group 202">
+            <a:extLst>
+              <a:ext uri="{FF2B5EF4-FFF2-40B4-BE49-F238E27FC236}">
+                <a16:creationId xmlns:a16="http://schemas.microsoft.com/office/drawing/2014/main" id="{5C22EAE9-C2AE-415F-9D7B-A12C3E376BB1}"/>
+              </a:ext>
+            </a:extLst>
+          </p:cNvPr>
+          <p:cNvGrpSpPr/>
+          <p:nvPr/>
+        </p:nvGrpSpPr>
+        <p:grpSpPr>
+          <a:xfrm rot="10800000">
+            <a:off x="6055524" y="5322471"/>
+            <a:ext cx="250566" cy="313004"/>
+            <a:chOff x="3956721" y="5216228"/>
+            <a:chExt cx="282387" cy="450886"/>
+          </a:xfrm>
+        </p:grpSpPr>
+        <p:cxnSp>
+          <p:nvCxnSpPr>
+            <p:cNvPr id="204" name="Elbow Connector 63">
+              <a:extLst>
+                <a:ext uri="{FF2B5EF4-FFF2-40B4-BE49-F238E27FC236}">
+                  <a16:creationId xmlns:a16="http://schemas.microsoft.com/office/drawing/2014/main" id="{F59CA712-0038-4F0F-957C-89B813CC96AB}"/>
+                </a:ext>
+              </a:extLst>
+            </p:cNvPr>
+            <p:cNvCxnSpPr>
+              <a:stCxn id="205" idx="3"/>
+            </p:cNvCxnSpPr>
+            <p:nvPr/>
+          </p:nvCxnSpPr>
+          <p:spPr>
+            <a:xfrm rot="5400000">
+              <a:off x="3948033" y="5517233"/>
+              <a:ext cx="293825" cy="5938"/>
+            </a:xfrm>
+            <a:prstGeom prst="bentConnector3">
+              <a:avLst>
+                <a:gd name="adj1" fmla="val 50000"/>
+              </a:avLst>
+            </a:prstGeom>
+            <a:ln w="19050">
+              <a:solidFill>
+                <a:srgbClr val="7030A0"/>
+              </a:solidFill>
+              <a:prstDash val="sysDot"/>
+              <a:headEnd type="none" w="med" len="med"/>
+              <a:tailEnd type="none" w="med" len="med"/>
+            </a:ln>
+            <a:effectLst/>
+          </p:spPr>
+          <p:style>
+            <a:lnRef idx="1">
+              <a:schemeClr val="accent2"/>
+            </a:lnRef>
+            <a:fillRef idx="2">
+              <a:schemeClr val="accent2"/>
+            </a:fillRef>
+            <a:effectRef idx="1">
+              <a:schemeClr val="accent2"/>
+            </a:effectRef>
+            <a:fontRef idx="minor">
+              <a:schemeClr val="dk1"/>
+            </a:fontRef>
+          </p:style>
+        </p:cxnSp>
+        <p:sp>
+          <p:nvSpPr>
+            <p:cNvPr id="205" name="Isosceles Triangle 102">
+              <a:extLst>
+                <a:ext uri="{FF2B5EF4-FFF2-40B4-BE49-F238E27FC236}">
+                  <a16:creationId xmlns:a16="http://schemas.microsoft.com/office/drawing/2014/main" id="{55FE0CE8-8A56-4F25-A577-FC74EEF9C52D}"/>
+                </a:ext>
+              </a:extLst>
+            </p:cNvPr>
+            <p:cNvSpPr/>
+            <p:nvPr/>
+          </p:nvSpPr>
+          <p:spPr>
+            <a:xfrm rot="10800000" flipV="1">
+              <a:off x="3956721" y="5216228"/>
+              <a:ext cx="282387" cy="157062"/>
+            </a:xfrm>
+            <a:prstGeom prst="triangle">
+              <a:avLst/>
+            </a:prstGeom>
+            <a:ln w="19050">
+              <a:solidFill>
+                <a:srgbClr val="7030A0"/>
+              </a:solidFill>
+            </a:ln>
+            <a:effectLst/>
+          </p:spPr>
+          <p:style>
+            <a:lnRef idx="1">
+              <a:schemeClr val="accent4"/>
+            </a:lnRef>
+            <a:fillRef idx="2">
+              <a:schemeClr val="accent4"/>
+            </a:fillRef>
+            <a:effectRef idx="1">
+              <a:schemeClr val="accent4"/>
+            </a:effectRef>
+            <a:fontRef idx="minor">
+              <a:schemeClr val="dk1"/>
+            </a:fontRef>
+          </p:style>
+          <p:txBody>
+            <a:bodyPr rtlCol="0" anchor="ctr"/>
+            <a:lstStyle/>
+            <a:p>
+              <a:pPr algn="ctr"/>
+              <a:endParaRPr lang="en-SG" sz="1050" b="1">
+                <a:solidFill>
+                  <a:srgbClr val="92D050"/>
+                </a:solidFill>
+              </a:endParaRPr>
+            </a:p>
+          </p:txBody>
+        </p:sp>
+      </p:grpSp>
+      <p:sp>
+        <p:nvSpPr>
+          <p:cNvPr id="206" name="Rectangle 8">
+            <a:extLst>
+              <a:ext uri="{FF2B5EF4-FFF2-40B4-BE49-F238E27FC236}">
+                <a16:creationId xmlns:a16="http://schemas.microsoft.com/office/drawing/2014/main" id="{F69F3562-E1B4-41B2-8507-BB7D861B03BB}"/>
+              </a:ext>
+            </a:extLst>
+          </p:cNvPr>
+          <p:cNvSpPr/>
+          <p:nvPr/>
+        </p:nvSpPr>
+        <p:spPr>
+          <a:xfrm>
+            <a:off x="5526149" y="5642225"/>
+            <a:ext cx="1294772" cy="298860"/>
+          </a:xfrm>
+          <a:prstGeom prst="rect">
+            <a:avLst/>
+          </a:prstGeom>
+          <a:ln w="19050">
+            <a:solidFill>
+              <a:srgbClr val="7030A0"/>
+            </a:solidFill>
+          </a:ln>
+          <a:effectLst/>
+        </p:spPr>
+        <p:style>
+          <a:lnRef idx="1">
+            <a:schemeClr val="accent4"/>
+          </a:lnRef>
+          <a:fillRef idx="2">
+            <a:schemeClr val="accent4"/>
+          </a:fillRef>
+          <a:effectRef idx="1">
+            <a:schemeClr val="accent4"/>
+          </a:effectRef>
+          <a:fontRef idx="minor">
+            <a:schemeClr val="dk1"/>
+          </a:fontRef>
+        </p:style>
+        <p:txBody>
+          <a:bodyPr rtlCol="0" anchor="ctr"/>
+          <a:lstStyle/>
+          <a:p>
+            <a:pPr algn="ctr"/>
+            <a:r>
+              <a:rPr lang="en-US" sz="900" dirty="0">
+                <a:solidFill>
+                  <a:srgbClr val="7030A0"/>
+                </a:solidFill>
+              </a:rPr>
+              <a:t>&lt;&lt;interface&gt;&gt;</a:t>
+            </a:r>
+            <a:br>
+              <a:rPr lang="en-US" sz="900" dirty="0">
+                <a:solidFill>
+                  <a:srgbClr val="7030A0"/>
+                </a:solidFill>
+              </a:rPr>
+            </a:br>
+            <a:r>
+              <a:rPr lang="en-US" sz="900" dirty="0" err="1">
+                <a:solidFill>
+                  <a:srgbClr val="7030A0"/>
+                </a:solidFill>
+              </a:rPr>
+              <a:t>ReadOnlyMenu</a:t>
+            </a:r>
+            <a:endParaRPr lang="en-SG" sz="900" dirty="0">
+              <a:solidFill>
+                <a:srgbClr val="7030A0"/>
+              </a:solidFill>
+            </a:endParaRPr>
+          </a:p>
+        </p:txBody>
+      </p:sp>
+      <p:cxnSp>
+        <p:nvCxnSpPr>
+          <p:cNvPr id="208" name="Straight Arrow Connector 207">
+            <a:extLst>
+              <a:ext uri="{FF2B5EF4-FFF2-40B4-BE49-F238E27FC236}">
+                <a16:creationId xmlns:a16="http://schemas.microsoft.com/office/drawing/2014/main" id="{4A733B5F-F014-48C9-9707-37651B10B773}"/>
+              </a:ext>
+            </a:extLst>
+          </p:cNvPr>
+          <p:cNvCxnSpPr/>
+          <p:nvPr/>
+        </p:nvCxnSpPr>
+        <p:spPr>
+          <a:xfrm>
+            <a:off x="1587379" y="2824221"/>
+            <a:ext cx="381000" cy="0"/>
+          </a:xfrm>
+          <a:prstGeom prst="straightConnector1">
+            <a:avLst/>
+          </a:prstGeom>
+          <a:ln w="19050">
+            <a:tailEnd type="triangle"/>
+          </a:ln>
+        </p:spPr>
+        <p:style>
+          <a:lnRef idx="1">
+            <a:schemeClr val="accent4"/>
+          </a:lnRef>
+          <a:fillRef idx="0">
+            <a:schemeClr val="accent4"/>
+          </a:fillRef>
+          <a:effectRef idx="0">
+            <a:schemeClr val="accent4"/>
+          </a:effectRef>
+          <a:fontRef idx="minor">
+            <a:schemeClr val="tx1"/>
+          </a:fontRef>
+        </p:style>
+      </p:cxnSp>
+      <p:sp>
+        <p:nvSpPr>
+          <p:cNvPr id="216" name="Rectangle 8">
+            <a:extLst>
+              <a:ext uri="{FF2B5EF4-FFF2-40B4-BE49-F238E27FC236}">
+                <a16:creationId xmlns:a16="http://schemas.microsoft.com/office/drawing/2014/main" id="{9A55EF20-149D-45ED-BD36-8BA0A4F22978}"/>
+              </a:ext>
+            </a:extLst>
+          </p:cNvPr>
+          <p:cNvSpPr/>
+          <p:nvPr/>
+        </p:nvSpPr>
+        <p:spPr>
+          <a:xfrm>
+            <a:off x="1994022" y="838200"/>
+            <a:ext cx="1358772" cy="380320"/>
+          </a:xfrm>
+          <a:prstGeom prst="rect">
+            <a:avLst/>
+          </a:prstGeom>
+          <a:ln w="19050">
+            <a:solidFill>
+              <a:srgbClr val="7030A0"/>
+            </a:solidFill>
+          </a:ln>
+          <a:effectLst/>
+        </p:spPr>
+        <p:style>
+          <a:lnRef idx="1">
+            <a:schemeClr val="accent4"/>
+          </a:lnRef>
+          <a:fillRef idx="2">
+            <a:schemeClr val="accent4"/>
+          </a:fillRef>
+          <a:effectRef idx="1">
+            <a:schemeClr val="accent4"/>
+          </a:effectRef>
+          <a:fontRef idx="minor">
+            <a:schemeClr val="dk1"/>
+          </a:fontRef>
+        </p:style>
+        <p:txBody>
+          <a:bodyPr rtlCol="0" anchor="ctr"/>
+          <a:lstStyle/>
+          <a:p>
+            <a:pPr algn="ctr"/>
+            <a:r>
+              <a:rPr lang="en-US" sz="1050" dirty="0">
+                <a:solidFill>
+                  <a:srgbClr val="7030A0"/>
+                </a:solidFill>
+              </a:rPr>
+              <a:t>…Exceptions</a:t>
+            </a:r>
+            <a:endParaRPr lang="en-SG" sz="1050" dirty="0">
+              <a:solidFill>
+                <a:srgbClr val="7030A0"/>
+              </a:solidFill>
+            </a:endParaRPr>
+          </a:p>
+        </p:txBody>
+      </p:sp>
+      <p:sp>
+        <p:nvSpPr>
+          <p:cNvPr id="217" name="Rectangle 8">
+            <a:extLst>
+              <a:ext uri="{FF2B5EF4-FFF2-40B4-BE49-F238E27FC236}">
+                <a16:creationId xmlns:a16="http://schemas.microsoft.com/office/drawing/2014/main" id="{8F2CC5B9-0C5F-4F58-95CC-6855387E37FC}"/>
+              </a:ext>
+            </a:extLst>
+          </p:cNvPr>
+          <p:cNvSpPr/>
+          <p:nvPr/>
+        </p:nvSpPr>
+        <p:spPr>
+          <a:xfrm>
+            <a:off x="1997998" y="5886939"/>
+            <a:ext cx="1358772" cy="380320"/>
+          </a:xfrm>
+          <a:prstGeom prst="rect">
+            <a:avLst/>
+          </a:prstGeom>
+          <a:ln w="19050">
+            <a:solidFill>
+              <a:srgbClr val="7030A0"/>
+            </a:solidFill>
+          </a:ln>
+          <a:effectLst/>
+        </p:spPr>
+        <p:style>
+          <a:lnRef idx="1">
+            <a:schemeClr val="accent4"/>
+          </a:lnRef>
+          <a:fillRef idx="2">
+            <a:schemeClr val="accent4"/>
+          </a:fillRef>
+          <a:effectRef idx="1">
+            <a:schemeClr val="accent4"/>
+          </a:effectRef>
+          <a:fontRef idx="minor">
+            <a:schemeClr val="dk1"/>
+          </a:fontRef>
+        </p:style>
+        <p:txBody>
+          <a:bodyPr rtlCol="0" anchor="ctr"/>
+          <a:lstStyle/>
+          <a:p>
+            <a:pPr algn="ctr"/>
+            <a:r>
+              <a:rPr lang="en-US" sz="1050" dirty="0">
+                <a:solidFill>
+                  <a:srgbClr val="7030A0"/>
+                </a:solidFill>
+              </a:rPr>
+              <a:t>…</a:t>
+            </a:r>
+            <a:r>
+              <a:rPr lang="en-US" sz="1050" dirty="0" err="1">
+                <a:solidFill>
+                  <a:srgbClr val="7030A0"/>
+                </a:solidFill>
+              </a:rPr>
+              <a:t>ReadOnlyStats</a:t>
+            </a:r>
+            <a:endParaRPr lang="en-SG" sz="1050" dirty="0">
+              <a:solidFill>
+                <a:srgbClr val="7030A0"/>
+              </a:solidFill>
+            </a:endParaRPr>
+          </a:p>
+        </p:txBody>
+      </p:sp>
+      <p:cxnSp>
+        <p:nvCxnSpPr>
+          <p:cNvPr id="218" name="Straight Connector 217">
+            <a:extLst>
+              <a:ext uri="{FF2B5EF4-FFF2-40B4-BE49-F238E27FC236}">
+                <a16:creationId xmlns:a16="http://schemas.microsoft.com/office/drawing/2014/main" id="{73EDC0B5-137B-44C8-9671-DE3A35DF3EF8}"/>
+              </a:ext>
+            </a:extLst>
+          </p:cNvPr>
+          <p:cNvCxnSpPr/>
+          <p:nvPr/>
+        </p:nvCxnSpPr>
+        <p:spPr>
+          <a:xfrm>
+            <a:off x="4759367" y="1667952"/>
+            <a:ext cx="227463" cy="0"/>
+          </a:xfrm>
+          <a:prstGeom prst="line">
+            <a:avLst/>
+          </a:prstGeom>
+          <a:ln w="12700"/>
+        </p:spPr>
+        <p:style>
+          <a:lnRef idx="1">
+            <a:schemeClr val="accent4"/>
+          </a:lnRef>
+          <a:fillRef idx="0">
+            <a:schemeClr val="accent4"/>
+          </a:fillRef>
+          <a:effectRef idx="0">
+            <a:schemeClr val="accent4"/>
+          </a:effectRef>
+          <a:fontRef idx="minor">
+            <a:schemeClr val="tx1"/>
+          </a:fontRef>
+        </p:style>
+      </p:cxnSp>
+      <p:cxnSp>
+        <p:nvCxnSpPr>
+          <p:cNvPr id="219" name="Straight Connector 218">
+            <a:extLst>
+              <a:ext uri="{FF2B5EF4-FFF2-40B4-BE49-F238E27FC236}">
+                <a16:creationId xmlns:a16="http://schemas.microsoft.com/office/drawing/2014/main" id="{54FA83CE-66D1-4997-8507-1D70F4A2E783}"/>
+              </a:ext>
+            </a:extLst>
+          </p:cNvPr>
+          <p:cNvCxnSpPr>
+            <a:cxnSpLocks/>
+          </p:cNvCxnSpPr>
+          <p:nvPr/>
+        </p:nvCxnSpPr>
+        <p:spPr>
+          <a:xfrm>
+            <a:off x="4987643" y="1028360"/>
+            <a:ext cx="4306" cy="1291317"/>
+          </a:xfrm>
+          <a:prstGeom prst="line">
+            <a:avLst/>
+          </a:prstGeom>
+          <a:ln w="12700"/>
+        </p:spPr>
+        <p:style>
+          <a:lnRef idx="1">
+            <a:schemeClr val="accent4"/>
+          </a:lnRef>
+          <a:fillRef idx="0">
+            <a:schemeClr val="accent4"/>
+          </a:fillRef>
+          <a:effectRef idx="0">
+            <a:schemeClr val="accent4"/>
+          </a:effectRef>
+          <a:fontRef idx="minor">
+            <a:schemeClr val="tx1"/>
+          </a:fontRef>
+        </p:style>
+      </p:cxnSp>
+      <p:cxnSp>
+        <p:nvCxnSpPr>
+          <p:cNvPr id="232" name="Straight Connector 231">
+            <a:extLst>
+              <a:ext uri="{FF2B5EF4-FFF2-40B4-BE49-F238E27FC236}">
+                <a16:creationId xmlns:a16="http://schemas.microsoft.com/office/drawing/2014/main" id="{FE450047-7A5F-4D03-B271-CFE447FEB269}"/>
+              </a:ext>
+            </a:extLst>
+          </p:cNvPr>
+          <p:cNvCxnSpPr/>
+          <p:nvPr/>
+        </p:nvCxnSpPr>
+        <p:spPr>
+          <a:xfrm>
+            <a:off x="6744160" y="2821731"/>
+            <a:ext cx="227463" cy="0"/>
+          </a:xfrm>
+          <a:prstGeom prst="line">
+            <a:avLst/>
+          </a:prstGeom>
+          <a:ln w="12700"/>
+        </p:spPr>
+        <p:style>
+          <a:lnRef idx="1">
+            <a:schemeClr val="accent4"/>
+          </a:lnRef>
+          <a:fillRef idx="0">
+            <a:schemeClr val="accent4"/>
+          </a:fillRef>
+          <a:effectRef idx="0">
+            <a:schemeClr val="accent4"/>
+          </a:effectRef>
+          <a:fontRef idx="minor">
+            <a:schemeClr val="tx1"/>
+          </a:fontRef>
+        </p:style>
+      </p:cxnSp>
+      <p:cxnSp>
+        <p:nvCxnSpPr>
+          <p:cNvPr id="233" name="Straight Connector 232">
+            <a:extLst>
+              <a:ext uri="{FF2B5EF4-FFF2-40B4-BE49-F238E27FC236}">
+                <a16:creationId xmlns:a16="http://schemas.microsoft.com/office/drawing/2014/main" id="{E9FE6B11-8C26-4DC9-854F-47EF6658EC08}"/>
+              </a:ext>
+            </a:extLst>
+          </p:cNvPr>
+          <p:cNvCxnSpPr>
+            <a:cxnSpLocks/>
+          </p:cNvCxnSpPr>
+          <p:nvPr/>
+        </p:nvCxnSpPr>
+        <p:spPr>
+          <a:xfrm>
+            <a:off x="6980208" y="2503733"/>
+            <a:ext cx="0" cy="791631"/>
+          </a:xfrm>
+          <a:prstGeom prst="line">
+            <a:avLst/>
+          </a:prstGeom>
+          <a:ln w="12700"/>
+        </p:spPr>
+        <p:style>
+          <a:lnRef idx="1">
+            <a:schemeClr val="accent4"/>
+          </a:lnRef>
+          <a:fillRef idx="0">
+            <a:schemeClr val="accent4"/>
+          </a:fillRef>
+          <a:effectRef idx="0">
+            <a:schemeClr val="accent4"/>
+          </a:effectRef>
+          <a:fontRef idx="minor">
+            <a:schemeClr val="tx1"/>
+          </a:fontRef>
+        </p:style>
+      </p:cxnSp>
+      <p:cxnSp>
+        <p:nvCxnSpPr>
+          <p:cNvPr id="242" name="Straight Arrow Connector 241">
+            <a:extLst>
+              <a:ext uri="{FF2B5EF4-FFF2-40B4-BE49-F238E27FC236}">
+                <a16:creationId xmlns:a16="http://schemas.microsoft.com/office/drawing/2014/main" id="{B60BBAE2-7FBE-4932-94D8-A31533F44C65}"/>
+              </a:ext>
+            </a:extLst>
+          </p:cNvPr>
+          <p:cNvCxnSpPr>
+            <a:cxnSpLocks/>
+          </p:cNvCxnSpPr>
+          <p:nvPr/>
+        </p:nvCxnSpPr>
+        <p:spPr>
+          <a:xfrm>
+            <a:off x="4987226" y="1028360"/>
+            <a:ext cx="240873" cy="0"/>
+          </a:xfrm>
+          <a:prstGeom prst="straightConnector1">
+            <a:avLst/>
+          </a:prstGeom>
+          <a:ln w="12700">
+            <a:tailEnd type="triangle"/>
+          </a:ln>
+        </p:spPr>
+        <p:style>
+          <a:lnRef idx="1">
+            <a:schemeClr val="accent4"/>
+          </a:lnRef>
+          <a:fillRef idx="0">
+            <a:schemeClr val="accent4"/>
+          </a:fillRef>
+          <a:effectRef idx="0">
+            <a:schemeClr val="accent4"/>
+          </a:effectRef>
+          <a:fontRef idx="minor">
+            <a:schemeClr val="tx1"/>
+          </a:fontRef>
+        </p:style>
+      </p:cxnSp>
+      <p:cxnSp>
+        <p:nvCxnSpPr>
+          <p:cNvPr id="244" name="Straight Arrow Connector 243">
+            <a:extLst>
+              <a:ext uri="{FF2B5EF4-FFF2-40B4-BE49-F238E27FC236}">
+                <a16:creationId xmlns:a16="http://schemas.microsoft.com/office/drawing/2014/main" id="{FE3C5F69-4D57-46C5-A479-527D00A05ACC}"/>
+              </a:ext>
+            </a:extLst>
+          </p:cNvPr>
+          <p:cNvCxnSpPr>
+            <a:cxnSpLocks/>
+          </p:cNvCxnSpPr>
+          <p:nvPr/>
+        </p:nvCxnSpPr>
+        <p:spPr>
+          <a:xfrm>
+            <a:off x="4997831" y="1359075"/>
+            <a:ext cx="240873" cy="0"/>
+          </a:xfrm>
+          <a:prstGeom prst="straightConnector1">
+            <a:avLst/>
+          </a:prstGeom>
+          <a:ln w="12700">
+            <a:tailEnd type="triangle"/>
+          </a:ln>
+        </p:spPr>
+        <p:style>
+          <a:lnRef idx="1">
+            <a:schemeClr val="accent4"/>
+          </a:lnRef>
+          <a:fillRef idx="0">
+            <a:schemeClr val="accent4"/>
+          </a:fillRef>
+          <a:effectRef idx="0">
+            <a:schemeClr val="accent4"/>
+          </a:effectRef>
+          <a:fontRef idx="minor">
+            <a:schemeClr val="tx1"/>
+          </a:fontRef>
+        </p:style>
+      </p:cxnSp>
+      <p:cxnSp>
+        <p:nvCxnSpPr>
+          <p:cNvPr id="245" name="Straight Arrow Connector 244">
+            <a:extLst>
+              <a:ext uri="{FF2B5EF4-FFF2-40B4-BE49-F238E27FC236}">
+                <a16:creationId xmlns:a16="http://schemas.microsoft.com/office/drawing/2014/main" id="{FA762AC1-4D2A-47B8-81C8-7E6C9029594C}"/>
+              </a:ext>
+            </a:extLst>
+          </p:cNvPr>
+          <p:cNvCxnSpPr>
+            <a:cxnSpLocks/>
+          </p:cNvCxnSpPr>
+          <p:nvPr/>
+        </p:nvCxnSpPr>
+        <p:spPr>
+          <a:xfrm>
+            <a:off x="4997831" y="1664034"/>
+            <a:ext cx="240873" cy="0"/>
+          </a:xfrm>
+          <a:prstGeom prst="straightConnector1">
+            <a:avLst/>
+          </a:prstGeom>
+          <a:ln w="12700">
+            <a:tailEnd type="triangle"/>
+          </a:ln>
+        </p:spPr>
+        <p:style>
+          <a:lnRef idx="1">
+            <a:schemeClr val="accent4"/>
+          </a:lnRef>
+          <a:fillRef idx="0">
+            <a:schemeClr val="accent4"/>
+          </a:fillRef>
+          <a:effectRef idx="0">
+            <a:schemeClr val="accent4"/>
+          </a:effectRef>
+          <a:fontRef idx="minor">
+            <a:schemeClr val="tx1"/>
+          </a:fontRef>
+        </p:style>
+      </p:cxnSp>
+      <p:cxnSp>
+        <p:nvCxnSpPr>
+          <p:cNvPr id="246" name="Straight Arrow Connector 245">
+            <a:extLst>
+              <a:ext uri="{FF2B5EF4-FFF2-40B4-BE49-F238E27FC236}">
+                <a16:creationId xmlns:a16="http://schemas.microsoft.com/office/drawing/2014/main" id="{3ACFA958-1BD1-4079-87B6-6BB4B7781192}"/>
+              </a:ext>
+            </a:extLst>
+          </p:cNvPr>
+          <p:cNvCxnSpPr>
+            <a:cxnSpLocks/>
+          </p:cNvCxnSpPr>
+          <p:nvPr/>
+        </p:nvCxnSpPr>
+        <p:spPr>
+          <a:xfrm>
+            <a:off x="4997831" y="1981099"/>
+            <a:ext cx="240873" cy="0"/>
+          </a:xfrm>
+          <a:prstGeom prst="straightConnector1">
+            <a:avLst/>
+          </a:prstGeom>
+          <a:ln w="12700">
+            <a:tailEnd type="triangle"/>
+          </a:ln>
+        </p:spPr>
+        <p:style>
+          <a:lnRef idx="1">
+            <a:schemeClr val="accent4"/>
+          </a:lnRef>
+          <a:fillRef idx="0">
+            <a:schemeClr val="accent4"/>
+          </a:fillRef>
+          <a:effectRef idx="0">
+            <a:schemeClr val="accent4"/>
+          </a:effectRef>
+          <a:fontRef idx="minor">
+            <a:schemeClr val="tx1"/>
+          </a:fontRef>
+        </p:style>
+      </p:cxnSp>
+      <p:cxnSp>
+        <p:nvCxnSpPr>
+          <p:cNvPr id="247" name="Straight Arrow Connector 246">
+            <a:extLst>
+              <a:ext uri="{FF2B5EF4-FFF2-40B4-BE49-F238E27FC236}">
+                <a16:creationId xmlns:a16="http://schemas.microsoft.com/office/drawing/2014/main" id="{8F3771C9-36D8-4BF6-97D2-0A8FC1A48F0D}"/>
+              </a:ext>
+            </a:extLst>
+          </p:cNvPr>
+          <p:cNvCxnSpPr>
+            <a:cxnSpLocks/>
+          </p:cNvCxnSpPr>
+          <p:nvPr/>
+        </p:nvCxnSpPr>
+        <p:spPr>
+          <a:xfrm>
+            <a:off x="5004735" y="2316538"/>
+            <a:ext cx="240873" cy="0"/>
+          </a:xfrm>
+          <a:prstGeom prst="straightConnector1">
+            <a:avLst/>
+          </a:prstGeom>
+          <a:ln w="12700">
+            <a:tailEnd type="triangle"/>
+          </a:ln>
+        </p:spPr>
+        <p:style>
+          <a:lnRef idx="1">
+            <a:schemeClr val="accent4"/>
+          </a:lnRef>
+          <a:fillRef idx="0">
+            <a:schemeClr val="accent4"/>
+          </a:fillRef>
+          <a:effectRef idx="0">
+            <a:schemeClr val="accent4"/>
+          </a:effectRef>
+          <a:fontRef idx="minor">
+            <a:schemeClr val="tx1"/>
+          </a:fontRef>
+        </p:style>
+      </p:cxnSp>
+      <p:cxnSp>
+        <p:nvCxnSpPr>
+          <p:cNvPr id="251" name="Straight Arrow Connector 250">
+            <a:extLst>
+              <a:ext uri="{FF2B5EF4-FFF2-40B4-BE49-F238E27FC236}">
+                <a16:creationId xmlns:a16="http://schemas.microsoft.com/office/drawing/2014/main" id="{AD1DC041-85BF-48E3-8917-0A382E415A77}"/>
+              </a:ext>
+            </a:extLst>
+          </p:cNvPr>
+          <p:cNvCxnSpPr>
+            <a:cxnSpLocks/>
+          </p:cNvCxnSpPr>
+          <p:nvPr/>
+        </p:nvCxnSpPr>
+        <p:spPr>
+          <a:xfrm>
+            <a:off x="6966163" y="2503733"/>
+            <a:ext cx="240873" cy="0"/>
+          </a:xfrm>
+          <a:prstGeom prst="straightConnector1">
+            <a:avLst/>
+          </a:prstGeom>
+          <a:ln w="12700">
+            <a:tailEnd type="triangle"/>
+          </a:ln>
+        </p:spPr>
+        <p:style>
+          <a:lnRef idx="1">
+            <a:schemeClr val="accent4"/>
+          </a:lnRef>
+          <a:fillRef idx="0">
+            <a:schemeClr val="accent4"/>
+          </a:fillRef>
+          <a:effectRef idx="0">
+            <a:schemeClr val="accent4"/>
+          </a:effectRef>
+          <a:fontRef idx="minor">
+            <a:schemeClr val="tx1"/>
+          </a:fontRef>
+        </p:style>
+      </p:cxnSp>
+      <p:cxnSp>
+        <p:nvCxnSpPr>
+          <p:cNvPr id="254" name="Straight Arrow Connector 253">
+            <a:extLst>
+              <a:ext uri="{FF2B5EF4-FFF2-40B4-BE49-F238E27FC236}">
+                <a16:creationId xmlns:a16="http://schemas.microsoft.com/office/drawing/2014/main" id="{ED46DE84-06EE-40C4-9BE2-B85FAD2348E6}"/>
+              </a:ext>
+            </a:extLst>
+          </p:cNvPr>
+          <p:cNvCxnSpPr>
+            <a:cxnSpLocks/>
+          </p:cNvCxnSpPr>
+          <p:nvPr/>
+        </p:nvCxnSpPr>
+        <p:spPr>
+          <a:xfrm>
+            <a:off x="6980208" y="2876519"/>
+            <a:ext cx="240873" cy="0"/>
+          </a:xfrm>
+          <a:prstGeom prst="straightConnector1">
+            <a:avLst/>
+          </a:prstGeom>
+          <a:ln w="12700">
+            <a:tailEnd type="triangle"/>
+          </a:ln>
+        </p:spPr>
+        <p:style>
+          <a:lnRef idx="1">
+            <a:schemeClr val="accent4"/>
+          </a:lnRef>
+          <a:fillRef idx="0">
+            <a:schemeClr val="accent4"/>
+          </a:fillRef>
+          <a:effectRef idx="0">
+            <a:schemeClr val="accent4"/>
+          </a:effectRef>
+          <a:fontRef idx="minor">
+            <a:schemeClr val="tx1"/>
+          </a:fontRef>
+        </p:style>
+      </p:cxnSp>
+      <p:cxnSp>
+        <p:nvCxnSpPr>
+          <p:cNvPr id="255" name="Straight Arrow Connector 254">
+            <a:extLst>
+              <a:ext uri="{FF2B5EF4-FFF2-40B4-BE49-F238E27FC236}">
+                <a16:creationId xmlns:a16="http://schemas.microsoft.com/office/drawing/2014/main" id="{9B4671EC-A00C-438C-B9AB-DDD417A7257E}"/>
+              </a:ext>
+            </a:extLst>
+          </p:cNvPr>
+          <p:cNvCxnSpPr>
+            <a:cxnSpLocks/>
+            <a:endCxn id="138" idx="1"/>
+          </p:cNvCxnSpPr>
+          <p:nvPr/>
+        </p:nvCxnSpPr>
+        <p:spPr>
+          <a:xfrm>
+            <a:off x="3576171" y="5138901"/>
+            <a:ext cx="2274614" cy="0"/>
+          </a:xfrm>
+          <a:prstGeom prst="straightConnector1">
+            <a:avLst/>
+          </a:prstGeom>
+          <a:ln w="12700">
+            <a:tailEnd type="triangle"/>
+          </a:ln>
+        </p:spPr>
+        <p:style>
+          <a:lnRef idx="1">
+            <a:schemeClr val="accent4"/>
+          </a:lnRef>
+          <a:fillRef idx="0">
+            <a:schemeClr val="accent4"/>
+          </a:fillRef>
+          <a:effectRef idx="0">
+            <a:schemeClr val="accent4"/>
+          </a:effectRef>
+          <a:fontRef idx="minor">
+            <a:schemeClr val="tx1"/>
+          </a:fontRef>
+        </p:style>
+      </p:cxnSp>
+      <p:cxnSp>
+        <p:nvCxnSpPr>
+          <p:cNvPr id="258" name="Straight Arrow Connector 257">
+            <a:extLst>
+              <a:ext uri="{FF2B5EF4-FFF2-40B4-BE49-F238E27FC236}">
+                <a16:creationId xmlns:a16="http://schemas.microsoft.com/office/drawing/2014/main" id="{9F4E7158-1FC1-40DA-8E27-7045929F7488}"/>
+              </a:ext>
+            </a:extLst>
+          </p:cNvPr>
+          <p:cNvCxnSpPr>
+            <a:cxnSpLocks/>
+            <a:endCxn id="87" idx="1"/>
+          </p:cNvCxnSpPr>
+          <p:nvPr/>
+        </p:nvCxnSpPr>
+        <p:spPr>
+          <a:xfrm>
+            <a:off x="3535014" y="2817830"/>
+            <a:ext cx="2187318" cy="0"/>
+          </a:xfrm>
+          <a:prstGeom prst="straightConnector1">
+            <a:avLst/>
+          </a:prstGeom>
+          <a:ln w="12700">
+            <a:tailEnd type="triangle"/>
+          </a:ln>
+        </p:spPr>
+        <p:style>
+          <a:lnRef idx="1">
+            <a:schemeClr val="accent4"/>
+          </a:lnRef>
+          <a:fillRef idx="0">
+            <a:schemeClr val="accent4"/>
+          </a:fillRef>
+          <a:effectRef idx="0">
+            <a:schemeClr val="accent4"/>
+          </a:effectRef>
+          <a:fontRef idx="minor">
+            <a:schemeClr val="tx1"/>
+          </a:fontRef>
+        </p:style>
+      </p:cxnSp>
+      <p:cxnSp>
+        <p:nvCxnSpPr>
+          <p:cNvPr id="260" name="Straight Arrow Connector 259">
+            <a:extLst>
+              <a:ext uri="{FF2B5EF4-FFF2-40B4-BE49-F238E27FC236}">
+                <a16:creationId xmlns:a16="http://schemas.microsoft.com/office/drawing/2014/main" id="{9E0D50A9-11A1-4F43-B6EE-4524F5420C95}"/>
+              </a:ext>
+            </a:extLst>
+          </p:cNvPr>
+          <p:cNvCxnSpPr>
+            <a:cxnSpLocks/>
+            <a:endCxn id="110" idx="1"/>
+          </p:cNvCxnSpPr>
+          <p:nvPr/>
+        </p:nvCxnSpPr>
+        <p:spPr>
+          <a:xfrm>
+            <a:off x="3576171" y="3447191"/>
+            <a:ext cx="157622" cy="7056"/>
+          </a:xfrm>
+          <a:prstGeom prst="straightConnector1">
+            <a:avLst/>
+          </a:prstGeom>
+          <a:ln w="12700">
+            <a:tailEnd type="triangle"/>
+          </a:ln>
+        </p:spPr>
+        <p:style>
+          <a:lnRef idx="1">
+            <a:schemeClr val="accent4"/>
+          </a:lnRef>
+          <a:fillRef idx="0">
+            <a:schemeClr val="accent4"/>
+          </a:fillRef>
+          <a:effectRef idx="0">
+            <a:schemeClr val="accent4"/>
+          </a:effectRef>
+          <a:fontRef idx="minor">
+            <a:schemeClr val="tx1"/>
+          </a:fontRef>
+        </p:style>
+      </p:cxnSp>
+      <p:cxnSp>
+        <p:nvCxnSpPr>
+          <p:cNvPr id="263" name="Straight Arrow Connector 262">
+            <a:extLst>
+              <a:ext uri="{FF2B5EF4-FFF2-40B4-BE49-F238E27FC236}">
+                <a16:creationId xmlns:a16="http://schemas.microsoft.com/office/drawing/2014/main" id="{0461204D-5C90-4FBB-94EB-D875B0679890}"/>
+              </a:ext>
+            </a:extLst>
+          </p:cNvPr>
+          <p:cNvCxnSpPr>
+            <a:cxnSpLocks/>
+            <a:endCxn id="62" idx="1"/>
+          </p:cNvCxnSpPr>
+          <p:nvPr/>
+        </p:nvCxnSpPr>
+        <p:spPr>
+          <a:xfrm>
+            <a:off x="3588993" y="1671032"/>
+            <a:ext cx="157622" cy="0"/>
+          </a:xfrm>
+          <a:prstGeom prst="straightConnector1">
+            <a:avLst/>
+          </a:prstGeom>
+          <a:ln w="12700">
+            <a:tailEnd type="triangle"/>
+          </a:ln>
+        </p:spPr>
+        <p:style>
+          <a:lnRef idx="1">
+            <a:schemeClr val="accent4"/>
+          </a:lnRef>
+          <a:fillRef idx="0">
+            <a:schemeClr val="accent4"/>
+          </a:fillRef>
+          <a:effectRef idx="0">
+            <a:schemeClr val="accent4"/>
+          </a:effectRef>
+          <a:fontRef idx="minor">
+            <a:schemeClr val="tx1"/>
+          </a:fontRef>
+        </p:style>
+      </p:cxnSp>
+      <p:sp>
+        <p:nvSpPr>
+          <p:cNvPr id="92" name="Rectangle 8">
+            <a:extLst>
+              <a:ext uri="{FF2B5EF4-FFF2-40B4-BE49-F238E27FC236}">
+                <a16:creationId xmlns:a16="http://schemas.microsoft.com/office/drawing/2014/main" id="{A2F011B3-49B1-4144-8F99-D867D42A802A}"/>
+              </a:ext>
+            </a:extLst>
+          </p:cNvPr>
+          <p:cNvSpPr/>
+          <p:nvPr/>
+        </p:nvSpPr>
+        <p:spPr>
+          <a:xfrm>
+            <a:off x="7217136" y="3152473"/>
+            <a:ext cx="1194209" cy="285783"/>
+          </a:xfrm>
+          <a:prstGeom prst="rect">
+            <a:avLst/>
+          </a:prstGeom>
+          <a:ln w="19050">
+            <a:solidFill>
+              <a:srgbClr val="7030A0"/>
+            </a:solidFill>
+          </a:ln>
+          <a:effectLst/>
+        </p:spPr>
+        <p:style>
+          <a:lnRef idx="1">
+            <a:schemeClr val="accent4"/>
+          </a:lnRef>
+          <a:fillRef idx="2">
+            <a:schemeClr val="accent4"/>
+          </a:fillRef>
+          <a:effectRef idx="1">
+            <a:schemeClr val="accent4"/>
+          </a:effectRef>
+          <a:fontRef idx="minor">
+            <a:schemeClr val="dk1"/>
+          </a:fontRef>
+        </p:style>
+        <p:txBody>
+          <a:bodyPr rtlCol="0" anchor="ctr"/>
+          <a:lstStyle/>
+          <a:p>
+            <a:pPr algn="ctr"/>
+            <a:r>
+              <a:rPr lang="en-US" sz="1050" dirty="0">
+                <a:solidFill>
+                  <a:srgbClr val="7030A0"/>
+                </a:solidFill>
+              </a:rPr>
+              <a:t>Date</a:t>
+            </a:r>
+            <a:endParaRPr lang="en-SG" sz="1050" dirty="0">
+              <a:solidFill>
+                <a:srgbClr val="7030A0"/>
+              </a:solidFill>
+            </a:endParaRPr>
+          </a:p>
+        </p:txBody>
+      </p:sp>
+      <p:cxnSp>
+        <p:nvCxnSpPr>
+          <p:cNvPr id="94" name="Straight Arrow Connector 93">
+            <a:extLst>
+              <a:ext uri="{FF2B5EF4-FFF2-40B4-BE49-F238E27FC236}">
+                <a16:creationId xmlns:a16="http://schemas.microsoft.com/office/drawing/2014/main" id="{D8BF1C49-1167-4131-9228-0D0BDAF3C7CA}"/>
+              </a:ext>
+            </a:extLst>
+          </p:cNvPr>
+          <p:cNvCxnSpPr>
+            <a:cxnSpLocks/>
+          </p:cNvCxnSpPr>
+          <p:nvPr/>
+        </p:nvCxnSpPr>
+        <p:spPr>
+          <a:xfrm>
+            <a:off x="6980208" y="3287825"/>
+            <a:ext cx="240873" cy="0"/>
+          </a:xfrm>
+          <a:prstGeom prst="straightConnector1">
+            <a:avLst/>
+          </a:prstGeom>
+          <a:ln w="12700">
+            <a:tailEnd type="triangle"/>
+          </a:ln>
+        </p:spPr>
+        <p:style>
+          <a:lnRef idx="1">
+            <a:schemeClr val="accent4"/>
+          </a:lnRef>
+          <a:fillRef idx="0">
+            <a:schemeClr val="accent4"/>
+          </a:fillRef>
+          <a:effectRef idx="0">
+            <a:schemeClr val="accent4"/>
+          </a:effectRef>
+          <a:fontRef idx="minor">
+            <a:schemeClr val="tx1"/>
+          </a:fontRef>
+        </p:style>
+      </p:cxnSp>
+    </p:spTree>
+    <p:extLst>
+      <p:ext uri="{BB962C8B-B14F-4D97-AF65-F5344CB8AC3E}">
+        <p14:creationId xmlns:p14="http://schemas.microsoft.com/office/powerpoint/2010/main" val="294472136"/>
+      </p:ext>
+    </p:extLst>
+  </p:cSld>
+  <p:clrMapOvr>
+    <a:masterClrMapping/>
+  </p:clrMapOvr>
+</p:sld>
+</file>
+
+<file path=ppt/slides/slide7.xml><?xml version="1.0" encoding="utf-8"?>
 <p:sld xmlns:a="http://schemas.openxmlformats.org/drawingml/2006/main" xmlns:r="http://schemas.openxmlformats.org/officeDocument/2006/relationships" xmlns:p="http://schemas.openxmlformats.org/presentationml/2006/main">
   <p:cSld>
     <p:spTree>
@@ -11594,7 +16164,7 @@
 </p:sld>
 </file>
 
-<file path=ppt/slides/slide7.xml><?xml version="1.0" encoding="utf-8"?>
+<file path=ppt/slides/slide8.xml><?xml version="1.0" encoding="utf-8"?>
 <p:sld xmlns:a="http://schemas.openxmlformats.org/drawingml/2006/main" xmlns:r="http://schemas.openxmlformats.org/officeDocument/2006/relationships" xmlns:p="http://schemas.openxmlformats.org/presentationml/2006/main">
   <p:cSld>
     <p:spTree>

</xml_diff>

<commit_message>
Allocated slides to prevent conflicts
</commit_message>
<xml_diff>
--- a/docs/Diagrams.pptx
+++ b/docs/Diagrams.pptx
@@ -5,13 +5,33 @@
     <p:sldMasterId id="2147483648" r:id="rId1"/>
   </p:sldMasterIdLst>
   <p:notesMasterIdLst>
-    <p:notesMasterId r:id="rId6"/>
+    <p:notesMasterId r:id="rId26"/>
   </p:notesMasterIdLst>
   <p:sldIdLst>
     <p:sldId id="256" r:id="rId2"/>
     <p:sldId id="257" r:id="rId3"/>
     <p:sldId id="259" r:id="rId4"/>
     <p:sldId id="258" r:id="rId5"/>
+    <p:sldId id="260" r:id="rId6"/>
+    <p:sldId id="276" r:id="rId7"/>
+    <p:sldId id="277" r:id="rId8"/>
+    <p:sldId id="278" r:id="rId9"/>
+    <p:sldId id="261" r:id="rId10"/>
+    <p:sldId id="279" r:id="rId11"/>
+    <p:sldId id="280" r:id="rId12"/>
+    <p:sldId id="281" r:id="rId13"/>
+    <p:sldId id="282" r:id="rId14"/>
+    <p:sldId id="262" r:id="rId15"/>
+    <p:sldId id="283" r:id="rId16"/>
+    <p:sldId id="284" r:id="rId17"/>
+    <p:sldId id="285" r:id="rId18"/>
+    <p:sldId id="286" r:id="rId19"/>
+    <p:sldId id="263" r:id="rId20"/>
+    <p:sldId id="290" r:id="rId21"/>
+    <p:sldId id="291" r:id="rId22"/>
+    <p:sldId id="292" r:id="rId23"/>
+    <p:sldId id="293" r:id="rId24"/>
+    <p:sldId id="294" r:id="rId25"/>
   </p:sldIdLst>
   <p:sldSz cx="9144000" cy="6858000" type="screen4x3"/>
   <p:notesSz cx="6858000" cy="9144000"/>
@@ -211,7 +231,7 @@
           <a:p>
             <a:fld id="{F5CC4B3F-88C1-4FFA-B1B6-F41C21DC6924}" type="datetimeFigureOut">
               <a:rPr lang="en-US" smtClean="0"/>
-              <a:t>8/12/2018</a:t>
+              <a:t>11/10/18</a:t>
             </a:fld>
             <a:endParaRPr lang="en-US"/>
           </a:p>
@@ -741,7 +761,7 @@
           <a:p>
             <a:fld id="{78C97017-6FC3-485B-9764-EAC9E56C1D49}" type="datetimeFigureOut">
               <a:rPr lang="en-US" smtClean="0"/>
-              <a:t>8/12/2018</a:t>
+              <a:t>11/10/18</a:t>
             </a:fld>
             <a:endParaRPr lang="en-US"/>
           </a:p>
@@ -909,7 +929,7 @@
           <a:p>
             <a:fld id="{78C97017-6FC3-485B-9764-EAC9E56C1D49}" type="datetimeFigureOut">
               <a:rPr lang="en-US" smtClean="0"/>
-              <a:t>8/12/2018</a:t>
+              <a:t>11/10/18</a:t>
             </a:fld>
             <a:endParaRPr lang="en-US"/>
           </a:p>
@@ -1087,7 +1107,7 @@
           <a:p>
             <a:fld id="{78C97017-6FC3-485B-9764-EAC9E56C1D49}" type="datetimeFigureOut">
               <a:rPr lang="en-US" smtClean="0"/>
-              <a:t>8/12/2018</a:t>
+              <a:t>11/10/18</a:t>
             </a:fld>
             <a:endParaRPr lang="en-US"/>
           </a:p>
@@ -1255,7 +1275,7 @@
           <a:p>
             <a:fld id="{78C97017-6FC3-485B-9764-EAC9E56C1D49}" type="datetimeFigureOut">
               <a:rPr lang="en-US" smtClean="0"/>
-              <a:t>8/12/2018</a:t>
+              <a:t>11/10/18</a:t>
             </a:fld>
             <a:endParaRPr lang="en-US"/>
           </a:p>
@@ -1500,7 +1520,7 @@
           <a:p>
             <a:fld id="{78C97017-6FC3-485B-9764-EAC9E56C1D49}" type="datetimeFigureOut">
               <a:rPr lang="en-US" smtClean="0"/>
-              <a:t>8/12/2018</a:t>
+              <a:t>11/10/18</a:t>
             </a:fld>
             <a:endParaRPr lang="en-US"/>
           </a:p>
@@ -1785,7 +1805,7 @@
           <a:p>
             <a:fld id="{78C97017-6FC3-485B-9764-EAC9E56C1D49}" type="datetimeFigureOut">
               <a:rPr lang="en-US" smtClean="0"/>
-              <a:t>8/12/2018</a:t>
+              <a:t>11/10/18</a:t>
             </a:fld>
             <a:endParaRPr lang="en-US"/>
           </a:p>
@@ -2204,7 +2224,7 @@
           <a:p>
             <a:fld id="{78C97017-6FC3-485B-9764-EAC9E56C1D49}" type="datetimeFigureOut">
               <a:rPr lang="en-US" smtClean="0"/>
-              <a:t>8/12/2018</a:t>
+              <a:t>11/10/18</a:t>
             </a:fld>
             <a:endParaRPr lang="en-US"/>
           </a:p>
@@ -2321,7 +2341,7 @@
           <a:p>
             <a:fld id="{78C97017-6FC3-485B-9764-EAC9E56C1D49}" type="datetimeFigureOut">
               <a:rPr lang="en-US" smtClean="0"/>
-              <a:t>8/12/2018</a:t>
+              <a:t>11/10/18</a:t>
             </a:fld>
             <a:endParaRPr lang="en-US"/>
           </a:p>
@@ -2416,7 +2436,7 @@
           <a:p>
             <a:fld id="{78C97017-6FC3-485B-9764-EAC9E56C1D49}" type="datetimeFigureOut">
               <a:rPr lang="en-US" smtClean="0"/>
-              <a:t>8/12/2018</a:t>
+              <a:t>11/10/18</a:t>
             </a:fld>
             <a:endParaRPr lang="en-US"/>
           </a:p>
@@ -2691,7 +2711,7 @@
           <a:p>
             <a:fld id="{78C97017-6FC3-485B-9764-EAC9E56C1D49}" type="datetimeFigureOut">
               <a:rPr lang="en-US" smtClean="0"/>
-              <a:t>8/12/2018</a:t>
+              <a:t>11/10/18</a:t>
             </a:fld>
             <a:endParaRPr lang="en-US"/>
           </a:p>
@@ -2943,7 +2963,7 @@
           <a:p>
             <a:fld id="{78C97017-6FC3-485B-9764-EAC9E56C1D49}" type="datetimeFigureOut">
               <a:rPr lang="en-US" smtClean="0"/>
-              <a:t>8/12/2018</a:t>
+              <a:t>11/10/18</a:t>
             </a:fld>
             <a:endParaRPr lang="en-US"/>
           </a:p>
@@ -3154,7 +3174,7 @@
           <a:p>
             <a:fld id="{78C97017-6FC3-485B-9764-EAC9E56C1D49}" type="datetimeFigureOut">
               <a:rPr lang="en-US" smtClean="0"/>
-              <a:t>8/12/2018</a:t>
+              <a:t>11/10/18</a:t>
             </a:fld>
             <a:endParaRPr lang="en-US"/>
           </a:p>
@@ -3595,6 +3615,660 @@
 </p:sld>
 </file>
 
+<file path=ppt/slides/slide10.xml><?xml version="1.0" encoding="utf-8"?>
+<p:sld xmlns:a="http://schemas.openxmlformats.org/drawingml/2006/main" xmlns:r="http://schemas.openxmlformats.org/officeDocument/2006/relationships" xmlns:p="http://schemas.openxmlformats.org/presentationml/2006/main">
+  <p:cSld>
+    <p:spTree>
+      <p:nvGrpSpPr>
+        <p:cNvPr id="1" name=""/>
+        <p:cNvGrpSpPr/>
+        <p:nvPr/>
+      </p:nvGrpSpPr>
+      <p:grpSpPr>
+        <a:xfrm>
+          <a:off x="0" y="0"/>
+          <a:ext cx="0" cy="0"/>
+          <a:chOff x="0" y="0"/>
+          <a:chExt cx="0" cy="0"/>
+        </a:xfrm>
+      </p:grpSpPr>
+      <p:sp>
+        <p:nvSpPr>
+          <p:cNvPr id="2" name="TextBox 1">
+            <a:extLst>
+              <a:ext uri="{FF2B5EF4-FFF2-40B4-BE49-F238E27FC236}">
+                <a16:creationId xmlns:a16="http://schemas.microsoft.com/office/drawing/2014/main" id="{F298CF04-C313-E24A-A52B-837593E940AF}"/>
+              </a:ext>
+            </a:extLst>
+          </p:cNvPr>
+          <p:cNvSpPr txBox="1"/>
+          <p:nvPr/>
+        </p:nvSpPr>
+        <p:spPr>
+          <a:xfrm>
+            <a:off x="5693664" y="2682240"/>
+            <a:ext cx="514885" cy="369332"/>
+          </a:xfrm>
+          <a:prstGeom prst="rect">
+            <a:avLst/>
+          </a:prstGeom>
+          <a:noFill/>
+        </p:spPr>
+        <p:txBody>
+          <a:bodyPr wrap="none" rtlCol="0">
+            <a:spAutoFit/>
+          </a:bodyPr>
+          <a:lstStyle/>
+          <a:p>
+            <a:r>
+              <a:rPr lang="en-US" dirty="0" err="1"/>
+              <a:t>Xiyi</a:t>
+            </a:r>
+            <a:endParaRPr lang="en-US" dirty="0"/>
+          </a:p>
+        </p:txBody>
+      </p:sp>
+    </p:spTree>
+    <p:extLst>
+      <p:ext uri="{BB962C8B-B14F-4D97-AF65-F5344CB8AC3E}">
+        <p14:creationId xmlns:p14="http://schemas.microsoft.com/office/powerpoint/2010/main" val="1208679585"/>
+      </p:ext>
+    </p:extLst>
+  </p:cSld>
+  <p:clrMapOvr>
+    <a:masterClrMapping/>
+  </p:clrMapOvr>
+</p:sld>
+</file>
+
+<file path=ppt/slides/slide11.xml><?xml version="1.0" encoding="utf-8"?>
+<p:sld xmlns:a="http://schemas.openxmlformats.org/drawingml/2006/main" xmlns:r="http://schemas.openxmlformats.org/officeDocument/2006/relationships" xmlns:p="http://schemas.openxmlformats.org/presentationml/2006/main">
+  <p:cSld>
+    <p:spTree>
+      <p:nvGrpSpPr>
+        <p:cNvPr id="1" name=""/>
+        <p:cNvGrpSpPr/>
+        <p:nvPr/>
+      </p:nvGrpSpPr>
+      <p:grpSpPr>
+        <a:xfrm>
+          <a:off x="0" y="0"/>
+          <a:ext cx="0" cy="0"/>
+          <a:chOff x="0" y="0"/>
+          <a:chExt cx="0" cy="0"/>
+        </a:xfrm>
+      </p:grpSpPr>
+      <p:sp>
+        <p:nvSpPr>
+          <p:cNvPr id="2" name="TextBox 1">
+            <a:extLst>
+              <a:ext uri="{FF2B5EF4-FFF2-40B4-BE49-F238E27FC236}">
+                <a16:creationId xmlns:a16="http://schemas.microsoft.com/office/drawing/2014/main" id="{F298CF04-C313-E24A-A52B-837593E940AF}"/>
+              </a:ext>
+            </a:extLst>
+          </p:cNvPr>
+          <p:cNvSpPr txBox="1"/>
+          <p:nvPr/>
+        </p:nvSpPr>
+        <p:spPr>
+          <a:xfrm>
+            <a:off x="5693664" y="2682240"/>
+            <a:ext cx="514885" cy="369332"/>
+          </a:xfrm>
+          <a:prstGeom prst="rect">
+            <a:avLst/>
+          </a:prstGeom>
+          <a:noFill/>
+        </p:spPr>
+        <p:txBody>
+          <a:bodyPr wrap="none" rtlCol="0">
+            <a:spAutoFit/>
+          </a:bodyPr>
+          <a:lstStyle/>
+          <a:p>
+            <a:r>
+              <a:rPr lang="en-US" dirty="0" err="1"/>
+              <a:t>Xiyi</a:t>
+            </a:r>
+            <a:endParaRPr lang="en-US" dirty="0"/>
+          </a:p>
+        </p:txBody>
+      </p:sp>
+    </p:spTree>
+    <p:extLst>
+      <p:ext uri="{BB962C8B-B14F-4D97-AF65-F5344CB8AC3E}">
+        <p14:creationId xmlns:p14="http://schemas.microsoft.com/office/powerpoint/2010/main" val="1024521291"/>
+      </p:ext>
+    </p:extLst>
+  </p:cSld>
+  <p:clrMapOvr>
+    <a:masterClrMapping/>
+  </p:clrMapOvr>
+</p:sld>
+</file>
+
+<file path=ppt/slides/slide12.xml><?xml version="1.0" encoding="utf-8"?>
+<p:sld xmlns:a="http://schemas.openxmlformats.org/drawingml/2006/main" xmlns:r="http://schemas.openxmlformats.org/officeDocument/2006/relationships" xmlns:p="http://schemas.openxmlformats.org/presentationml/2006/main">
+  <p:cSld>
+    <p:spTree>
+      <p:nvGrpSpPr>
+        <p:cNvPr id="1" name=""/>
+        <p:cNvGrpSpPr/>
+        <p:nvPr/>
+      </p:nvGrpSpPr>
+      <p:grpSpPr>
+        <a:xfrm>
+          <a:off x="0" y="0"/>
+          <a:ext cx="0" cy="0"/>
+          <a:chOff x="0" y="0"/>
+          <a:chExt cx="0" cy="0"/>
+        </a:xfrm>
+      </p:grpSpPr>
+      <p:sp>
+        <p:nvSpPr>
+          <p:cNvPr id="2" name="TextBox 1">
+            <a:extLst>
+              <a:ext uri="{FF2B5EF4-FFF2-40B4-BE49-F238E27FC236}">
+                <a16:creationId xmlns:a16="http://schemas.microsoft.com/office/drawing/2014/main" id="{F298CF04-C313-E24A-A52B-837593E940AF}"/>
+              </a:ext>
+            </a:extLst>
+          </p:cNvPr>
+          <p:cNvSpPr txBox="1"/>
+          <p:nvPr/>
+        </p:nvSpPr>
+        <p:spPr>
+          <a:xfrm>
+            <a:off x="5693664" y="2682240"/>
+            <a:ext cx="514885" cy="369332"/>
+          </a:xfrm>
+          <a:prstGeom prst="rect">
+            <a:avLst/>
+          </a:prstGeom>
+          <a:noFill/>
+        </p:spPr>
+        <p:txBody>
+          <a:bodyPr wrap="none" rtlCol="0">
+            <a:spAutoFit/>
+          </a:bodyPr>
+          <a:lstStyle/>
+          <a:p>
+            <a:r>
+              <a:rPr lang="en-US" dirty="0" err="1"/>
+              <a:t>Xiyi</a:t>
+            </a:r>
+            <a:endParaRPr lang="en-US" dirty="0"/>
+          </a:p>
+        </p:txBody>
+      </p:sp>
+    </p:spTree>
+    <p:extLst>
+      <p:ext uri="{BB962C8B-B14F-4D97-AF65-F5344CB8AC3E}">
+        <p14:creationId xmlns:p14="http://schemas.microsoft.com/office/powerpoint/2010/main" val="1277986228"/>
+      </p:ext>
+    </p:extLst>
+  </p:cSld>
+  <p:clrMapOvr>
+    <a:masterClrMapping/>
+  </p:clrMapOvr>
+</p:sld>
+</file>
+
+<file path=ppt/slides/slide13.xml><?xml version="1.0" encoding="utf-8"?>
+<p:sld xmlns:a="http://schemas.openxmlformats.org/drawingml/2006/main" xmlns:r="http://schemas.openxmlformats.org/officeDocument/2006/relationships" xmlns:p="http://schemas.openxmlformats.org/presentationml/2006/main">
+  <p:cSld>
+    <p:spTree>
+      <p:nvGrpSpPr>
+        <p:cNvPr id="1" name=""/>
+        <p:cNvGrpSpPr/>
+        <p:nvPr/>
+      </p:nvGrpSpPr>
+      <p:grpSpPr>
+        <a:xfrm>
+          <a:off x="0" y="0"/>
+          <a:ext cx="0" cy="0"/>
+          <a:chOff x="0" y="0"/>
+          <a:chExt cx="0" cy="0"/>
+        </a:xfrm>
+      </p:grpSpPr>
+      <p:sp>
+        <p:nvSpPr>
+          <p:cNvPr id="2" name="TextBox 1">
+            <a:extLst>
+              <a:ext uri="{FF2B5EF4-FFF2-40B4-BE49-F238E27FC236}">
+                <a16:creationId xmlns:a16="http://schemas.microsoft.com/office/drawing/2014/main" id="{F298CF04-C313-E24A-A52B-837593E940AF}"/>
+              </a:ext>
+            </a:extLst>
+          </p:cNvPr>
+          <p:cNvSpPr txBox="1"/>
+          <p:nvPr/>
+        </p:nvSpPr>
+        <p:spPr>
+          <a:xfrm>
+            <a:off x="5693664" y="2682240"/>
+            <a:ext cx="514885" cy="369332"/>
+          </a:xfrm>
+          <a:prstGeom prst="rect">
+            <a:avLst/>
+          </a:prstGeom>
+          <a:noFill/>
+        </p:spPr>
+        <p:txBody>
+          <a:bodyPr wrap="none" rtlCol="0">
+            <a:spAutoFit/>
+          </a:bodyPr>
+          <a:lstStyle/>
+          <a:p>
+            <a:r>
+              <a:rPr lang="en-US" dirty="0" err="1"/>
+              <a:t>Xiyi</a:t>
+            </a:r>
+            <a:endParaRPr lang="en-US" dirty="0"/>
+          </a:p>
+        </p:txBody>
+      </p:sp>
+    </p:spTree>
+    <p:extLst>
+      <p:ext uri="{BB962C8B-B14F-4D97-AF65-F5344CB8AC3E}">
+        <p14:creationId xmlns:p14="http://schemas.microsoft.com/office/powerpoint/2010/main" val="4061719779"/>
+      </p:ext>
+    </p:extLst>
+  </p:cSld>
+  <p:clrMapOvr>
+    <a:masterClrMapping/>
+  </p:clrMapOvr>
+</p:sld>
+</file>
+
+<file path=ppt/slides/slide14.xml><?xml version="1.0" encoding="utf-8"?>
+<p:sld xmlns:a="http://schemas.openxmlformats.org/drawingml/2006/main" xmlns:r="http://schemas.openxmlformats.org/officeDocument/2006/relationships" xmlns:p="http://schemas.openxmlformats.org/presentationml/2006/main">
+  <p:cSld>
+    <p:spTree>
+      <p:nvGrpSpPr>
+        <p:cNvPr id="1" name=""/>
+        <p:cNvGrpSpPr/>
+        <p:nvPr/>
+      </p:nvGrpSpPr>
+      <p:grpSpPr>
+        <a:xfrm>
+          <a:off x="0" y="0"/>
+          <a:ext cx="0" cy="0"/>
+          <a:chOff x="0" y="0"/>
+          <a:chExt cx="0" cy="0"/>
+        </a:xfrm>
+      </p:grpSpPr>
+      <p:sp>
+        <p:nvSpPr>
+          <p:cNvPr id="2" name="TextBox 1">
+            <a:extLst>
+              <a:ext uri="{FF2B5EF4-FFF2-40B4-BE49-F238E27FC236}">
+                <a16:creationId xmlns:a16="http://schemas.microsoft.com/office/drawing/2014/main" id="{4E211E7D-D05C-2949-8500-D32AA9DBA052}"/>
+              </a:ext>
+            </a:extLst>
+          </p:cNvPr>
+          <p:cNvSpPr txBox="1"/>
+          <p:nvPr/>
+        </p:nvSpPr>
+        <p:spPr>
+          <a:xfrm>
+            <a:off x="5949696" y="4120896"/>
+            <a:ext cx="667812" cy="369332"/>
+          </a:xfrm>
+          <a:prstGeom prst="rect">
+            <a:avLst/>
+          </a:prstGeom>
+          <a:noFill/>
+        </p:spPr>
+        <p:txBody>
+          <a:bodyPr wrap="none" rtlCol="0">
+            <a:spAutoFit/>
+          </a:bodyPr>
+          <a:lstStyle/>
+          <a:p>
+            <a:r>
+              <a:rPr lang="en-US" dirty="0"/>
+              <a:t>Keith</a:t>
+            </a:r>
+          </a:p>
+        </p:txBody>
+      </p:sp>
+    </p:spTree>
+    <p:extLst>
+      <p:ext uri="{BB962C8B-B14F-4D97-AF65-F5344CB8AC3E}">
+        <p14:creationId xmlns:p14="http://schemas.microsoft.com/office/powerpoint/2010/main" val="4184612790"/>
+      </p:ext>
+    </p:extLst>
+  </p:cSld>
+  <p:clrMapOvr>
+    <a:masterClrMapping/>
+  </p:clrMapOvr>
+</p:sld>
+</file>
+
+<file path=ppt/slides/slide15.xml><?xml version="1.0" encoding="utf-8"?>
+<p:sld xmlns:a="http://schemas.openxmlformats.org/drawingml/2006/main" xmlns:r="http://schemas.openxmlformats.org/officeDocument/2006/relationships" xmlns:p="http://schemas.openxmlformats.org/presentationml/2006/main">
+  <p:cSld>
+    <p:spTree>
+      <p:nvGrpSpPr>
+        <p:cNvPr id="1" name=""/>
+        <p:cNvGrpSpPr/>
+        <p:nvPr/>
+      </p:nvGrpSpPr>
+      <p:grpSpPr>
+        <a:xfrm>
+          <a:off x="0" y="0"/>
+          <a:ext cx="0" cy="0"/>
+          <a:chOff x="0" y="0"/>
+          <a:chExt cx="0" cy="0"/>
+        </a:xfrm>
+      </p:grpSpPr>
+      <p:sp>
+        <p:nvSpPr>
+          <p:cNvPr id="2" name="TextBox 1">
+            <a:extLst>
+              <a:ext uri="{FF2B5EF4-FFF2-40B4-BE49-F238E27FC236}">
+                <a16:creationId xmlns:a16="http://schemas.microsoft.com/office/drawing/2014/main" id="{4E211E7D-D05C-2949-8500-D32AA9DBA052}"/>
+              </a:ext>
+            </a:extLst>
+          </p:cNvPr>
+          <p:cNvSpPr txBox="1"/>
+          <p:nvPr/>
+        </p:nvSpPr>
+        <p:spPr>
+          <a:xfrm>
+            <a:off x="5949696" y="4120896"/>
+            <a:ext cx="667812" cy="369332"/>
+          </a:xfrm>
+          <a:prstGeom prst="rect">
+            <a:avLst/>
+          </a:prstGeom>
+          <a:noFill/>
+        </p:spPr>
+        <p:txBody>
+          <a:bodyPr wrap="none" rtlCol="0">
+            <a:spAutoFit/>
+          </a:bodyPr>
+          <a:lstStyle/>
+          <a:p>
+            <a:r>
+              <a:rPr lang="en-US" dirty="0"/>
+              <a:t>Keith</a:t>
+            </a:r>
+          </a:p>
+        </p:txBody>
+      </p:sp>
+    </p:spTree>
+    <p:extLst>
+      <p:ext uri="{BB962C8B-B14F-4D97-AF65-F5344CB8AC3E}">
+        <p14:creationId xmlns:p14="http://schemas.microsoft.com/office/powerpoint/2010/main" val="732047599"/>
+      </p:ext>
+    </p:extLst>
+  </p:cSld>
+  <p:clrMapOvr>
+    <a:masterClrMapping/>
+  </p:clrMapOvr>
+</p:sld>
+</file>
+
+<file path=ppt/slides/slide16.xml><?xml version="1.0" encoding="utf-8"?>
+<p:sld xmlns:a="http://schemas.openxmlformats.org/drawingml/2006/main" xmlns:r="http://schemas.openxmlformats.org/officeDocument/2006/relationships" xmlns:p="http://schemas.openxmlformats.org/presentationml/2006/main">
+  <p:cSld>
+    <p:spTree>
+      <p:nvGrpSpPr>
+        <p:cNvPr id="1" name=""/>
+        <p:cNvGrpSpPr/>
+        <p:nvPr/>
+      </p:nvGrpSpPr>
+      <p:grpSpPr>
+        <a:xfrm>
+          <a:off x="0" y="0"/>
+          <a:ext cx="0" cy="0"/>
+          <a:chOff x="0" y="0"/>
+          <a:chExt cx="0" cy="0"/>
+        </a:xfrm>
+      </p:grpSpPr>
+      <p:sp>
+        <p:nvSpPr>
+          <p:cNvPr id="2" name="TextBox 1">
+            <a:extLst>
+              <a:ext uri="{FF2B5EF4-FFF2-40B4-BE49-F238E27FC236}">
+                <a16:creationId xmlns:a16="http://schemas.microsoft.com/office/drawing/2014/main" id="{4E211E7D-D05C-2949-8500-D32AA9DBA052}"/>
+              </a:ext>
+            </a:extLst>
+          </p:cNvPr>
+          <p:cNvSpPr txBox="1"/>
+          <p:nvPr/>
+        </p:nvSpPr>
+        <p:spPr>
+          <a:xfrm>
+            <a:off x="5949696" y="4120896"/>
+            <a:ext cx="667812" cy="369332"/>
+          </a:xfrm>
+          <a:prstGeom prst="rect">
+            <a:avLst/>
+          </a:prstGeom>
+          <a:noFill/>
+        </p:spPr>
+        <p:txBody>
+          <a:bodyPr wrap="none" rtlCol="0">
+            <a:spAutoFit/>
+          </a:bodyPr>
+          <a:lstStyle/>
+          <a:p>
+            <a:r>
+              <a:rPr lang="en-US" dirty="0"/>
+              <a:t>Keith</a:t>
+            </a:r>
+          </a:p>
+        </p:txBody>
+      </p:sp>
+    </p:spTree>
+    <p:extLst>
+      <p:ext uri="{BB962C8B-B14F-4D97-AF65-F5344CB8AC3E}">
+        <p14:creationId xmlns:p14="http://schemas.microsoft.com/office/powerpoint/2010/main" val="2171078834"/>
+      </p:ext>
+    </p:extLst>
+  </p:cSld>
+  <p:clrMapOvr>
+    <a:masterClrMapping/>
+  </p:clrMapOvr>
+</p:sld>
+</file>
+
+<file path=ppt/slides/slide17.xml><?xml version="1.0" encoding="utf-8"?>
+<p:sld xmlns:a="http://schemas.openxmlformats.org/drawingml/2006/main" xmlns:r="http://schemas.openxmlformats.org/officeDocument/2006/relationships" xmlns:p="http://schemas.openxmlformats.org/presentationml/2006/main">
+  <p:cSld>
+    <p:spTree>
+      <p:nvGrpSpPr>
+        <p:cNvPr id="1" name=""/>
+        <p:cNvGrpSpPr/>
+        <p:nvPr/>
+      </p:nvGrpSpPr>
+      <p:grpSpPr>
+        <a:xfrm>
+          <a:off x="0" y="0"/>
+          <a:ext cx="0" cy="0"/>
+          <a:chOff x="0" y="0"/>
+          <a:chExt cx="0" cy="0"/>
+        </a:xfrm>
+      </p:grpSpPr>
+      <p:sp>
+        <p:nvSpPr>
+          <p:cNvPr id="2" name="TextBox 1">
+            <a:extLst>
+              <a:ext uri="{FF2B5EF4-FFF2-40B4-BE49-F238E27FC236}">
+                <a16:creationId xmlns:a16="http://schemas.microsoft.com/office/drawing/2014/main" id="{4E211E7D-D05C-2949-8500-D32AA9DBA052}"/>
+              </a:ext>
+            </a:extLst>
+          </p:cNvPr>
+          <p:cNvSpPr txBox="1"/>
+          <p:nvPr/>
+        </p:nvSpPr>
+        <p:spPr>
+          <a:xfrm>
+            <a:off x="5949696" y="4120896"/>
+            <a:ext cx="667812" cy="369332"/>
+          </a:xfrm>
+          <a:prstGeom prst="rect">
+            <a:avLst/>
+          </a:prstGeom>
+          <a:noFill/>
+        </p:spPr>
+        <p:txBody>
+          <a:bodyPr wrap="none" rtlCol="0">
+            <a:spAutoFit/>
+          </a:bodyPr>
+          <a:lstStyle/>
+          <a:p>
+            <a:r>
+              <a:rPr lang="en-US" dirty="0"/>
+              <a:t>Keith</a:t>
+            </a:r>
+          </a:p>
+        </p:txBody>
+      </p:sp>
+    </p:spTree>
+    <p:extLst>
+      <p:ext uri="{BB962C8B-B14F-4D97-AF65-F5344CB8AC3E}">
+        <p14:creationId xmlns:p14="http://schemas.microsoft.com/office/powerpoint/2010/main" val="138934033"/>
+      </p:ext>
+    </p:extLst>
+  </p:cSld>
+  <p:clrMapOvr>
+    <a:masterClrMapping/>
+  </p:clrMapOvr>
+</p:sld>
+</file>
+
+<file path=ppt/slides/slide18.xml><?xml version="1.0" encoding="utf-8"?>
+<p:sld xmlns:a="http://schemas.openxmlformats.org/drawingml/2006/main" xmlns:r="http://schemas.openxmlformats.org/officeDocument/2006/relationships" xmlns:p="http://schemas.openxmlformats.org/presentationml/2006/main">
+  <p:cSld>
+    <p:spTree>
+      <p:nvGrpSpPr>
+        <p:cNvPr id="1" name=""/>
+        <p:cNvGrpSpPr/>
+        <p:nvPr/>
+      </p:nvGrpSpPr>
+      <p:grpSpPr>
+        <a:xfrm>
+          <a:off x="0" y="0"/>
+          <a:ext cx="0" cy="0"/>
+          <a:chOff x="0" y="0"/>
+          <a:chExt cx="0" cy="0"/>
+        </a:xfrm>
+      </p:grpSpPr>
+      <p:sp>
+        <p:nvSpPr>
+          <p:cNvPr id="2" name="TextBox 1">
+            <a:extLst>
+              <a:ext uri="{FF2B5EF4-FFF2-40B4-BE49-F238E27FC236}">
+                <a16:creationId xmlns:a16="http://schemas.microsoft.com/office/drawing/2014/main" id="{4E211E7D-D05C-2949-8500-D32AA9DBA052}"/>
+              </a:ext>
+            </a:extLst>
+          </p:cNvPr>
+          <p:cNvSpPr txBox="1"/>
+          <p:nvPr/>
+        </p:nvSpPr>
+        <p:spPr>
+          <a:xfrm>
+            <a:off x="5949696" y="4120896"/>
+            <a:ext cx="667812" cy="369332"/>
+          </a:xfrm>
+          <a:prstGeom prst="rect">
+            <a:avLst/>
+          </a:prstGeom>
+          <a:noFill/>
+        </p:spPr>
+        <p:txBody>
+          <a:bodyPr wrap="none" rtlCol="0">
+            <a:spAutoFit/>
+          </a:bodyPr>
+          <a:lstStyle/>
+          <a:p>
+            <a:r>
+              <a:rPr lang="en-US" dirty="0"/>
+              <a:t>Keith</a:t>
+            </a:r>
+          </a:p>
+        </p:txBody>
+      </p:sp>
+    </p:spTree>
+    <p:extLst>
+      <p:ext uri="{BB962C8B-B14F-4D97-AF65-F5344CB8AC3E}">
+        <p14:creationId xmlns:p14="http://schemas.microsoft.com/office/powerpoint/2010/main" val="2530317220"/>
+      </p:ext>
+    </p:extLst>
+  </p:cSld>
+  <p:clrMapOvr>
+    <a:masterClrMapping/>
+  </p:clrMapOvr>
+</p:sld>
+</file>
+
+<file path=ppt/slides/slide19.xml><?xml version="1.0" encoding="utf-8"?>
+<p:sld xmlns:a="http://schemas.openxmlformats.org/drawingml/2006/main" xmlns:r="http://schemas.openxmlformats.org/officeDocument/2006/relationships" xmlns:p="http://schemas.openxmlformats.org/presentationml/2006/main">
+  <p:cSld>
+    <p:spTree>
+      <p:nvGrpSpPr>
+        <p:cNvPr id="1" name=""/>
+        <p:cNvGrpSpPr/>
+        <p:nvPr/>
+      </p:nvGrpSpPr>
+      <p:grpSpPr>
+        <a:xfrm>
+          <a:off x="0" y="0"/>
+          <a:ext cx="0" cy="0"/>
+          <a:chOff x="0" y="0"/>
+          <a:chExt cx="0" cy="0"/>
+        </a:xfrm>
+      </p:grpSpPr>
+      <p:sp>
+        <p:nvSpPr>
+          <p:cNvPr id="2" name="TextBox 1">
+            <a:extLst>
+              <a:ext uri="{FF2B5EF4-FFF2-40B4-BE49-F238E27FC236}">
+                <a16:creationId xmlns:a16="http://schemas.microsoft.com/office/drawing/2014/main" id="{4D05C971-D981-664C-A746-65DFB8DF78C0}"/>
+              </a:ext>
+            </a:extLst>
+          </p:cNvPr>
+          <p:cNvSpPr txBox="1"/>
+          <p:nvPr/>
+        </p:nvSpPr>
+        <p:spPr>
+          <a:xfrm>
+            <a:off x="3608832" y="3840480"/>
+            <a:ext cx="332142" cy="369332"/>
+          </a:xfrm>
+          <a:prstGeom prst="rect">
+            <a:avLst/>
+          </a:prstGeom>
+          <a:noFill/>
+        </p:spPr>
+        <p:txBody>
+          <a:bodyPr wrap="none" rtlCol="0">
+            <a:spAutoFit/>
+          </a:bodyPr>
+          <a:lstStyle/>
+          <a:p>
+            <a:r>
+              <a:rPr lang="en-US" dirty="0"/>
+              <a:t>JJ</a:t>
+            </a:r>
+          </a:p>
+        </p:txBody>
+      </p:sp>
+    </p:spTree>
+    <p:extLst>
+      <p:ext uri="{BB962C8B-B14F-4D97-AF65-F5344CB8AC3E}">
+        <p14:creationId xmlns:p14="http://schemas.microsoft.com/office/powerpoint/2010/main" val="2442966721"/>
+      </p:ext>
+    </p:extLst>
+  </p:cSld>
+  <p:clrMapOvr>
+    <a:masterClrMapping/>
+  </p:clrMapOvr>
+</p:sld>
+</file>
+
 <file path=ppt/slides/slide2.xml><?xml version="1.0" encoding="utf-8"?>
 <p:sld xmlns:a="http://schemas.openxmlformats.org/drawingml/2006/main" xmlns:r="http://schemas.openxmlformats.org/officeDocument/2006/relationships" xmlns:p="http://schemas.openxmlformats.org/presentationml/2006/main">
   <p:cSld>
@@ -6761,6 +7435,331 @@
     <p:extLst>
       <p:ext uri="{BB962C8B-B14F-4D97-AF65-F5344CB8AC3E}">
         <p14:creationId xmlns:p14="http://schemas.microsoft.com/office/powerpoint/2010/main" val="3376861716"/>
+      </p:ext>
+    </p:extLst>
+  </p:cSld>
+  <p:clrMapOvr>
+    <a:masterClrMapping/>
+  </p:clrMapOvr>
+</p:sld>
+</file>
+
+<file path=ppt/slides/slide20.xml><?xml version="1.0" encoding="utf-8"?>
+<p:sld xmlns:a="http://schemas.openxmlformats.org/drawingml/2006/main" xmlns:r="http://schemas.openxmlformats.org/officeDocument/2006/relationships" xmlns:p="http://schemas.openxmlformats.org/presentationml/2006/main">
+  <p:cSld>
+    <p:spTree>
+      <p:nvGrpSpPr>
+        <p:cNvPr id="1" name=""/>
+        <p:cNvGrpSpPr/>
+        <p:nvPr/>
+      </p:nvGrpSpPr>
+      <p:grpSpPr>
+        <a:xfrm>
+          <a:off x="0" y="0"/>
+          <a:ext cx="0" cy="0"/>
+          <a:chOff x="0" y="0"/>
+          <a:chExt cx="0" cy="0"/>
+        </a:xfrm>
+      </p:grpSpPr>
+      <p:sp>
+        <p:nvSpPr>
+          <p:cNvPr id="2" name="TextBox 1">
+            <a:extLst>
+              <a:ext uri="{FF2B5EF4-FFF2-40B4-BE49-F238E27FC236}">
+                <a16:creationId xmlns:a16="http://schemas.microsoft.com/office/drawing/2014/main" id="{4D05C971-D981-664C-A746-65DFB8DF78C0}"/>
+              </a:ext>
+            </a:extLst>
+          </p:cNvPr>
+          <p:cNvSpPr txBox="1"/>
+          <p:nvPr/>
+        </p:nvSpPr>
+        <p:spPr>
+          <a:xfrm>
+            <a:off x="3608832" y="3840480"/>
+            <a:ext cx="332142" cy="369332"/>
+          </a:xfrm>
+          <a:prstGeom prst="rect">
+            <a:avLst/>
+          </a:prstGeom>
+          <a:noFill/>
+        </p:spPr>
+        <p:txBody>
+          <a:bodyPr wrap="none" rtlCol="0">
+            <a:spAutoFit/>
+          </a:bodyPr>
+          <a:lstStyle/>
+          <a:p>
+            <a:r>
+              <a:rPr lang="en-US" dirty="0"/>
+              <a:t>JJ</a:t>
+            </a:r>
+          </a:p>
+        </p:txBody>
+      </p:sp>
+    </p:spTree>
+    <p:extLst>
+      <p:ext uri="{BB962C8B-B14F-4D97-AF65-F5344CB8AC3E}">
+        <p14:creationId xmlns:p14="http://schemas.microsoft.com/office/powerpoint/2010/main" val="39349434"/>
+      </p:ext>
+    </p:extLst>
+  </p:cSld>
+  <p:clrMapOvr>
+    <a:masterClrMapping/>
+  </p:clrMapOvr>
+</p:sld>
+</file>
+
+<file path=ppt/slides/slide21.xml><?xml version="1.0" encoding="utf-8"?>
+<p:sld xmlns:a="http://schemas.openxmlformats.org/drawingml/2006/main" xmlns:r="http://schemas.openxmlformats.org/officeDocument/2006/relationships" xmlns:p="http://schemas.openxmlformats.org/presentationml/2006/main">
+  <p:cSld>
+    <p:spTree>
+      <p:nvGrpSpPr>
+        <p:cNvPr id="1" name=""/>
+        <p:cNvGrpSpPr/>
+        <p:nvPr/>
+      </p:nvGrpSpPr>
+      <p:grpSpPr>
+        <a:xfrm>
+          <a:off x="0" y="0"/>
+          <a:ext cx="0" cy="0"/>
+          <a:chOff x="0" y="0"/>
+          <a:chExt cx="0" cy="0"/>
+        </a:xfrm>
+      </p:grpSpPr>
+      <p:sp>
+        <p:nvSpPr>
+          <p:cNvPr id="2" name="TextBox 1">
+            <a:extLst>
+              <a:ext uri="{FF2B5EF4-FFF2-40B4-BE49-F238E27FC236}">
+                <a16:creationId xmlns:a16="http://schemas.microsoft.com/office/drawing/2014/main" id="{4D05C971-D981-664C-A746-65DFB8DF78C0}"/>
+              </a:ext>
+            </a:extLst>
+          </p:cNvPr>
+          <p:cNvSpPr txBox="1"/>
+          <p:nvPr/>
+        </p:nvSpPr>
+        <p:spPr>
+          <a:xfrm>
+            <a:off x="3608832" y="3840480"/>
+            <a:ext cx="332142" cy="369332"/>
+          </a:xfrm>
+          <a:prstGeom prst="rect">
+            <a:avLst/>
+          </a:prstGeom>
+          <a:noFill/>
+        </p:spPr>
+        <p:txBody>
+          <a:bodyPr wrap="none" rtlCol="0">
+            <a:spAutoFit/>
+          </a:bodyPr>
+          <a:lstStyle/>
+          <a:p>
+            <a:r>
+              <a:rPr lang="en-US" dirty="0"/>
+              <a:t>JJ</a:t>
+            </a:r>
+          </a:p>
+        </p:txBody>
+      </p:sp>
+    </p:spTree>
+    <p:extLst>
+      <p:ext uri="{BB962C8B-B14F-4D97-AF65-F5344CB8AC3E}">
+        <p14:creationId xmlns:p14="http://schemas.microsoft.com/office/powerpoint/2010/main" val="772333017"/>
+      </p:ext>
+    </p:extLst>
+  </p:cSld>
+  <p:clrMapOvr>
+    <a:masterClrMapping/>
+  </p:clrMapOvr>
+</p:sld>
+</file>
+
+<file path=ppt/slides/slide22.xml><?xml version="1.0" encoding="utf-8"?>
+<p:sld xmlns:a="http://schemas.openxmlformats.org/drawingml/2006/main" xmlns:r="http://schemas.openxmlformats.org/officeDocument/2006/relationships" xmlns:p="http://schemas.openxmlformats.org/presentationml/2006/main">
+  <p:cSld>
+    <p:spTree>
+      <p:nvGrpSpPr>
+        <p:cNvPr id="1" name=""/>
+        <p:cNvGrpSpPr/>
+        <p:nvPr/>
+      </p:nvGrpSpPr>
+      <p:grpSpPr>
+        <a:xfrm>
+          <a:off x="0" y="0"/>
+          <a:ext cx="0" cy="0"/>
+          <a:chOff x="0" y="0"/>
+          <a:chExt cx="0" cy="0"/>
+        </a:xfrm>
+      </p:grpSpPr>
+      <p:sp>
+        <p:nvSpPr>
+          <p:cNvPr id="2" name="TextBox 1">
+            <a:extLst>
+              <a:ext uri="{FF2B5EF4-FFF2-40B4-BE49-F238E27FC236}">
+                <a16:creationId xmlns:a16="http://schemas.microsoft.com/office/drawing/2014/main" id="{4D05C971-D981-664C-A746-65DFB8DF78C0}"/>
+              </a:ext>
+            </a:extLst>
+          </p:cNvPr>
+          <p:cNvSpPr txBox="1"/>
+          <p:nvPr/>
+        </p:nvSpPr>
+        <p:spPr>
+          <a:xfrm>
+            <a:off x="3608832" y="3840480"/>
+            <a:ext cx="332142" cy="369332"/>
+          </a:xfrm>
+          <a:prstGeom prst="rect">
+            <a:avLst/>
+          </a:prstGeom>
+          <a:noFill/>
+        </p:spPr>
+        <p:txBody>
+          <a:bodyPr wrap="none" rtlCol="0">
+            <a:spAutoFit/>
+          </a:bodyPr>
+          <a:lstStyle/>
+          <a:p>
+            <a:r>
+              <a:rPr lang="en-US" dirty="0"/>
+              <a:t>JJ</a:t>
+            </a:r>
+          </a:p>
+        </p:txBody>
+      </p:sp>
+    </p:spTree>
+    <p:extLst>
+      <p:ext uri="{BB962C8B-B14F-4D97-AF65-F5344CB8AC3E}">
+        <p14:creationId xmlns:p14="http://schemas.microsoft.com/office/powerpoint/2010/main" val="3702046556"/>
+      </p:ext>
+    </p:extLst>
+  </p:cSld>
+  <p:clrMapOvr>
+    <a:masterClrMapping/>
+  </p:clrMapOvr>
+</p:sld>
+</file>
+
+<file path=ppt/slides/slide23.xml><?xml version="1.0" encoding="utf-8"?>
+<p:sld xmlns:a="http://schemas.openxmlformats.org/drawingml/2006/main" xmlns:r="http://schemas.openxmlformats.org/officeDocument/2006/relationships" xmlns:p="http://schemas.openxmlformats.org/presentationml/2006/main">
+  <p:cSld>
+    <p:spTree>
+      <p:nvGrpSpPr>
+        <p:cNvPr id="1" name=""/>
+        <p:cNvGrpSpPr/>
+        <p:nvPr/>
+      </p:nvGrpSpPr>
+      <p:grpSpPr>
+        <a:xfrm>
+          <a:off x="0" y="0"/>
+          <a:ext cx="0" cy="0"/>
+          <a:chOff x="0" y="0"/>
+          <a:chExt cx="0" cy="0"/>
+        </a:xfrm>
+      </p:grpSpPr>
+      <p:sp>
+        <p:nvSpPr>
+          <p:cNvPr id="2" name="TextBox 1">
+            <a:extLst>
+              <a:ext uri="{FF2B5EF4-FFF2-40B4-BE49-F238E27FC236}">
+                <a16:creationId xmlns:a16="http://schemas.microsoft.com/office/drawing/2014/main" id="{4D05C971-D981-664C-A746-65DFB8DF78C0}"/>
+              </a:ext>
+            </a:extLst>
+          </p:cNvPr>
+          <p:cNvSpPr txBox="1"/>
+          <p:nvPr/>
+        </p:nvSpPr>
+        <p:spPr>
+          <a:xfrm>
+            <a:off x="3608832" y="3840480"/>
+            <a:ext cx="332142" cy="369332"/>
+          </a:xfrm>
+          <a:prstGeom prst="rect">
+            <a:avLst/>
+          </a:prstGeom>
+          <a:noFill/>
+        </p:spPr>
+        <p:txBody>
+          <a:bodyPr wrap="none" rtlCol="0">
+            <a:spAutoFit/>
+          </a:bodyPr>
+          <a:lstStyle/>
+          <a:p>
+            <a:r>
+              <a:rPr lang="en-US" dirty="0"/>
+              <a:t>JJ</a:t>
+            </a:r>
+          </a:p>
+        </p:txBody>
+      </p:sp>
+    </p:spTree>
+    <p:extLst>
+      <p:ext uri="{BB962C8B-B14F-4D97-AF65-F5344CB8AC3E}">
+        <p14:creationId xmlns:p14="http://schemas.microsoft.com/office/powerpoint/2010/main" val="1647318354"/>
+      </p:ext>
+    </p:extLst>
+  </p:cSld>
+  <p:clrMapOvr>
+    <a:masterClrMapping/>
+  </p:clrMapOvr>
+</p:sld>
+</file>
+
+<file path=ppt/slides/slide24.xml><?xml version="1.0" encoding="utf-8"?>
+<p:sld xmlns:a="http://schemas.openxmlformats.org/drawingml/2006/main" xmlns:r="http://schemas.openxmlformats.org/officeDocument/2006/relationships" xmlns:p="http://schemas.openxmlformats.org/presentationml/2006/main">
+  <p:cSld>
+    <p:spTree>
+      <p:nvGrpSpPr>
+        <p:cNvPr id="1" name=""/>
+        <p:cNvGrpSpPr/>
+        <p:nvPr/>
+      </p:nvGrpSpPr>
+      <p:grpSpPr>
+        <a:xfrm>
+          <a:off x="0" y="0"/>
+          <a:ext cx="0" cy="0"/>
+          <a:chOff x="0" y="0"/>
+          <a:chExt cx="0" cy="0"/>
+        </a:xfrm>
+      </p:grpSpPr>
+      <p:sp>
+        <p:nvSpPr>
+          <p:cNvPr id="2" name="TextBox 1">
+            <a:extLst>
+              <a:ext uri="{FF2B5EF4-FFF2-40B4-BE49-F238E27FC236}">
+                <a16:creationId xmlns:a16="http://schemas.microsoft.com/office/drawing/2014/main" id="{4D05C971-D981-664C-A746-65DFB8DF78C0}"/>
+              </a:ext>
+            </a:extLst>
+          </p:cNvPr>
+          <p:cNvSpPr txBox="1"/>
+          <p:nvPr/>
+        </p:nvSpPr>
+        <p:spPr>
+          <a:xfrm>
+            <a:off x="3608832" y="3840480"/>
+            <a:ext cx="332142" cy="369332"/>
+          </a:xfrm>
+          <a:prstGeom prst="rect">
+            <a:avLst/>
+          </a:prstGeom>
+          <a:noFill/>
+        </p:spPr>
+        <p:txBody>
+          <a:bodyPr wrap="none" rtlCol="0">
+            <a:spAutoFit/>
+          </a:bodyPr>
+          <a:lstStyle/>
+          <a:p>
+            <a:r>
+              <a:rPr lang="en-US" dirty="0"/>
+              <a:t>JJ</a:t>
+            </a:r>
+          </a:p>
+        </p:txBody>
+      </p:sp>
+    </p:spTree>
+    <p:extLst>
+      <p:ext uri="{BB962C8B-B14F-4D97-AF65-F5344CB8AC3E}">
+        <p14:creationId xmlns:p14="http://schemas.microsoft.com/office/powerpoint/2010/main" val="2559683323"/>
       </p:ext>
     </p:extLst>
   </p:cSld>
@@ -9505,6 +10504,332 @@
     <p:extLst>
       <p:ext uri="{BB962C8B-B14F-4D97-AF65-F5344CB8AC3E}">
         <p14:creationId xmlns:p14="http://schemas.microsoft.com/office/powerpoint/2010/main" val="2619388383"/>
+      </p:ext>
+    </p:extLst>
+  </p:cSld>
+  <p:clrMapOvr>
+    <a:masterClrMapping/>
+  </p:clrMapOvr>
+</p:sld>
+</file>
+
+<file path=ppt/slides/slide5.xml><?xml version="1.0" encoding="utf-8"?>
+<p:sld xmlns:a="http://schemas.openxmlformats.org/drawingml/2006/main" xmlns:r="http://schemas.openxmlformats.org/officeDocument/2006/relationships" xmlns:p="http://schemas.openxmlformats.org/presentationml/2006/main">
+  <p:cSld>
+    <p:spTree>
+      <p:nvGrpSpPr>
+        <p:cNvPr id="1" name=""/>
+        <p:cNvGrpSpPr/>
+        <p:nvPr/>
+      </p:nvGrpSpPr>
+      <p:grpSpPr>
+        <a:xfrm>
+          <a:off x="0" y="0"/>
+          <a:ext cx="0" cy="0"/>
+          <a:chOff x="0" y="0"/>
+          <a:chExt cx="0" cy="0"/>
+        </a:xfrm>
+      </p:grpSpPr>
+      <p:sp>
+        <p:nvSpPr>
+          <p:cNvPr id="2" name="TextBox 1">
+            <a:extLst>
+              <a:ext uri="{FF2B5EF4-FFF2-40B4-BE49-F238E27FC236}">
+                <a16:creationId xmlns:a16="http://schemas.microsoft.com/office/drawing/2014/main" id="{11B5617C-AC77-ED43-B27A-A9454742C897}"/>
+              </a:ext>
+            </a:extLst>
+          </p:cNvPr>
+          <p:cNvSpPr txBox="1"/>
+          <p:nvPr/>
+        </p:nvSpPr>
+        <p:spPr>
+          <a:xfrm>
+            <a:off x="3681984" y="1267968"/>
+            <a:ext cx="659155" cy="369332"/>
+          </a:xfrm>
+          <a:prstGeom prst="rect">
+            <a:avLst/>
+          </a:prstGeom>
+          <a:noFill/>
+        </p:spPr>
+        <p:txBody>
+          <a:bodyPr wrap="none" rtlCol="0">
+            <a:spAutoFit/>
+          </a:bodyPr>
+          <a:lstStyle/>
+          <a:p>
+            <a:r>
+              <a:rPr lang="en-US" dirty="0"/>
+              <a:t>NICH</a:t>
+            </a:r>
+          </a:p>
+        </p:txBody>
+      </p:sp>
+    </p:spTree>
+    <p:extLst>
+      <p:ext uri="{BB962C8B-B14F-4D97-AF65-F5344CB8AC3E}">
+        <p14:creationId xmlns:p14="http://schemas.microsoft.com/office/powerpoint/2010/main" val="1681074217"/>
+      </p:ext>
+    </p:extLst>
+  </p:cSld>
+  <p:clrMapOvr>
+    <a:masterClrMapping/>
+  </p:clrMapOvr>
+</p:sld>
+</file>
+
+<file path=ppt/slides/slide6.xml><?xml version="1.0" encoding="utf-8"?>
+<p:sld xmlns:a="http://schemas.openxmlformats.org/drawingml/2006/main" xmlns:r="http://schemas.openxmlformats.org/officeDocument/2006/relationships" xmlns:p="http://schemas.openxmlformats.org/presentationml/2006/main">
+  <p:cSld>
+    <p:spTree>
+      <p:nvGrpSpPr>
+        <p:cNvPr id="1" name=""/>
+        <p:cNvGrpSpPr/>
+        <p:nvPr/>
+      </p:nvGrpSpPr>
+      <p:grpSpPr>
+        <a:xfrm>
+          <a:off x="0" y="0"/>
+          <a:ext cx="0" cy="0"/>
+          <a:chOff x="0" y="0"/>
+          <a:chExt cx="0" cy="0"/>
+        </a:xfrm>
+      </p:grpSpPr>
+      <p:sp>
+        <p:nvSpPr>
+          <p:cNvPr id="2" name="TextBox 1">
+            <a:extLst>
+              <a:ext uri="{FF2B5EF4-FFF2-40B4-BE49-F238E27FC236}">
+                <a16:creationId xmlns:a16="http://schemas.microsoft.com/office/drawing/2014/main" id="{11B5617C-AC77-ED43-B27A-A9454742C897}"/>
+              </a:ext>
+            </a:extLst>
+          </p:cNvPr>
+          <p:cNvSpPr txBox="1"/>
+          <p:nvPr/>
+        </p:nvSpPr>
+        <p:spPr>
+          <a:xfrm>
+            <a:off x="3681984" y="1267968"/>
+            <a:ext cx="659155" cy="369332"/>
+          </a:xfrm>
+          <a:prstGeom prst="rect">
+            <a:avLst/>
+          </a:prstGeom>
+          <a:noFill/>
+        </p:spPr>
+        <p:txBody>
+          <a:bodyPr wrap="none" rtlCol="0">
+            <a:spAutoFit/>
+          </a:bodyPr>
+          <a:lstStyle/>
+          <a:p>
+            <a:r>
+              <a:rPr lang="en-US" dirty="0"/>
+              <a:t>NICH</a:t>
+            </a:r>
+          </a:p>
+        </p:txBody>
+      </p:sp>
+    </p:spTree>
+    <p:extLst>
+      <p:ext uri="{BB962C8B-B14F-4D97-AF65-F5344CB8AC3E}">
+        <p14:creationId xmlns:p14="http://schemas.microsoft.com/office/powerpoint/2010/main" val="4194871880"/>
+      </p:ext>
+    </p:extLst>
+  </p:cSld>
+  <p:clrMapOvr>
+    <a:masterClrMapping/>
+  </p:clrMapOvr>
+</p:sld>
+</file>
+
+<file path=ppt/slides/slide7.xml><?xml version="1.0" encoding="utf-8"?>
+<p:sld xmlns:a="http://schemas.openxmlformats.org/drawingml/2006/main" xmlns:r="http://schemas.openxmlformats.org/officeDocument/2006/relationships" xmlns:p="http://schemas.openxmlformats.org/presentationml/2006/main">
+  <p:cSld>
+    <p:spTree>
+      <p:nvGrpSpPr>
+        <p:cNvPr id="1" name=""/>
+        <p:cNvGrpSpPr/>
+        <p:nvPr/>
+      </p:nvGrpSpPr>
+      <p:grpSpPr>
+        <a:xfrm>
+          <a:off x="0" y="0"/>
+          <a:ext cx="0" cy="0"/>
+          <a:chOff x="0" y="0"/>
+          <a:chExt cx="0" cy="0"/>
+        </a:xfrm>
+      </p:grpSpPr>
+      <p:sp>
+        <p:nvSpPr>
+          <p:cNvPr id="2" name="TextBox 1">
+            <a:extLst>
+              <a:ext uri="{FF2B5EF4-FFF2-40B4-BE49-F238E27FC236}">
+                <a16:creationId xmlns:a16="http://schemas.microsoft.com/office/drawing/2014/main" id="{11B5617C-AC77-ED43-B27A-A9454742C897}"/>
+              </a:ext>
+            </a:extLst>
+          </p:cNvPr>
+          <p:cNvSpPr txBox="1"/>
+          <p:nvPr/>
+        </p:nvSpPr>
+        <p:spPr>
+          <a:xfrm>
+            <a:off x="3681984" y="1267968"/>
+            <a:ext cx="659155" cy="369332"/>
+          </a:xfrm>
+          <a:prstGeom prst="rect">
+            <a:avLst/>
+          </a:prstGeom>
+          <a:noFill/>
+        </p:spPr>
+        <p:txBody>
+          <a:bodyPr wrap="none" rtlCol="0">
+            <a:spAutoFit/>
+          </a:bodyPr>
+          <a:lstStyle/>
+          <a:p>
+            <a:r>
+              <a:rPr lang="en-US" dirty="0"/>
+              <a:t>NICH</a:t>
+            </a:r>
+          </a:p>
+        </p:txBody>
+      </p:sp>
+    </p:spTree>
+    <p:extLst>
+      <p:ext uri="{BB962C8B-B14F-4D97-AF65-F5344CB8AC3E}">
+        <p14:creationId xmlns:p14="http://schemas.microsoft.com/office/powerpoint/2010/main" val="3534876607"/>
+      </p:ext>
+    </p:extLst>
+  </p:cSld>
+  <p:clrMapOvr>
+    <a:masterClrMapping/>
+  </p:clrMapOvr>
+</p:sld>
+</file>
+
+<file path=ppt/slides/slide8.xml><?xml version="1.0" encoding="utf-8"?>
+<p:sld xmlns:a="http://schemas.openxmlformats.org/drawingml/2006/main" xmlns:r="http://schemas.openxmlformats.org/officeDocument/2006/relationships" xmlns:p="http://schemas.openxmlformats.org/presentationml/2006/main">
+  <p:cSld>
+    <p:spTree>
+      <p:nvGrpSpPr>
+        <p:cNvPr id="1" name=""/>
+        <p:cNvGrpSpPr/>
+        <p:nvPr/>
+      </p:nvGrpSpPr>
+      <p:grpSpPr>
+        <a:xfrm>
+          <a:off x="0" y="0"/>
+          <a:ext cx="0" cy="0"/>
+          <a:chOff x="0" y="0"/>
+          <a:chExt cx="0" cy="0"/>
+        </a:xfrm>
+      </p:grpSpPr>
+      <p:sp>
+        <p:nvSpPr>
+          <p:cNvPr id="2" name="TextBox 1">
+            <a:extLst>
+              <a:ext uri="{FF2B5EF4-FFF2-40B4-BE49-F238E27FC236}">
+                <a16:creationId xmlns:a16="http://schemas.microsoft.com/office/drawing/2014/main" id="{11B5617C-AC77-ED43-B27A-A9454742C897}"/>
+              </a:ext>
+            </a:extLst>
+          </p:cNvPr>
+          <p:cNvSpPr txBox="1"/>
+          <p:nvPr/>
+        </p:nvSpPr>
+        <p:spPr>
+          <a:xfrm>
+            <a:off x="3681984" y="1267968"/>
+            <a:ext cx="659155" cy="369332"/>
+          </a:xfrm>
+          <a:prstGeom prst="rect">
+            <a:avLst/>
+          </a:prstGeom>
+          <a:noFill/>
+        </p:spPr>
+        <p:txBody>
+          <a:bodyPr wrap="none" rtlCol="0">
+            <a:spAutoFit/>
+          </a:bodyPr>
+          <a:lstStyle/>
+          <a:p>
+            <a:r>
+              <a:rPr lang="en-US" dirty="0"/>
+              <a:t>NICH</a:t>
+            </a:r>
+          </a:p>
+        </p:txBody>
+      </p:sp>
+    </p:spTree>
+    <p:extLst>
+      <p:ext uri="{BB962C8B-B14F-4D97-AF65-F5344CB8AC3E}">
+        <p14:creationId xmlns:p14="http://schemas.microsoft.com/office/powerpoint/2010/main" val="1075803884"/>
+      </p:ext>
+    </p:extLst>
+  </p:cSld>
+  <p:clrMapOvr>
+    <a:masterClrMapping/>
+  </p:clrMapOvr>
+</p:sld>
+</file>
+
+<file path=ppt/slides/slide9.xml><?xml version="1.0" encoding="utf-8"?>
+<p:sld xmlns:a="http://schemas.openxmlformats.org/drawingml/2006/main" xmlns:r="http://schemas.openxmlformats.org/officeDocument/2006/relationships" xmlns:p="http://schemas.openxmlformats.org/presentationml/2006/main">
+  <p:cSld>
+    <p:spTree>
+      <p:nvGrpSpPr>
+        <p:cNvPr id="1" name=""/>
+        <p:cNvGrpSpPr/>
+        <p:nvPr/>
+      </p:nvGrpSpPr>
+      <p:grpSpPr>
+        <a:xfrm>
+          <a:off x="0" y="0"/>
+          <a:ext cx="0" cy="0"/>
+          <a:chOff x="0" y="0"/>
+          <a:chExt cx="0" cy="0"/>
+        </a:xfrm>
+      </p:grpSpPr>
+      <p:sp>
+        <p:nvSpPr>
+          <p:cNvPr id="2" name="TextBox 1">
+            <a:extLst>
+              <a:ext uri="{FF2B5EF4-FFF2-40B4-BE49-F238E27FC236}">
+                <a16:creationId xmlns:a16="http://schemas.microsoft.com/office/drawing/2014/main" id="{F298CF04-C313-E24A-A52B-837593E940AF}"/>
+              </a:ext>
+            </a:extLst>
+          </p:cNvPr>
+          <p:cNvSpPr txBox="1"/>
+          <p:nvPr/>
+        </p:nvSpPr>
+        <p:spPr>
+          <a:xfrm>
+            <a:off x="5693664" y="2682240"/>
+            <a:ext cx="514885" cy="369332"/>
+          </a:xfrm>
+          <a:prstGeom prst="rect">
+            <a:avLst/>
+          </a:prstGeom>
+          <a:noFill/>
+        </p:spPr>
+        <p:txBody>
+          <a:bodyPr wrap="none" rtlCol="0">
+            <a:spAutoFit/>
+          </a:bodyPr>
+          <a:lstStyle/>
+          <a:p>
+            <a:r>
+              <a:rPr lang="en-US" dirty="0" err="1"/>
+              <a:t>Xiyi</a:t>
+            </a:r>
+            <a:endParaRPr lang="en-US" dirty="0"/>
+          </a:p>
+        </p:txBody>
+      </p:sp>
+    </p:spTree>
+    <p:extLst>
+      <p:ext uri="{BB962C8B-B14F-4D97-AF65-F5344CB8AC3E}">
+        <p14:creationId xmlns:p14="http://schemas.microsoft.com/office/powerpoint/2010/main" val="3256526287"/>
       </p:ext>
     </p:extLst>
   </p:cSld>

</xml_diff>

<commit_message>
Revert "Allocated slides to prevent conflicts"
This reverts commit 1acbd977d5c309246cf96f2936ca85ce1673b87b.
</commit_message>
<xml_diff>
--- a/docs/Diagrams.pptx
+++ b/docs/Diagrams.pptx
@@ -5,33 +5,13 @@
     <p:sldMasterId id="2147483648" r:id="rId1"/>
   </p:sldMasterIdLst>
   <p:notesMasterIdLst>
-    <p:notesMasterId r:id="rId26"/>
+    <p:notesMasterId r:id="rId6"/>
   </p:notesMasterIdLst>
   <p:sldIdLst>
     <p:sldId id="256" r:id="rId2"/>
     <p:sldId id="257" r:id="rId3"/>
     <p:sldId id="259" r:id="rId4"/>
     <p:sldId id="258" r:id="rId5"/>
-    <p:sldId id="260" r:id="rId6"/>
-    <p:sldId id="276" r:id="rId7"/>
-    <p:sldId id="277" r:id="rId8"/>
-    <p:sldId id="278" r:id="rId9"/>
-    <p:sldId id="261" r:id="rId10"/>
-    <p:sldId id="279" r:id="rId11"/>
-    <p:sldId id="280" r:id="rId12"/>
-    <p:sldId id="281" r:id="rId13"/>
-    <p:sldId id="282" r:id="rId14"/>
-    <p:sldId id="262" r:id="rId15"/>
-    <p:sldId id="283" r:id="rId16"/>
-    <p:sldId id="284" r:id="rId17"/>
-    <p:sldId id="285" r:id="rId18"/>
-    <p:sldId id="286" r:id="rId19"/>
-    <p:sldId id="263" r:id="rId20"/>
-    <p:sldId id="290" r:id="rId21"/>
-    <p:sldId id="291" r:id="rId22"/>
-    <p:sldId id="292" r:id="rId23"/>
-    <p:sldId id="293" r:id="rId24"/>
-    <p:sldId id="294" r:id="rId25"/>
   </p:sldIdLst>
   <p:sldSz cx="9144000" cy="6858000" type="screen4x3"/>
   <p:notesSz cx="6858000" cy="9144000"/>
@@ -231,7 +211,7 @@
           <a:p>
             <a:fld id="{F5CC4B3F-88C1-4FFA-B1B6-F41C21DC6924}" type="datetimeFigureOut">
               <a:rPr lang="en-US" smtClean="0"/>
-              <a:t>11/10/18</a:t>
+              <a:t>8/12/2018</a:t>
             </a:fld>
             <a:endParaRPr lang="en-US"/>
           </a:p>
@@ -761,7 +741,7 @@
           <a:p>
             <a:fld id="{78C97017-6FC3-485B-9764-EAC9E56C1D49}" type="datetimeFigureOut">
               <a:rPr lang="en-US" smtClean="0"/>
-              <a:t>11/10/18</a:t>
+              <a:t>8/12/2018</a:t>
             </a:fld>
             <a:endParaRPr lang="en-US"/>
           </a:p>
@@ -929,7 +909,7 @@
           <a:p>
             <a:fld id="{78C97017-6FC3-485B-9764-EAC9E56C1D49}" type="datetimeFigureOut">
               <a:rPr lang="en-US" smtClean="0"/>
-              <a:t>11/10/18</a:t>
+              <a:t>8/12/2018</a:t>
             </a:fld>
             <a:endParaRPr lang="en-US"/>
           </a:p>
@@ -1107,7 +1087,7 @@
           <a:p>
             <a:fld id="{78C97017-6FC3-485B-9764-EAC9E56C1D49}" type="datetimeFigureOut">
               <a:rPr lang="en-US" smtClean="0"/>
-              <a:t>11/10/18</a:t>
+              <a:t>8/12/2018</a:t>
             </a:fld>
             <a:endParaRPr lang="en-US"/>
           </a:p>
@@ -1275,7 +1255,7 @@
           <a:p>
             <a:fld id="{78C97017-6FC3-485B-9764-EAC9E56C1D49}" type="datetimeFigureOut">
               <a:rPr lang="en-US" smtClean="0"/>
-              <a:t>11/10/18</a:t>
+              <a:t>8/12/2018</a:t>
             </a:fld>
             <a:endParaRPr lang="en-US"/>
           </a:p>
@@ -1520,7 +1500,7 @@
           <a:p>
             <a:fld id="{78C97017-6FC3-485B-9764-EAC9E56C1D49}" type="datetimeFigureOut">
               <a:rPr lang="en-US" smtClean="0"/>
-              <a:t>11/10/18</a:t>
+              <a:t>8/12/2018</a:t>
             </a:fld>
             <a:endParaRPr lang="en-US"/>
           </a:p>
@@ -1805,7 +1785,7 @@
           <a:p>
             <a:fld id="{78C97017-6FC3-485B-9764-EAC9E56C1D49}" type="datetimeFigureOut">
               <a:rPr lang="en-US" smtClean="0"/>
-              <a:t>11/10/18</a:t>
+              <a:t>8/12/2018</a:t>
             </a:fld>
             <a:endParaRPr lang="en-US"/>
           </a:p>
@@ -2224,7 +2204,7 @@
           <a:p>
             <a:fld id="{78C97017-6FC3-485B-9764-EAC9E56C1D49}" type="datetimeFigureOut">
               <a:rPr lang="en-US" smtClean="0"/>
-              <a:t>11/10/18</a:t>
+              <a:t>8/12/2018</a:t>
             </a:fld>
             <a:endParaRPr lang="en-US"/>
           </a:p>
@@ -2341,7 +2321,7 @@
           <a:p>
             <a:fld id="{78C97017-6FC3-485B-9764-EAC9E56C1D49}" type="datetimeFigureOut">
               <a:rPr lang="en-US" smtClean="0"/>
-              <a:t>11/10/18</a:t>
+              <a:t>8/12/2018</a:t>
             </a:fld>
             <a:endParaRPr lang="en-US"/>
           </a:p>
@@ -2436,7 +2416,7 @@
           <a:p>
             <a:fld id="{78C97017-6FC3-485B-9764-EAC9E56C1D49}" type="datetimeFigureOut">
               <a:rPr lang="en-US" smtClean="0"/>
-              <a:t>11/10/18</a:t>
+              <a:t>8/12/2018</a:t>
             </a:fld>
             <a:endParaRPr lang="en-US"/>
           </a:p>
@@ -2711,7 +2691,7 @@
           <a:p>
             <a:fld id="{78C97017-6FC3-485B-9764-EAC9E56C1D49}" type="datetimeFigureOut">
               <a:rPr lang="en-US" smtClean="0"/>
-              <a:t>11/10/18</a:t>
+              <a:t>8/12/2018</a:t>
             </a:fld>
             <a:endParaRPr lang="en-US"/>
           </a:p>
@@ -2963,7 +2943,7 @@
           <a:p>
             <a:fld id="{78C97017-6FC3-485B-9764-EAC9E56C1D49}" type="datetimeFigureOut">
               <a:rPr lang="en-US" smtClean="0"/>
-              <a:t>11/10/18</a:t>
+              <a:t>8/12/2018</a:t>
             </a:fld>
             <a:endParaRPr lang="en-US"/>
           </a:p>
@@ -3174,7 +3154,7 @@
           <a:p>
             <a:fld id="{78C97017-6FC3-485B-9764-EAC9E56C1D49}" type="datetimeFigureOut">
               <a:rPr lang="en-US" smtClean="0"/>
-              <a:t>11/10/18</a:t>
+              <a:t>8/12/2018</a:t>
             </a:fld>
             <a:endParaRPr lang="en-US"/>
           </a:p>
@@ -3615,660 +3595,6 @@
 </p:sld>
 </file>
 
-<file path=ppt/slides/slide10.xml><?xml version="1.0" encoding="utf-8"?>
-<p:sld xmlns:a="http://schemas.openxmlformats.org/drawingml/2006/main" xmlns:r="http://schemas.openxmlformats.org/officeDocument/2006/relationships" xmlns:p="http://schemas.openxmlformats.org/presentationml/2006/main">
-  <p:cSld>
-    <p:spTree>
-      <p:nvGrpSpPr>
-        <p:cNvPr id="1" name=""/>
-        <p:cNvGrpSpPr/>
-        <p:nvPr/>
-      </p:nvGrpSpPr>
-      <p:grpSpPr>
-        <a:xfrm>
-          <a:off x="0" y="0"/>
-          <a:ext cx="0" cy="0"/>
-          <a:chOff x="0" y="0"/>
-          <a:chExt cx="0" cy="0"/>
-        </a:xfrm>
-      </p:grpSpPr>
-      <p:sp>
-        <p:nvSpPr>
-          <p:cNvPr id="2" name="TextBox 1">
-            <a:extLst>
-              <a:ext uri="{FF2B5EF4-FFF2-40B4-BE49-F238E27FC236}">
-                <a16:creationId xmlns:a16="http://schemas.microsoft.com/office/drawing/2014/main" id="{F298CF04-C313-E24A-A52B-837593E940AF}"/>
-              </a:ext>
-            </a:extLst>
-          </p:cNvPr>
-          <p:cNvSpPr txBox="1"/>
-          <p:nvPr/>
-        </p:nvSpPr>
-        <p:spPr>
-          <a:xfrm>
-            <a:off x="5693664" y="2682240"/>
-            <a:ext cx="514885" cy="369332"/>
-          </a:xfrm>
-          <a:prstGeom prst="rect">
-            <a:avLst/>
-          </a:prstGeom>
-          <a:noFill/>
-        </p:spPr>
-        <p:txBody>
-          <a:bodyPr wrap="none" rtlCol="0">
-            <a:spAutoFit/>
-          </a:bodyPr>
-          <a:lstStyle/>
-          <a:p>
-            <a:r>
-              <a:rPr lang="en-US" dirty="0" err="1"/>
-              <a:t>Xiyi</a:t>
-            </a:r>
-            <a:endParaRPr lang="en-US" dirty="0"/>
-          </a:p>
-        </p:txBody>
-      </p:sp>
-    </p:spTree>
-    <p:extLst>
-      <p:ext uri="{BB962C8B-B14F-4D97-AF65-F5344CB8AC3E}">
-        <p14:creationId xmlns:p14="http://schemas.microsoft.com/office/powerpoint/2010/main" val="1208679585"/>
-      </p:ext>
-    </p:extLst>
-  </p:cSld>
-  <p:clrMapOvr>
-    <a:masterClrMapping/>
-  </p:clrMapOvr>
-</p:sld>
-</file>
-
-<file path=ppt/slides/slide11.xml><?xml version="1.0" encoding="utf-8"?>
-<p:sld xmlns:a="http://schemas.openxmlformats.org/drawingml/2006/main" xmlns:r="http://schemas.openxmlformats.org/officeDocument/2006/relationships" xmlns:p="http://schemas.openxmlformats.org/presentationml/2006/main">
-  <p:cSld>
-    <p:spTree>
-      <p:nvGrpSpPr>
-        <p:cNvPr id="1" name=""/>
-        <p:cNvGrpSpPr/>
-        <p:nvPr/>
-      </p:nvGrpSpPr>
-      <p:grpSpPr>
-        <a:xfrm>
-          <a:off x="0" y="0"/>
-          <a:ext cx="0" cy="0"/>
-          <a:chOff x="0" y="0"/>
-          <a:chExt cx="0" cy="0"/>
-        </a:xfrm>
-      </p:grpSpPr>
-      <p:sp>
-        <p:nvSpPr>
-          <p:cNvPr id="2" name="TextBox 1">
-            <a:extLst>
-              <a:ext uri="{FF2B5EF4-FFF2-40B4-BE49-F238E27FC236}">
-                <a16:creationId xmlns:a16="http://schemas.microsoft.com/office/drawing/2014/main" id="{F298CF04-C313-E24A-A52B-837593E940AF}"/>
-              </a:ext>
-            </a:extLst>
-          </p:cNvPr>
-          <p:cNvSpPr txBox="1"/>
-          <p:nvPr/>
-        </p:nvSpPr>
-        <p:spPr>
-          <a:xfrm>
-            <a:off x="5693664" y="2682240"/>
-            <a:ext cx="514885" cy="369332"/>
-          </a:xfrm>
-          <a:prstGeom prst="rect">
-            <a:avLst/>
-          </a:prstGeom>
-          <a:noFill/>
-        </p:spPr>
-        <p:txBody>
-          <a:bodyPr wrap="none" rtlCol="0">
-            <a:spAutoFit/>
-          </a:bodyPr>
-          <a:lstStyle/>
-          <a:p>
-            <a:r>
-              <a:rPr lang="en-US" dirty="0" err="1"/>
-              <a:t>Xiyi</a:t>
-            </a:r>
-            <a:endParaRPr lang="en-US" dirty="0"/>
-          </a:p>
-        </p:txBody>
-      </p:sp>
-    </p:spTree>
-    <p:extLst>
-      <p:ext uri="{BB962C8B-B14F-4D97-AF65-F5344CB8AC3E}">
-        <p14:creationId xmlns:p14="http://schemas.microsoft.com/office/powerpoint/2010/main" val="1024521291"/>
-      </p:ext>
-    </p:extLst>
-  </p:cSld>
-  <p:clrMapOvr>
-    <a:masterClrMapping/>
-  </p:clrMapOvr>
-</p:sld>
-</file>
-
-<file path=ppt/slides/slide12.xml><?xml version="1.0" encoding="utf-8"?>
-<p:sld xmlns:a="http://schemas.openxmlformats.org/drawingml/2006/main" xmlns:r="http://schemas.openxmlformats.org/officeDocument/2006/relationships" xmlns:p="http://schemas.openxmlformats.org/presentationml/2006/main">
-  <p:cSld>
-    <p:spTree>
-      <p:nvGrpSpPr>
-        <p:cNvPr id="1" name=""/>
-        <p:cNvGrpSpPr/>
-        <p:nvPr/>
-      </p:nvGrpSpPr>
-      <p:grpSpPr>
-        <a:xfrm>
-          <a:off x="0" y="0"/>
-          <a:ext cx="0" cy="0"/>
-          <a:chOff x="0" y="0"/>
-          <a:chExt cx="0" cy="0"/>
-        </a:xfrm>
-      </p:grpSpPr>
-      <p:sp>
-        <p:nvSpPr>
-          <p:cNvPr id="2" name="TextBox 1">
-            <a:extLst>
-              <a:ext uri="{FF2B5EF4-FFF2-40B4-BE49-F238E27FC236}">
-                <a16:creationId xmlns:a16="http://schemas.microsoft.com/office/drawing/2014/main" id="{F298CF04-C313-E24A-A52B-837593E940AF}"/>
-              </a:ext>
-            </a:extLst>
-          </p:cNvPr>
-          <p:cNvSpPr txBox="1"/>
-          <p:nvPr/>
-        </p:nvSpPr>
-        <p:spPr>
-          <a:xfrm>
-            <a:off x="5693664" y="2682240"/>
-            <a:ext cx="514885" cy="369332"/>
-          </a:xfrm>
-          <a:prstGeom prst="rect">
-            <a:avLst/>
-          </a:prstGeom>
-          <a:noFill/>
-        </p:spPr>
-        <p:txBody>
-          <a:bodyPr wrap="none" rtlCol="0">
-            <a:spAutoFit/>
-          </a:bodyPr>
-          <a:lstStyle/>
-          <a:p>
-            <a:r>
-              <a:rPr lang="en-US" dirty="0" err="1"/>
-              <a:t>Xiyi</a:t>
-            </a:r>
-            <a:endParaRPr lang="en-US" dirty="0"/>
-          </a:p>
-        </p:txBody>
-      </p:sp>
-    </p:spTree>
-    <p:extLst>
-      <p:ext uri="{BB962C8B-B14F-4D97-AF65-F5344CB8AC3E}">
-        <p14:creationId xmlns:p14="http://schemas.microsoft.com/office/powerpoint/2010/main" val="1277986228"/>
-      </p:ext>
-    </p:extLst>
-  </p:cSld>
-  <p:clrMapOvr>
-    <a:masterClrMapping/>
-  </p:clrMapOvr>
-</p:sld>
-</file>
-
-<file path=ppt/slides/slide13.xml><?xml version="1.0" encoding="utf-8"?>
-<p:sld xmlns:a="http://schemas.openxmlformats.org/drawingml/2006/main" xmlns:r="http://schemas.openxmlformats.org/officeDocument/2006/relationships" xmlns:p="http://schemas.openxmlformats.org/presentationml/2006/main">
-  <p:cSld>
-    <p:spTree>
-      <p:nvGrpSpPr>
-        <p:cNvPr id="1" name=""/>
-        <p:cNvGrpSpPr/>
-        <p:nvPr/>
-      </p:nvGrpSpPr>
-      <p:grpSpPr>
-        <a:xfrm>
-          <a:off x="0" y="0"/>
-          <a:ext cx="0" cy="0"/>
-          <a:chOff x="0" y="0"/>
-          <a:chExt cx="0" cy="0"/>
-        </a:xfrm>
-      </p:grpSpPr>
-      <p:sp>
-        <p:nvSpPr>
-          <p:cNvPr id="2" name="TextBox 1">
-            <a:extLst>
-              <a:ext uri="{FF2B5EF4-FFF2-40B4-BE49-F238E27FC236}">
-                <a16:creationId xmlns:a16="http://schemas.microsoft.com/office/drawing/2014/main" id="{F298CF04-C313-E24A-A52B-837593E940AF}"/>
-              </a:ext>
-            </a:extLst>
-          </p:cNvPr>
-          <p:cNvSpPr txBox="1"/>
-          <p:nvPr/>
-        </p:nvSpPr>
-        <p:spPr>
-          <a:xfrm>
-            <a:off x="5693664" y="2682240"/>
-            <a:ext cx="514885" cy="369332"/>
-          </a:xfrm>
-          <a:prstGeom prst="rect">
-            <a:avLst/>
-          </a:prstGeom>
-          <a:noFill/>
-        </p:spPr>
-        <p:txBody>
-          <a:bodyPr wrap="none" rtlCol="0">
-            <a:spAutoFit/>
-          </a:bodyPr>
-          <a:lstStyle/>
-          <a:p>
-            <a:r>
-              <a:rPr lang="en-US" dirty="0" err="1"/>
-              <a:t>Xiyi</a:t>
-            </a:r>
-            <a:endParaRPr lang="en-US" dirty="0"/>
-          </a:p>
-        </p:txBody>
-      </p:sp>
-    </p:spTree>
-    <p:extLst>
-      <p:ext uri="{BB962C8B-B14F-4D97-AF65-F5344CB8AC3E}">
-        <p14:creationId xmlns:p14="http://schemas.microsoft.com/office/powerpoint/2010/main" val="4061719779"/>
-      </p:ext>
-    </p:extLst>
-  </p:cSld>
-  <p:clrMapOvr>
-    <a:masterClrMapping/>
-  </p:clrMapOvr>
-</p:sld>
-</file>
-
-<file path=ppt/slides/slide14.xml><?xml version="1.0" encoding="utf-8"?>
-<p:sld xmlns:a="http://schemas.openxmlformats.org/drawingml/2006/main" xmlns:r="http://schemas.openxmlformats.org/officeDocument/2006/relationships" xmlns:p="http://schemas.openxmlformats.org/presentationml/2006/main">
-  <p:cSld>
-    <p:spTree>
-      <p:nvGrpSpPr>
-        <p:cNvPr id="1" name=""/>
-        <p:cNvGrpSpPr/>
-        <p:nvPr/>
-      </p:nvGrpSpPr>
-      <p:grpSpPr>
-        <a:xfrm>
-          <a:off x="0" y="0"/>
-          <a:ext cx="0" cy="0"/>
-          <a:chOff x="0" y="0"/>
-          <a:chExt cx="0" cy="0"/>
-        </a:xfrm>
-      </p:grpSpPr>
-      <p:sp>
-        <p:nvSpPr>
-          <p:cNvPr id="2" name="TextBox 1">
-            <a:extLst>
-              <a:ext uri="{FF2B5EF4-FFF2-40B4-BE49-F238E27FC236}">
-                <a16:creationId xmlns:a16="http://schemas.microsoft.com/office/drawing/2014/main" id="{4E211E7D-D05C-2949-8500-D32AA9DBA052}"/>
-              </a:ext>
-            </a:extLst>
-          </p:cNvPr>
-          <p:cNvSpPr txBox="1"/>
-          <p:nvPr/>
-        </p:nvSpPr>
-        <p:spPr>
-          <a:xfrm>
-            <a:off x="5949696" y="4120896"/>
-            <a:ext cx="667812" cy="369332"/>
-          </a:xfrm>
-          <a:prstGeom prst="rect">
-            <a:avLst/>
-          </a:prstGeom>
-          <a:noFill/>
-        </p:spPr>
-        <p:txBody>
-          <a:bodyPr wrap="none" rtlCol="0">
-            <a:spAutoFit/>
-          </a:bodyPr>
-          <a:lstStyle/>
-          <a:p>
-            <a:r>
-              <a:rPr lang="en-US" dirty="0"/>
-              <a:t>Keith</a:t>
-            </a:r>
-          </a:p>
-        </p:txBody>
-      </p:sp>
-    </p:spTree>
-    <p:extLst>
-      <p:ext uri="{BB962C8B-B14F-4D97-AF65-F5344CB8AC3E}">
-        <p14:creationId xmlns:p14="http://schemas.microsoft.com/office/powerpoint/2010/main" val="4184612790"/>
-      </p:ext>
-    </p:extLst>
-  </p:cSld>
-  <p:clrMapOvr>
-    <a:masterClrMapping/>
-  </p:clrMapOvr>
-</p:sld>
-</file>
-
-<file path=ppt/slides/slide15.xml><?xml version="1.0" encoding="utf-8"?>
-<p:sld xmlns:a="http://schemas.openxmlformats.org/drawingml/2006/main" xmlns:r="http://schemas.openxmlformats.org/officeDocument/2006/relationships" xmlns:p="http://schemas.openxmlformats.org/presentationml/2006/main">
-  <p:cSld>
-    <p:spTree>
-      <p:nvGrpSpPr>
-        <p:cNvPr id="1" name=""/>
-        <p:cNvGrpSpPr/>
-        <p:nvPr/>
-      </p:nvGrpSpPr>
-      <p:grpSpPr>
-        <a:xfrm>
-          <a:off x="0" y="0"/>
-          <a:ext cx="0" cy="0"/>
-          <a:chOff x="0" y="0"/>
-          <a:chExt cx="0" cy="0"/>
-        </a:xfrm>
-      </p:grpSpPr>
-      <p:sp>
-        <p:nvSpPr>
-          <p:cNvPr id="2" name="TextBox 1">
-            <a:extLst>
-              <a:ext uri="{FF2B5EF4-FFF2-40B4-BE49-F238E27FC236}">
-                <a16:creationId xmlns:a16="http://schemas.microsoft.com/office/drawing/2014/main" id="{4E211E7D-D05C-2949-8500-D32AA9DBA052}"/>
-              </a:ext>
-            </a:extLst>
-          </p:cNvPr>
-          <p:cNvSpPr txBox="1"/>
-          <p:nvPr/>
-        </p:nvSpPr>
-        <p:spPr>
-          <a:xfrm>
-            <a:off x="5949696" y="4120896"/>
-            <a:ext cx="667812" cy="369332"/>
-          </a:xfrm>
-          <a:prstGeom prst="rect">
-            <a:avLst/>
-          </a:prstGeom>
-          <a:noFill/>
-        </p:spPr>
-        <p:txBody>
-          <a:bodyPr wrap="none" rtlCol="0">
-            <a:spAutoFit/>
-          </a:bodyPr>
-          <a:lstStyle/>
-          <a:p>
-            <a:r>
-              <a:rPr lang="en-US" dirty="0"/>
-              <a:t>Keith</a:t>
-            </a:r>
-          </a:p>
-        </p:txBody>
-      </p:sp>
-    </p:spTree>
-    <p:extLst>
-      <p:ext uri="{BB962C8B-B14F-4D97-AF65-F5344CB8AC3E}">
-        <p14:creationId xmlns:p14="http://schemas.microsoft.com/office/powerpoint/2010/main" val="732047599"/>
-      </p:ext>
-    </p:extLst>
-  </p:cSld>
-  <p:clrMapOvr>
-    <a:masterClrMapping/>
-  </p:clrMapOvr>
-</p:sld>
-</file>
-
-<file path=ppt/slides/slide16.xml><?xml version="1.0" encoding="utf-8"?>
-<p:sld xmlns:a="http://schemas.openxmlformats.org/drawingml/2006/main" xmlns:r="http://schemas.openxmlformats.org/officeDocument/2006/relationships" xmlns:p="http://schemas.openxmlformats.org/presentationml/2006/main">
-  <p:cSld>
-    <p:spTree>
-      <p:nvGrpSpPr>
-        <p:cNvPr id="1" name=""/>
-        <p:cNvGrpSpPr/>
-        <p:nvPr/>
-      </p:nvGrpSpPr>
-      <p:grpSpPr>
-        <a:xfrm>
-          <a:off x="0" y="0"/>
-          <a:ext cx="0" cy="0"/>
-          <a:chOff x="0" y="0"/>
-          <a:chExt cx="0" cy="0"/>
-        </a:xfrm>
-      </p:grpSpPr>
-      <p:sp>
-        <p:nvSpPr>
-          <p:cNvPr id="2" name="TextBox 1">
-            <a:extLst>
-              <a:ext uri="{FF2B5EF4-FFF2-40B4-BE49-F238E27FC236}">
-                <a16:creationId xmlns:a16="http://schemas.microsoft.com/office/drawing/2014/main" id="{4E211E7D-D05C-2949-8500-D32AA9DBA052}"/>
-              </a:ext>
-            </a:extLst>
-          </p:cNvPr>
-          <p:cNvSpPr txBox="1"/>
-          <p:nvPr/>
-        </p:nvSpPr>
-        <p:spPr>
-          <a:xfrm>
-            <a:off x="5949696" y="4120896"/>
-            <a:ext cx="667812" cy="369332"/>
-          </a:xfrm>
-          <a:prstGeom prst="rect">
-            <a:avLst/>
-          </a:prstGeom>
-          <a:noFill/>
-        </p:spPr>
-        <p:txBody>
-          <a:bodyPr wrap="none" rtlCol="0">
-            <a:spAutoFit/>
-          </a:bodyPr>
-          <a:lstStyle/>
-          <a:p>
-            <a:r>
-              <a:rPr lang="en-US" dirty="0"/>
-              <a:t>Keith</a:t>
-            </a:r>
-          </a:p>
-        </p:txBody>
-      </p:sp>
-    </p:spTree>
-    <p:extLst>
-      <p:ext uri="{BB962C8B-B14F-4D97-AF65-F5344CB8AC3E}">
-        <p14:creationId xmlns:p14="http://schemas.microsoft.com/office/powerpoint/2010/main" val="2171078834"/>
-      </p:ext>
-    </p:extLst>
-  </p:cSld>
-  <p:clrMapOvr>
-    <a:masterClrMapping/>
-  </p:clrMapOvr>
-</p:sld>
-</file>
-
-<file path=ppt/slides/slide17.xml><?xml version="1.0" encoding="utf-8"?>
-<p:sld xmlns:a="http://schemas.openxmlformats.org/drawingml/2006/main" xmlns:r="http://schemas.openxmlformats.org/officeDocument/2006/relationships" xmlns:p="http://schemas.openxmlformats.org/presentationml/2006/main">
-  <p:cSld>
-    <p:spTree>
-      <p:nvGrpSpPr>
-        <p:cNvPr id="1" name=""/>
-        <p:cNvGrpSpPr/>
-        <p:nvPr/>
-      </p:nvGrpSpPr>
-      <p:grpSpPr>
-        <a:xfrm>
-          <a:off x="0" y="0"/>
-          <a:ext cx="0" cy="0"/>
-          <a:chOff x="0" y="0"/>
-          <a:chExt cx="0" cy="0"/>
-        </a:xfrm>
-      </p:grpSpPr>
-      <p:sp>
-        <p:nvSpPr>
-          <p:cNvPr id="2" name="TextBox 1">
-            <a:extLst>
-              <a:ext uri="{FF2B5EF4-FFF2-40B4-BE49-F238E27FC236}">
-                <a16:creationId xmlns:a16="http://schemas.microsoft.com/office/drawing/2014/main" id="{4E211E7D-D05C-2949-8500-D32AA9DBA052}"/>
-              </a:ext>
-            </a:extLst>
-          </p:cNvPr>
-          <p:cNvSpPr txBox="1"/>
-          <p:nvPr/>
-        </p:nvSpPr>
-        <p:spPr>
-          <a:xfrm>
-            <a:off x="5949696" y="4120896"/>
-            <a:ext cx="667812" cy="369332"/>
-          </a:xfrm>
-          <a:prstGeom prst="rect">
-            <a:avLst/>
-          </a:prstGeom>
-          <a:noFill/>
-        </p:spPr>
-        <p:txBody>
-          <a:bodyPr wrap="none" rtlCol="0">
-            <a:spAutoFit/>
-          </a:bodyPr>
-          <a:lstStyle/>
-          <a:p>
-            <a:r>
-              <a:rPr lang="en-US" dirty="0"/>
-              <a:t>Keith</a:t>
-            </a:r>
-          </a:p>
-        </p:txBody>
-      </p:sp>
-    </p:spTree>
-    <p:extLst>
-      <p:ext uri="{BB962C8B-B14F-4D97-AF65-F5344CB8AC3E}">
-        <p14:creationId xmlns:p14="http://schemas.microsoft.com/office/powerpoint/2010/main" val="138934033"/>
-      </p:ext>
-    </p:extLst>
-  </p:cSld>
-  <p:clrMapOvr>
-    <a:masterClrMapping/>
-  </p:clrMapOvr>
-</p:sld>
-</file>
-
-<file path=ppt/slides/slide18.xml><?xml version="1.0" encoding="utf-8"?>
-<p:sld xmlns:a="http://schemas.openxmlformats.org/drawingml/2006/main" xmlns:r="http://schemas.openxmlformats.org/officeDocument/2006/relationships" xmlns:p="http://schemas.openxmlformats.org/presentationml/2006/main">
-  <p:cSld>
-    <p:spTree>
-      <p:nvGrpSpPr>
-        <p:cNvPr id="1" name=""/>
-        <p:cNvGrpSpPr/>
-        <p:nvPr/>
-      </p:nvGrpSpPr>
-      <p:grpSpPr>
-        <a:xfrm>
-          <a:off x="0" y="0"/>
-          <a:ext cx="0" cy="0"/>
-          <a:chOff x="0" y="0"/>
-          <a:chExt cx="0" cy="0"/>
-        </a:xfrm>
-      </p:grpSpPr>
-      <p:sp>
-        <p:nvSpPr>
-          <p:cNvPr id="2" name="TextBox 1">
-            <a:extLst>
-              <a:ext uri="{FF2B5EF4-FFF2-40B4-BE49-F238E27FC236}">
-                <a16:creationId xmlns:a16="http://schemas.microsoft.com/office/drawing/2014/main" id="{4E211E7D-D05C-2949-8500-D32AA9DBA052}"/>
-              </a:ext>
-            </a:extLst>
-          </p:cNvPr>
-          <p:cNvSpPr txBox="1"/>
-          <p:nvPr/>
-        </p:nvSpPr>
-        <p:spPr>
-          <a:xfrm>
-            <a:off x="5949696" y="4120896"/>
-            <a:ext cx="667812" cy="369332"/>
-          </a:xfrm>
-          <a:prstGeom prst="rect">
-            <a:avLst/>
-          </a:prstGeom>
-          <a:noFill/>
-        </p:spPr>
-        <p:txBody>
-          <a:bodyPr wrap="none" rtlCol="0">
-            <a:spAutoFit/>
-          </a:bodyPr>
-          <a:lstStyle/>
-          <a:p>
-            <a:r>
-              <a:rPr lang="en-US" dirty="0"/>
-              <a:t>Keith</a:t>
-            </a:r>
-          </a:p>
-        </p:txBody>
-      </p:sp>
-    </p:spTree>
-    <p:extLst>
-      <p:ext uri="{BB962C8B-B14F-4D97-AF65-F5344CB8AC3E}">
-        <p14:creationId xmlns:p14="http://schemas.microsoft.com/office/powerpoint/2010/main" val="2530317220"/>
-      </p:ext>
-    </p:extLst>
-  </p:cSld>
-  <p:clrMapOvr>
-    <a:masterClrMapping/>
-  </p:clrMapOvr>
-</p:sld>
-</file>
-
-<file path=ppt/slides/slide19.xml><?xml version="1.0" encoding="utf-8"?>
-<p:sld xmlns:a="http://schemas.openxmlformats.org/drawingml/2006/main" xmlns:r="http://schemas.openxmlformats.org/officeDocument/2006/relationships" xmlns:p="http://schemas.openxmlformats.org/presentationml/2006/main">
-  <p:cSld>
-    <p:spTree>
-      <p:nvGrpSpPr>
-        <p:cNvPr id="1" name=""/>
-        <p:cNvGrpSpPr/>
-        <p:nvPr/>
-      </p:nvGrpSpPr>
-      <p:grpSpPr>
-        <a:xfrm>
-          <a:off x="0" y="0"/>
-          <a:ext cx="0" cy="0"/>
-          <a:chOff x="0" y="0"/>
-          <a:chExt cx="0" cy="0"/>
-        </a:xfrm>
-      </p:grpSpPr>
-      <p:sp>
-        <p:nvSpPr>
-          <p:cNvPr id="2" name="TextBox 1">
-            <a:extLst>
-              <a:ext uri="{FF2B5EF4-FFF2-40B4-BE49-F238E27FC236}">
-                <a16:creationId xmlns:a16="http://schemas.microsoft.com/office/drawing/2014/main" id="{4D05C971-D981-664C-A746-65DFB8DF78C0}"/>
-              </a:ext>
-            </a:extLst>
-          </p:cNvPr>
-          <p:cNvSpPr txBox="1"/>
-          <p:nvPr/>
-        </p:nvSpPr>
-        <p:spPr>
-          <a:xfrm>
-            <a:off x="3608832" y="3840480"/>
-            <a:ext cx="332142" cy="369332"/>
-          </a:xfrm>
-          <a:prstGeom prst="rect">
-            <a:avLst/>
-          </a:prstGeom>
-          <a:noFill/>
-        </p:spPr>
-        <p:txBody>
-          <a:bodyPr wrap="none" rtlCol="0">
-            <a:spAutoFit/>
-          </a:bodyPr>
-          <a:lstStyle/>
-          <a:p>
-            <a:r>
-              <a:rPr lang="en-US" dirty="0"/>
-              <a:t>JJ</a:t>
-            </a:r>
-          </a:p>
-        </p:txBody>
-      </p:sp>
-    </p:spTree>
-    <p:extLst>
-      <p:ext uri="{BB962C8B-B14F-4D97-AF65-F5344CB8AC3E}">
-        <p14:creationId xmlns:p14="http://schemas.microsoft.com/office/powerpoint/2010/main" val="2442966721"/>
-      </p:ext>
-    </p:extLst>
-  </p:cSld>
-  <p:clrMapOvr>
-    <a:masterClrMapping/>
-  </p:clrMapOvr>
-</p:sld>
-</file>
-
 <file path=ppt/slides/slide2.xml><?xml version="1.0" encoding="utf-8"?>
 <p:sld xmlns:a="http://schemas.openxmlformats.org/drawingml/2006/main" xmlns:r="http://schemas.openxmlformats.org/officeDocument/2006/relationships" xmlns:p="http://schemas.openxmlformats.org/presentationml/2006/main">
   <p:cSld>
@@ -7435,331 +6761,6 @@
     <p:extLst>
       <p:ext uri="{BB962C8B-B14F-4D97-AF65-F5344CB8AC3E}">
         <p14:creationId xmlns:p14="http://schemas.microsoft.com/office/powerpoint/2010/main" val="3376861716"/>
-      </p:ext>
-    </p:extLst>
-  </p:cSld>
-  <p:clrMapOvr>
-    <a:masterClrMapping/>
-  </p:clrMapOvr>
-</p:sld>
-</file>
-
-<file path=ppt/slides/slide20.xml><?xml version="1.0" encoding="utf-8"?>
-<p:sld xmlns:a="http://schemas.openxmlformats.org/drawingml/2006/main" xmlns:r="http://schemas.openxmlformats.org/officeDocument/2006/relationships" xmlns:p="http://schemas.openxmlformats.org/presentationml/2006/main">
-  <p:cSld>
-    <p:spTree>
-      <p:nvGrpSpPr>
-        <p:cNvPr id="1" name=""/>
-        <p:cNvGrpSpPr/>
-        <p:nvPr/>
-      </p:nvGrpSpPr>
-      <p:grpSpPr>
-        <a:xfrm>
-          <a:off x="0" y="0"/>
-          <a:ext cx="0" cy="0"/>
-          <a:chOff x="0" y="0"/>
-          <a:chExt cx="0" cy="0"/>
-        </a:xfrm>
-      </p:grpSpPr>
-      <p:sp>
-        <p:nvSpPr>
-          <p:cNvPr id="2" name="TextBox 1">
-            <a:extLst>
-              <a:ext uri="{FF2B5EF4-FFF2-40B4-BE49-F238E27FC236}">
-                <a16:creationId xmlns:a16="http://schemas.microsoft.com/office/drawing/2014/main" id="{4D05C971-D981-664C-A746-65DFB8DF78C0}"/>
-              </a:ext>
-            </a:extLst>
-          </p:cNvPr>
-          <p:cNvSpPr txBox="1"/>
-          <p:nvPr/>
-        </p:nvSpPr>
-        <p:spPr>
-          <a:xfrm>
-            <a:off x="3608832" y="3840480"/>
-            <a:ext cx="332142" cy="369332"/>
-          </a:xfrm>
-          <a:prstGeom prst="rect">
-            <a:avLst/>
-          </a:prstGeom>
-          <a:noFill/>
-        </p:spPr>
-        <p:txBody>
-          <a:bodyPr wrap="none" rtlCol="0">
-            <a:spAutoFit/>
-          </a:bodyPr>
-          <a:lstStyle/>
-          <a:p>
-            <a:r>
-              <a:rPr lang="en-US" dirty="0"/>
-              <a:t>JJ</a:t>
-            </a:r>
-          </a:p>
-        </p:txBody>
-      </p:sp>
-    </p:spTree>
-    <p:extLst>
-      <p:ext uri="{BB962C8B-B14F-4D97-AF65-F5344CB8AC3E}">
-        <p14:creationId xmlns:p14="http://schemas.microsoft.com/office/powerpoint/2010/main" val="39349434"/>
-      </p:ext>
-    </p:extLst>
-  </p:cSld>
-  <p:clrMapOvr>
-    <a:masterClrMapping/>
-  </p:clrMapOvr>
-</p:sld>
-</file>
-
-<file path=ppt/slides/slide21.xml><?xml version="1.0" encoding="utf-8"?>
-<p:sld xmlns:a="http://schemas.openxmlformats.org/drawingml/2006/main" xmlns:r="http://schemas.openxmlformats.org/officeDocument/2006/relationships" xmlns:p="http://schemas.openxmlformats.org/presentationml/2006/main">
-  <p:cSld>
-    <p:spTree>
-      <p:nvGrpSpPr>
-        <p:cNvPr id="1" name=""/>
-        <p:cNvGrpSpPr/>
-        <p:nvPr/>
-      </p:nvGrpSpPr>
-      <p:grpSpPr>
-        <a:xfrm>
-          <a:off x="0" y="0"/>
-          <a:ext cx="0" cy="0"/>
-          <a:chOff x="0" y="0"/>
-          <a:chExt cx="0" cy="0"/>
-        </a:xfrm>
-      </p:grpSpPr>
-      <p:sp>
-        <p:nvSpPr>
-          <p:cNvPr id="2" name="TextBox 1">
-            <a:extLst>
-              <a:ext uri="{FF2B5EF4-FFF2-40B4-BE49-F238E27FC236}">
-                <a16:creationId xmlns:a16="http://schemas.microsoft.com/office/drawing/2014/main" id="{4D05C971-D981-664C-A746-65DFB8DF78C0}"/>
-              </a:ext>
-            </a:extLst>
-          </p:cNvPr>
-          <p:cNvSpPr txBox="1"/>
-          <p:nvPr/>
-        </p:nvSpPr>
-        <p:spPr>
-          <a:xfrm>
-            <a:off x="3608832" y="3840480"/>
-            <a:ext cx="332142" cy="369332"/>
-          </a:xfrm>
-          <a:prstGeom prst="rect">
-            <a:avLst/>
-          </a:prstGeom>
-          <a:noFill/>
-        </p:spPr>
-        <p:txBody>
-          <a:bodyPr wrap="none" rtlCol="0">
-            <a:spAutoFit/>
-          </a:bodyPr>
-          <a:lstStyle/>
-          <a:p>
-            <a:r>
-              <a:rPr lang="en-US" dirty="0"/>
-              <a:t>JJ</a:t>
-            </a:r>
-          </a:p>
-        </p:txBody>
-      </p:sp>
-    </p:spTree>
-    <p:extLst>
-      <p:ext uri="{BB962C8B-B14F-4D97-AF65-F5344CB8AC3E}">
-        <p14:creationId xmlns:p14="http://schemas.microsoft.com/office/powerpoint/2010/main" val="772333017"/>
-      </p:ext>
-    </p:extLst>
-  </p:cSld>
-  <p:clrMapOvr>
-    <a:masterClrMapping/>
-  </p:clrMapOvr>
-</p:sld>
-</file>
-
-<file path=ppt/slides/slide22.xml><?xml version="1.0" encoding="utf-8"?>
-<p:sld xmlns:a="http://schemas.openxmlformats.org/drawingml/2006/main" xmlns:r="http://schemas.openxmlformats.org/officeDocument/2006/relationships" xmlns:p="http://schemas.openxmlformats.org/presentationml/2006/main">
-  <p:cSld>
-    <p:spTree>
-      <p:nvGrpSpPr>
-        <p:cNvPr id="1" name=""/>
-        <p:cNvGrpSpPr/>
-        <p:nvPr/>
-      </p:nvGrpSpPr>
-      <p:grpSpPr>
-        <a:xfrm>
-          <a:off x="0" y="0"/>
-          <a:ext cx="0" cy="0"/>
-          <a:chOff x="0" y="0"/>
-          <a:chExt cx="0" cy="0"/>
-        </a:xfrm>
-      </p:grpSpPr>
-      <p:sp>
-        <p:nvSpPr>
-          <p:cNvPr id="2" name="TextBox 1">
-            <a:extLst>
-              <a:ext uri="{FF2B5EF4-FFF2-40B4-BE49-F238E27FC236}">
-                <a16:creationId xmlns:a16="http://schemas.microsoft.com/office/drawing/2014/main" id="{4D05C971-D981-664C-A746-65DFB8DF78C0}"/>
-              </a:ext>
-            </a:extLst>
-          </p:cNvPr>
-          <p:cNvSpPr txBox="1"/>
-          <p:nvPr/>
-        </p:nvSpPr>
-        <p:spPr>
-          <a:xfrm>
-            <a:off x="3608832" y="3840480"/>
-            <a:ext cx="332142" cy="369332"/>
-          </a:xfrm>
-          <a:prstGeom prst="rect">
-            <a:avLst/>
-          </a:prstGeom>
-          <a:noFill/>
-        </p:spPr>
-        <p:txBody>
-          <a:bodyPr wrap="none" rtlCol="0">
-            <a:spAutoFit/>
-          </a:bodyPr>
-          <a:lstStyle/>
-          <a:p>
-            <a:r>
-              <a:rPr lang="en-US" dirty="0"/>
-              <a:t>JJ</a:t>
-            </a:r>
-          </a:p>
-        </p:txBody>
-      </p:sp>
-    </p:spTree>
-    <p:extLst>
-      <p:ext uri="{BB962C8B-B14F-4D97-AF65-F5344CB8AC3E}">
-        <p14:creationId xmlns:p14="http://schemas.microsoft.com/office/powerpoint/2010/main" val="3702046556"/>
-      </p:ext>
-    </p:extLst>
-  </p:cSld>
-  <p:clrMapOvr>
-    <a:masterClrMapping/>
-  </p:clrMapOvr>
-</p:sld>
-</file>
-
-<file path=ppt/slides/slide23.xml><?xml version="1.0" encoding="utf-8"?>
-<p:sld xmlns:a="http://schemas.openxmlformats.org/drawingml/2006/main" xmlns:r="http://schemas.openxmlformats.org/officeDocument/2006/relationships" xmlns:p="http://schemas.openxmlformats.org/presentationml/2006/main">
-  <p:cSld>
-    <p:spTree>
-      <p:nvGrpSpPr>
-        <p:cNvPr id="1" name=""/>
-        <p:cNvGrpSpPr/>
-        <p:nvPr/>
-      </p:nvGrpSpPr>
-      <p:grpSpPr>
-        <a:xfrm>
-          <a:off x="0" y="0"/>
-          <a:ext cx="0" cy="0"/>
-          <a:chOff x="0" y="0"/>
-          <a:chExt cx="0" cy="0"/>
-        </a:xfrm>
-      </p:grpSpPr>
-      <p:sp>
-        <p:nvSpPr>
-          <p:cNvPr id="2" name="TextBox 1">
-            <a:extLst>
-              <a:ext uri="{FF2B5EF4-FFF2-40B4-BE49-F238E27FC236}">
-                <a16:creationId xmlns:a16="http://schemas.microsoft.com/office/drawing/2014/main" id="{4D05C971-D981-664C-A746-65DFB8DF78C0}"/>
-              </a:ext>
-            </a:extLst>
-          </p:cNvPr>
-          <p:cNvSpPr txBox="1"/>
-          <p:nvPr/>
-        </p:nvSpPr>
-        <p:spPr>
-          <a:xfrm>
-            <a:off x="3608832" y="3840480"/>
-            <a:ext cx="332142" cy="369332"/>
-          </a:xfrm>
-          <a:prstGeom prst="rect">
-            <a:avLst/>
-          </a:prstGeom>
-          <a:noFill/>
-        </p:spPr>
-        <p:txBody>
-          <a:bodyPr wrap="none" rtlCol="0">
-            <a:spAutoFit/>
-          </a:bodyPr>
-          <a:lstStyle/>
-          <a:p>
-            <a:r>
-              <a:rPr lang="en-US" dirty="0"/>
-              <a:t>JJ</a:t>
-            </a:r>
-          </a:p>
-        </p:txBody>
-      </p:sp>
-    </p:spTree>
-    <p:extLst>
-      <p:ext uri="{BB962C8B-B14F-4D97-AF65-F5344CB8AC3E}">
-        <p14:creationId xmlns:p14="http://schemas.microsoft.com/office/powerpoint/2010/main" val="1647318354"/>
-      </p:ext>
-    </p:extLst>
-  </p:cSld>
-  <p:clrMapOvr>
-    <a:masterClrMapping/>
-  </p:clrMapOvr>
-</p:sld>
-</file>
-
-<file path=ppt/slides/slide24.xml><?xml version="1.0" encoding="utf-8"?>
-<p:sld xmlns:a="http://schemas.openxmlformats.org/drawingml/2006/main" xmlns:r="http://schemas.openxmlformats.org/officeDocument/2006/relationships" xmlns:p="http://schemas.openxmlformats.org/presentationml/2006/main">
-  <p:cSld>
-    <p:spTree>
-      <p:nvGrpSpPr>
-        <p:cNvPr id="1" name=""/>
-        <p:cNvGrpSpPr/>
-        <p:nvPr/>
-      </p:nvGrpSpPr>
-      <p:grpSpPr>
-        <a:xfrm>
-          <a:off x="0" y="0"/>
-          <a:ext cx="0" cy="0"/>
-          <a:chOff x="0" y="0"/>
-          <a:chExt cx="0" cy="0"/>
-        </a:xfrm>
-      </p:grpSpPr>
-      <p:sp>
-        <p:nvSpPr>
-          <p:cNvPr id="2" name="TextBox 1">
-            <a:extLst>
-              <a:ext uri="{FF2B5EF4-FFF2-40B4-BE49-F238E27FC236}">
-                <a16:creationId xmlns:a16="http://schemas.microsoft.com/office/drawing/2014/main" id="{4D05C971-D981-664C-A746-65DFB8DF78C0}"/>
-              </a:ext>
-            </a:extLst>
-          </p:cNvPr>
-          <p:cNvSpPr txBox="1"/>
-          <p:nvPr/>
-        </p:nvSpPr>
-        <p:spPr>
-          <a:xfrm>
-            <a:off x="3608832" y="3840480"/>
-            <a:ext cx="332142" cy="369332"/>
-          </a:xfrm>
-          <a:prstGeom prst="rect">
-            <a:avLst/>
-          </a:prstGeom>
-          <a:noFill/>
-        </p:spPr>
-        <p:txBody>
-          <a:bodyPr wrap="none" rtlCol="0">
-            <a:spAutoFit/>
-          </a:bodyPr>
-          <a:lstStyle/>
-          <a:p>
-            <a:r>
-              <a:rPr lang="en-US" dirty="0"/>
-              <a:t>JJ</a:t>
-            </a:r>
-          </a:p>
-        </p:txBody>
-      </p:sp>
-    </p:spTree>
-    <p:extLst>
-      <p:ext uri="{BB962C8B-B14F-4D97-AF65-F5344CB8AC3E}">
-        <p14:creationId xmlns:p14="http://schemas.microsoft.com/office/powerpoint/2010/main" val="2559683323"/>
       </p:ext>
     </p:extLst>
   </p:cSld>
@@ -10504,332 +9505,6 @@
     <p:extLst>
       <p:ext uri="{BB962C8B-B14F-4D97-AF65-F5344CB8AC3E}">
         <p14:creationId xmlns:p14="http://schemas.microsoft.com/office/powerpoint/2010/main" val="2619388383"/>
-      </p:ext>
-    </p:extLst>
-  </p:cSld>
-  <p:clrMapOvr>
-    <a:masterClrMapping/>
-  </p:clrMapOvr>
-</p:sld>
-</file>
-
-<file path=ppt/slides/slide5.xml><?xml version="1.0" encoding="utf-8"?>
-<p:sld xmlns:a="http://schemas.openxmlformats.org/drawingml/2006/main" xmlns:r="http://schemas.openxmlformats.org/officeDocument/2006/relationships" xmlns:p="http://schemas.openxmlformats.org/presentationml/2006/main">
-  <p:cSld>
-    <p:spTree>
-      <p:nvGrpSpPr>
-        <p:cNvPr id="1" name=""/>
-        <p:cNvGrpSpPr/>
-        <p:nvPr/>
-      </p:nvGrpSpPr>
-      <p:grpSpPr>
-        <a:xfrm>
-          <a:off x="0" y="0"/>
-          <a:ext cx="0" cy="0"/>
-          <a:chOff x="0" y="0"/>
-          <a:chExt cx="0" cy="0"/>
-        </a:xfrm>
-      </p:grpSpPr>
-      <p:sp>
-        <p:nvSpPr>
-          <p:cNvPr id="2" name="TextBox 1">
-            <a:extLst>
-              <a:ext uri="{FF2B5EF4-FFF2-40B4-BE49-F238E27FC236}">
-                <a16:creationId xmlns:a16="http://schemas.microsoft.com/office/drawing/2014/main" id="{11B5617C-AC77-ED43-B27A-A9454742C897}"/>
-              </a:ext>
-            </a:extLst>
-          </p:cNvPr>
-          <p:cNvSpPr txBox="1"/>
-          <p:nvPr/>
-        </p:nvSpPr>
-        <p:spPr>
-          <a:xfrm>
-            <a:off x="3681984" y="1267968"/>
-            <a:ext cx="659155" cy="369332"/>
-          </a:xfrm>
-          <a:prstGeom prst="rect">
-            <a:avLst/>
-          </a:prstGeom>
-          <a:noFill/>
-        </p:spPr>
-        <p:txBody>
-          <a:bodyPr wrap="none" rtlCol="0">
-            <a:spAutoFit/>
-          </a:bodyPr>
-          <a:lstStyle/>
-          <a:p>
-            <a:r>
-              <a:rPr lang="en-US" dirty="0"/>
-              <a:t>NICH</a:t>
-            </a:r>
-          </a:p>
-        </p:txBody>
-      </p:sp>
-    </p:spTree>
-    <p:extLst>
-      <p:ext uri="{BB962C8B-B14F-4D97-AF65-F5344CB8AC3E}">
-        <p14:creationId xmlns:p14="http://schemas.microsoft.com/office/powerpoint/2010/main" val="1681074217"/>
-      </p:ext>
-    </p:extLst>
-  </p:cSld>
-  <p:clrMapOvr>
-    <a:masterClrMapping/>
-  </p:clrMapOvr>
-</p:sld>
-</file>
-
-<file path=ppt/slides/slide6.xml><?xml version="1.0" encoding="utf-8"?>
-<p:sld xmlns:a="http://schemas.openxmlformats.org/drawingml/2006/main" xmlns:r="http://schemas.openxmlformats.org/officeDocument/2006/relationships" xmlns:p="http://schemas.openxmlformats.org/presentationml/2006/main">
-  <p:cSld>
-    <p:spTree>
-      <p:nvGrpSpPr>
-        <p:cNvPr id="1" name=""/>
-        <p:cNvGrpSpPr/>
-        <p:nvPr/>
-      </p:nvGrpSpPr>
-      <p:grpSpPr>
-        <a:xfrm>
-          <a:off x="0" y="0"/>
-          <a:ext cx="0" cy="0"/>
-          <a:chOff x="0" y="0"/>
-          <a:chExt cx="0" cy="0"/>
-        </a:xfrm>
-      </p:grpSpPr>
-      <p:sp>
-        <p:nvSpPr>
-          <p:cNvPr id="2" name="TextBox 1">
-            <a:extLst>
-              <a:ext uri="{FF2B5EF4-FFF2-40B4-BE49-F238E27FC236}">
-                <a16:creationId xmlns:a16="http://schemas.microsoft.com/office/drawing/2014/main" id="{11B5617C-AC77-ED43-B27A-A9454742C897}"/>
-              </a:ext>
-            </a:extLst>
-          </p:cNvPr>
-          <p:cNvSpPr txBox="1"/>
-          <p:nvPr/>
-        </p:nvSpPr>
-        <p:spPr>
-          <a:xfrm>
-            <a:off x="3681984" y="1267968"/>
-            <a:ext cx="659155" cy="369332"/>
-          </a:xfrm>
-          <a:prstGeom prst="rect">
-            <a:avLst/>
-          </a:prstGeom>
-          <a:noFill/>
-        </p:spPr>
-        <p:txBody>
-          <a:bodyPr wrap="none" rtlCol="0">
-            <a:spAutoFit/>
-          </a:bodyPr>
-          <a:lstStyle/>
-          <a:p>
-            <a:r>
-              <a:rPr lang="en-US" dirty="0"/>
-              <a:t>NICH</a:t>
-            </a:r>
-          </a:p>
-        </p:txBody>
-      </p:sp>
-    </p:spTree>
-    <p:extLst>
-      <p:ext uri="{BB962C8B-B14F-4D97-AF65-F5344CB8AC3E}">
-        <p14:creationId xmlns:p14="http://schemas.microsoft.com/office/powerpoint/2010/main" val="4194871880"/>
-      </p:ext>
-    </p:extLst>
-  </p:cSld>
-  <p:clrMapOvr>
-    <a:masterClrMapping/>
-  </p:clrMapOvr>
-</p:sld>
-</file>
-
-<file path=ppt/slides/slide7.xml><?xml version="1.0" encoding="utf-8"?>
-<p:sld xmlns:a="http://schemas.openxmlformats.org/drawingml/2006/main" xmlns:r="http://schemas.openxmlformats.org/officeDocument/2006/relationships" xmlns:p="http://schemas.openxmlformats.org/presentationml/2006/main">
-  <p:cSld>
-    <p:spTree>
-      <p:nvGrpSpPr>
-        <p:cNvPr id="1" name=""/>
-        <p:cNvGrpSpPr/>
-        <p:nvPr/>
-      </p:nvGrpSpPr>
-      <p:grpSpPr>
-        <a:xfrm>
-          <a:off x="0" y="0"/>
-          <a:ext cx="0" cy="0"/>
-          <a:chOff x="0" y="0"/>
-          <a:chExt cx="0" cy="0"/>
-        </a:xfrm>
-      </p:grpSpPr>
-      <p:sp>
-        <p:nvSpPr>
-          <p:cNvPr id="2" name="TextBox 1">
-            <a:extLst>
-              <a:ext uri="{FF2B5EF4-FFF2-40B4-BE49-F238E27FC236}">
-                <a16:creationId xmlns:a16="http://schemas.microsoft.com/office/drawing/2014/main" id="{11B5617C-AC77-ED43-B27A-A9454742C897}"/>
-              </a:ext>
-            </a:extLst>
-          </p:cNvPr>
-          <p:cNvSpPr txBox="1"/>
-          <p:nvPr/>
-        </p:nvSpPr>
-        <p:spPr>
-          <a:xfrm>
-            <a:off x="3681984" y="1267968"/>
-            <a:ext cx="659155" cy="369332"/>
-          </a:xfrm>
-          <a:prstGeom prst="rect">
-            <a:avLst/>
-          </a:prstGeom>
-          <a:noFill/>
-        </p:spPr>
-        <p:txBody>
-          <a:bodyPr wrap="none" rtlCol="0">
-            <a:spAutoFit/>
-          </a:bodyPr>
-          <a:lstStyle/>
-          <a:p>
-            <a:r>
-              <a:rPr lang="en-US" dirty="0"/>
-              <a:t>NICH</a:t>
-            </a:r>
-          </a:p>
-        </p:txBody>
-      </p:sp>
-    </p:spTree>
-    <p:extLst>
-      <p:ext uri="{BB962C8B-B14F-4D97-AF65-F5344CB8AC3E}">
-        <p14:creationId xmlns:p14="http://schemas.microsoft.com/office/powerpoint/2010/main" val="3534876607"/>
-      </p:ext>
-    </p:extLst>
-  </p:cSld>
-  <p:clrMapOvr>
-    <a:masterClrMapping/>
-  </p:clrMapOvr>
-</p:sld>
-</file>
-
-<file path=ppt/slides/slide8.xml><?xml version="1.0" encoding="utf-8"?>
-<p:sld xmlns:a="http://schemas.openxmlformats.org/drawingml/2006/main" xmlns:r="http://schemas.openxmlformats.org/officeDocument/2006/relationships" xmlns:p="http://schemas.openxmlformats.org/presentationml/2006/main">
-  <p:cSld>
-    <p:spTree>
-      <p:nvGrpSpPr>
-        <p:cNvPr id="1" name=""/>
-        <p:cNvGrpSpPr/>
-        <p:nvPr/>
-      </p:nvGrpSpPr>
-      <p:grpSpPr>
-        <a:xfrm>
-          <a:off x="0" y="0"/>
-          <a:ext cx="0" cy="0"/>
-          <a:chOff x="0" y="0"/>
-          <a:chExt cx="0" cy="0"/>
-        </a:xfrm>
-      </p:grpSpPr>
-      <p:sp>
-        <p:nvSpPr>
-          <p:cNvPr id="2" name="TextBox 1">
-            <a:extLst>
-              <a:ext uri="{FF2B5EF4-FFF2-40B4-BE49-F238E27FC236}">
-                <a16:creationId xmlns:a16="http://schemas.microsoft.com/office/drawing/2014/main" id="{11B5617C-AC77-ED43-B27A-A9454742C897}"/>
-              </a:ext>
-            </a:extLst>
-          </p:cNvPr>
-          <p:cNvSpPr txBox="1"/>
-          <p:nvPr/>
-        </p:nvSpPr>
-        <p:spPr>
-          <a:xfrm>
-            <a:off x="3681984" y="1267968"/>
-            <a:ext cx="659155" cy="369332"/>
-          </a:xfrm>
-          <a:prstGeom prst="rect">
-            <a:avLst/>
-          </a:prstGeom>
-          <a:noFill/>
-        </p:spPr>
-        <p:txBody>
-          <a:bodyPr wrap="none" rtlCol="0">
-            <a:spAutoFit/>
-          </a:bodyPr>
-          <a:lstStyle/>
-          <a:p>
-            <a:r>
-              <a:rPr lang="en-US" dirty="0"/>
-              <a:t>NICH</a:t>
-            </a:r>
-          </a:p>
-        </p:txBody>
-      </p:sp>
-    </p:spTree>
-    <p:extLst>
-      <p:ext uri="{BB962C8B-B14F-4D97-AF65-F5344CB8AC3E}">
-        <p14:creationId xmlns:p14="http://schemas.microsoft.com/office/powerpoint/2010/main" val="1075803884"/>
-      </p:ext>
-    </p:extLst>
-  </p:cSld>
-  <p:clrMapOvr>
-    <a:masterClrMapping/>
-  </p:clrMapOvr>
-</p:sld>
-</file>
-
-<file path=ppt/slides/slide9.xml><?xml version="1.0" encoding="utf-8"?>
-<p:sld xmlns:a="http://schemas.openxmlformats.org/drawingml/2006/main" xmlns:r="http://schemas.openxmlformats.org/officeDocument/2006/relationships" xmlns:p="http://schemas.openxmlformats.org/presentationml/2006/main">
-  <p:cSld>
-    <p:spTree>
-      <p:nvGrpSpPr>
-        <p:cNvPr id="1" name=""/>
-        <p:cNvGrpSpPr/>
-        <p:nvPr/>
-      </p:nvGrpSpPr>
-      <p:grpSpPr>
-        <a:xfrm>
-          <a:off x="0" y="0"/>
-          <a:ext cx="0" cy="0"/>
-          <a:chOff x="0" y="0"/>
-          <a:chExt cx="0" cy="0"/>
-        </a:xfrm>
-      </p:grpSpPr>
-      <p:sp>
-        <p:nvSpPr>
-          <p:cNvPr id="2" name="TextBox 1">
-            <a:extLst>
-              <a:ext uri="{FF2B5EF4-FFF2-40B4-BE49-F238E27FC236}">
-                <a16:creationId xmlns:a16="http://schemas.microsoft.com/office/drawing/2014/main" id="{F298CF04-C313-E24A-A52B-837593E940AF}"/>
-              </a:ext>
-            </a:extLst>
-          </p:cNvPr>
-          <p:cNvSpPr txBox="1"/>
-          <p:nvPr/>
-        </p:nvSpPr>
-        <p:spPr>
-          <a:xfrm>
-            <a:off x="5693664" y="2682240"/>
-            <a:ext cx="514885" cy="369332"/>
-          </a:xfrm>
-          <a:prstGeom prst="rect">
-            <a:avLst/>
-          </a:prstGeom>
-          <a:noFill/>
-        </p:spPr>
-        <p:txBody>
-          <a:bodyPr wrap="none" rtlCol="0">
-            <a:spAutoFit/>
-          </a:bodyPr>
-          <a:lstStyle/>
-          <a:p>
-            <a:r>
-              <a:rPr lang="en-US" dirty="0" err="1"/>
-              <a:t>Xiyi</a:t>
-            </a:r>
-            <a:endParaRPr lang="en-US" dirty="0"/>
-          </a:p>
-        </p:txBody>
-      </p:sp>
-    </p:spTree>
-    <p:extLst>
-      <p:ext uri="{BB962C8B-B14F-4D97-AF65-F5344CB8AC3E}">
-        <p14:creationId xmlns:p14="http://schemas.microsoft.com/office/powerpoint/2010/main" val="3256526287"/>
       </p:ext>
     </p:extLst>
   </p:cSld>

</xml_diff>

<commit_message>
edited Diagrams for UI and Login class diagrams remove unneccessary lines in login class
</commit_message>
<xml_diff>
--- a/docs/Diagrams.pptx
+++ b/docs/Diagrams.pptx
@@ -5,14 +5,33 @@
     <p:sldMasterId id="2147483648" r:id="rId1"/>
   </p:sldMasterIdLst>
   <p:notesMasterIdLst>
-    <p:notesMasterId r:id="rId7"/>
+    <p:notesMasterId r:id="rId26"/>
   </p:notesMasterIdLst>
   <p:sldIdLst>
     <p:sldId id="256" r:id="rId2"/>
     <p:sldId id="257" r:id="rId3"/>
     <p:sldId id="259" r:id="rId4"/>
     <p:sldId id="258" r:id="rId5"/>
-    <p:sldId id="271" r:id="rId6"/>
+    <p:sldId id="260" r:id="rId6"/>
+    <p:sldId id="276" r:id="rId7"/>
+    <p:sldId id="277" r:id="rId8"/>
+    <p:sldId id="278" r:id="rId9"/>
+    <p:sldId id="261" r:id="rId10"/>
+    <p:sldId id="279" r:id="rId11"/>
+    <p:sldId id="280" r:id="rId12"/>
+    <p:sldId id="281" r:id="rId13"/>
+    <p:sldId id="282" r:id="rId14"/>
+    <p:sldId id="262" r:id="rId15"/>
+    <p:sldId id="283" r:id="rId16"/>
+    <p:sldId id="284" r:id="rId17"/>
+    <p:sldId id="285" r:id="rId18"/>
+    <p:sldId id="286" r:id="rId19"/>
+    <p:sldId id="263" r:id="rId20"/>
+    <p:sldId id="290" r:id="rId21"/>
+    <p:sldId id="291" r:id="rId22"/>
+    <p:sldId id="292" r:id="rId23"/>
+    <p:sldId id="293" r:id="rId24"/>
+    <p:sldId id="294" r:id="rId25"/>
   </p:sldIdLst>
   <p:sldSz cx="9144000" cy="6858000" type="screen4x3"/>
   <p:notesSz cx="6858000" cy="9144000"/>
@@ -212,7 +231,7 @@
           <a:p>
             <a:fld id="{F5CC4B3F-88C1-4FFA-B1B6-F41C21DC6924}" type="datetimeFigureOut">
               <a:rPr lang="en-US" smtClean="0"/>
-              <a:t>11-Nov-18</a:t>
+              <a:t>11/12/18</a:t>
             </a:fld>
             <a:endParaRPr lang="en-US"/>
           </a:p>
@@ -742,7 +761,7 @@
           <a:p>
             <a:fld id="{78C97017-6FC3-485B-9764-EAC9E56C1D49}" type="datetimeFigureOut">
               <a:rPr lang="en-US" smtClean="0"/>
-              <a:t>11-Nov-18</a:t>
+              <a:t>11/12/18</a:t>
             </a:fld>
             <a:endParaRPr lang="en-US"/>
           </a:p>
@@ -910,7 +929,7 @@
           <a:p>
             <a:fld id="{78C97017-6FC3-485B-9764-EAC9E56C1D49}" type="datetimeFigureOut">
               <a:rPr lang="en-US" smtClean="0"/>
-              <a:t>11-Nov-18</a:t>
+              <a:t>11/12/18</a:t>
             </a:fld>
             <a:endParaRPr lang="en-US"/>
           </a:p>
@@ -1088,7 +1107,7 @@
           <a:p>
             <a:fld id="{78C97017-6FC3-485B-9764-EAC9E56C1D49}" type="datetimeFigureOut">
               <a:rPr lang="en-US" smtClean="0"/>
-              <a:t>11-Nov-18</a:t>
+              <a:t>11/12/18</a:t>
             </a:fld>
             <a:endParaRPr lang="en-US"/>
           </a:p>
@@ -1256,7 +1275,7 @@
           <a:p>
             <a:fld id="{78C97017-6FC3-485B-9764-EAC9E56C1D49}" type="datetimeFigureOut">
               <a:rPr lang="en-US" smtClean="0"/>
-              <a:t>11-Nov-18</a:t>
+              <a:t>11/12/18</a:t>
             </a:fld>
             <a:endParaRPr lang="en-US"/>
           </a:p>
@@ -1501,7 +1520,7 @@
           <a:p>
             <a:fld id="{78C97017-6FC3-485B-9764-EAC9E56C1D49}" type="datetimeFigureOut">
               <a:rPr lang="en-US" smtClean="0"/>
-              <a:t>11-Nov-18</a:t>
+              <a:t>11/12/18</a:t>
             </a:fld>
             <a:endParaRPr lang="en-US"/>
           </a:p>
@@ -1786,7 +1805,7 @@
           <a:p>
             <a:fld id="{78C97017-6FC3-485B-9764-EAC9E56C1D49}" type="datetimeFigureOut">
               <a:rPr lang="en-US" smtClean="0"/>
-              <a:t>11-Nov-18</a:t>
+              <a:t>11/12/18</a:t>
             </a:fld>
             <a:endParaRPr lang="en-US"/>
           </a:p>
@@ -2205,7 +2224,7 @@
           <a:p>
             <a:fld id="{78C97017-6FC3-485B-9764-EAC9E56C1D49}" type="datetimeFigureOut">
               <a:rPr lang="en-US" smtClean="0"/>
-              <a:t>11-Nov-18</a:t>
+              <a:t>11/12/18</a:t>
             </a:fld>
             <a:endParaRPr lang="en-US"/>
           </a:p>
@@ -2322,7 +2341,7 @@
           <a:p>
             <a:fld id="{78C97017-6FC3-485B-9764-EAC9E56C1D49}" type="datetimeFigureOut">
               <a:rPr lang="en-US" smtClean="0"/>
-              <a:t>11-Nov-18</a:t>
+              <a:t>11/12/18</a:t>
             </a:fld>
             <a:endParaRPr lang="en-US"/>
           </a:p>
@@ -2417,7 +2436,7 @@
           <a:p>
             <a:fld id="{78C97017-6FC3-485B-9764-EAC9E56C1D49}" type="datetimeFigureOut">
               <a:rPr lang="en-US" smtClean="0"/>
-              <a:t>11-Nov-18</a:t>
+              <a:t>11/12/18</a:t>
             </a:fld>
             <a:endParaRPr lang="en-US"/>
           </a:p>
@@ -2692,7 +2711,7 @@
           <a:p>
             <a:fld id="{78C97017-6FC3-485B-9764-EAC9E56C1D49}" type="datetimeFigureOut">
               <a:rPr lang="en-US" smtClean="0"/>
-              <a:t>11-Nov-18</a:t>
+              <a:t>11/12/18</a:t>
             </a:fld>
             <a:endParaRPr lang="en-US"/>
           </a:p>
@@ -2944,7 +2963,7 @@
           <a:p>
             <a:fld id="{78C97017-6FC3-485B-9764-EAC9E56C1D49}" type="datetimeFigureOut">
               <a:rPr lang="en-US" smtClean="0"/>
-              <a:t>11-Nov-18</a:t>
+              <a:t>11/12/18</a:t>
             </a:fld>
             <a:endParaRPr lang="en-US"/>
           </a:p>
@@ -3155,7 +3174,7 @@
           <a:p>
             <a:fld id="{78C97017-6FC3-485B-9764-EAC9E56C1D49}" type="datetimeFigureOut">
               <a:rPr lang="en-US" smtClean="0"/>
-              <a:t>11-Nov-18</a:t>
+              <a:t>11/12/18</a:t>
             </a:fld>
             <a:endParaRPr lang="en-US"/>
           </a:p>
@@ -3596,6 +3615,1674 @@
 </p:sld>
 </file>
 
+<file path=ppt/slides/slide10.xml><?xml version="1.0" encoding="utf-8"?>
+<p:sld xmlns:a="http://schemas.openxmlformats.org/drawingml/2006/main" xmlns:r="http://schemas.openxmlformats.org/officeDocument/2006/relationships" xmlns:p="http://schemas.openxmlformats.org/presentationml/2006/main">
+  <p:cSld>
+    <p:spTree>
+      <p:nvGrpSpPr>
+        <p:cNvPr id="1" name=""/>
+        <p:cNvGrpSpPr/>
+        <p:nvPr/>
+      </p:nvGrpSpPr>
+      <p:grpSpPr>
+        <a:xfrm>
+          <a:off x="0" y="0"/>
+          <a:ext cx="0" cy="0"/>
+          <a:chOff x="0" y="0"/>
+          <a:chExt cx="0" cy="0"/>
+        </a:xfrm>
+      </p:grpSpPr>
+      <p:sp>
+        <p:nvSpPr>
+          <p:cNvPr id="2" name="TextBox 1">
+            <a:extLst>
+              <a:ext uri="{FF2B5EF4-FFF2-40B4-BE49-F238E27FC236}">
+                <a16:creationId xmlns:a16="http://schemas.microsoft.com/office/drawing/2014/main" id="{F298CF04-C313-E24A-A52B-837593E940AF}"/>
+              </a:ext>
+            </a:extLst>
+          </p:cNvPr>
+          <p:cNvSpPr txBox="1"/>
+          <p:nvPr/>
+        </p:nvSpPr>
+        <p:spPr>
+          <a:xfrm>
+            <a:off x="5693664" y="2682240"/>
+            <a:ext cx="514885" cy="369332"/>
+          </a:xfrm>
+          <a:prstGeom prst="rect">
+            <a:avLst/>
+          </a:prstGeom>
+          <a:noFill/>
+        </p:spPr>
+        <p:txBody>
+          <a:bodyPr wrap="none" rtlCol="0">
+            <a:spAutoFit/>
+          </a:bodyPr>
+          <a:lstStyle/>
+          <a:p>
+            <a:r>
+              <a:rPr lang="en-US" dirty="0" err="1"/>
+              <a:t>Xiyi</a:t>
+            </a:r>
+            <a:endParaRPr lang="en-US" dirty="0"/>
+          </a:p>
+        </p:txBody>
+      </p:sp>
+    </p:spTree>
+    <p:extLst>
+      <p:ext uri="{BB962C8B-B14F-4D97-AF65-F5344CB8AC3E}">
+        <p14:creationId xmlns:p14="http://schemas.microsoft.com/office/powerpoint/2010/main" val="1208679585"/>
+      </p:ext>
+    </p:extLst>
+  </p:cSld>
+  <p:clrMapOvr>
+    <a:masterClrMapping/>
+  </p:clrMapOvr>
+</p:sld>
+</file>
+
+<file path=ppt/slides/slide11.xml><?xml version="1.0" encoding="utf-8"?>
+<p:sld xmlns:a="http://schemas.openxmlformats.org/drawingml/2006/main" xmlns:r="http://schemas.openxmlformats.org/officeDocument/2006/relationships" xmlns:p="http://schemas.openxmlformats.org/presentationml/2006/main">
+  <p:cSld>
+    <p:spTree>
+      <p:nvGrpSpPr>
+        <p:cNvPr id="1" name=""/>
+        <p:cNvGrpSpPr/>
+        <p:nvPr/>
+      </p:nvGrpSpPr>
+      <p:grpSpPr>
+        <a:xfrm>
+          <a:off x="0" y="0"/>
+          <a:ext cx="0" cy="0"/>
+          <a:chOff x="0" y="0"/>
+          <a:chExt cx="0" cy="0"/>
+        </a:xfrm>
+      </p:grpSpPr>
+      <p:sp>
+        <p:nvSpPr>
+          <p:cNvPr id="2" name="TextBox 1">
+            <a:extLst>
+              <a:ext uri="{FF2B5EF4-FFF2-40B4-BE49-F238E27FC236}">
+                <a16:creationId xmlns:a16="http://schemas.microsoft.com/office/drawing/2014/main" id="{F298CF04-C313-E24A-A52B-837593E940AF}"/>
+              </a:ext>
+            </a:extLst>
+          </p:cNvPr>
+          <p:cNvSpPr txBox="1"/>
+          <p:nvPr/>
+        </p:nvSpPr>
+        <p:spPr>
+          <a:xfrm>
+            <a:off x="5693664" y="2682240"/>
+            <a:ext cx="514885" cy="369332"/>
+          </a:xfrm>
+          <a:prstGeom prst="rect">
+            <a:avLst/>
+          </a:prstGeom>
+          <a:noFill/>
+        </p:spPr>
+        <p:txBody>
+          <a:bodyPr wrap="none" rtlCol="0">
+            <a:spAutoFit/>
+          </a:bodyPr>
+          <a:lstStyle/>
+          <a:p>
+            <a:r>
+              <a:rPr lang="en-US" dirty="0" err="1"/>
+              <a:t>Xiyi</a:t>
+            </a:r>
+            <a:endParaRPr lang="en-US" dirty="0"/>
+          </a:p>
+        </p:txBody>
+      </p:sp>
+    </p:spTree>
+    <p:extLst>
+      <p:ext uri="{BB962C8B-B14F-4D97-AF65-F5344CB8AC3E}">
+        <p14:creationId xmlns:p14="http://schemas.microsoft.com/office/powerpoint/2010/main" val="1024521291"/>
+      </p:ext>
+    </p:extLst>
+  </p:cSld>
+  <p:clrMapOvr>
+    <a:masterClrMapping/>
+  </p:clrMapOvr>
+</p:sld>
+</file>
+
+<file path=ppt/slides/slide12.xml><?xml version="1.0" encoding="utf-8"?>
+<p:sld xmlns:a="http://schemas.openxmlformats.org/drawingml/2006/main" xmlns:r="http://schemas.openxmlformats.org/officeDocument/2006/relationships" xmlns:p="http://schemas.openxmlformats.org/presentationml/2006/main">
+  <p:cSld>
+    <p:spTree>
+      <p:nvGrpSpPr>
+        <p:cNvPr id="1" name=""/>
+        <p:cNvGrpSpPr/>
+        <p:nvPr/>
+      </p:nvGrpSpPr>
+      <p:grpSpPr>
+        <a:xfrm>
+          <a:off x="0" y="0"/>
+          <a:ext cx="0" cy="0"/>
+          <a:chOff x="0" y="0"/>
+          <a:chExt cx="0" cy="0"/>
+        </a:xfrm>
+      </p:grpSpPr>
+      <p:sp>
+        <p:nvSpPr>
+          <p:cNvPr id="2" name="TextBox 1">
+            <a:extLst>
+              <a:ext uri="{FF2B5EF4-FFF2-40B4-BE49-F238E27FC236}">
+                <a16:creationId xmlns:a16="http://schemas.microsoft.com/office/drawing/2014/main" id="{F298CF04-C313-E24A-A52B-837593E940AF}"/>
+              </a:ext>
+            </a:extLst>
+          </p:cNvPr>
+          <p:cNvSpPr txBox="1"/>
+          <p:nvPr/>
+        </p:nvSpPr>
+        <p:spPr>
+          <a:xfrm>
+            <a:off x="5693664" y="2682240"/>
+            <a:ext cx="514885" cy="369332"/>
+          </a:xfrm>
+          <a:prstGeom prst="rect">
+            <a:avLst/>
+          </a:prstGeom>
+          <a:noFill/>
+        </p:spPr>
+        <p:txBody>
+          <a:bodyPr wrap="none" rtlCol="0">
+            <a:spAutoFit/>
+          </a:bodyPr>
+          <a:lstStyle/>
+          <a:p>
+            <a:r>
+              <a:rPr lang="en-US" dirty="0" err="1"/>
+              <a:t>Xiyi</a:t>
+            </a:r>
+            <a:endParaRPr lang="en-US" dirty="0"/>
+          </a:p>
+        </p:txBody>
+      </p:sp>
+    </p:spTree>
+    <p:extLst>
+      <p:ext uri="{BB962C8B-B14F-4D97-AF65-F5344CB8AC3E}">
+        <p14:creationId xmlns:p14="http://schemas.microsoft.com/office/powerpoint/2010/main" val="1277986228"/>
+      </p:ext>
+    </p:extLst>
+  </p:cSld>
+  <p:clrMapOvr>
+    <a:masterClrMapping/>
+  </p:clrMapOvr>
+</p:sld>
+</file>
+
+<file path=ppt/slides/slide13.xml><?xml version="1.0" encoding="utf-8"?>
+<p:sld xmlns:a="http://schemas.openxmlformats.org/drawingml/2006/main" xmlns:r="http://schemas.openxmlformats.org/officeDocument/2006/relationships" xmlns:p="http://schemas.openxmlformats.org/presentationml/2006/main">
+  <p:cSld>
+    <p:spTree>
+      <p:nvGrpSpPr>
+        <p:cNvPr id="1" name=""/>
+        <p:cNvGrpSpPr/>
+        <p:nvPr/>
+      </p:nvGrpSpPr>
+      <p:grpSpPr>
+        <a:xfrm>
+          <a:off x="0" y="0"/>
+          <a:ext cx="0" cy="0"/>
+          <a:chOff x="0" y="0"/>
+          <a:chExt cx="0" cy="0"/>
+        </a:xfrm>
+      </p:grpSpPr>
+      <p:sp>
+        <p:nvSpPr>
+          <p:cNvPr id="2" name="TextBox 1">
+            <a:extLst>
+              <a:ext uri="{FF2B5EF4-FFF2-40B4-BE49-F238E27FC236}">
+                <a16:creationId xmlns:a16="http://schemas.microsoft.com/office/drawing/2014/main" id="{F298CF04-C313-E24A-A52B-837593E940AF}"/>
+              </a:ext>
+            </a:extLst>
+          </p:cNvPr>
+          <p:cNvSpPr txBox="1"/>
+          <p:nvPr/>
+        </p:nvSpPr>
+        <p:spPr>
+          <a:xfrm>
+            <a:off x="5693664" y="2682240"/>
+            <a:ext cx="514885" cy="369332"/>
+          </a:xfrm>
+          <a:prstGeom prst="rect">
+            <a:avLst/>
+          </a:prstGeom>
+          <a:noFill/>
+        </p:spPr>
+        <p:txBody>
+          <a:bodyPr wrap="none" rtlCol="0">
+            <a:spAutoFit/>
+          </a:bodyPr>
+          <a:lstStyle/>
+          <a:p>
+            <a:r>
+              <a:rPr lang="en-US" dirty="0" err="1"/>
+              <a:t>Xiyi</a:t>
+            </a:r>
+            <a:endParaRPr lang="en-US" dirty="0"/>
+          </a:p>
+        </p:txBody>
+      </p:sp>
+    </p:spTree>
+    <p:extLst>
+      <p:ext uri="{BB962C8B-B14F-4D97-AF65-F5344CB8AC3E}">
+        <p14:creationId xmlns:p14="http://schemas.microsoft.com/office/powerpoint/2010/main" val="4061719779"/>
+      </p:ext>
+    </p:extLst>
+  </p:cSld>
+  <p:clrMapOvr>
+    <a:masterClrMapping/>
+  </p:clrMapOvr>
+</p:sld>
+</file>
+
+<file path=ppt/slides/slide14.xml><?xml version="1.0" encoding="utf-8"?>
+<p:sld xmlns:a="http://schemas.openxmlformats.org/drawingml/2006/main" xmlns:r="http://schemas.openxmlformats.org/officeDocument/2006/relationships" xmlns:p="http://schemas.openxmlformats.org/presentationml/2006/main">
+  <p:cSld>
+    <p:spTree>
+      <p:nvGrpSpPr>
+        <p:cNvPr id="1" name=""/>
+        <p:cNvGrpSpPr/>
+        <p:nvPr/>
+      </p:nvGrpSpPr>
+      <p:grpSpPr>
+        <a:xfrm>
+          <a:off x="0" y="0"/>
+          <a:ext cx="0" cy="0"/>
+          <a:chOff x="0" y="0"/>
+          <a:chExt cx="0" cy="0"/>
+        </a:xfrm>
+      </p:grpSpPr>
+      <p:sp>
+        <p:nvSpPr>
+          <p:cNvPr id="2" name="TextBox 1">
+            <a:extLst>
+              <a:ext uri="{FF2B5EF4-FFF2-40B4-BE49-F238E27FC236}">
+                <a16:creationId xmlns:a16="http://schemas.microsoft.com/office/drawing/2014/main" id="{4E211E7D-D05C-2949-8500-D32AA9DBA052}"/>
+              </a:ext>
+            </a:extLst>
+          </p:cNvPr>
+          <p:cNvSpPr txBox="1"/>
+          <p:nvPr/>
+        </p:nvSpPr>
+        <p:spPr>
+          <a:xfrm>
+            <a:off x="5949696" y="4120896"/>
+            <a:ext cx="667812" cy="369332"/>
+          </a:xfrm>
+          <a:prstGeom prst="rect">
+            <a:avLst/>
+          </a:prstGeom>
+          <a:noFill/>
+        </p:spPr>
+        <p:txBody>
+          <a:bodyPr wrap="none" rtlCol="0">
+            <a:spAutoFit/>
+          </a:bodyPr>
+          <a:lstStyle/>
+          <a:p>
+            <a:r>
+              <a:rPr lang="en-US" dirty="0"/>
+              <a:t>Keith</a:t>
+            </a:r>
+          </a:p>
+        </p:txBody>
+      </p:sp>
+    </p:spTree>
+    <p:extLst>
+      <p:ext uri="{BB962C8B-B14F-4D97-AF65-F5344CB8AC3E}">
+        <p14:creationId xmlns:p14="http://schemas.microsoft.com/office/powerpoint/2010/main" val="4184612790"/>
+      </p:ext>
+    </p:extLst>
+  </p:cSld>
+  <p:clrMapOvr>
+    <a:masterClrMapping/>
+  </p:clrMapOvr>
+</p:sld>
+</file>
+
+<file path=ppt/slides/slide15.xml><?xml version="1.0" encoding="utf-8"?>
+<p:sld xmlns:a="http://schemas.openxmlformats.org/drawingml/2006/main" xmlns:r="http://schemas.openxmlformats.org/officeDocument/2006/relationships" xmlns:p="http://schemas.openxmlformats.org/presentationml/2006/main">
+  <p:cSld>
+    <p:spTree>
+      <p:nvGrpSpPr>
+        <p:cNvPr id="1" name=""/>
+        <p:cNvGrpSpPr/>
+        <p:nvPr/>
+      </p:nvGrpSpPr>
+      <p:grpSpPr>
+        <a:xfrm>
+          <a:off x="0" y="0"/>
+          <a:ext cx="0" cy="0"/>
+          <a:chOff x="0" y="0"/>
+          <a:chExt cx="0" cy="0"/>
+        </a:xfrm>
+      </p:grpSpPr>
+      <p:sp>
+        <p:nvSpPr>
+          <p:cNvPr id="2" name="TextBox 1">
+            <a:extLst>
+              <a:ext uri="{FF2B5EF4-FFF2-40B4-BE49-F238E27FC236}">
+                <a16:creationId xmlns:a16="http://schemas.microsoft.com/office/drawing/2014/main" id="{4E211E7D-D05C-2949-8500-D32AA9DBA052}"/>
+              </a:ext>
+            </a:extLst>
+          </p:cNvPr>
+          <p:cNvSpPr txBox="1"/>
+          <p:nvPr/>
+        </p:nvSpPr>
+        <p:spPr>
+          <a:xfrm>
+            <a:off x="5949696" y="4120896"/>
+            <a:ext cx="667812" cy="369332"/>
+          </a:xfrm>
+          <a:prstGeom prst="rect">
+            <a:avLst/>
+          </a:prstGeom>
+          <a:noFill/>
+        </p:spPr>
+        <p:txBody>
+          <a:bodyPr wrap="none" rtlCol="0">
+            <a:spAutoFit/>
+          </a:bodyPr>
+          <a:lstStyle/>
+          <a:p>
+            <a:r>
+              <a:rPr lang="en-US" dirty="0"/>
+              <a:t>Keith</a:t>
+            </a:r>
+          </a:p>
+        </p:txBody>
+      </p:sp>
+    </p:spTree>
+    <p:extLst>
+      <p:ext uri="{BB962C8B-B14F-4D97-AF65-F5344CB8AC3E}">
+        <p14:creationId xmlns:p14="http://schemas.microsoft.com/office/powerpoint/2010/main" val="732047599"/>
+      </p:ext>
+    </p:extLst>
+  </p:cSld>
+  <p:clrMapOvr>
+    <a:masterClrMapping/>
+  </p:clrMapOvr>
+</p:sld>
+</file>
+
+<file path=ppt/slides/slide16.xml><?xml version="1.0" encoding="utf-8"?>
+<p:sld xmlns:a="http://schemas.openxmlformats.org/drawingml/2006/main" xmlns:r="http://schemas.openxmlformats.org/officeDocument/2006/relationships" xmlns:p="http://schemas.openxmlformats.org/presentationml/2006/main">
+  <p:cSld>
+    <p:spTree>
+      <p:nvGrpSpPr>
+        <p:cNvPr id="1" name=""/>
+        <p:cNvGrpSpPr/>
+        <p:nvPr/>
+      </p:nvGrpSpPr>
+      <p:grpSpPr>
+        <a:xfrm>
+          <a:off x="0" y="0"/>
+          <a:ext cx="0" cy="0"/>
+          <a:chOff x="0" y="0"/>
+          <a:chExt cx="0" cy="0"/>
+        </a:xfrm>
+      </p:grpSpPr>
+      <p:sp>
+        <p:nvSpPr>
+          <p:cNvPr id="2" name="TextBox 1">
+            <a:extLst>
+              <a:ext uri="{FF2B5EF4-FFF2-40B4-BE49-F238E27FC236}">
+                <a16:creationId xmlns:a16="http://schemas.microsoft.com/office/drawing/2014/main" id="{4E211E7D-D05C-2949-8500-D32AA9DBA052}"/>
+              </a:ext>
+            </a:extLst>
+          </p:cNvPr>
+          <p:cNvSpPr txBox="1"/>
+          <p:nvPr/>
+        </p:nvSpPr>
+        <p:spPr>
+          <a:xfrm>
+            <a:off x="5949696" y="4120896"/>
+            <a:ext cx="667812" cy="369332"/>
+          </a:xfrm>
+          <a:prstGeom prst="rect">
+            <a:avLst/>
+          </a:prstGeom>
+          <a:noFill/>
+        </p:spPr>
+        <p:txBody>
+          <a:bodyPr wrap="none" rtlCol="0">
+            <a:spAutoFit/>
+          </a:bodyPr>
+          <a:lstStyle/>
+          <a:p>
+            <a:r>
+              <a:rPr lang="en-US" dirty="0"/>
+              <a:t>Keith</a:t>
+            </a:r>
+          </a:p>
+        </p:txBody>
+      </p:sp>
+    </p:spTree>
+    <p:extLst>
+      <p:ext uri="{BB962C8B-B14F-4D97-AF65-F5344CB8AC3E}">
+        <p14:creationId xmlns:p14="http://schemas.microsoft.com/office/powerpoint/2010/main" val="2171078834"/>
+      </p:ext>
+    </p:extLst>
+  </p:cSld>
+  <p:clrMapOvr>
+    <a:masterClrMapping/>
+  </p:clrMapOvr>
+</p:sld>
+</file>
+
+<file path=ppt/slides/slide17.xml><?xml version="1.0" encoding="utf-8"?>
+<p:sld xmlns:a="http://schemas.openxmlformats.org/drawingml/2006/main" xmlns:r="http://schemas.openxmlformats.org/officeDocument/2006/relationships" xmlns:p="http://schemas.openxmlformats.org/presentationml/2006/main">
+  <p:cSld>
+    <p:spTree>
+      <p:nvGrpSpPr>
+        <p:cNvPr id="1" name=""/>
+        <p:cNvGrpSpPr/>
+        <p:nvPr/>
+      </p:nvGrpSpPr>
+      <p:grpSpPr>
+        <a:xfrm>
+          <a:off x="0" y="0"/>
+          <a:ext cx="0" cy="0"/>
+          <a:chOff x="0" y="0"/>
+          <a:chExt cx="0" cy="0"/>
+        </a:xfrm>
+      </p:grpSpPr>
+      <p:sp>
+        <p:nvSpPr>
+          <p:cNvPr id="2" name="TextBox 1">
+            <a:extLst>
+              <a:ext uri="{FF2B5EF4-FFF2-40B4-BE49-F238E27FC236}">
+                <a16:creationId xmlns:a16="http://schemas.microsoft.com/office/drawing/2014/main" id="{4E211E7D-D05C-2949-8500-D32AA9DBA052}"/>
+              </a:ext>
+            </a:extLst>
+          </p:cNvPr>
+          <p:cNvSpPr txBox="1"/>
+          <p:nvPr/>
+        </p:nvSpPr>
+        <p:spPr>
+          <a:xfrm>
+            <a:off x="5949696" y="4120896"/>
+            <a:ext cx="667812" cy="369332"/>
+          </a:xfrm>
+          <a:prstGeom prst="rect">
+            <a:avLst/>
+          </a:prstGeom>
+          <a:noFill/>
+        </p:spPr>
+        <p:txBody>
+          <a:bodyPr wrap="none" rtlCol="0">
+            <a:spAutoFit/>
+          </a:bodyPr>
+          <a:lstStyle/>
+          <a:p>
+            <a:r>
+              <a:rPr lang="en-US" dirty="0"/>
+              <a:t>Keith</a:t>
+            </a:r>
+          </a:p>
+        </p:txBody>
+      </p:sp>
+    </p:spTree>
+    <p:extLst>
+      <p:ext uri="{BB962C8B-B14F-4D97-AF65-F5344CB8AC3E}">
+        <p14:creationId xmlns:p14="http://schemas.microsoft.com/office/powerpoint/2010/main" val="138934033"/>
+      </p:ext>
+    </p:extLst>
+  </p:cSld>
+  <p:clrMapOvr>
+    <a:masterClrMapping/>
+  </p:clrMapOvr>
+</p:sld>
+</file>
+
+<file path=ppt/slides/slide18.xml><?xml version="1.0" encoding="utf-8"?>
+<p:sld xmlns:a="http://schemas.openxmlformats.org/drawingml/2006/main" xmlns:r="http://schemas.openxmlformats.org/officeDocument/2006/relationships" xmlns:p="http://schemas.openxmlformats.org/presentationml/2006/main">
+  <p:cSld>
+    <p:spTree>
+      <p:nvGrpSpPr>
+        <p:cNvPr id="1" name=""/>
+        <p:cNvGrpSpPr/>
+        <p:nvPr/>
+      </p:nvGrpSpPr>
+      <p:grpSpPr>
+        <a:xfrm>
+          <a:off x="0" y="0"/>
+          <a:ext cx="0" cy="0"/>
+          <a:chOff x="0" y="0"/>
+          <a:chExt cx="0" cy="0"/>
+        </a:xfrm>
+      </p:grpSpPr>
+      <p:sp>
+        <p:nvSpPr>
+          <p:cNvPr id="2" name="TextBox 1">
+            <a:extLst>
+              <a:ext uri="{FF2B5EF4-FFF2-40B4-BE49-F238E27FC236}">
+                <a16:creationId xmlns:a16="http://schemas.microsoft.com/office/drawing/2014/main" id="{4E211E7D-D05C-2949-8500-D32AA9DBA052}"/>
+              </a:ext>
+            </a:extLst>
+          </p:cNvPr>
+          <p:cNvSpPr txBox="1"/>
+          <p:nvPr/>
+        </p:nvSpPr>
+        <p:spPr>
+          <a:xfrm>
+            <a:off x="5949696" y="4120896"/>
+            <a:ext cx="667812" cy="369332"/>
+          </a:xfrm>
+          <a:prstGeom prst="rect">
+            <a:avLst/>
+          </a:prstGeom>
+          <a:noFill/>
+        </p:spPr>
+        <p:txBody>
+          <a:bodyPr wrap="none" rtlCol="0">
+            <a:spAutoFit/>
+          </a:bodyPr>
+          <a:lstStyle/>
+          <a:p>
+            <a:r>
+              <a:rPr lang="en-US" dirty="0"/>
+              <a:t>Keith</a:t>
+            </a:r>
+          </a:p>
+        </p:txBody>
+      </p:sp>
+    </p:spTree>
+    <p:extLst>
+      <p:ext uri="{BB962C8B-B14F-4D97-AF65-F5344CB8AC3E}">
+        <p14:creationId xmlns:p14="http://schemas.microsoft.com/office/powerpoint/2010/main" val="2530317220"/>
+      </p:ext>
+    </p:extLst>
+  </p:cSld>
+  <p:clrMapOvr>
+    <a:masterClrMapping/>
+  </p:clrMapOvr>
+</p:sld>
+</file>
+
+<file path=ppt/slides/slide19.xml><?xml version="1.0" encoding="utf-8"?>
+<p:sld xmlns:a="http://schemas.openxmlformats.org/drawingml/2006/main" xmlns:r="http://schemas.openxmlformats.org/officeDocument/2006/relationships" xmlns:p="http://schemas.openxmlformats.org/presentationml/2006/main">
+  <p:cSld>
+    <p:spTree>
+      <p:nvGrpSpPr>
+        <p:cNvPr id="1" name=""/>
+        <p:cNvGrpSpPr/>
+        <p:nvPr/>
+      </p:nvGrpSpPr>
+      <p:grpSpPr>
+        <a:xfrm>
+          <a:off x="0" y="0"/>
+          <a:ext cx="0" cy="0"/>
+          <a:chOff x="0" y="0"/>
+          <a:chExt cx="0" cy="0"/>
+        </a:xfrm>
+      </p:grpSpPr>
+      <p:sp>
+        <p:nvSpPr>
+          <p:cNvPr id="2" name="TextBox 1">
+            <a:extLst>
+              <a:ext uri="{FF2B5EF4-FFF2-40B4-BE49-F238E27FC236}">
+                <a16:creationId xmlns:a16="http://schemas.microsoft.com/office/drawing/2014/main" id="{4D05C971-D981-664C-A746-65DFB8DF78C0}"/>
+              </a:ext>
+            </a:extLst>
+          </p:cNvPr>
+          <p:cNvSpPr txBox="1"/>
+          <p:nvPr/>
+        </p:nvSpPr>
+        <p:spPr>
+          <a:xfrm>
+            <a:off x="304800" y="6292015"/>
+            <a:ext cx="332142" cy="369332"/>
+          </a:xfrm>
+          <a:prstGeom prst="rect">
+            <a:avLst/>
+          </a:prstGeom>
+          <a:noFill/>
+        </p:spPr>
+        <p:txBody>
+          <a:bodyPr wrap="none" rtlCol="0">
+            <a:spAutoFit/>
+          </a:bodyPr>
+          <a:lstStyle/>
+          <a:p>
+            <a:r>
+              <a:rPr lang="en-US" dirty="0"/>
+              <a:t>JJ</a:t>
+            </a:r>
+          </a:p>
+        </p:txBody>
+      </p:sp>
+      <p:sp>
+        <p:nvSpPr>
+          <p:cNvPr id="3" name="Rectangle 2">
+            <a:extLst>
+              <a:ext uri="{FF2B5EF4-FFF2-40B4-BE49-F238E27FC236}">
+                <a16:creationId xmlns:a16="http://schemas.microsoft.com/office/drawing/2014/main" id="{6140C018-1AD3-DD4C-B321-55C0A0C07B18}"/>
+              </a:ext>
+            </a:extLst>
+          </p:cNvPr>
+          <p:cNvSpPr/>
+          <p:nvPr/>
+        </p:nvSpPr>
+        <p:spPr>
+          <a:xfrm>
+            <a:off x="1438870" y="2656798"/>
+            <a:ext cx="1464105" cy="346760"/>
+          </a:xfrm>
+          <a:prstGeom prst="rect">
+            <a:avLst/>
+          </a:prstGeom>
+          <a:solidFill>
+            <a:srgbClr val="C00000"/>
+          </a:solidFill>
+          <a:ln w="19050">
+            <a:solidFill>
+              <a:srgbClr val="C00000"/>
+            </a:solidFill>
+          </a:ln>
+          <a:effectLst/>
+        </p:spPr>
+        <p:style>
+          <a:lnRef idx="1">
+            <a:schemeClr val="accent2"/>
+          </a:lnRef>
+          <a:fillRef idx="2">
+            <a:schemeClr val="accent2"/>
+          </a:fillRef>
+          <a:effectRef idx="1">
+            <a:schemeClr val="accent2"/>
+          </a:effectRef>
+          <a:fontRef idx="minor">
+            <a:schemeClr val="dk1"/>
+          </a:fontRef>
+        </p:style>
+        <p:txBody>
+          <a:bodyPr rtlCol="0" anchor="ctr"/>
+          <a:lstStyle/>
+          <a:p>
+            <a:pPr algn="ctr"/>
+            <a:r>
+              <a:rPr lang="en-US" sz="1050" dirty="0">
+                <a:solidFill>
+                  <a:schemeClr val="bg1"/>
+                </a:solidFill>
+              </a:rPr>
+              <a:t>Application</a:t>
+            </a:r>
+            <a:endParaRPr lang="en-SG" sz="1050" dirty="0">
+              <a:solidFill>
+                <a:schemeClr val="bg1"/>
+              </a:solidFill>
+            </a:endParaRPr>
+          </a:p>
+        </p:txBody>
+      </p:sp>
+      <p:sp>
+        <p:nvSpPr>
+          <p:cNvPr id="4" name="Rectangle 3">
+            <a:extLst>
+              <a:ext uri="{FF2B5EF4-FFF2-40B4-BE49-F238E27FC236}">
+                <a16:creationId xmlns:a16="http://schemas.microsoft.com/office/drawing/2014/main" id="{9A901164-9CD7-7F46-92AF-17F09011208E}"/>
+              </a:ext>
+            </a:extLst>
+          </p:cNvPr>
+          <p:cNvSpPr/>
+          <p:nvPr/>
+        </p:nvSpPr>
+        <p:spPr>
+          <a:xfrm>
+            <a:off x="4180203" y="2682362"/>
+            <a:ext cx="581331" cy="346760"/>
+          </a:xfrm>
+          <a:prstGeom prst="rect">
+            <a:avLst/>
+          </a:prstGeom>
+          <a:solidFill>
+            <a:srgbClr val="C00000"/>
+          </a:solidFill>
+          <a:ln w="19050">
+            <a:solidFill>
+              <a:srgbClr val="C00000"/>
+            </a:solidFill>
+          </a:ln>
+          <a:effectLst/>
+        </p:spPr>
+        <p:style>
+          <a:lnRef idx="1">
+            <a:schemeClr val="accent2"/>
+          </a:lnRef>
+          <a:fillRef idx="2">
+            <a:schemeClr val="accent2"/>
+          </a:fillRef>
+          <a:effectRef idx="1">
+            <a:schemeClr val="accent2"/>
+          </a:effectRef>
+          <a:fontRef idx="minor">
+            <a:schemeClr val="dk1"/>
+          </a:fontRef>
+        </p:style>
+        <p:txBody>
+          <a:bodyPr rtlCol="0" anchor="ctr"/>
+          <a:lstStyle/>
+          <a:p>
+            <a:pPr algn="ctr"/>
+            <a:r>
+              <a:rPr lang="en-US" sz="1050" dirty="0">
+                <a:solidFill>
+                  <a:schemeClr val="bg1"/>
+                </a:solidFill>
+              </a:rPr>
+              <a:t>Main</a:t>
+            </a:r>
+            <a:endParaRPr lang="en-SG" sz="1050" dirty="0">
+              <a:solidFill>
+                <a:schemeClr val="bg1"/>
+              </a:solidFill>
+            </a:endParaRPr>
+          </a:p>
+        </p:txBody>
+      </p:sp>
+      <p:sp>
+        <p:nvSpPr>
+          <p:cNvPr id="8" name="Rectangle 7">
+            <a:extLst>
+              <a:ext uri="{FF2B5EF4-FFF2-40B4-BE49-F238E27FC236}">
+                <a16:creationId xmlns:a16="http://schemas.microsoft.com/office/drawing/2014/main" id="{157CAFB0-E3B4-D64F-B6EC-A3CDF891B2CA}"/>
+              </a:ext>
+            </a:extLst>
+          </p:cNvPr>
+          <p:cNvSpPr/>
+          <p:nvPr/>
+        </p:nvSpPr>
+        <p:spPr>
+          <a:xfrm>
+            <a:off x="5875460" y="4692618"/>
+            <a:ext cx="1746186" cy="346760"/>
+          </a:xfrm>
+          <a:prstGeom prst="rect">
+            <a:avLst/>
+          </a:prstGeom>
+          <a:solidFill>
+            <a:srgbClr val="C00000"/>
+          </a:solidFill>
+          <a:ln w="19050">
+            <a:solidFill>
+              <a:srgbClr val="C00000"/>
+            </a:solidFill>
+          </a:ln>
+          <a:effectLst/>
+        </p:spPr>
+        <p:style>
+          <a:lnRef idx="1">
+            <a:schemeClr val="accent2"/>
+          </a:lnRef>
+          <a:fillRef idx="2">
+            <a:schemeClr val="accent2"/>
+          </a:fillRef>
+          <a:effectRef idx="1">
+            <a:schemeClr val="accent2"/>
+          </a:effectRef>
+          <a:fontRef idx="minor">
+            <a:schemeClr val="dk1"/>
+          </a:fontRef>
+        </p:style>
+        <p:txBody>
+          <a:bodyPr rtlCol="0" anchor="ctr"/>
+          <a:lstStyle/>
+          <a:p>
+            <a:pPr algn="ctr"/>
+            <a:r>
+              <a:rPr lang="en-US" sz="1050" dirty="0" err="1">
+                <a:solidFill>
+                  <a:schemeClr val="bg1"/>
+                </a:solidFill>
+              </a:rPr>
+              <a:t>MainWindow</a:t>
+            </a:r>
+            <a:endParaRPr lang="en-SG" sz="1050" dirty="0">
+              <a:solidFill>
+                <a:schemeClr val="bg1"/>
+              </a:solidFill>
+            </a:endParaRPr>
+          </a:p>
+        </p:txBody>
+      </p:sp>
+      <p:sp>
+        <p:nvSpPr>
+          <p:cNvPr id="12" name="Rectangle 11">
+            <a:extLst>
+              <a:ext uri="{FF2B5EF4-FFF2-40B4-BE49-F238E27FC236}">
+                <a16:creationId xmlns:a16="http://schemas.microsoft.com/office/drawing/2014/main" id="{6B9949C1-17B0-174E-B35E-5ED22676BE08}"/>
+              </a:ext>
+            </a:extLst>
+          </p:cNvPr>
+          <p:cNvSpPr/>
+          <p:nvPr/>
+        </p:nvSpPr>
+        <p:spPr>
+          <a:xfrm>
+            <a:off x="3935239" y="1687073"/>
+            <a:ext cx="1071262" cy="346760"/>
+          </a:xfrm>
+          <a:prstGeom prst="rect">
+            <a:avLst/>
+          </a:prstGeom>
+          <a:ln w="19050"/>
+          <a:effectLst/>
+        </p:spPr>
+        <p:style>
+          <a:lnRef idx="1">
+            <a:schemeClr val="accent2"/>
+          </a:lnRef>
+          <a:fillRef idx="2">
+            <a:schemeClr val="accent2"/>
+          </a:fillRef>
+          <a:effectRef idx="1">
+            <a:schemeClr val="accent2"/>
+          </a:effectRef>
+          <a:fontRef idx="minor">
+            <a:schemeClr val="dk1"/>
+          </a:fontRef>
+        </p:style>
+        <p:txBody>
+          <a:bodyPr rtlCol="0" anchor="ctr"/>
+          <a:lstStyle/>
+          <a:p>
+            <a:pPr algn="ctr"/>
+            <a:r>
+              <a:rPr lang="en-US" sz="1050" dirty="0"/>
+              <a:t>&lt;&lt;interface&gt;&gt;</a:t>
+            </a:r>
+          </a:p>
+          <a:p>
+            <a:pPr algn="ctr"/>
+            <a:r>
+              <a:rPr lang="en-US" sz="1050" dirty="0"/>
+              <a:t>Stoppable</a:t>
+            </a:r>
+            <a:endParaRPr lang="en-SG" sz="1050" dirty="0"/>
+          </a:p>
+        </p:txBody>
+      </p:sp>
+      <p:sp>
+        <p:nvSpPr>
+          <p:cNvPr id="14" name="Isosceles Triangle 102">
+            <a:extLst>
+              <a:ext uri="{FF2B5EF4-FFF2-40B4-BE49-F238E27FC236}">
+                <a16:creationId xmlns:a16="http://schemas.microsoft.com/office/drawing/2014/main" id="{1B028007-70BE-D444-932D-80E616D0F1FD}"/>
+              </a:ext>
+            </a:extLst>
+          </p:cNvPr>
+          <p:cNvSpPr/>
+          <p:nvPr/>
+        </p:nvSpPr>
+        <p:spPr>
+          <a:xfrm rot="10800000" flipV="1">
+            <a:off x="4335615" y="2068595"/>
+            <a:ext cx="270504" cy="175523"/>
+          </a:xfrm>
+          <a:prstGeom prst="triangle">
+            <a:avLst/>
+          </a:prstGeom>
+          <a:ln w="19050"/>
+          <a:effectLst/>
+        </p:spPr>
+        <p:style>
+          <a:lnRef idx="1">
+            <a:schemeClr val="accent2"/>
+          </a:lnRef>
+          <a:fillRef idx="2">
+            <a:schemeClr val="accent2"/>
+          </a:fillRef>
+          <a:effectRef idx="1">
+            <a:schemeClr val="accent2"/>
+          </a:effectRef>
+          <a:fontRef idx="minor">
+            <a:schemeClr val="dk1"/>
+          </a:fontRef>
+        </p:style>
+        <p:txBody>
+          <a:bodyPr rtlCol="0" anchor="ctr"/>
+          <a:lstStyle/>
+          <a:p>
+            <a:pPr algn="ctr"/>
+            <a:endParaRPr lang="en-SG" sz="1050"/>
+          </a:p>
+        </p:txBody>
+      </p:sp>
+      <p:cxnSp>
+        <p:nvCxnSpPr>
+          <p:cNvPr id="15" name="Elbow Connector 14">
+            <a:extLst>
+              <a:ext uri="{FF2B5EF4-FFF2-40B4-BE49-F238E27FC236}">
+                <a16:creationId xmlns:a16="http://schemas.microsoft.com/office/drawing/2014/main" id="{BBDF7760-9BDE-0E49-BB0B-97B8C49DDC39}"/>
+              </a:ext>
+            </a:extLst>
+          </p:cNvPr>
+          <p:cNvCxnSpPr>
+            <a:cxnSpLocks/>
+            <a:stCxn id="12" idx="2"/>
+            <a:endCxn id="4" idx="0"/>
+          </p:cNvCxnSpPr>
+          <p:nvPr/>
+        </p:nvCxnSpPr>
+        <p:spPr>
+          <a:xfrm rot="5400000">
+            <a:off x="4146606" y="2358097"/>
+            <a:ext cx="648529" cy="1"/>
+          </a:xfrm>
+          <a:prstGeom prst="bentConnector3">
+            <a:avLst>
+              <a:gd name="adj1" fmla="val 50000"/>
+            </a:avLst>
+          </a:prstGeom>
+          <a:ln w="19050">
+            <a:solidFill>
+              <a:srgbClr val="C00000"/>
+            </a:solidFill>
+            <a:prstDash val="dash"/>
+            <a:headEnd type="none" w="med" len="med"/>
+            <a:tailEnd type="none" w="med" len="med"/>
+          </a:ln>
+          <a:effectLst/>
+        </p:spPr>
+        <p:style>
+          <a:lnRef idx="1">
+            <a:schemeClr val="accent2"/>
+          </a:lnRef>
+          <a:fillRef idx="2">
+            <a:schemeClr val="accent2"/>
+          </a:fillRef>
+          <a:effectRef idx="1">
+            <a:schemeClr val="accent2"/>
+          </a:effectRef>
+          <a:fontRef idx="minor">
+            <a:schemeClr val="dk1"/>
+          </a:fontRef>
+        </p:style>
+      </p:cxnSp>
+      <p:cxnSp>
+        <p:nvCxnSpPr>
+          <p:cNvPr id="16" name="Elbow Connector 15">
+            <a:extLst>
+              <a:ext uri="{FF2B5EF4-FFF2-40B4-BE49-F238E27FC236}">
+                <a16:creationId xmlns:a16="http://schemas.microsoft.com/office/drawing/2014/main" id="{F1BD1D3C-259C-9B43-B680-A17968AD4022}"/>
+              </a:ext>
+            </a:extLst>
+          </p:cNvPr>
+          <p:cNvCxnSpPr>
+            <a:cxnSpLocks/>
+            <a:stCxn id="8" idx="0"/>
+            <a:endCxn id="54" idx="2"/>
+          </p:cNvCxnSpPr>
+          <p:nvPr/>
+        </p:nvCxnSpPr>
+        <p:spPr>
+          <a:xfrm rot="5400000" flipH="1" flipV="1">
+            <a:off x="6287238" y="4231303"/>
+            <a:ext cx="922631" cy="1"/>
+          </a:xfrm>
+          <a:prstGeom prst="bentConnector3">
+            <a:avLst>
+              <a:gd name="adj1" fmla="val 50000"/>
+            </a:avLst>
+          </a:prstGeom>
+          <a:ln w="19050">
+            <a:solidFill>
+              <a:srgbClr val="C00000"/>
+            </a:solidFill>
+            <a:prstDash val="solid"/>
+            <a:headEnd type="none" w="med" len="med"/>
+            <a:tailEnd type="arrow" w="med" len="med"/>
+          </a:ln>
+          <a:effectLst/>
+        </p:spPr>
+        <p:style>
+          <a:lnRef idx="1">
+            <a:schemeClr val="accent2"/>
+          </a:lnRef>
+          <a:fillRef idx="2">
+            <a:schemeClr val="accent2"/>
+          </a:fillRef>
+          <a:effectRef idx="1">
+            <a:schemeClr val="accent2"/>
+          </a:effectRef>
+          <a:fontRef idx="minor">
+            <a:schemeClr val="dk1"/>
+          </a:fontRef>
+        </p:style>
+      </p:cxnSp>
+      <p:cxnSp>
+        <p:nvCxnSpPr>
+          <p:cNvPr id="17" name="Elbow Connector 16">
+            <a:extLst>
+              <a:ext uri="{FF2B5EF4-FFF2-40B4-BE49-F238E27FC236}">
+                <a16:creationId xmlns:a16="http://schemas.microsoft.com/office/drawing/2014/main" id="{D97CE731-81D6-E144-96B6-46C96EB9DFB2}"/>
+              </a:ext>
+            </a:extLst>
+          </p:cNvPr>
+          <p:cNvCxnSpPr>
+            <a:cxnSpLocks/>
+            <a:stCxn id="4" idx="2"/>
+            <a:endCxn id="21" idx="0"/>
+          </p:cNvCxnSpPr>
+          <p:nvPr/>
+        </p:nvCxnSpPr>
+        <p:spPr>
+          <a:xfrm rot="5400000">
+            <a:off x="4273817" y="3226174"/>
+            <a:ext cx="394105" cy="1"/>
+          </a:xfrm>
+          <a:prstGeom prst="bentConnector3">
+            <a:avLst>
+              <a:gd name="adj1" fmla="val 50000"/>
+            </a:avLst>
+          </a:prstGeom>
+          <a:ln w="19050">
+            <a:solidFill>
+              <a:srgbClr val="C00000"/>
+            </a:solidFill>
+            <a:prstDash val="dash"/>
+            <a:headEnd type="none" w="med" len="med"/>
+            <a:tailEnd type="arrow" w="med" len="med"/>
+          </a:ln>
+          <a:effectLst/>
+        </p:spPr>
+        <p:style>
+          <a:lnRef idx="1">
+            <a:schemeClr val="accent2"/>
+          </a:lnRef>
+          <a:fillRef idx="2">
+            <a:schemeClr val="accent2"/>
+          </a:fillRef>
+          <a:effectRef idx="1">
+            <a:schemeClr val="accent2"/>
+          </a:effectRef>
+          <a:fontRef idx="minor">
+            <a:schemeClr val="dk1"/>
+          </a:fontRef>
+        </p:style>
+      </p:cxnSp>
+      <p:sp>
+        <p:nvSpPr>
+          <p:cNvPr id="21" name="Rectangle 20">
+            <a:extLst>
+              <a:ext uri="{FF2B5EF4-FFF2-40B4-BE49-F238E27FC236}">
+                <a16:creationId xmlns:a16="http://schemas.microsoft.com/office/drawing/2014/main" id="{4F2EFA1D-347C-7D43-9FDA-45A1AC812AA4}"/>
+              </a:ext>
+            </a:extLst>
+          </p:cNvPr>
+          <p:cNvSpPr/>
+          <p:nvPr/>
+        </p:nvSpPr>
+        <p:spPr>
+          <a:xfrm>
+            <a:off x="4270378" y="3423227"/>
+            <a:ext cx="400979" cy="346760"/>
+          </a:xfrm>
+          <a:prstGeom prst="rect">
+            <a:avLst/>
+          </a:prstGeom>
+          <a:solidFill>
+            <a:srgbClr val="C00000"/>
+          </a:solidFill>
+          <a:ln w="19050">
+            <a:solidFill>
+              <a:srgbClr val="C00000"/>
+            </a:solidFill>
+          </a:ln>
+          <a:effectLst/>
+        </p:spPr>
+        <p:style>
+          <a:lnRef idx="1">
+            <a:schemeClr val="accent2"/>
+          </a:lnRef>
+          <a:fillRef idx="2">
+            <a:schemeClr val="accent2"/>
+          </a:fillRef>
+          <a:effectRef idx="1">
+            <a:schemeClr val="accent2"/>
+          </a:effectRef>
+          <a:fontRef idx="minor">
+            <a:schemeClr val="dk1"/>
+          </a:fontRef>
+        </p:style>
+        <p:txBody>
+          <a:bodyPr rtlCol="0" anchor="ctr"/>
+          <a:lstStyle/>
+          <a:p>
+            <a:pPr algn="ctr"/>
+            <a:r>
+              <a:rPr lang="en-US" sz="1050" dirty="0" err="1">
+                <a:solidFill>
+                  <a:schemeClr val="bg1"/>
+                </a:solidFill>
+              </a:rPr>
+              <a:t>Gui</a:t>
+            </a:r>
+            <a:endParaRPr lang="en-SG" sz="1050" dirty="0">
+              <a:solidFill>
+                <a:schemeClr val="bg1"/>
+              </a:solidFill>
+            </a:endParaRPr>
+          </a:p>
+        </p:txBody>
+      </p:sp>
+      <p:cxnSp>
+        <p:nvCxnSpPr>
+          <p:cNvPr id="34" name="Elbow Connector 33">
+            <a:extLst>
+              <a:ext uri="{FF2B5EF4-FFF2-40B4-BE49-F238E27FC236}">
+                <a16:creationId xmlns:a16="http://schemas.microsoft.com/office/drawing/2014/main" id="{2A88459F-4F66-4F4F-83C7-22C73C29A2F1}"/>
+              </a:ext>
+            </a:extLst>
+          </p:cNvPr>
+          <p:cNvCxnSpPr>
+            <a:cxnSpLocks/>
+            <a:stCxn id="21" idx="2"/>
+            <a:endCxn id="35" idx="3"/>
+          </p:cNvCxnSpPr>
+          <p:nvPr/>
+        </p:nvCxnSpPr>
+        <p:spPr>
+          <a:xfrm rot="5400000">
+            <a:off x="3286545" y="3681674"/>
+            <a:ext cx="1096011" cy="1272637"/>
+          </a:xfrm>
+          <a:prstGeom prst="bentConnector2">
+            <a:avLst/>
+          </a:prstGeom>
+          <a:ln w="19050">
+            <a:solidFill>
+              <a:srgbClr val="C00000"/>
+            </a:solidFill>
+            <a:prstDash val="dash"/>
+            <a:headEnd type="none" w="med" len="med"/>
+            <a:tailEnd type="arrow" w="med" len="med"/>
+          </a:ln>
+          <a:effectLst/>
+        </p:spPr>
+        <p:style>
+          <a:lnRef idx="1">
+            <a:schemeClr val="accent2"/>
+          </a:lnRef>
+          <a:fillRef idx="2">
+            <a:schemeClr val="accent2"/>
+          </a:fillRef>
+          <a:effectRef idx="1">
+            <a:schemeClr val="accent2"/>
+          </a:effectRef>
+          <a:fontRef idx="minor">
+            <a:schemeClr val="dk1"/>
+          </a:fontRef>
+        </p:style>
+      </p:cxnSp>
+      <p:sp>
+        <p:nvSpPr>
+          <p:cNvPr id="35" name="Rectangle 34">
+            <a:extLst>
+              <a:ext uri="{FF2B5EF4-FFF2-40B4-BE49-F238E27FC236}">
+                <a16:creationId xmlns:a16="http://schemas.microsoft.com/office/drawing/2014/main" id="{233B2F1B-6222-8B49-918C-CAD8D1CE4E7E}"/>
+              </a:ext>
+            </a:extLst>
+          </p:cNvPr>
+          <p:cNvSpPr/>
+          <p:nvPr/>
+        </p:nvSpPr>
+        <p:spPr>
+          <a:xfrm>
+            <a:off x="1452045" y="4692618"/>
+            <a:ext cx="1746186" cy="346760"/>
+          </a:xfrm>
+          <a:prstGeom prst="rect">
+            <a:avLst/>
+          </a:prstGeom>
+          <a:solidFill>
+            <a:srgbClr val="C00000"/>
+          </a:solidFill>
+          <a:ln w="19050">
+            <a:solidFill>
+              <a:srgbClr val="C00000"/>
+            </a:solidFill>
+          </a:ln>
+          <a:effectLst/>
+        </p:spPr>
+        <p:style>
+          <a:lnRef idx="1">
+            <a:schemeClr val="accent2"/>
+          </a:lnRef>
+          <a:fillRef idx="2">
+            <a:schemeClr val="accent2"/>
+          </a:fillRef>
+          <a:effectRef idx="1">
+            <a:schemeClr val="accent2"/>
+          </a:effectRef>
+          <a:fontRef idx="minor">
+            <a:schemeClr val="dk1"/>
+          </a:fontRef>
+        </p:style>
+        <p:txBody>
+          <a:bodyPr rtlCol="0" anchor="ctr"/>
+          <a:lstStyle/>
+          <a:p>
+            <a:pPr algn="ctr"/>
+            <a:r>
+              <a:rPr lang="en-US" sz="1050" dirty="0" err="1">
+                <a:solidFill>
+                  <a:schemeClr val="bg1"/>
+                </a:solidFill>
+              </a:rPr>
+              <a:t>LoginWindow</a:t>
+            </a:r>
+            <a:endParaRPr lang="en-SG" sz="1050" dirty="0">
+              <a:solidFill>
+                <a:schemeClr val="bg1"/>
+              </a:solidFill>
+            </a:endParaRPr>
+          </a:p>
+        </p:txBody>
+      </p:sp>
+      <p:cxnSp>
+        <p:nvCxnSpPr>
+          <p:cNvPr id="47" name="Elbow Connector 46">
+            <a:extLst>
+              <a:ext uri="{FF2B5EF4-FFF2-40B4-BE49-F238E27FC236}">
+                <a16:creationId xmlns:a16="http://schemas.microsoft.com/office/drawing/2014/main" id="{93AAB53F-2114-1A4B-BC2B-B0E42BF78069}"/>
+              </a:ext>
+            </a:extLst>
+          </p:cNvPr>
+          <p:cNvCxnSpPr>
+            <a:cxnSpLocks/>
+            <a:stCxn id="35" idx="2"/>
+            <a:endCxn id="51" idx="0"/>
+          </p:cNvCxnSpPr>
+          <p:nvPr/>
+        </p:nvCxnSpPr>
+        <p:spPr>
+          <a:xfrm rot="5400000">
+            <a:off x="1927832" y="5436684"/>
+            <a:ext cx="794612" cy="12700"/>
+          </a:xfrm>
+          <a:prstGeom prst="bentConnector3">
+            <a:avLst>
+              <a:gd name="adj1" fmla="val 50000"/>
+            </a:avLst>
+          </a:prstGeom>
+          <a:ln w="19050">
+            <a:solidFill>
+              <a:srgbClr val="C00000"/>
+            </a:solidFill>
+            <a:prstDash val="solid"/>
+            <a:headEnd type="none" w="med" len="med"/>
+            <a:tailEnd type="arrow" w="med" len="med"/>
+          </a:ln>
+          <a:effectLst/>
+        </p:spPr>
+        <p:style>
+          <a:lnRef idx="1">
+            <a:schemeClr val="accent2"/>
+          </a:lnRef>
+          <a:fillRef idx="2">
+            <a:schemeClr val="accent2"/>
+          </a:fillRef>
+          <a:effectRef idx="1">
+            <a:schemeClr val="accent2"/>
+          </a:effectRef>
+          <a:fontRef idx="minor">
+            <a:schemeClr val="dk1"/>
+          </a:fontRef>
+        </p:style>
+      </p:cxnSp>
+      <p:sp>
+        <p:nvSpPr>
+          <p:cNvPr id="51" name="Rectangle 50">
+            <a:extLst>
+              <a:ext uri="{FF2B5EF4-FFF2-40B4-BE49-F238E27FC236}">
+                <a16:creationId xmlns:a16="http://schemas.microsoft.com/office/drawing/2014/main" id="{CADF4C8C-F812-F640-989B-EB807A5F6C2A}"/>
+              </a:ext>
+            </a:extLst>
+          </p:cNvPr>
+          <p:cNvSpPr/>
+          <p:nvPr/>
+        </p:nvSpPr>
+        <p:spPr>
+          <a:xfrm>
+            <a:off x="1593085" y="5833990"/>
+            <a:ext cx="1464105" cy="346760"/>
+          </a:xfrm>
+          <a:prstGeom prst="rect">
+            <a:avLst/>
+          </a:prstGeom>
+          <a:solidFill>
+            <a:schemeClr val="accent6"/>
+          </a:solidFill>
+          <a:ln w="19050">
+            <a:solidFill>
+              <a:schemeClr val="accent6"/>
+            </a:solidFill>
+          </a:ln>
+          <a:effectLst/>
+        </p:spPr>
+        <p:style>
+          <a:lnRef idx="1">
+            <a:schemeClr val="accent2"/>
+          </a:lnRef>
+          <a:fillRef idx="2">
+            <a:schemeClr val="accent2"/>
+          </a:fillRef>
+          <a:effectRef idx="1">
+            <a:schemeClr val="accent2"/>
+          </a:effectRef>
+          <a:fontRef idx="minor">
+            <a:schemeClr val="dk1"/>
+          </a:fontRef>
+        </p:style>
+        <p:txBody>
+          <a:bodyPr rtlCol="0" anchor="ctr"/>
+          <a:lstStyle/>
+          <a:p>
+            <a:pPr algn="ctr"/>
+            <a:r>
+              <a:rPr lang="en-US" sz="1050" dirty="0">
+                <a:solidFill>
+                  <a:schemeClr val="bg1"/>
+                </a:solidFill>
+              </a:rPr>
+              <a:t>Login</a:t>
+            </a:r>
+            <a:endParaRPr lang="en-SG" sz="1050" dirty="0">
+              <a:solidFill>
+                <a:schemeClr val="bg1"/>
+              </a:solidFill>
+            </a:endParaRPr>
+          </a:p>
+        </p:txBody>
+      </p:sp>
+      <p:sp>
+        <p:nvSpPr>
+          <p:cNvPr id="54" name="Rectangle 53">
+            <a:extLst>
+              <a:ext uri="{FF2B5EF4-FFF2-40B4-BE49-F238E27FC236}">
+                <a16:creationId xmlns:a16="http://schemas.microsoft.com/office/drawing/2014/main" id="{0C3C6586-982E-3846-8C18-D6D9A87CDD69}"/>
+              </a:ext>
+            </a:extLst>
+          </p:cNvPr>
+          <p:cNvSpPr/>
+          <p:nvPr/>
+        </p:nvSpPr>
+        <p:spPr>
+          <a:xfrm>
+            <a:off x="6016501" y="3423227"/>
+            <a:ext cx="1464105" cy="346760"/>
+          </a:xfrm>
+          <a:prstGeom prst="rect">
+            <a:avLst/>
+          </a:prstGeom>
+          <a:solidFill>
+            <a:schemeClr val="tx2">
+              <a:lumMod val="60000"/>
+              <a:lumOff val="40000"/>
+            </a:schemeClr>
+          </a:solidFill>
+          <a:ln w="19050">
+            <a:solidFill>
+              <a:schemeClr val="tx2">
+                <a:lumMod val="60000"/>
+                <a:lumOff val="40000"/>
+              </a:schemeClr>
+            </a:solidFill>
+          </a:ln>
+          <a:effectLst/>
+        </p:spPr>
+        <p:style>
+          <a:lnRef idx="1">
+            <a:schemeClr val="accent2"/>
+          </a:lnRef>
+          <a:fillRef idx="2">
+            <a:schemeClr val="accent2"/>
+          </a:fillRef>
+          <a:effectRef idx="1">
+            <a:schemeClr val="accent2"/>
+          </a:effectRef>
+          <a:fontRef idx="minor">
+            <a:schemeClr val="dk1"/>
+          </a:fontRef>
+        </p:style>
+        <p:txBody>
+          <a:bodyPr rtlCol="0" anchor="ctr"/>
+          <a:lstStyle/>
+          <a:p>
+            <a:pPr algn="ctr"/>
+            <a:r>
+              <a:rPr lang="en-US" sz="1050" dirty="0">
+                <a:solidFill>
+                  <a:schemeClr val="bg1"/>
+                </a:solidFill>
+              </a:rPr>
+              <a:t>Logic</a:t>
+            </a:r>
+            <a:endParaRPr lang="en-SG" sz="1050" dirty="0">
+              <a:solidFill>
+                <a:schemeClr val="bg1"/>
+              </a:solidFill>
+            </a:endParaRPr>
+          </a:p>
+        </p:txBody>
+      </p:sp>
+      <p:cxnSp>
+        <p:nvCxnSpPr>
+          <p:cNvPr id="67" name="Elbow Connector 66">
+            <a:extLst>
+              <a:ext uri="{FF2B5EF4-FFF2-40B4-BE49-F238E27FC236}">
+                <a16:creationId xmlns:a16="http://schemas.microsoft.com/office/drawing/2014/main" id="{AB4991BF-B9CF-F144-962B-7F918AA62D05}"/>
+              </a:ext>
+            </a:extLst>
+          </p:cNvPr>
+          <p:cNvCxnSpPr>
+            <a:cxnSpLocks/>
+            <a:stCxn id="21" idx="2"/>
+            <a:endCxn id="8" idx="1"/>
+          </p:cNvCxnSpPr>
+          <p:nvPr/>
+        </p:nvCxnSpPr>
+        <p:spPr>
+          <a:xfrm rot="16200000" flipH="1">
+            <a:off x="4625159" y="3615696"/>
+            <a:ext cx="1096011" cy="1404592"/>
+          </a:xfrm>
+          <a:prstGeom prst="bentConnector2">
+            <a:avLst/>
+          </a:prstGeom>
+          <a:ln w="19050">
+            <a:solidFill>
+              <a:srgbClr val="C00000"/>
+            </a:solidFill>
+            <a:prstDash val="dash"/>
+            <a:headEnd type="none" w="med" len="med"/>
+            <a:tailEnd type="arrow" w="med" len="med"/>
+          </a:ln>
+          <a:effectLst/>
+        </p:spPr>
+        <p:style>
+          <a:lnRef idx="1">
+            <a:schemeClr val="accent2"/>
+          </a:lnRef>
+          <a:fillRef idx="2">
+            <a:schemeClr val="accent2"/>
+          </a:fillRef>
+          <a:effectRef idx="1">
+            <a:schemeClr val="accent2"/>
+          </a:effectRef>
+          <a:fontRef idx="minor">
+            <a:schemeClr val="dk1"/>
+          </a:fontRef>
+        </p:style>
+      </p:cxnSp>
+      <p:cxnSp>
+        <p:nvCxnSpPr>
+          <p:cNvPr id="83" name="Elbow Connector 82">
+            <a:extLst>
+              <a:ext uri="{FF2B5EF4-FFF2-40B4-BE49-F238E27FC236}">
+                <a16:creationId xmlns:a16="http://schemas.microsoft.com/office/drawing/2014/main" id="{5A466A01-A354-3440-9FB4-A435F9306618}"/>
+              </a:ext>
+            </a:extLst>
+          </p:cNvPr>
+          <p:cNvCxnSpPr>
+            <a:cxnSpLocks/>
+            <a:stCxn id="21" idx="3"/>
+            <a:endCxn id="54" idx="1"/>
+          </p:cNvCxnSpPr>
+          <p:nvPr/>
+        </p:nvCxnSpPr>
+        <p:spPr>
+          <a:xfrm>
+            <a:off x="4671357" y="3596607"/>
+            <a:ext cx="1345144" cy="12700"/>
+          </a:xfrm>
+          <a:prstGeom prst="bentConnector3">
+            <a:avLst>
+              <a:gd name="adj1" fmla="val 50000"/>
+            </a:avLst>
+          </a:prstGeom>
+          <a:ln w="19050">
+            <a:solidFill>
+              <a:srgbClr val="C00000"/>
+            </a:solidFill>
+            <a:prstDash val="dash"/>
+            <a:headEnd type="none" w="med" len="med"/>
+            <a:tailEnd type="arrow" w="med" len="med"/>
+          </a:ln>
+          <a:effectLst/>
+        </p:spPr>
+        <p:style>
+          <a:lnRef idx="1">
+            <a:schemeClr val="accent2"/>
+          </a:lnRef>
+          <a:fillRef idx="2">
+            <a:schemeClr val="accent2"/>
+          </a:fillRef>
+          <a:effectRef idx="1">
+            <a:schemeClr val="accent2"/>
+          </a:effectRef>
+          <a:fontRef idx="minor">
+            <a:schemeClr val="dk1"/>
+          </a:fontRef>
+        </p:style>
+      </p:cxnSp>
+      <p:cxnSp>
+        <p:nvCxnSpPr>
+          <p:cNvPr id="22" name="Elbow Connector 21">
+            <a:extLst>
+              <a:ext uri="{FF2B5EF4-FFF2-40B4-BE49-F238E27FC236}">
+                <a16:creationId xmlns:a16="http://schemas.microsoft.com/office/drawing/2014/main" id="{7F3179C1-DFA1-7245-B8B4-220471BD271B}"/>
+              </a:ext>
+            </a:extLst>
+          </p:cNvPr>
+          <p:cNvCxnSpPr>
+            <a:cxnSpLocks/>
+            <a:stCxn id="4" idx="1"/>
+            <a:endCxn id="3" idx="3"/>
+          </p:cNvCxnSpPr>
+          <p:nvPr/>
+        </p:nvCxnSpPr>
+        <p:spPr>
+          <a:xfrm rot="10800000">
+            <a:off x="2902975" y="2830178"/>
+            <a:ext cx="1277228" cy="25564"/>
+          </a:xfrm>
+          <a:prstGeom prst="bentConnector3">
+            <a:avLst>
+              <a:gd name="adj1" fmla="val 50000"/>
+            </a:avLst>
+          </a:prstGeom>
+          <a:ln w="19050">
+            <a:solidFill>
+              <a:srgbClr val="C00000"/>
+            </a:solidFill>
+            <a:prstDash val="solid"/>
+            <a:headEnd type="none" w="med" len="med"/>
+            <a:tailEnd type="arrow" w="med" len="med"/>
+          </a:ln>
+          <a:effectLst/>
+        </p:spPr>
+        <p:style>
+          <a:lnRef idx="1">
+            <a:schemeClr val="accent2"/>
+          </a:lnRef>
+          <a:fillRef idx="2">
+            <a:schemeClr val="accent2"/>
+          </a:fillRef>
+          <a:effectRef idx="1">
+            <a:schemeClr val="accent2"/>
+          </a:effectRef>
+          <a:fontRef idx="minor">
+            <a:schemeClr val="dk1"/>
+          </a:fontRef>
+        </p:style>
+      </p:cxnSp>
+      <p:sp>
+        <p:nvSpPr>
+          <p:cNvPr id="41" name="Isosceles Triangle 102">
+            <a:extLst>
+              <a:ext uri="{FF2B5EF4-FFF2-40B4-BE49-F238E27FC236}">
+                <a16:creationId xmlns:a16="http://schemas.microsoft.com/office/drawing/2014/main" id="{3565A689-351C-A34F-B387-2697584F9537}"/>
+              </a:ext>
+            </a:extLst>
+          </p:cNvPr>
+          <p:cNvSpPr/>
+          <p:nvPr/>
+        </p:nvSpPr>
+        <p:spPr>
+          <a:xfrm rot="5400000" flipV="1">
+            <a:off x="2855483" y="2755199"/>
+            <a:ext cx="270504" cy="175523"/>
+          </a:xfrm>
+          <a:prstGeom prst="triangle">
+            <a:avLst/>
+          </a:prstGeom>
+          <a:ln w="19050"/>
+          <a:effectLst/>
+        </p:spPr>
+        <p:style>
+          <a:lnRef idx="1">
+            <a:schemeClr val="accent2"/>
+          </a:lnRef>
+          <a:fillRef idx="2">
+            <a:schemeClr val="accent2"/>
+          </a:fillRef>
+          <a:effectRef idx="1">
+            <a:schemeClr val="accent2"/>
+          </a:effectRef>
+          <a:fontRef idx="minor">
+            <a:schemeClr val="dk1"/>
+          </a:fontRef>
+        </p:style>
+        <p:txBody>
+          <a:bodyPr rtlCol="0" anchor="ctr"/>
+          <a:lstStyle/>
+          <a:p>
+            <a:pPr algn="ctr"/>
+            <a:endParaRPr lang="en-SG" sz="1050"/>
+          </a:p>
+        </p:txBody>
+      </p:sp>
+    </p:spTree>
+    <p:extLst>
+      <p:ext uri="{BB962C8B-B14F-4D97-AF65-F5344CB8AC3E}">
+        <p14:creationId xmlns:p14="http://schemas.microsoft.com/office/powerpoint/2010/main" val="2442966721"/>
+      </p:ext>
+    </p:extLst>
+  </p:cSld>
+  <p:clrMapOvr>
+    <a:masterClrMapping/>
+  </p:clrMapOvr>
+</p:sld>
+</file>
+
 <file path=ppt/slides/slide2.xml><?xml version="1.0" encoding="utf-8"?>
 <p:sld xmlns:a="http://schemas.openxmlformats.org/drawingml/2006/main" xmlns:r="http://schemas.openxmlformats.org/officeDocument/2006/relationships" xmlns:p="http://schemas.openxmlformats.org/presentationml/2006/main">
   <p:cSld>
@@ -6762,6 +8449,810 @@
     <p:extLst>
       <p:ext uri="{BB962C8B-B14F-4D97-AF65-F5344CB8AC3E}">
         <p14:creationId xmlns:p14="http://schemas.microsoft.com/office/powerpoint/2010/main" val="3376861716"/>
+      </p:ext>
+    </p:extLst>
+  </p:cSld>
+  <p:clrMapOvr>
+    <a:masterClrMapping/>
+  </p:clrMapOvr>
+</p:sld>
+</file>
+
+<file path=ppt/slides/slide20.xml><?xml version="1.0" encoding="utf-8"?>
+<p:sld xmlns:a="http://schemas.openxmlformats.org/drawingml/2006/main" xmlns:r="http://schemas.openxmlformats.org/officeDocument/2006/relationships" xmlns:p="http://schemas.openxmlformats.org/presentationml/2006/main">
+  <p:cSld>
+    <p:spTree>
+      <p:nvGrpSpPr>
+        <p:cNvPr id="1" name=""/>
+        <p:cNvGrpSpPr/>
+        <p:nvPr/>
+      </p:nvGrpSpPr>
+      <p:grpSpPr>
+        <a:xfrm>
+          <a:off x="0" y="0"/>
+          <a:ext cx="0" cy="0"/>
+          <a:chOff x="0" y="0"/>
+          <a:chExt cx="0" cy="0"/>
+        </a:xfrm>
+      </p:grpSpPr>
+      <p:sp>
+        <p:nvSpPr>
+          <p:cNvPr id="3" name="Rectangle 2">
+            <a:extLst>
+              <a:ext uri="{FF2B5EF4-FFF2-40B4-BE49-F238E27FC236}">
+                <a16:creationId xmlns:a16="http://schemas.microsoft.com/office/drawing/2014/main" id="{3AA739C2-AB61-A547-AD30-E2A2823358F2}"/>
+              </a:ext>
+            </a:extLst>
+          </p:cNvPr>
+          <p:cNvSpPr/>
+          <p:nvPr/>
+        </p:nvSpPr>
+        <p:spPr>
+          <a:xfrm>
+            <a:off x="3810000" y="1143000"/>
+            <a:ext cx="1464105" cy="346760"/>
+          </a:xfrm>
+          <a:prstGeom prst="rect">
+            <a:avLst/>
+          </a:prstGeom>
+          <a:solidFill>
+            <a:schemeClr val="accent6"/>
+          </a:solidFill>
+          <a:ln w="19050">
+            <a:solidFill>
+              <a:schemeClr val="accent6"/>
+            </a:solidFill>
+          </a:ln>
+          <a:effectLst/>
+        </p:spPr>
+        <p:style>
+          <a:lnRef idx="1">
+            <a:schemeClr val="accent2"/>
+          </a:lnRef>
+          <a:fillRef idx="2">
+            <a:schemeClr val="accent2"/>
+          </a:fillRef>
+          <a:effectRef idx="1">
+            <a:schemeClr val="accent2"/>
+          </a:effectRef>
+          <a:fontRef idx="minor">
+            <a:schemeClr val="dk1"/>
+          </a:fontRef>
+        </p:style>
+        <p:txBody>
+          <a:bodyPr rtlCol="0" anchor="ctr"/>
+          <a:lstStyle/>
+          <a:p>
+            <a:pPr algn="ctr"/>
+            <a:r>
+              <a:rPr lang="en-US" sz="1050" dirty="0">
+                <a:solidFill>
+                  <a:schemeClr val="bg1"/>
+                </a:solidFill>
+              </a:rPr>
+              <a:t>Login</a:t>
+            </a:r>
+            <a:endParaRPr lang="en-SG" sz="1050" dirty="0">
+              <a:solidFill>
+                <a:schemeClr val="bg1"/>
+              </a:solidFill>
+            </a:endParaRPr>
+          </a:p>
+        </p:txBody>
+      </p:sp>
+      <p:cxnSp>
+        <p:nvCxnSpPr>
+          <p:cNvPr id="6" name="Elbow Connector 5">
+            <a:extLst>
+              <a:ext uri="{FF2B5EF4-FFF2-40B4-BE49-F238E27FC236}">
+                <a16:creationId xmlns:a16="http://schemas.microsoft.com/office/drawing/2014/main" id="{B90080AB-192A-FA41-AEAF-479249819CBA}"/>
+              </a:ext>
+            </a:extLst>
+          </p:cNvPr>
+          <p:cNvCxnSpPr>
+            <a:cxnSpLocks/>
+            <a:stCxn id="8" idx="0"/>
+            <a:endCxn id="3" idx="2"/>
+          </p:cNvCxnSpPr>
+          <p:nvPr/>
+        </p:nvCxnSpPr>
+        <p:spPr>
+          <a:xfrm rot="16200000" flipV="1">
+            <a:off x="4296969" y="1734844"/>
+            <a:ext cx="493216" cy="3048"/>
+          </a:xfrm>
+          <a:prstGeom prst="bentConnector3">
+            <a:avLst>
+              <a:gd name="adj1" fmla="val 50000"/>
+            </a:avLst>
+          </a:prstGeom>
+          <a:ln w="19050">
+            <a:solidFill>
+              <a:schemeClr val="accent6"/>
+            </a:solidFill>
+            <a:prstDash val="solid"/>
+            <a:headEnd type="none" w="med" len="med"/>
+            <a:tailEnd type="arrow" w="med" len="med"/>
+          </a:ln>
+          <a:effectLst/>
+        </p:spPr>
+        <p:style>
+          <a:lnRef idx="1">
+            <a:schemeClr val="accent2"/>
+          </a:lnRef>
+          <a:fillRef idx="2">
+            <a:schemeClr val="accent2"/>
+          </a:fillRef>
+          <a:effectRef idx="1">
+            <a:schemeClr val="accent2"/>
+          </a:effectRef>
+          <a:fontRef idx="minor">
+            <a:schemeClr val="dk1"/>
+          </a:fontRef>
+        </p:style>
+      </p:cxnSp>
+      <p:sp>
+        <p:nvSpPr>
+          <p:cNvPr id="8" name="Rectangle 7">
+            <a:extLst>
+              <a:ext uri="{FF2B5EF4-FFF2-40B4-BE49-F238E27FC236}">
+                <a16:creationId xmlns:a16="http://schemas.microsoft.com/office/drawing/2014/main" id="{82BEB8CF-465A-A745-B243-BCDCFDD5EE07}"/>
+              </a:ext>
+            </a:extLst>
+          </p:cNvPr>
+          <p:cNvSpPr/>
+          <p:nvPr/>
+        </p:nvSpPr>
+        <p:spPr>
+          <a:xfrm>
+            <a:off x="3813048" y="1982976"/>
+            <a:ext cx="1464105" cy="346760"/>
+          </a:xfrm>
+          <a:prstGeom prst="rect">
+            <a:avLst/>
+          </a:prstGeom>
+          <a:solidFill>
+            <a:schemeClr val="accent6"/>
+          </a:solidFill>
+          <a:ln w="19050">
+            <a:solidFill>
+              <a:schemeClr val="accent6"/>
+            </a:solidFill>
+          </a:ln>
+          <a:effectLst/>
+        </p:spPr>
+        <p:style>
+          <a:lnRef idx="1">
+            <a:schemeClr val="accent2"/>
+          </a:lnRef>
+          <a:fillRef idx="2">
+            <a:schemeClr val="accent2"/>
+          </a:fillRef>
+          <a:effectRef idx="1">
+            <a:schemeClr val="accent2"/>
+          </a:effectRef>
+          <a:fontRef idx="minor">
+            <a:schemeClr val="dk1"/>
+          </a:fontRef>
+        </p:style>
+        <p:txBody>
+          <a:bodyPr rtlCol="0" anchor="ctr"/>
+          <a:lstStyle/>
+          <a:p>
+            <a:pPr algn="ctr"/>
+            <a:r>
+              <a:rPr lang="en-US" sz="1050" dirty="0">
+                <a:solidFill>
+                  <a:schemeClr val="bg1"/>
+                </a:solidFill>
+              </a:rPr>
+              <a:t>Credentials</a:t>
+            </a:r>
+            <a:endParaRPr lang="en-SG" sz="1050" dirty="0">
+              <a:solidFill>
+                <a:schemeClr val="bg1"/>
+              </a:solidFill>
+            </a:endParaRPr>
+          </a:p>
+        </p:txBody>
+      </p:sp>
+      <p:sp>
+        <p:nvSpPr>
+          <p:cNvPr id="10" name="Diamond 9">
+            <a:extLst>
+              <a:ext uri="{FF2B5EF4-FFF2-40B4-BE49-F238E27FC236}">
+                <a16:creationId xmlns:a16="http://schemas.microsoft.com/office/drawing/2014/main" id="{5F361C00-03D2-2340-AE2D-FA073FECB227}"/>
+              </a:ext>
+            </a:extLst>
+          </p:cNvPr>
+          <p:cNvSpPr/>
+          <p:nvPr/>
+        </p:nvSpPr>
+        <p:spPr>
+          <a:xfrm>
+            <a:off x="4459136" y="1489760"/>
+            <a:ext cx="165831" cy="165831"/>
+          </a:xfrm>
+          <a:prstGeom prst="diamond">
+            <a:avLst/>
+          </a:prstGeom>
+          <a:solidFill>
+            <a:schemeClr val="bg1"/>
+          </a:solidFill>
+          <a:ln>
+            <a:solidFill>
+              <a:schemeClr val="accent6"/>
+            </a:solidFill>
+          </a:ln>
+        </p:spPr>
+        <p:style>
+          <a:lnRef idx="2">
+            <a:schemeClr val="accent1">
+              <a:shade val="50000"/>
+            </a:schemeClr>
+          </a:lnRef>
+          <a:fillRef idx="1">
+            <a:schemeClr val="accent1"/>
+          </a:fillRef>
+          <a:effectRef idx="0">
+            <a:schemeClr val="accent1"/>
+          </a:effectRef>
+          <a:fontRef idx="minor">
+            <a:schemeClr val="lt1"/>
+          </a:fontRef>
+        </p:style>
+        <p:txBody>
+          <a:bodyPr rtlCol="0" anchor="ctr"/>
+          <a:lstStyle/>
+          <a:p>
+            <a:pPr algn="ctr"/>
+            <a:endParaRPr lang="en-US"/>
+          </a:p>
+        </p:txBody>
+      </p:sp>
+      <p:cxnSp>
+        <p:nvCxnSpPr>
+          <p:cNvPr id="11" name="Elbow Connector 10">
+            <a:extLst>
+              <a:ext uri="{FF2B5EF4-FFF2-40B4-BE49-F238E27FC236}">
+                <a16:creationId xmlns:a16="http://schemas.microsoft.com/office/drawing/2014/main" id="{2E02824C-FD78-8C4A-B738-AE07DF3C09BE}"/>
+              </a:ext>
+            </a:extLst>
+          </p:cNvPr>
+          <p:cNvCxnSpPr>
+            <a:cxnSpLocks/>
+            <a:stCxn id="8" idx="3"/>
+            <a:endCxn id="12" idx="0"/>
+          </p:cNvCxnSpPr>
+          <p:nvPr/>
+        </p:nvCxnSpPr>
+        <p:spPr>
+          <a:xfrm>
+            <a:off x="5277153" y="2156356"/>
+            <a:ext cx="636500" cy="823772"/>
+          </a:xfrm>
+          <a:prstGeom prst="bentConnector2">
+            <a:avLst/>
+          </a:prstGeom>
+          <a:ln w="19050">
+            <a:solidFill>
+              <a:schemeClr val="accent6"/>
+            </a:solidFill>
+            <a:prstDash val="solid"/>
+            <a:headEnd type="none" w="med" len="med"/>
+            <a:tailEnd type="arrow" w="med" len="med"/>
+          </a:ln>
+          <a:effectLst/>
+        </p:spPr>
+        <p:style>
+          <a:lnRef idx="1">
+            <a:schemeClr val="accent2"/>
+          </a:lnRef>
+          <a:fillRef idx="2">
+            <a:schemeClr val="accent2"/>
+          </a:fillRef>
+          <a:effectRef idx="1">
+            <a:schemeClr val="accent2"/>
+          </a:effectRef>
+          <a:fontRef idx="minor">
+            <a:schemeClr val="dk1"/>
+          </a:fontRef>
+        </p:style>
+      </p:cxnSp>
+      <p:sp>
+        <p:nvSpPr>
+          <p:cNvPr id="12" name="Rectangle 11">
+            <a:extLst>
+              <a:ext uri="{FF2B5EF4-FFF2-40B4-BE49-F238E27FC236}">
+                <a16:creationId xmlns:a16="http://schemas.microsoft.com/office/drawing/2014/main" id="{6809212A-085A-2348-A64C-2CA903DC20AA}"/>
+              </a:ext>
+            </a:extLst>
+          </p:cNvPr>
+          <p:cNvSpPr/>
+          <p:nvPr/>
+        </p:nvSpPr>
+        <p:spPr>
+          <a:xfrm>
+            <a:off x="5181600" y="2980128"/>
+            <a:ext cx="1464105" cy="346760"/>
+          </a:xfrm>
+          <a:prstGeom prst="rect">
+            <a:avLst/>
+          </a:prstGeom>
+          <a:solidFill>
+            <a:schemeClr val="accent6"/>
+          </a:solidFill>
+          <a:ln w="19050">
+            <a:solidFill>
+              <a:schemeClr val="accent6"/>
+            </a:solidFill>
+          </a:ln>
+          <a:effectLst/>
+        </p:spPr>
+        <p:style>
+          <a:lnRef idx="1">
+            <a:schemeClr val="accent2"/>
+          </a:lnRef>
+          <a:fillRef idx="2">
+            <a:schemeClr val="accent2"/>
+          </a:fillRef>
+          <a:effectRef idx="1">
+            <a:schemeClr val="accent2"/>
+          </a:effectRef>
+          <a:fontRef idx="minor">
+            <a:schemeClr val="dk1"/>
+          </a:fontRef>
+        </p:style>
+        <p:txBody>
+          <a:bodyPr rtlCol="0" anchor="ctr"/>
+          <a:lstStyle/>
+          <a:p>
+            <a:pPr algn="ctr"/>
+            <a:r>
+              <a:rPr lang="en-US" sz="1050" dirty="0">
+                <a:solidFill>
+                  <a:schemeClr val="bg1"/>
+                </a:solidFill>
+              </a:rPr>
+              <a:t>hashing</a:t>
+            </a:r>
+            <a:endParaRPr lang="en-SG" sz="1050" dirty="0">
+              <a:solidFill>
+                <a:schemeClr val="bg1"/>
+              </a:solidFill>
+            </a:endParaRPr>
+          </a:p>
+        </p:txBody>
+      </p:sp>
+      <p:sp>
+        <p:nvSpPr>
+          <p:cNvPr id="14" name="Rectangle 13">
+            <a:extLst>
+              <a:ext uri="{FF2B5EF4-FFF2-40B4-BE49-F238E27FC236}">
+                <a16:creationId xmlns:a16="http://schemas.microsoft.com/office/drawing/2014/main" id="{4B576A40-84A3-B340-8241-3029E5E5CAF6}"/>
+              </a:ext>
+            </a:extLst>
+          </p:cNvPr>
+          <p:cNvSpPr/>
+          <p:nvPr/>
+        </p:nvSpPr>
+        <p:spPr>
+          <a:xfrm>
+            <a:off x="2269695" y="2980128"/>
+            <a:ext cx="1464105" cy="346760"/>
+          </a:xfrm>
+          <a:prstGeom prst="rect">
+            <a:avLst/>
+          </a:prstGeom>
+          <a:solidFill>
+            <a:schemeClr val="accent6"/>
+          </a:solidFill>
+          <a:ln w="19050">
+            <a:solidFill>
+              <a:schemeClr val="accent6"/>
+            </a:solidFill>
+          </a:ln>
+          <a:effectLst/>
+        </p:spPr>
+        <p:style>
+          <a:lnRef idx="1">
+            <a:schemeClr val="accent2"/>
+          </a:lnRef>
+          <a:fillRef idx="2">
+            <a:schemeClr val="accent2"/>
+          </a:fillRef>
+          <a:effectRef idx="1">
+            <a:schemeClr val="accent2"/>
+          </a:effectRef>
+          <a:fontRef idx="minor">
+            <a:schemeClr val="dk1"/>
+          </a:fontRef>
+        </p:style>
+        <p:txBody>
+          <a:bodyPr rtlCol="0" anchor="ctr"/>
+          <a:lstStyle/>
+          <a:p>
+            <a:pPr algn="ctr"/>
+            <a:r>
+              <a:rPr lang="en-US" sz="1050" dirty="0" err="1">
+                <a:solidFill>
+                  <a:schemeClr val="bg1"/>
+                </a:solidFill>
+              </a:rPr>
+              <a:t>WorkWIthLoginStorage</a:t>
+            </a:r>
+            <a:endParaRPr lang="en-SG" sz="1050" dirty="0">
+              <a:solidFill>
+                <a:schemeClr val="bg1"/>
+              </a:solidFill>
+            </a:endParaRPr>
+          </a:p>
+        </p:txBody>
+      </p:sp>
+      <p:cxnSp>
+        <p:nvCxnSpPr>
+          <p:cNvPr id="16" name="Elbow Connector 15">
+            <a:extLst>
+              <a:ext uri="{FF2B5EF4-FFF2-40B4-BE49-F238E27FC236}">
+                <a16:creationId xmlns:a16="http://schemas.microsoft.com/office/drawing/2014/main" id="{AC56E96E-9BBC-3A4E-8A4C-3D9255C6EA54}"/>
+              </a:ext>
+            </a:extLst>
+          </p:cNvPr>
+          <p:cNvCxnSpPr>
+            <a:cxnSpLocks/>
+            <a:stCxn id="8" idx="1"/>
+            <a:endCxn id="14" idx="0"/>
+          </p:cNvCxnSpPr>
+          <p:nvPr/>
+        </p:nvCxnSpPr>
+        <p:spPr>
+          <a:xfrm rot="10800000" flipV="1">
+            <a:off x="3001748" y="2156356"/>
+            <a:ext cx="811300" cy="823772"/>
+          </a:xfrm>
+          <a:prstGeom prst="bentConnector2">
+            <a:avLst/>
+          </a:prstGeom>
+          <a:ln w="19050">
+            <a:solidFill>
+              <a:schemeClr val="accent6"/>
+            </a:solidFill>
+            <a:prstDash val="solid"/>
+            <a:headEnd type="none" w="med" len="med"/>
+            <a:tailEnd type="arrow" w="med" len="med"/>
+          </a:ln>
+          <a:effectLst/>
+        </p:spPr>
+        <p:style>
+          <a:lnRef idx="1">
+            <a:schemeClr val="accent2"/>
+          </a:lnRef>
+          <a:fillRef idx="2">
+            <a:schemeClr val="accent2"/>
+          </a:fillRef>
+          <a:effectRef idx="1">
+            <a:schemeClr val="accent2"/>
+          </a:effectRef>
+          <a:fontRef idx="minor">
+            <a:schemeClr val="dk1"/>
+          </a:fontRef>
+        </p:style>
+      </p:cxnSp>
+      <p:cxnSp>
+        <p:nvCxnSpPr>
+          <p:cNvPr id="18" name="Elbow Connector 17">
+            <a:extLst>
+              <a:ext uri="{FF2B5EF4-FFF2-40B4-BE49-F238E27FC236}">
+                <a16:creationId xmlns:a16="http://schemas.microsoft.com/office/drawing/2014/main" id="{8A1558D3-48D4-6946-9ADF-C1A307DB56AB}"/>
+              </a:ext>
+            </a:extLst>
+          </p:cNvPr>
+          <p:cNvCxnSpPr>
+            <a:cxnSpLocks/>
+            <a:stCxn id="12" idx="1"/>
+            <a:endCxn id="14" idx="3"/>
+          </p:cNvCxnSpPr>
+          <p:nvPr/>
+        </p:nvCxnSpPr>
+        <p:spPr>
+          <a:xfrm rot="10800000">
+            <a:off x="3733800" y="3153508"/>
+            <a:ext cx="1447800" cy="12700"/>
+          </a:xfrm>
+          <a:prstGeom prst="bentConnector3">
+            <a:avLst>
+              <a:gd name="adj1" fmla="val 50000"/>
+            </a:avLst>
+          </a:prstGeom>
+          <a:ln w="19050">
+            <a:solidFill>
+              <a:schemeClr val="accent6"/>
+            </a:solidFill>
+            <a:prstDash val="solid"/>
+            <a:headEnd type="none" w="med" len="med"/>
+            <a:tailEnd type="arrow" w="med" len="med"/>
+          </a:ln>
+          <a:effectLst/>
+        </p:spPr>
+        <p:style>
+          <a:lnRef idx="1">
+            <a:schemeClr val="accent2"/>
+          </a:lnRef>
+          <a:fillRef idx="2">
+            <a:schemeClr val="accent2"/>
+          </a:fillRef>
+          <a:effectRef idx="1">
+            <a:schemeClr val="accent2"/>
+          </a:effectRef>
+          <a:fontRef idx="minor">
+            <a:schemeClr val="dk1"/>
+          </a:fontRef>
+        </p:style>
+      </p:cxnSp>
+    </p:spTree>
+    <p:extLst>
+      <p:ext uri="{BB962C8B-B14F-4D97-AF65-F5344CB8AC3E}">
+        <p14:creationId xmlns:p14="http://schemas.microsoft.com/office/powerpoint/2010/main" val="39349434"/>
+      </p:ext>
+    </p:extLst>
+  </p:cSld>
+  <p:clrMapOvr>
+    <a:masterClrMapping/>
+  </p:clrMapOvr>
+</p:sld>
+</file>
+
+<file path=ppt/slides/slide21.xml><?xml version="1.0" encoding="utf-8"?>
+<p:sld xmlns:a="http://schemas.openxmlformats.org/drawingml/2006/main" xmlns:r="http://schemas.openxmlformats.org/officeDocument/2006/relationships" xmlns:p="http://schemas.openxmlformats.org/presentationml/2006/main">
+  <p:cSld>
+    <p:spTree>
+      <p:nvGrpSpPr>
+        <p:cNvPr id="1" name=""/>
+        <p:cNvGrpSpPr/>
+        <p:nvPr/>
+      </p:nvGrpSpPr>
+      <p:grpSpPr>
+        <a:xfrm>
+          <a:off x="0" y="0"/>
+          <a:ext cx="0" cy="0"/>
+          <a:chOff x="0" y="0"/>
+          <a:chExt cx="0" cy="0"/>
+        </a:xfrm>
+      </p:grpSpPr>
+      <p:sp>
+        <p:nvSpPr>
+          <p:cNvPr id="2" name="TextBox 1">
+            <a:extLst>
+              <a:ext uri="{FF2B5EF4-FFF2-40B4-BE49-F238E27FC236}">
+                <a16:creationId xmlns:a16="http://schemas.microsoft.com/office/drawing/2014/main" id="{4D05C971-D981-664C-A746-65DFB8DF78C0}"/>
+              </a:ext>
+            </a:extLst>
+          </p:cNvPr>
+          <p:cNvSpPr txBox="1"/>
+          <p:nvPr/>
+        </p:nvSpPr>
+        <p:spPr>
+          <a:xfrm>
+            <a:off x="3608832" y="3840480"/>
+            <a:ext cx="332142" cy="369332"/>
+          </a:xfrm>
+          <a:prstGeom prst="rect">
+            <a:avLst/>
+          </a:prstGeom>
+          <a:noFill/>
+        </p:spPr>
+        <p:txBody>
+          <a:bodyPr wrap="none" rtlCol="0">
+            <a:spAutoFit/>
+          </a:bodyPr>
+          <a:lstStyle/>
+          <a:p>
+            <a:r>
+              <a:rPr lang="en-US" dirty="0"/>
+              <a:t>JJ</a:t>
+            </a:r>
+          </a:p>
+        </p:txBody>
+      </p:sp>
+    </p:spTree>
+    <p:extLst>
+      <p:ext uri="{BB962C8B-B14F-4D97-AF65-F5344CB8AC3E}">
+        <p14:creationId xmlns:p14="http://schemas.microsoft.com/office/powerpoint/2010/main" val="772333017"/>
+      </p:ext>
+    </p:extLst>
+  </p:cSld>
+  <p:clrMapOvr>
+    <a:masterClrMapping/>
+  </p:clrMapOvr>
+</p:sld>
+</file>
+
+<file path=ppt/slides/slide22.xml><?xml version="1.0" encoding="utf-8"?>
+<p:sld xmlns:a="http://schemas.openxmlformats.org/drawingml/2006/main" xmlns:r="http://schemas.openxmlformats.org/officeDocument/2006/relationships" xmlns:p="http://schemas.openxmlformats.org/presentationml/2006/main">
+  <p:cSld>
+    <p:spTree>
+      <p:nvGrpSpPr>
+        <p:cNvPr id="1" name=""/>
+        <p:cNvGrpSpPr/>
+        <p:nvPr/>
+      </p:nvGrpSpPr>
+      <p:grpSpPr>
+        <a:xfrm>
+          <a:off x="0" y="0"/>
+          <a:ext cx="0" cy="0"/>
+          <a:chOff x="0" y="0"/>
+          <a:chExt cx="0" cy="0"/>
+        </a:xfrm>
+      </p:grpSpPr>
+      <p:sp>
+        <p:nvSpPr>
+          <p:cNvPr id="2" name="TextBox 1">
+            <a:extLst>
+              <a:ext uri="{FF2B5EF4-FFF2-40B4-BE49-F238E27FC236}">
+                <a16:creationId xmlns:a16="http://schemas.microsoft.com/office/drawing/2014/main" id="{4D05C971-D981-664C-A746-65DFB8DF78C0}"/>
+              </a:ext>
+            </a:extLst>
+          </p:cNvPr>
+          <p:cNvSpPr txBox="1"/>
+          <p:nvPr/>
+        </p:nvSpPr>
+        <p:spPr>
+          <a:xfrm>
+            <a:off x="3608832" y="3840480"/>
+            <a:ext cx="332142" cy="369332"/>
+          </a:xfrm>
+          <a:prstGeom prst="rect">
+            <a:avLst/>
+          </a:prstGeom>
+          <a:noFill/>
+        </p:spPr>
+        <p:txBody>
+          <a:bodyPr wrap="none" rtlCol="0">
+            <a:spAutoFit/>
+          </a:bodyPr>
+          <a:lstStyle/>
+          <a:p>
+            <a:r>
+              <a:rPr lang="en-US" dirty="0"/>
+              <a:t>JJ</a:t>
+            </a:r>
+          </a:p>
+        </p:txBody>
+      </p:sp>
+    </p:spTree>
+    <p:extLst>
+      <p:ext uri="{BB962C8B-B14F-4D97-AF65-F5344CB8AC3E}">
+        <p14:creationId xmlns:p14="http://schemas.microsoft.com/office/powerpoint/2010/main" val="3702046556"/>
+      </p:ext>
+    </p:extLst>
+  </p:cSld>
+  <p:clrMapOvr>
+    <a:masterClrMapping/>
+  </p:clrMapOvr>
+</p:sld>
+</file>
+
+<file path=ppt/slides/slide23.xml><?xml version="1.0" encoding="utf-8"?>
+<p:sld xmlns:a="http://schemas.openxmlformats.org/drawingml/2006/main" xmlns:r="http://schemas.openxmlformats.org/officeDocument/2006/relationships" xmlns:p="http://schemas.openxmlformats.org/presentationml/2006/main">
+  <p:cSld>
+    <p:spTree>
+      <p:nvGrpSpPr>
+        <p:cNvPr id="1" name=""/>
+        <p:cNvGrpSpPr/>
+        <p:nvPr/>
+      </p:nvGrpSpPr>
+      <p:grpSpPr>
+        <a:xfrm>
+          <a:off x="0" y="0"/>
+          <a:ext cx="0" cy="0"/>
+          <a:chOff x="0" y="0"/>
+          <a:chExt cx="0" cy="0"/>
+        </a:xfrm>
+      </p:grpSpPr>
+      <p:sp>
+        <p:nvSpPr>
+          <p:cNvPr id="2" name="TextBox 1">
+            <a:extLst>
+              <a:ext uri="{FF2B5EF4-FFF2-40B4-BE49-F238E27FC236}">
+                <a16:creationId xmlns:a16="http://schemas.microsoft.com/office/drawing/2014/main" id="{4D05C971-D981-664C-A746-65DFB8DF78C0}"/>
+              </a:ext>
+            </a:extLst>
+          </p:cNvPr>
+          <p:cNvSpPr txBox="1"/>
+          <p:nvPr/>
+        </p:nvSpPr>
+        <p:spPr>
+          <a:xfrm>
+            <a:off x="3608832" y="3840480"/>
+            <a:ext cx="332142" cy="369332"/>
+          </a:xfrm>
+          <a:prstGeom prst="rect">
+            <a:avLst/>
+          </a:prstGeom>
+          <a:noFill/>
+        </p:spPr>
+        <p:txBody>
+          <a:bodyPr wrap="none" rtlCol="0">
+            <a:spAutoFit/>
+          </a:bodyPr>
+          <a:lstStyle/>
+          <a:p>
+            <a:r>
+              <a:rPr lang="en-US" dirty="0"/>
+              <a:t>JJ</a:t>
+            </a:r>
+          </a:p>
+        </p:txBody>
+      </p:sp>
+    </p:spTree>
+    <p:extLst>
+      <p:ext uri="{BB962C8B-B14F-4D97-AF65-F5344CB8AC3E}">
+        <p14:creationId xmlns:p14="http://schemas.microsoft.com/office/powerpoint/2010/main" val="1647318354"/>
+      </p:ext>
+    </p:extLst>
+  </p:cSld>
+  <p:clrMapOvr>
+    <a:masterClrMapping/>
+  </p:clrMapOvr>
+</p:sld>
+</file>
+
+<file path=ppt/slides/slide24.xml><?xml version="1.0" encoding="utf-8"?>
+<p:sld xmlns:a="http://schemas.openxmlformats.org/drawingml/2006/main" xmlns:r="http://schemas.openxmlformats.org/officeDocument/2006/relationships" xmlns:p="http://schemas.openxmlformats.org/presentationml/2006/main">
+  <p:cSld>
+    <p:spTree>
+      <p:nvGrpSpPr>
+        <p:cNvPr id="1" name=""/>
+        <p:cNvGrpSpPr/>
+        <p:nvPr/>
+      </p:nvGrpSpPr>
+      <p:grpSpPr>
+        <a:xfrm>
+          <a:off x="0" y="0"/>
+          <a:ext cx="0" cy="0"/>
+          <a:chOff x="0" y="0"/>
+          <a:chExt cx="0" cy="0"/>
+        </a:xfrm>
+      </p:grpSpPr>
+      <p:sp>
+        <p:nvSpPr>
+          <p:cNvPr id="2" name="TextBox 1">
+            <a:extLst>
+              <a:ext uri="{FF2B5EF4-FFF2-40B4-BE49-F238E27FC236}">
+                <a16:creationId xmlns:a16="http://schemas.microsoft.com/office/drawing/2014/main" id="{4D05C971-D981-664C-A746-65DFB8DF78C0}"/>
+              </a:ext>
+            </a:extLst>
+          </p:cNvPr>
+          <p:cNvSpPr txBox="1"/>
+          <p:nvPr/>
+        </p:nvSpPr>
+        <p:spPr>
+          <a:xfrm>
+            <a:off x="3608832" y="3840480"/>
+            <a:ext cx="332142" cy="369332"/>
+          </a:xfrm>
+          <a:prstGeom prst="rect">
+            <a:avLst/>
+          </a:prstGeom>
+          <a:noFill/>
+        </p:spPr>
+        <p:txBody>
+          <a:bodyPr wrap="none" rtlCol="0">
+            <a:spAutoFit/>
+          </a:bodyPr>
+          <a:lstStyle/>
+          <a:p>
+            <a:r>
+              <a:rPr lang="en-US" dirty="0"/>
+              <a:t>JJ</a:t>
+            </a:r>
+          </a:p>
+        </p:txBody>
+      </p:sp>
+    </p:spTree>
+    <p:extLst>
+      <p:ext uri="{BB962C8B-B14F-4D97-AF65-F5344CB8AC3E}">
+        <p14:creationId xmlns:p14="http://schemas.microsoft.com/office/powerpoint/2010/main" val="2559683323"/>
       </p:ext>
     </p:extLst>
   </p:cSld>
@@ -9534,777 +12025,10 @@
       </p:grpSpPr>
       <p:sp>
         <p:nvSpPr>
-          <p:cNvPr id="2" name="Rectangle 1">
+          <p:cNvPr id="2" name="TextBox 1">
             <a:extLst>
               <a:ext uri="{FF2B5EF4-FFF2-40B4-BE49-F238E27FC236}">
-                <a16:creationId xmlns:a16="http://schemas.microsoft.com/office/drawing/2014/main" id="{811E94C6-63E4-439C-84FF-947F54D3C9B2}"/>
-              </a:ext>
-            </a:extLst>
-          </p:cNvPr>
-          <p:cNvSpPr/>
-          <p:nvPr/>
-        </p:nvSpPr>
-        <p:spPr>
-          <a:xfrm>
-            <a:off x="6132711" y="2900822"/>
-            <a:ext cx="696972" cy="260070"/>
-          </a:xfrm>
-          <a:prstGeom prst="rect">
-            <a:avLst/>
-          </a:prstGeom>
-          <a:solidFill>
-            <a:srgbClr val="7030A0"/>
-          </a:solidFill>
-          <a:ln w="19050">
-            <a:solidFill>
-              <a:srgbClr val="7030A0"/>
-            </a:solidFill>
-          </a:ln>
-          <a:effectLst/>
-        </p:spPr>
-        <p:style>
-          <a:lnRef idx="1">
-            <a:schemeClr val="accent6"/>
-          </a:lnRef>
-          <a:fillRef idx="2">
-            <a:schemeClr val="accent6"/>
-          </a:fillRef>
-          <a:effectRef idx="1">
-            <a:schemeClr val="accent6"/>
-          </a:effectRef>
-          <a:fontRef idx="minor">
-            <a:schemeClr val="dk1"/>
-          </a:fontRef>
-        </p:style>
-        <p:txBody>
-          <a:bodyPr rtlCol="0" anchor="ctr"/>
-          <a:lstStyle/>
-          <a:p>
-            <a:pPr algn="ctr"/>
-            <a:r>
-              <a:rPr lang="en-US" sz="788" dirty="0">
-                <a:solidFill>
-                  <a:schemeClr val="bg1"/>
-                </a:solidFill>
-              </a:rPr>
-              <a:t>Person</a:t>
-            </a:r>
-            <a:endParaRPr lang="en-SG" sz="788" dirty="0">
-              <a:solidFill>
-                <a:schemeClr val="bg1"/>
-              </a:solidFill>
-            </a:endParaRPr>
-          </a:p>
-        </p:txBody>
-      </p:sp>
-      <p:sp>
-        <p:nvSpPr>
-          <p:cNvPr id="3" name="Rectangle 2">
-            <a:extLst>
-              <a:ext uri="{FF2B5EF4-FFF2-40B4-BE49-F238E27FC236}">
-                <a16:creationId xmlns:a16="http://schemas.microsoft.com/office/drawing/2014/main" id="{703D26E1-8543-4B87-B39D-A4CAF76C4CD3}"/>
-              </a:ext>
-            </a:extLst>
-          </p:cNvPr>
-          <p:cNvSpPr/>
-          <p:nvPr/>
-        </p:nvSpPr>
-        <p:spPr>
-          <a:xfrm>
-            <a:off x="7521638" y="2082007"/>
-            <a:ext cx="696972" cy="260070"/>
-          </a:xfrm>
-          <a:prstGeom prst="rect">
-            <a:avLst/>
-          </a:prstGeom>
-          <a:ln w="19050"/>
-          <a:effectLst/>
-        </p:spPr>
-        <p:style>
-          <a:lnRef idx="1">
-            <a:schemeClr val="accent4"/>
-          </a:lnRef>
-          <a:fillRef idx="2">
-            <a:schemeClr val="accent4"/>
-          </a:fillRef>
-          <a:effectRef idx="1">
-            <a:schemeClr val="accent4"/>
-          </a:effectRef>
-          <a:fontRef idx="minor">
-            <a:schemeClr val="dk1"/>
-          </a:fontRef>
-        </p:style>
-        <p:txBody>
-          <a:bodyPr rtlCol="0" anchor="ctr"/>
-          <a:lstStyle/>
-          <a:p>
-            <a:pPr algn="ctr"/>
-            <a:r>
-              <a:rPr lang="en-US" sz="788" dirty="0"/>
-              <a:t>Phone</a:t>
-            </a:r>
-            <a:endParaRPr lang="en-SG" sz="788" dirty="0"/>
-          </a:p>
-        </p:txBody>
-      </p:sp>
-      <p:sp>
-        <p:nvSpPr>
-          <p:cNvPr id="4" name="Rectangle 3">
-            <a:extLst>
-              <a:ext uri="{FF2B5EF4-FFF2-40B4-BE49-F238E27FC236}">
-                <a16:creationId xmlns:a16="http://schemas.microsoft.com/office/drawing/2014/main" id="{2AA16EB8-18F9-4D36-9381-5C805FB508B3}"/>
-              </a:ext>
-            </a:extLst>
-          </p:cNvPr>
-          <p:cNvSpPr/>
-          <p:nvPr/>
-        </p:nvSpPr>
-        <p:spPr>
-          <a:xfrm>
-            <a:off x="7521638" y="2424907"/>
-            <a:ext cx="696972" cy="260070"/>
-          </a:xfrm>
-          <a:prstGeom prst="rect">
-            <a:avLst/>
-          </a:prstGeom>
-          <a:ln w="19050"/>
-          <a:effectLst/>
-        </p:spPr>
-        <p:style>
-          <a:lnRef idx="1">
-            <a:schemeClr val="accent4"/>
-          </a:lnRef>
-          <a:fillRef idx="2">
-            <a:schemeClr val="accent4"/>
-          </a:fillRef>
-          <a:effectRef idx="1">
-            <a:schemeClr val="accent4"/>
-          </a:effectRef>
-          <a:fontRef idx="minor">
-            <a:schemeClr val="dk1"/>
-          </a:fontRef>
-        </p:style>
-        <p:txBody>
-          <a:bodyPr rtlCol="0" anchor="ctr"/>
-          <a:lstStyle/>
-          <a:p>
-            <a:pPr algn="ctr"/>
-            <a:r>
-              <a:rPr lang="en-US" sz="788" dirty="0"/>
-              <a:t>Email</a:t>
-            </a:r>
-            <a:endParaRPr lang="en-SG" sz="788" dirty="0"/>
-          </a:p>
-        </p:txBody>
-      </p:sp>
-      <p:sp>
-        <p:nvSpPr>
-          <p:cNvPr id="5" name="Rectangle 4">
-            <a:extLst>
-              <a:ext uri="{FF2B5EF4-FFF2-40B4-BE49-F238E27FC236}">
-                <a16:creationId xmlns:a16="http://schemas.microsoft.com/office/drawing/2014/main" id="{7D5E86AC-DBB2-40C5-B0DC-209879D80A73}"/>
-              </a:ext>
-            </a:extLst>
-          </p:cNvPr>
-          <p:cNvSpPr/>
-          <p:nvPr/>
-        </p:nvSpPr>
-        <p:spPr>
-          <a:xfrm>
-            <a:off x="7521638" y="2767807"/>
-            <a:ext cx="696972" cy="260070"/>
-          </a:xfrm>
-          <a:prstGeom prst="rect">
-            <a:avLst/>
-          </a:prstGeom>
-          <a:ln w="19050"/>
-          <a:effectLst/>
-        </p:spPr>
-        <p:style>
-          <a:lnRef idx="1">
-            <a:schemeClr val="accent4"/>
-          </a:lnRef>
-          <a:fillRef idx="2">
-            <a:schemeClr val="accent4"/>
-          </a:fillRef>
-          <a:effectRef idx="1">
-            <a:schemeClr val="accent4"/>
-          </a:effectRef>
-          <a:fontRef idx="minor">
-            <a:schemeClr val="dk1"/>
-          </a:fontRef>
-        </p:style>
-        <p:txBody>
-          <a:bodyPr rtlCol="0" anchor="ctr"/>
-          <a:lstStyle/>
-          <a:p>
-            <a:pPr algn="ctr"/>
-            <a:r>
-              <a:rPr lang="en-US" sz="788" dirty="0"/>
-              <a:t>Address</a:t>
-            </a:r>
-            <a:endParaRPr lang="en-SG" sz="788" dirty="0"/>
-          </a:p>
-        </p:txBody>
-      </p:sp>
-      <p:cxnSp>
-        <p:nvCxnSpPr>
-          <p:cNvPr id="6" name="Elbow Connector 61">
-            <a:extLst>
-              <a:ext uri="{FF2B5EF4-FFF2-40B4-BE49-F238E27FC236}">
-                <a16:creationId xmlns:a16="http://schemas.microsoft.com/office/drawing/2014/main" id="{0F48A7E8-E1B9-44A3-A4AF-6DF6DCCF1A36}"/>
-              </a:ext>
-            </a:extLst>
-          </p:cNvPr>
-          <p:cNvCxnSpPr>
-            <a:cxnSpLocks/>
-            <a:stCxn id="2" idx="3"/>
-            <a:endCxn id="16" idx="1"/>
-          </p:cNvCxnSpPr>
-          <p:nvPr/>
-        </p:nvCxnSpPr>
-        <p:spPr>
-          <a:xfrm>
-            <a:off x="6829683" y="3030857"/>
-            <a:ext cx="707211" cy="1246901"/>
-          </a:xfrm>
-          <a:prstGeom prst="bentConnector3">
-            <a:avLst>
-              <a:gd name="adj1" fmla="val 61637"/>
-            </a:avLst>
-          </a:prstGeom>
-          <a:ln w="19050">
-            <a:solidFill>
-              <a:srgbClr val="7030A0"/>
-            </a:solidFill>
-            <a:headEnd type="none" w="med" len="med"/>
-            <a:tailEnd type="arrow" w="med" len="med"/>
-          </a:ln>
-          <a:effectLst/>
-        </p:spPr>
-        <p:style>
-          <a:lnRef idx="1">
-            <a:schemeClr val="accent6"/>
-          </a:lnRef>
-          <a:fillRef idx="2">
-            <a:schemeClr val="accent6"/>
-          </a:fillRef>
-          <a:effectRef idx="1">
-            <a:schemeClr val="accent6"/>
-          </a:effectRef>
-          <a:fontRef idx="minor">
-            <a:schemeClr val="dk1"/>
-          </a:fontRef>
-        </p:style>
-      </p:cxnSp>
-      <p:cxnSp>
-        <p:nvCxnSpPr>
-          <p:cNvPr id="7" name="Elbow Connector 64">
-            <a:extLst>
-              <a:ext uri="{FF2B5EF4-FFF2-40B4-BE49-F238E27FC236}">
-                <a16:creationId xmlns:a16="http://schemas.microsoft.com/office/drawing/2014/main" id="{83C492EA-FB7A-44C1-A6BA-81A6D14A61B2}"/>
-              </a:ext>
-            </a:extLst>
-          </p:cNvPr>
-          <p:cNvCxnSpPr>
-            <a:stCxn id="10" idx="3"/>
-            <a:endCxn id="3" idx="1"/>
-          </p:cNvCxnSpPr>
-          <p:nvPr/>
-        </p:nvCxnSpPr>
-        <p:spPr>
-          <a:xfrm flipV="1">
-            <a:off x="7006719" y="2212042"/>
-            <a:ext cx="514919" cy="815835"/>
-          </a:xfrm>
-          <a:prstGeom prst="bentConnector3">
-            <a:avLst>
-              <a:gd name="adj1" fmla="val 50000"/>
-            </a:avLst>
-          </a:prstGeom>
-          <a:ln w="19050">
-            <a:solidFill>
-              <a:srgbClr val="7030A0"/>
-            </a:solidFill>
-            <a:headEnd type="none" w="med" len="med"/>
-            <a:tailEnd type="arrow" w="med" len="med"/>
-          </a:ln>
-          <a:effectLst/>
-        </p:spPr>
-        <p:style>
-          <a:lnRef idx="1">
-            <a:schemeClr val="accent6"/>
-          </a:lnRef>
-          <a:fillRef idx="2">
-            <a:schemeClr val="accent6"/>
-          </a:fillRef>
-          <a:effectRef idx="1">
-            <a:schemeClr val="accent6"/>
-          </a:effectRef>
-          <a:fontRef idx="minor">
-            <a:schemeClr val="dk1"/>
-          </a:fontRef>
-        </p:style>
-      </p:cxnSp>
-      <p:cxnSp>
-        <p:nvCxnSpPr>
-          <p:cNvPr id="8" name="Elbow Connector 67">
-            <a:extLst>
-              <a:ext uri="{FF2B5EF4-FFF2-40B4-BE49-F238E27FC236}">
-                <a16:creationId xmlns:a16="http://schemas.microsoft.com/office/drawing/2014/main" id="{B842DE51-0588-423F-A828-A2469ACE46C0}"/>
-              </a:ext>
-            </a:extLst>
-          </p:cNvPr>
-          <p:cNvCxnSpPr>
-            <a:stCxn id="10" idx="3"/>
-            <a:endCxn id="4" idx="1"/>
-          </p:cNvCxnSpPr>
-          <p:nvPr/>
-        </p:nvCxnSpPr>
-        <p:spPr>
-          <a:xfrm flipV="1">
-            <a:off x="7006719" y="2554942"/>
-            <a:ext cx="514919" cy="472935"/>
-          </a:xfrm>
-          <a:prstGeom prst="bentConnector3">
-            <a:avLst>
-              <a:gd name="adj1" fmla="val 50000"/>
-            </a:avLst>
-          </a:prstGeom>
-          <a:ln w="19050">
-            <a:solidFill>
-              <a:srgbClr val="7030A0"/>
-            </a:solidFill>
-            <a:headEnd type="none" w="med" len="med"/>
-            <a:tailEnd type="arrow" w="med" len="med"/>
-          </a:ln>
-          <a:effectLst/>
-        </p:spPr>
-        <p:style>
-          <a:lnRef idx="1">
-            <a:schemeClr val="accent6"/>
-          </a:lnRef>
-          <a:fillRef idx="2">
-            <a:schemeClr val="accent6"/>
-          </a:fillRef>
-          <a:effectRef idx="1">
-            <a:schemeClr val="accent6"/>
-          </a:effectRef>
-          <a:fontRef idx="minor">
-            <a:schemeClr val="dk1"/>
-          </a:fontRef>
-        </p:style>
-      </p:cxnSp>
-      <p:cxnSp>
-        <p:nvCxnSpPr>
-          <p:cNvPr id="9" name="Elbow Connector 70">
-            <a:extLst>
-              <a:ext uri="{FF2B5EF4-FFF2-40B4-BE49-F238E27FC236}">
-                <a16:creationId xmlns:a16="http://schemas.microsoft.com/office/drawing/2014/main" id="{D677F9F4-E1E8-443F-BA5F-BA76284F8150}"/>
-              </a:ext>
-            </a:extLst>
-          </p:cNvPr>
-          <p:cNvCxnSpPr>
-            <a:stCxn id="10" idx="3"/>
-            <a:endCxn id="5" idx="1"/>
-          </p:cNvCxnSpPr>
-          <p:nvPr/>
-        </p:nvCxnSpPr>
-        <p:spPr>
-          <a:xfrm flipV="1">
-            <a:off x="7006719" y="2897842"/>
-            <a:ext cx="514919" cy="130035"/>
-          </a:xfrm>
-          <a:prstGeom prst="bentConnector3">
-            <a:avLst>
-              <a:gd name="adj1" fmla="val 50000"/>
-            </a:avLst>
-          </a:prstGeom>
-          <a:ln w="19050">
-            <a:solidFill>
-              <a:srgbClr val="7030A0"/>
-            </a:solidFill>
-            <a:headEnd type="none" w="med" len="med"/>
-            <a:tailEnd type="arrow" w="med" len="med"/>
-          </a:ln>
-          <a:effectLst/>
-        </p:spPr>
-        <p:style>
-          <a:lnRef idx="1">
-            <a:schemeClr val="accent6"/>
-          </a:lnRef>
-          <a:fillRef idx="2">
-            <a:schemeClr val="accent6"/>
-          </a:fillRef>
-          <a:effectRef idx="1">
-            <a:schemeClr val="accent6"/>
-          </a:effectRef>
-          <a:fontRef idx="minor">
-            <a:schemeClr val="dk1"/>
-          </a:fontRef>
-        </p:style>
-      </p:cxnSp>
-      <p:sp>
-        <p:nvSpPr>
-          <p:cNvPr id="10" name="Flowchart: Decision 9">
-            <a:extLst>
-              <a:ext uri="{FF2B5EF4-FFF2-40B4-BE49-F238E27FC236}">
-                <a16:creationId xmlns:a16="http://schemas.microsoft.com/office/drawing/2014/main" id="{D835CBA8-231D-4893-B3B9-F5BF2474AAE9}"/>
-              </a:ext>
-            </a:extLst>
-          </p:cNvPr>
-          <p:cNvSpPr/>
-          <p:nvPr/>
-        </p:nvSpPr>
-        <p:spPr>
-          <a:xfrm>
-            <a:off x="6829683" y="2962859"/>
-            <a:ext cx="177036" cy="130035"/>
-          </a:xfrm>
-          <a:prstGeom prst="flowChartDecision">
-            <a:avLst/>
-          </a:prstGeom>
-          <a:solidFill>
-            <a:srgbClr val="7030A0"/>
-          </a:solidFill>
-          <a:ln w="19050">
-            <a:solidFill>
-              <a:srgbClr val="7030A0"/>
-            </a:solidFill>
-          </a:ln>
-          <a:effectLst/>
-        </p:spPr>
-        <p:style>
-          <a:lnRef idx="1">
-            <a:schemeClr val="accent6"/>
-          </a:lnRef>
-          <a:fillRef idx="2">
-            <a:schemeClr val="accent6"/>
-          </a:fillRef>
-          <a:effectRef idx="1">
-            <a:schemeClr val="accent6"/>
-          </a:effectRef>
-          <a:fontRef idx="minor">
-            <a:schemeClr val="dk1"/>
-          </a:fontRef>
-        </p:style>
-        <p:txBody>
-          <a:bodyPr rtlCol="0" anchor="ctr"/>
-          <a:lstStyle/>
-          <a:p>
-            <a:pPr algn="ctr"/>
-            <a:endParaRPr lang="en-US" sz="788"/>
-          </a:p>
-        </p:txBody>
-      </p:sp>
-      <p:sp>
-        <p:nvSpPr>
-          <p:cNvPr id="11" name="Rectangle 10">
-            <a:extLst>
-              <a:ext uri="{FF2B5EF4-FFF2-40B4-BE49-F238E27FC236}">
-                <a16:creationId xmlns:a16="http://schemas.microsoft.com/office/drawing/2014/main" id="{30B52089-5828-4E6B-A8E5-1A1587EEBC00}"/>
-              </a:ext>
-            </a:extLst>
-          </p:cNvPr>
-          <p:cNvSpPr/>
-          <p:nvPr/>
-        </p:nvSpPr>
-        <p:spPr>
-          <a:xfrm>
-            <a:off x="5927281" y="3491615"/>
-            <a:ext cx="1056449" cy="260070"/>
-          </a:xfrm>
-          <a:prstGeom prst="rect">
-            <a:avLst/>
-          </a:prstGeom>
-          <a:ln w="19050"/>
-          <a:effectLst/>
-        </p:spPr>
-        <p:style>
-          <a:lnRef idx="1">
-            <a:schemeClr val="accent4"/>
-          </a:lnRef>
-          <a:fillRef idx="2">
-            <a:schemeClr val="accent4"/>
-          </a:fillRef>
-          <a:effectRef idx="1">
-            <a:schemeClr val="accent4"/>
-          </a:effectRef>
-          <a:fontRef idx="minor">
-            <a:schemeClr val="dk1"/>
-          </a:fontRef>
-        </p:style>
-        <p:txBody>
-          <a:bodyPr rtlCol="0" anchor="ctr"/>
-          <a:lstStyle/>
-          <a:p>
-            <a:pPr algn="ctr"/>
-            <a:r>
-              <a:rPr lang="en-US" sz="788" dirty="0"/>
-              <a:t>&lt;&lt;interface&gt;&gt;</a:t>
-            </a:r>
-          </a:p>
-          <a:p>
-            <a:pPr algn="ctr"/>
-            <a:r>
-              <a:rPr lang="en-US" sz="788" dirty="0" err="1"/>
-              <a:t>ReadOnlyPerson</a:t>
-            </a:r>
-            <a:endParaRPr lang="en-SG" sz="788" dirty="0"/>
-          </a:p>
-        </p:txBody>
-      </p:sp>
-      <p:sp>
-        <p:nvSpPr>
-          <p:cNvPr id="12" name="Isosceles Triangle 11">
-            <a:extLst>
-              <a:ext uri="{FF2B5EF4-FFF2-40B4-BE49-F238E27FC236}">
-                <a16:creationId xmlns:a16="http://schemas.microsoft.com/office/drawing/2014/main" id="{36A61938-7175-41FE-82DE-538BA83F0748}"/>
-              </a:ext>
-            </a:extLst>
-          </p:cNvPr>
-          <p:cNvSpPr/>
-          <p:nvPr/>
-        </p:nvSpPr>
-        <p:spPr>
-          <a:xfrm rot="10800000">
-            <a:off x="6377596" y="3351060"/>
-            <a:ext cx="202878" cy="131642"/>
-          </a:xfrm>
-          <a:prstGeom prst="triangle">
-            <a:avLst/>
-          </a:prstGeom>
-          <a:ln w="19050"/>
-          <a:effectLst/>
-        </p:spPr>
-        <p:style>
-          <a:lnRef idx="1">
-            <a:schemeClr val="accent4"/>
-          </a:lnRef>
-          <a:fillRef idx="2">
-            <a:schemeClr val="accent4"/>
-          </a:fillRef>
-          <a:effectRef idx="1">
-            <a:schemeClr val="accent4"/>
-          </a:effectRef>
-          <a:fontRef idx="minor">
-            <a:schemeClr val="dk1"/>
-          </a:fontRef>
-        </p:style>
-        <p:txBody>
-          <a:bodyPr rtlCol="0" anchor="ctr"/>
-          <a:lstStyle/>
-          <a:p>
-            <a:pPr algn="ctr"/>
-            <a:endParaRPr lang="en-SG" sz="788"/>
-          </a:p>
-        </p:txBody>
-      </p:sp>
-      <p:cxnSp>
-        <p:nvCxnSpPr>
-          <p:cNvPr id="13" name="Elbow Connector 135">
-            <a:extLst>
-              <a:ext uri="{FF2B5EF4-FFF2-40B4-BE49-F238E27FC236}">
-                <a16:creationId xmlns:a16="http://schemas.microsoft.com/office/drawing/2014/main" id="{AC2B25A3-913F-47C7-BE30-AA41E97AB1CE}"/>
-              </a:ext>
-            </a:extLst>
-          </p:cNvPr>
-          <p:cNvCxnSpPr>
-            <a:stCxn id="2" idx="2"/>
-            <a:endCxn id="12" idx="3"/>
-          </p:cNvCxnSpPr>
-          <p:nvPr/>
-        </p:nvCxnSpPr>
-        <p:spPr>
-          <a:xfrm rot="5400000">
-            <a:off x="6385035" y="3254896"/>
-            <a:ext cx="190166" cy="2162"/>
-          </a:xfrm>
-          <a:prstGeom prst="bentConnector3">
-            <a:avLst>
-              <a:gd name="adj1" fmla="val 50000"/>
-            </a:avLst>
-          </a:prstGeom>
-          <a:ln w="19050">
-            <a:solidFill>
-              <a:srgbClr val="7030A0"/>
-            </a:solidFill>
-            <a:prstDash val="dash"/>
-            <a:headEnd type="none" w="med" len="med"/>
-            <a:tailEnd type="none" w="med" len="med"/>
-          </a:ln>
-          <a:effectLst/>
-        </p:spPr>
-        <p:style>
-          <a:lnRef idx="1">
-            <a:schemeClr val="accent6"/>
-          </a:lnRef>
-          <a:fillRef idx="2">
-            <a:schemeClr val="accent6"/>
-          </a:fillRef>
-          <a:effectRef idx="1">
-            <a:schemeClr val="accent6"/>
-          </a:effectRef>
-          <a:fontRef idx="minor">
-            <a:schemeClr val="dk1"/>
-          </a:fontRef>
-        </p:style>
-      </p:cxnSp>
-      <p:sp>
-        <p:nvSpPr>
-          <p:cNvPr id="14" name="Rectangle 13">
-            <a:extLst>
-              <a:ext uri="{FF2B5EF4-FFF2-40B4-BE49-F238E27FC236}">
-                <a16:creationId xmlns:a16="http://schemas.microsoft.com/office/drawing/2014/main" id="{AB3EF65A-593D-4B97-9D52-81070764A24B}"/>
-              </a:ext>
-            </a:extLst>
-          </p:cNvPr>
-          <p:cNvSpPr/>
-          <p:nvPr/>
-        </p:nvSpPr>
-        <p:spPr>
-          <a:xfrm>
-            <a:off x="7521638" y="1390446"/>
-            <a:ext cx="696972" cy="260070"/>
-          </a:xfrm>
-          <a:prstGeom prst="rect">
-            <a:avLst/>
-          </a:prstGeom>
-          <a:ln w="19050"/>
-          <a:effectLst/>
-        </p:spPr>
-        <p:style>
-          <a:lnRef idx="1">
-            <a:schemeClr val="accent4"/>
-          </a:lnRef>
-          <a:fillRef idx="2">
-            <a:schemeClr val="accent4"/>
-          </a:fillRef>
-          <a:effectRef idx="1">
-            <a:schemeClr val="accent4"/>
-          </a:effectRef>
-          <a:fontRef idx="minor">
-            <a:schemeClr val="dk1"/>
-          </a:fontRef>
-        </p:style>
-        <p:txBody>
-          <a:bodyPr rtlCol="0" anchor="ctr"/>
-          <a:lstStyle/>
-          <a:p>
-            <a:pPr algn="ctr"/>
-            <a:r>
-              <a:rPr lang="en-US" sz="788" dirty="0"/>
-              <a:t>Name</a:t>
-            </a:r>
-            <a:endParaRPr lang="en-SG" sz="788" dirty="0"/>
-          </a:p>
-        </p:txBody>
-      </p:sp>
-      <p:cxnSp>
-        <p:nvCxnSpPr>
-          <p:cNvPr id="15" name="Elbow Connector 92">
-            <a:extLst>
-              <a:ext uri="{FF2B5EF4-FFF2-40B4-BE49-F238E27FC236}">
-                <a16:creationId xmlns:a16="http://schemas.microsoft.com/office/drawing/2014/main" id="{B8EC7033-8309-49D3-A8C7-147FEBCF08F0}"/>
-              </a:ext>
-            </a:extLst>
-          </p:cNvPr>
-          <p:cNvCxnSpPr>
-            <a:stCxn id="10" idx="3"/>
-            <a:endCxn id="14" idx="1"/>
-          </p:cNvCxnSpPr>
-          <p:nvPr/>
-        </p:nvCxnSpPr>
-        <p:spPr>
-          <a:xfrm flipV="1">
-            <a:off x="7006719" y="1520481"/>
-            <a:ext cx="514919" cy="1507396"/>
-          </a:xfrm>
-          <a:prstGeom prst="bentConnector3">
-            <a:avLst>
-              <a:gd name="adj1" fmla="val 50000"/>
-            </a:avLst>
-          </a:prstGeom>
-          <a:ln w="19050">
-            <a:solidFill>
-              <a:srgbClr val="7030A0"/>
-            </a:solidFill>
-            <a:headEnd type="none" w="med" len="med"/>
-            <a:tailEnd type="arrow" w="med" len="med"/>
-          </a:ln>
-          <a:effectLst/>
-        </p:spPr>
-        <p:style>
-          <a:lnRef idx="1">
-            <a:schemeClr val="accent6"/>
-          </a:lnRef>
-          <a:fillRef idx="2">
-            <a:schemeClr val="accent6"/>
-          </a:fillRef>
-          <a:effectRef idx="1">
-            <a:schemeClr val="accent6"/>
-          </a:effectRef>
-          <a:fontRef idx="minor">
-            <a:schemeClr val="dk1"/>
-          </a:fontRef>
-        </p:style>
-      </p:cxnSp>
-      <p:sp>
-        <p:nvSpPr>
-          <p:cNvPr id="16" name="Rectangle 15">
-            <a:extLst>
-              <a:ext uri="{FF2B5EF4-FFF2-40B4-BE49-F238E27FC236}">
-                <a16:creationId xmlns:a16="http://schemas.microsoft.com/office/drawing/2014/main" id="{7FF63963-C3AA-4CFB-A087-34F6B3FB3A77}"/>
-              </a:ext>
-            </a:extLst>
-          </p:cNvPr>
-          <p:cNvSpPr/>
-          <p:nvPr/>
-        </p:nvSpPr>
-        <p:spPr>
-          <a:xfrm>
-            <a:off x="7536894" y="4147723"/>
-            <a:ext cx="696972" cy="260070"/>
-          </a:xfrm>
-          <a:prstGeom prst="rect">
-            <a:avLst/>
-          </a:prstGeom>
-          <a:ln w="19050"/>
-          <a:effectLst/>
-        </p:spPr>
-        <p:style>
-          <a:lnRef idx="1">
-            <a:schemeClr val="accent4"/>
-          </a:lnRef>
-          <a:fillRef idx="2">
-            <a:schemeClr val="accent4"/>
-          </a:fillRef>
-          <a:effectRef idx="1">
-            <a:schemeClr val="accent4"/>
-          </a:effectRef>
-          <a:fontRef idx="minor">
-            <a:schemeClr val="dk1"/>
-          </a:fontRef>
-        </p:style>
-        <p:txBody>
-          <a:bodyPr rtlCol="0" anchor="ctr"/>
-          <a:lstStyle/>
-          <a:p>
-            <a:pPr algn="ctr"/>
-            <a:r>
-              <a:rPr lang="en-US" sz="788" dirty="0"/>
-              <a:t>Tag</a:t>
-            </a:r>
-            <a:endParaRPr lang="en-SG" sz="788" dirty="0"/>
-          </a:p>
-        </p:txBody>
-      </p:sp>
-      <p:sp>
-        <p:nvSpPr>
-          <p:cNvPr id="17" name="TextBox 16">
-            <a:extLst>
-              <a:ext uri="{FF2B5EF4-FFF2-40B4-BE49-F238E27FC236}">
-                <a16:creationId xmlns:a16="http://schemas.microsoft.com/office/drawing/2014/main" id="{255E49B7-CAF3-47E0-B830-12A42CA19426}"/>
+                <a16:creationId xmlns:a16="http://schemas.microsoft.com/office/drawing/2014/main" id="{11B5617C-AC77-ED43-B27A-A9454742C897}"/>
               </a:ext>
             </a:extLst>
           </p:cNvPr>
@@ -10313,8 +12037,8 @@
         </p:nvSpPr>
         <p:spPr>
           <a:xfrm>
-            <a:off x="7397459" y="4069969"/>
-            <a:ext cx="66174" cy="300082"/>
+            <a:off x="3681984" y="1267968"/>
+            <a:ext cx="659155" cy="369332"/>
           </a:xfrm>
           <a:prstGeom prst="rect">
             <a:avLst/>
@@ -10322,328 +12046,54 @@
           <a:noFill/>
         </p:spPr>
         <p:txBody>
-          <a:bodyPr wrap="square" rtlCol="0">
+          <a:bodyPr wrap="none" rtlCol="0">
             <a:spAutoFit/>
           </a:bodyPr>
           <a:lstStyle/>
           <a:p>
             <a:r>
-              <a:rPr lang="en-US" sz="1350" dirty="0">
-                <a:solidFill>
-                  <a:srgbClr val="7030A0"/>
-                </a:solidFill>
-              </a:rPr>
-              <a:t>*</a:t>
-            </a:r>
-          </a:p>
-        </p:txBody>
-      </p:sp>
-      <p:sp>
-        <p:nvSpPr>
-          <p:cNvPr id="30" name="Rectangle 29">
+              <a:rPr lang="en-US" dirty="0"/>
+              <a:t>NICH</a:t>
+            </a:r>
+          </a:p>
+        </p:txBody>
+      </p:sp>
+    </p:spTree>
+    <p:extLst>
+      <p:ext uri="{BB962C8B-B14F-4D97-AF65-F5344CB8AC3E}">
+        <p14:creationId xmlns:p14="http://schemas.microsoft.com/office/powerpoint/2010/main" val="1681074217"/>
+      </p:ext>
+    </p:extLst>
+  </p:cSld>
+  <p:clrMapOvr>
+    <a:masterClrMapping/>
+  </p:clrMapOvr>
+</p:sld>
+</file>
+
+<file path=ppt/slides/slide6.xml><?xml version="1.0" encoding="utf-8"?>
+<p:sld xmlns:a="http://schemas.openxmlformats.org/drawingml/2006/main" xmlns:r="http://schemas.openxmlformats.org/officeDocument/2006/relationships" xmlns:p="http://schemas.openxmlformats.org/presentationml/2006/main">
+  <p:cSld>
+    <p:spTree>
+      <p:nvGrpSpPr>
+        <p:cNvPr id="1" name=""/>
+        <p:cNvGrpSpPr/>
+        <p:nvPr/>
+      </p:nvGrpSpPr>
+      <p:grpSpPr>
+        <a:xfrm>
+          <a:off x="0" y="0"/>
+          <a:ext cx="0" cy="0"/>
+          <a:chOff x="0" y="0"/>
+          <a:chExt cx="0" cy="0"/>
+        </a:xfrm>
+      </p:grpSpPr>
+      <p:sp>
+        <p:nvSpPr>
+          <p:cNvPr id="2" name="TextBox 1">
             <a:extLst>
               <a:ext uri="{FF2B5EF4-FFF2-40B4-BE49-F238E27FC236}">
-                <a16:creationId xmlns:a16="http://schemas.microsoft.com/office/drawing/2014/main" id="{D77633EE-A306-46EF-9F5F-5DD807A3A8A5}"/>
-              </a:ext>
-            </a:extLst>
-          </p:cNvPr>
-          <p:cNvSpPr/>
-          <p:nvPr/>
-        </p:nvSpPr>
-        <p:spPr>
-          <a:xfrm>
-            <a:off x="7521638" y="1737504"/>
-            <a:ext cx="696972" cy="260070"/>
-          </a:xfrm>
-          <a:prstGeom prst="rect">
-            <a:avLst/>
-          </a:prstGeom>
-          <a:ln w="19050"/>
-          <a:effectLst/>
-        </p:spPr>
-        <p:style>
-          <a:lnRef idx="1">
-            <a:schemeClr val="accent4"/>
-          </a:lnRef>
-          <a:fillRef idx="2">
-            <a:schemeClr val="accent4"/>
-          </a:fillRef>
-          <a:effectRef idx="1">
-            <a:schemeClr val="accent4"/>
-          </a:effectRef>
-          <a:fontRef idx="minor">
-            <a:schemeClr val="dk1"/>
-          </a:fontRef>
-        </p:style>
-        <p:txBody>
-          <a:bodyPr rtlCol="0" anchor="ctr"/>
-          <a:lstStyle/>
-          <a:p>
-            <a:pPr algn="ctr"/>
-            <a:r>
-              <a:rPr lang="en-US" sz="788" dirty="0"/>
-              <a:t>NRIC</a:t>
-            </a:r>
-            <a:endParaRPr lang="en-SG" sz="788" dirty="0"/>
-          </a:p>
-        </p:txBody>
-      </p:sp>
-      <p:cxnSp>
-        <p:nvCxnSpPr>
-          <p:cNvPr id="31" name="Elbow Connector 92">
-            <a:extLst>
-              <a:ext uri="{FF2B5EF4-FFF2-40B4-BE49-F238E27FC236}">
-                <a16:creationId xmlns:a16="http://schemas.microsoft.com/office/drawing/2014/main" id="{0C5F4D66-E530-4B12-93B4-157DF408F8C1}"/>
-              </a:ext>
-            </a:extLst>
-          </p:cNvPr>
-          <p:cNvCxnSpPr>
-            <a:cxnSpLocks/>
-            <a:stCxn id="10" idx="3"/>
-            <a:endCxn id="30" idx="1"/>
-          </p:cNvCxnSpPr>
-          <p:nvPr/>
-        </p:nvCxnSpPr>
-        <p:spPr>
-          <a:xfrm flipV="1">
-            <a:off x="7006719" y="1867539"/>
-            <a:ext cx="514919" cy="1160338"/>
-          </a:xfrm>
-          <a:prstGeom prst="bentConnector3">
-            <a:avLst>
-              <a:gd name="adj1" fmla="val 50000"/>
-            </a:avLst>
-          </a:prstGeom>
-          <a:ln w="19050">
-            <a:solidFill>
-              <a:srgbClr val="7030A0"/>
-            </a:solidFill>
-            <a:headEnd type="none" w="med" len="med"/>
-            <a:tailEnd type="arrow" w="med" len="med"/>
-          </a:ln>
-          <a:effectLst/>
-        </p:spPr>
-        <p:style>
-          <a:lnRef idx="1">
-            <a:schemeClr val="accent6"/>
-          </a:lnRef>
-          <a:fillRef idx="2">
-            <a:schemeClr val="accent6"/>
-          </a:fillRef>
-          <a:effectRef idx="1">
-            <a:schemeClr val="accent6"/>
-          </a:effectRef>
-          <a:fontRef idx="minor">
-            <a:schemeClr val="dk1"/>
-          </a:fontRef>
-        </p:style>
-      </p:cxnSp>
-      <p:sp>
-        <p:nvSpPr>
-          <p:cNvPr id="41" name="Rectangle 40">
-            <a:extLst>
-              <a:ext uri="{FF2B5EF4-FFF2-40B4-BE49-F238E27FC236}">
-                <a16:creationId xmlns:a16="http://schemas.microsoft.com/office/drawing/2014/main" id="{EA5C696A-0A41-4896-A61C-A442FB9D517C}"/>
-              </a:ext>
-            </a:extLst>
-          </p:cNvPr>
-          <p:cNvSpPr/>
-          <p:nvPr/>
-        </p:nvSpPr>
-        <p:spPr>
-          <a:xfrm>
-            <a:off x="7521638" y="3110707"/>
-            <a:ext cx="696972" cy="260070"/>
-          </a:xfrm>
-          <a:prstGeom prst="rect">
-            <a:avLst/>
-          </a:prstGeom>
-          <a:ln w="19050"/>
-          <a:effectLst/>
-        </p:spPr>
-        <p:style>
-          <a:lnRef idx="1">
-            <a:schemeClr val="accent4"/>
-          </a:lnRef>
-          <a:fillRef idx="2">
-            <a:schemeClr val="accent4"/>
-          </a:fillRef>
-          <a:effectRef idx="1">
-            <a:schemeClr val="accent4"/>
-          </a:effectRef>
-          <a:fontRef idx="minor">
-            <a:schemeClr val="dk1"/>
-          </a:fontRef>
-        </p:style>
-        <p:txBody>
-          <a:bodyPr rtlCol="0" anchor="ctr"/>
-          <a:lstStyle/>
-          <a:p>
-            <a:pPr algn="ctr"/>
-            <a:r>
-              <a:rPr lang="en-US" sz="788" dirty="0"/>
-              <a:t>Tittle</a:t>
-            </a:r>
-            <a:endParaRPr lang="en-SG" sz="788" dirty="0"/>
-          </a:p>
-        </p:txBody>
-      </p:sp>
-      <p:cxnSp>
-        <p:nvCxnSpPr>
-          <p:cNvPr id="47" name="Elbow Connector 70">
-            <a:extLst>
-              <a:ext uri="{FF2B5EF4-FFF2-40B4-BE49-F238E27FC236}">
-                <a16:creationId xmlns:a16="http://schemas.microsoft.com/office/drawing/2014/main" id="{83120162-65B6-445E-A0A5-266968CE23D4}"/>
-              </a:ext>
-            </a:extLst>
-          </p:cNvPr>
-          <p:cNvCxnSpPr>
-            <a:cxnSpLocks/>
-            <a:stCxn id="10" idx="3"/>
-            <a:endCxn id="41" idx="1"/>
-          </p:cNvCxnSpPr>
-          <p:nvPr/>
-        </p:nvCxnSpPr>
-        <p:spPr>
-          <a:xfrm>
-            <a:off x="7006719" y="3027877"/>
-            <a:ext cx="514919" cy="212865"/>
-          </a:xfrm>
-          <a:prstGeom prst="bentConnector3">
-            <a:avLst>
-              <a:gd name="adj1" fmla="val 50000"/>
-            </a:avLst>
-          </a:prstGeom>
-          <a:ln w="19050">
-            <a:solidFill>
-              <a:srgbClr val="7030A0"/>
-            </a:solidFill>
-            <a:headEnd type="none" w="med" len="med"/>
-            <a:tailEnd type="arrow" w="med" len="med"/>
-          </a:ln>
-          <a:effectLst/>
-        </p:spPr>
-        <p:style>
-          <a:lnRef idx="1">
-            <a:schemeClr val="accent6"/>
-          </a:lnRef>
-          <a:fillRef idx="2">
-            <a:schemeClr val="accent6"/>
-          </a:fillRef>
-          <a:effectRef idx="1">
-            <a:schemeClr val="accent6"/>
-          </a:effectRef>
-          <a:fontRef idx="minor">
-            <a:schemeClr val="dk1"/>
-          </a:fontRef>
-        </p:style>
-      </p:cxnSp>
-      <p:sp>
-        <p:nvSpPr>
-          <p:cNvPr id="50" name="Rectangle 49">
-            <a:extLst>
-              <a:ext uri="{FF2B5EF4-FFF2-40B4-BE49-F238E27FC236}">
-                <a16:creationId xmlns:a16="http://schemas.microsoft.com/office/drawing/2014/main" id="{DA95EB64-ABE3-4339-9855-82DBCFC2BD29}"/>
-              </a:ext>
-            </a:extLst>
-          </p:cNvPr>
-          <p:cNvSpPr/>
-          <p:nvPr/>
-        </p:nvSpPr>
-        <p:spPr>
-          <a:xfrm>
-            <a:off x="7529266" y="3804823"/>
-            <a:ext cx="696972" cy="260070"/>
-          </a:xfrm>
-          <a:prstGeom prst="rect">
-            <a:avLst/>
-          </a:prstGeom>
-          <a:ln w="19050"/>
-          <a:effectLst/>
-        </p:spPr>
-        <p:style>
-          <a:lnRef idx="1">
-            <a:schemeClr val="accent4"/>
-          </a:lnRef>
-          <a:fillRef idx="2">
-            <a:schemeClr val="accent4"/>
-          </a:fillRef>
-          <a:effectRef idx="1">
-            <a:schemeClr val="accent4"/>
-          </a:effectRef>
-          <a:fontRef idx="minor">
-            <a:schemeClr val="dk1"/>
-          </a:fontRef>
-        </p:style>
-        <p:txBody>
-          <a:bodyPr rtlCol="0" anchor="ctr"/>
-          <a:lstStyle/>
-          <a:p>
-            <a:pPr algn="ctr"/>
-            <a:r>
-              <a:rPr lang="en-US" sz="788" dirty="0"/>
-              <a:t>Schedule</a:t>
-            </a:r>
-            <a:endParaRPr lang="en-SG" sz="788" dirty="0"/>
-          </a:p>
-        </p:txBody>
-      </p:sp>
-      <p:cxnSp>
-        <p:nvCxnSpPr>
-          <p:cNvPr id="51" name="Elbow Connector 70">
-            <a:extLst>
-              <a:ext uri="{FF2B5EF4-FFF2-40B4-BE49-F238E27FC236}">
-                <a16:creationId xmlns:a16="http://schemas.microsoft.com/office/drawing/2014/main" id="{C224B8CF-7E5A-47BF-BCCC-EF6B0C5D5008}"/>
-              </a:ext>
-            </a:extLst>
-          </p:cNvPr>
-          <p:cNvCxnSpPr>
-            <a:cxnSpLocks/>
-            <a:stCxn id="10" idx="3"/>
-            <a:endCxn id="50" idx="1"/>
-          </p:cNvCxnSpPr>
-          <p:nvPr/>
-        </p:nvCxnSpPr>
-        <p:spPr>
-          <a:xfrm>
-            <a:off x="7006719" y="3027877"/>
-            <a:ext cx="522547" cy="906981"/>
-          </a:xfrm>
-          <a:prstGeom prst="bentConnector3">
-            <a:avLst>
-              <a:gd name="adj1" fmla="val 50000"/>
-            </a:avLst>
-          </a:prstGeom>
-          <a:ln w="19050">
-            <a:solidFill>
-              <a:srgbClr val="7030A0"/>
-            </a:solidFill>
-            <a:headEnd type="none" w="med" len="med"/>
-            <a:tailEnd type="arrow" w="med" len="med"/>
-          </a:ln>
-          <a:effectLst/>
-        </p:spPr>
-        <p:style>
-          <a:lnRef idx="1">
-            <a:schemeClr val="accent6"/>
-          </a:lnRef>
-          <a:fillRef idx="2">
-            <a:schemeClr val="accent6"/>
-          </a:fillRef>
-          <a:effectRef idx="1">
-            <a:schemeClr val="accent6"/>
-          </a:effectRef>
-          <a:fontRef idx="minor">
-            <a:schemeClr val="dk1"/>
-          </a:fontRef>
-        </p:style>
-      </p:cxnSp>
-      <p:sp>
-        <p:nvSpPr>
-          <p:cNvPr id="54" name="TextBox 53">
-            <a:extLst>
-              <a:ext uri="{FF2B5EF4-FFF2-40B4-BE49-F238E27FC236}">
-                <a16:creationId xmlns:a16="http://schemas.microsoft.com/office/drawing/2014/main" id="{8D979CF2-754C-48B3-9384-6EB61DD0CDB0}"/>
+                <a16:creationId xmlns:a16="http://schemas.microsoft.com/office/drawing/2014/main" id="{11B5617C-AC77-ED43-B27A-A9454742C897}"/>
               </a:ext>
             </a:extLst>
           </p:cNvPr>
@@ -10652,8 +12102,8 @@
         </p:nvSpPr>
         <p:spPr>
           <a:xfrm>
-            <a:off x="7382202" y="3731341"/>
-            <a:ext cx="66174" cy="300082"/>
+            <a:off x="3681984" y="1267968"/>
+            <a:ext cx="659155" cy="369332"/>
           </a:xfrm>
           <a:prstGeom prst="rect">
             <a:avLst/>
@@ -10661,691 +12111,54 @@
           <a:noFill/>
         </p:spPr>
         <p:txBody>
-          <a:bodyPr wrap="square" rtlCol="0">
+          <a:bodyPr wrap="none" rtlCol="0">
             <a:spAutoFit/>
           </a:bodyPr>
           <a:lstStyle/>
           <a:p>
             <a:r>
-              <a:rPr lang="en-US" sz="1350" dirty="0">
-                <a:solidFill>
-                  <a:srgbClr val="7030A0"/>
-                </a:solidFill>
-              </a:rPr>
-              <a:t>*</a:t>
-            </a:r>
-          </a:p>
-        </p:txBody>
-      </p:sp>
-      <p:sp>
-        <p:nvSpPr>
-          <p:cNvPr id="56" name="Rectangle 55">
+              <a:rPr lang="en-US" dirty="0"/>
+              <a:t>NICH</a:t>
+            </a:r>
+          </a:p>
+        </p:txBody>
+      </p:sp>
+    </p:spTree>
+    <p:extLst>
+      <p:ext uri="{BB962C8B-B14F-4D97-AF65-F5344CB8AC3E}">
+        <p14:creationId xmlns:p14="http://schemas.microsoft.com/office/powerpoint/2010/main" val="4194871880"/>
+      </p:ext>
+    </p:extLst>
+  </p:cSld>
+  <p:clrMapOvr>
+    <a:masterClrMapping/>
+  </p:clrMapOvr>
+</p:sld>
+</file>
+
+<file path=ppt/slides/slide7.xml><?xml version="1.0" encoding="utf-8"?>
+<p:sld xmlns:a="http://schemas.openxmlformats.org/drawingml/2006/main" xmlns:r="http://schemas.openxmlformats.org/officeDocument/2006/relationships" xmlns:p="http://schemas.openxmlformats.org/presentationml/2006/main">
+  <p:cSld>
+    <p:spTree>
+      <p:nvGrpSpPr>
+        <p:cNvPr id="1" name=""/>
+        <p:cNvGrpSpPr/>
+        <p:nvPr/>
+      </p:nvGrpSpPr>
+      <p:grpSpPr>
+        <a:xfrm>
+          <a:off x="0" y="0"/>
+          <a:ext cx="0" cy="0"/>
+          <a:chOff x="0" y="0"/>
+          <a:chExt cx="0" cy="0"/>
+        </a:xfrm>
+      </p:grpSpPr>
+      <p:sp>
+        <p:nvSpPr>
+          <p:cNvPr id="2" name="TextBox 1">
             <a:extLst>
               <a:ext uri="{FF2B5EF4-FFF2-40B4-BE49-F238E27FC236}">
-                <a16:creationId xmlns:a16="http://schemas.microsoft.com/office/drawing/2014/main" id="{0B130FF9-7D63-4921-AADC-E2F9974CFB1B}"/>
-              </a:ext>
-            </a:extLst>
-          </p:cNvPr>
-          <p:cNvSpPr/>
-          <p:nvPr/>
-        </p:nvSpPr>
-        <p:spPr>
-          <a:xfrm>
-            <a:off x="7521638" y="3457765"/>
-            <a:ext cx="696972" cy="260070"/>
-          </a:xfrm>
-          <a:prstGeom prst="rect">
-            <a:avLst/>
-          </a:prstGeom>
-          <a:ln w="19050"/>
-          <a:effectLst/>
-        </p:spPr>
-        <p:style>
-          <a:lnRef idx="1">
-            <a:schemeClr val="accent4"/>
-          </a:lnRef>
-          <a:fillRef idx="2">
-            <a:schemeClr val="accent4"/>
-          </a:fillRef>
-          <a:effectRef idx="1">
-            <a:schemeClr val="accent4"/>
-          </a:effectRef>
-          <a:fontRef idx="minor">
-            <a:schemeClr val="dk1"/>
-          </a:fontRef>
-        </p:style>
-        <p:txBody>
-          <a:bodyPr rtlCol="0" anchor="ctr"/>
-          <a:lstStyle/>
-          <a:p>
-            <a:pPr algn="ctr"/>
-            <a:r>
-              <a:rPr lang="en-US" sz="788" dirty="0"/>
-              <a:t>Associated</a:t>
-            </a:r>
-            <a:endParaRPr lang="en-SG" sz="788" dirty="0"/>
-          </a:p>
-        </p:txBody>
-      </p:sp>
-      <p:cxnSp>
-        <p:nvCxnSpPr>
-          <p:cNvPr id="58" name="Elbow Connector 70">
-            <a:extLst>
-              <a:ext uri="{FF2B5EF4-FFF2-40B4-BE49-F238E27FC236}">
-                <a16:creationId xmlns:a16="http://schemas.microsoft.com/office/drawing/2014/main" id="{EF0C14B1-A170-4B48-92B4-FEDA1697FFE9}"/>
-              </a:ext>
-            </a:extLst>
-          </p:cNvPr>
-          <p:cNvCxnSpPr>
-            <a:cxnSpLocks/>
-            <a:stCxn id="10" idx="3"/>
-            <a:endCxn id="56" idx="1"/>
-          </p:cNvCxnSpPr>
-          <p:nvPr/>
-        </p:nvCxnSpPr>
-        <p:spPr>
-          <a:xfrm>
-            <a:off x="7006719" y="3027877"/>
-            <a:ext cx="514919" cy="559923"/>
-          </a:xfrm>
-          <a:prstGeom prst="bentConnector3">
-            <a:avLst>
-              <a:gd name="adj1" fmla="val 50000"/>
-            </a:avLst>
-          </a:prstGeom>
-          <a:ln w="19050">
-            <a:solidFill>
-              <a:srgbClr val="7030A0"/>
-            </a:solidFill>
-            <a:headEnd type="none" w="med" len="med"/>
-            <a:tailEnd type="arrow" w="med" len="med"/>
-          </a:ln>
-          <a:effectLst/>
-        </p:spPr>
-        <p:style>
-          <a:lnRef idx="1">
-            <a:schemeClr val="accent6"/>
-          </a:lnRef>
-          <a:fillRef idx="2">
-            <a:schemeClr val="accent6"/>
-          </a:fillRef>
-          <a:effectRef idx="1">
-            <a:schemeClr val="accent6"/>
-          </a:effectRef>
-          <a:fontRef idx="minor">
-            <a:schemeClr val="dk1"/>
-          </a:fontRef>
-        </p:style>
-      </p:cxnSp>
-      <p:sp>
-        <p:nvSpPr>
-          <p:cNvPr id="67" name="Rectangle 66">
-            <a:extLst>
-              <a:ext uri="{FF2B5EF4-FFF2-40B4-BE49-F238E27FC236}">
-                <a16:creationId xmlns:a16="http://schemas.microsoft.com/office/drawing/2014/main" id="{F62DF4B1-AE9C-4631-A216-B0AA3E8996C5}"/>
-              </a:ext>
-            </a:extLst>
-          </p:cNvPr>
-          <p:cNvSpPr/>
-          <p:nvPr/>
-        </p:nvSpPr>
-        <p:spPr>
-          <a:xfrm>
-            <a:off x="3718859" y="2445138"/>
-            <a:ext cx="753319" cy="260070"/>
-          </a:xfrm>
-          <a:prstGeom prst="rect">
-            <a:avLst/>
-          </a:prstGeom>
-          <a:solidFill>
-            <a:schemeClr val="accent6"/>
-          </a:solidFill>
-          <a:ln w="19050"/>
-          <a:effectLst/>
-        </p:spPr>
-        <p:style>
-          <a:lnRef idx="1">
-            <a:schemeClr val="accent6"/>
-          </a:lnRef>
-          <a:fillRef idx="2">
-            <a:schemeClr val="accent6"/>
-          </a:fillRef>
-          <a:effectRef idx="1">
-            <a:schemeClr val="accent6"/>
-          </a:effectRef>
-          <a:fontRef idx="minor">
-            <a:schemeClr val="dk1"/>
-          </a:fontRef>
-        </p:style>
-        <p:txBody>
-          <a:bodyPr rtlCol="0" anchor="ctr"/>
-          <a:lstStyle/>
-          <a:p>
-            <a:pPr algn="ctr"/>
-            <a:r>
-              <a:rPr lang="en-US" sz="788" dirty="0" err="1">
-                <a:solidFill>
-                  <a:schemeClr val="bg1"/>
-                </a:solidFill>
-              </a:rPr>
-              <a:t>AddressBook</a:t>
-            </a:r>
-            <a:endParaRPr lang="en-SG" sz="788" dirty="0">
-              <a:solidFill>
-                <a:schemeClr val="bg1"/>
-              </a:solidFill>
-            </a:endParaRPr>
-          </a:p>
-        </p:txBody>
-      </p:sp>
-      <p:sp>
-        <p:nvSpPr>
-          <p:cNvPr id="68" name="Rectangle 67">
-            <a:extLst>
-              <a:ext uri="{FF2B5EF4-FFF2-40B4-BE49-F238E27FC236}">
-                <a16:creationId xmlns:a16="http://schemas.microsoft.com/office/drawing/2014/main" id="{745B3F0D-EC1D-43FD-A53E-1C046EFFB47A}"/>
-              </a:ext>
-            </a:extLst>
-          </p:cNvPr>
-          <p:cNvSpPr/>
-          <p:nvPr/>
-        </p:nvSpPr>
-        <p:spPr>
-          <a:xfrm>
-            <a:off x="4967684" y="2897842"/>
-            <a:ext cx="696972" cy="260070"/>
-          </a:xfrm>
-          <a:prstGeom prst="rect">
-            <a:avLst/>
-          </a:prstGeom>
-          <a:ln w="19050"/>
-          <a:effectLst/>
-        </p:spPr>
-        <p:style>
-          <a:lnRef idx="1">
-            <a:schemeClr val="accent6"/>
-          </a:lnRef>
-          <a:fillRef idx="2">
-            <a:schemeClr val="accent6"/>
-          </a:fillRef>
-          <a:effectRef idx="1">
-            <a:schemeClr val="accent6"/>
-          </a:effectRef>
-          <a:fontRef idx="minor">
-            <a:schemeClr val="dk1"/>
-          </a:fontRef>
-        </p:style>
-        <p:txBody>
-          <a:bodyPr rtlCol="0" anchor="ctr"/>
-          <a:lstStyle/>
-          <a:p>
-            <a:pPr algn="ctr"/>
-            <a:r>
-              <a:rPr lang="en-US" sz="788" dirty="0"/>
-              <a:t>Unique</a:t>
-            </a:r>
-            <a:br>
-              <a:rPr lang="en-US" sz="788" dirty="0"/>
-            </a:br>
-            <a:r>
-              <a:rPr lang="en-US" sz="788" dirty="0" err="1"/>
-              <a:t>PersonList</a:t>
-            </a:r>
-            <a:endParaRPr lang="en-SG" sz="788" dirty="0"/>
-          </a:p>
-        </p:txBody>
-      </p:sp>
-      <p:cxnSp>
-        <p:nvCxnSpPr>
-          <p:cNvPr id="69" name="Elbow Connector 50">
-            <a:extLst>
-              <a:ext uri="{FF2B5EF4-FFF2-40B4-BE49-F238E27FC236}">
-                <a16:creationId xmlns:a16="http://schemas.microsoft.com/office/drawing/2014/main" id="{977F389F-68CC-4EDB-AC54-F79D6924E773}"/>
-              </a:ext>
-            </a:extLst>
-          </p:cNvPr>
-          <p:cNvCxnSpPr>
-            <a:stCxn id="71" idx="3"/>
-            <a:endCxn id="68" idx="1"/>
-          </p:cNvCxnSpPr>
-          <p:nvPr/>
-        </p:nvCxnSpPr>
-        <p:spPr>
-          <a:xfrm>
-            <a:off x="4656843" y="2575173"/>
-            <a:ext cx="310841" cy="452704"/>
-          </a:xfrm>
-          <a:prstGeom prst="bentConnector3">
-            <a:avLst>
-              <a:gd name="adj1" fmla="val 50000"/>
-            </a:avLst>
-          </a:prstGeom>
-          <a:ln w="19050">
-            <a:headEnd type="none" w="med" len="med"/>
-            <a:tailEnd type="arrow" w="med" len="med"/>
-          </a:ln>
-          <a:effectLst/>
-        </p:spPr>
-        <p:style>
-          <a:lnRef idx="1">
-            <a:schemeClr val="accent6"/>
-          </a:lnRef>
-          <a:fillRef idx="2">
-            <a:schemeClr val="accent6"/>
-          </a:fillRef>
-          <a:effectRef idx="1">
-            <a:schemeClr val="accent6"/>
-          </a:effectRef>
-          <a:fontRef idx="minor">
-            <a:schemeClr val="dk1"/>
-          </a:fontRef>
-        </p:style>
-      </p:cxnSp>
-      <p:sp>
-        <p:nvSpPr>
-          <p:cNvPr id="70" name="Flowchart: Decision 69">
-            <a:extLst>
-              <a:ext uri="{FF2B5EF4-FFF2-40B4-BE49-F238E27FC236}">
-                <a16:creationId xmlns:a16="http://schemas.microsoft.com/office/drawing/2014/main" id="{BBBBB283-26C0-4643-8796-E2991A15B4F7}"/>
-              </a:ext>
-            </a:extLst>
-          </p:cNvPr>
-          <p:cNvSpPr/>
-          <p:nvPr/>
-        </p:nvSpPr>
-        <p:spPr>
-          <a:xfrm>
-            <a:off x="5664654" y="2965840"/>
-            <a:ext cx="177036" cy="130035"/>
-          </a:xfrm>
-          <a:prstGeom prst="flowChartDecision">
-            <a:avLst/>
-          </a:prstGeom>
-          <a:noFill/>
-          <a:ln w="19050"/>
-          <a:effectLst/>
-        </p:spPr>
-        <p:style>
-          <a:lnRef idx="1">
-            <a:schemeClr val="accent6"/>
-          </a:lnRef>
-          <a:fillRef idx="2">
-            <a:schemeClr val="accent6"/>
-          </a:fillRef>
-          <a:effectRef idx="1">
-            <a:schemeClr val="accent6"/>
-          </a:effectRef>
-          <a:fontRef idx="minor">
-            <a:schemeClr val="dk1"/>
-          </a:fontRef>
-        </p:style>
-        <p:txBody>
-          <a:bodyPr rtlCol="0" anchor="ctr"/>
-          <a:lstStyle/>
-          <a:p>
-            <a:pPr algn="ctr"/>
-            <a:endParaRPr lang="en-US" sz="788"/>
-          </a:p>
-        </p:txBody>
-      </p:sp>
-      <p:sp>
-        <p:nvSpPr>
-          <p:cNvPr id="71" name="Flowchart: Decision 70">
-            <a:extLst>
-              <a:ext uri="{FF2B5EF4-FFF2-40B4-BE49-F238E27FC236}">
-                <a16:creationId xmlns:a16="http://schemas.microsoft.com/office/drawing/2014/main" id="{D069BA6E-A852-4986-A119-A75B967D5695}"/>
-              </a:ext>
-            </a:extLst>
-          </p:cNvPr>
-          <p:cNvSpPr/>
-          <p:nvPr/>
-        </p:nvSpPr>
-        <p:spPr>
-          <a:xfrm>
-            <a:off x="4479806" y="2510156"/>
-            <a:ext cx="177036" cy="130035"/>
-          </a:xfrm>
-          <a:prstGeom prst="flowChartDecision">
-            <a:avLst/>
-          </a:prstGeom>
-          <a:solidFill>
-            <a:schemeClr val="accent6"/>
-          </a:solidFill>
-          <a:ln w="19050"/>
-          <a:effectLst/>
-        </p:spPr>
-        <p:style>
-          <a:lnRef idx="1">
-            <a:schemeClr val="accent6"/>
-          </a:lnRef>
-          <a:fillRef idx="2">
-            <a:schemeClr val="accent6"/>
-          </a:fillRef>
-          <a:effectRef idx="1">
-            <a:schemeClr val="accent6"/>
-          </a:effectRef>
-          <a:fontRef idx="minor">
-            <a:schemeClr val="dk1"/>
-          </a:fontRef>
-        </p:style>
-        <p:txBody>
-          <a:bodyPr rtlCol="0" anchor="ctr"/>
-          <a:lstStyle/>
-          <a:p>
-            <a:pPr algn="ctr"/>
-            <a:endParaRPr lang="en-US" sz="788"/>
-          </a:p>
-        </p:txBody>
-      </p:sp>
-      <p:cxnSp>
-        <p:nvCxnSpPr>
-          <p:cNvPr id="72" name="Straight Arrow Connector 71">
-            <a:extLst>
-              <a:ext uri="{FF2B5EF4-FFF2-40B4-BE49-F238E27FC236}">
-                <a16:creationId xmlns:a16="http://schemas.microsoft.com/office/drawing/2014/main" id="{EDBB4432-0B28-4A0A-9C3E-DCFABD3FE643}"/>
-              </a:ext>
-            </a:extLst>
-          </p:cNvPr>
-          <p:cNvCxnSpPr>
-            <a:cxnSpLocks/>
-            <a:stCxn id="70" idx="3"/>
-            <a:endCxn id="2" idx="1"/>
-          </p:cNvCxnSpPr>
-          <p:nvPr/>
-        </p:nvCxnSpPr>
-        <p:spPr>
-          <a:xfrm>
-            <a:off x="5841690" y="3030857"/>
-            <a:ext cx="291021" cy="0"/>
-          </a:xfrm>
-          <a:prstGeom prst="straightConnector1">
-            <a:avLst/>
-          </a:prstGeom>
-          <a:ln w="19050">
-            <a:headEnd type="none" w="med" len="med"/>
-            <a:tailEnd type="arrow" w="med" len="med"/>
-          </a:ln>
-          <a:effectLst/>
-        </p:spPr>
-        <p:style>
-          <a:lnRef idx="1">
-            <a:schemeClr val="accent6"/>
-          </a:lnRef>
-          <a:fillRef idx="2">
-            <a:schemeClr val="accent6"/>
-          </a:fillRef>
-          <a:effectRef idx="1">
-            <a:schemeClr val="accent6"/>
-          </a:effectRef>
-          <a:fontRef idx="minor">
-            <a:schemeClr val="dk1"/>
-          </a:fontRef>
-        </p:style>
-      </p:cxnSp>
-      <p:sp>
-        <p:nvSpPr>
-          <p:cNvPr id="73" name="Rectangle 72">
-            <a:extLst>
-              <a:ext uri="{FF2B5EF4-FFF2-40B4-BE49-F238E27FC236}">
-                <a16:creationId xmlns:a16="http://schemas.microsoft.com/office/drawing/2014/main" id="{87A12D63-5BF6-4C15-87B8-9CA2A57CBD0F}"/>
-              </a:ext>
-            </a:extLst>
-          </p:cNvPr>
-          <p:cNvSpPr/>
-          <p:nvPr/>
-        </p:nvSpPr>
-        <p:spPr>
-          <a:xfrm>
-            <a:off x="4981100" y="2209691"/>
-            <a:ext cx="696972" cy="260070"/>
-          </a:xfrm>
-          <a:prstGeom prst="rect">
-            <a:avLst/>
-          </a:prstGeom>
-          <a:ln w="19050"/>
-          <a:effectLst/>
-        </p:spPr>
-        <p:style>
-          <a:lnRef idx="1">
-            <a:schemeClr val="accent6"/>
-          </a:lnRef>
-          <a:fillRef idx="2">
-            <a:schemeClr val="accent6"/>
-          </a:fillRef>
-          <a:effectRef idx="1">
-            <a:schemeClr val="accent6"/>
-          </a:effectRef>
-          <a:fontRef idx="minor">
-            <a:schemeClr val="dk1"/>
-          </a:fontRef>
-        </p:style>
-        <p:txBody>
-          <a:bodyPr rtlCol="0" anchor="ctr"/>
-          <a:lstStyle/>
-          <a:p>
-            <a:pPr algn="ctr"/>
-            <a:r>
-              <a:rPr lang="en-US" sz="788" dirty="0"/>
-              <a:t>…Exception</a:t>
-            </a:r>
-            <a:endParaRPr lang="en-SG" sz="788" dirty="0"/>
-          </a:p>
-        </p:txBody>
-      </p:sp>
-      <p:sp>
-        <p:nvSpPr>
-          <p:cNvPr id="76" name="Rectangle 75">
-            <a:extLst>
-              <a:ext uri="{FF2B5EF4-FFF2-40B4-BE49-F238E27FC236}">
-                <a16:creationId xmlns:a16="http://schemas.microsoft.com/office/drawing/2014/main" id="{1167BB20-4B78-41B9-8D9E-31507837E5BD}"/>
-              </a:ext>
-            </a:extLst>
-          </p:cNvPr>
-          <p:cNvSpPr/>
-          <p:nvPr/>
-        </p:nvSpPr>
-        <p:spPr>
-          <a:xfrm>
-            <a:off x="4981100" y="3461357"/>
-            <a:ext cx="696972" cy="260070"/>
-          </a:xfrm>
-          <a:prstGeom prst="rect">
-            <a:avLst/>
-          </a:prstGeom>
-          <a:ln w="19050"/>
-          <a:effectLst/>
-        </p:spPr>
-        <p:style>
-          <a:lnRef idx="1">
-            <a:schemeClr val="accent6"/>
-          </a:lnRef>
-          <a:fillRef idx="2">
-            <a:schemeClr val="accent6"/>
-          </a:fillRef>
-          <a:effectRef idx="1">
-            <a:schemeClr val="accent6"/>
-          </a:effectRef>
-          <a:fontRef idx="minor">
-            <a:schemeClr val="dk1"/>
-          </a:fontRef>
-        </p:style>
-        <p:txBody>
-          <a:bodyPr rtlCol="0" anchor="ctr"/>
-          <a:lstStyle/>
-          <a:p>
-            <a:pPr algn="ctr"/>
-            <a:r>
-              <a:rPr lang="en-US" sz="788" dirty="0"/>
-              <a:t>Command</a:t>
-            </a:r>
-          </a:p>
-          <a:p>
-            <a:pPr algn="ctr"/>
-            <a:r>
-              <a:rPr lang="en-US" sz="788" dirty="0"/>
-              <a:t>History</a:t>
-            </a:r>
-            <a:endParaRPr lang="en-SG" sz="788" dirty="0"/>
-          </a:p>
-        </p:txBody>
-      </p:sp>
-      <p:sp>
-        <p:nvSpPr>
-          <p:cNvPr id="77" name="Rectangle 76">
-            <a:extLst>
-              <a:ext uri="{FF2B5EF4-FFF2-40B4-BE49-F238E27FC236}">
-                <a16:creationId xmlns:a16="http://schemas.microsoft.com/office/drawing/2014/main" id="{3A5BE087-5088-4EF8-B417-21A8C68C2E51}"/>
-              </a:ext>
-            </a:extLst>
-          </p:cNvPr>
-          <p:cNvSpPr/>
-          <p:nvPr/>
-        </p:nvSpPr>
-        <p:spPr>
-          <a:xfrm>
-            <a:off x="4989298" y="4082444"/>
-            <a:ext cx="696972" cy="260070"/>
-          </a:xfrm>
-          <a:prstGeom prst="rect">
-            <a:avLst/>
-          </a:prstGeom>
-          <a:ln w="19050"/>
-          <a:effectLst/>
-        </p:spPr>
-        <p:style>
-          <a:lnRef idx="1">
-            <a:schemeClr val="accent6"/>
-          </a:lnRef>
-          <a:fillRef idx="2">
-            <a:schemeClr val="accent6"/>
-          </a:fillRef>
-          <a:effectRef idx="1">
-            <a:schemeClr val="accent6"/>
-          </a:effectRef>
-          <a:fontRef idx="minor">
-            <a:schemeClr val="dk1"/>
-          </a:fontRef>
-        </p:style>
-        <p:txBody>
-          <a:bodyPr rtlCol="0" anchor="ctr"/>
-          <a:lstStyle/>
-          <a:p>
-            <a:pPr algn="ctr"/>
-            <a:r>
-              <a:rPr lang="en-US" sz="788" dirty="0"/>
-              <a:t>Command</a:t>
-            </a:r>
-          </a:p>
-          <a:p>
-            <a:pPr algn="ctr"/>
-            <a:r>
-              <a:rPr lang="en-US" sz="788" dirty="0"/>
-              <a:t>Stack</a:t>
-            </a:r>
-            <a:endParaRPr lang="en-SG" sz="788" dirty="0"/>
-          </a:p>
-        </p:txBody>
-      </p:sp>
-      <p:cxnSp>
-        <p:nvCxnSpPr>
-          <p:cNvPr id="79" name="Elbow Connector 50">
-            <a:extLst>
-              <a:ext uri="{FF2B5EF4-FFF2-40B4-BE49-F238E27FC236}">
-                <a16:creationId xmlns:a16="http://schemas.microsoft.com/office/drawing/2014/main" id="{39305F1B-7293-415D-AF1B-80D6391FA0B9}"/>
-              </a:ext>
-            </a:extLst>
-          </p:cNvPr>
-          <p:cNvCxnSpPr>
-            <a:cxnSpLocks/>
-            <a:stCxn id="71" idx="3"/>
-            <a:endCxn id="76" idx="1"/>
-          </p:cNvCxnSpPr>
-          <p:nvPr/>
-        </p:nvCxnSpPr>
-        <p:spPr>
-          <a:xfrm>
-            <a:off x="4656842" y="2575174"/>
-            <a:ext cx="324258" cy="1016219"/>
-          </a:xfrm>
-          <a:prstGeom prst="bentConnector3">
-            <a:avLst>
-              <a:gd name="adj1" fmla="val 50000"/>
-            </a:avLst>
-          </a:prstGeom>
-          <a:ln w="19050">
-            <a:headEnd type="none" w="med" len="med"/>
-            <a:tailEnd type="arrow" w="med" len="med"/>
-          </a:ln>
-          <a:effectLst/>
-        </p:spPr>
-        <p:style>
-          <a:lnRef idx="1">
-            <a:schemeClr val="accent6"/>
-          </a:lnRef>
-          <a:fillRef idx="2">
-            <a:schemeClr val="accent6"/>
-          </a:fillRef>
-          <a:effectRef idx="1">
-            <a:schemeClr val="accent6"/>
-          </a:effectRef>
-          <a:fontRef idx="minor">
-            <a:schemeClr val="dk1"/>
-          </a:fontRef>
-        </p:style>
-      </p:cxnSp>
-      <p:cxnSp>
-        <p:nvCxnSpPr>
-          <p:cNvPr id="84" name="Elbow Connector 50">
-            <a:extLst>
-              <a:ext uri="{FF2B5EF4-FFF2-40B4-BE49-F238E27FC236}">
-                <a16:creationId xmlns:a16="http://schemas.microsoft.com/office/drawing/2014/main" id="{1E5C96D2-F12A-4B53-BAD7-4037CEE64661}"/>
-              </a:ext>
-            </a:extLst>
-          </p:cNvPr>
-          <p:cNvCxnSpPr>
-            <a:cxnSpLocks/>
-            <a:stCxn id="71" idx="3"/>
-            <a:endCxn id="77" idx="1"/>
-          </p:cNvCxnSpPr>
-          <p:nvPr/>
-        </p:nvCxnSpPr>
-        <p:spPr>
-          <a:xfrm>
-            <a:off x="4656842" y="2575173"/>
-            <a:ext cx="332456" cy="1637306"/>
-          </a:xfrm>
-          <a:prstGeom prst="bentConnector3">
-            <a:avLst>
-              <a:gd name="adj1" fmla="val 50000"/>
-            </a:avLst>
-          </a:prstGeom>
-          <a:ln w="19050">
-            <a:headEnd type="none" w="med" len="med"/>
-            <a:tailEnd type="arrow" w="med" len="med"/>
-          </a:ln>
-          <a:effectLst/>
-        </p:spPr>
-        <p:style>
-          <a:lnRef idx="1">
-            <a:schemeClr val="accent6"/>
-          </a:lnRef>
-          <a:fillRef idx="2">
-            <a:schemeClr val="accent6"/>
-          </a:fillRef>
-          <a:effectRef idx="1">
-            <a:schemeClr val="accent6"/>
-          </a:effectRef>
-          <a:fontRef idx="minor">
-            <a:schemeClr val="dk1"/>
-          </a:fontRef>
-        </p:style>
-      </p:cxnSp>
-      <p:sp>
-        <p:nvSpPr>
-          <p:cNvPr id="98" name="TextBox 97">
-            <a:extLst>
-              <a:ext uri="{FF2B5EF4-FFF2-40B4-BE49-F238E27FC236}">
-                <a16:creationId xmlns:a16="http://schemas.microsoft.com/office/drawing/2014/main" id="{4558D250-C114-4BB3-A261-FDF76F07FE5B}"/>
+                <a16:creationId xmlns:a16="http://schemas.microsoft.com/office/drawing/2014/main" id="{11B5617C-AC77-ED43-B27A-A9454742C897}"/>
               </a:ext>
             </a:extLst>
           </p:cNvPr>
@@ -11354,8 +12167,8 @@
         </p:nvSpPr>
         <p:spPr>
           <a:xfrm>
-            <a:off x="762000" y="533400"/>
-            <a:ext cx="1549908" cy="300082"/>
+            <a:off x="3681984" y="1267968"/>
+            <a:ext cx="659155" cy="369332"/>
           </a:xfrm>
           <a:prstGeom prst="rect">
             <a:avLst/>
@@ -11363,14 +12176,14 @@
           <a:noFill/>
         </p:spPr>
         <p:txBody>
-          <a:bodyPr wrap="square" rtlCol="0">
+          <a:bodyPr wrap="none" rtlCol="0">
             <a:spAutoFit/>
           </a:bodyPr>
           <a:lstStyle/>
           <a:p>
             <a:r>
-              <a:rPr lang="en-US" sz="1350" dirty="0"/>
-              <a:t>Data</a:t>
+              <a:rPr lang="en-US" dirty="0"/>
+              <a:t>NICH</a:t>
             </a:r>
           </a:p>
         </p:txBody>
@@ -11378,7 +12191,138 @@
     </p:spTree>
     <p:extLst>
       <p:ext uri="{BB962C8B-B14F-4D97-AF65-F5344CB8AC3E}">
-        <p14:creationId xmlns:p14="http://schemas.microsoft.com/office/powerpoint/2010/main" val="3441932977"/>
+        <p14:creationId xmlns:p14="http://schemas.microsoft.com/office/powerpoint/2010/main" val="3534876607"/>
+      </p:ext>
+    </p:extLst>
+  </p:cSld>
+  <p:clrMapOvr>
+    <a:masterClrMapping/>
+  </p:clrMapOvr>
+</p:sld>
+</file>
+
+<file path=ppt/slides/slide8.xml><?xml version="1.0" encoding="utf-8"?>
+<p:sld xmlns:a="http://schemas.openxmlformats.org/drawingml/2006/main" xmlns:r="http://schemas.openxmlformats.org/officeDocument/2006/relationships" xmlns:p="http://schemas.openxmlformats.org/presentationml/2006/main">
+  <p:cSld>
+    <p:spTree>
+      <p:nvGrpSpPr>
+        <p:cNvPr id="1" name=""/>
+        <p:cNvGrpSpPr/>
+        <p:nvPr/>
+      </p:nvGrpSpPr>
+      <p:grpSpPr>
+        <a:xfrm>
+          <a:off x="0" y="0"/>
+          <a:ext cx="0" cy="0"/>
+          <a:chOff x="0" y="0"/>
+          <a:chExt cx="0" cy="0"/>
+        </a:xfrm>
+      </p:grpSpPr>
+      <p:sp>
+        <p:nvSpPr>
+          <p:cNvPr id="2" name="TextBox 1">
+            <a:extLst>
+              <a:ext uri="{FF2B5EF4-FFF2-40B4-BE49-F238E27FC236}">
+                <a16:creationId xmlns:a16="http://schemas.microsoft.com/office/drawing/2014/main" id="{11B5617C-AC77-ED43-B27A-A9454742C897}"/>
+              </a:ext>
+            </a:extLst>
+          </p:cNvPr>
+          <p:cNvSpPr txBox="1"/>
+          <p:nvPr/>
+        </p:nvSpPr>
+        <p:spPr>
+          <a:xfrm>
+            <a:off x="3681984" y="1267968"/>
+            <a:ext cx="659155" cy="369332"/>
+          </a:xfrm>
+          <a:prstGeom prst="rect">
+            <a:avLst/>
+          </a:prstGeom>
+          <a:noFill/>
+        </p:spPr>
+        <p:txBody>
+          <a:bodyPr wrap="none" rtlCol="0">
+            <a:spAutoFit/>
+          </a:bodyPr>
+          <a:lstStyle/>
+          <a:p>
+            <a:r>
+              <a:rPr lang="en-US" dirty="0"/>
+              <a:t>NICH</a:t>
+            </a:r>
+          </a:p>
+        </p:txBody>
+      </p:sp>
+    </p:spTree>
+    <p:extLst>
+      <p:ext uri="{BB962C8B-B14F-4D97-AF65-F5344CB8AC3E}">
+        <p14:creationId xmlns:p14="http://schemas.microsoft.com/office/powerpoint/2010/main" val="1075803884"/>
+      </p:ext>
+    </p:extLst>
+  </p:cSld>
+  <p:clrMapOvr>
+    <a:masterClrMapping/>
+  </p:clrMapOvr>
+</p:sld>
+</file>
+
+<file path=ppt/slides/slide9.xml><?xml version="1.0" encoding="utf-8"?>
+<p:sld xmlns:a="http://schemas.openxmlformats.org/drawingml/2006/main" xmlns:r="http://schemas.openxmlformats.org/officeDocument/2006/relationships" xmlns:p="http://schemas.openxmlformats.org/presentationml/2006/main">
+  <p:cSld>
+    <p:spTree>
+      <p:nvGrpSpPr>
+        <p:cNvPr id="1" name=""/>
+        <p:cNvGrpSpPr/>
+        <p:nvPr/>
+      </p:nvGrpSpPr>
+      <p:grpSpPr>
+        <a:xfrm>
+          <a:off x="0" y="0"/>
+          <a:ext cx="0" cy="0"/>
+          <a:chOff x="0" y="0"/>
+          <a:chExt cx="0" cy="0"/>
+        </a:xfrm>
+      </p:grpSpPr>
+      <p:sp>
+        <p:nvSpPr>
+          <p:cNvPr id="2" name="TextBox 1">
+            <a:extLst>
+              <a:ext uri="{FF2B5EF4-FFF2-40B4-BE49-F238E27FC236}">
+                <a16:creationId xmlns:a16="http://schemas.microsoft.com/office/drawing/2014/main" id="{F298CF04-C313-E24A-A52B-837593E940AF}"/>
+              </a:ext>
+            </a:extLst>
+          </p:cNvPr>
+          <p:cNvSpPr txBox="1"/>
+          <p:nvPr/>
+        </p:nvSpPr>
+        <p:spPr>
+          <a:xfrm>
+            <a:off x="5693664" y="2682240"/>
+            <a:ext cx="514885" cy="369332"/>
+          </a:xfrm>
+          <a:prstGeom prst="rect">
+            <a:avLst/>
+          </a:prstGeom>
+          <a:noFill/>
+        </p:spPr>
+        <p:txBody>
+          <a:bodyPr wrap="none" rtlCol="0">
+            <a:spAutoFit/>
+          </a:bodyPr>
+          <a:lstStyle/>
+          <a:p>
+            <a:r>
+              <a:rPr lang="en-US" dirty="0" err="1"/>
+              <a:t>Xiyi</a:t>
+            </a:r>
+            <a:endParaRPr lang="en-US" dirty="0"/>
+          </a:p>
+        </p:txBody>
+      </p:sp>
+    </p:spTree>
+    <p:extLst>
+      <p:ext uri="{BB962C8B-B14F-4D97-AF65-F5344CB8AC3E}">
+        <p14:creationId xmlns:p14="http://schemas.microsoft.com/office/powerpoint/2010/main" val="3256526287"/>
       </p:ext>
     </p:extLst>
   </p:cSld>

</xml_diff>

<commit_message>
made changes to ppp and updated diagram for Data Component
</commit_message>
<xml_diff>
--- a/docs/Diagrams.pptx
+++ b/docs/Diagrams.pptx
@@ -215,7 +215,7 @@
           <a:p>
             <a:fld id="{F5CC4B3F-88C1-4FFA-B1B6-F41C21DC6924}" type="datetimeFigureOut">
               <a:rPr lang="en-US" smtClean="0"/>
-              <a:t>11/8/2018</a:t>
+              <a:t>11/11/2018</a:t>
             </a:fld>
             <a:endParaRPr lang="en-US"/>
           </a:p>
@@ -829,7 +829,7 @@
           <a:p>
             <a:fld id="{78C97017-6FC3-485B-9764-EAC9E56C1D49}" type="datetimeFigureOut">
               <a:rPr lang="en-US" smtClean="0"/>
-              <a:t>11/8/2018</a:t>
+              <a:t>11/11/2018</a:t>
             </a:fld>
             <a:endParaRPr lang="en-US"/>
           </a:p>
@@ -997,7 +997,7 @@
           <a:p>
             <a:fld id="{78C97017-6FC3-485B-9764-EAC9E56C1D49}" type="datetimeFigureOut">
               <a:rPr lang="en-US" smtClean="0"/>
-              <a:t>11/8/2018</a:t>
+              <a:t>11/11/2018</a:t>
             </a:fld>
             <a:endParaRPr lang="en-US"/>
           </a:p>
@@ -1175,7 +1175,7 @@
           <a:p>
             <a:fld id="{78C97017-6FC3-485B-9764-EAC9E56C1D49}" type="datetimeFigureOut">
               <a:rPr lang="en-US" smtClean="0"/>
-              <a:t>11/8/2018</a:t>
+              <a:t>11/11/2018</a:t>
             </a:fld>
             <a:endParaRPr lang="en-US"/>
           </a:p>
@@ -1343,7 +1343,7 @@
           <a:p>
             <a:fld id="{78C97017-6FC3-485B-9764-EAC9E56C1D49}" type="datetimeFigureOut">
               <a:rPr lang="en-US" smtClean="0"/>
-              <a:t>11/8/2018</a:t>
+              <a:t>11/11/2018</a:t>
             </a:fld>
             <a:endParaRPr lang="en-US"/>
           </a:p>
@@ -1588,7 +1588,7 @@
           <a:p>
             <a:fld id="{78C97017-6FC3-485B-9764-EAC9E56C1D49}" type="datetimeFigureOut">
               <a:rPr lang="en-US" smtClean="0"/>
-              <a:t>11/8/2018</a:t>
+              <a:t>11/11/2018</a:t>
             </a:fld>
             <a:endParaRPr lang="en-US"/>
           </a:p>
@@ -1873,7 +1873,7 @@
           <a:p>
             <a:fld id="{78C97017-6FC3-485B-9764-EAC9E56C1D49}" type="datetimeFigureOut">
               <a:rPr lang="en-US" smtClean="0"/>
-              <a:t>11/8/2018</a:t>
+              <a:t>11/11/2018</a:t>
             </a:fld>
             <a:endParaRPr lang="en-US"/>
           </a:p>
@@ -2292,7 +2292,7 @@
           <a:p>
             <a:fld id="{78C97017-6FC3-485B-9764-EAC9E56C1D49}" type="datetimeFigureOut">
               <a:rPr lang="en-US" smtClean="0"/>
-              <a:t>11/8/2018</a:t>
+              <a:t>11/11/2018</a:t>
             </a:fld>
             <a:endParaRPr lang="en-US"/>
           </a:p>
@@ -2409,7 +2409,7 @@
           <a:p>
             <a:fld id="{78C97017-6FC3-485B-9764-EAC9E56C1D49}" type="datetimeFigureOut">
               <a:rPr lang="en-US" smtClean="0"/>
-              <a:t>11/8/2018</a:t>
+              <a:t>11/11/2018</a:t>
             </a:fld>
             <a:endParaRPr lang="en-US"/>
           </a:p>
@@ -2504,7 +2504,7 @@
           <a:p>
             <a:fld id="{78C97017-6FC3-485B-9764-EAC9E56C1D49}" type="datetimeFigureOut">
               <a:rPr lang="en-US" smtClean="0"/>
-              <a:t>11/8/2018</a:t>
+              <a:t>11/11/2018</a:t>
             </a:fld>
             <a:endParaRPr lang="en-US"/>
           </a:p>
@@ -2779,7 +2779,7 @@
           <a:p>
             <a:fld id="{78C97017-6FC3-485B-9764-EAC9E56C1D49}" type="datetimeFigureOut">
               <a:rPr lang="en-US" smtClean="0"/>
-              <a:t>11/8/2018</a:t>
+              <a:t>11/11/2018</a:t>
             </a:fld>
             <a:endParaRPr lang="en-US"/>
           </a:p>
@@ -3031,7 +3031,7 @@
           <a:p>
             <a:fld id="{78C97017-6FC3-485B-9764-EAC9E56C1D49}" type="datetimeFigureOut">
               <a:rPr lang="en-US" smtClean="0"/>
-              <a:t>11/8/2018</a:t>
+              <a:t>11/11/2018</a:t>
             </a:fld>
             <a:endParaRPr lang="en-US"/>
           </a:p>
@@ -3242,7 +3242,7 @@
           <a:p>
             <a:fld id="{78C97017-6FC3-485B-9764-EAC9E56C1D49}" type="datetimeFigureOut">
               <a:rPr lang="en-US" smtClean="0"/>
-              <a:t>11/8/2018</a:t>
+              <a:t>11/11/2018</a:t>
             </a:fld>
             <a:endParaRPr lang="en-US"/>
           </a:p>
@@ -14291,8 +14291,8 @@
         </p:nvCxnSpPr>
         <p:spPr>
           <a:xfrm>
-            <a:off x="6980208" y="2503733"/>
-            <a:ext cx="0" cy="791631"/>
+            <a:off x="6966163" y="2095437"/>
+            <a:ext cx="11996" cy="1595074"/>
           </a:xfrm>
           <a:prstGeom prst="line">
             <a:avLst/>
@@ -14848,6 +14848,212 @@
         <p:spPr>
           <a:xfrm>
             <a:off x="6980208" y="3287825"/>
+            <a:ext cx="240873" cy="0"/>
+          </a:xfrm>
+          <a:prstGeom prst="straightConnector1">
+            <a:avLst/>
+          </a:prstGeom>
+          <a:ln w="12700">
+            <a:tailEnd type="triangle"/>
+          </a:ln>
+        </p:spPr>
+        <p:style>
+          <a:lnRef idx="1">
+            <a:schemeClr val="accent4"/>
+          </a:lnRef>
+          <a:fillRef idx="0">
+            <a:schemeClr val="accent4"/>
+          </a:fillRef>
+          <a:effectRef idx="0">
+            <a:schemeClr val="accent4"/>
+          </a:effectRef>
+          <a:fontRef idx="minor">
+            <a:schemeClr val="tx1"/>
+          </a:fontRef>
+        </p:style>
+      </p:cxnSp>
+      <p:sp>
+        <p:nvSpPr>
+          <p:cNvPr id="96" name="Rectangle 8">
+            <a:extLst>
+              <a:ext uri="{FF2B5EF4-FFF2-40B4-BE49-F238E27FC236}">
+                <a16:creationId xmlns:a16="http://schemas.microsoft.com/office/drawing/2014/main" id="{1D8160A6-31BE-40D7-B942-B5E72A9076A4}"/>
+              </a:ext>
+            </a:extLst>
+          </p:cNvPr>
+          <p:cNvSpPr/>
+          <p:nvPr/>
+        </p:nvSpPr>
+        <p:spPr>
+          <a:xfrm>
+            <a:off x="7200466" y="1943418"/>
+            <a:ext cx="1194207" cy="285783"/>
+          </a:xfrm>
+          <a:prstGeom prst="rect">
+            <a:avLst/>
+          </a:prstGeom>
+          <a:ln w="19050">
+            <a:solidFill>
+              <a:srgbClr val="7030A0"/>
+            </a:solidFill>
+          </a:ln>
+          <a:effectLst/>
+        </p:spPr>
+        <p:style>
+          <a:lnRef idx="1">
+            <a:schemeClr val="accent4"/>
+          </a:lnRef>
+          <a:fillRef idx="2">
+            <a:schemeClr val="accent4"/>
+          </a:fillRef>
+          <a:effectRef idx="1">
+            <a:schemeClr val="accent4"/>
+          </a:effectRef>
+          <a:fontRef idx="minor">
+            <a:schemeClr val="dk1"/>
+          </a:fontRef>
+        </p:style>
+        <p:txBody>
+          <a:bodyPr rtlCol="0" anchor="ctr"/>
+          <a:lstStyle/>
+          <a:p>
+            <a:pPr algn="ctr"/>
+            <a:r>
+              <a:rPr lang="en-US" sz="1050" dirty="0" err="1">
+                <a:solidFill>
+                  <a:srgbClr val="7030A0"/>
+                </a:solidFill>
+              </a:rPr>
+              <a:t>MemberTier</a:t>
+            </a:r>
+            <a:endParaRPr lang="en-SG" sz="1050" dirty="0">
+              <a:solidFill>
+                <a:srgbClr val="7030A0"/>
+              </a:solidFill>
+            </a:endParaRPr>
+          </a:p>
+        </p:txBody>
+      </p:sp>
+      <p:sp>
+        <p:nvSpPr>
+          <p:cNvPr id="97" name="Rectangle 8">
+            <a:extLst>
+              <a:ext uri="{FF2B5EF4-FFF2-40B4-BE49-F238E27FC236}">
+                <a16:creationId xmlns:a16="http://schemas.microsoft.com/office/drawing/2014/main" id="{7D99E4C9-F3B5-4106-AE4A-6126847CD180}"/>
+              </a:ext>
+            </a:extLst>
+          </p:cNvPr>
+          <p:cNvSpPr/>
+          <p:nvPr/>
+        </p:nvSpPr>
+        <p:spPr>
+          <a:xfrm>
+            <a:off x="7222926" y="3547620"/>
+            <a:ext cx="1194207" cy="285783"/>
+          </a:xfrm>
+          <a:prstGeom prst="rect">
+            <a:avLst/>
+          </a:prstGeom>
+          <a:ln w="19050">
+            <a:solidFill>
+              <a:srgbClr val="7030A0"/>
+            </a:solidFill>
+          </a:ln>
+          <a:effectLst/>
+        </p:spPr>
+        <p:style>
+          <a:lnRef idx="1">
+            <a:schemeClr val="accent4"/>
+          </a:lnRef>
+          <a:fillRef idx="2">
+            <a:schemeClr val="accent4"/>
+          </a:fillRef>
+          <a:effectRef idx="1">
+            <a:schemeClr val="accent4"/>
+          </a:effectRef>
+          <a:fontRef idx="minor">
+            <a:schemeClr val="dk1"/>
+          </a:fontRef>
+        </p:style>
+        <p:txBody>
+          <a:bodyPr rtlCol="0" anchor="ctr"/>
+          <a:lstStyle/>
+          <a:p>
+            <a:pPr algn="ctr"/>
+            <a:r>
+              <a:rPr lang="en-US" sz="1050" dirty="0" err="1">
+                <a:solidFill>
+                  <a:srgbClr val="7030A0"/>
+                </a:solidFill>
+              </a:rPr>
+              <a:t>MemberEmail</a:t>
+            </a:r>
+            <a:endParaRPr lang="en-SG" sz="1050" dirty="0">
+              <a:solidFill>
+                <a:srgbClr val="7030A0"/>
+              </a:solidFill>
+            </a:endParaRPr>
+          </a:p>
+        </p:txBody>
+      </p:sp>
+      <p:cxnSp>
+        <p:nvCxnSpPr>
+          <p:cNvPr id="98" name="Straight Arrow Connector 97">
+            <a:extLst>
+              <a:ext uri="{FF2B5EF4-FFF2-40B4-BE49-F238E27FC236}">
+                <a16:creationId xmlns:a16="http://schemas.microsoft.com/office/drawing/2014/main" id="{AE37EE06-3295-4A7F-B6B0-415DAFA5DBEA}"/>
+              </a:ext>
+            </a:extLst>
+          </p:cNvPr>
+          <p:cNvCxnSpPr>
+            <a:cxnSpLocks/>
+          </p:cNvCxnSpPr>
+          <p:nvPr/>
+        </p:nvCxnSpPr>
+        <p:spPr>
+          <a:xfrm>
+            <a:off x="6980208" y="3690940"/>
+            <a:ext cx="240873" cy="0"/>
+          </a:xfrm>
+          <a:prstGeom prst="straightConnector1">
+            <a:avLst/>
+          </a:prstGeom>
+          <a:ln w="12700">
+            <a:tailEnd type="triangle"/>
+          </a:ln>
+        </p:spPr>
+        <p:style>
+          <a:lnRef idx="1">
+            <a:schemeClr val="accent4"/>
+          </a:lnRef>
+          <a:fillRef idx="0">
+            <a:schemeClr val="accent4"/>
+          </a:fillRef>
+          <a:effectRef idx="0">
+            <a:schemeClr val="accent4"/>
+          </a:effectRef>
+          <a:fontRef idx="minor">
+            <a:schemeClr val="tx1"/>
+          </a:fontRef>
+        </p:style>
+      </p:cxnSp>
+      <p:cxnSp>
+        <p:nvCxnSpPr>
+          <p:cNvPr id="99" name="Straight Arrow Connector 98">
+            <a:extLst>
+              <a:ext uri="{FF2B5EF4-FFF2-40B4-BE49-F238E27FC236}">
+                <a16:creationId xmlns:a16="http://schemas.microsoft.com/office/drawing/2014/main" id="{F0EF81CD-1140-4E9D-B130-EC46B9874DA1}"/>
+              </a:ext>
+            </a:extLst>
+          </p:cNvPr>
+          <p:cNvCxnSpPr>
+            <a:cxnSpLocks/>
+          </p:cNvCxnSpPr>
+          <p:nvPr/>
+        </p:nvCxnSpPr>
+        <p:spPr>
+          <a:xfrm>
+            <a:off x="6972868" y="2095437"/>
             <a:ext cx="240873" cy="0"/>
           </a:xfrm>
           <a:prstGeom prst="straightConnector1">

</xml_diff>

<commit_message>
loginstorage.txt will be created in same directory of jar file
</commit_message>
<xml_diff>
--- a/docs/Diagrams.pptx
+++ b/docs/Diagrams.pptx
@@ -4223,41 +4223,6 @@
       </p:grpSpPr>
       <p:sp>
         <p:nvSpPr>
-          <p:cNvPr id="2" name="TextBox 1">
-            <a:extLst>
-              <a:ext uri="{FF2B5EF4-FFF2-40B4-BE49-F238E27FC236}">
-                <a16:creationId xmlns:a16="http://schemas.microsoft.com/office/drawing/2014/main" id="{4D05C971-D981-664C-A746-65DFB8DF78C0}"/>
-              </a:ext>
-            </a:extLst>
-          </p:cNvPr>
-          <p:cNvSpPr txBox="1"/>
-          <p:nvPr/>
-        </p:nvSpPr>
-        <p:spPr>
-          <a:xfrm>
-            <a:off x="304800" y="6292015"/>
-            <a:ext cx="332142" cy="369332"/>
-          </a:xfrm>
-          <a:prstGeom prst="rect">
-            <a:avLst/>
-          </a:prstGeom>
-          <a:noFill/>
-        </p:spPr>
-        <p:txBody>
-          <a:bodyPr wrap="none" rtlCol="0">
-            <a:spAutoFit/>
-          </a:bodyPr>
-          <a:lstStyle/>
-          <a:p>
-            <a:r>
-              <a:rPr lang="en-US" dirty="0"/>
-              <a:t>JJ</a:t>
-            </a:r>
-          </a:p>
-        </p:txBody>
-      </p:sp>
-      <p:sp>
-        <p:nvSpPr>
           <p:cNvPr id="3" name="Rectangle 2">
             <a:extLst>
               <a:ext uri="{FF2B5EF4-FFF2-40B4-BE49-F238E27FC236}">
@@ -4436,7 +4401,7 @@
           <a:p>
             <a:pPr algn="ctr"/>
             <a:r>
-              <a:rPr lang="en-US" sz="1050" dirty="0" err="1">
+              <a:rPr lang="en-US" sz="1050" dirty="0">
                 <a:solidFill>
                   <a:schemeClr val="bg1"/>
                 </a:solidFill>
@@ -4757,7 +4722,7 @@
           <a:p>
             <a:pPr algn="ctr"/>
             <a:r>
-              <a:rPr lang="en-US" sz="1050" dirty="0" err="1">
+              <a:rPr lang="en-US" sz="1050" dirty="0">
                 <a:solidFill>
                   <a:schemeClr val="bg1"/>
                 </a:solidFill>
@@ -4871,7 +4836,7 @@
           <a:p>
             <a:pPr algn="ctr"/>
             <a:r>
-              <a:rPr lang="en-US" sz="1050" dirty="0" err="1">
+              <a:rPr lang="en-US" sz="1050" dirty="0">
                 <a:solidFill>
                   <a:schemeClr val="bg1"/>
                 </a:solidFill>
@@ -5344,7 +5309,7 @@
           <a:p>
             <a:pPr algn="ctr"/>
             <a:r>
-              <a:rPr lang="en-US" sz="1050" dirty="0" err="1">
+              <a:rPr lang="en-US" sz="1050" dirty="0">
                 <a:solidFill>
                   <a:schemeClr val="bg1"/>
                 </a:solidFill>
@@ -7847,7 +7812,7 @@
           <a:p>
             <a:pPr algn="ctr"/>
             <a:r>
-              <a:rPr lang="en-US" sz="1050" dirty="0" err="1">
+              <a:rPr lang="en-US" sz="1050" dirty="0">
                 <a:solidFill>
                   <a:schemeClr val="bg1"/>
                 </a:solidFill>
@@ -8874,7 +8839,7 @@
           <a:p>
             <a:pPr algn="ctr"/>
             <a:r>
-              <a:rPr lang="en-US" sz="1050" dirty="0" err="1">
+              <a:rPr lang="en-US" sz="1050" dirty="0">
                 <a:solidFill>
                   <a:schemeClr val="bg1"/>
                 </a:solidFill>
@@ -9559,7 +9524,7 @@
           <a:p>
             <a:pPr algn="ctr"/>
             <a:r>
-              <a:rPr lang="en-US" sz="1050" dirty="0" err="1">
+              <a:rPr lang="en-US" sz="1050" dirty="0">
                 <a:solidFill>
                   <a:schemeClr val="bg1"/>
                 </a:solidFill>

</xml_diff>

<commit_message>
change the data component diagram
</commit_message>
<xml_diff>
--- a/docs/Diagrams.pptx
+++ b/docs/Diagrams.pptx
@@ -215,7 +215,7 @@
           <a:p>
             <a:fld id="{F5CC4B3F-88C1-4FFA-B1B6-F41C21DC6924}" type="datetimeFigureOut">
               <a:rPr lang="en-US" smtClean="0"/>
-              <a:t>11/8/2018</a:t>
+              <a:t>11/12/2018</a:t>
             </a:fld>
             <a:endParaRPr lang="en-US"/>
           </a:p>
@@ -829,7 +829,7 @@
           <a:p>
             <a:fld id="{78C97017-6FC3-485B-9764-EAC9E56C1D49}" type="datetimeFigureOut">
               <a:rPr lang="en-US" smtClean="0"/>
-              <a:t>11/8/2018</a:t>
+              <a:t>11/12/2018</a:t>
             </a:fld>
             <a:endParaRPr lang="en-US"/>
           </a:p>
@@ -997,7 +997,7 @@
           <a:p>
             <a:fld id="{78C97017-6FC3-485B-9764-EAC9E56C1D49}" type="datetimeFigureOut">
               <a:rPr lang="en-US" smtClean="0"/>
-              <a:t>11/8/2018</a:t>
+              <a:t>11/12/2018</a:t>
             </a:fld>
             <a:endParaRPr lang="en-US"/>
           </a:p>
@@ -1175,7 +1175,7 @@
           <a:p>
             <a:fld id="{78C97017-6FC3-485B-9764-EAC9E56C1D49}" type="datetimeFigureOut">
               <a:rPr lang="en-US" smtClean="0"/>
-              <a:t>11/8/2018</a:t>
+              <a:t>11/12/2018</a:t>
             </a:fld>
             <a:endParaRPr lang="en-US"/>
           </a:p>
@@ -1343,7 +1343,7 @@
           <a:p>
             <a:fld id="{78C97017-6FC3-485B-9764-EAC9E56C1D49}" type="datetimeFigureOut">
               <a:rPr lang="en-US" smtClean="0"/>
-              <a:t>11/8/2018</a:t>
+              <a:t>11/12/2018</a:t>
             </a:fld>
             <a:endParaRPr lang="en-US"/>
           </a:p>
@@ -1588,7 +1588,7 @@
           <a:p>
             <a:fld id="{78C97017-6FC3-485B-9764-EAC9E56C1D49}" type="datetimeFigureOut">
               <a:rPr lang="en-US" smtClean="0"/>
-              <a:t>11/8/2018</a:t>
+              <a:t>11/12/2018</a:t>
             </a:fld>
             <a:endParaRPr lang="en-US"/>
           </a:p>
@@ -1873,7 +1873,7 @@
           <a:p>
             <a:fld id="{78C97017-6FC3-485B-9764-EAC9E56C1D49}" type="datetimeFigureOut">
               <a:rPr lang="en-US" smtClean="0"/>
-              <a:t>11/8/2018</a:t>
+              <a:t>11/12/2018</a:t>
             </a:fld>
             <a:endParaRPr lang="en-US"/>
           </a:p>
@@ -2292,7 +2292,7 @@
           <a:p>
             <a:fld id="{78C97017-6FC3-485B-9764-EAC9E56C1D49}" type="datetimeFigureOut">
               <a:rPr lang="en-US" smtClean="0"/>
-              <a:t>11/8/2018</a:t>
+              <a:t>11/12/2018</a:t>
             </a:fld>
             <a:endParaRPr lang="en-US"/>
           </a:p>
@@ -2409,7 +2409,7 @@
           <a:p>
             <a:fld id="{78C97017-6FC3-485B-9764-EAC9E56C1D49}" type="datetimeFigureOut">
               <a:rPr lang="en-US" smtClean="0"/>
-              <a:t>11/8/2018</a:t>
+              <a:t>11/12/2018</a:t>
             </a:fld>
             <a:endParaRPr lang="en-US"/>
           </a:p>
@@ -2504,7 +2504,7 @@
           <a:p>
             <a:fld id="{78C97017-6FC3-485B-9764-EAC9E56C1D49}" type="datetimeFigureOut">
               <a:rPr lang="en-US" smtClean="0"/>
-              <a:t>11/8/2018</a:t>
+              <a:t>11/12/2018</a:t>
             </a:fld>
             <a:endParaRPr lang="en-US"/>
           </a:p>
@@ -2779,7 +2779,7 @@
           <a:p>
             <a:fld id="{78C97017-6FC3-485B-9764-EAC9E56C1D49}" type="datetimeFigureOut">
               <a:rPr lang="en-US" smtClean="0"/>
-              <a:t>11/8/2018</a:t>
+              <a:t>11/12/2018</a:t>
             </a:fld>
             <a:endParaRPr lang="en-US"/>
           </a:p>
@@ -3031,7 +3031,7 @@
           <a:p>
             <a:fld id="{78C97017-6FC3-485B-9764-EAC9E56C1D49}" type="datetimeFigureOut">
               <a:rPr lang="en-US" smtClean="0"/>
-              <a:t>11/8/2018</a:t>
+              <a:t>11/12/2018</a:t>
             </a:fld>
             <a:endParaRPr lang="en-US"/>
           </a:p>
@@ -3242,7 +3242,7 @@
           <a:p>
             <a:fld id="{78C97017-6FC3-485B-9764-EAC9E56C1D49}" type="datetimeFigureOut">
               <a:rPr lang="en-US" smtClean="0"/>
-              <a:t>11/8/2018</a:t>
+              <a:t>11/12/2018</a:t>
             </a:fld>
             <a:endParaRPr lang="en-US"/>
           </a:p>
@@ -10432,7 +10432,7 @@
         <p:spPr>
           <a:xfrm>
             <a:off x="113164" y="565913"/>
-            <a:ext cx="8802236" cy="6040606"/>
+            <a:ext cx="8954636" cy="6040606"/>
           </a:xfrm>
           <a:prstGeom prst="roundRect">
             <a:avLst>
@@ -11469,7 +11469,7 @@
         </p:nvSpPr>
         <p:spPr>
           <a:xfrm>
-            <a:off x="7205170" y="2354303"/>
+            <a:off x="7217135" y="1574271"/>
             <a:ext cx="1194207" cy="285783"/>
           </a:xfrm>
           <a:prstGeom prst="rect">
@@ -12035,86 +12035,6 @@
           <a:ln w="19050">
             <a:tailEnd type="triangle"/>
           </a:ln>
-        </p:spPr>
-        <p:style>
-          <a:lnRef idx="1">
-            <a:schemeClr val="accent4"/>
-          </a:lnRef>
-          <a:fillRef idx="0">
-            <a:schemeClr val="accent4"/>
-          </a:fillRef>
-          <a:effectRef idx="0">
-            <a:schemeClr val="accent4"/>
-          </a:effectRef>
-          <a:fontRef idx="minor">
-            <a:schemeClr val="tx1"/>
-          </a:fontRef>
-        </p:style>
-      </p:cxnSp>
-      <p:cxnSp>
-        <p:nvCxnSpPr>
-          <p:cNvPr id="133" name="Straight Arrow Connector 132">
-            <a:extLst>
-              <a:ext uri="{FF2B5EF4-FFF2-40B4-BE49-F238E27FC236}">
-                <a16:creationId xmlns:a16="http://schemas.microsoft.com/office/drawing/2014/main" id="{3260D866-1EA3-4E19-8924-BDDE387BA9AE}"/>
-              </a:ext>
-            </a:extLst>
-          </p:cNvPr>
-          <p:cNvCxnSpPr>
-            <a:cxnSpLocks/>
-          </p:cNvCxnSpPr>
-          <p:nvPr/>
-        </p:nvCxnSpPr>
-        <p:spPr>
-          <a:xfrm>
-            <a:off x="5526943" y="2966089"/>
-            <a:ext cx="188057" cy="0"/>
-          </a:xfrm>
-          <a:prstGeom prst="straightConnector1">
-            <a:avLst/>
-          </a:prstGeom>
-          <a:ln w="12700">
-            <a:tailEnd type="triangle"/>
-          </a:ln>
-        </p:spPr>
-        <p:style>
-          <a:lnRef idx="1">
-            <a:schemeClr val="accent4"/>
-          </a:lnRef>
-          <a:fillRef idx="0">
-            <a:schemeClr val="accent4"/>
-          </a:fillRef>
-          <a:effectRef idx="0">
-            <a:schemeClr val="accent4"/>
-          </a:effectRef>
-          <a:fontRef idx="minor">
-            <a:schemeClr val="tx1"/>
-          </a:fontRef>
-        </p:style>
-      </p:cxnSp>
-      <p:cxnSp>
-        <p:nvCxnSpPr>
-          <p:cNvPr id="134" name="Straight Connector 133">
-            <a:extLst>
-              <a:ext uri="{FF2B5EF4-FFF2-40B4-BE49-F238E27FC236}">
-                <a16:creationId xmlns:a16="http://schemas.microsoft.com/office/drawing/2014/main" id="{DFB9FB29-11CE-4E27-AA73-4AEB1ACE8CB9}"/>
-              </a:ext>
-            </a:extLst>
-          </p:cNvPr>
-          <p:cNvCxnSpPr>
-            <a:cxnSpLocks/>
-          </p:cNvCxnSpPr>
-          <p:nvPr/>
-        </p:nvCxnSpPr>
-        <p:spPr>
-          <a:xfrm flipH="1">
-            <a:off x="5526148" y="2965842"/>
-            <a:ext cx="2753" cy="2021551"/>
-          </a:xfrm>
-          <a:prstGeom prst="line">
-            <a:avLst/>
-          </a:prstGeom>
-          <a:ln w="12700"/>
         </p:spPr>
         <p:style>
           <a:lnRef idx="1">
@@ -12147,8 +12067,8 @@
         </p:nvCxnSpPr>
         <p:spPr>
           <a:xfrm>
-            <a:off x="5540230" y="3845577"/>
-            <a:ext cx="188057" cy="0"/>
+            <a:off x="5410200" y="3837626"/>
+            <a:ext cx="318087" cy="7951"/>
           </a:xfrm>
           <a:prstGeom prst="straightConnector1">
             <a:avLst/>
@@ -12156,45 +12076,6 @@
           <a:ln w="12700">
             <a:tailEnd type="triangle"/>
           </a:ln>
-        </p:spPr>
-        <p:style>
-          <a:lnRef idx="1">
-            <a:schemeClr val="accent4"/>
-          </a:lnRef>
-          <a:fillRef idx="0">
-            <a:schemeClr val="accent4"/>
-          </a:fillRef>
-          <a:effectRef idx="0">
-            <a:schemeClr val="accent4"/>
-          </a:effectRef>
-          <a:fontRef idx="minor">
-            <a:schemeClr val="tx1"/>
-          </a:fontRef>
-        </p:style>
-      </p:cxnSp>
-      <p:cxnSp>
-        <p:nvCxnSpPr>
-          <p:cNvPr id="136" name="Straight Connector 135">
-            <a:extLst>
-              <a:ext uri="{FF2B5EF4-FFF2-40B4-BE49-F238E27FC236}">
-                <a16:creationId xmlns:a16="http://schemas.microsoft.com/office/drawing/2014/main" id="{3366C7B7-4535-4A50-BEAC-D1A9515C6326}"/>
-              </a:ext>
-            </a:extLst>
-          </p:cNvPr>
-          <p:cNvCxnSpPr>
-            <a:cxnSpLocks/>
-          </p:cNvCxnSpPr>
-          <p:nvPr/>
-        </p:nvCxnSpPr>
-        <p:spPr>
-          <a:xfrm>
-            <a:off x="4759367" y="3456456"/>
-            <a:ext cx="764946" cy="6787"/>
-          </a:xfrm>
-          <a:prstGeom prst="line">
-            <a:avLst/>
-          </a:prstGeom>
-          <a:ln w="12700"/>
         </p:spPr>
         <p:style>
           <a:lnRef idx="1">
@@ -12287,7 +12168,7 @@
         </p:nvSpPr>
         <p:spPr>
           <a:xfrm>
-            <a:off x="5850785" y="4965521"/>
+            <a:off x="5620370" y="5686046"/>
             <a:ext cx="769442" cy="346760"/>
           </a:xfrm>
           <a:prstGeom prst="rect">
@@ -12684,7 +12565,7 @@
         </p:nvSpPr>
         <p:spPr>
           <a:xfrm>
-            <a:off x="7275863" y="4053356"/>
+            <a:off x="7275863" y="4210017"/>
             <a:ext cx="1194206" cy="285783"/>
           </a:xfrm>
           <a:prstGeom prst="rect">
@@ -12773,47 +12654,6 @@
           </a:fontRef>
         </p:style>
       </p:cxnSp>
-      <p:cxnSp>
-        <p:nvCxnSpPr>
-          <p:cNvPr id="160" name="Straight Arrow Connector 159">
-            <a:extLst>
-              <a:ext uri="{FF2B5EF4-FFF2-40B4-BE49-F238E27FC236}">
-                <a16:creationId xmlns:a16="http://schemas.microsoft.com/office/drawing/2014/main" id="{45C776FE-3F60-4540-B986-423D6BCB9CE8}"/>
-              </a:ext>
-            </a:extLst>
-          </p:cNvPr>
-          <p:cNvCxnSpPr>
-            <a:cxnSpLocks/>
-          </p:cNvCxnSpPr>
-          <p:nvPr/>
-        </p:nvCxnSpPr>
-        <p:spPr>
-          <a:xfrm flipV="1">
-            <a:off x="5518205" y="4990954"/>
-            <a:ext cx="332580" cy="2465"/>
-          </a:xfrm>
-          <a:prstGeom prst="straightConnector1">
-            <a:avLst/>
-          </a:prstGeom>
-          <a:ln w="12700">
-            <a:tailEnd type="triangle"/>
-          </a:ln>
-        </p:spPr>
-        <p:style>
-          <a:lnRef idx="1">
-            <a:schemeClr val="accent4"/>
-          </a:lnRef>
-          <a:fillRef idx="0">
-            <a:schemeClr val="accent4"/>
-          </a:fillRef>
-          <a:effectRef idx="0">
-            <a:schemeClr val="accent4"/>
-          </a:effectRef>
-          <a:fontRef idx="minor">
-            <a:schemeClr val="tx1"/>
-          </a:fontRef>
-        </p:style>
-      </p:cxnSp>
       <p:sp>
         <p:nvSpPr>
           <p:cNvPr id="168" name="TextBox 167">
@@ -12828,7 +12668,7 @@
         </p:nvSpPr>
         <p:spPr>
           <a:xfrm>
-            <a:off x="5546311" y="4811983"/>
+            <a:off x="5119602" y="4779998"/>
             <a:ext cx="270658" cy="220379"/>
           </a:xfrm>
           <a:prstGeom prst="rect">
@@ -12849,7 +12689,7 @@
                   <a:srgbClr val="7030A0"/>
                 </a:solidFill>
               </a:rPr>
-              <a:t>0…*</a:t>
+              <a:t>1…*</a:t>
             </a:r>
             <a:endParaRPr lang="en-SG" sz="1100" dirty="0">
               <a:solidFill>
@@ -12913,9 +12753,9 @@
           <p:nvPr/>
         </p:nvCxnSpPr>
         <p:spPr>
-          <a:xfrm flipH="1">
-            <a:off x="7087806" y="4267200"/>
-            <a:ext cx="7379" cy="1762630"/>
+          <a:xfrm>
+            <a:off x="7080453" y="4419600"/>
+            <a:ext cx="7354" cy="1610230"/>
           </a:xfrm>
           <a:prstGeom prst="line">
             <a:avLst/>
@@ -12953,49 +12793,8 @@
         </p:nvCxnSpPr>
         <p:spPr>
           <a:xfrm>
-            <a:off x="7086600" y="4267200"/>
+            <a:off x="7086600" y="4419600"/>
             <a:ext cx="188057" cy="0"/>
-          </a:xfrm>
-          <a:prstGeom prst="straightConnector1">
-            <a:avLst/>
-          </a:prstGeom>
-          <a:ln w="12700">
-            <a:tailEnd type="triangle"/>
-          </a:ln>
-        </p:spPr>
-        <p:style>
-          <a:lnRef idx="1">
-            <a:schemeClr val="accent4"/>
-          </a:lnRef>
-          <a:fillRef idx="0">
-            <a:schemeClr val="accent4"/>
-          </a:fillRef>
-          <a:effectRef idx="0">
-            <a:schemeClr val="accent4"/>
-          </a:effectRef>
-          <a:fontRef idx="minor">
-            <a:schemeClr val="tx1"/>
-          </a:fontRef>
-        </p:style>
-      </p:cxnSp>
-      <p:cxnSp>
-        <p:nvCxnSpPr>
-          <p:cNvPr id="180" name="Straight Arrow Connector 179">
-            <a:extLst>
-              <a:ext uri="{FF2B5EF4-FFF2-40B4-BE49-F238E27FC236}">
-                <a16:creationId xmlns:a16="http://schemas.microsoft.com/office/drawing/2014/main" id="{2942C48F-D76B-4487-9A83-6343DAF7CAD0}"/>
-              </a:ext>
-            </a:extLst>
-          </p:cNvPr>
-          <p:cNvCxnSpPr>
-            <a:cxnSpLocks/>
-          </p:cNvCxnSpPr>
-          <p:nvPr/>
-        </p:nvCxnSpPr>
-        <p:spPr>
-          <a:xfrm>
-            <a:off x="5526148" y="4114800"/>
-            <a:ext cx="1748509" cy="0"/>
           </a:xfrm>
           <a:prstGeom prst="straightConnector1">
             <a:avLst/>
@@ -13803,8 +13602,8 @@
           <p:nvPr/>
         </p:nvGrpSpPr>
         <p:grpSpPr>
-          <a:xfrm rot="10800000">
-            <a:off x="6055524" y="5322471"/>
+          <a:xfrm>
+            <a:off x="5866131" y="5350061"/>
             <a:ext cx="250566" cy="313004"/>
             <a:chOff x="3956721" y="5216228"/>
             <a:chExt cx="282387" cy="450886"/>
@@ -13928,7 +13727,7 @@
         </p:nvSpPr>
         <p:spPr>
           <a:xfrm>
-            <a:off x="5526149" y="5642225"/>
+            <a:off x="5327862" y="5025789"/>
             <a:ext cx="1294772" cy="298860"/>
           </a:xfrm>
           <a:prstGeom prst="rect">
@@ -14578,48 +14377,6 @@
           <a:xfrm>
             <a:off x="6980208" y="2876519"/>
             <a:ext cx="240873" cy="0"/>
-          </a:xfrm>
-          <a:prstGeom prst="straightConnector1">
-            <a:avLst/>
-          </a:prstGeom>
-          <a:ln w="12700">
-            <a:tailEnd type="triangle"/>
-          </a:ln>
-        </p:spPr>
-        <p:style>
-          <a:lnRef idx="1">
-            <a:schemeClr val="accent4"/>
-          </a:lnRef>
-          <a:fillRef idx="0">
-            <a:schemeClr val="accent4"/>
-          </a:fillRef>
-          <a:effectRef idx="0">
-            <a:schemeClr val="accent4"/>
-          </a:effectRef>
-          <a:fontRef idx="minor">
-            <a:schemeClr val="tx1"/>
-          </a:fontRef>
-        </p:style>
-      </p:cxnSp>
-      <p:cxnSp>
-        <p:nvCxnSpPr>
-          <p:cNvPr id="255" name="Straight Arrow Connector 254">
-            <a:extLst>
-              <a:ext uri="{FF2B5EF4-FFF2-40B4-BE49-F238E27FC236}">
-                <a16:creationId xmlns:a16="http://schemas.microsoft.com/office/drawing/2014/main" id="{9B4671EC-A00C-438C-B9AB-DDD417A7257E}"/>
-              </a:ext>
-            </a:extLst>
-          </p:cNvPr>
-          <p:cNvCxnSpPr>
-            <a:cxnSpLocks/>
-            <a:endCxn id="138" idx="1"/>
-          </p:cNvCxnSpPr>
-          <p:nvPr/>
-        </p:nvCxnSpPr>
-        <p:spPr>
-          <a:xfrm>
-            <a:off x="3576171" y="5138901"/>
-            <a:ext cx="2274614" cy="0"/>
           </a:xfrm>
           <a:prstGeom prst="straightConnector1">
             <a:avLst/>
@@ -14854,6 +14611,384 @@
             <a:avLst/>
           </a:prstGeom>
           <a:ln w="12700">
+            <a:tailEnd type="triangle"/>
+          </a:ln>
+        </p:spPr>
+        <p:style>
+          <a:lnRef idx="1">
+            <a:schemeClr val="accent4"/>
+          </a:lnRef>
+          <a:fillRef idx="0">
+            <a:schemeClr val="accent4"/>
+          </a:fillRef>
+          <a:effectRef idx="0">
+            <a:schemeClr val="accent4"/>
+          </a:effectRef>
+          <a:fontRef idx="minor">
+            <a:schemeClr val="tx1"/>
+          </a:fontRef>
+        </p:style>
+      </p:cxnSp>
+      <p:cxnSp>
+        <p:nvCxnSpPr>
+          <p:cNvPr id="19" name="Straight Arrow Connector 18">
+            <a:extLst>
+              <a:ext uri="{FF2B5EF4-FFF2-40B4-BE49-F238E27FC236}">
+                <a16:creationId xmlns:a16="http://schemas.microsoft.com/office/drawing/2014/main" id="{DED103BD-886D-4B45-A969-A13D31B6E57E}"/>
+              </a:ext>
+            </a:extLst>
+          </p:cNvPr>
+          <p:cNvCxnSpPr>
+            <a:cxnSpLocks/>
+            <a:stCxn id="115" idx="3"/>
+            <a:endCxn id="198" idx="1"/>
+          </p:cNvCxnSpPr>
+          <p:nvPr/>
+        </p:nvCxnSpPr>
+        <p:spPr>
+          <a:xfrm>
+            <a:off x="4759367" y="3457692"/>
+            <a:ext cx="861003" cy="11198"/>
+          </a:xfrm>
+          <a:prstGeom prst="straightConnector1">
+            <a:avLst/>
+          </a:prstGeom>
+          <a:ln w="12700">
+            <a:tailEnd type="triangle"/>
+          </a:ln>
+        </p:spPr>
+        <p:style>
+          <a:lnRef idx="1">
+            <a:schemeClr val="accent4"/>
+          </a:lnRef>
+          <a:fillRef idx="0">
+            <a:schemeClr val="accent4"/>
+          </a:fillRef>
+          <a:effectRef idx="0">
+            <a:schemeClr val="accent4"/>
+          </a:effectRef>
+          <a:fontRef idx="minor">
+            <a:schemeClr val="tx1"/>
+          </a:fontRef>
+        </p:style>
+      </p:cxnSp>
+      <p:cxnSp>
+        <p:nvCxnSpPr>
+          <p:cNvPr id="27" name="Connector: Elbow 26">
+            <a:extLst>
+              <a:ext uri="{FF2B5EF4-FFF2-40B4-BE49-F238E27FC236}">
+                <a16:creationId xmlns:a16="http://schemas.microsoft.com/office/drawing/2014/main" id="{F09F3622-69E9-4592-BC12-E78100A4FA87}"/>
+              </a:ext>
+            </a:extLst>
+          </p:cNvPr>
+          <p:cNvCxnSpPr>
+            <a:cxnSpLocks/>
+            <a:endCxn id="95" idx="3"/>
+          </p:cNvCxnSpPr>
+          <p:nvPr/>
+        </p:nvCxnSpPr>
+        <p:spPr>
+          <a:xfrm flipV="1">
+            <a:off x="5410200" y="2884626"/>
+            <a:ext cx="3005090" cy="1221539"/>
+          </a:xfrm>
+          <a:prstGeom prst="bentConnector3">
+            <a:avLst>
+              <a:gd name="adj1" fmla="val 107607"/>
+            </a:avLst>
+          </a:prstGeom>
+          <a:ln w="12700">
+            <a:tailEnd type="triangle"/>
+          </a:ln>
+        </p:spPr>
+        <p:style>
+          <a:lnRef idx="1">
+            <a:schemeClr val="accent4"/>
+          </a:lnRef>
+          <a:fillRef idx="0">
+            <a:schemeClr val="accent4"/>
+          </a:fillRef>
+          <a:effectRef idx="0">
+            <a:schemeClr val="accent4"/>
+          </a:effectRef>
+          <a:fontRef idx="minor">
+            <a:schemeClr val="tx1"/>
+          </a:fontRef>
+        </p:style>
+      </p:cxnSp>
+      <p:cxnSp>
+        <p:nvCxnSpPr>
+          <p:cNvPr id="227" name="Connector: Elbow 226">
+            <a:extLst>
+              <a:ext uri="{FF2B5EF4-FFF2-40B4-BE49-F238E27FC236}">
+                <a16:creationId xmlns:a16="http://schemas.microsoft.com/office/drawing/2014/main" id="{CFB571CA-7ECD-43CF-913D-408E439767D5}"/>
+              </a:ext>
+            </a:extLst>
+          </p:cNvPr>
+          <p:cNvCxnSpPr>
+            <a:stCxn id="139" idx="3"/>
+            <a:endCxn id="138" idx="1"/>
+          </p:cNvCxnSpPr>
+          <p:nvPr/>
+        </p:nvCxnSpPr>
+        <p:spPr>
+          <a:xfrm>
+            <a:off x="3588993" y="5140643"/>
+            <a:ext cx="2031377" cy="718783"/>
+          </a:xfrm>
+          <a:prstGeom prst="bentConnector3">
+            <a:avLst/>
+          </a:prstGeom>
+          <a:ln w="12700">
+            <a:tailEnd type="triangle"/>
+          </a:ln>
+        </p:spPr>
+        <p:style>
+          <a:lnRef idx="1">
+            <a:schemeClr val="accent4"/>
+          </a:lnRef>
+          <a:fillRef idx="0">
+            <a:schemeClr val="accent4"/>
+          </a:fillRef>
+          <a:effectRef idx="0">
+            <a:schemeClr val="accent4"/>
+          </a:effectRef>
+          <a:fontRef idx="minor">
+            <a:schemeClr val="tx1"/>
+          </a:fontRef>
+        </p:style>
+      </p:cxnSp>
+      <p:cxnSp>
+        <p:nvCxnSpPr>
+          <p:cNvPr id="229" name="Straight Arrow Connector 228">
+            <a:extLst>
+              <a:ext uri="{FF2B5EF4-FFF2-40B4-BE49-F238E27FC236}">
+                <a16:creationId xmlns:a16="http://schemas.microsoft.com/office/drawing/2014/main" id="{907988B8-8D4A-47F6-80AA-61FD9822B0A8}"/>
+              </a:ext>
+            </a:extLst>
+          </p:cNvPr>
+          <p:cNvCxnSpPr>
+            <a:cxnSpLocks/>
+          </p:cNvCxnSpPr>
+          <p:nvPr/>
+        </p:nvCxnSpPr>
+        <p:spPr>
+          <a:xfrm>
+            <a:off x="5392655" y="3484683"/>
+            <a:ext cx="17545" cy="1541106"/>
+          </a:xfrm>
+          <a:prstGeom prst="straightConnector1">
+            <a:avLst/>
+          </a:prstGeom>
+          <a:ln>
+            <a:tailEnd type="triangle"/>
+          </a:ln>
+        </p:spPr>
+        <p:style>
+          <a:lnRef idx="1">
+            <a:schemeClr val="accent4"/>
+          </a:lnRef>
+          <a:fillRef idx="0">
+            <a:schemeClr val="accent4"/>
+          </a:fillRef>
+          <a:effectRef idx="0">
+            <a:schemeClr val="accent4"/>
+          </a:effectRef>
+          <a:fontRef idx="minor">
+            <a:schemeClr val="tx1"/>
+          </a:fontRef>
+        </p:style>
+      </p:cxnSp>
+      <p:sp>
+        <p:nvSpPr>
+          <p:cNvPr id="129" name="Rectangle 8">
+            <a:extLst>
+              <a:ext uri="{FF2B5EF4-FFF2-40B4-BE49-F238E27FC236}">
+                <a16:creationId xmlns:a16="http://schemas.microsoft.com/office/drawing/2014/main" id="{AACD1877-2908-4BF1-B8AA-59B10E4FCD03}"/>
+              </a:ext>
+            </a:extLst>
+          </p:cNvPr>
+          <p:cNvSpPr/>
+          <p:nvPr/>
+        </p:nvSpPr>
+        <p:spPr>
+          <a:xfrm>
+            <a:off x="7217135" y="2354647"/>
+            <a:ext cx="1194209" cy="285783"/>
+          </a:xfrm>
+          <a:prstGeom prst="rect">
+            <a:avLst/>
+          </a:prstGeom>
+          <a:ln w="19050">
+            <a:solidFill>
+              <a:srgbClr val="7030A0"/>
+            </a:solidFill>
+          </a:ln>
+          <a:effectLst/>
+        </p:spPr>
+        <p:style>
+          <a:lnRef idx="1">
+            <a:schemeClr val="accent4"/>
+          </a:lnRef>
+          <a:fillRef idx="2">
+            <a:schemeClr val="accent4"/>
+          </a:fillRef>
+          <a:effectRef idx="1">
+            <a:schemeClr val="accent4"/>
+          </a:effectRef>
+          <a:fontRef idx="minor">
+            <a:schemeClr val="dk1"/>
+          </a:fontRef>
+        </p:style>
+        <p:txBody>
+          <a:bodyPr rtlCol="0" anchor="ctr"/>
+          <a:lstStyle/>
+          <a:p>
+            <a:pPr algn="ctr"/>
+            <a:r>
+              <a:rPr lang="en-US" sz="1050" dirty="0" err="1">
+                <a:solidFill>
+                  <a:srgbClr val="7030A0"/>
+                </a:solidFill>
+              </a:rPr>
+              <a:t>MemberTier</a:t>
+            </a:r>
+            <a:endParaRPr lang="en-SG" sz="1050" dirty="0">
+              <a:solidFill>
+                <a:srgbClr val="7030A0"/>
+              </a:solidFill>
+            </a:endParaRPr>
+          </a:p>
+        </p:txBody>
+      </p:sp>
+      <p:sp>
+        <p:nvSpPr>
+          <p:cNvPr id="130" name="Rectangle 8">
+            <a:extLst>
+              <a:ext uri="{FF2B5EF4-FFF2-40B4-BE49-F238E27FC236}">
+                <a16:creationId xmlns:a16="http://schemas.microsoft.com/office/drawing/2014/main" id="{889EB7F2-3DB4-4877-9D53-F444F529DA44}"/>
+              </a:ext>
+            </a:extLst>
+          </p:cNvPr>
+          <p:cNvSpPr/>
+          <p:nvPr/>
+        </p:nvSpPr>
+        <p:spPr>
+          <a:xfrm>
+            <a:off x="7217135" y="1975666"/>
+            <a:ext cx="1194210" cy="285783"/>
+          </a:xfrm>
+          <a:prstGeom prst="rect">
+            <a:avLst/>
+          </a:prstGeom>
+          <a:ln w="19050">
+            <a:solidFill>
+              <a:srgbClr val="7030A0"/>
+            </a:solidFill>
+          </a:ln>
+          <a:effectLst/>
+        </p:spPr>
+        <p:style>
+          <a:lnRef idx="1">
+            <a:schemeClr val="accent4"/>
+          </a:lnRef>
+          <a:fillRef idx="2">
+            <a:schemeClr val="accent4"/>
+          </a:fillRef>
+          <a:effectRef idx="1">
+            <a:schemeClr val="accent4"/>
+          </a:effectRef>
+          <a:fontRef idx="minor">
+            <a:schemeClr val="dk1"/>
+          </a:fontRef>
+        </p:style>
+        <p:txBody>
+          <a:bodyPr rtlCol="0" anchor="ctr"/>
+          <a:lstStyle/>
+          <a:p>
+            <a:pPr algn="ctr"/>
+            <a:r>
+              <a:rPr lang="en-US" sz="1050" dirty="0" err="1">
+                <a:solidFill>
+                  <a:srgbClr val="7030A0"/>
+                </a:solidFill>
+              </a:rPr>
+              <a:t>MemberEmail</a:t>
+            </a:r>
+            <a:endParaRPr lang="en-SG" sz="1050" dirty="0">
+              <a:solidFill>
+                <a:srgbClr val="7030A0"/>
+              </a:solidFill>
+            </a:endParaRPr>
+          </a:p>
+        </p:txBody>
+      </p:sp>
+      <p:cxnSp>
+        <p:nvCxnSpPr>
+          <p:cNvPr id="236" name="Connector: Elbow 235">
+            <a:extLst>
+              <a:ext uri="{FF2B5EF4-FFF2-40B4-BE49-F238E27FC236}">
+                <a16:creationId xmlns:a16="http://schemas.microsoft.com/office/drawing/2014/main" id="{C8000328-0616-4FBB-859E-A433BE04DB87}"/>
+              </a:ext>
+            </a:extLst>
+          </p:cNvPr>
+          <p:cNvCxnSpPr>
+            <a:cxnSpLocks/>
+            <a:endCxn id="130" idx="1"/>
+          </p:cNvCxnSpPr>
+          <p:nvPr/>
+        </p:nvCxnSpPr>
+        <p:spPr>
+          <a:xfrm rot="5400000" flipH="1" flipV="1">
+            <a:off x="6921817" y="2176949"/>
+            <a:ext cx="353709" cy="236928"/>
+          </a:xfrm>
+          <a:prstGeom prst="bentConnector2">
+            <a:avLst/>
+          </a:prstGeom>
+          <a:ln>
+            <a:tailEnd type="triangle"/>
+          </a:ln>
+        </p:spPr>
+        <p:style>
+          <a:lnRef idx="1">
+            <a:schemeClr val="accent4"/>
+          </a:lnRef>
+          <a:fillRef idx="0">
+            <a:schemeClr val="accent4"/>
+          </a:fillRef>
+          <a:effectRef idx="0">
+            <a:schemeClr val="accent4"/>
+          </a:effectRef>
+          <a:fontRef idx="minor">
+            <a:schemeClr val="tx1"/>
+          </a:fontRef>
+        </p:style>
+      </p:cxnSp>
+      <p:cxnSp>
+        <p:nvCxnSpPr>
+          <p:cNvPr id="239" name="Connector: Elbow 238">
+            <a:extLst>
+              <a:ext uri="{FF2B5EF4-FFF2-40B4-BE49-F238E27FC236}">
+                <a16:creationId xmlns:a16="http://schemas.microsoft.com/office/drawing/2014/main" id="{9132F0C2-88E5-4EC1-A541-88632966D185}"/>
+              </a:ext>
+            </a:extLst>
+          </p:cNvPr>
+          <p:cNvCxnSpPr>
+            <a:cxnSpLocks/>
+            <a:endCxn id="93" idx="1"/>
+          </p:cNvCxnSpPr>
+          <p:nvPr/>
+        </p:nvCxnSpPr>
+        <p:spPr>
+          <a:xfrm rot="5400000" flipH="1" flipV="1">
+            <a:off x="6697297" y="2000077"/>
+            <a:ext cx="802751" cy="236925"/>
+          </a:xfrm>
+          <a:prstGeom prst="bentConnector2">
+            <a:avLst/>
+          </a:prstGeom>
+          <a:ln>
             <a:tailEnd type="triangle"/>
           </a:ln>
         </p:spPr>

</xml_diff>